<commit_message>
SOM Lsn 2 over
</commit_message>
<xml_diff>
--- a/STRENGTH OF MATERIALS SHORTNOTES/SOM Revision.pptx
+++ b/STRENGTH OF MATERIALS SHORTNOTES/SOM Revision.pptx
@@ -6,6 +6,16 @@
   </p:sldMasterIdLst>
   <p:sldIdLst>
     <p:sldId id="256" r:id="rId2"/>
+    <p:sldId id="257" r:id="rId3"/>
+    <p:sldId id="258" r:id="rId4"/>
+    <p:sldId id="259" r:id="rId5"/>
+    <p:sldId id="260" r:id="rId6"/>
+    <p:sldId id="261" r:id="rId7"/>
+    <p:sldId id="262" r:id="rId8"/>
+    <p:sldId id="263" r:id="rId9"/>
+    <p:sldId id="264" r:id="rId10"/>
+    <p:sldId id="265" r:id="rId11"/>
+    <p:sldId id="266" r:id="rId12"/>
   </p:sldIdLst>
   <p:sldSz cx="12192000" cy="6858000"/>
   <p:notesSz cx="6858000" cy="9144000"/>
@@ -104,6 +114,11 @@
       </a:defRPr>
     </a:lvl9pPr>
   </p:defaultTextStyle>
+  <p:extLst>
+    <p:ext uri="{EFAFB233-063F-42B5-8137-9DF3F51BA10A}">
+      <p15:sldGuideLst xmlns:p15="http://schemas.microsoft.com/office/powerpoint/2012/main"/>
+    </p:ext>
+  </p:extLst>
 </p:presentation>
 </file>
 
@@ -256,7 +271,7 @@
           <a:p>
             <a:fld id="{EA402788-B3D0-4CAD-96CC-4B452FA47DBC}" type="datetimeFigureOut">
               <a:rPr lang="en-IN" smtClean="0"/>
-              <a:t>27-01-2023</a:t>
+              <a:t>29-01-2023</a:t>
             </a:fld>
             <a:endParaRPr lang="en-IN"/>
           </a:p>
@@ -456,7 +471,7 @@
           <a:p>
             <a:fld id="{EA402788-B3D0-4CAD-96CC-4B452FA47DBC}" type="datetimeFigureOut">
               <a:rPr lang="en-IN" smtClean="0"/>
-              <a:t>27-01-2023</a:t>
+              <a:t>29-01-2023</a:t>
             </a:fld>
             <a:endParaRPr lang="en-IN"/>
           </a:p>
@@ -666,7 +681,7 @@
           <a:p>
             <a:fld id="{EA402788-B3D0-4CAD-96CC-4B452FA47DBC}" type="datetimeFigureOut">
               <a:rPr lang="en-IN" smtClean="0"/>
-              <a:t>27-01-2023</a:t>
+              <a:t>29-01-2023</a:t>
             </a:fld>
             <a:endParaRPr lang="en-IN"/>
           </a:p>
@@ -866,7 +881,7 @@
           <a:p>
             <a:fld id="{EA402788-B3D0-4CAD-96CC-4B452FA47DBC}" type="datetimeFigureOut">
               <a:rPr lang="en-IN" smtClean="0"/>
-              <a:t>27-01-2023</a:t>
+              <a:t>29-01-2023</a:t>
             </a:fld>
             <a:endParaRPr lang="en-IN"/>
           </a:p>
@@ -1142,7 +1157,7 @@
           <a:p>
             <a:fld id="{EA402788-B3D0-4CAD-96CC-4B452FA47DBC}" type="datetimeFigureOut">
               <a:rPr lang="en-IN" smtClean="0"/>
-              <a:t>27-01-2023</a:t>
+              <a:t>29-01-2023</a:t>
             </a:fld>
             <a:endParaRPr lang="en-IN"/>
           </a:p>
@@ -1410,7 +1425,7 @@
           <a:p>
             <a:fld id="{EA402788-B3D0-4CAD-96CC-4B452FA47DBC}" type="datetimeFigureOut">
               <a:rPr lang="en-IN" smtClean="0"/>
-              <a:t>27-01-2023</a:t>
+              <a:t>29-01-2023</a:t>
             </a:fld>
             <a:endParaRPr lang="en-IN"/>
           </a:p>
@@ -1825,7 +1840,7 @@
           <a:p>
             <a:fld id="{EA402788-B3D0-4CAD-96CC-4B452FA47DBC}" type="datetimeFigureOut">
               <a:rPr lang="en-IN" smtClean="0"/>
-              <a:t>27-01-2023</a:t>
+              <a:t>29-01-2023</a:t>
             </a:fld>
             <a:endParaRPr lang="en-IN"/>
           </a:p>
@@ -1967,7 +1982,7 @@
           <a:p>
             <a:fld id="{EA402788-B3D0-4CAD-96CC-4B452FA47DBC}" type="datetimeFigureOut">
               <a:rPr lang="en-IN" smtClean="0"/>
-              <a:t>27-01-2023</a:t>
+              <a:t>29-01-2023</a:t>
             </a:fld>
             <a:endParaRPr lang="en-IN"/>
           </a:p>
@@ -2080,7 +2095,7 @@
           <a:p>
             <a:fld id="{EA402788-B3D0-4CAD-96CC-4B452FA47DBC}" type="datetimeFigureOut">
               <a:rPr lang="en-IN" smtClean="0"/>
-              <a:t>27-01-2023</a:t>
+              <a:t>29-01-2023</a:t>
             </a:fld>
             <a:endParaRPr lang="en-IN"/>
           </a:p>
@@ -2393,7 +2408,7 @@
           <a:p>
             <a:fld id="{EA402788-B3D0-4CAD-96CC-4B452FA47DBC}" type="datetimeFigureOut">
               <a:rPr lang="en-IN" smtClean="0"/>
-              <a:t>27-01-2023</a:t>
+              <a:t>29-01-2023</a:t>
             </a:fld>
             <a:endParaRPr lang="en-IN"/>
           </a:p>
@@ -2682,7 +2697,7 @@
           <a:p>
             <a:fld id="{EA402788-B3D0-4CAD-96CC-4B452FA47DBC}" type="datetimeFigureOut">
               <a:rPr lang="en-IN" smtClean="0"/>
-              <a:t>27-01-2023</a:t>
+              <a:t>29-01-2023</a:t>
             </a:fld>
             <a:endParaRPr lang="en-IN"/>
           </a:p>
@@ -2925,7 +2940,7 @@
           <a:p>
             <a:fld id="{EA402788-B3D0-4CAD-96CC-4B452FA47DBC}" type="datetimeFigureOut">
               <a:rPr lang="en-IN" smtClean="0"/>
-              <a:t>27-01-2023</a:t>
+              <a:t>29-01-2023</a:t>
             </a:fld>
             <a:endParaRPr lang="en-IN"/>
           </a:p>
@@ -4681,6 +4696,4817 @@
 </p:sld>
 </file>
 
+<file path=ppt/slides/slide10.xml><?xml version="1.0" encoding="utf-8"?>
+<p:sld xmlns:a="http://schemas.openxmlformats.org/drawingml/2006/main" xmlns:r="http://schemas.openxmlformats.org/officeDocument/2006/relationships" xmlns:p="http://schemas.openxmlformats.org/presentationml/2006/main">
+  <p:cSld>
+    <p:spTree>
+      <p:nvGrpSpPr>
+        <p:cNvPr id="1" name=""/>
+        <p:cNvGrpSpPr/>
+        <p:nvPr/>
+      </p:nvGrpSpPr>
+      <p:grpSpPr>
+        <a:xfrm>
+          <a:off x="0" y="0"/>
+          <a:ext cx="0" cy="0"/>
+          <a:chOff x="0" y="0"/>
+          <a:chExt cx="0" cy="0"/>
+        </a:xfrm>
+      </p:grpSpPr>
+      <p:sp>
+        <p:nvSpPr>
+          <p:cNvPr id="4" name="Rectangle 3">
+            <a:extLst>
+              <a:ext uri="{FF2B5EF4-FFF2-40B4-BE49-F238E27FC236}">
+                <a16:creationId xmlns:a16="http://schemas.microsoft.com/office/drawing/2014/main" id="{88CDF052-7060-44CD-8FA2-933FADA6FA5B}"/>
+              </a:ext>
+            </a:extLst>
+          </p:cNvPr>
+          <p:cNvSpPr/>
+          <p:nvPr/>
+        </p:nvSpPr>
+        <p:spPr>
+          <a:xfrm>
+            <a:off x="2994212" y="403412"/>
+            <a:ext cx="6831106" cy="1004047"/>
+          </a:xfrm>
+          <a:prstGeom prst="rect">
+            <a:avLst/>
+          </a:prstGeom>
+        </p:spPr>
+        <p:style>
+          <a:lnRef idx="1">
+            <a:schemeClr val="accent5"/>
+          </a:lnRef>
+          <a:fillRef idx="2">
+            <a:schemeClr val="accent5"/>
+          </a:fillRef>
+          <a:effectRef idx="1">
+            <a:schemeClr val="accent5"/>
+          </a:effectRef>
+          <a:fontRef idx="minor">
+            <a:schemeClr val="dk1"/>
+          </a:fontRef>
+        </p:style>
+        <p:txBody>
+          <a:bodyPr rtlCol="0" anchor="ctr"/>
+          <a:lstStyle/>
+          <a:p>
+            <a:pPr algn="ctr"/>
+            <a:endParaRPr lang="en-IN"/>
+          </a:p>
+        </p:txBody>
+      </p:sp>
+      <p:cxnSp>
+        <p:nvCxnSpPr>
+          <p:cNvPr id="6" name="Straight Connector 5">
+            <a:extLst>
+              <a:ext uri="{FF2B5EF4-FFF2-40B4-BE49-F238E27FC236}">
+                <a16:creationId xmlns:a16="http://schemas.microsoft.com/office/drawing/2014/main" id="{4DC68427-C26C-4A78-95ED-35290219B0B1}"/>
+              </a:ext>
+            </a:extLst>
+          </p:cNvPr>
+          <p:cNvCxnSpPr/>
+          <p:nvPr/>
+        </p:nvCxnSpPr>
+        <p:spPr>
+          <a:xfrm>
+            <a:off x="4966447" y="197224"/>
+            <a:ext cx="0" cy="1541929"/>
+          </a:xfrm>
+          <a:prstGeom prst="line">
+            <a:avLst/>
+          </a:prstGeom>
+          <a:ln w="28575">
+            <a:prstDash val="sysDash"/>
+          </a:ln>
+        </p:spPr>
+        <p:style>
+          <a:lnRef idx="1">
+            <a:schemeClr val="dk1"/>
+          </a:lnRef>
+          <a:fillRef idx="0">
+            <a:schemeClr val="dk1"/>
+          </a:fillRef>
+          <a:effectRef idx="0">
+            <a:schemeClr val="dk1"/>
+          </a:effectRef>
+          <a:fontRef idx="minor">
+            <a:schemeClr val="tx1"/>
+          </a:fontRef>
+        </p:style>
+      </p:cxnSp>
+      <p:cxnSp>
+        <p:nvCxnSpPr>
+          <p:cNvPr id="19" name="Straight Connector 18">
+            <a:extLst>
+              <a:ext uri="{FF2B5EF4-FFF2-40B4-BE49-F238E27FC236}">
+                <a16:creationId xmlns:a16="http://schemas.microsoft.com/office/drawing/2014/main" id="{13800F11-384B-4196-9208-30C726F76FB5}"/>
+              </a:ext>
+            </a:extLst>
+          </p:cNvPr>
+          <p:cNvCxnSpPr/>
+          <p:nvPr/>
+        </p:nvCxnSpPr>
+        <p:spPr>
+          <a:xfrm>
+            <a:off x="6992470" y="197224"/>
+            <a:ext cx="0" cy="1541929"/>
+          </a:xfrm>
+          <a:prstGeom prst="line">
+            <a:avLst/>
+          </a:prstGeom>
+          <a:ln w="28575">
+            <a:prstDash val="sysDash"/>
+          </a:ln>
+        </p:spPr>
+        <p:style>
+          <a:lnRef idx="1">
+            <a:schemeClr val="dk1"/>
+          </a:lnRef>
+          <a:fillRef idx="0">
+            <a:schemeClr val="dk1"/>
+          </a:fillRef>
+          <a:effectRef idx="0">
+            <a:schemeClr val="dk1"/>
+          </a:effectRef>
+          <a:fontRef idx="minor">
+            <a:schemeClr val="tx1"/>
+          </a:fontRef>
+        </p:style>
+      </p:cxnSp>
+      <p:cxnSp>
+        <p:nvCxnSpPr>
+          <p:cNvPr id="8" name="Straight Connector 7">
+            <a:extLst>
+              <a:ext uri="{FF2B5EF4-FFF2-40B4-BE49-F238E27FC236}">
+                <a16:creationId xmlns:a16="http://schemas.microsoft.com/office/drawing/2014/main" id="{5B8AE156-B57A-4C0C-9972-755D691B1EA5}"/>
+              </a:ext>
+            </a:extLst>
+          </p:cNvPr>
+          <p:cNvCxnSpPr/>
+          <p:nvPr/>
+        </p:nvCxnSpPr>
+        <p:spPr>
+          <a:xfrm>
+            <a:off x="2994212" y="1631576"/>
+            <a:ext cx="6831106" cy="0"/>
+          </a:xfrm>
+          <a:prstGeom prst="line">
+            <a:avLst/>
+          </a:prstGeom>
+          <a:ln w="19050"/>
+        </p:spPr>
+        <p:style>
+          <a:lnRef idx="1">
+            <a:schemeClr val="dk1"/>
+          </a:lnRef>
+          <a:fillRef idx="0">
+            <a:schemeClr val="dk1"/>
+          </a:fillRef>
+          <a:effectRef idx="0">
+            <a:schemeClr val="dk1"/>
+          </a:effectRef>
+          <a:fontRef idx="minor">
+            <a:schemeClr val="tx1"/>
+          </a:fontRef>
+        </p:style>
+      </p:cxnSp>
+      <p:cxnSp>
+        <p:nvCxnSpPr>
+          <p:cNvPr id="10" name="Straight Connector 9">
+            <a:extLst>
+              <a:ext uri="{FF2B5EF4-FFF2-40B4-BE49-F238E27FC236}">
+                <a16:creationId xmlns:a16="http://schemas.microsoft.com/office/drawing/2014/main" id="{C5CE6A5D-CD7A-4170-B8B2-8A9BB4B30683}"/>
+              </a:ext>
+            </a:extLst>
+          </p:cNvPr>
+          <p:cNvCxnSpPr/>
+          <p:nvPr/>
+        </p:nvCxnSpPr>
+        <p:spPr>
+          <a:xfrm>
+            <a:off x="2994212" y="1479176"/>
+            <a:ext cx="0" cy="259977"/>
+          </a:xfrm>
+          <a:prstGeom prst="line">
+            <a:avLst/>
+          </a:prstGeom>
+          <a:ln w="19050"/>
+        </p:spPr>
+        <p:style>
+          <a:lnRef idx="1">
+            <a:schemeClr val="dk1"/>
+          </a:lnRef>
+          <a:fillRef idx="0">
+            <a:schemeClr val="dk1"/>
+          </a:fillRef>
+          <a:effectRef idx="0">
+            <a:schemeClr val="dk1"/>
+          </a:effectRef>
+          <a:fontRef idx="minor">
+            <a:schemeClr val="tx1"/>
+          </a:fontRef>
+        </p:style>
+      </p:cxnSp>
+      <p:cxnSp>
+        <p:nvCxnSpPr>
+          <p:cNvPr id="24" name="Straight Connector 23">
+            <a:extLst>
+              <a:ext uri="{FF2B5EF4-FFF2-40B4-BE49-F238E27FC236}">
+                <a16:creationId xmlns:a16="http://schemas.microsoft.com/office/drawing/2014/main" id="{286BD775-14F3-48A5-BB78-B17DF1F8BF75}"/>
+              </a:ext>
+            </a:extLst>
+          </p:cNvPr>
+          <p:cNvCxnSpPr/>
+          <p:nvPr/>
+        </p:nvCxnSpPr>
+        <p:spPr>
+          <a:xfrm>
+            <a:off x="9825318" y="1501587"/>
+            <a:ext cx="0" cy="259977"/>
+          </a:xfrm>
+          <a:prstGeom prst="line">
+            <a:avLst/>
+          </a:prstGeom>
+          <a:ln w="19050"/>
+        </p:spPr>
+        <p:style>
+          <a:lnRef idx="1">
+            <a:schemeClr val="dk1"/>
+          </a:lnRef>
+          <a:fillRef idx="0">
+            <a:schemeClr val="dk1"/>
+          </a:fillRef>
+          <a:effectRef idx="0">
+            <a:schemeClr val="dk1"/>
+          </a:effectRef>
+          <a:fontRef idx="minor">
+            <a:schemeClr val="tx1"/>
+          </a:fontRef>
+        </p:style>
+      </p:cxnSp>
+      <p:sp>
+        <p:nvSpPr>
+          <p:cNvPr id="11" name="TextBox 10">
+            <a:extLst>
+              <a:ext uri="{FF2B5EF4-FFF2-40B4-BE49-F238E27FC236}">
+                <a16:creationId xmlns:a16="http://schemas.microsoft.com/office/drawing/2014/main" id="{EEFC385D-3078-46C9-9602-BEB8B5545BBA}"/>
+              </a:ext>
+            </a:extLst>
+          </p:cNvPr>
+          <p:cNvSpPr txBox="1"/>
+          <p:nvPr/>
+        </p:nvSpPr>
+        <p:spPr>
+          <a:xfrm>
+            <a:off x="3657596" y="1631575"/>
+            <a:ext cx="753040" cy="369332"/>
+          </a:xfrm>
+          <a:prstGeom prst="rect">
+            <a:avLst/>
+          </a:prstGeom>
+          <a:noFill/>
+        </p:spPr>
+        <p:txBody>
+          <a:bodyPr wrap="square" rtlCol="0">
+            <a:spAutoFit/>
+          </a:bodyPr>
+          <a:lstStyle/>
+          <a:p>
+            <a:r>
+              <a:rPr lang="en-IN"/>
+              <a:t>0.6m</a:t>
+            </a:r>
+          </a:p>
+        </p:txBody>
+      </p:sp>
+      <p:sp>
+        <p:nvSpPr>
+          <p:cNvPr id="25" name="TextBox 24">
+            <a:extLst>
+              <a:ext uri="{FF2B5EF4-FFF2-40B4-BE49-F238E27FC236}">
+                <a16:creationId xmlns:a16="http://schemas.microsoft.com/office/drawing/2014/main" id="{14CF5B97-E484-4C0C-B8A6-D85270218BE6}"/>
+              </a:ext>
+            </a:extLst>
+          </p:cNvPr>
+          <p:cNvSpPr txBox="1"/>
+          <p:nvPr/>
+        </p:nvSpPr>
+        <p:spPr>
+          <a:xfrm>
+            <a:off x="5773269" y="1585863"/>
+            <a:ext cx="753040" cy="369332"/>
+          </a:xfrm>
+          <a:prstGeom prst="rect">
+            <a:avLst/>
+          </a:prstGeom>
+          <a:noFill/>
+        </p:spPr>
+        <p:txBody>
+          <a:bodyPr wrap="square" rtlCol="0">
+            <a:spAutoFit/>
+          </a:bodyPr>
+          <a:lstStyle/>
+          <a:p>
+            <a:r>
+              <a:rPr lang="en-IN"/>
+              <a:t>1m</a:t>
+            </a:r>
+          </a:p>
+        </p:txBody>
+      </p:sp>
+      <p:sp>
+        <p:nvSpPr>
+          <p:cNvPr id="26" name="TextBox 25">
+            <a:extLst>
+              <a:ext uri="{FF2B5EF4-FFF2-40B4-BE49-F238E27FC236}">
+                <a16:creationId xmlns:a16="http://schemas.microsoft.com/office/drawing/2014/main" id="{F3D19E0A-7F04-4975-867C-183931F1F7B5}"/>
+              </a:ext>
+            </a:extLst>
+          </p:cNvPr>
+          <p:cNvSpPr txBox="1"/>
+          <p:nvPr/>
+        </p:nvSpPr>
+        <p:spPr>
+          <a:xfrm>
+            <a:off x="8032373" y="1585863"/>
+            <a:ext cx="869573" cy="369332"/>
+          </a:xfrm>
+          <a:prstGeom prst="rect">
+            <a:avLst/>
+          </a:prstGeom>
+          <a:noFill/>
+        </p:spPr>
+        <p:txBody>
+          <a:bodyPr wrap="square" rtlCol="0">
+            <a:spAutoFit/>
+          </a:bodyPr>
+          <a:lstStyle/>
+          <a:p>
+            <a:r>
+              <a:rPr lang="en-IN"/>
+              <a:t>1.25m</a:t>
+            </a:r>
+          </a:p>
+        </p:txBody>
+      </p:sp>
+      <p:sp>
+        <p:nvSpPr>
+          <p:cNvPr id="27" name="TextBox 26">
+            <a:extLst>
+              <a:ext uri="{FF2B5EF4-FFF2-40B4-BE49-F238E27FC236}">
+                <a16:creationId xmlns:a16="http://schemas.microsoft.com/office/drawing/2014/main" id="{7D67DDCA-8575-43ED-B824-0A7098D54DD4}"/>
+              </a:ext>
+            </a:extLst>
+          </p:cNvPr>
+          <p:cNvSpPr txBox="1"/>
+          <p:nvPr/>
+        </p:nvSpPr>
+        <p:spPr>
+          <a:xfrm>
+            <a:off x="4818513" y="1653988"/>
+            <a:ext cx="259982" cy="369332"/>
+          </a:xfrm>
+          <a:prstGeom prst="rect">
+            <a:avLst/>
+          </a:prstGeom>
+          <a:noFill/>
+        </p:spPr>
+        <p:txBody>
+          <a:bodyPr wrap="square" rtlCol="0">
+            <a:spAutoFit/>
+          </a:bodyPr>
+          <a:lstStyle/>
+          <a:p>
+            <a:r>
+              <a:rPr lang="en-IN" b="1"/>
+              <a:t>B</a:t>
+            </a:r>
+          </a:p>
+        </p:txBody>
+      </p:sp>
+      <p:sp>
+        <p:nvSpPr>
+          <p:cNvPr id="28" name="TextBox 27">
+            <a:extLst>
+              <a:ext uri="{FF2B5EF4-FFF2-40B4-BE49-F238E27FC236}">
+                <a16:creationId xmlns:a16="http://schemas.microsoft.com/office/drawing/2014/main" id="{827FCA74-A8D9-49D4-A9E0-39481AEBFBB5}"/>
+              </a:ext>
+            </a:extLst>
+          </p:cNvPr>
+          <p:cNvSpPr txBox="1"/>
+          <p:nvPr/>
+        </p:nvSpPr>
+        <p:spPr>
+          <a:xfrm>
+            <a:off x="2837319" y="1644578"/>
+            <a:ext cx="259982" cy="369332"/>
+          </a:xfrm>
+          <a:prstGeom prst="rect">
+            <a:avLst/>
+          </a:prstGeom>
+          <a:noFill/>
+        </p:spPr>
+        <p:txBody>
+          <a:bodyPr wrap="square" rtlCol="0">
+            <a:spAutoFit/>
+          </a:bodyPr>
+          <a:lstStyle/>
+          <a:p>
+            <a:r>
+              <a:rPr lang="en-IN" b="1"/>
+              <a:t>A</a:t>
+            </a:r>
+          </a:p>
+        </p:txBody>
+      </p:sp>
+      <p:sp>
+        <p:nvSpPr>
+          <p:cNvPr id="30" name="TextBox 29">
+            <a:extLst>
+              <a:ext uri="{FF2B5EF4-FFF2-40B4-BE49-F238E27FC236}">
+                <a16:creationId xmlns:a16="http://schemas.microsoft.com/office/drawing/2014/main" id="{0CE8E150-B68A-44CF-A34F-0C7D79F3EBE2}"/>
+              </a:ext>
+            </a:extLst>
+          </p:cNvPr>
+          <p:cNvSpPr txBox="1"/>
+          <p:nvPr/>
+        </p:nvSpPr>
+        <p:spPr>
+          <a:xfrm>
+            <a:off x="6835586" y="1660247"/>
+            <a:ext cx="259982" cy="369332"/>
+          </a:xfrm>
+          <a:prstGeom prst="rect">
+            <a:avLst/>
+          </a:prstGeom>
+          <a:noFill/>
+        </p:spPr>
+        <p:txBody>
+          <a:bodyPr wrap="square" rtlCol="0">
+            <a:spAutoFit/>
+          </a:bodyPr>
+          <a:lstStyle/>
+          <a:p>
+            <a:r>
+              <a:rPr lang="en-IN" b="1"/>
+              <a:t>C</a:t>
+            </a:r>
+          </a:p>
+        </p:txBody>
+      </p:sp>
+      <p:sp>
+        <p:nvSpPr>
+          <p:cNvPr id="32" name="TextBox 31">
+            <a:extLst>
+              <a:ext uri="{FF2B5EF4-FFF2-40B4-BE49-F238E27FC236}">
+                <a16:creationId xmlns:a16="http://schemas.microsoft.com/office/drawing/2014/main" id="{7EB7B642-D432-4EFE-8996-433D943D9CB5}"/>
+              </a:ext>
+            </a:extLst>
+          </p:cNvPr>
+          <p:cNvSpPr txBox="1"/>
+          <p:nvPr/>
+        </p:nvSpPr>
+        <p:spPr>
+          <a:xfrm>
+            <a:off x="9672901" y="1660245"/>
+            <a:ext cx="259982" cy="369332"/>
+          </a:xfrm>
+          <a:prstGeom prst="rect">
+            <a:avLst/>
+          </a:prstGeom>
+          <a:noFill/>
+        </p:spPr>
+        <p:txBody>
+          <a:bodyPr wrap="square" rtlCol="0">
+            <a:spAutoFit/>
+          </a:bodyPr>
+          <a:lstStyle/>
+          <a:p>
+            <a:r>
+              <a:rPr lang="en-IN" b="1"/>
+              <a:t>D</a:t>
+            </a:r>
+          </a:p>
+        </p:txBody>
+      </p:sp>
+      <p:sp>
+        <p:nvSpPr>
+          <p:cNvPr id="15" name="Arrow: Right 14">
+            <a:extLst>
+              <a:ext uri="{FF2B5EF4-FFF2-40B4-BE49-F238E27FC236}">
+                <a16:creationId xmlns:a16="http://schemas.microsoft.com/office/drawing/2014/main" id="{CEE9C327-DA0C-4A3B-983D-59DC9F429E3C}"/>
+              </a:ext>
+            </a:extLst>
+          </p:cNvPr>
+          <p:cNvSpPr/>
+          <p:nvPr/>
+        </p:nvSpPr>
+        <p:spPr>
+          <a:xfrm flipH="1">
+            <a:off x="1945341" y="806823"/>
+            <a:ext cx="1048871" cy="197224"/>
+          </a:xfrm>
+          <a:prstGeom prst="rightArrow">
+            <a:avLst/>
+          </a:prstGeom>
+        </p:spPr>
+        <p:style>
+          <a:lnRef idx="2">
+            <a:schemeClr val="dk1">
+              <a:shade val="50000"/>
+            </a:schemeClr>
+          </a:lnRef>
+          <a:fillRef idx="1">
+            <a:schemeClr val="dk1"/>
+          </a:fillRef>
+          <a:effectRef idx="0">
+            <a:schemeClr val="dk1"/>
+          </a:effectRef>
+          <a:fontRef idx="minor">
+            <a:schemeClr val="lt1"/>
+          </a:fontRef>
+        </p:style>
+        <p:txBody>
+          <a:bodyPr rtlCol="0" anchor="ctr"/>
+          <a:lstStyle/>
+          <a:p>
+            <a:pPr algn="ctr"/>
+            <a:endParaRPr lang="en-IN"/>
+          </a:p>
+        </p:txBody>
+      </p:sp>
+      <p:sp>
+        <p:nvSpPr>
+          <p:cNvPr id="33" name="Arrow: Right 32">
+            <a:extLst>
+              <a:ext uri="{FF2B5EF4-FFF2-40B4-BE49-F238E27FC236}">
+                <a16:creationId xmlns:a16="http://schemas.microsoft.com/office/drawing/2014/main" id="{F03E375D-8D66-46F3-AC95-299C5E2FC84D}"/>
+              </a:ext>
+            </a:extLst>
+          </p:cNvPr>
+          <p:cNvSpPr/>
+          <p:nvPr/>
+        </p:nvSpPr>
+        <p:spPr>
+          <a:xfrm flipH="1">
+            <a:off x="6212533" y="809730"/>
+            <a:ext cx="775453" cy="189836"/>
+          </a:xfrm>
+          <a:prstGeom prst="rightArrow">
+            <a:avLst/>
+          </a:prstGeom>
+        </p:spPr>
+        <p:style>
+          <a:lnRef idx="2">
+            <a:schemeClr val="dk1">
+              <a:shade val="50000"/>
+            </a:schemeClr>
+          </a:lnRef>
+          <a:fillRef idx="1">
+            <a:schemeClr val="dk1"/>
+          </a:fillRef>
+          <a:effectRef idx="0">
+            <a:schemeClr val="dk1"/>
+          </a:effectRef>
+          <a:fontRef idx="minor">
+            <a:schemeClr val="lt1"/>
+          </a:fontRef>
+        </p:style>
+        <p:txBody>
+          <a:bodyPr rtlCol="0" anchor="ctr"/>
+          <a:lstStyle/>
+          <a:p>
+            <a:pPr algn="ctr"/>
+            <a:endParaRPr lang="en-IN"/>
+          </a:p>
+        </p:txBody>
+      </p:sp>
+      <p:sp>
+        <p:nvSpPr>
+          <p:cNvPr id="34" name="Arrow: Right 33">
+            <a:extLst>
+              <a:ext uri="{FF2B5EF4-FFF2-40B4-BE49-F238E27FC236}">
+                <a16:creationId xmlns:a16="http://schemas.microsoft.com/office/drawing/2014/main" id="{F4BB6BCD-2FB8-40A5-B5D0-B571AB1564CA}"/>
+              </a:ext>
+            </a:extLst>
+          </p:cNvPr>
+          <p:cNvSpPr/>
+          <p:nvPr/>
+        </p:nvSpPr>
+        <p:spPr>
+          <a:xfrm>
+            <a:off x="4970931" y="814211"/>
+            <a:ext cx="775443" cy="189836"/>
+          </a:xfrm>
+          <a:prstGeom prst="rightArrow">
+            <a:avLst/>
+          </a:prstGeom>
+        </p:spPr>
+        <p:style>
+          <a:lnRef idx="2">
+            <a:schemeClr val="dk1">
+              <a:shade val="50000"/>
+            </a:schemeClr>
+          </a:lnRef>
+          <a:fillRef idx="1">
+            <a:schemeClr val="dk1"/>
+          </a:fillRef>
+          <a:effectRef idx="0">
+            <a:schemeClr val="dk1"/>
+          </a:effectRef>
+          <a:fontRef idx="minor">
+            <a:schemeClr val="lt1"/>
+          </a:fontRef>
+        </p:style>
+        <p:txBody>
+          <a:bodyPr rtlCol="0" anchor="ctr"/>
+          <a:lstStyle/>
+          <a:p>
+            <a:pPr algn="ctr"/>
+            <a:endParaRPr lang="en-IN"/>
+          </a:p>
+        </p:txBody>
+      </p:sp>
+      <p:sp>
+        <p:nvSpPr>
+          <p:cNvPr id="35" name="Arrow: Right 34">
+            <a:extLst>
+              <a:ext uri="{FF2B5EF4-FFF2-40B4-BE49-F238E27FC236}">
+                <a16:creationId xmlns:a16="http://schemas.microsoft.com/office/drawing/2014/main" id="{DCF0A9D6-7F59-4EA1-932E-7A758E601A93}"/>
+              </a:ext>
+            </a:extLst>
+          </p:cNvPr>
+          <p:cNvSpPr/>
+          <p:nvPr/>
+        </p:nvSpPr>
+        <p:spPr>
+          <a:xfrm>
+            <a:off x="9834280" y="814211"/>
+            <a:ext cx="775443" cy="189836"/>
+          </a:xfrm>
+          <a:prstGeom prst="rightArrow">
+            <a:avLst/>
+          </a:prstGeom>
+        </p:spPr>
+        <p:style>
+          <a:lnRef idx="2">
+            <a:schemeClr val="dk1">
+              <a:shade val="50000"/>
+            </a:schemeClr>
+          </a:lnRef>
+          <a:fillRef idx="1">
+            <a:schemeClr val="dk1"/>
+          </a:fillRef>
+          <a:effectRef idx="0">
+            <a:schemeClr val="dk1"/>
+          </a:effectRef>
+          <a:fontRef idx="minor">
+            <a:schemeClr val="lt1"/>
+          </a:fontRef>
+        </p:style>
+        <p:txBody>
+          <a:bodyPr rtlCol="0" anchor="ctr"/>
+          <a:lstStyle/>
+          <a:p>
+            <a:pPr algn="ctr"/>
+            <a:endParaRPr lang="en-IN"/>
+          </a:p>
+        </p:txBody>
+      </p:sp>
+      <p:sp>
+        <p:nvSpPr>
+          <p:cNvPr id="36" name="TextBox 35">
+            <a:extLst>
+              <a:ext uri="{FF2B5EF4-FFF2-40B4-BE49-F238E27FC236}">
+                <a16:creationId xmlns:a16="http://schemas.microsoft.com/office/drawing/2014/main" id="{36F060EA-4B82-425F-8297-D7FFB897D27C}"/>
+              </a:ext>
+            </a:extLst>
+          </p:cNvPr>
+          <p:cNvSpPr txBox="1"/>
+          <p:nvPr/>
+        </p:nvSpPr>
+        <p:spPr>
+          <a:xfrm>
+            <a:off x="2232210" y="955869"/>
+            <a:ext cx="753040" cy="369332"/>
+          </a:xfrm>
+          <a:prstGeom prst="rect">
+            <a:avLst/>
+          </a:prstGeom>
+          <a:noFill/>
+        </p:spPr>
+        <p:txBody>
+          <a:bodyPr wrap="square" rtlCol="0">
+            <a:spAutoFit/>
+          </a:bodyPr>
+          <a:lstStyle/>
+          <a:p>
+            <a:r>
+              <a:rPr lang="en-IN"/>
+              <a:t>50KN</a:t>
+            </a:r>
+          </a:p>
+        </p:txBody>
+      </p:sp>
+      <p:sp>
+        <p:nvSpPr>
+          <p:cNvPr id="37" name="TextBox 36">
+            <a:extLst>
+              <a:ext uri="{FF2B5EF4-FFF2-40B4-BE49-F238E27FC236}">
+                <a16:creationId xmlns:a16="http://schemas.microsoft.com/office/drawing/2014/main" id="{68F89CE4-4937-4EE9-A102-DC848F55A217}"/>
+              </a:ext>
+            </a:extLst>
+          </p:cNvPr>
+          <p:cNvSpPr txBox="1"/>
+          <p:nvPr/>
+        </p:nvSpPr>
+        <p:spPr>
+          <a:xfrm>
+            <a:off x="5002296" y="955869"/>
+            <a:ext cx="753040" cy="369332"/>
+          </a:xfrm>
+          <a:prstGeom prst="rect">
+            <a:avLst/>
+          </a:prstGeom>
+          <a:noFill/>
+        </p:spPr>
+        <p:txBody>
+          <a:bodyPr wrap="square" rtlCol="0">
+            <a:spAutoFit/>
+          </a:bodyPr>
+          <a:lstStyle/>
+          <a:p>
+            <a:r>
+              <a:rPr lang="en-IN"/>
+              <a:t>15KN</a:t>
+            </a:r>
+          </a:p>
+        </p:txBody>
+      </p:sp>
+      <p:sp>
+        <p:nvSpPr>
+          <p:cNvPr id="38" name="TextBox 37">
+            <a:extLst>
+              <a:ext uri="{FF2B5EF4-FFF2-40B4-BE49-F238E27FC236}">
+                <a16:creationId xmlns:a16="http://schemas.microsoft.com/office/drawing/2014/main" id="{5C1196A8-02B8-45B7-8796-71F99980D10B}"/>
+              </a:ext>
+            </a:extLst>
+          </p:cNvPr>
+          <p:cNvSpPr txBox="1"/>
+          <p:nvPr/>
+        </p:nvSpPr>
+        <p:spPr>
+          <a:xfrm>
+            <a:off x="6279767" y="949833"/>
+            <a:ext cx="753040" cy="369332"/>
+          </a:xfrm>
+          <a:prstGeom prst="rect">
+            <a:avLst/>
+          </a:prstGeom>
+          <a:noFill/>
+        </p:spPr>
+        <p:txBody>
+          <a:bodyPr wrap="square" rtlCol="0">
+            <a:spAutoFit/>
+          </a:bodyPr>
+          <a:lstStyle/>
+          <a:p>
+            <a:r>
+              <a:rPr lang="en-IN"/>
+              <a:t>10KN</a:t>
+            </a:r>
+          </a:p>
+        </p:txBody>
+      </p:sp>
+      <p:sp>
+        <p:nvSpPr>
+          <p:cNvPr id="39" name="TextBox 38">
+            <a:extLst>
+              <a:ext uri="{FF2B5EF4-FFF2-40B4-BE49-F238E27FC236}">
+                <a16:creationId xmlns:a16="http://schemas.microsoft.com/office/drawing/2014/main" id="{AC77659E-4F40-464A-B5EF-863D2AE27EBA}"/>
+              </a:ext>
+            </a:extLst>
+          </p:cNvPr>
+          <p:cNvSpPr txBox="1"/>
+          <p:nvPr/>
+        </p:nvSpPr>
+        <p:spPr>
+          <a:xfrm>
+            <a:off x="9784981" y="955869"/>
+            <a:ext cx="753040" cy="369332"/>
+          </a:xfrm>
+          <a:prstGeom prst="rect">
+            <a:avLst/>
+          </a:prstGeom>
+          <a:noFill/>
+        </p:spPr>
+        <p:txBody>
+          <a:bodyPr wrap="square" rtlCol="0">
+            <a:spAutoFit/>
+          </a:bodyPr>
+          <a:lstStyle/>
+          <a:p>
+            <a:r>
+              <a:rPr lang="en-IN"/>
+              <a:t>45KN</a:t>
+            </a:r>
+          </a:p>
+        </p:txBody>
+      </p:sp>
+      <p:sp>
+        <p:nvSpPr>
+          <p:cNvPr id="20" name="Rectangle 19">
+            <a:extLst>
+              <a:ext uri="{FF2B5EF4-FFF2-40B4-BE49-F238E27FC236}">
+                <a16:creationId xmlns:a16="http://schemas.microsoft.com/office/drawing/2014/main" id="{97EF9FB8-1237-4F65-BF83-FC87CBE0835C}"/>
+              </a:ext>
+            </a:extLst>
+          </p:cNvPr>
+          <p:cNvSpPr/>
+          <p:nvPr/>
+        </p:nvSpPr>
+        <p:spPr>
+          <a:xfrm>
+            <a:off x="2967310" y="4191857"/>
+            <a:ext cx="1972235" cy="977150"/>
+          </a:xfrm>
+          <a:prstGeom prst="rect">
+            <a:avLst/>
+          </a:prstGeom>
+        </p:spPr>
+        <p:style>
+          <a:lnRef idx="1">
+            <a:schemeClr val="accent5"/>
+          </a:lnRef>
+          <a:fillRef idx="2">
+            <a:schemeClr val="accent5"/>
+          </a:fillRef>
+          <a:effectRef idx="1">
+            <a:schemeClr val="accent5"/>
+          </a:effectRef>
+          <a:fontRef idx="minor">
+            <a:schemeClr val="dk1"/>
+          </a:fontRef>
+        </p:style>
+        <p:txBody>
+          <a:bodyPr rtlCol="0" anchor="ctr"/>
+          <a:lstStyle/>
+          <a:p>
+            <a:pPr algn="ctr"/>
+            <a:endParaRPr lang="en-IN"/>
+          </a:p>
+        </p:txBody>
+      </p:sp>
+      <p:sp>
+        <p:nvSpPr>
+          <p:cNvPr id="40" name="Rectangle 39">
+            <a:extLst>
+              <a:ext uri="{FF2B5EF4-FFF2-40B4-BE49-F238E27FC236}">
+                <a16:creationId xmlns:a16="http://schemas.microsoft.com/office/drawing/2014/main" id="{E3F4E787-5F18-46C6-AB63-C8B5293A6D4F}"/>
+              </a:ext>
+            </a:extLst>
+          </p:cNvPr>
+          <p:cNvSpPr/>
+          <p:nvPr/>
+        </p:nvSpPr>
+        <p:spPr>
+          <a:xfrm>
+            <a:off x="4948505" y="2372498"/>
+            <a:ext cx="2039482" cy="977150"/>
+          </a:xfrm>
+          <a:prstGeom prst="rect">
+            <a:avLst/>
+          </a:prstGeom>
+        </p:spPr>
+        <p:style>
+          <a:lnRef idx="1">
+            <a:schemeClr val="accent5"/>
+          </a:lnRef>
+          <a:fillRef idx="2">
+            <a:schemeClr val="accent5"/>
+          </a:fillRef>
+          <a:effectRef idx="1">
+            <a:schemeClr val="accent5"/>
+          </a:effectRef>
+          <a:fontRef idx="minor">
+            <a:schemeClr val="dk1"/>
+          </a:fontRef>
+        </p:style>
+        <p:txBody>
+          <a:bodyPr rtlCol="0" anchor="ctr"/>
+          <a:lstStyle/>
+          <a:p>
+            <a:pPr algn="ctr"/>
+            <a:endParaRPr lang="en-IN"/>
+          </a:p>
+        </p:txBody>
+      </p:sp>
+      <p:sp>
+        <p:nvSpPr>
+          <p:cNvPr id="41" name="Rectangle 40">
+            <a:extLst>
+              <a:ext uri="{FF2B5EF4-FFF2-40B4-BE49-F238E27FC236}">
+                <a16:creationId xmlns:a16="http://schemas.microsoft.com/office/drawing/2014/main" id="{09BF07C5-8174-44EB-A6BB-209F62BEF30C}"/>
+              </a:ext>
+            </a:extLst>
+          </p:cNvPr>
+          <p:cNvSpPr/>
+          <p:nvPr/>
+        </p:nvSpPr>
+        <p:spPr>
+          <a:xfrm>
+            <a:off x="6965576" y="4191857"/>
+            <a:ext cx="2859741" cy="977150"/>
+          </a:xfrm>
+          <a:prstGeom prst="rect">
+            <a:avLst/>
+          </a:prstGeom>
+        </p:spPr>
+        <p:style>
+          <a:lnRef idx="1">
+            <a:schemeClr val="accent5"/>
+          </a:lnRef>
+          <a:fillRef idx="2">
+            <a:schemeClr val="accent5"/>
+          </a:fillRef>
+          <a:effectRef idx="1">
+            <a:schemeClr val="accent5"/>
+          </a:effectRef>
+          <a:fontRef idx="minor">
+            <a:schemeClr val="dk1"/>
+          </a:fontRef>
+        </p:style>
+        <p:txBody>
+          <a:bodyPr rtlCol="0" anchor="ctr"/>
+          <a:lstStyle/>
+          <a:p>
+            <a:pPr algn="ctr"/>
+            <a:endParaRPr lang="en-IN"/>
+          </a:p>
+        </p:txBody>
+      </p:sp>
+      <p:cxnSp>
+        <p:nvCxnSpPr>
+          <p:cNvPr id="43" name="Straight Connector 42">
+            <a:extLst>
+              <a:ext uri="{FF2B5EF4-FFF2-40B4-BE49-F238E27FC236}">
+                <a16:creationId xmlns:a16="http://schemas.microsoft.com/office/drawing/2014/main" id="{997ABB9D-F315-440A-865A-8F764682F102}"/>
+              </a:ext>
+            </a:extLst>
+          </p:cNvPr>
+          <p:cNvCxnSpPr>
+            <a:cxnSpLocks/>
+            <a:stCxn id="28" idx="2"/>
+          </p:cNvCxnSpPr>
+          <p:nvPr/>
+        </p:nvCxnSpPr>
+        <p:spPr>
+          <a:xfrm>
+            <a:off x="2967310" y="2013910"/>
+            <a:ext cx="0" cy="2047102"/>
+          </a:xfrm>
+          <a:prstGeom prst="line">
+            <a:avLst/>
+          </a:prstGeom>
+          <a:ln w="19050">
+            <a:prstDash val="sysDash"/>
+          </a:ln>
+        </p:spPr>
+        <p:style>
+          <a:lnRef idx="1">
+            <a:schemeClr val="dk1"/>
+          </a:lnRef>
+          <a:fillRef idx="0">
+            <a:schemeClr val="dk1"/>
+          </a:fillRef>
+          <a:effectRef idx="0">
+            <a:schemeClr val="dk1"/>
+          </a:effectRef>
+          <a:fontRef idx="minor">
+            <a:schemeClr val="tx1"/>
+          </a:fontRef>
+        </p:style>
+      </p:cxnSp>
+      <p:cxnSp>
+        <p:nvCxnSpPr>
+          <p:cNvPr id="45" name="Straight Connector 44">
+            <a:extLst>
+              <a:ext uri="{FF2B5EF4-FFF2-40B4-BE49-F238E27FC236}">
+                <a16:creationId xmlns:a16="http://schemas.microsoft.com/office/drawing/2014/main" id="{11C72DFC-46BF-4AC3-854F-656ABE0C685C}"/>
+              </a:ext>
+            </a:extLst>
+          </p:cNvPr>
+          <p:cNvCxnSpPr>
+            <a:cxnSpLocks/>
+          </p:cNvCxnSpPr>
+          <p:nvPr/>
+        </p:nvCxnSpPr>
+        <p:spPr>
+          <a:xfrm>
+            <a:off x="9825309" y="2000907"/>
+            <a:ext cx="0" cy="2047102"/>
+          </a:xfrm>
+          <a:prstGeom prst="line">
+            <a:avLst/>
+          </a:prstGeom>
+          <a:ln w="19050">
+            <a:prstDash val="sysDash"/>
+          </a:ln>
+        </p:spPr>
+        <p:style>
+          <a:lnRef idx="1">
+            <a:schemeClr val="dk1"/>
+          </a:lnRef>
+          <a:fillRef idx="0">
+            <a:schemeClr val="dk1"/>
+          </a:fillRef>
+          <a:effectRef idx="0">
+            <a:schemeClr val="dk1"/>
+          </a:effectRef>
+          <a:fontRef idx="minor">
+            <a:schemeClr val="tx1"/>
+          </a:fontRef>
+        </p:style>
+      </p:cxnSp>
+      <p:cxnSp>
+        <p:nvCxnSpPr>
+          <p:cNvPr id="46" name="Straight Connector 45">
+            <a:extLst>
+              <a:ext uri="{FF2B5EF4-FFF2-40B4-BE49-F238E27FC236}">
+                <a16:creationId xmlns:a16="http://schemas.microsoft.com/office/drawing/2014/main" id="{9D3FF88B-EBE4-4A3E-AB17-77B62AF78708}"/>
+              </a:ext>
+            </a:extLst>
+          </p:cNvPr>
+          <p:cNvCxnSpPr>
+            <a:cxnSpLocks/>
+          </p:cNvCxnSpPr>
+          <p:nvPr/>
+        </p:nvCxnSpPr>
+        <p:spPr>
+          <a:xfrm>
+            <a:off x="4948505" y="2023320"/>
+            <a:ext cx="0" cy="2047102"/>
+          </a:xfrm>
+          <a:prstGeom prst="line">
+            <a:avLst/>
+          </a:prstGeom>
+          <a:ln w="19050">
+            <a:prstDash val="sysDash"/>
+          </a:ln>
+        </p:spPr>
+        <p:style>
+          <a:lnRef idx="1">
+            <a:schemeClr val="dk1"/>
+          </a:lnRef>
+          <a:fillRef idx="0">
+            <a:schemeClr val="dk1"/>
+          </a:fillRef>
+          <a:effectRef idx="0">
+            <a:schemeClr val="dk1"/>
+          </a:effectRef>
+          <a:fontRef idx="minor">
+            <a:schemeClr val="tx1"/>
+          </a:fontRef>
+        </p:style>
+      </p:cxnSp>
+      <p:cxnSp>
+        <p:nvCxnSpPr>
+          <p:cNvPr id="47" name="Straight Connector 46">
+            <a:extLst>
+              <a:ext uri="{FF2B5EF4-FFF2-40B4-BE49-F238E27FC236}">
+                <a16:creationId xmlns:a16="http://schemas.microsoft.com/office/drawing/2014/main" id="{CE30A53A-747D-4EBF-B58B-0EACAA0767F3}"/>
+              </a:ext>
+            </a:extLst>
+          </p:cNvPr>
+          <p:cNvCxnSpPr>
+            <a:cxnSpLocks/>
+          </p:cNvCxnSpPr>
+          <p:nvPr/>
+        </p:nvCxnSpPr>
+        <p:spPr>
+          <a:xfrm>
+            <a:off x="6987986" y="2013910"/>
+            <a:ext cx="0" cy="2047102"/>
+          </a:xfrm>
+          <a:prstGeom prst="line">
+            <a:avLst/>
+          </a:prstGeom>
+          <a:ln w="19050">
+            <a:prstDash val="sysDash"/>
+          </a:ln>
+        </p:spPr>
+        <p:style>
+          <a:lnRef idx="1">
+            <a:schemeClr val="dk1"/>
+          </a:lnRef>
+          <a:fillRef idx="0">
+            <a:schemeClr val="dk1"/>
+          </a:fillRef>
+          <a:effectRef idx="0">
+            <a:schemeClr val="dk1"/>
+          </a:effectRef>
+          <a:fontRef idx="minor">
+            <a:schemeClr val="tx1"/>
+          </a:fontRef>
+        </p:style>
+      </p:cxnSp>
+      <p:sp>
+        <p:nvSpPr>
+          <p:cNvPr id="48" name="Arrow: Right 47">
+            <a:extLst>
+              <a:ext uri="{FF2B5EF4-FFF2-40B4-BE49-F238E27FC236}">
+                <a16:creationId xmlns:a16="http://schemas.microsoft.com/office/drawing/2014/main" id="{2286E928-B5D5-4D70-9B25-23BA2253C3E0}"/>
+              </a:ext>
+            </a:extLst>
+          </p:cNvPr>
+          <p:cNvSpPr/>
+          <p:nvPr/>
+        </p:nvSpPr>
+        <p:spPr>
+          <a:xfrm flipH="1">
+            <a:off x="1918439" y="4581820"/>
+            <a:ext cx="1048871" cy="197224"/>
+          </a:xfrm>
+          <a:prstGeom prst="rightArrow">
+            <a:avLst/>
+          </a:prstGeom>
+        </p:spPr>
+        <p:style>
+          <a:lnRef idx="2">
+            <a:schemeClr val="dk1">
+              <a:shade val="50000"/>
+            </a:schemeClr>
+          </a:lnRef>
+          <a:fillRef idx="1">
+            <a:schemeClr val="dk1"/>
+          </a:fillRef>
+          <a:effectRef idx="0">
+            <a:schemeClr val="dk1"/>
+          </a:effectRef>
+          <a:fontRef idx="minor">
+            <a:schemeClr val="lt1"/>
+          </a:fontRef>
+        </p:style>
+        <p:txBody>
+          <a:bodyPr rtlCol="0" anchor="ctr"/>
+          <a:lstStyle/>
+          <a:p>
+            <a:pPr algn="ctr"/>
+            <a:endParaRPr lang="en-IN"/>
+          </a:p>
+        </p:txBody>
+      </p:sp>
+      <p:sp>
+        <p:nvSpPr>
+          <p:cNvPr id="49" name="TextBox 48">
+            <a:extLst>
+              <a:ext uri="{FF2B5EF4-FFF2-40B4-BE49-F238E27FC236}">
+                <a16:creationId xmlns:a16="http://schemas.microsoft.com/office/drawing/2014/main" id="{5CFBA6DF-4137-4DBD-86F0-3619A3A3077F}"/>
+              </a:ext>
+            </a:extLst>
+          </p:cNvPr>
+          <p:cNvSpPr txBox="1"/>
+          <p:nvPr/>
+        </p:nvSpPr>
+        <p:spPr>
+          <a:xfrm>
+            <a:off x="2093256" y="4718308"/>
+            <a:ext cx="753040" cy="369332"/>
+          </a:xfrm>
+          <a:prstGeom prst="rect">
+            <a:avLst/>
+          </a:prstGeom>
+          <a:noFill/>
+        </p:spPr>
+        <p:txBody>
+          <a:bodyPr wrap="square" rtlCol="0">
+            <a:spAutoFit/>
+          </a:bodyPr>
+          <a:lstStyle/>
+          <a:p>
+            <a:r>
+              <a:rPr lang="en-IN"/>
+              <a:t>50KN</a:t>
+            </a:r>
+          </a:p>
+        </p:txBody>
+      </p:sp>
+      <p:sp>
+        <p:nvSpPr>
+          <p:cNvPr id="50" name="Arrow: Right 49">
+            <a:extLst>
+              <a:ext uri="{FF2B5EF4-FFF2-40B4-BE49-F238E27FC236}">
+                <a16:creationId xmlns:a16="http://schemas.microsoft.com/office/drawing/2014/main" id="{DB691F7F-1FAE-4D45-97F7-8DBB3F1C6DEA}"/>
+              </a:ext>
+            </a:extLst>
+          </p:cNvPr>
+          <p:cNvSpPr/>
+          <p:nvPr/>
+        </p:nvSpPr>
+        <p:spPr>
+          <a:xfrm>
+            <a:off x="4948503" y="4581820"/>
+            <a:ext cx="726151" cy="197224"/>
+          </a:xfrm>
+          <a:prstGeom prst="rightArrow">
+            <a:avLst/>
+          </a:prstGeom>
+        </p:spPr>
+        <p:style>
+          <a:lnRef idx="2">
+            <a:schemeClr val="dk1">
+              <a:shade val="50000"/>
+            </a:schemeClr>
+          </a:lnRef>
+          <a:fillRef idx="1">
+            <a:schemeClr val="dk1"/>
+          </a:fillRef>
+          <a:effectRef idx="0">
+            <a:schemeClr val="dk1"/>
+          </a:effectRef>
+          <a:fontRef idx="minor">
+            <a:schemeClr val="lt1"/>
+          </a:fontRef>
+        </p:style>
+        <p:txBody>
+          <a:bodyPr rtlCol="0" anchor="ctr"/>
+          <a:lstStyle/>
+          <a:p>
+            <a:pPr algn="ctr"/>
+            <a:endParaRPr lang="en-IN"/>
+          </a:p>
+        </p:txBody>
+      </p:sp>
+      <p:sp>
+        <p:nvSpPr>
+          <p:cNvPr id="51" name="TextBox 50">
+            <a:extLst>
+              <a:ext uri="{FF2B5EF4-FFF2-40B4-BE49-F238E27FC236}">
+                <a16:creationId xmlns:a16="http://schemas.microsoft.com/office/drawing/2014/main" id="{34B17A22-C5F9-432E-944F-E9577646CA19}"/>
+              </a:ext>
+            </a:extLst>
+          </p:cNvPr>
+          <p:cNvSpPr txBox="1"/>
+          <p:nvPr/>
+        </p:nvSpPr>
+        <p:spPr>
+          <a:xfrm>
+            <a:off x="4948503" y="4718308"/>
+            <a:ext cx="753040" cy="369332"/>
+          </a:xfrm>
+          <a:prstGeom prst="rect">
+            <a:avLst/>
+          </a:prstGeom>
+          <a:noFill/>
+        </p:spPr>
+        <p:txBody>
+          <a:bodyPr wrap="square" rtlCol="0">
+            <a:spAutoFit/>
+          </a:bodyPr>
+          <a:lstStyle/>
+          <a:p>
+            <a:r>
+              <a:rPr lang="en-IN"/>
+              <a:t>50KN</a:t>
+            </a:r>
+          </a:p>
+        </p:txBody>
+      </p:sp>
+      <p:sp>
+        <p:nvSpPr>
+          <p:cNvPr id="52" name="Arrow: Right 51">
+            <a:extLst>
+              <a:ext uri="{FF2B5EF4-FFF2-40B4-BE49-F238E27FC236}">
+                <a16:creationId xmlns:a16="http://schemas.microsoft.com/office/drawing/2014/main" id="{6137296A-CD16-43DB-8C2F-1BE684029CC2}"/>
+              </a:ext>
+            </a:extLst>
+          </p:cNvPr>
+          <p:cNvSpPr/>
+          <p:nvPr/>
+        </p:nvSpPr>
+        <p:spPr>
+          <a:xfrm>
+            <a:off x="3904108" y="2524484"/>
+            <a:ext cx="1035434" cy="197223"/>
+          </a:xfrm>
+          <a:prstGeom prst="rightArrow">
+            <a:avLst/>
+          </a:prstGeom>
+        </p:spPr>
+        <p:style>
+          <a:lnRef idx="2">
+            <a:schemeClr val="dk1">
+              <a:shade val="50000"/>
+            </a:schemeClr>
+          </a:lnRef>
+          <a:fillRef idx="1">
+            <a:schemeClr val="dk1"/>
+          </a:fillRef>
+          <a:effectRef idx="0">
+            <a:schemeClr val="dk1"/>
+          </a:effectRef>
+          <a:fontRef idx="minor">
+            <a:schemeClr val="lt1"/>
+          </a:fontRef>
+        </p:style>
+        <p:txBody>
+          <a:bodyPr rtlCol="0" anchor="ctr"/>
+          <a:lstStyle/>
+          <a:p>
+            <a:pPr algn="ctr"/>
+            <a:endParaRPr lang="en-IN"/>
+          </a:p>
+        </p:txBody>
+      </p:sp>
+      <p:sp>
+        <p:nvSpPr>
+          <p:cNvPr id="53" name="TextBox 52">
+            <a:extLst>
+              <a:ext uri="{FF2B5EF4-FFF2-40B4-BE49-F238E27FC236}">
+                <a16:creationId xmlns:a16="http://schemas.microsoft.com/office/drawing/2014/main" id="{A1115A84-F247-4B06-89B4-D96C56E555E7}"/>
+              </a:ext>
+            </a:extLst>
+          </p:cNvPr>
+          <p:cNvSpPr txBox="1"/>
+          <p:nvPr/>
+        </p:nvSpPr>
+        <p:spPr>
+          <a:xfrm>
+            <a:off x="4195463" y="2666143"/>
+            <a:ext cx="753040" cy="369332"/>
+          </a:xfrm>
+          <a:prstGeom prst="rect">
+            <a:avLst/>
+          </a:prstGeom>
+          <a:noFill/>
+        </p:spPr>
+        <p:txBody>
+          <a:bodyPr wrap="square" rtlCol="0">
+            <a:spAutoFit/>
+          </a:bodyPr>
+          <a:lstStyle/>
+          <a:p>
+            <a:r>
+              <a:rPr lang="en-IN"/>
+              <a:t>15KN</a:t>
+            </a:r>
+          </a:p>
+        </p:txBody>
+      </p:sp>
+      <p:sp>
+        <p:nvSpPr>
+          <p:cNvPr id="54" name="Arrow: Right 53">
+            <a:extLst>
+              <a:ext uri="{FF2B5EF4-FFF2-40B4-BE49-F238E27FC236}">
+                <a16:creationId xmlns:a16="http://schemas.microsoft.com/office/drawing/2014/main" id="{555AA73F-C43B-4BB7-9231-9F1085B185D7}"/>
+              </a:ext>
+            </a:extLst>
+          </p:cNvPr>
+          <p:cNvSpPr/>
+          <p:nvPr/>
+        </p:nvSpPr>
+        <p:spPr>
+          <a:xfrm flipH="1">
+            <a:off x="3904107" y="2995036"/>
+            <a:ext cx="1048871" cy="197224"/>
+          </a:xfrm>
+          <a:prstGeom prst="rightArrow">
+            <a:avLst/>
+          </a:prstGeom>
+        </p:spPr>
+        <p:style>
+          <a:lnRef idx="2">
+            <a:schemeClr val="dk1">
+              <a:shade val="50000"/>
+            </a:schemeClr>
+          </a:lnRef>
+          <a:fillRef idx="1">
+            <a:schemeClr val="dk1"/>
+          </a:fillRef>
+          <a:effectRef idx="0">
+            <a:schemeClr val="dk1"/>
+          </a:effectRef>
+          <a:fontRef idx="minor">
+            <a:schemeClr val="lt1"/>
+          </a:fontRef>
+        </p:style>
+        <p:txBody>
+          <a:bodyPr rtlCol="0" anchor="ctr"/>
+          <a:lstStyle/>
+          <a:p>
+            <a:pPr algn="ctr"/>
+            <a:endParaRPr lang="en-IN"/>
+          </a:p>
+        </p:txBody>
+      </p:sp>
+      <p:sp>
+        <p:nvSpPr>
+          <p:cNvPr id="55" name="TextBox 54">
+            <a:extLst>
+              <a:ext uri="{FF2B5EF4-FFF2-40B4-BE49-F238E27FC236}">
+                <a16:creationId xmlns:a16="http://schemas.microsoft.com/office/drawing/2014/main" id="{D9C959D8-BC92-4627-A39B-95E0D5945159}"/>
+              </a:ext>
+            </a:extLst>
+          </p:cNvPr>
+          <p:cNvSpPr txBox="1"/>
+          <p:nvPr/>
+        </p:nvSpPr>
+        <p:spPr>
+          <a:xfrm>
+            <a:off x="4164098" y="3138439"/>
+            <a:ext cx="753040" cy="369332"/>
+          </a:xfrm>
+          <a:prstGeom prst="rect">
+            <a:avLst/>
+          </a:prstGeom>
+          <a:noFill/>
+        </p:spPr>
+        <p:txBody>
+          <a:bodyPr wrap="square" rtlCol="0">
+            <a:spAutoFit/>
+          </a:bodyPr>
+          <a:lstStyle/>
+          <a:p>
+            <a:r>
+              <a:rPr lang="en-IN"/>
+              <a:t>50KN</a:t>
+            </a:r>
+          </a:p>
+        </p:txBody>
+      </p:sp>
+      <p:sp>
+        <p:nvSpPr>
+          <p:cNvPr id="56" name="Left Brace 55">
+            <a:extLst>
+              <a:ext uri="{FF2B5EF4-FFF2-40B4-BE49-F238E27FC236}">
+                <a16:creationId xmlns:a16="http://schemas.microsoft.com/office/drawing/2014/main" id="{11ACECF3-A739-4C4C-83A5-E2781244874C}"/>
+              </a:ext>
+            </a:extLst>
+          </p:cNvPr>
+          <p:cNvSpPr/>
+          <p:nvPr/>
+        </p:nvSpPr>
+        <p:spPr>
+          <a:xfrm>
+            <a:off x="3657596" y="2524484"/>
+            <a:ext cx="98616" cy="825164"/>
+          </a:xfrm>
+          <a:prstGeom prst="leftBrace">
+            <a:avLst/>
+          </a:prstGeom>
+          <a:ln w="19050"/>
+        </p:spPr>
+        <p:style>
+          <a:lnRef idx="1">
+            <a:schemeClr val="dk1"/>
+          </a:lnRef>
+          <a:fillRef idx="0">
+            <a:schemeClr val="dk1"/>
+          </a:fillRef>
+          <a:effectRef idx="0">
+            <a:schemeClr val="dk1"/>
+          </a:effectRef>
+          <a:fontRef idx="minor">
+            <a:schemeClr val="tx1"/>
+          </a:fontRef>
+        </p:style>
+        <p:txBody>
+          <a:bodyPr rtlCol="0" anchor="ctr"/>
+          <a:lstStyle/>
+          <a:p>
+            <a:pPr algn="ctr"/>
+            <a:endParaRPr lang="en-IN"/>
+          </a:p>
+        </p:txBody>
+      </p:sp>
+      <p:sp>
+        <p:nvSpPr>
+          <p:cNvPr id="57" name="Arrow: Right 56">
+            <a:extLst>
+              <a:ext uri="{FF2B5EF4-FFF2-40B4-BE49-F238E27FC236}">
+                <a16:creationId xmlns:a16="http://schemas.microsoft.com/office/drawing/2014/main" id="{EB3790A8-D0FC-48A1-B57B-E02190F2708B}"/>
+              </a:ext>
+            </a:extLst>
+          </p:cNvPr>
+          <p:cNvSpPr/>
+          <p:nvPr/>
+        </p:nvSpPr>
+        <p:spPr>
+          <a:xfrm flipH="1">
+            <a:off x="2454081" y="2836913"/>
+            <a:ext cx="1048871" cy="197224"/>
+          </a:xfrm>
+          <a:prstGeom prst="rightArrow">
+            <a:avLst/>
+          </a:prstGeom>
+        </p:spPr>
+        <p:style>
+          <a:lnRef idx="2">
+            <a:schemeClr val="dk1">
+              <a:shade val="50000"/>
+            </a:schemeClr>
+          </a:lnRef>
+          <a:fillRef idx="1">
+            <a:schemeClr val="dk1"/>
+          </a:fillRef>
+          <a:effectRef idx="0">
+            <a:schemeClr val="dk1"/>
+          </a:effectRef>
+          <a:fontRef idx="minor">
+            <a:schemeClr val="lt1"/>
+          </a:fontRef>
+        </p:style>
+        <p:txBody>
+          <a:bodyPr rtlCol="0" anchor="ctr"/>
+          <a:lstStyle/>
+          <a:p>
+            <a:pPr algn="ctr"/>
+            <a:endParaRPr lang="en-IN"/>
+          </a:p>
+        </p:txBody>
+      </p:sp>
+      <p:sp>
+        <p:nvSpPr>
+          <p:cNvPr id="58" name="TextBox 57">
+            <a:extLst>
+              <a:ext uri="{FF2B5EF4-FFF2-40B4-BE49-F238E27FC236}">
+                <a16:creationId xmlns:a16="http://schemas.microsoft.com/office/drawing/2014/main" id="{FF6D0570-3139-474A-99C4-3DAF66A9BF2D}"/>
+              </a:ext>
+            </a:extLst>
+          </p:cNvPr>
+          <p:cNvSpPr txBox="1"/>
+          <p:nvPr/>
+        </p:nvSpPr>
+        <p:spPr>
+          <a:xfrm>
+            <a:off x="2947124" y="2935525"/>
+            <a:ext cx="753040" cy="369332"/>
+          </a:xfrm>
+          <a:prstGeom prst="rect">
+            <a:avLst/>
+          </a:prstGeom>
+          <a:noFill/>
+        </p:spPr>
+        <p:txBody>
+          <a:bodyPr wrap="square" rtlCol="0">
+            <a:spAutoFit/>
+          </a:bodyPr>
+          <a:lstStyle/>
+          <a:p>
+            <a:r>
+              <a:rPr lang="en-IN"/>
+              <a:t>35KN</a:t>
+            </a:r>
+          </a:p>
+        </p:txBody>
+      </p:sp>
+      <p:sp>
+        <p:nvSpPr>
+          <p:cNvPr id="59" name="Arrow: Right 58">
+            <a:extLst>
+              <a:ext uri="{FF2B5EF4-FFF2-40B4-BE49-F238E27FC236}">
+                <a16:creationId xmlns:a16="http://schemas.microsoft.com/office/drawing/2014/main" id="{67CBBF0F-48CB-41A6-8FBD-D7009CA3F185}"/>
+              </a:ext>
+            </a:extLst>
+          </p:cNvPr>
+          <p:cNvSpPr/>
+          <p:nvPr/>
+        </p:nvSpPr>
+        <p:spPr>
+          <a:xfrm>
+            <a:off x="6972281" y="2735299"/>
+            <a:ext cx="880797" cy="200223"/>
+          </a:xfrm>
+          <a:prstGeom prst="rightArrow">
+            <a:avLst/>
+          </a:prstGeom>
+        </p:spPr>
+        <p:style>
+          <a:lnRef idx="2">
+            <a:schemeClr val="dk1">
+              <a:shade val="50000"/>
+            </a:schemeClr>
+          </a:lnRef>
+          <a:fillRef idx="1">
+            <a:schemeClr val="dk1"/>
+          </a:fillRef>
+          <a:effectRef idx="0">
+            <a:schemeClr val="dk1"/>
+          </a:effectRef>
+          <a:fontRef idx="minor">
+            <a:schemeClr val="lt1"/>
+          </a:fontRef>
+        </p:style>
+        <p:txBody>
+          <a:bodyPr rtlCol="0" anchor="ctr"/>
+          <a:lstStyle/>
+          <a:p>
+            <a:pPr algn="ctr"/>
+            <a:endParaRPr lang="en-IN"/>
+          </a:p>
+        </p:txBody>
+      </p:sp>
+      <p:sp>
+        <p:nvSpPr>
+          <p:cNvPr id="60" name="TextBox 59">
+            <a:extLst>
+              <a:ext uri="{FF2B5EF4-FFF2-40B4-BE49-F238E27FC236}">
+                <a16:creationId xmlns:a16="http://schemas.microsoft.com/office/drawing/2014/main" id="{1AE4977E-0447-4C59-A8E9-B2BEFE23FFF8}"/>
+              </a:ext>
+            </a:extLst>
+          </p:cNvPr>
+          <p:cNvSpPr txBox="1"/>
+          <p:nvPr/>
+        </p:nvSpPr>
+        <p:spPr>
+          <a:xfrm>
+            <a:off x="6983489" y="2871788"/>
+            <a:ext cx="753040" cy="369332"/>
+          </a:xfrm>
+          <a:prstGeom prst="rect">
+            <a:avLst/>
+          </a:prstGeom>
+          <a:noFill/>
+        </p:spPr>
+        <p:txBody>
+          <a:bodyPr wrap="square" rtlCol="0">
+            <a:spAutoFit/>
+          </a:bodyPr>
+          <a:lstStyle/>
+          <a:p>
+            <a:r>
+              <a:rPr lang="en-IN"/>
+              <a:t>35KN</a:t>
+            </a:r>
+          </a:p>
+        </p:txBody>
+      </p:sp>
+      <p:sp>
+        <p:nvSpPr>
+          <p:cNvPr id="61" name="Arrow: Right 60">
+            <a:extLst>
+              <a:ext uri="{FF2B5EF4-FFF2-40B4-BE49-F238E27FC236}">
+                <a16:creationId xmlns:a16="http://schemas.microsoft.com/office/drawing/2014/main" id="{8C357278-9B70-4FB7-97CF-820DA7C306B3}"/>
+              </a:ext>
+            </a:extLst>
+          </p:cNvPr>
+          <p:cNvSpPr/>
+          <p:nvPr/>
+        </p:nvSpPr>
+        <p:spPr>
+          <a:xfrm flipH="1">
+            <a:off x="6185654" y="4299810"/>
+            <a:ext cx="775455" cy="215427"/>
+          </a:xfrm>
+          <a:prstGeom prst="rightArrow">
+            <a:avLst/>
+          </a:prstGeom>
+        </p:spPr>
+        <p:style>
+          <a:lnRef idx="2">
+            <a:schemeClr val="dk1">
+              <a:shade val="50000"/>
+            </a:schemeClr>
+          </a:lnRef>
+          <a:fillRef idx="1">
+            <a:schemeClr val="dk1"/>
+          </a:fillRef>
+          <a:effectRef idx="0">
+            <a:schemeClr val="dk1"/>
+          </a:effectRef>
+          <a:fontRef idx="minor">
+            <a:schemeClr val="lt1"/>
+          </a:fontRef>
+        </p:style>
+        <p:txBody>
+          <a:bodyPr rtlCol="0" anchor="ctr"/>
+          <a:lstStyle/>
+          <a:p>
+            <a:pPr algn="ctr"/>
+            <a:endParaRPr lang="en-IN"/>
+          </a:p>
+        </p:txBody>
+      </p:sp>
+      <p:sp>
+        <p:nvSpPr>
+          <p:cNvPr id="62" name="TextBox 61">
+            <a:extLst>
+              <a:ext uri="{FF2B5EF4-FFF2-40B4-BE49-F238E27FC236}">
+                <a16:creationId xmlns:a16="http://schemas.microsoft.com/office/drawing/2014/main" id="{91963A85-4E6E-4F16-9891-F105CD63E745}"/>
+              </a:ext>
+            </a:extLst>
+          </p:cNvPr>
+          <p:cNvSpPr txBox="1"/>
+          <p:nvPr/>
+        </p:nvSpPr>
+        <p:spPr>
+          <a:xfrm>
+            <a:off x="6288731" y="4407488"/>
+            <a:ext cx="753040" cy="369332"/>
+          </a:xfrm>
+          <a:prstGeom prst="rect">
+            <a:avLst/>
+          </a:prstGeom>
+          <a:noFill/>
+        </p:spPr>
+        <p:txBody>
+          <a:bodyPr wrap="square" rtlCol="0">
+            <a:spAutoFit/>
+          </a:bodyPr>
+          <a:lstStyle/>
+          <a:p>
+            <a:r>
+              <a:rPr lang="en-IN"/>
+              <a:t>35KN</a:t>
+            </a:r>
+          </a:p>
+        </p:txBody>
+      </p:sp>
+      <p:sp>
+        <p:nvSpPr>
+          <p:cNvPr id="63" name="Arrow: Right 62">
+            <a:extLst>
+              <a:ext uri="{FF2B5EF4-FFF2-40B4-BE49-F238E27FC236}">
+                <a16:creationId xmlns:a16="http://schemas.microsoft.com/office/drawing/2014/main" id="{5CB52882-5790-406E-B6E3-E38DE4ABDB73}"/>
+              </a:ext>
+            </a:extLst>
+          </p:cNvPr>
+          <p:cNvSpPr/>
+          <p:nvPr/>
+        </p:nvSpPr>
+        <p:spPr>
+          <a:xfrm flipH="1">
+            <a:off x="6190120" y="4834837"/>
+            <a:ext cx="775453" cy="189836"/>
+          </a:xfrm>
+          <a:prstGeom prst="rightArrow">
+            <a:avLst/>
+          </a:prstGeom>
+        </p:spPr>
+        <p:style>
+          <a:lnRef idx="2">
+            <a:schemeClr val="dk1">
+              <a:shade val="50000"/>
+            </a:schemeClr>
+          </a:lnRef>
+          <a:fillRef idx="1">
+            <a:schemeClr val="dk1"/>
+          </a:fillRef>
+          <a:effectRef idx="0">
+            <a:schemeClr val="dk1"/>
+          </a:effectRef>
+          <a:fontRef idx="minor">
+            <a:schemeClr val="lt1"/>
+          </a:fontRef>
+        </p:style>
+        <p:txBody>
+          <a:bodyPr rtlCol="0" anchor="ctr"/>
+          <a:lstStyle/>
+          <a:p>
+            <a:pPr algn="ctr"/>
+            <a:endParaRPr lang="en-IN"/>
+          </a:p>
+        </p:txBody>
+      </p:sp>
+      <p:sp>
+        <p:nvSpPr>
+          <p:cNvPr id="64" name="TextBox 63">
+            <a:extLst>
+              <a:ext uri="{FF2B5EF4-FFF2-40B4-BE49-F238E27FC236}">
+                <a16:creationId xmlns:a16="http://schemas.microsoft.com/office/drawing/2014/main" id="{B67566E4-6EF7-48BE-8EB0-753E9DFC3DB1}"/>
+              </a:ext>
+            </a:extLst>
+          </p:cNvPr>
+          <p:cNvSpPr txBox="1"/>
+          <p:nvPr/>
+        </p:nvSpPr>
+        <p:spPr>
+          <a:xfrm>
+            <a:off x="6338035" y="4934186"/>
+            <a:ext cx="753040" cy="369332"/>
+          </a:xfrm>
+          <a:prstGeom prst="rect">
+            <a:avLst/>
+          </a:prstGeom>
+          <a:noFill/>
+        </p:spPr>
+        <p:txBody>
+          <a:bodyPr wrap="square" rtlCol="0">
+            <a:spAutoFit/>
+          </a:bodyPr>
+          <a:lstStyle/>
+          <a:p>
+            <a:r>
+              <a:rPr lang="en-IN"/>
+              <a:t>10KN</a:t>
+            </a:r>
+          </a:p>
+        </p:txBody>
+      </p:sp>
+      <p:sp>
+        <p:nvSpPr>
+          <p:cNvPr id="65" name="Arrow: Right 64">
+            <a:extLst>
+              <a:ext uri="{FF2B5EF4-FFF2-40B4-BE49-F238E27FC236}">
+                <a16:creationId xmlns:a16="http://schemas.microsoft.com/office/drawing/2014/main" id="{E95EC1D4-F4C6-4511-8CA0-C90F93176EBB}"/>
+              </a:ext>
+            </a:extLst>
+          </p:cNvPr>
+          <p:cNvSpPr/>
+          <p:nvPr/>
+        </p:nvSpPr>
+        <p:spPr>
+          <a:xfrm>
+            <a:off x="9825316" y="4513683"/>
+            <a:ext cx="775443" cy="189836"/>
+          </a:xfrm>
+          <a:prstGeom prst="rightArrow">
+            <a:avLst/>
+          </a:prstGeom>
+        </p:spPr>
+        <p:style>
+          <a:lnRef idx="2">
+            <a:schemeClr val="dk1">
+              <a:shade val="50000"/>
+            </a:schemeClr>
+          </a:lnRef>
+          <a:fillRef idx="1">
+            <a:schemeClr val="dk1"/>
+          </a:fillRef>
+          <a:effectRef idx="0">
+            <a:schemeClr val="dk1"/>
+          </a:effectRef>
+          <a:fontRef idx="minor">
+            <a:schemeClr val="lt1"/>
+          </a:fontRef>
+        </p:style>
+        <p:txBody>
+          <a:bodyPr rtlCol="0" anchor="ctr"/>
+          <a:lstStyle/>
+          <a:p>
+            <a:pPr algn="ctr"/>
+            <a:endParaRPr lang="en-IN"/>
+          </a:p>
+        </p:txBody>
+      </p:sp>
+      <p:sp>
+        <p:nvSpPr>
+          <p:cNvPr id="66" name="TextBox 65">
+            <a:extLst>
+              <a:ext uri="{FF2B5EF4-FFF2-40B4-BE49-F238E27FC236}">
+                <a16:creationId xmlns:a16="http://schemas.microsoft.com/office/drawing/2014/main" id="{377326AC-D821-492A-BC6B-00C8E50BAB0F}"/>
+              </a:ext>
+            </a:extLst>
+          </p:cNvPr>
+          <p:cNvSpPr txBox="1"/>
+          <p:nvPr/>
+        </p:nvSpPr>
+        <p:spPr>
+          <a:xfrm>
+            <a:off x="9776017" y="4655341"/>
+            <a:ext cx="753040" cy="369332"/>
+          </a:xfrm>
+          <a:prstGeom prst="rect">
+            <a:avLst/>
+          </a:prstGeom>
+          <a:noFill/>
+        </p:spPr>
+        <p:txBody>
+          <a:bodyPr wrap="square" rtlCol="0">
+            <a:spAutoFit/>
+          </a:bodyPr>
+          <a:lstStyle/>
+          <a:p>
+            <a:r>
+              <a:rPr lang="en-IN"/>
+              <a:t>45KN</a:t>
+            </a:r>
+          </a:p>
+        </p:txBody>
+      </p:sp>
+    </p:spTree>
+    <p:extLst>
+      <p:ext uri="{BB962C8B-B14F-4D97-AF65-F5344CB8AC3E}">
+        <p14:creationId xmlns:p14="http://schemas.microsoft.com/office/powerpoint/2010/main" val="3912243081"/>
+      </p:ext>
+    </p:extLst>
+  </p:cSld>
+  <p:clrMapOvr>
+    <a:masterClrMapping/>
+  </p:clrMapOvr>
+</p:sld>
+</file>
+
+<file path=ppt/slides/slide11.xml><?xml version="1.0" encoding="utf-8"?>
+<p:sld xmlns:a="http://schemas.openxmlformats.org/drawingml/2006/main" xmlns:r="http://schemas.openxmlformats.org/officeDocument/2006/relationships" xmlns:p="http://schemas.openxmlformats.org/presentationml/2006/main">
+  <p:cSld>
+    <p:spTree>
+      <p:nvGrpSpPr>
+        <p:cNvPr id="1" name=""/>
+        <p:cNvGrpSpPr/>
+        <p:nvPr/>
+      </p:nvGrpSpPr>
+      <p:grpSpPr>
+        <a:xfrm>
+          <a:off x="0" y="0"/>
+          <a:ext cx="0" cy="0"/>
+          <a:chOff x="0" y="0"/>
+          <a:chExt cx="0" cy="0"/>
+        </a:xfrm>
+      </p:grpSpPr>
+      <p:sp>
+        <p:nvSpPr>
+          <p:cNvPr id="2" name="Rectangle 1">
+            <a:extLst>
+              <a:ext uri="{FF2B5EF4-FFF2-40B4-BE49-F238E27FC236}">
+                <a16:creationId xmlns:a16="http://schemas.microsoft.com/office/drawing/2014/main" id="{9787C1C7-4A08-42ED-B791-6E7E356559C7}"/>
+              </a:ext>
+            </a:extLst>
+          </p:cNvPr>
+          <p:cNvSpPr/>
+          <p:nvPr/>
+        </p:nvSpPr>
+        <p:spPr>
+          <a:xfrm>
+            <a:off x="3576917" y="2487706"/>
+            <a:ext cx="5665694" cy="941294"/>
+          </a:xfrm>
+          <a:prstGeom prst="rect">
+            <a:avLst/>
+          </a:prstGeom>
+          <a:pattFill prst="horzBrick">
+            <a:fgClr>
+              <a:schemeClr val="tx1"/>
+            </a:fgClr>
+            <a:bgClr>
+              <a:schemeClr val="bg1"/>
+            </a:bgClr>
+          </a:pattFill>
+        </p:spPr>
+        <p:style>
+          <a:lnRef idx="2">
+            <a:schemeClr val="accent1">
+              <a:shade val="50000"/>
+            </a:schemeClr>
+          </a:lnRef>
+          <a:fillRef idx="1">
+            <a:schemeClr val="accent1"/>
+          </a:fillRef>
+          <a:effectRef idx="0">
+            <a:schemeClr val="accent1"/>
+          </a:effectRef>
+          <a:fontRef idx="minor">
+            <a:schemeClr val="lt1"/>
+          </a:fontRef>
+        </p:style>
+        <p:txBody>
+          <a:bodyPr rtlCol="0" anchor="ctr"/>
+          <a:lstStyle/>
+          <a:p>
+            <a:pPr algn="ctr"/>
+            <a:endParaRPr lang="en-IN"/>
+          </a:p>
+        </p:txBody>
+      </p:sp>
+      <p:sp>
+        <p:nvSpPr>
+          <p:cNvPr id="67" name="Rectangle 66">
+            <a:extLst>
+              <a:ext uri="{FF2B5EF4-FFF2-40B4-BE49-F238E27FC236}">
+                <a16:creationId xmlns:a16="http://schemas.microsoft.com/office/drawing/2014/main" id="{C5F449F9-6102-4C23-AFF0-7D6F97A87CE2}"/>
+              </a:ext>
+            </a:extLst>
+          </p:cNvPr>
+          <p:cNvSpPr/>
+          <p:nvPr/>
+        </p:nvSpPr>
+        <p:spPr>
+          <a:xfrm>
+            <a:off x="3576917" y="3429000"/>
+            <a:ext cx="5665694" cy="941294"/>
+          </a:xfrm>
+          <a:prstGeom prst="rect">
+            <a:avLst/>
+          </a:prstGeom>
+          <a:pattFill prst="smConfetti">
+            <a:fgClr>
+              <a:schemeClr val="tx1"/>
+            </a:fgClr>
+            <a:bgClr>
+              <a:schemeClr val="bg1"/>
+            </a:bgClr>
+          </a:pattFill>
+        </p:spPr>
+        <p:style>
+          <a:lnRef idx="2">
+            <a:schemeClr val="accent1">
+              <a:shade val="50000"/>
+            </a:schemeClr>
+          </a:lnRef>
+          <a:fillRef idx="1">
+            <a:schemeClr val="accent1"/>
+          </a:fillRef>
+          <a:effectRef idx="0">
+            <a:schemeClr val="accent1"/>
+          </a:effectRef>
+          <a:fontRef idx="minor">
+            <a:schemeClr val="lt1"/>
+          </a:fontRef>
+        </p:style>
+        <p:txBody>
+          <a:bodyPr rtlCol="0" anchor="ctr"/>
+          <a:lstStyle/>
+          <a:p>
+            <a:pPr algn="ctr"/>
+            <a:endParaRPr lang="en-IN"/>
+          </a:p>
+        </p:txBody>
+      </p:sp>
+      <p:cxnSp>
+        <p:nvCxnSpPr>
+          <p:cNvPr id="5" name="Straight Connector 4">
+            <a:extLst>
+              <a:ext uri="{FF2B5EF4-FFF2-40B4-BE49-F238E27FC236}">
+                <a16:creationId xmlns:a16="http://schemas.microsoft.com/office/drawing/2014/main" id="{CF6CBB20-3F6C-450F-8050-9C0BFFD7B373}"/>
+              </a:ext>
+            </a:extLst>
+          </p:cNvPr>
+          <p:cNvCxnSpPr/>
+          <p:nvPr/>
+        </p:nvCxnSpPr>
+        <p:spPr>
+          <a:xfrm>
+            <a:off x="3557867" y="2205037"/>
+            <a:ext cx="0" cy="2447925"/>
+          </a:xfrm>
+          <a:prstGeom prst="line">
+            <a:avLst/>
+          </a:prstGeom>
+          <a:ln w="76200"/>
+        </p:spPr>
+        <p:style>
+          <a:lnRef idx="1">
+            <a:schemeClr val="dk1"/>
+          </a:lnRef>
+          <a:fillRef idx="0">
+            <a:schemeClr val="dk1"/>
+          </a:fillRef>
+          <a:effectRef idx="0">
+            <a:schemeClr val="dk1"/>
+          </a:effectRef>
+          <a:fontRef idx="minor">
+            <a:schemeClr val="tx1"/>
+          </a:fontRef>
+        </p:style>
+      </p:cxnSp>
+      <p:cxnSp>
+        <p:nvCxnSpPr>
+          <p:cNvPr id="68" name="Straight Connector 67">
+            <a:extLst>
+              <a:ext uri="{FF2B5EF4-FFF2-40B4-BE49-F238E27FC236}">
+                <a16:creationId xmlns:a16="http://schemas.microsoft.com/office/drawing/2014/main" id="{0F605BBB-ED55-400F-8DA4-E7022AF7025E}"/>
+              </a:ext>
+            </a:extLst>
+          </p:cNvPr>
+          <p:cNvCxnSpPr/>
+          <p:nvPr/>
+        </p:nvCxnSpPr>
+        <p:spPr>
+          <a:xfrm>
+            <a:off x="9242611" y="2205037"/>
+            <a:ext cx="0" cy="2447925"/>
+          </a:xfrm>
+          <a:prstGeom prst="line">
+            <a:avLst/>
+          </a:prstGeom>
+          <a:ln w="76200"/>
+        </p:spPr>
+        <p:style>
+          <a:lnRef idx="1">
+            <a:schemeClr val="dk1"/>
+          </a:lnRef>
+          <a:fillRef idx="0">
+            <a:schemeClr val="dk1"/>
+          </a:fillRef>
+          <a:effectRef idx="0">
+            <a:schemeClr val="dk1"/>
+          </a:effectRef>
+          <a:fontRef idx="minor">
+            <a:schemeClr val="tx1"/>
+          </a:fontRef>
+        </p:style>
+      </p:cxnSp>
+      <p:cxnSp>
+        <p:nvCxnSpPr>
+          <p:cNvPr id="9" name="Straight Arrow Connector 8">
+            <a:extLst>
+              <a:ext uri="{FF2B5EF4-FFF2-40B4-BE49-F238E27FC236}">
+                <a16:creationId xmlns:a16="http://schemas.microsoft.com/office/drawing/2014/main" id="{1BA80FFF-A051-4A22-90DE-D2890C2E3F31}"/>
+              </a:ext>
+            </a:extLst>
+          </p:cNvPr>
+          <p:cNvCxnSpPr/>
+          <p:nvPr/>
+        </p:nvCxnSpPr>
+        <p:spPr>
+          <a:xfrm flipH="1">
+            <a:off x="2781300" y="3429000"/>
+            <a:ext cx="795617" cy="0"/>
+          </a:xfrm>
+          <a:prstGeom prst="straightConnector1">
+            <a:avLst/>
+          </a:prstGeom>
+          <a:ln w="57150">
+            <a:tailEnd type="triangle"/>
+          </a:ln>
+        </p:spPr>
+        <p:style>
+          <a:lnRef idx="1">
+            <a:schemeClr val="dk1"/>
+          </a:lnRef>
+          <a:fillRef idx="0">
+            <a:schemeClr val="dk1"/>
+          </a:fillRef>
+          <a:effectRef idx="0">
+            <a:schemeClr val="dk1"/>
+          </a:effectRef>
+          <a:fontRef idx="minor">
+            <a:schemeClr val="tx1"/>
+          </a:fontRef>
+        </p:style>
+      </p:cxnSp>
+      <p:cxnSp>
+        <p:nvCxnSpPr>
+          <p:cNvPr id="70" name="Straight Arrow Connector 69">
+            <a:extLst>
+              <a:ext uri="{FF2B5EF4-FFF2-40B4-BE49-F238E27FC236}">
+                <a16:creationId xmlns:a16="http://schemas.microsoft.com/office/drawing/2014/main" id="{5A489938-34B3-4C7D-AD20-B613AA98CD03}"/>
+              </a:ext>
+            </a:extLst>
+          </p:cNvPr>
+          <p:cNvCxnSpPr>
+            <a:cxnSpLocks/>
+          </p:cNvCxnSpPr>
+          <p:nvPr/>
+        </p:nvCxnSpPr>
+        <p:spPr>
+          <a:xfrm>
+            <a:off x="9242612" y="3448050"/>
+            <a:ext cx="730063" cy="0"/>
+          </a:xfrm>
+          <a:prstGeom prst="straightConnector1">
+            <a:avLst/>
+          </a:prstGeom>
+          <a:ln w="57150">
+            <a:tailEnd type="triangle"/>
+          </a:ln>
+        </p:spPr>
+        <p:style>
+          <a:lnRef idx="1">
+            <a:schemeClr val="dk1"/>
+          </a:lnRef>
+          <a:fillRef idx="0">
+            <a:schemeClr val="dk1"/>
+          </a:fillRef>
+          <a:effectRef idx="0">
+            <a:schemeClr val="dk1"/>
+          </a:effectRef>
+          <a:fontRef idx="minor">
+            <a:schemeClr val="tx1"/>
+          </a:fontRef>
+        </p:style>
+      </p:cxnSp>
+      <p:sp>
+        <p:nvSpPr>
+          <p:cNvPr id="13" name="TextBox 12">
+            <a:extLst>
+              <a:ext uri="{FF2B5EF4-FFF2-40B4-BE49-F238E27FC236}">
+                <a16:creationId xmlns:a16="http://schemas.microsoft.com/office/drawing/2014/main" id="{D1DBA392-ABD7-40C5-8DDF-B5084F5D36A3}"/>
+              </a:ext>
+            </a:extLst>
+          </p:cNvPr>
+          <p:cNvSpPr txBox="1"/>
+          <p:nvPr/>
+        </p:nvSpPr>
+        <p:spPr>
+          <a:xfrm>
+            <a:off x="2362200" y="3094107"/>
+            <a:ext cx="484654" cy="707886"/>
+          </a:xfrm>
+          <a:prstGeom prst="rect">
+            <a:avLst/>
+          </a:prstGeom>
+          <a:noFill/>
+        </p:spPr>
+        <p:txBody>
+          <a:bodyPr wrap="square" rtlCol="0">
+            <a:spAutoFit/>
+          </a:bodyPr>
+          <a:lstStyle/>
+          <a:p>
+            <a:r>
+              <a:rPr lang="en-IN" sz="4000" b="1"/>
+              <a:t>P</a:t>
+            </a:r>
+          </a:p>
+        </p:txBody>
+      </p:sp>
+      <p:sp>
+        <p:nvSpPr>
+          <p:cNvPr id="71" name="TextBox 70">
+            <a:extLst>
+              <a:ext uri="{FF2B5EF4-FFF2-40B4-BE49-F238E27FC236}">
+                <a16:creationId xmlns:a16="http://schemas.microsoft.com/office/drawing/2014/main" id="{31446F1D-0993-405F-B8F0-B3F60D7CCD7A}"/>
+              </a:ext>
+            </a:extLst>
+          </p:cNvPr>
+          <p:cNvSpPr txBox="1"/>
+          <p:nvPr/>
+        </p:nvSpPr>
+        <p:spPr>
+          <a:xfrm>
+            <a:off x="9960908" y="3094107"/>
+            <a:ext cx="484654" cy="707886"/>
+          </a:xfrm>
+          <a:prstGeom prst="rect">
+            <a:avLst/>
+          </a:prstGeom>
+          <a:noFill/>
+        </p:spPr>
+        <p:txBody>
+          <a:bodyPr wrap="square" rtlCol="0">
+            <a:spAutoFit/>
+          </a:bodyPr>
+          <a:lstStyle/>
+          <a:p>
+            <a:r>
+              <a:rPr lang="en-IN" sz="4000" b="1"/>
+              <a:t>P</a:t>
+            </a:r>
+          </a:p>
+        </p:txBody>
+      </p:sp>
+      <p:sp>
+        <p:nvSpPr>
+          <p:cNvPr id="14" name="TextBox 13">
+            <a:extLst>
+              <a:ext uri="{FF2B5EF4-FFF2-40B4-BE49-F238E27FC236}">
+                <a16:creationId xmlns:a16="http://schemas.microsoft.com/office/drawing/2014/main" id="{956FF50B-93E3-426E-A8A7-4AD3AB93B2B5}"/>
+              </a:ext>
+            </a:extLst>
+          </p:cNvPr>
+          <p:cNvSpPr txBox="1"/>
+          <p:nvPr/>
+        </p:nvSpPr>
+        <p:spPr>
+          <a:xfrm>
+            <a:off x="5486400" y="2665965"/>
+            <a:ext cx="1476375" cy="584775"/>
+          </a:xfrm>
+          <a:prstGeom prst="rect">
+            <a:avLst/>
+          </a:prstGeom>
+          <a:noFill/>
+        </p:spPr>
+        <p:txBody>
+          <a:bodyPr wrap="square" rtlCol="0">
+            <a:spAutoFit/>
+          </a:bodyPr>
+          <a:lstStyle/>
+          <a:p>
+            <a:pPr algn="ctr"/>
+            <a:r>
+              <a:rPr lang="en-IN" sz="3200" b="1"/>
+              <a:t>A1   E1</a:t>
+            </a:r>
+          </a:p>
+        </p:txBody>
+      </p:sp>
+      <p:sp>
+        <p:nvSpPr>
+          <p:cNvPr id="72" name="TextBox 71">
+            <a:extLst>
+              <a:ext uri="{FF2B5EF4-FFF2-40B4-BE49-F238E27FC236}">
+                <a16:creationId xmlns:a16="http://schemas.microsoft.com/office/drawing/2014/main" id="{4636FCA1-B7B7-48B4-8877-694BD22CA6F5}"/>
+              </a:ext>
+            </a:extLst>
+          </p:cNvPr>
+          <p:cNvSpPr txBox="1"/>
+          <p:nvPr/>
+        </p:nvSpPr>
+        <p:spPr>
+          <a:xfrm>
+            <a:off x="5486399" y="3569331"/>
+            <a:ext cx="1476375" cy="584775"/>
+          </a:xfrm>
+          <a:prstGeom prst="rect">
+            <a:avLst/>
+          </a:prstGeom>
+          <a:noFill/>
+        </p:spPr>
+        <p:txBody>
+          <a:bodyPr wrap="square" rtlCol="0">
+            <a:spAutoFit/>
+          </a:bodyPr>
+          <a:lstStyle/>
+          <a:p>
+            <a:pPr algn="ctr"/>
+            <a:r>
+              <a:rPr lang="en-IN" sz="3200" b="1"/>
+              <a:t>A2   E2</a:t>
+            </a:r>
+          </a:p>
+        </p:txBody>
+      </p:sp>
+    </p:spTree>
+    <p:extLst>
+      <p:ext uri="{BB962C8B-B14F-4D97-AF65-F5344CB8AC3E}">
+        <p14:creationId xmlns:p14="http://schemas.microsoft.com/office/powerpoint/2010/main" val="669014426"/>
+      </p:ext>
+    </p:extLst>
+  </p:cSld>
+  <p:clrMapOvr>
+    <a:masterClrMapping/>
+  </p:clrMapOvr>
+</p:sld>
+</file>
+
+<file path=ppt/slides/slide2.xml><?xml version="1.0" encoding="utf-8"?>
+<p:sld xmlns:a="http://schemas.openxmlformats.org/drawingml/2006/main" xmlns:r="http://schemas.openxmlformats.org/officeDocument/2006/relationships" xmlns:p="http://schemas.openxmlformats.org/presentationml/2006/main">
+  <p:cSld>
+    <p:spTree>
+      <p:nvGrpSpPr>
+        <p:cNvPr id="1" name=""/>
+        <p:cNvGrpSpPr/>
+        <p:nvPr/>
+      </p:nvGrpSpPr>
+      <p:grpSpPr>
+        <a:xfrm>
+          <a:off x="0" y="0"/>
+          <a:ext cx="0" cy="0"/>
+          <a:chOff x="0" y="0"/>
+          <a:chExt cx="0" cy="0"/>
+        </a:xfrm>
+      </p:grpSpPr>
+      <p:cxnSp>
+        <p:nvCxnSpPr>
+          <p:cNvPr id="5" name="Straight Arrow Connector 4">
+            <a:extLst>
+              <a:ext uri="{FF2B5EF4-FFF2-40B4-BE49-F238E27FC236}">
+                <a16:creationId xmlns:a16="http://schemas.microsoft.com/office/drawing/2014/main" id="{559850C6-6BB8-47AE-B4F4-B25D30AD45C0}"/>
+              </a:ext>
+            </a:extLst>
+          </p:cNvPr>
+          <p:cNvCxnSpPr/>
+          <p:nvPr/>
+        </p:nvCxnSpPr>
+        <p:spPr>
+          <a:xfrm flipV="1">
+            <a:off x="4078941" y="1461247"/>
+            <a:ext cx="0" cy="3845859"/>
+          </a:xfrm>
+          <a:prstGeom prst="straightConnector1">
+            <a:avLst/>
+          </a:prstGeom>
+          <a:ln w="57150">
+            <a:tailEnd type="triangle"/>
+          </a:ln>
+        </p:spPr>
+        <p:style>
+          <a:lnRef idx="1">
+            <a:schemeClr val="dk1"/>
+          </a:lnRef>
+          <a:fillRef idx="0">
+            <a:schemeClr val="dk1"/>
+          </a:fillRef>
+          <a:effectRef idx="0">
+            <a:schemeClr val="dk1"/>
+          </a:effectRef>
+          <a:fontRef idx="minor">
+            <a:schemeClr val="tx1"/>
+          </a:fontRef>
+        </p:style>
+      </p:cxnSp>
+      <p:cxnSp>
+        <p:nvCxnSpPr>
+          <p:cNvPr id="6" name="Straight Arrow Connector 5">
+            <a:extLst>
+              <a:ext uri="{FF2B5EF4-FFF2-40B4-BE49-F238E27FC236}">
+                <a16:creationId xmlns:a16="http://schemas.microsoft.com/office/drawing/2014/main" id="{1A1D26B7-5172-4FC0-BB52-5D87AC6E26DF}"/>
+              </a:ext>
+            </a:extLst>
+          </p:cNvPr>
+          <p:cNvCxnSpPr>
+            <a:cxnSpLocks/>
+          </p:cNvCxnSpPr>
+          <p:nvPr/>
+        </p:nvCxnSpPr>
+        <p:spPr>
+          <a:xfrm flipV="1">
+            <a:off x="4052046" y="5307105"/>
+            <a:ext cx="4670612" cy="1"/>
+          </a:xfrm>
+          <a:prstGeom prst="straightConnector1">
+            <a:avLst/>
+          </a:prstGeom>
+          <a:ln w="57150">
+            <a:tailEnd type="triangle"/>
+          </a:ln>
+        </p:spPr>
+        <p:style>
+          <a:lnRef idx="1">
+            <a:schemeClr val="dk1"/>
+          </a:lnRef>
+          <a:fillRef idx="0">
+            <a:schemeClr val="dk1"/>
+          </a:fillRef>
+          <a:effectRef idx="0">
+            <a:schemeClr val="dk1"/>
+          </a:effectRef>
+          <a:fontRef idx="minor">
+            <a:schemeClr val="tx1"/>
+          </a:fontRef>
+        </p:style>
+      </p:cxnSp>
+      <p:sp>
+        <p:nvSpPr>
+          <p:cNvPr id="8" name="TextBox 7">
+            <a:extLst>
+              <a:ext uri="{FF2B5EF4-FFF2-40B4-BE49-F238E27FC236}">
+                <a16:creationId xmlns:a16="http://schemas.microsoft.com/office/drawing/2014/main" id="{93D5381B-DA8B-4000-8F36-C1AEB4372D46}"/>
+              </a:ext>
+            </a:extLst>
+          </p:cNvPr>
+          <p:cNvSpPr txBox="1"/>
+          <p:nvPr/>
+        </p:nvSpPr>
+        <p:spPr>
+          <a:xfrm>
+            <a:off x="3886200" y="966119"/>
+            <a:ext cx="815788" cy="584775"/>
+          </a:xfrm>
+          <a:prstGeom prst="rect">
+            <a:avLst/>
+          </a:prstGeom>
+          <a:noFill/>
+        </p:spPr>
+        <p:txBody>
+          <a:bodyPr wrap="square" rtlCol="0">
+            <a:spAutoFit/>
+          </a:bodyPr>
+          <a:lstStyle/>
+          <a:p>
+            <a:r>
+              <a:rPr lang="el-GR" sz="3200" b="1"/>
+              <a:t>σ</a:t>
+            </a:r>
+            <a:endParaRPr lang="en-IN" sz="3200" b="1"/>
+          </a:p>
+        </p:txBody>
+      </p:sp>
+      <p:sp>
+        <p:nvSpPr>
+          <p:cNvPr id="9" name="TextBox 8">
+            <a:extLst>
+              <a:ext uri="{FF2B5EF4-FFF2-40B4-BE49-F238E27FC236}">
+                <a16:creationId xmlns:a16="http://schemas.microsoft.com/office/drawing/2014/main" id="{152DAFAD-C296-47F1-BD5B-E43A4C981D21}"/>
+              </a:ext>
+            </a:extLst>
+          </p:cNvPr>
+          <p:cNvSpPr txBox="1"/>
+          <p:nvPr/>
+        </p:nvSpPr>
+        <p:spPr>
+          <a:xfrm>
+            <a:off x="8644218" y="4987822"/>
+            <a:ext cx="815786" cy="584775"/>
+          </a:xfrm>
+          <a:prstGeom prst="rect">
+            <a:avLst/>
+          </a:prstGeom>
+          <a:noFill/>
+        </p:spPr>
+        <p:txBody>
+          <a:bodyPr wrap="square" rtlCol="0">
+            <a:spAutoFit/>
+          </a:bodyPr>
+          <a:lstStyle/>
+          <a:p>
+            <a:r>
+              <a:rPr lang="el-GR" sz="3200" b="1"/>
+              <a:t>ε</a:t>
+            </a:r>
+            <a:endParaRPr lang="en-IN" sz="3200" b="1"/>
+          </a:p>
+        </p:txBody>
+      </p:sp>
+      <p:cxnSp>
+        <p:nvCxnSpPr>
+          <p:cNvPr id="3" name="Straight Connector 2">
+            <a:extLst>
+              <a:ext uri="{FF2B5EF4-FFF2-40B4-BE49-F238E27FC236}">
+                <a16:creationId xmlns:a16="http://schemas.microsoft.com/office/drawing/2014/main" id="{857E4234-E6C4-4AAB-8855-147829AF6477}"/>
+              </a:ext>
+            </a:extLst>
+          </p:cNvPr>
+          <p:cNvCxnSpPr/>
+          <p:nvPr/>
+        </p:nvCxnSpPr>
+        <p:spPr>
+          <a:xfrm flipV="1">
+            <a:off x="4078941" y="1909482"/>
+            <a:ext cx="3092824" cy="3397623"/>
+          </a:xfrm>
+          <a:prstGeom prst="line">
+            <a:avLst/>
+          </a:prstGeom>
+          <a:ln w="57150"/>
+        </p:spPr>
+        <p:style>
+          <a:lnRef idx="1">
+            <a:schemeClr val="accent1"/>
+          </a:lnRef>
+          <a:fillRef idx="0">
+            <a:schemeClr val="accent1"/>
+          </a:fillRef>
+          <a:effectRef idx="0">
+            <a:schemeClr val="accent1"/>
+          </a:effectRef>
+          <a:fontRef idx="minor">
+            <a:schemeClr val="tx1"/>
+          </a:fontRef>
+        </p:style>
+      </p:cxnSp>
+      <p:sp>
+        <p:nvSpPr>
+          <p:cNvPr id="4" name="TextBox 3">
+            <a:extLst>
+              <a:ext uri="{FF2B5EF4-FFF2-40B4-BE49-F238E27FC236}">
+                <a16:creationId xmlns:a16="http://schemas.microsoft.com/office/drawing/2014/main" id="{182F2028-48B2-45DE-BEA2-4985DF0E2F9F}"/>
+              </a:ext>
+            </a:extLst>
+          </p:cNvPr>
+          <p:cNvSpPr txBox="1"/>
+          <p:nvPr/>
+        </p:nvSpPr>
+        <p:spPr>
+          <a:xfrm>
+            <a:off x="4447615" y="5342527"/>
+            <a:ext cx="3801035" cy="646331"/>
+          </a:xfrm>
+          <a:prstGeom prst="rect">
+            <a:avLst/>
+          </a:prstGeom>
+          <a:noFill/>
+        </p:spPr>
+        <p:txBody>
+          <a:bodyPr wrap="square" rtlCol="0">
+            <a:spAutoFit/>
+          </a:bodyPr>
+          <a:lstStyle/>
+          <a:p>
+            <a:pPr algn="ctr"/>
+            <a:r>
+              <a:rPr lang="en-IN" sz="3600" b="1"/>
+              <a:t>Linear Elastic</a:t>
+            </a:r>
+          </a:p>
+        </p:txBody>
+      </p:sp>
+    </p:spTree>
+    <p:extLst>
+      <p:ext uri="{BB962C8B-B14F-4D97-AF65-F5344CB8AC3E}">
+        <p14:creationId xmlns:p14="http://schemas.microsoft.com/office/powerpoint/2010/main" val="1399090415"/>
+      </p:ext>
+    </p:extLst>
+  </p:cSld>
+  <p:clrMapOvr>
+    <a:masterClrMapping/>
+  </p:clrMapOvr>
+</p:sld>
+</file>
+
+<file path=ppt/slides/slide3.xml><?xml version="1.0" encoding="utf-8"?>
+<p:sld xmlns:a="http://schemas.openxmlformats.org/drawingml/2006/main" xmlns:r="http://schemas.openxmlformats.org/officeDocument/2006/relationships" xmlns:p="http://schemas.openxmlformats.org/presentationml/2006/main">
+  <p:cSld>
+    <p:spTree>
+      <p:nvGrpSpPr>
+        <p:cNvPr id="1" name=""/>
+        <p:cNvGrpSpPr/>
+        <p:nvPr/>
+      </p:nvGrpSpPr>
+      <p:grpSpPr>
+        <a:xfrm>
+          <a:off x="0" y="0"/>
+          <a:ext cx="0" cy="0"/>
+          <a:chOff x="0" y="0"/>
+          <a:chExt cx="0" cy="0"/>
+        </a:xfrm>
+      </p:grpSpPr>
+      <p:cxnSp>
+        <p:nvCxnSpPr>
+          <p:cNvPr id="5" name="Straight Arrow Connector 4">
+            <a:extLst>
+              <a:ext uri="{FF2B5EF4-FFF2-40B4-BE49-F238E27FC236}">
+                <a16:creationId xmlns:a16="http://schemas.microsoft.com/office/drawing/2014/main" id="{559850C6-6BB8-47AE-B4F4-B25D30AD45C0}"/>
+              </a:ext>
+            </a:extLst>
+          </p:cNvPr>
+          <p:cNvCxnSpPr/>
+          <p:nvPr/>
+        </p:nvCxnSpPr>
+        <p:spPr>
+          <a:xfrm flipV="1">
+            <a:off x="4078941" y="1461247"/>
+            <a:ext cx="0" cy="3845859"/>
+          </a:xfrm>
+          <a:prstGeom prst="straightConnector1">
+            <a:avLst/>
+          </a:prstGeom>
+          <a:ln w="57150">
+            <a:tailEnd type="triangle"/>
+          </a:ln>
+        </p:spPr>
+        <p:style>
+          <a:lnRef idx="1">
+            <a:schemeClr val="dk1"/>
+          </a:lnRef>
+          <a:fillRef idx="0">
+            <a:schemeClr val="dk1"/>
+          </a:fillRef>
+          <a:effectRef idx="0">
+            <a:schemeClr val="dk1"/>
+          </a:effectRef>
+          <a:fontRef idx="minor">
+            <a:schemeClr val="tx1"/>
+          </a:fontRef>
+        </p:style>
+      </p:cxnSp>
+      <p:cxnSp>
+        <p:nvCxnSpPr>
+          <p:cNvPr id="6" name="Straight Arrow Connector 5">
+            <a:extLst>
+              <a:ext uri="{FF2B5EF4-FFF2-40B4-BE49-F238E27FC236}">
+                <a16:creationId xmlns:a16="http://schemas.microsoft.com/office/drawing/2014/main" id="{1A1D26B7-5172-4FC0-BB52-5D87AC6E26DF}"/>
+              </a:ext>
+            </a:extLst>
+          </p:cNvPr>
+          <p:cNvCxnSpPr>
+            <a:cxnSpLocks/>
+          </p:cNvCxnSpPr>
+          <p:nvPr/>
+        </p:nvCxnSpPr>
+        <p:spPr>
+          <a:xfrm flipV="1">
+            <a:off x="4052046" y="5307105"/>
+            <a:ext cx="4670612" cy="1"/>
+          </a:xfrm>
+          <a:prstGeom prst="straightConnector1">
+            <a:avLst/>
+          </a:prstGeom>
+          <a:ln w="57150">
+            <a:tailEnd type="triangle"/>
+          </a:ln>
+        </p:spPr>
+        <p:style>
+          <a:lnRef idx="1">
+            <a:schemeClr val="dk1"/>
+          </a:lnRef>
+          <a:fillRef idx="0">
+            <a:schemeClr val="dk1"/>
+          </a:fillRef>
+          <a:effectRef idx="0">
+            <a:schemeClr val="dk1"/>
+          </a:effectRef>
+          <a:fontRef idx="minor">
+            <a:schemeClr val="tx1"/>
+          </a:fontRef>
+        </p:style>
+      </p:cxnSp>
+      <p:sp>
+        <p:nvSpPr>
+          <p:cNvPr id="8" name="TextBox 7">
+            <a:extLst>
+              <a:ext uri="{FF2B5EF4-FFF2-40B4-BE49-F238E27FC236}">
+                <a16:creationId xmlns:a16="http://schemas.microsoft.com/office/drawing/2014/main" id="{93D5381B-DA8B-4000-8F36-C1AEB4372D46}"/>
+              </a:ext>
+            </a:extLst>
+          </p:cNvPr>
+          <p:cNvSpPr txBox="1"/>
+          <p:nvPr/>
+        </p:nvSpPr>
+        <p:spPr>
+          <a:xfrm>
+            <a:off x="3886200" y="966119"/>
+            <a:ext cx="815788" cy="584775"/>
+          </a:xfrm>
+          <a:prstGeom prst="rect">
+            <a:avLst/>
+          </a:prstGeom>
+          <a:noFill/>
+        </p:spPr>
+        <p:txBody>
+          <a:bodyPr wrap="square" rtlCol="0">
+            <a:spAutoFit/>
+          </a:bodyPr>
+          <a:lstStyle/>
+          <a:p>
+            <a:r>
+              <a:rPr lang="el-GR" sz="3200" b="1"/>
+              <a:t>σ</a:t>
+            </a:r>
+            <a:endParaRPr lang="en-IN" sz="3200" b="1"/>
+          </a:p>
+        </p:txBody>
+      </p:sp>
+      <p:sp>
+        <p:nvSpPr>
+          <p:cNvPr id="9" name="TextBox 8">
+            <a:extLst>
+              <a:ext uri="{FF2B5EF4-FFF2-40B4-BE49-F238E27FC236}">
+                <a16:creationId xmlns:a16="http://schemas.microsoft.com/office/drawing/2014/main" id="{152DAFAD-C296-47F1-BD5B-E43A4C981D21}"/>
+              </a:ext>
+            </a:extLst>
+          </p:cNvPr>
+          <p:cNvSpPr txBox="1"/>
+          <p:nvPr/>
+        </p:nvSpPr>
+        <p:spPr>
+          <a:xfrm>
+            <a:off x="8644218" y="4987822"/>
+            <a:ext cx="815786" cy="584775"/>
+          </a:xfrm>
+          <a:prstGeom prst="rect">
+            <a:avLst/>
+          </a:prstGeom>
+          <a:noFill/>
+        </p:spPr>
+        <p:txBody>
+          <a:bodyPr wrap="square" rtlCol="0">
+            <a:spAutoFit/>
+          </a:bodyPr>
+          <a:lstStyle/>
+          <a:p>
+            <a:r>
+              <a:rPr lang="el-GR" sz="3200" b="1"/>
+              <a:t>ε</a:t>
+            </a:r>
+            <a:endParaRPr lang="en-IN" sz="3200" b="1"/>
+          </a:p>
+        </p:txBody>
+      </p:sp>
+      <p:sp>
+        <p:nvSpPr>
+          <p:cNvPr id="2" name="Freeform: Shape 1">
+            <a:extLst>
+              <a:ext uri="{FF2B5EF4-FFF2-40B4-BE49-F238E27FC236}">
+                <a16:creationId xmlns:a16="http://schemas.microsoft.com/office/drawing/2014/main" id="{73027412-64BF-42DE-8C17-0B327346B1B8}"/>
+              </a:ext>
+            </a:extLst>
+          </p:cNvPr>
+          <p:cNvSpPr/>
+          <p:nvPr/>
+        </p:nvSpPr>
+        <p:spPr>
+          <a:xfrm>
+            <a:off x="4078942" y="1909482"/>
+            <a:ext cx="3379694" cy="3397624"/>
+          </a:xfrm>
+          <a:custGeom>
+            <a:avLst/>
+            <a:gdLst>
+              <a:gd name="connsiteX0" fmla="*/ 0 w 3379694"/>
+              <a:gd name="connsiteY0" fmla="*/ 3397624 h 3397624"/>
+              <a:gd name="connsiteX1" fmla="*/ 1380565 w 3379694"/>
+              <a:gd name="connsiteY1" fmla="*/ 1272988 h 3397624"/>
+              <a:gd name="connsiteX2" fmla="*/ 3379694 w 3379694"/>
+              <a:gd name="connsiteY2" fmla="*/ 0 h 3397624"/>
+            </a:gdLst>
+            <a:ahLst/>
+            <a:cxnLst>
+              <a:cxn ang="0">
+                <a:pos x="connsiteX0" y="connsiteY0"/>
+              </a:cxn>
+              <a:cxn ang="0">
+                <a:pos x="connsiteX1" y="connsiteY1"/>
+              </a:cxn>
+              <a:cxn ang="0">
+                <a:pos x="connsiteX2" y="connsiteY2"/>
+              </a:cxn>
+            </a:cxnLst>
+            <a:rect l="l" t="t" r="r" b="b"/>
+            <a:pathLst>
+              <a:path w="3379694" h="3397624">
+                <a:moveTo>
+                  <a:pt x="0" y="3397624"/>
+                </a:moveTo>
+                <a:cubicBezTo>
+                  <a:pt x="408641" y="2618441"/>
+                  <a:pt x="817283" y="1839259"/>
+                  <a:pt x="1380565" y="1272988"/>
+                </a:cubicBezTo>
+                <a:cubicBezTo>
+                  <a:pt x="1943847" y="706717"/>
+                  <a:pt x="3115235" y="191247"/>
+                  <a:pt x="3379694" y="0"/>
+                </a:cubicBezTo>
+              </a:path>
+            </a:pathLst>
+          </a:custGeom>
+          <a:ln w="57150">
+            <a:solidFill>
+              <a:schemeClr val="accent1"/>
+            </a:solidFill>
+          </a:ln>
+        </p:spPr>
+        <p:style>
+          <a:lnRef idx="1">
+            <a:schemeClr val="accent1"/>
+          </a:lnRef>
+          <a:fillRef idx="0">
+            <a:schemeClr val="accent1"/>
+          </a:fillRef>
+          <a:effectRef idx="0">
+            <a:schemeClr val="accent1"/>
+          </a:effectRef>
+          <a:fontRef idx="minor">
+            <a:schemeClr val="tx1"/>
+          </a:fontRef>
+        </p:style>
+        <p:txBody>
+          <a:bodyPr rtlCol="0" anchor="ctr"/>
+          <a:lstStyle/>
+          <a:p>
+            <a:pPr algn="ctr"/>
+            <a:endParaRPr lang="en-IN"/>
+          </a:p>
+        </p:txBody>
+      </p:sp>
+      <p:sp>
+        <p:nvSpPr>
+          <p:cNvPr id="10" name="TextBox 9">
+            <a:extLst>
+              <a:ext uri="{FF2B5EF4-FFF2-40B4-BE49-F238E27FC236}">
+                <a16:creationId xmlns:a16="http://schemas.microsoft.com/office/drawing/2014/main" id="{72DBC138-0BA3-4B70-B06F-3377014D260F}"/>
+              </a:ext>
+            </a:extLst>
+          </p:cNvPr>
+          <p:cNvSpPr txBox="1"/>
+          <p:nvPr/>
+        </p:nvSpPr>
+        <p:spPr>
+          <a:xfrm>
+            <a:off x="4447615" y="5342527"/>
+            <a:ext cx="3801035" cy="646331"/>
+          </a:xfrm>
+          <a:prstGeom prst="rect">
+            <a:avLst/>
+          </a:prstGeom>
+          <a:noFill/>
+        </p:spPr>
+        <p:txBody>
+          <a:bodyPr wrap="square" rtlCol="0">
+            <a:spAutoFit/>
+          </a:bodyPr>
+          <a:lstStyle/>
+          <a:p>
+            <a:pPr algn="ctr"/>
+            <a:r>
+              <a:rPr lang="en-IN" sz="3600" b="1"/>
+              <a:t>NonLinear Elastic</a:t>
+            </a:r>
+          </a:p>
+        </p:txBody>
+      </p:sp>
+    </p:spTree>
+    <p:extLst>
+      <p:ext uri="{BB962C8B-B14F-4D97-AF65-F5344CB8AC3E}">
+        <p14:creationId xmlns:p14="http://schemas.microsoft.com/office/powerpoint/2010/main" val="4144392867"/>
+      </p:ext>
+    </p:extLst>
+  </p:cSld>
+  <p:clrMapOvr>
+    <a:masterClrMapping/>
+  </p:clrMapOvr>
+</p:sld>
+</file>
+
+<file path=ppt/slides/slide4.xml><?xml version="1.0" encoding="utf-8"?>
+<p:sld xmlns:a="http://schemas.openxmlformats.org/drawingml/2006/main" xmlns:r="http://schemas.openxmlformats.org/officeDocument/2006/relationships" xmlns:p="http://schemas.openxmlformats.org/presentationml/2006/main">
+  <p:cSld>
+    <p:spTree>
+      <p:nvGrpSpPr>
+        <p:cNvPr id="1" name=""/>
+        <p:cNvGrpSpPr/>
+        <p:nvPr/>
+      </p:nvGrpSpPr>
+      <p:grpSpPr>
+        <a:xfrm>
+          <a:off x="0" y="0"/>
+          <a:ext cx="0" cy="0"/>
+          <a:chOff x="0" y="0"/>
+          <a:chExt cx="0" cy="0"/>
+        </a:xfrm>
+      </p:grpSpPr>
+      <p:cxnSp>
+        <p:nvCxnSpPr>
+          <p:cNvPr id="5" name="Straight Arrow Connector 4">
+            <a:extLst>
+              <a:ext uri="{FF2B5EF4-FFF2-40B4-BE49-F238E27FC236}">
+                <a16:creationId xmlns:a16="http://schemas.microsoft.com/office/drawing/2014/main" id="{559850C6-6BB8-47AE-B4F4-B25D30AD45C0}"/>
+              </a:ext>
+            </a:extLst>
+          </p:cNvPr>
+          <p:cNvCxnSpPr/>
+          <p:nvPr/>
+        </p:nvCxnSpPr>
+        <p:spPr>
+          <a:xfrm flipV="1">
+            <a:off x="4078941" y="1461247"/>
+            <a:ext cx="0" cy="3845859"/>
+          </a:xfrm>
+          <a:prstGeom prst="straightConnector1">
+            <a:avLst/>
+          </a:prstGeom>
+          <a:ln w="57150">
+            <a:tailEnd type="triangle"/>
+          </a:ln>
+        </p:spPr>
+        <p:style>
+          <a:lnRef idx="1">
+            <a:schemeClr val="dk1"/>
+          </a:lnRef>
+          <a:fillRef idx="0">
+            <a:schemeClr val="dk1"/>
+          </a:fillRef>
+          <a:effectRef idx="0">
+            <a:schemeClr val="dk1"/>
+          </a:effectRef>
+          <a:fontRef idx="minor">
+            <a:schemeClr val="tx1"/>
+          </a:fontRef>
+        </p:style>
+      </p:cxnSp>
+      <p:cxnSp>
+        <p:nvCxnSpPr>
+          <p:cNvPr id="6" name="Straight Arrow Connector 5">
+            <a:extLst>
+              <a:ext uri="{FF2B5EF4-FFF2-40B4-BE49-F238E27FC236}">
+                <a16:creationId xmlns:a16="http://schemas.microsoft.com/office/drawing/2014/main" id="{1A1D26B7-5172-4FC0-BB52-5D87AC6E26DF}"/>
+              </a:ext>
+            </a:extLst>
+          </p:cNvPr>
+          <p:cNvCxnSpPr>
+            <a:cxnSpLocks/>
+          </p:cNvCxnSpPr>
+          <p:nvPr/>
+        </p:nvCxnSpPr>
+        <p:spPr>
+          <a:xfrm flipV="1">
+            <a:off x="4052046" y="5307105"/>
+            <a:ext cx="4670612" cy="1"/>
+          </a:xfrm>
+          <a:prstGeom prst="straightConnector1">
+            <a:avLst/>
+          </a:prstGeom>
+          <a:ln w="57150">
+            <a:tailEnd type="triangle"/>
+          </a:ln>
+        </p:spPr>
+        <p:style>
+          <a:lnRef idx="1">
+            <a:schemeClr val="dk1"/>
+          </a:lnRef>
+          <a:fillRef idx="0">
+            <a:schemeClr val="dk1"/>
+          </a:fillRef>
+          <a:effectRef idx="0">
+            <a:schemeClr val="dk1"/>
+          </a:effectRef>
+          <a:fontRef idx="minor">
+            <a:schemeClr val="tx1"/>
+          </a:fontRef>
+        </p:style>
+      </p:cxnSp>
+      <p:sp>
+        <p:nvSpPr>
+          <p:cNvPr id="8" name="TextBox 7">
+            <a:extLst>
+              <a:ext uri="{FF2B5EF4-FFF2-40B4-BE49-F238E27FC236}">
+                <a16:creationId xmlns:a16="http://schemas.microsoft.com/office/drawing/2014/main" id="{93D5381B-DA8B-4000-8F36-C1AEB4372D46}"/>
+              </a:ext>
+            </a:extLst>
+          </p:cNvPr>
+          <p:cNvSpPr txBox="1"/>
+          <p:nvPr/>
+        </p:nvSpPr>
+        <p:spPr>
+          <a:xfrm>
+            <a:off x="3886200" y="966119"/>
+            <a:ext cx="815788" cy="584775"/>
+          </a:xfrm>
+          <a:prstGeom prst="rect">
+            <a:avLst/>
+          </a:prstGeom>
+          <a:noFill/>
+        </p:spPr>
+        <p:txBody>
+          <a:bodyPr wrap="square" rtlCol="0">
+            <a:spAutoFit/>
+          </a:bodyPr>
+          <a:lstStyle/>
+          <a:p>
+            <a:r>
+              <a:rPr lang="el-GR" sz="3200" b="1"/>
+              <a:t>σ</a:t>
+            </a:r>
+            <a:endParaRPr lang="en-IN" sz="3200" b="1"/>
+          </a:p>
+        </p:txBody>
+      </p:sp>
+      <p:sp>
+        <p:nvSpPr>
+          <p:cNvPr id="9" name="TextBox 8">
+            <a:extLst>
+              <a:ext uri="{FF2B5EF4-FFF2-40B4-BE49-F238E27FC236}">
+                <a16:creationId xmlns:a16="http://schemas.microsoft.com/office/drawing/2014/main" id="{152DAFAD-C296-47F1-BD5B-E43A4C981D21}"/>
+              </a:ext>
+            </a:extLst>
+          </p:cNvPr>
+          <p:cNvSpPr txBox="1"/>
+          <p:nvPr/>
+        </p:nvSpPr>
+        <p:spPr>
+          <a:xfrm>
+            <a:off x="8644218" y="4987822"/>
+            <a:ext cx="815786" cy="584775"/>
+          </a:xfrm>
+          <a:prstGeom prst="rect">
+            <a:avLst/>
+          </a:prstGeom>
+          <a:noFill/>
+        </p:spPr>
+        <p:txBody>
+          <a:bodyPr wrap="square" rtlCol="0">
+            <a:spAutoFit/>
+          </a:bodyPr>
+          <a:lstStyle/>
+          <a:p>
+            <a:r>
+              <a:rPr lang="el-GR" sz="3200" b="1"/>
+              <a:t>ε</a:t>
+            </a:r>
+            <a:endParaRPr lang="en-IN" sz="3200" b="1"/>
+          </a:p>
+        </p:txBody>
+      </p:sp>
+      <p:cxnSp>
+        <p:nvCxnSpPr>
+          <p:cNvPr id="4" name="Straight Connector 3">
+            <a:extLst>
+              <a:ext uri="{FF2B5EF4-FFF2-40B4-BE49-F238E27FC236}">
+                <a16:creationId xmlns:a16="http://schemas.microsoft.com/office/drawing/2014/main" id="{D94E8BE2-FF41-44DC-AFBE-94E1B3EACD7C}"/>
+              </a:ext>
+            </a:extLst>
+          </p:cNvPr>
+          <p:cNvCxnSpPr>
+            <a:cxnSpLocks/>
+          </p:cNvCxnSpPr>
+          <p:nvPr/>
+        </p:nvCxnSpPr>
+        <p:spPr>
+          <a:xfrm flipV="1">
+            <a:off x="4078941" y="2572871"/>
+            <a:ext cx="1775012" cy="2734234"/>
+          </a:xfrm>
+          <a:prstGeom prst="line">
+            <a:avLst/>
+          </a:prstGeom>
+          <a:ln w="57150"/>
+        </p:spPr>
+        <p:style>
+          <a:lnRef idx="1">
+            <a:schemeClr val="accent1"/>
+          </a:lnRef>
+          <a:fillRef idx="0">
+            <a:schemeClr val="accent1"/>
+          </a:fillRef>
+          <a:effectRef idx="0">
+            <a:schemeClr val="accent1"/>
+          </a:effectRef>
+          <a:fontRef idx="minor">
+            <a:schemeClr val="tx1"/>
+          </a:fontRef>
+        </p:style>
+      </p:cxnSp>
+      <p:cxnSp>
+        <p:nvCxnSpPr>
+          <p:cNvPr id="10" name="Straight Connector 9">
+            <a:extLst>
+              <a:ext uri="{FF2B5EF4-FFF2-40B4-BE49-F238E27FC236}">
+                <a16:creationId xmlns:a16="http://schemas.microsoft.com/office/drawing/2014/main" id="{8AE53FAC-272D-47B6-8A19-5263771FAEC7}"/>
+              </a:ext>
+            </a:extLst>
+          </p:cNvPr>
+          <p:cNvCxnSpPr>
+            <a:cxnSpLocks/>
+          </p:cNvCxnSpPr>
+          <p:nvPr/>
+        </p:nvCxnSpPr>
+        <p:spPr>
+          <a:xfrm>
+            <a:off x="5836023" y="2581836"/>
+            <a:ext cx="2949388" cy="0"/>
+          </a:xfrm>
+          <a:prstGeom prst="line">
+            <a:avLst/>
+          </a:prstGeom>
+          <a:ln w="57150"/>
+        </p:spPr>
+        <p:style>
+          <a:lnRef idx="1">
+            <a:schemeClr val="accent1"/>
+          </a:lnRef>
+          <a:fillRef idx="0">
+            <a:schemeClr val="accent1"/>
+          </a:fillRef>
+          <a:effectRef idx="0">
+            <a:schemeClr val="accent1"/>
+          </a:effectRef>
+          <a:fontRef idx="minor">
+            <a:schemeClr val="tx1"/>
+          </a:fontRef>
+        </p:style>
+      </p:cxnSp>
+      <p:sp>
+        <p:nvSpPr>
+          <p:cNvPr id="14" name="TextBox 13">
+            <a:extLst>
+              <a:ext uri="{FF2B5EF4-FFF2-40B4-BE49-F238E27FC236}">
+                <a16:creationId xmlns:a16="http://schemas.microsoft.com/office/drawing/2014/main" id="{3A24C52C-429D-47D7-AD8F-92549372EFE5}"/>
+              </a:ext>
+            </a:extLst>
+          </p:cNvPr>
+          <p:cNvSpPr txBox="1"/>
+          <p:nvPr/>
+        </p:nvSpPr>
+        <p:spPr>
+          <a:xfrm>
+            <a:off x="3335991" y="5382177"/>
+            <a:ext cx="6256244" cy="646331"/>
+          </a:xfrm>
+          <a:prstGeom prst="rect">
+            <a:avLst/>
+          </a:prstGeom>
+          <a:noFill/>
+        </p:spPr>
+        <p:txBody>
+          <a:bodyPr wrap="square" rtlCol="0">
+            <a:spAutoFit/>
+          </a:bodyPr>
+          <a:lstStyle/>
+          <a:p>
+            <a:pPr algn="ctr"/>
+            <a:r>
+              <a:rPr lang="en-IN" sz="3600" b="1"/>
+              <a:t>Elastoplastic or Viscoplastic</a:t>
+            </a:r>
+          </a:p>
+        </p:txBody>
+      </p:sp>
+    </p:spTree>
+    <p:extLst>
+      <p:ext uri="{BB962C8B-B14F-4D97-AF65-F5344CB8AC3E}">
+        <p14:creationId xmlns:p14="http://schemas.microsoft.com/office/powerpoint/2010/main" val="4205590116"/>
+      </p:ext>
+    </p:extLst>
+  </p:cSld>
+  <p:clrMapOvr>
+    <a:masterClrMapping/>
+  </p:clrMapOvr>
+</p:sld>
+</file>
+
+<file path=ppt/slides/slide5.xml><?xml version="1.0" encoding="utf-8"?>
+<p:sld xmlns:a="http://schemas.openxmlformats.org/drawingml/2006/main" xmlns:r="http://schemas.openxmlformats.org/officeDocument/2006/relationships" xmlns:p="http://schemas.openxmlformats.org/presentationml/2006/main">
+  <p:cSld>
+    <p:spTree>
+      <p:nvGrpSpPr>
+        <p:cNvPr id="1" name=""/>
+        <p:cNvGrpSpPr/>
+        <p:nvPr/>
+      </p:nvGrpSpPr>
+      <p:grpSpPr>
+        <a:xfrm>
+          <a:off x="0" y="0"/>
+          <a:ext cx="0" cy="0"/>
+          <a:chOff x="0" y="0"/>
+          <a:chExt cx="0" cy="0"/>
+        </a:xfrm>
+      </p:grpSpPr>
+      <p:cxnSp>
+        <p:nvCxnSpPr>
+          <p:cNvPr id="5" name="Straight Arrow Connector 4">
+            <a:extLst>
+              <a:ext uri="{FF2B5EF4-FFF2-40B4-BE49-F238E27FC236}">
+                <a16:creationId xmlns:a16="http://schemas.microsoft.com/office/drawing/2014/main" id="{559850C6-6BB8-47AE-B4F4-B25D30AD45C0}"/>
+              </a:ext>
+            </a:extLst>
+          </p:cNvPr>
+          <p:cNvCxnSpPr/>
+          <p:nvPr/>
+        </p:nvCxnSpPr>
+        <p:spPr>
+          <a:xfrm flipV="1">
+            <a:off x="4078941" y="1461247"/>
+            <a:ext cx="0" cy="3845859"/>
+          </a:xfrm>
+          <a:prstGeom prst="straightConnector1">
+            <a:avLst/>
+          </a:prstGeom>
+          <a:ln w="57150">
+            <a:tailEnd type="triangle"/>
+          </a:ln>
+        </p:spPr>
+        <p:style>
+          <a:lnRef idx="1">
+            <a:schemeClr val="dk1"/>
+          </a:lnRef>
+          <a:fillRef idx="0">
+            <a:schemeClr val="dk1"/>
+          </a:fillRef>
+          <a:effectRef idx="0">
+            <a:schemeClr val="dk1"/>
+          </a:effectRef>
+          <a:fontRef idx="minor">
+            <a:schemeClr val="tx1"/>
+          </a:fontRef>
+        </p:style>
+      </p:cxnSp>
+      <p:cxnSp>
+        <p:nvCxnSpPr>
+          <p:cNvPr id="6" name="Straight Arrow Connector 5">
+            <a:extLst>
+              <a:ext uri="{FF2B5EF4-FFF2-40B4-BE49-F238E27FC236}">
+                <a16:creationId xmlns:a16="http://schemas.microsoft.com/office/drawing/2014/main" id="{1A1D26B7-5172-4FC0-BB52-5D87AC6E26DF}"/>
+              </a:ext>
+            </a:extLst>
+          </p:cNvPr>
+          <p:cNvCxnSpPr>
+            <a:cxnSpLocks/>
+          </p:cNvCxnSpPr>
+          <p:nvPr/>
+        </p:nvCxnSpPr>
+        <p:spPr>
+          <a:xfrm flipV="1">
+            <a:off x="4052046" y="5307105"/>
+            <a:ext cx="4670612" cy="1"/>
+          </a:xfrm>
+          <a:prstGeom prst="straightConnector1">
+            <a:avLst/>
+          </a:prstGeom>
+          <a:ln w="57150">
+            <a:tailEnd type="triangle"/>
+          </a:ln>
+        </p:spPr>
+        <p:style>
+          <a:lnRef idx="1">
+            <a:schemeClr val="dk1"/>
+          </a:lnRef>
+          <a:fillRef idx="0">
+            <a:schemeClr val="dk1"/>
+          </a:fillRef>
+          <a:effectRef idx="0">
+            <a:schemeClr val="dk1"/>
+          </a:effectRef>
+          <a:fontRef idx="minor">
+            <a:schemeClr val="tx1"/>
+          </a:fontRef>
+        </p:style>
+      </p:cxnSp>
+      <p:sp>
+        <p:nvSpPr>
+          <p:cNvPr id="8" name="TextBox 7">
+            <a:extLst>
+              <a:ext uri="{FF2B5EF4-FFF2-40B4-BE49-F238E27FC236}">
+                <a16:creationId xmlns:a16="http://schemas.microsoft.com/office/drawing/2014/main" id="{93D5381B-DA8B-4000-8F36-C1AEB4372D46}"/>
+              </a:ext>
+            </a:extLst>
+          </p:cNvPr>
+          <p:cNvSpPr txBox="1"/>
+          <p:nvPr/>
+        </p:nvSpPr>
+        <p:spPr>
+          <a:xfrm>
+            <a:off x="3886200" y="966119"/>
+            <a:ext cx="815788" cy="584775"/>
+          </a:xfrm>
+          <a:prstGeom prst="rect">
+            <a:avLst/>
+          </a:prstGeom>
+          <a:noFill/>
+        </p:spPr>
+        <p:txBody>
+          <a:bodyPr wrap="square" rtlCol="0">
+            <a:spAutoFit/>
+          </a:bodyPr>
+          <a:lstStyle/>
+          <a:p>
+            <a:r>
+              <a:rPr lang="el-GR" sz="3200" b="1"/>
+              <a:t>σ</a:t>
+            </a:r>
+            <a:endParaRPr lang="en-IN" sz="3200" b="1"/>
+          </a:p>
+        </p:txBody>
+      </p:sp>
+      <p:sp>
+        <p:nvSpPr>
+          <p:cNvPr id="9" name="TextBox 8">
+            <a:extLst>
+              <a:ext uri="{FF2B5EF4-FFF2-40B4-BE49-F238E27FC236}">
+                <a16:creationId xmlns:a16="http://schemas.microsoft.com/office/drawing/2014/main" id="{152DAFAD-C296-47F1-BD5B-E43A4C981D21}"/>
+              </a:ext>
+            </a:extLst>
+          </p:cNvPr>
+          <p:cNvSpPr txBox="1"/>
+          <p:nvPr/>
+        </p:nvSpPr>
+        <p:spPr>
+          <a:xfrm>
+            <a:off x="8644218" y="4987822"/>
+            <a:ext cx="815786" cy="584775"/>
+          </a:xfrm>
+          <a:prstGeom prst="rect">
+            <a:avLst/>
+          </a:prstGeom>
+          <a:noFill/>
+        </p:spPr>
+        <p:txBody>
+          <a:bodyPr wrap="square" rtlCol="0">
+            <a:spAutoFit/>
+          </a:bodyPr>
+          <a:lstStyle/>
+          <a:p>
+            <a:r>
+              <a:rPr lang="el-GR" sz="3200" b="1"/>
+              <a:t>ε</a:t>
+            </a:r>
+            <a:endParaRPr lang="en-IN" sz="3200" b="1"/>
+          </a:p>
+        </p:txBody>
+      </p:sp>
+      <p:cxnSp>
+        <p:nvCxnSpPr>
+          <p:cNvPr id="10" name="Straight Connector 9">
+            <a:extLst>
+              <a:ext uri="{FF2B5EF4-FFF2-40B4-BE49-F238E27FC236}">
+                <a16:creationId xmlns:a16="http://schemas.microsoft.com/office/drawing/2014/main" id="{8AE53FAC-272D-47B6-8A19-5263771FAEC7}"/>
+              </a:ext>
+            </a:extLst>
+          </p:cNvPr>
+          <p:cNvCxnSpPr>
+            <a:cxnSpLocks/>
+          </p:cNvCxnSpPr>
+          <p:nvPr/>
+        </p:nvCxnSpPr>
+        <p:spPr>
+          <a:xfrm>
+            <a:off x="4052046" y="2572871"/>
+            <a:ext cx="4733366" cy="0"/>
+          </a:xfrm>
+          <a:prstGeom prst="line">
+            <a:avLst/>
+          </a:prstGeom>
+          <a:ln w="57150"/>
+        </p:spPr>
+        <p:style>
+          <a:lnRef idx="1">
+            <a:schemeClr val="accent1"/>
+          </a:lnRef>
+          <a:fillRef idx="0">
+            <a:schemeClr val="accent1"/>
+          </a:fillRef>
+          <a:effectRef idx="0">
+            <a:schemeClr val="accent1"/>
+          </a:effectRef>
+          <a:fontRef idx="minor">
+            <a:schemeClr val="tx1"/>
+          </a:fontRef>
+        </p:style>
+      </p:cxnSp>
+      <p:sp>
+        <p:nvSpPr>
+          <p:cNvPr id="11" name="TextBox 10">
+            <a:extLst>
+              <a:ext uri="{FF2B5EF4-FFF2-40B4-BE49-F238E27FC236}">
+                <a16:creationId xmlns:a16="http://schemas.microsoft.com/office/drawing/2014/main" id="{1FEBC151-5FFA-4F6A-A08A-A4CDFC385019}"/>
+              </a:ext>
+            </a:extLst>
+          </p:cNvPr>
+          <p:cNvSpPr txBox="1"/>
+          <p:nvPr/>
+        </p:nvSpPr>
+        <p:spPr>
+          <a:xfrm>
+            <a:off x="4447615" y="5342527"/>
+            <a:ext cx="3801035" cy="646331"/>
+          </a:xfrm>
+          <a:prstGeom prst="rect">
+            <a:avLst/>
+          </a:prstGeom>
+          <a:noFill/>
+        </p:spPr>
+        <p:txBody>
+          <a:bodyPr wrap="square" rtlCol="0">
+            <a:spAutoFit/>
+          </a:bodyPr>
+          <a:lstStyle/>
+          <a:p>
+            <a:pPr algn="ctr"/>
+            <a:r>
+              <a:rPr lang="en-IN" sz="3600" b="1"/>
+              <a:t>Perfectly Plastic</a:t>
+            </a:r>
+          </a:p>
+        </p:txBody>
+      </p:sp>
+    </p:spTree>
+    <p:extLst>
+      <p:ext uri="{BB962C8B-B14F-4D97-AF65-F5344CB8AC3E}">
+        <p14:creationId xmlns:p14="http://schemas.microsoft.com/office/powerpoint/2010/main" val="2090649233"/>
+      </p:ext>
+    </p:extLst>
+  </p:cSld>
+  <p:clrMapOvr>
+    <a:masterClrMapping/>
+  </p:clrMapOvr>
+</p:sld>
+</file>
+
+<file path=ppt/slides/slide6.xml><?xml version="1.0" encoding="utf-8"?>
+<p:sld xmlns:a="http://schemas.openxmlformats.org/drawingml/2006/main" xmlns:r="http://schemas.openxmlformats.org/officeDocument/2006/relationships" xmlns:p="http://schemas.openxmlformats.org/presentationml/2006/main">
+  <p:cSld>
+    <p:spTree>
+      <p:nvGrpSpPr>
+        <p:cNvPr id="1" name=""/>
+        <p:cNvGrpSpPr/>
+        <p:nvPr/>
+      </p:nvGrpSpPr>
+      <p:grpSpPr>
+        <a:xfrm>
+          <a:off x="0" y="0"/>
+          <a:ext cx="0" cy="0"/>
+          <a:chOff x="0" y="0"/>
+          <a:chExt cx="0" cy="0"/>
+        </a:xfrm>
+      </p:grpSpPr>
+      <p:cxnSp>
+        <p:nvCxnSpPr>
+          <p:cNvPr id="5" name="Straight Arrow Connector 4">
+            <a:extLst>
+              <a:ext uri="{FF2B5EF4-FFF2-40B4-BE49-F238E27FC236}">
+                <a16:creationId xmlns:a16="http://schemas.microsoft.com/office/drawing/2014/main" id="{559850C6-6BB8-47AE-B4F4-B25D30AD45C0}"/>
+              </a:ext>
+            </a:extLst>
+          </p:cNvPr>
+          <p:cNvCxnSpPr/>
+          <p:nvPr/>
+        </p:nvCxnSpPr>
+        <p:spPr>
+          <a:xfrm flipV="1">
+            <a:off x="4078941" y="1461247"/>
+            <a:ext cx="0" cy="3845859"/>
+          </a:xfrm>
+          <a:prstGeom prst="straightConnector1">
+            <a:avLst/>
+          </a:prstGeom>
+          <a:ln w="57150">
+            <a:tailEnd type="triangle"/>
+          </a:ln>
+        </p:spPr>
+        <p:style>
+          <a:lnRef idx="1">
+            <a:schemeClr val="dk1"/>
+          </a:lnRef>
+          <a:fillRef idx="0">
+            <a:schemeClr val="dk1"/>
+          </a:fillRef>
+          <a:effectRef idx="0">
+            <a:schemeClr val="dk1"/>
+          </a:effectRef>
+          <a:fontRef idx="minor">
+            <a:schemeClr val="tx1"/>
+          </a:fontRef>
+        </p:style>
+      </p:cxnSp>
+      <p:cxnSp>
+        <p:nvCxnSpPr>
+          <p:cNvPr id="6" name="Straight Arrow Connector 5">
+            <a:extLst>
+              <a:ext uri="{FF2B5EF4-FFF2-40B4-BE49-F238E27FC236}">
+                <a16:creationId xmlns:a16="http://schemas.microsoft.com/office/drawing/2014/main" id="{1A1D26B7-5172-4FC0-BB52-5D87AC6E26DF}"/>
+              </a:ext>
+            </a:extLst>
+          </p:cNvPr>
+          <p:cNvCxnSpPr>
+            <a:cxnSpLocks/>
+          </p:cNvCxnSpPr>
+          <p:nvPr/>
+        </p:nvCxnSpPr>
+        <p:spPr>
+          <a:xfrm flipV="1">
+            <a:off x="4052046" y="5307105"/>
+            <a:ext cx="4670612" cy="1"/>
+          </a:xfrm>
+          <a:prstGeom prst="straightConnector1">
+            <a:avLst/>
+          </a:prstGeom>
+          <a:ln w="57150">
+            <a:tailEnd type="triangle"/>
+          </a:ln>
+        </p:spPr>
+        <p:style>
+          <a:lnRef idx="1">
+            <a:schemeClr val="dk1"/>
+          </a:lnRef>
+          <a:fillRef idx="0">
+            <a:schemeClr val="dk1"/>
+          </a:fillRef>
+          <a:effectRef idx="0">
+            <a:schemeClr val="dk1"/>
+          </a:effectRef>
+          <a:fontRef idx="minor">
+            <a:schemeClr val="tx1"/>
+          </a:fontRef>
+        </p:style>
+      </p:cxnSp>
+      <p:sp>
+        <p:nvSpPr>
+          <p:cNvPr id="8" name="TextBox 7">
+            <a:extLst>
+              <a:ext uri="{FF2B5EF4-FFF2-40B4-BE49-F238E27FC236}">
+                <a16:creationId xmlns:a16="http://schemas.microsoft.com/office/drawing/2014/main" id="{93D5381B-DA8B-4000-8F36-C1AEB4372D46}"/>
+              </a:ext>
+            </a:extLst>
+          </p:cNvPr>
+          <p:cNvSpPr txBox="1"/>
+          <p:nvPr/>
+        </p:nvSpPr>
+        <p:spPr>
+          <a:xfrm>
+            <a:off x="3886200" y="966119"/>
+            <a:ext cx="815788" cy="584775"/>
+          </a:xfrm>
+          <a:prstGeom prst="rect">
+            <a:avLst/>
+          </a:prstGeom>
+          <a:noFill/>
+        </p:spPr>
+        <p:txBody>
+          <a:bodyPr wrap="square" rtlCol="0">
+            <a:spAutoFit/>
+          </a:bodyPr>
+          <a:lstStyle/>
+          <a:p>
+            <a:r>
+              <a:rPr lang="el-GR" sz="3200" b="1"/>
+              <a:t>σ</a:t>
+            </a:r>
+            <a:endParaRPr lang="en-IN" sz="3200" b="1"/>
+          </a:p>
+        </p:txBody>
+      </p:sp>
+      <p:sp>
+        <p:nvSpPr>
+          <p:cNvPr id="9" name="TextBox 8">
+            <a:extLst>
+              <a:ext uri="{FF2B5EF4-FFF2-40B4-BE49-F238E27FC236}">
+                <a16:creationId xmlns:a16="http://schemas.microsoft.com/office/drawing/2014/main" id="{152DAFAD-C296-47F1-BD5B-E43A4C981D21}"/>
+              </a:ext>
+            </a:extLst>
+          </p:cNvPr>
+          <p:cNvSpPr txBox="1"/>
+          <p:nvPr/>
+        </p:nvSpPr>
+        <p:spPr>
+          <a:xfrm>
+            <a:off x="8644218" y="4987822"/>
+            <a:ext cx="815786" cy="584775"/>
+          </a:xfrm>
+          <a:prstGeom prst="rect">
+            <a:avLst/>
+          </a:prstGeom>
+          <a:noFill/>
+        </p:spPr>
+        <p:txBody>
+          <a:bodyPr wrap="square" rtlCol="0">
+            <a:spAutoFit/>
+          </a:bodyPr>
+          <a:lstStyle/>
+          <a:p>
+            <a:r>
+              <a:rPr lang="el-GR" sz="3200" b="1"/>
+              <a:t>ε</a:t>
+            </a:r>
+            <a:endParaRPr lang="en-IN" sz="3200" b="1"/>
+          </a:p>
+        </p:txBody>
+      </p:sp>
+      <p:cxnSp>
+        <p:nvCxnSpPr>
+          <p:cNvPr id="4" name="Straight Connector 3">
+            <a:extLst>
+              <a:ext uri="{FF2B5EF4-FFF2-40B4-BE49-F238E27FC236}">
+                <a16:creationId xmlns:a16="http://schemas.microsoft.com/office/drawing/2014/main" id="{D94E8BE2-FF41-44DC-AFBE-94E1B3EACD7C}"/>
+              </a:ext>
+            </a:extLst>
+          </p:cNvPr>
+          <p:cNvCxnSpPr>
+            <a:cxnSpLocks/>
+          </p:cNvCxnSpPr>
+          <p:nvPr/>
+        </p:nvCxnSpPr>
+        <p:spPr>
+          <a:xfrm flipV="1">
+            <a:off x="4078941" y="2572871"/>
+            <a:ext cx="1775012" cy="2734234"/>
+          </a:xfrm>
+          <a:prstGeom prst="line">
+            <a:avLst/>
+          </a:prstGeom>
+          <a:ln w="57150"/>
+        </p:spPr>
+        <p:style>
+          <a:lnRef idx="1">
+            <a:schemeClr val="accent1"/>
+          </a:lnRef>
+          <a:fillRef idx="0">
+            <a:schemeClr val="accent1"/>
+          </a:fillRef>
+          <a:effectRef idx="0">
+            <a:schemeClr val="accent1"/>
+          </a:effectRef>
+          <a:fontRef idx="minor">
+            <a:schemeClr val="tx1"/>
+          </a:fontRef>
+        </p:style>
+      </p:cxnSp>
+      <p:cxnSp>
+        <p:nvCxnSpPr>
+          <p:cNvPr id="10" name="Straight Connector 9">
+            <a:extLst>
+              <a:ext uri="{FF2B5EF4-FFF2-40B4-BE49-F238E27FC236}">
+                <a16:creationId xmlns:a16="http://schemas.microsoft.com/office/drawing/2014/main" id="{8AE53FAC-272D-47B6-8A19-5263771FAEC7}"/>
+              </a:ext>
+            </a:extLst>
+          </p:cNvPr>
+          <p:cNvCxnSpPr>
+            <a:cxnSpLocks/>
+          </p:cNvCxnSpPr>
+          <p:nvPr/>
+        </p:nvCxnSpPr>
+        <p:spPr>
+          <a:xfrm flipV="1">
+            <a:off x="5844988" y="1658471"/>
+            <a:ext cx="3048000" cy="923365"/>
+          </a:xfrm>
+          <a:prstGeom prst="line">
+            <a:avLst/>
+          </a:prstGeom>
+          <a:ln w="57150"/>
+        </p:spPr>
+        <p:style>
+          <a:lnRef idx="1">
+            <a:schemeClr val="accent1"/>
+          </a:lnRef>
+          <a:fillRef idx="0">
+            <a:schemeClr val="accent1"/>
+          </a:fillRef>
+          <a:effectRef idx="0">
+            <a:schemeClr val="accent1"/>
+          </a:effectRef>
+          <a:fontRef idx="minor">
+            <a:schemeClr val="tx1"/>
+          </a:fontRef>
+        </p:style>
+      </p:cxnSp>
+      <p:sp>
+        <p:nvSpPr>
+          <p:cNvPr id="11" name="TextBox 10">
+            <a:extLst>
+              <a:ext uri="{FF2B5EF4-FFF2-40B4-BE49-F238E27FC236}">
+                <a16:creationId xmlns:a16="http://schemas.microsoft.com/office/drawing/2014/main" id="{3FE90366-3723-4CDF-9EB2-0C489F19EB0E}"/>
+              </a:ext>
+            </a:extLst>
+          </p:cNvPr>
+          <p:cNvSpPr txBox="1"/>
+          <p:nvPr/>
+        </p:nvSpPr>
+        <p:spPr>
+          <a:xfrm>
+            <a:off x="2748242" y="5316070"/>
+            <a:ext cx="7278220" cy="646331"/>
+          </a:xfrm>
+          <a:prstGeom prst="rect">
+            <a:avLst/>
+          </a:prstGeom>
+          <a:noFill/>
+        </p:spPr>
+        <p:txBody>
+          <a:bodyPr wrap="square" rtlCol="0">
+            <a:spAutoFit/>
+          </a:bodyPr>
+          <a:lstStyle/>
+          <a:p>
+            <a:pPr algn="ctr"/>
+            <a:r>
+              <a:rPr lang="en-IN" sz="3600" b="1"/>
+              <a:t>Elastoplastic with strain hardening</a:t>
+            </a:r>
+          </a:p>
+        </p:txBody>
+      </p:sp>
+    </p:spTree>
+    <p:extLst>
+      <p:ext uri="{BB962C8B-B14F-4D97-AF65-F5344CB8AC3E}">
+        <p14:creationId xmlns:p14="http://schemas.microsoft.com/office/powerpoint/2010/main" val="1607794936"/>
+      </p:ext>
+    </p:extLst>
+  </p:cSld>
+  <p:clrMapOvr>
+    <a:masterClrMapping/>
+  </p:clrMapOvr>
+</p:sld>
+</file>
+
+<file path=ppt/slides/slide7.xml><?xml version="1.0" encoding="utf-8"?>
+<p:sld xmlns:a="http://schemas.openxmlformats.org/drawingml/2006/main" xmlns:r="http://schemas.openxmlformats.org/officeDocument/2006/relationships" xmlns:p="http://schemas.openxmlformats.org/presentationml/2006/main">
+  <p:cSld>
+    <p:spTree>
+      <p:nvGrpSpPr>
+        <p:cNvPr id="1" name=""/>
+        <p:cNvGrpSpPr/>
+        <p:nvPr/>
+      </p:nvGrpSpPr>
+      <p:grpSpPr>
+        <a:xfrm>
+          <a:off x="0" y="0"/>
+          <a:ext cx="0" cy="0"/>
+          <a:chOff x="0" y="0"/>
+          <a:chExt cx="0" cy="0"/>
+        </a:xfrm>
+      </p:grpSpPr>
+      <p:cxnSp>
+        <p:nvCxnSpPr>
+          <p:cNvPr id="5" name="Straight Arrow Connector 4">
+            <a:extLst>
+              <a:ext uri="{FF2B5EF4-FFF2-40B4-BE49-F238E27FC236}">
+                <a16:creationId xmlns:a16="http://schemas.microsoft.com/office/drawing/2014/main" id="{559850C6-6BB8-47AE-B4F4-B25D30AD45C0}"/>
+              </a:ext>
+            </a:extLst>
+          </p:cNvPr>
+          <p:cNvCxnSpPr/>
+          <p:nvPr/>
+        </p:nvCxnSpPr>
+        <p:spPr>
+          <a:xfrm flipV="1">
+            <a:off x="4078941" y="1461247"/>
+            <a:ext cx="0" cy="3845859"/>
+          </a:xfrm>
+          <a:prstGeom prst="straightConnector1">
+            <a:avLst/>
+          </a:prstGeom>
+          <a:ln w="57150">
+            <a:tailEnd type="triangle"/>
+          </a:ln>
+        </p:spPr>
+        <p:style>
+          <a:lnRef idx="1">
+            <a:schemeClr val="dk1"/>
+          </a:lnRef>
+          <a:fillRef idx="0">
+            <a:schemeClr val="dk1"/>
+          </a:fillRef>
+          <a:effectRef idx="0">
+            <a:schemeClr val="dk1"/>
+          </a:effectRef>
+          <a:fontRef idx="minor">
+            <a:schemeClr val="tx1"/>
+          </a:fontRef>
+        </p:style>
+      </p:cxnSp>
+      <p:cxnSp>
+        <p:nvCxnSpPr>
+          <p:cNvPr id="6" name="Straight Arrow Connector 5">
+            <a:extLst>
+              <a:ext uri="{FF2B5EF4-FFF2-40B4-BE49-F238E27FC236}">
+                <a16:creationId xmlns:a16="http://schemas.microsoft.com/office/drawing/2014/main" id="{1A1D26B7-5172-4FC0-BB52-5D87AC6E26DF}"/>
+              </a:ext>
+            </a:extLst>
+          </p:cNvPr>
+          <p:cNvCxnSpPr>
+            <a:cxnSpLocks/>
+          </p:cNvCxnSpPr>
+          <p:nvPr/>
+        </p:nvCxnSpPr>
+        <p:spPr>
+          <a:xfrm flipV="1">
+            <a:off x="4052046" y="5307105"/>
+            <a:ext cx="4670612" cy="1"/>
+          </a:xfrm>
+          <a:prstGeom prst="straightConnector1">
+            <a:avLst/>
+          </a:prstGeom>
+          <a:ln w="57150">
+            <a:tailEnd type="triangle"/>
+          </a:ln>
+        </p:spPr>
+        <p:style>
+          <a:lnRef idx="1">
+            <a:schemeClr val="dk1"/>
+          </a:lnRef>
+          <a:fillRef idx="0">
+            <a:schemeClr val="dk1"/>
+          </a:fillRef>
+          <a:effectRef idx="0">
+            <a:schemeClr val="dk1"/>
+          </a:effectRef>
+          <a:fontRef idx="minor">
+            <a:schemeClr val="tx1"/>
+          </a:fontRef>
+        </p:style>
+      </p:cxnSp>
+      <p:sp>
+        <p:nvSpPr>
+          <p:cNvPr id="8" name="TextBox 7">
+            <a:extLst>
+              <a:ext uri="{FF2B5EF4-FFF2-40B4-BE49-F238E27FC236}">
+                <a16:creationId xmlns:a16="http://schemas.microsoft.com/office/drawing/2014/main" id="{93D5381B-DA8B-4000-8F36-C1AEB4372D46}"/>
+              </a:ext>
+            </a:extLst>
+          </p:cNvPr>
+          <p:cNvSpPr txBox="1"/>
+          <p:nvPr/>
+        </p:nvSpPr>
+        <p:spPr>
+          <a:xfrm>
+            <a:off x="3886200" y="966119"/>
+            <a:ext cx="815788" cy="584775"/>
+          </a:xfrm>
+          <a:prstGeom prst="rect">
+            <a:avLst/>
+          </a:prstGeom>
+          <a:noFill/>
+        </p:spPr>
+        <p:txBody>
+          <a:bodyPr wrap="square" rtlCol="0">
+            <a:spAutoFit/>
+          </a:bodyPr>
+          <a:lstStyle/>
+          <a:p>
+            <a:r>
+              <a:rPr lang="el-GR" sz="3200" b="1"/>
+              <a:t>σ</a:t>
+            </a:r>
+            <a:endParaRPr lang="en-IN" sz="3200" b="1"/>
+          </a:p>
+        </p:txBody>
+      </p:sp>
+      <p:sp>
+        <p:nvSpPr>
+          <p:cNvPr id="9" name="TextBox 8">
+            <a:extLst>
+              <a:ext uri="{FF2B5EF4-FFF2-40B4-BE49-F238E27FC236}">
+                <a16:creationId xmlns:a16="http://schemas.microsoft.com/office/drawing/2014/main" id="{152DAFAD-C296-47F1-BD5B-E43A4C981D21}"/>
+              </a:ext>
+            </a:extLst>
+          </p:cNvPr>
+          <p:cNvSpPr txBox="1"/>
+          <p:nvPr/>
+        </p:nvSpPr>
+        <p:spPr>
+          <a:xfrm>
+            <a:off x="8644218" y="4987822"/>
+            <a:ext cx="815786" cy="584775"/>
+          </a:xfrm>
+          <a:prstGeom prst="rect">
+            <a:avLst/>
+          </a:prstGeom>
+          <a:noFill/>
+        </p:spPr>
+        <p:txBody>
+          <a:bodyPr wrap="square" rtlCol="0">
+            <a:spAutoFit/>
+          </a:bodyPr>
+          <a:lstStyle/>
+          <a:p>
+            <a:r>
+              <a:rPr lang="el-GR" sz="3200" b="1"/>
+              <a:t>ε</a:t>
+            </a:r>
+            <a:endParaRPr lang="en-IN" sz="3200" b="1"/>
+          </a:p>
+        </p:txBody>
+      </p:sp>
+      <p:cxnSp>
+        <p:nvCxnSpPr>
+          <p:cNvPr id="4" name="Straight Connector 3">
+            <a:extLst>
+              <a:ext uri="{FF2B5EF4-FFF2-40B4-BE49-F238E27FC236}">
+                <a16:creationId xmlns:a16="http://schemas.microsoft.com/office/drawing/2014/main" id="{D94E8BE2-FF41-44DC-AFBE-94E1B3EACD7C}"/>
+              </a:ext>
+            </a:extLst>
+          </p:cNvPr>
+          <p:cNvCxnSpPr>
+            <a:cxnSpLocks/>
+          </p:cNvCxnSpPr>
+          <p:nvPr/>
+        </p:nvCxnSpPr>
+        <p:spPr>
+          <a:xfrm flipV="1">
+            <a:off x="4114801" y="2303929"/>
+            <a:ext cx="0" cy="3003176"/>
+          </a:xfrm>
+          <a:prstGeom prst="line">
+            <a:avLst/>
+          </a:prstGeom>
+          <a:ln w="57150"/>
+        </p:spPr>
+        <p:style>
+          <a:lnRef idx="1">
+            <a:schemeClr val="accent1"/>
+          </a:lnRef>
+          <a:fillRef idx="0">
+            <a:schemeClr val="accent1"/>
+          </a:fillRef>
+          <a:effectRef idx="0">
+            <a:schemeClr val="accent1"/>
+          </a:effectRef>
+          <a:fontRef idx="minor">
+            <a:schemeClr val="tx1"/>
+          </a:fontRef>
+        </p:style>
+      </p:cxnSp>
+      <p:sp>
+        <p:nvSpPr>
+          <p:cNvPr id="11" name="TextBox 10">
+            <a:extLst>
+              <a:ext uri="{FF2B5EF4-FFF2-40B4-BE49-F238E27FC236}">
+                <a16:creationId xmlns:a16="http://schemas.microsoft.com/office/drawing/2014/main" id="{ACD4898E-FBA9-4CC9-BA90-09372955CA51}"/>
+              </a:ext>
+            </a:extLst>
+          </p:cNvPr>
+          <p:cNvSpPr txBox="1"/>
+          <p:nvPr/>
+        </p:nvSpPr>
+        <p:spPr>
+          <a:xfrm>
+            <a:off x="4447615" y="5342527"/>
+            <a:ext cx="3801035" cy="646331"/>
+          </a:xfrm>
+          <a:prstGeom prst="rect">
+            <a:avLst/>
+          </a:prstGeom>
+          <a:noFill/>
+        </p:spPr>
+        <p:txBody>
+          <a:bodyPr wrap="square" rtlCol="0">
+            <a:spAutoFit/>
+          </a:bodyPr>
+          <a:lstStyle/>
+          <a:p>
+            <a:pPr algn="ctr"/>
+            <a:r>
+              <a:rPr lang="en-IN" sz="3600" b="1"/>
+              <a:t>Ideal Rigid</a:t>
+            </a:r>
+          </a:p>
+        </p:txBody>
+      </p:sp>
+    </p:spTree>
+    <p:extLst>
+      <p:ext uri="{BB962C8B-B14F-4D97-AF65-F5344CB8AC3E}">
+        <p14:creationId xmlns:p14="http://schemas.microsoft.com/office/powerpoint/2010/main" val="2771416912"/>
+      </p:ext>
+    </p:extLst>
+  </p:cSld>
+  <p:clrMapOvr>
+    <a:masterClrMapping/>
+  </p:clrMapOvr>
+</p:sld>
+</file>
+
+<file path=ppt/slides/slide8.xml><?xml version="1.0" encoding="utf-8"?>
+<p:sld xmlns:a="http://schemas.openxmlformats.org/drawingml/2006/main" xmlns:r="http://schemas.openxmlformats.org/officeDocument/2006/relationships" xmlns:p="http://schemas.openxmlformats.org/presentationml/2006/main">
+  <p:cSld>
+    <p:spTree>
+      <p:nvGrpSpPr>
+        <p:cNvPr id="1" name=""/>
+        <p:cNvGrpSpPr/>
+        <p:nvPr/>
+      </p:nvGrpSpPr>
+      <p:grpSpPr>
+        <a:xfrm>
+          <a:off x="0" y="0"/>
+          <a:ext cx="0" cy="0"/>
+          <a:chOff x="0" y="0"/>
+          <a:chExt cx="0" cy="0"/>
+        </a:xfrm>
+      </p:grpSpPr>
+      <p:cxnSp>
+        <p:nvCxnSpPr>
+          <p:cNvPr id="5" name="Straight Arrow Connector 4">
+            <a:extLst>
+              <a:ext uri="{FF2B5EF4-FFF2-40B4-BE49-F238E27FC236}">
+                <a16:creationId xmlns:a16="http://schemas.microsoft.com/office/drawing/2014/main" id="{559850C6-6BB8-47AE-B4F4-B25D30AD45C0}"/>
+              </a:ext>
+            </a:extLst>
+          </p:cNvPr>
+          <p:cNvCxnSpPr/>
+          <p:nvPr/>
+        </p:nvCxnSpPr>
+        <p:spPr>
+          <a:xfrm flipV="1">
+            <a:off x="4078941" y="1461247"/>
+            <a:ext cx="0" cy="3845859"/>
+          </a:xfrm>
+          <a:prstGeom prst="straightConnector1">
+            <a:avLst/>
+          </a:prstGeom>
+          <a:ln w="57150">
+            <a:tailEnd type="triangle"/>
+          </a:ln>
+        </p:spPr>
+        <p:style>
+          <a:lnRef idx="1">
+            <a:schemeClr val="dk1"/>
+          </a:lnRef>
+          <a:fillRef idx="0">
+            <a:schemeClr val="dk1"/>
+          </a:fillRef>
+          <a:effectRef idx="0">
+            <a:schemeClr val="dk1"/>
+          </a:effectRef>
+          <a:fontRef idx="minor">
+            <a:schemeClr val="tx1"/>
+          </a:fontRef>
+        </p:style>
+      </p:cxnSp>
+      <p:cxnSp>
+        <p:nvCxnSpPr>
+          <p:cNvPr id="6" name="Straight Arrow Connector 5">
+            <a:extLst>
+              <a:ext uri="{FF2B5EF4-FFF2-40B4-BE49-F238E27FC236}">
+                <a16:creationId xmlns:a16="http://schemas.microsoft.com/office/drawing/2014/main" id="{1A1D26B7-5172-4FC0-BB52-5D87AC6E26DF}"/>
+              </a:ext>
+            </a:extLst>
+          </p:cNvPr>
+          <p:cNvCxnSpPr>
+            <a:cxnSpLocks/>
+          </p:cNvCxnSpPr>
+          <p:nvPr/>
+        </p:nvCxnSpPr>
+        <p:spPr>
+          <a:xfrm flipV="1">
+            <a:off x="4052046" y="5307105"/>
+            <a:ext cx="4670612" cy="1"/>
+          </a:xfrm>
+          <a:prstGeom prst="straightConnector1">
+            <a:avLst/>
+          </a:prstGeom>
+          <a:ln w="57150">
+            <a:tailEnd type="triangle"/>
+          </a:ln>
+        </p:spPr>
+        <p:style>
+          <a:lnRef idx="1">
+            <a:schemeClr val="dk1"/>
+          </a:lnRef>
+          <a:fillRef idx="0">
+            <a:schemeClr val="dk1"/>
+          </a:fillRef>
+          <a:effectRef idx="0">
+            <a:schemeClr val="dk1"/>
+          </a:effectRef>
+          <a:fontRef idx="minor">
+            <a:schemeClr val="tx1"/>
+          </a:fontRef>
+        </p:style>
+      </p:cxnSp>
+      <p:sp>
+        <p:nvSpPr>
+          <p:cNvPr id="8" name="TextBox 7">
+            <a:extLst>
+              <a:ext uri="{FF2B5EF4-FFF2-40B4-BE49-F238E27FC236}">
+                <a16:creationId xmlns:a16="http://schemas.microsoft.com/office/drawing/2014/main" id="{93D5381B-DA8B-4000-8F36-C1AEB4372D46}"/>
+              </a:ext>
+            </a:extLst>
+          </p:cNvPr>
+          <p:cNvSpPr txBox="1"/>
+          <p:nvPr/>
+        </p:nvSpPr>
+        <p:spPr>
+          <a:xfrm>
+            <a:off x="3886200" y="966119"/>
+            <a:ext cx="815788" cy="584775"/>
+          </a:xfrm>
+          <a:prstGeom prst="rect">
+            <a:avLst/>
+          </a:prstGeom>
+          <a:noFill/>
+        </p:spPr>
+        <p:txBody>
+          <a:bodyPr wrap="square" rtlCol="0">
+            <a:spAutoFit/>
+          </a:bodyPr>
+          <a:lstStyle/>
+          <a:p>
+            <a:r>
+              <a:rPr lang="el-GR" sz="3200" b="1"/>
+              <a:t>σ</a:t>
+            </a:r>
+            <a:endParaRPr lang="en-IN" sz="3200" b="1"/>
+          </a:p>
+        </p:txBody>
+      </p:sp>
+      <p:sp>
+        <p:nvSpPr>
+          <p:cNvPr id="9" name="TextBox 8">
+            <a:extLst>
+              <a:ext uri="{FF2B5EF4-FFF2-40B4-BE49-F238E27FC236}">
+                <a16:creationId xmlns:a16="http://schemas.microsoft.com/office/drawing/2014/main" id="{152DAFAD-C296-47F1-BD5B-E43A4C981D21}"/>
+              </a:ext>
+            </a:extLst>
+          </p:cNvPr>
+          <p:cNvSpPr txBox="1"/>
+          <p:nvPr/>
+        </p:nvSpPr>
+        <p:spPr>
+          <a:xfrm>
+            <a:off x="8644218" y="4987822"/>
+            <a:ext cx="815786" cy="584775"/>
+          </a:xfrm>
+          <a:prstGeom prst="rect">
+            <a:avLst/>
+          </a:prstGeom>
+          <a:noFill/>
+        </p:spPr>
+        <p:txBody>
+          <a:bodyPr wrap="square" rtlCol="0">
+            <a:spAutoFit/>
+          </a:bodyPr>
+          <a:lstStyle/>
+          <a:p>
+            <a:r>
+              <a:rPr lang="el-GR" sz="3200" b="1"/>
+              <a:t>ε</a:t>
+            </a:r>
+            <a:endParaRPr lang="en-IN" sz="3200" b="1"/>
+          </a:p>
+        </p:txBody>
+      </p:sp>
+      <p:cxnSp>
+        <p:nvCxnSpPr>
+          <p:cNvPr id="4" name="Straight Connector 3">
+            <a:extLst>
+              <a:ext uri="{FF2B5EF4-FFF2-40B4-BE49-F238E27FC236}">
+                <a16:creationId xmlns:a16="http://schemas.microsoft.com/office/drawing/2014/main" id="{D94E8BE2-FF41-44DC-AFBE-94E1B3EACD7C}"/>
+              </a:ext>
+            </a:extLst>
+          </p:cNvPr>
+          <p:cNvCxnSpPr>
+            <a:cxnSpLocks/>
+          </p:cNvCxnSpPr>
+          <p:nvPr/>
+        </p:nvCxnSpPr>
+        <p:spPr>
+          <a:xfrm>
+            <a:off x="4078941" y="5262280"/>
+            <a:ext cx="3227294" cy="0"/>
+          </a:xfrm>
+          <a:prstGeom prst="line">
+            <a:avLst/>
+          </a:prstGeom>
+          <a:ln w="57150"/>
+        </p:spPr>
+        <p:style>
+          <a:lnRef idx="1">
+            <a:schemeClr val="accent1"/>
+          </a:lnRef>
+          <a:fillRef idx="0">
+            <a:schemeClr val="accent1"/>
+          </a:fillRef>
+          <a:effectRef idx="0">
+            <a:schemeClr val="accent1"/>
+          </a:effectRef>
+          <a:fontRef idx="minor">
+            <a:schemeClr val="tx1"/>
+          </a:fontRef>
+        </p:style>
+      </p:cxnSp>
+      <p:sp>
+        <p:nvSpPr>
+          <p:cNvPr id="11" name="TextBox 10">
+            <a:extLst>
+              <a:ext uri="{FF2B5EF4-FFF2-40B4-BE49-F238E27FC236}">
+                <a16:creationId xmlns:a16="http://schemas.microsoft.com/office/drawing/2014/main" id="{3DF74E29-85D8-4AAB-B391-0D47929A4402}"/>
+              </a:ext>
+            </a:extLst>
+          </p:cNvPr>
+          <p:cNvSpPr txBox="1"/>
+          <p:nvPr/>
+        </p:nvSpPr>
+        <p:spPr>
+          <a:xfrm>
+            <a:off x="4447615" y="5342527"/>
+            <a:ext cx="3801035" cy="646331"/>
+          </a:xfrm>
+          <a:prstGeom prst="rect">
+            <a:avLst/>
+          </a:prstGeom>
+          <a:noFill/>
+        </p:spPr>
+        <p:txBody>
+          <a:bodyPr wrap="square" rtlCol="0">
+            <a:spAutoFit/>
+          </a:bodyPr>
+          <a:lstStyle/>
+          <a:p>
+            <a:pPr algn="ctr"/>
+            <a:r>
+              <a:rPr lang="en-IN" sz="3600" b="1"/>
+              <a:t>Ideal fluid</a:t>
+            </a:r>
+          </a:p>
+        </p:txBody>
+      </p:sp>
+    </p:spTree>
+    <p:extLst>
+      <p:ext uri="{BB962C8B-B14F-4D97-AF65-F5344CB8AC3E}">
+        <p14:creationId xmlns:p14="http://schemas.microsoft.com/office/powerpoint/2010/main" val="3822626496"/>
+      </p:ext>
+    </p:extLst>
+  </p:cSld>
+  <p:clrMapOvr>
+    <a:masterClrMapping/>
+  </p:clrMapOvr>
+</p:sld>
+</file>
+
+<file path=ppt/slides/slide9.xml><?xml version="1.0" encoding="utf-8"?>
+<p:sld xmlns:a="http://schemas.openxmlformats.org/drawingml/2006/main" xmlns:r="http://schemas.openxmlformats.org/officeDocument/2006/relationships" xmlns:p="http://schemas.openxmlformats.org/presentationml/2006/main">
+  <p:cSld>
+    <p:spTree>
+      <p:nvGrpSpPr>
+        <p:cNvPr id="1" name=""/>
+        <p:cNvGrpSpPr/>
+        <p:nvPr/>
+      </p:nvGrpSpPr>
+      <p:grpSpPr>
+        <a:xfrm>
+          <a:off x="0" y="0"/>
+          <a:ext cx="0" cy="0"/>
+          <a:chOff x="0" y="0"/>
+          <a:chExt cx="0" cy="0"/>
+        </a:xfrm>
+      </p:grpSpPr>
+      <p:sp>
+        <p:nvSpPr>
+          <p:cNvPr id="2" name="Rectangle 1">
+            <a:extLst>
+              <a:ext uri="{FF2B5EF4-FFF2-40B4-BE49-F238E27FC236}">
+                <a16:creationId xmlns:a16="http://schemas.microsoft.com/office/drawing/2014/main" id="{3F39828E-309D-475D-8EDD-85319F831189}"/>
+              </a:ext>
+            </a:extLst>
+          </p:cNvPr>
+          <p:cNvSpPr/>
+          <p:nvPr/>
+        </p:nvSpPr>
+        <p:spPr>
+          <a:xfrm>
+            <a:off x="3218329" y="2227729"/>
+            <a:ext cx="5396753" cy="2402541"/>
+          </a:xfrm>
+          <a:prstGeom prst="rect">
+            <a:avLst/>
+          </a:prstGeom>
+          <a:ln w="76200">
+            <a:prstDash val="sysDash"/>
+          </a:ln>
+        </p:spPr>
+        <p:style>
+          <a:lnRef idx="2">
+            <a:schemeClr val="accent1">
+              <a:shade val="50000"/>
+            </a:schemeClr>
+          </a:lnRef>
+          <a:fillRef idx="1">
+            <a:schemeClr val="accent1"/>
+          </a:fillRef>
+          <a:effectRef idx="0">
+            <a:schemeClr val="accent1"/>
+          </a:effectRef>
+          <a:fontRef idx="minor">
+            <a:schemeClr val="lt1"/>
+          </a:fontRef>
+        </p:style>
+        <p:txBody>
+          <a:bodyPr rtlCol="0" anchor="ctr"/>
+          <a:lstStyle/>
+          <a:p>
+            <a:pPr algn="ctr"/>
+            <a:endParaRPr lang="en-IN"/>
+          </a:p>
+        </p:txBody>
+      </p:sp>
+      <p:sp>
+        <p:nvSpPr>
+          <p:cNvPr id="3" name="Parallelogram 2">
+            <a:extLst>
+              <a:ext uri="{FF2B5EF4-FFF2-40B4-BE49-F238E27FC236}">
+                <a16:creationId xmlns:a16="http://schemas.microsoft.com/office/drawing/2014/main" id="{D9FB0BCF-0610-4E52-AB9B-E2D33D2C1A47}"/>
+              </a:ext>
+            </a:extLst>
+          </p:cNvPr>
+          <p:cNvSpPr/>
+          <p:nvPr/>
+        </p:nvSpPr>
+        <p:spPr>
+          <a:xfrm>
+            <a:off x="3218329" y="2227729"/>
+            <a:ext cx="7010400" cy="2402541"/>
+          </a:xfrm>
+          <a:prstGeom prst="parallelogram">
+            <a:avLst>
+              <a:gd name="adj" fmla="val 66045"/>
+            </a:avLst>
+          </a:prstGeom>
+          <a:ln w="76200">
+            <a:prstDash val="sysDash"/>
+          </a:ln>
+        </p:spPr>
+        <p:style>
+          <a:lnRef idx="2">
+            <a:schemeClr val="accent6">
+              <a:shade val="50000"/>
+            </a:schemeClr>
+          </a:lnRef>
+          <a:fillRef idx="1">
+            <a:schemeClr val="accent6"/>
+          </a:fillRef>
+          <a:effectRef idx="0">
+            <a:schemeClr val="accent6"/>
+          </a:effectRef>
+          <a:fontRef idx="minor">
+            <a:schemeClr val="lt1"/>
+          </a:fontRef>
+        </p:style>
+        <p:txBody>
+          <a:bodyPr rtlCol="0" anchor="ctr"/>
+          <a:lstStyle/>
+          <a:p>
+            <a:pPr algn="ctr"/>
+            <a:endParaRPr lang="en-IN"/>
+          </a:p>
+        </p:txBody>
+      </p:sp>
+      <p:sp>
+        <p:nvSpPr>
+          <p:cNvPr id="12" name="Arc 11">
+            <a:extLst>
+              <a:ext uri="{FF2B5EF4-FFF2-40B4-BE49-F238E27FC236}">
+                <a16:creationId xmlns:a16="http://schemas.microsoft.com/office/drawing/2014/main" id="{D88B0B5C-5BAF-4699-9A64-1B0361A5BA90}"/>
+              </a:ext>
+            </a:extLst>
+          </p:cNvPr>
+          <p:cNvSpPr/>
+          <p:nvPr/>
+        </p:nvSpPr>
+        <p:spPr>
+          <a:xfrm>
+            <a:off x="2725271" y="3693459"/>
+            <a:ext cx="1030941" cy="125506"/>
+          </a:xfrm>
+          <a:prstGeom prst="arc">
+            <a:avLst/>
+          </a:prstGeom>
+          <a:ln w="76200"/>
+        </p:spPr>
+        <p:style>
+          <a:lnRef idx="1">
+            <a:schemeClr val="dk1"/>
+          </a:lnRef>
+          <a:fillRef idx="0">
+            <a:schemeClr val="dk1"/>
+          </a:fillRef>
+          <a:effectRef idx="0">
+            <a:schemeClr val="dk1"/>
+          </a:effectRef>
+          <a:fontRef idx="minor">
+            <a:schemeClr val="tx1"/>
+          </a:fontRef>
+        </p:style>
+        <p:txBody>
+          <a:bodyPr rtlCol="0" anchor="ctr"/>
+          <a:lstStyle/>
+          <a:p>
+            <a:pPr algn="ctr"/>
+            <a:endParaRPr lang="en-IN"/>
+          </a:p>
+        </p:txBody>
+      </p:sp>
+      <p:sp>
+        <p:nvSpPr>
+          <p:cNvPr id="13" name="TextBox 12">
+            <a:extLst>
+              <a:ext uri="{FF2B5EF4-FFF2-40B4-BE49-F238E27FC236}">
+                <a16:creationId xmlns:a16="http://schemas.microsoft.com/office/drawing/2014/main" id="{836F325D-041B-4EB5-AED9-F7CFBF45E584}"/>
+              </a:ext>
+            </a:extLst>
+          </p:cNvPr>
+          <p:cNvSpPr txBox="1"/>
+          <p:nvPr/>
+        </p:nvSpPr>
+        <p:spPr>
+          <a:xfrm>
+            <a:off x="3343835" y="3074895"/>
+            <a:ext cx="528918" cy="584775"/>
+          </a:xfrm>
+          <a:prstGeom prst="rect">
+            <a:avLst/>
+          </a:prstGeom>
+          <a:noFill/>
+        </p:spPr>
+        <p:txBody>
+          <a:bodyPr wrap="square" rtlCol="0">
+            <a:spAutoFit/>
+          </a:bodyPr>
+          <a:lstStyle/>
+          <a:p>
+            <a:r>
+              <a:rPr lang="en-IN" sz="3200" b="1"/>
+              <a:t>φ</a:t>
+            </a:r>
+          </a:p>
+        </p:txBody>
+      </p:sp>
+      <p:cxnSp>
+        <p:nvCxnSpPr>
+          <p:cNvPr id="16" name="Straight Connector 15">
+            <a:extLst>
+              <a:ext uri="{FF2B5EF4-FFF2-40B4-BE49-F238E27FC236}">
+                <a16:creationId xmlns:a16="http://schemas.microsoft.com/office/drawing/2014/main" id="{6461333B-7168-4CB3-8344-C97DD6D29206}"/>
+              </a:ext>
+            </a:extLst>
+          </p:cNvPr>
+          <p:cNvCxnSpPr/>
+          <p:nvPr/>
+        </p:nvCxnSpPr>
+        <p:spPr>
+          <a:xfrm>
+            <a:off x="3218329" y="1801906"/>
+            <a:ext cx="1550895" cy="0"/>
+          </a:xfrm>
+          <a:prstGeom prst="line">
+            <a:avLst/>
+          </a:prstGeom>
+          <a:ln w="38100"/>
+        </p:spPr>
+        <p:style>
+          <a:lnRef idx="1">
+            <a:schemeClr val="dk1"/>
+          </a:lnRef>
+          <a:fillRef idx="0">
+            <a:schemeClr val="dk1"/>
+          </a:fillRef>
+          <a:effectRef idx="0">
+            <a:schemeClr val="dk1"/>
+          </a:effectRef>
+          <a:fontRef idx="minor">
+            <a:schemeClr val="tx1"/>
+          </a:fontRef>
+        </p:style>
+      </p:cxnSp>
+      <p:cxnSp>
+        <p:nvCxnSpPr>
+          <p:cNvPr id="17" name="Straight Connector 16">
+            <a:extLst>
+              <a:ext uri="{FF2B5EF4-FFF2-40B4-BE49-F238E27FC236}">
+                <a16:creationId xmlns:a16="http://schemas.microsoft.com/office/drawing/2014/main" id="{FDD0C7C7-AAB7-463E-918D-E95AD09075A3}"/>
+              </a:ext>
+            </a:extLst>
+          </p:cNvPr>
+          <p:cNvCxnSpPr>
+            <a:cxnSpLocks/>
+          </p:cNvCxnSpPr>
+          <p:nvPr/>
+        </p:nvCxnSpPr>
+        <p:spPr>
+          <a:xfrm>
+            <a:off x="3218329" y="1649506"/>
+            <a:ext cx="0" cy="336179"/>
+          </a:xfrm>
+          <a:prstGeom prst="line">
+            <a:avLst/>
+          </a:prstGeom>
+          <a:ln w="38100"/>
+        </p:spPr>
+        <p:style>
+          <a:lnRef idx="1">
+            <a:schemeClr val="dk1"/>
+          </a:lnRef>
+          <a:fillRef idx="0">
+            <a:schemeClr val="dk1"/>
+          </a:fillRef>
+          <a:effectRef idx="0">
+            <a:schemeClr val="dk1"/>
+          </a:effectRef>
+          <a:fontRef idx="minor">
+            <a:schemeClr val="tx1"/>
+          </a:fontRef>
+        </p:style>
+      </p:cxnSp>
+      <p:cxnSp>
+        <p:nvCxnSpPr>
+          <p:cNvPr id="18" name="Straight Connector 17">
+            <a:extLst>
+              <a:ext uri="{FF2B5EF4-FFF2-40B4-BE49-F238E27FC236}">
+                <a16:creationId xmlns:a16="http://schemas.microsoft.com/office/drawing/2014/main" id="{A24EB3EA-CCD8-4C75-BE53-FB5581E06B28}"/>
+              </a:ext>
+            </a:extLst>
+          </p:cNvPr>
+          <p:cNvCxnSpPr>
+            <a:cxnSpLocks/>
+          </p:cNvCxnSpPr>
+          <p:nvPr/>
+        </p:nvCxnSpPr>
+        <p:spPr>
+          <a:xfrm>
+            <a:off x="4769224" y="1641059"/>
+            <a:ext cx="0" cy="321693"/>
+          </a:xfrm>
+          <a:prstGeom prst="line">
+            <a:avLst/>
+          </a:prstGeom>
+          <a:ln w="38100"/>
+        </p:spPr>
+        <p:style>
+          <a:lnRef idx="1">
+            <a:schemeClr val="dk1"/>
+          </a:lnRef>
+          <a:fillRef idx="0">
+            <a:schemeClr val="dk1"/>
+          </a:fillRef>
+          <a:effectRef idx="0">
+            <a:schemeClr val="dk1"/>
+          </a:effectRef>
+          <a:fontRef idx="minor">
+            <a:schemeClr val="tx1"/>
+          </a:fontRef>
+        </p:style>
+      </p:cxnSp>
+      <p:sp>
+        <p:nvSpPr>
+          <p:cNvPr id="14" name="TextBox 13">
+            <a:extLst>
+              <a:ext uri="{FF2B5EF4-FFF2-40B4-BE49-F238E27FC236}">
+                <a16:creationId xmlns:a16="http://schemas.microsoft.com/office/drawing/2014/main" id="{641F2BF1-9FBF-4DF5-835E-6B8702DFA731}"/>
+              </a:ext>
+            </a:extLst>
+          </p:cNvPr>
+          <p:cNvSpPr txBox="1"/>
+          <p:nvPr/>
+        </p:nvSpPr>
+        <p:spPr>
+          <a:xfrm>
+            <a:off x="3801033" y="1299023"/>
+            <a:ext cx="528918" cy="584775"/>
+          </a:xfrm>
+          <a:prstGeom prst="rect">
+            <a:avLst/>
+          </a:prstGeom>
+          <a:noFill/>
+        </p:spPr>
+        <p:txBody>
+          <a:bodyPr wrap="square" rtlCol="0">
+            <a:spAutoFit/>
+          </a:bodyPr>
+          <a:lstStyle/>
+          <a:p>
+            <a:r>
+              <a:rPr lang="en-IN" sz="3200" b="1"/>
+              <a:t>Δ</a:t>
+            </a:r>
+          </a:p>
+        </p:txBody>
+      </p:sp>
+      <p:cxnSp>
+        <p:nvCxnSpPr>
+          <p:cNvPr id="21" name="Straight Connector 20">
+            <a:extLst>
+              <a:ext uri="{FF2B5EF4-FFF2-40B4-BE49-F238E27FC236}">
+                <a16:creationId xmlns:a16="http://schemas.microsoft.com/office/drawing/2014/main" id="{6EDD43EE-718C-4466-AC47-78BE2AC45967}"/>
+              </a:ext>
+            </a:extLst>
+          </p:cNvPr>
+          <p:cNvCxnSpPr>
+            <a:cxnSpLocks/>
+          </p:cNvCxnSpPr>
+          <p:nvPr/>
+        </p:nvCxnSpPr>
+        <p:spPr>
+          <a:xfrm>
+            <a:off x="2859741" y="2227728"/>
+            <a:ext cx="0" cy="2402541"/>
+          </a:xfrm>
+          <a:prstGeom prst="line">
+            <a:avLst/>
+          </a:prstGeom>
+          <a:ln w="38100"/>
+        </p:spPr>
+        <p:style>
+          <a:lnRef idx="1">
+            <a:schemeClr val="dk1"/>
+          </a:lnRef>
+          <a:fillRef idx="0">
+            <a:schemeClr val="dk1"/>
+          </a:fillRef>
+          <a:effectRef idx="0">
+            <a:schemeClr val="dk1"/>
+          </a:effectRef>
+          <a:fontRef idx="minor">
+            <a:schemeClr val="tx1"/>
+          </a:fontRef>
+        </p:style>
+      </p:cxnSp>
+      <p:cxnSp>
+        <p:nvCxnSpPr>
+          <p:cNvPr id="22" name="Straight Connector 21">
+            <a:extLst>
+              <a:ext uri="{FF2B5EF4-FFF2-40B4-BE49-F238E27FC236}">
+                <a16:creationId xmlns:a16="http://schemas.microsoft.com/office/drawing/2014/main" id="{C5AEE280-275E-461F-8F9F-2C19FC78DE92}"/>
+              </a:ext>
+            </a:extLst>
+          </p:cNvPr>
+          <p:cNvCxnSpPr>
+            <a:cxnSpLocks/>
+          </p:cNvCxnSpPr>
+          <p:nvPr/>
+        </p:nvCxnSpPr>
+        <p:spPr>
+          <a:xfrm flipH="1">
+            <a:off x="2675965" y="2227728"/>
+            <a:ext cx="367552" cy="0"/>
+          </a:xfrm>
+          <a:prstGeom prst="line">
+            <a:avLst/>
+          </a:prstGeom>
+          <a:ln w="38100"/>
+        </p:spPr>
+        <p:style>
+          <a:lnRef idx="1">
+            <a:schemeClr val="dk1"/>
+          </a:lnRef>
+          <a:fillRef idx="0">
+            <a:schemeClr val="dk1"/>
+          </a:fillRef>
+          <a:effectRef idx="0">
+            <a:schemeClr val="dk1"/>
+          </a:effectRef>
+          <a:fontRef idx="minor">
+            <a:schemeClr val="tx1"/>
+          </a:fontRef>
+        </p:style>
+      </p:cxnSp>
+      <p:cxnSp>
+        <p:nvCxnSpPr>
+          <p:cNvPr id="23" name="Straight Connector 22">
+            <a:extLst>
+              <a:ext uri="{FF2B5EF4-FFF2-40B4-BE49-F238E27FC236}">
+                <a16:creationId xmlns:a16="http://schemas.microsoft.com/office/drawing/2014/main" id="{7DC703F6-816F-447D-86F9-4F9BD26CBA8A}"/>
+              </a:ext>
+            </a:extLst>
+          </p:cNvPr>
+          <p:cNvCxnSpPr>
+            <a:cxnSpLocks/>
+          </p:cNvCxnSpPr>
+          <p:nvPr/>
+        </p:nvCxnSpPr>
+        <p:spPr>
+          <a:xfrm flipH="1">
+            <a:off x="2693894" y="4618547"/>
+            <a:ext cx="331693" cy="0"/>
+          </a:xfrm>
+          <a:prstGeom prst="line">
+            <a:avLst/>
+          </a:prstGeom>
+          <a:ln w="38100"/>
+        </p:spPr>
+        <p:style>
+          <a:lnRef idx="1">
+            <a:schemeClr val="dk1"/>
+          </a:lnRef>
+          <a:fillRef idx="0">
+            <a:schemeClr val="dk1"/>
+          </a:fillRef>
+          <a:effectRef idx="0">
+            <a:schemeClr val="dk1"/>
+          </a:effectRef>
+          <a:fontRef idx="minor">
+            <a:schemeClr val="tx1"/>
+          </a:fontRef>
+        </p:style>
+      </p:cxnSp>
+      <p:sp>
+        <p:nvSpPr>
+          <p:cNvPr id="29" name="TextBox 28">
+            <a:extLst>
+              <a:ext uri="{FF2B5EF4-FFF2-40B4-BE49-F238E27FC236}">
+                <a16:creationId xmlns:a16="http://schemas.microsoft.com/office/drawing/2014/main" id="{83992D45-0FD7-465D-A186-1BA4CE8A4D74}"/>
+              </a:ext>
+            </a:extLst>
+          </p:cNvPr>
+          <p:cNvSpPr txBox="1"/>
+          <p:nvPr/>
+        </p:nvSpPr>
+        <p:spPr>
+          <a:xfrm>
+            <a:off x="2362199" y="3001281"/>
+            <a:ext cx="528918" cy="584775"/>
+          </a:xfrm>
+          <a:prstGeom prst="rect">
+            <a:avLst/>
+          </a:prstGeom>
+          <a:noFill/>
+        </p:spPr>
+        <p:txBody>
+          <a:bodyPr wrap="square" rtlCol="0">
+            <a:spAutoFit/>
+          </a:bodyPr>
+          <a:lstStyle/>
+          <a:p>
+            <a:r>
+              <a:rPr lang="en-IN" sz="3200" b="1"/>
+              <a:t>h</a:t>
+            </a:r>
+          </a:p>
+        </p:txBody>
+      </p:sp>
+      <p:cxnSp>
+        <p:nvCxnSpPr>
+          <p:cNvPr id="31" name="Straight Connector 30">
+            <a:extLst>
+              <a:ext uri="{FF2B5EF4-FFF2-40B4-BE49-F238E27FC236}">
+                <a16:creationId xmlns:a16="http://schemas.microsoft.com/office/drawing/2014/main" id="{EA7B9C19-E131-4F86-A7F9-5E937459ECA1}"/>
+              </a:ext>
+            </a:extLst>
+          </p:cNvPr>
+          <p:cNvCxnSpPr/>
+          <p:nvPr/>
+        </p:nvCxnSpPr>
+        <p:spPr>
+          <a:xfrm flipV="1">
+            <a:off x="8615082" y="2227728"/>
+            <a:ext cx="0" cy="2402541"/>
+          </a:xfrm>
+          <a:prstGeom prst="line">
+            <a:avLst/>
+          </a:prstGeom>
+          <a:ln w="76200">
+            <a:prstDash val="sysDash"/>
+          </a:ln>
+        </p:spPr>
+        <p:style>
+          <a:lnRef idx="1">
+            <a:schemeClr val="accent1"/>
+          </a:lnRef>
+          <a:fillRef idx="0">
+            <a:schemeClr val="accent1"/>
+          </a:fillRef>
+          <a:effectRef idx="0">
+            <a:schemeClr val="accent1"/>
+          </a:effectRef>
+          <a:fontRef idx="minor">
+            <a:schemeClr val="tx1"/>
+          </a:fontRef>
+        </p:style>
+      </p:cxnSp>
+    </p:spTree>
+    <p:extLst>
+      <p:ext uri="{BB962C8B-B14F-4D97-AF65-F5344CB8AC3E}">
+        <p14:creationId xmlns:p14="http://schemas.microsoft.com/office/powerpoint/2010/main" val="41101675"/>
+      </p:ext>
+    </p:extLst>
+  </p:cSld>
+  <p:clrMapOvr>
+    <a:masterClrMapping/>
+  </p:clrMapOvr>
+</p:sld>
+</file>
+
 <file path=ppt/theme/theme1.xml><?xml version="1.0" encoding="utf-8"?>
 <a:theme xmlns:a="http://schemas.openxmlformats.org/drawingml/2006/main" name="Office Theme">
   <a:themeElements>

</xml_diff>

<commit_message>
SOM lsn 3 added
</commit_message>
<xml_diff>
--- a/STRENGTH OF MATERIALS SHORTNOTES/SOM Revision.pptx
+++ b/STRENGTH OF MATERIALS SHORTNOTES/SOM Revision.pptx
@@ -16,6 +16,8 @@
     <p:sldId id="264" r:id="rId10"/>
     <p:sldId id="265" r:id="rId11"/>
     <p:sldId id="266" r:id="rId12"/>
+    <p:sldId id="267" r:id="rId13"/>
+    <p:sldId id="268" r:id="rId14"/>
   </p:sldIdLst>
   <p:sldSz cx="12192000" cy="6858000"/>
   <p:notesSz cx="6858000" cy="9144000"/>
@@ -7033,6 +7035,3414 @@
 </p:sld>
 </file>
 
+<file path=ppt/slides/slide12.xml><?xml version="1.0" encoding="utf-8"?>
+<p:sld xmlns:a="http://schemas.openxmlformats.org/drawingml/2006/main" xmlns:r="http://schemas.openxmlformats.org/officeDocument/2006/relationships" xmlns:p="http://schemas.openxmlformats.org/presentationml/2006/main">
+  <p:cSld>
+    <p:spTree>
+      <p:nvGrpSpPr>
+        <p:cNvPr id="1" name=""/>
+        <p:cNvGrpSpPr/>
+        <p:nvPr/>
+      </p:nvGrpSpPr>
+      <p:grpSpPr>
+        <a:xfrm>
+          <a:off x="0" y="0"/>
+          <a:ext cx="0" cy="0"/>
+          <a:chOff x="0" y="0"/>
+          <a:chExt cx="0" cy="0"/>
+        </a:xfrm>
+      </p:grpSpPr>
+      <p:pic>
+        <p:nvPicPr>
+          <p:cNvPr id="29" name="Picture 28">
+            <a:extLst>
+              <a:ext uri="{FF2B5EF4-FFF2-40B4-BE49-F238E27FC236}">
+                <a16:creationId xmlns:a16="http://schemas.microsoft.com/office/drawing/2014/main" id="{E8D19FE6-1F84-4631-BAD0-9FC17332F665}"/>
+              </a:ext>
+            </a:extLst>
+          </p:cNvPr>
+          <p:cNvPicPr>
+            <a:picLocks noChangeAspect="1"/>
+          </p:cNvPicPr>
+          <p:nvPr/>
+        </p:nvPicPr>
+        <p:blipFill>
+          <a:blip r:embed="rId2"/>
+          <a:stretch>
+            <a:fillRect/>
+          </a:stretch>
+        </p:blipFill>
+        <p:spPr>
+          <a:xfrm>
+            <a:off x="9601734" y="1658805"/>
+            <a:ext cx="2505537" cy="777929"/>
+          </a:xfrm>
+          <a:prstGeom prst="rect">
+            <a:avLst/>
+          </a:prstGeom>
+        </p:spPr>
+      </p:pic>
+      <p:pic>
+        <p:nvPicPr>
+          <p:cNvPr id="26" name="Picture 25">
+            <a:extLst>
+              <a:ext uri="{FF2B5EF4-FFF2-40B4-BE49-F238E27FC236}">
+                <a16:creationId xmlns:a16="http://schemas.microsoft.com/office/drawing/2014/main" id="{7F452594-51FE-4BA8-AE82-B000AE4C93D1}"/>
+              </a:ext>
+            </a:extLst>
+          </p:cNvPr>
+          <p:cNvPicPr>
+            <a:picLocks noChangeAspect="1"/>
+          </p:cNvPicPr>
+          <p:nvPr/>
+        </p:nvPicPr>
+        <p:blipFill>
+          <a:blip r:embed="rId3"/>
+          <a:stretch>
+            <a:fillRect/>
+          </a:stretch>
+        </p:blipFill>
+        <p:spPr>
+          <a:xfrm>
+            <a:off x="637788" y="1896442"/>
+            <a:ext cx="2431000" cy="797210"/>
+          </a:xfrm>
+          <a:prstGeom prst="rect">
+            <a:avLst/>
+          </a:prstGeom>
+        </p:spPr>
+      </p:pic>
+      <p:sp>
+        <p:nvSpPr>
+          <p:cNvPr id="8" name="TextBox 7">
+            <a:extLst>
+              <a:ext uri="{FF2B5EF4-FFF2-40B4-BE49-F238E27FC236}">
+                <a16:creationId xmlns:a16="http://schemas.microsoft.com/office/drawing/2014/main" id="{93D5381B-DA8B-4000-8F36-C1AEB4372D46}"/>
+              </a:ext>
+            </a:extLst>
+          </p:cNvPr>
+          <p:cNvSpPr txBox="1"/>
+          <p:nvPr/>
+        </p:nvSpPr>
+        <p:spPr>
+          <a:xfrm>
+            <a:off x="7264092" y="5304094"/>
+            <a:ext cx="815788" cy="584775"/>
+          </a:xfrm>
+          <a:prstGeom prst="rect">
+            <a:avLst/>
+          </a:prstGeom>
+          <a:noFill/>
+        </p:spPr>
+        <p:txBody>
+          <a:bodyPr wrap="square" rtlCol="0">
+            <a:spAutoFit/>
+          </a:bodyPr>
+          <a:lstStyle/>
+          <a:p>
+            <a:r>
+              <a:rPr lang="en-IN" sz="3200" b="1"/>
+              <a:t>y</a:t>
+            </a:r>
+          </a:p>
+        </p:txBody>
+      </p:sp>
+      <p:sp>
+        <p:nvSpPr>
+          <p:cNvPr id="9" name="TextBox 8">
+            <a:extLst>
+              <a:ext uri="{FF2B5EF4-FFF2-40B4-BE49-F238E27FC236}">
+                <a16:creationId xmlns:a16="http://schemas.microsoft.com/office/drawing/2014/main" id="{152DAFAD-C296-47F1-BD5B-E43A4C981D21}"/>
+              </a:ext>
+            </a:extLst>
+          </p:cNvPr>
+          <p:cNvSpPr txBox="1"/>
+          <p:nvPr/>
+        </p:nvSpPr>
+        <p:spPr>
+          <a:xfrm>
+            <a:off x="5104802" y="5106782"/>
+            <a:ext cx="815786" cy="584775"/>
+          </a:xfrm>
+          <a:prstGeom prst="rect">
+            <a:avLst/>
+          </a:prstGeom>
+          <a:noFill/>
+        </p:spPr>
+        <p:txBody>
+          <a:bodyPr wrap="square" rtlCol="0">
+            <a:spAutoFit/>
+          </a:bodyPr>
+          <a:lstStyle/>
+          <a:p>
+            <a:r>
+              <a:rPr lang="en-IN" sz="3200" b="1"/>
+              <a:t>x</a:t>
+            </a:r>
+          </a:p>
+        </p:txBody>
+      </p:sp>
+      <p:sp>
+        <p:nvSpPr>
+          <p:cNvPr id="3" name="Freeform: Shape 2">
+            <a:extLst>
+              <a:ext uri="{FF2B5EF4-FFF2-40B4-BE49-F238E27FC236}">
+                <a16:creationId xmlns:a16="http://schemas.microsoft.com/office/drawing/2014/main" id="{B9CD7F21-8ABF-4C83-A5B6-E567009AC8A6}"/>
+              </a:ext>
+            </a:extLst>
+          </p:cNvPr>
+          <p:cNvSpPr/>
+          <p:nvPr/>
+        </p:nvSpPr>
+        <p:spPr>
+          <a:xfrm>
+            <a:off x="469226" y="2338755"/>
+            <a:ext cx="3935506" cy="3083858"/>
+          </a:xfrm>
+          <a:custGeom>
+            <a:avLst/>
+            <a:gdLst>
+              <a:gd name="connsiteX0" fmla="*/ 0 w 3935506"/>
+              <a:gd name="connsiteY0" fmla="*/ 3083858 h 3083858"/>
+              <a:gd name="connsiteX1" fmla="*/ 1532965 w 3935506"/>
+              <a:gd name="connsiteY1" fmla="*/ 779929 h 3083858"/>
+              <a:gd name="connsiteX2" fmla="*/ 3935506 w 3935506"/>
+              <a:gd name="connsiteY2" fmla="*/ 0 h 3083858"/>
+            </a:gdLst>
+            <a:ahLst/>
+            <a:cxnLst>
+              <a:cxn ang="0">
+                <a:pos x="connsiteX0" y="connsiteY0"/>
+              </a:cxn>
+              <a:cxn ang="0">
+                <a:pos x="connsiteX1" y="connsiteY1"/>
+              </a:cxn>
+              <a:cxn ang="0">
+                <a:pos x="connsiteX2" y="connsiteY2"/>
+              </a:cxn>
+            </a:cxnLst>
+            <a:rect l="l" t="t" r="r" b="b"/>
+            <a:pathLst>
+              <a:path w="3935506" h="3083858">
+                <a:moveTo>
+                  <a:pt x="0" y="3083858"/>
+                </a:moveTo>
+                <a:cubicBezTo>
+                  <a:pt x="438523" y="2188881"/>
+                  <a:pt x="877047" y="1293905"/>
+                  <a:pt x="1532965" y="779929"/>
+                </a:cubicBezTo>
+                <a:cubicBezTo>
+                  <a:pt x="2188883" y="265953"/>
+                  <a:pt x="3062194" y="132976"/>
+                  <a:pt x="3935506" y="0"/>
+                </a:cubicBezTo>
+              </a:path>
+            </a:pathLst>
+          </a:custGeom>
+          <a:ln w="38100"/>
+        </p:spPr>
+        <p:style>
+          <a:lnRef idx="1">
+            <a:schemeClr val="accent2"/>
+          </a:lnRef>
+          <a:fillRef idx="0">
+            <a:schemeClr val="accent2"/>
+          </a:fillRef>
+          <a:effectRef idx="0">
+            <a:schemeClr val="accent2"/>
+          </a:effectRef>
+          <a:fontRef idx="minor">
+            <a:schemeClr val="tx1"/>
+          </a:fontRef>
+        </p:style>
+        <p:txBody>
+          <a:bodyPr rtlCol="0" anchor="ctr"/>
+          <a:lstStyle/>
+          <a:p>
+            <a:pPr algn="ctr"/>
+            <a:endParaRPr lang="en-IN"/>
+          </a:p>
+        </p:txBody>
+      </p:sp>
+      <p:sp>
+        <p:nvSpPr>
+          <p:cNvPr id="7" name="Freeform: Shape 6">
+            <a:extLst>
+              <a:ext uri="{FF2B5EF4-FFF2-40B4-BE49-F238E27FC236}">
+                <a16:creationId xmlns:a16="http://schemas.microsoft.com/office/drawing/2014/main" id="{B94362AD-1B1F-411E-8C16-48306F0F2465}"/>
+              </a:ext>
+            </a:extLst>
+          </p:cNvPr>
+          <p:cNvSpPr/>
+          <p:nvPr/>
+        </p:nvSpPr>
+        <p:spPr>
+          <a:xfrm>
+            <a:off x="469226" y="1603649"/>
+            <a:ext cx="3048000" cy="3827929"/>
+          </a:xfrm>
+          <a:custGeom>
+            <a:avLst/>
+            <a:gdLst>
+              <a:gd name="connsiteX0" fmla="*/ 0 w 3048000"/>
+              <a:gd name="connsiteY0" fmla="*/ 3827929 h 3827929"/>
+              <a:gd name="connsiteX1" fmla="*/ 2268071 w 3048000"/>
+              <a:gd name="connsiteY1" fmla="*/ 2142564 h 3827929"/>
+              <a:gd name="connsiteX2" fmla="*/ 3048000 w 3048000"/>
+              <a:gd name="connsiteY2" fmla="*/ 0 h 3827929"/>
+            </a:gdLst>
+            <a:ahLst/>
+            <a:cxnLst>
+              <a:cxn ang="0">
+                <a:pos x="connsiteX0" y="connsiteY0"/>
+              </a:cxn>
+              <a:cxn ang="0">
+                <a:pos x="connsiteX1" y="connsiteY1"/>
+              </a:cxn>
+              <a:cxn ang="0">
+                <a:pos x="connsiteX2" y="connsiteY2"/>
+              </a:cxn>
+            </a:cxnLst>
+            <a:rect l="l" t="t" r="r" b="b"/>
+            <a:pathLst>
+              <a:path w="3048000" h="3827929">
+                <a:moveTo>
+                  <a:pt x="0" y="3827929"/>
+                </a:moveTo>
+                <a:cubicBezTo>
+                  <a:pt x="880035" y="3304240"/>
+                  <a:pt x="1760071" y="2780552"/>
+                  <a:pt x="2268071" y="2142564"/>
+                </a:cubicBezTo>
+                <a:cubicBezTo>
+                  <a:pt x="2776071" y="1504576"/>
+                  <a:pt x="2912035" y="752288"/>
+                  <a:pt x="3048000" y="0"/>
+                </a:cubicBezTo>
+              </a:path>
+            </a:pathLst>
+          </a:custGeom>
+          <a:ln w="38100"/>
+        </p:spPr>
+        <p:style>
+          <a:lnRef idx="1">
+            <a:schemeClr val="accent6"/>
+          </a:lnRef>
+          <a:fillRef idx="0">
+            <a:schemeClr val="accent6"/>
+          </a:fillRef>
+          <a:effectRef idx="0">
+            <a:schemeClr val="accent6"/>
+          </a:effectRef>
+          <a:fontRef idx="minor">
+            <a:schemeClr val="tx1"/>
+          </a:fontRef>
+        </p:style>
+        <p:txBody>
+          <a:bodyPr rtlCol="0" anchor="ctr"/>
+          <a:lstStyle/>
+          <a:p>
+            <a:pPr algn="ctr"/>
+            <a:endParaRPr lang="en-IN"/>
+          </a:p>
+        </p:txBody>
+      </p:sp>
+      <p:sp>
+        <p:nvSpPr>
+          <p:cNvPr id="12" name="TextBox 11">
+            <a:extLst>
+              <a:ext uri="{FF2B5EF4-FFF2-40B4-BE49-F238E27FC236}">
+                <a16:creationId xmlns:a16="http://schemas.microsoft.com/office/drawing/2014/main" id="{054BC1D3-C35E-4BA8-891D-19713183CC00}"/>
+              </a:ext>
+            </a:extLst>
+          </p:cNvPr>
+          <p:cNvSpPr txBox="1"/>
+          <p:nvPr/>
+        </p:nvSpPr>
+        <p:spPr>
+          <a:xfrm>
+            <a:off x="10511557" y="4814395"/>
+            <a:ext cx="815788" cy="584775"/>
+          </a:xfrm>
+          <a:prstGeom prst="rect">
+            <a:avLst/>
+          </a:prstGeom>
+          <a:noFill/>
+        </p:spPr>
+        <p:txBody>
+          <a:bodyPr wrap="square" rtlCol="0">
+            <a:spAutoFit/>
+          </a:bodyPr>
+          <a:lstStyle/>
+          <a:p>
+            <a:r>
+              <a:rPr lang="en-IN" sz="3200" b="1">
+                <a:latin typeface="Adobe Hebrew" panose="02040503050201020203" pitchFamily="18" charset="-79"/>
+                <a:cs typeface="Adobe Hebrew" panose="02040503050201020203" pitchFamily="18" charset="-79"/>
+              </a:rPr>
+              <a:t>III</a:t>
+            </a:r>
+          </a:p>
+        </p:txBody>
+      </p:sp>
+      <p:sp>
+        <p:nvSpPr>
+          <p:cNvPr id="13" name="TextBox 12">
+            <a:extLst>
+              <a:ext uri="{FF2B5EF4-FFF2-40B4-BE49-F238E27FC236}">
+                <a16:creationId xmlns:a16="http://schemas.microsoft.com/office/drawing/2014/main" id="{069C2978-BC1C-4C9F-AD55-3A7EC2958EFF}"/>
+              </a:ext>
+            </a:extLst>
+          </p:cNvPr>
+          <p:cNvSpPr txBox="1"/>
+          <p:nvPr/>
+        </p:nvSpPr>
+        <p:spPr>
+          <a:xfrm>
+            <a:off x="4418179" y="1915344"/>
+            <a:ext cx="815788" cy="584775"/>
+          </a:xfrm>
+          <a:prstGeom prst="rect">
+            <a:avLst/>
+          </a:prstGeom>
+          <a:noFill/>
+        </p:spPr>
+        <p:txBody>
+          <a:bodyPr wrap="square" rtlCol="0">
+            <a:spAutoFit/>
+          </a:bodyPr>
+          <a:lstStyle/>
+          <a:p>
+            <a:r>
+              <a:rPr lang="en-IN" sz="3200" b="1">
+                <a:latin typeface="Adobe Hebrew" panose="02040503050201020203" pitchFamily="18" charset="-79"/>
+                <a:cs typeface="Adobe Hebrew" panose="02040503050201020203" pitchFamily="18" charset="-79"/>
+              </a:rPr>
+              <a:t>I</a:t>
+            </a:r>
+          </a:p>
+        </p:txBody>
+      </p:sp>
+      <p:sp>
+        <p:nvSpPr>
+          <p:cNvPr id="20" name="Freeform: Shape 19">
+            <a:extLst>
+              <a:ext uri="{FF2B5EF4-FFF2-40B4-BE49-F238E27FC236}">
+                <a16:creationId xmlns:a16="http://schemas.microsoft.com/office/drawing/2014/main" id="{B2B4C33F-C44B-4F3A-B3B7-24D94FA3A5DE}"/>
+              </a:ext>
+            </a:extLst>
+          </p:cNvPr>
+          <p:cNvSpPr/>
+          <p:nvPr/>
+        </p:nvSpPr>
+        <p:spPr>
+          <a:xfrm>
+            <a:off x="7459075" y="1498489"/>
+            <a:ext cx="3316941" cy="3290047"/>
+          </a:xfrm>
+          <a:custGeom>
+            <a:avLst/>
+            <a:gdLst>
+              <a:gd name="connsiteX0" fmla="*/ 0 w 3316941"/>
+              <a:gd name="connsiteY0" fmla="*/ 0 h 3290047"/>
+              <a:gd name="connsiteX1" fmla="*/ 2528047 w 3316941"/>
+              <a:gd name="connsiteY1" fmla="*/ 1183341 h 3290047"/>
+              <a:gd name="connsiteX2" fmla="*/ 3316941 w 3316941"/>
+              <a:gd name="connsiteY2" fmla="*/ 3290047 h 3290047"/>
+            </a:gdLst>
+            <a:ahLst/>
+            <a:cxnLst>
+              <a:cxn ang="0">
+                <a:pos x="connsiteX0" y="connsiteY0"/>
+              </a:cxn>
+              <a:cxn ang="0">
+                <a:pos x="connsiteX1" y="connsiteY1"/>
+              </a:cxn>
+              <a:cxn ang="0">
+                <a:pos x="connsiteX2" y="connsiteY2"/>
+              </a:cxn>
+            </a:cxnLst>
+            <a:rect l="l" t="t" r="r" b="b"/>
+            <a:pathLst>
+              <a:path w="3316941" h="3290047">
+                <a:moveTo>
+                  <a:pt x="0" y="0"/>
+                </a:moveTo>
+                <a:cubicBezTo>
+                  <a:pt x="987612" y="317500"/>
+                  <a:pt x="1975224" y="635000"/>
+                  <a:pt x="2528047" y="1183341"/>
+                </a:cubicBezTo>
+                <a:cubicBezTo>
+                  <a:pt x="3080870" y="1731682"/>
+                  <a:pt x="3198905" y="2510864"/>
+                  <a:pt x="3316941" y="3290047"/>
+                </a:cubicBezTo>
+              </a:path>
+            </a:pathLst>
+          </a:custGeom>
+          <a:ln w="57150"/>
+        </p:spPr>
+        <p:style>
+          <a:lnRef idx="1">
+            <a:schemeClr val="accent5"/>
+          </a:lnRef>
+          <a:fillRef idx="0">
+            <a:schemeClr val="accent5"/>
+          </a:fillRef>
+          <a:effectRef idx="0">
+            <a:schemeClr val="accent5"/>
+          </a:effectRef>
+          <a:fontRef idx="minor">
+            <a:schemeClr val="tx1"/>
+          </a:fontRef>
+        </p:style>
+        <p:txBody>
+          <a:bodyPr rtlCol="0" anchor="ctr"/>
+          <a:lstStyle/>
+          <a:p>
+            <a:pPr algn="ctr"/>
+            <a:endParaRPr lang="en-IN"/>
+          </a:p>
+        </p:txBody>
+      </p:sp>
+      <p:sp>
+        <p:nvSpPr>
+          <p:cNvPr id="21" name="Freeform: Shape 20">
+            <a:extLst>
+              <a:ext uri="{FF2B5EF4-FFF2-40B4-BE49-F238E27FC236}">
+                <a16:creationId xmlns:a16="http://schemas.microsoft.com/office/drawing/2014/main" id="{9C075305-674E-4AD3-A8FA-AC46BC3F4AC1}"/>
+              </a:ext>
+            </a:extLst>
+          </p:cNvPr>
+          <p:cNvSpPr/>
+          <p:nvPr/>
+        </p:nvSpPr>
+        <p:spPr>
+          <a:xfrm>
+            <a:off x="7459074" y="1489524"/>
+            <a:ext cx="3962400" cy="2716306"/>
+          </a:xfrm>
+          <a:custGeom>
+            <a:avLst/>
+            <a:gdLst>
+              <a:gd name="connsiteX0" fmla="*/ 0 w 3962400"/>
+              <a:gd name="connsiteY0" fmla="*/ 0 h 2716306"/>
+              <a:gd name="connsiteX1" fmla="*/ 1524000 w 3962400"/>
+              <a:gd name="connsiteY1" fmla="*/ 2196353 h 2716306"/>
+              <a:gd name="connsiteX2" fmla="*/ 3962400 w 3962400"/>
+              <a:gd name="connsiteY2" fmla="*/ 2716306 h 2716306"/>
+            </a:gdLst>
+            <a:ahLst/>
+            <a:cxnLst>
+              <a:cxn ang="0">
+                <a:pos x="connsiteX0" y="connsiteY0"/>
+              </a:cxn>
+              <a:cxn ang="0">
+                <a:pos x="connsiteX1" y="connsiteY1"/>
+              </a:cxn>
+              <a:cxn ang="0">
+                <a:pos x="connsiteX2" y="connsiteY2"/>
+              </a:cxn>
+            </a:cxnLst>
+            <a:rect l="l" t="t" r="r" b="b"/>
+            <a:pathLst>
+              <a:path w="3962400" h="2716306">
+                <a:moveTo>
+                  <a:pt x="0" y="0"/>
+                </a:moveTo>
+                <a:cubicBezTo>
+                  <a:pt x="431800" y="871817"/>
+                  <a:pt x="863600" y="1743635"/>
+                  <a:pt x="1524000" y="2196353"/>
+                </a:cubicBezTo>
+                <a:cubicBezTo>
+                  <a:pt x="2184400" y="2649071"/>
+                  <a:pt x="3073400" y="2682688"/>
+                  <a:pt x="3962400" y="2716306"/>
+                </a:cubicBezTo>
+              </a:path>
+            </a:pathLst>
+          </a:custGeom>
+          <a:ln w="57150"/>
+        </p:spPr>
+        <p:style>
+          <a:lnRef idx="1">
+            <a:schemeClr val="accent4"/>
+          </a:lnRef>
+          <a:fillRef idx="0">
+            <a:schemeClr val="accent4"/>
+          </a:fillRef>
+          <a:effectRef idx="0">
+            <a:schemeClr val="accent4"/>
+          </a:effectRef>
+          <a:fontRef idx="minor">
+            <a:schemeClr val="tx1"/>
+          </a:fontRef>
+        </p:style>
+        <p:txBody>
+          <a:bodyPr rtlCol="0" anchor="ctr"/>
+          <a:lstStyle/>
+          <a:p>
+            <a:pPr algn="ctr"/>
+            <a:endParaRPr lang="en-IN"/>
+          </a:p>
+        </p:txBody>
+      </p:sp>
+      <p:cxnSp>
+        <p:nvCxnSpPr>
+          <p:cNvPr id="16" name="Straight Arrow Connector 15">
+            <a:extLst>
+              <a:ext uri="{FF2B5EF4-FFF2-40B4-BE49-F238E27FC236}">
+                <a16:creationId xmlns:a16="http://schemas.microsoft.com/office/drawing/2014/main" id="{3677380B-EDD2-4898-9D72-A0A5F85D6396}"/>
+              </a:ext>
+            </a:extLst>
+          </p:cNvPr>
+          <p:cNvCxnSpPr/>
+          <p:nvPr/>
+        </p:nvCxnSpPr>
+        <p:spPr>
+          <a:xfrm>
+            <a:off x="7459074" y="1462630"/>
+            <a:ext cx="0" cy="3962400"/>
+          </a:xfrm>
+          <a:prstGeom prst="straightConnector1">
+            <a:avLst/>
+          </a:prstGeom>
+          <a:ln w="57150">
+            <a:tailEnd type="triangle"/>
+          </a:ln>
+        </p:spPr>
+        <p:style>
+          <a:lnRef idx="1">
+            <a:schemeClr val="dk1"/>
+          </a:lnRef>
+          <a:fillRef idx="0">
+            <a:schemeClr val="dk1"/>
+          </a:fillRef>
+          <a:effectRef idx="0">
+            <a:schemeClr val="dk1"/>
+          </a:effectRef>
+          <a:fontRef idx="minor">
+            <a:schemeClr val="tx1"/>
+          </a:fontRef>
+        </p:style>
+      </p:cxnSp>
+      <p:cxnSp>
+        <p:nvCxnSpPr>
+          <p:cNvPr id="17" name="Straight Arrow Connector 16">
+            <a:extLst>
+              <a:ext uri="{FF2B5EF4-FFF2-40B4-BE49-F238E27FC236}">
+                <a16:creationId xmlns:a16="http://schemas.microsoft.com/office/drawing/2014/main" id="{A91E2E57-E33F-47ED-ADEF-64910CE6F832}"/>
+              </a:ext>
+            </a:extLst>
+          </p:cNvPr>
+          <p:cNvCxnSpPr>
+            <a:cxnSpLocks/>
+          </p:cNvCxnSpPr>
+          <p:nvPr/>
+        </p:nvCxnSpPr>
+        <p:spPr>
+          <a:xfrm flipV="1">
+            <a:off x="7436659" y="1462630"/>
+            <a:ext cx="3872756" cy="26895"/>
+          </a:xfrm>
+          <a:prstGeom prst="straightConnector1">
+            <a:avLst/>
+          </a:prstGeom>
+          <a:ln w="57150">
+            <a:tailEnd type="triangle"/>
+          </a:ln>
+        </p:spPr>
+        <p:style>
+          <a:lnRef idx="1">
+            <a:schemeClr val="dk1"/>
+          </a:lnRef>
+          <a:fillRef idx="0">
+            <a:schemeClr val="dk1"/>
+          </a:fillRef>
+          <a:effectRef idx="0">
+            <a:schemeClr val="dk1"/>
+          </a:effectRef>
+          <a:fontRef idx="minor">
+            <a:schemeClr val="tx1"/>
+          </a:fontRef>
+        </p:style>
+      </p:cxnSp>
+      <p:cxnSp>
+        <p:nvCxnSpPr>
+          <p:cNvPr id="5" name="Straight Arrow Connector 4">
+            <a:extLst>
+              <a:ext uri="{FF2B5EF4-FFF2-40B4-BE49-F238E27FC236}">
+                <a16:creationId xmlns:a16="http://schemas.microsoft.com/office/drawing/2014/main" id="{559850C6-6BB8-47AE-B4F4-B25D30AD45C0}"/>
+              </a:ext>
+            </a:extLst>
+          </p:cNvPr>
+          <p:cNvCxnSpPr/>
+          <p:nvPr/>
+        </p:nvCxnSpPr>
+        <p:spPr>
+          <a:xfrm flipV="1">
+            <a:off x="478191" y="1594684"/>
+            <a:ext cx="0" cy="3845859"/>
+          </a:xfrm>
+          <a:prstGeom prst="straightConnector1">
+            <a:avLst/>
+          </a:prstGeom>
+          <a:ln w="57150">
+            <a:tailEnd type="triangle"/>
+          </a:ln>
+        </p:spPr>
+        <p:style>
+          <a:lnRef idx="1">
+            <a:schemeClr val="dk1"/>
+          </a:lnRef>
+          <a:fillRef idx="0">
+            <a:schemeClr val="dk1"/>
+          </a:fillRef>
+          <a:effectRef idx="0">
+            <a:schemeClr val="dk1"/>
+          </a:effectRef>
+          <a:fontRef idx="minor">
+            <a:schemeClr val="tx1"/>
+          </a:fontRef>
+        </p:style>
+      </p:cxnSp>
+      <p:cxnSp>
+        <p:nvCxnSpPr>
+          <p:cNvPr id="6" name="Straight Arrow Connector 5">
+            <a:extLst>
+              <a:ext uri="{FF2B5EF4-FFF2-40B4-BE49-F238E27FC236}">
+                <a16:creationId xmlns:a16="http://schemas.microsoft.com/office/drawing/2014/main" id="{1A1D26B7-5172-4FC0-BB52-5D87AC6E26DF}"/>
+              </a:ext>
+            </a:extLst>
+          </p:cNvPr>
+          <p:cNvCxnSpPr>
+            <a:cxnSpLocks/>
+          </p:cNvCxnSpPr>
+          <p:nvPr/>
+        </p:nvCxnSpPr>
+        <p:spPr>
+          <a:xfrm flipV="1">
+            <a:off x="451296" y="5440542"/>
+            <a:ext cx="4670612" cy="1"/>
+          </a:xfrm>
+          <a:prstGeom prst="straightConnector1">
+            <a:avLst/>
+          </a:prstGeom>
+          <a:ln w="57150">
+            <a:tailEnd type="triangle"/>
+          </a:ln>
+        </p:spPr>
+        <p:style>
+          <a:lnRef idx="1">
+            <a:schemeClr val="dk1"/>
+          </a:lnRef>
+          <a:fillRef idx="0">
+            <a:schemeClr val="dk1"/>
+          </a:fillRef>
+          <a:effectRef idx="0">
+            <a:schemeClr val="dk1"/>
+          </a:effectRef>
+          <a:fontRef idx="minor">
+            <a:schemeClr val="tx1"/>
+          </a:fontRef>
+        </p:style>
+      </p:cxnSp>
+      <p:sp>
+        <p:nvSpPr>
+          <p:cNvPr id="22" name="TextBox 21">
+            <a:extLst>
+              <a:ext uri="{FF2B5EF4-FFF2-40B4-BE49-F238E27FC236}">
+                <a16:creationId xmlns:a16="http://schemas.microsoft.com/office/drawing/2014/main" id="{D3A899D7-8F1C-4D54-9262-96C25A3BE4CB}"/>
+              </a:ext>
+            </a:extLst>
+          </p:cNvPr>
+          <p:cNvSpPr txBox="1"/>
+          <p:nvPr/>
+        </p:nvSpPr>
+        <p:spPr>
+          <a:xfrm>
+            <a:off x="3454473" y="1240924"/>
+            <a:ext cx="815788" cy="584775"/>
+          </a:xfrm>
+          <a:prstGeom prst="rect">
+            <a:avLst/>
+          </a:prstGeom>
+          <a:noFill/>
+        </p:spPr>
+        <p:txBody>
+          <a:bodyPr wrap="square" rtlCol="0">
+            <a:spAutoFit/>
+          </a:bodyPr>
+          <a:lstStyle/>
+          <a:p>
+            <a:r>
+              <a:rPr lang="en-IN" sz="3200" b="1">
+                <a:latin typeface="Adobe Hebrew" panose="02040503050201020203" pitchFamily="18" charset="-79"/>
+                <a:cs typeface="Adobe Hebrew" panose="02040503050201020203" pitchFamily="18" charset="-79"/>
+              </a:rPr>
+              <a:t>II</a:t>
+            </a:r>
+          </a:p>
+        </p:txBody>
+      </p:sp>
+      <p:sp>
+        <p:nvSpPr>
+          <p:cNvPr id="23" name="TextBox 22">
+            <a:extLst>
+              <a:ext uri="{FF2B5EF4-FFF2-40B4-BE49-F238E27FC236}">
+                <a16:creationId xmlns:a16="http://schemas.microsoft.com/office/drawing/2014/main" id="{5509AD03-3BC4-4BBC-BBD7-02EABA4EACF5}"/>
+              </a:ext>
+            </a:extLst>
+          </p:cNvPr>
+          <p:cNvSpPr txBox="1"/>
+          <p:nvPr/>
+        </p:nvSpPr>
+        <p:spPr>
+          <a:xfrm>
+            <a:off x="11421474" y="3925337"/>
+            <a:ext cx="815788" cy="584775"/>
+          </a:xfrm>
+          <a:prstGeom prst="rect">
+            <a:avLst/>
+          </a:prstGeom>
+          <a:noFill/>
+        </p:spPr>
+        <p:txBody>
+          <a:bodyPr wrap="square" rtlCol="0">
+            <a:spAutoFit/>
+          </a:bodyPr>
+          <a:lstStyle/>
+          <a:p>
+            <a:r>
+              <a:rPr lang="en-IN" sz="3200" b="1">
+                <a:latin typeface="Adobe Hebrew" panose="02040503050201020203" pitchFamily="18" charset="-79"/>
+                <a:cs typeface="Adobe Hebrew" panose="02040503050201020203" pitchFamily="18" charset="-79"/>
+              </a:rPr>
+              <a:t>IV</a:t>
+            </a:r>
+          </a:p>
+        </p:txBody>
+      </p:sp>
+      <p:sp>
+        <p:nvSpPr>
+          <p:cNvPr id="24" name="TextBox 23">
+            <a:extLst>
+              <a:ext uri="{FF2B5EF4-FFF2-40B4-BE49-F238E27FC236}">
+                <a16:creationId xmlns:a16="http://schemas.microsoft.com/office/drawing/2014/main" id="{E192A674-6C03-473A-9E83-02580549BAB4}"/>
+              </a:ext>
+            </a:extLst>
+          </p:cNvPr>
+          <p:cNvSpPr txBox="1"/>
+          <p:nvPr/>
+        </p:nvSpPr>
+        <p:spPr>
+          <a:xfrm>
+            <a:off x="11291485" y="1134382"/>
+            <a:ext cx="815786" cy="584775"/>
+          </a:xfrm>
+          <a:prstGeom prst="rect">
+            <a:avLst/>
+          </a:prstGeom>
+          <a:noFill/>
+        </p:spPr>
+        <p:txBody>
+          <a:bodyPr wrap="square" rtlCol="0">
+            <a:spAutoFit/>
+          </a:bodyPr>
+          <a:lstStyle/>
+          <a:p>
+            <a:r>
+              <a:rPr lang="en-IN" sz="3200" b="1"/>
+              <a:t>x</a:t>
+            </a:r>
+          </a:p>
+        </p:txBody>
+      </p:sp>
+      <p:sp>
+        <p:nvSpPr>
+          <p:cNvPr id="25" name="TextBox 24">
+            <a:extLst>
+              <a:ext uri="{FF2B5EF4-FFF2-40B4-BE49-F238E27FC236}">
+                <a16:creationId xmlns:a16="http://schemas.microsoft.com/office/drawing/2014/main" id="{B5FDB3E2-340E-4FFF-B3CC-3E53045120CB}"/>
+              </a:ext>
+            </a:extLst>
+          </p:cNvPr>
+          <p:cNvSpPr txBox="1"/>
+          <p:nvPr/>
+        </p:nvSpPr>
+        <p:spPr>
+          <a:xfrm>
+            <a:off x="314586" y="991980"/>
+            <a:ext cx="815788" cy="584775"/>
+          </a:xfrm>
+          <a:prstGeom prst="rect">
+            <a:avLst/>
+          </a:prstGeom>
+          <a:noFill/>
+        </p:spPr>
+        <p:txBody>
+          <a:bodyPr wrap="square" rtlCol="0">
+            <a:spAutoFit/>
+          </a:bodyPr>
+          <a:lstStyle/>
+          <a:p>
+            <a:r>
+              <a:rPr lang="en-IN" sz="3200" b="1"/>
+              <a:t>y</a:t>
+            </a:r>
+          </a:p>
+        </p:txBody>
+      </p:sp>
+      <p:pic>
+        <p:nvPicPr>
+          <p:cNvPr id="27" name="Picture 26">
+            <a:extLst>
+              <a:ext uri="{FF2B5EF4-FFF2-40B4-BE49-F238E27FC236}">
+                <a16:creationId xmlns:a16="http://schemas.microsoft.com/office/drawing/2014/main" id="{83A3BE8C-E1C6-4D74-AA01-AF3A83576FAE}"/>
+              </a:ext>
+            </a:extLst>
+          </p:cNvPr>
+          <p:cNvPicPr>
+            <a:picLocks noChangeAspect="1"/>
+          </p:cNvPicPr>
+          <p:nvPr/>
+        </p:nvPicPr>
+        <p:blipFill>
+          <a:blip r:embed="rId4"/>
+          <a:stretch>
+            <a:fillRect/>
+          </a:stretch>
+        </p:blipFill>
+        <p:spPr>
+          <a:xfrm>
+            <a:off x="2800933" y="3723664"/>
+            <a:ext cx="2772898" cy="797209"/>
+          </a:xfrm>
+          <a:prstGeom prst="rect">
+            <a:avLst/>
+          </a:prstGeom>
+        </p:spPr>
+      </p:pic>
+      <p:pic>
+        <p:nvPicPr>
+          <p:cNvPr id="28" name="Picture 27">
+            <a:extLst>
+              <a:ext uri="{FF2B5EF4-FFF2-40B4-BE49-F238E27FC236}">
+                <a16:creationId xmlns:a16="http://schemas.microsoft.com/office/drawing/2014/main" id="{F6E9105C-F317-4FC1-8AAF-B3D62B21F3EC}"/>
+              </a:ext>
+            </a:extLst>
+          </p:cNvPr>
+          <p:cNvPicPr>
+            <a:picLocks noChangeAspect="1"/>
+          </p:cNvPicPr>
+          <p:nvPr/>
+        </p:nvPicPr>
+        <p:blipFill>
+          <a:blip r:embed="rId5"/>
+          <a:stretch>
+            <a:fillRect/>
+          </a:stretch>
+        </p:blipFill>
+        <p:spPr>
+          <a:xfrm>
+            <a:off x="7539214" y="4236104"/>
+            <a:ext cx="2644589" cy="763063"/>
+          </a:xfrm>
+          <a:prstGeom prst="rect">
+            <a:avLst/>
+          </a:prstGeom>
+        </p:spPr>
+      </p:pic>
+      <p:sp>
+        <p:nvSpPr>
+          <p:cNvPr id="33" name="Arrow: Bent-Up 32">
+            <a:extLst>
+              <a:ext uri="{FF2B5EF4-FFF2-40B4-BE49-F238E27FC236}">
+                <a16:creationId xmlns:a16="http://schemas.microsoft.com/office/drawing/2014/main" id="{B6320B58-C347-405E-B987-D8EC0378F04C}"/>
+              </a:ext>
+            </a:extLst>
+          </p:cNvPr>
+          <p:cNvSpPr/>
+          <p:nvPr/>
+        </p:nvSpPr>
+        <p:spPr>
+          <a:xfrm flipH="1">
+            <a:off x="1488146" y="2551575"/>
+            <a:ext cx="331249" cy="617273"/>
+          </a:xfrm>
+          <a:prstGeom prst="bentUpArrow">
+            <a:avLst/>
+          </a:prstGeom>
+        </p:spPr>
+        <p:style>
+          <a:lnRef idx="2">
+            <a:schemeClr val="dk1">
+              <a:shade val="50000"/>
+            </a:schemeClr>
+          </a:lnRef>
+          <a:fillRef idx="1">
+            <a:schemeClr val="dk1"/>
+          </a:fillRef>
+          <a:effectRef idx="0">
+            <a:schemeClr val="dk1"/>
+          </a:effectRef>
+          <a:fontRef idx="minor">
+            <a:schemeClr val="lt1"/>
+          </a:fontRef>
+        </p:style>
+        <p:txBody>
+          <a:bodyPr rtlCol="0" anchor="ctr"/>
+          <a:lstStyle/>
+          <a:p>
+            <a:pPr algn="ctr"/>
+            <a:endParaRPr lang="en-IN"/>
+          </a:p>
+        </p:txBody>
+      </p:sp>
+      <p:sp>
+        <p:nvSpPr>
+          <p:cNvPr id="34" name="Arrow: Bent-Up 33">
+            <a:extLst>
+              <a:ext uri="{FF2B5EF4-FFF2-40B4-BE49-F238E27FC236}">
+                <a16:creationId xmlns:a16="http://schemas.microsoft.com/office/drawing/2014/main" id="{58E0EF71-A572-4D7F-AF7D-25714122F33F}"/>
+              </a:ext>
+            </a:extLst>
+          </p:cNvPr>
+          <p:cNvSpPr/>
+          <p:nvPr/>
+        </p:nvSpPr>
+        <p:spPr>
+          <a:xfrm flipV="1">
+            <a:off x="3228385" y="3077984"/>
+            <a:ext cx="325789" cy="617273"/>
+          </a:xfrm>
+          <a:prstGeom prst="bentUpArrow">
+            <a:avLst/>
+          </a:prstGeom>
+        </p:spPr>
+        <p:style>
+          <a:lnRef idx="2">
+            <a:schemeClr val="dk1">
+              <a:shade val="50000"/>
+            </a:schemeClr>
+          </a:lnRef>
+          <a:fillRef idx="1">
+            <a:schemeClr val="dk1"/>
+          </a:fillRef>
+          <a:effectRef idx="0">
+            <a:schemeClr val="dk1"/>
+          </a:effectRef>
+          <a:fontRef idx="minor">
+            <a:schemeClr val="lt1"/>
+          </a:fontRef>
+        </p:style>
+        <p:txBody>
+          <a:bodyPr rtlCol="0" anchor="ctr"/>
+          <a:lstStyle/>
+          <a:p>
+            <a:pPr algn="ctr"/>
+            <a:endParaRPr lang="en-IN"/>
+          </a:p>
+        </p:txBody>
+      </p:sp>
+      <p:sp>
+        <p:nvSpPr>
+          <p:cNvPr id="35" name="Arrow: Bent-Up 34">
+            <a:extLst>
+              <a:ext uri="{FF2B5EF4-FFF2-40B4-BE49-F238E27FC236}">
+                <a16:creationId xmlns:a16="http://schemas.microsoft.com/office/drawing/2014/main" id="{57092895-1981-44BB-8793-C45F437D7AE6}"/>
+              </a:ext>
+            </a:extLst>
+          </p:cNvPr>
+          <p:cNvSpPr/>
+          <p:nvPr/>
+        </p:nvSpPr>
+        <p:spPr>
+          <a:xfrm flipH="1" flipV="1">
+            <a:off x="8199647" y="3432062"/>
+            <a:ext cx="293865" cy="617273"/>
+          </a:xfrm>
+          <a:prstGeom prst="bentUpArrow">
+            <a:avLst/>
+          </a:prstGeom>
+        </p:spPr>
+        <p:style>
+          <a:lnRef idx="2">
+            <a:schemeClr val="dk1">
+              <a:shade val="50000"/>
+            </a:schemeClr>
+          </a:lnRef>
+          <a:fillRef idx="1">
+            <a:schemeClr val="dk1"/>
+          </a:fillRef>
+          <a:effectRef idx="0">
+            <a:schemeClr val="dk1"/>
+          </a:effectRef>
+          <a:fontRef idx="minor">
+            <a:schemeClr val="lt1"/>
+          </a:fontRef>
+        </p:style>
+        <p:txBody>
+          <a:bodyPr rtlCol="0" anchor="ctr"/>
+          <a:lstStyle/>
+          <a:p>
+            <a:pPr algn="ctr"/>
+            <a:endParaRPr lang="en-IN"/>
+          </a:p>
+        </p:txBody>
+      </p:sp>
+      <p:sp>
+        <p:nvSpPr>
+          <p:cNvPr id="36" name="Arrow: Bent-Up 35">
+            <a:extLst>
+              <a:ext uri="{FF2B5EF4-FFF2-40B4-BE49-F238E27FC236}">
+                <a16:creationId xmlns:a16="http://schemas.microsoft.com/office/drawing/2014/main" id="{13FAE5C6-59A2-4002-9307-6AB90E84DE32}"/>
+              </a:ext>
+            </a:extLst>
+          </p:cNvPr>
+          <p:cNvSpPr/>
+          <p:nvPr/>
+        </p:nvSpPr>
+        <p:spPr>
+          <a:xfrm>
+            <a:off x="10498933" y="2587949"/>
+            <a:ext cx="277083" cy="580899"/>
+          </a:xfrm>
+          <a:prstGeom prst="bentUpArrow">
+            <a:avLst/>
+          </a:prstGeom>
+        </p:spPr>
+        <p:style>
+          <a:lnRef idx="2">
+            <a:schemeClr val="dk1">
+              <a:shade val="50000"/>
+            </a:schemeClr>
+          </a:lnRef>
+          <a:fillRef idx="1">
+            <a:schemeClr val="dk1"/>
+          </a:fillRef>
+          <a:effectRef idx="0">
+            <a:schemeClr val="dk1"/>
+          </a:effectRef>
+          <a:fontRef idx="minor">
+            <a:schemeClr val="lt1"/>
+          </a:fontRef>
+        </p:style>
+        <p:txBody>
+          <a:bodyPr rtlCol="0" anchor="ctr"/>
+          <a:lstStyle/>
+          <a:p>
+            <a:pPr algn="ctr"/>
+            <a:endParaRPr lang="en-IN"/>
+          </a:p>
+        </p:txBody>
+      </p:sp>
+      <p:sp>
+        <p:nvSpPr>
+          <p:cNvPr id="37" name="TextBox 36">
+            <a:extLst>
+              <a:ext uri="{FF2B5EF4-FFF2-40B4-BE49-F238E27FC236}">
+                <a16:creationId xmlns:a16="http://schemas.microsoft.com/office/drawing/2014/main" id="{5BC12B9D-2765-43A5-8803-88C4B18D6F42}"/>
+              </a:ext>
+            </a:extLst>
+          </p:cNvPr>
+          <p:cNvSpPr txBox="1"/>
+          <p:nvPr/>
+        </p:nvSpPr>
+        <p:spPr>
+          <a:xfrm>
+            <a:off x="5643616" y="2500119"/>
+            <a:ext cx="1511309" cy="1200329"/>
+          </a:xfrm>
+          <a:prstGeom prst="rect">
+            <a:avLst/>
+          </a:prstGeom>
+          <a:noFill/>
+          <a:ln w="38100">
+            <a:solidFill>
+              <a:schemeClr val="tx1"/>
+            </a:solidFill>
+            <a:prstDash val="sysDot"/>
+          </a:ln>
+        </p:spPr>
+        <p:txBody>
+          <a:bodyPr wrap="square" rtlCol="0">
+            <a:spAutoFit/>
+          </a:bodyPr>
+          <a:lstStyle/>
+          <a:p>
+            <a:pPr algn="ctr"/>
+            <a:r>
+              <a:rPr lang="en-IN" sz="3600" b="1"/>
+              <a:t>SF/BM = y(x)</a:t>
+            </a:r>
+          </a:p>
+        </p:txBody>
+      </p:sp>
+    </p:spTree>
+    <p:extLst>
+      <p:ext uri="{BB962C8B-B14F-4D97-AF65-F5344CB8AC3E}">
+        <p14:creationId xmlns:p14="http://schemas.microsoft.com/office/powerpoint/2010/main" val="2495762541"/>
+      </p:ext>
+    </p:extLst>
+  </p:cSld>
+  <p:clrMapOvr>
+    <a:masterClrMapping/>
+  </p:clrMapOvr>
+</p:sld>
+</file>
+
+<file path=ppt/slides/slide13.xml><?xml version="1.0" encoding="utf-8"?>
+<p:sld xmlns:a="http://schemas.openxmlformats.org/drawingml/2006/main" xmlns:r="http://schemas.openxmlformats.org/officeDocument/2006/relationships" xmlns:p="http://schemas.openxmlformats.org/presentationml/2006/main">
+  <p:cSld>
+    <p:spTree>
+      <p:nvGrpSpPr>
+        <p:cNvPr id="1" name=""/>
+        <p:cNvGrpSpPr/>
+        <p:nvPr/>
+      </p:nvGrpSpPr>
+      <p:grpSpPr>
+        <a:xfrm>
+          <a:off x="0" y="0"/>
+          <a:ext cx="0" cy="0"/>
+          <a:chOff x="0" y="0"/>
+          <a:chExt cx="0" cy="0"/>
+        </a:xfrm>
+      </p:grpSpPr>
+      <p:sp>
+        <p:nvSpPr>
+          <p:cNvPr id="4" name="Rectangle 3">
+            <a:extLst>
+              <a:ext uri="{FF2B5EF4-FFF2-40B4-BE49-F238E27FC236}">
+                <a16:creationId xmlns:a16="http://schemas.microsoft.com/office/drawing/2014/main" id="{AB2D3E39-289E-416C-8AB5-E6DB171EA0E5}"/>
+              </a:ext>
+            </a:extLst>
+          </p:cNvPr>
+          <p:cNvSpPr/>
+          <p:nvPr/>
+        </p:nvSpPr>
+        <p:spPr>
+          <a:xfrm>
+            <a:off x="3594845" y="590038"/>
+            <a:ext cx="188258" cy="1613647"/>
+          </a:xfrm>
+          <a:prstGeom prst="rect">
+            <a:avLst/>
+          </a:prstGeom>
+        </p:spPr>
+        <p:style>
+          <a:lnRef idx="1">
+            <a:schemeClr val="accent1"/>
+          </a:lnRef>
+          <a:fillRef idx="2">
+            <a:schemeClr val="accent1"/>
+          </a:fillRef>
+          <a:effectRef idx="1">
+            <a:schemeClr val="accent1"/>
+          </a:effectRef>
+          <a:fontRef idx="minor">
+            <a:schemeClr val="dk1"/>
+          </a:fontRef>
+        </p:style>
+        <p:txBody>
+          <a:bodyPr rtlCol="0" anchor="ctr"/>
+          <a:lstStyle/>
+          <a:p>
+            <a:pPr algn="ctr"/>
+            <a:endParaRPr lang="en-IN"/>
+          </a:p>
+        </p:txBody>
+      </p:sp>
+      <p:sp>
+        <p:nvSpPr>
+          <p:cNvPr id="3" name="Rectangle 2">
+            <a:extLst>
+              <a:ext uri="{FF2B5EF4-FFF2-40B4-BE49-F238E27FC236}">
+                <a16:creationId xmlns:a16="http://schemas.microsoft.com/office/drawing/2014/main" id="{A8E4AE96-000C-47C2-B1D1-9AB67E1CDD2F}"/>
+              </a:ext>
+            </a:extLst>
+          </p:cNvPr>
+          <p:cNvSpPr/>
+          <p:nvPr/>
+        </p:nvSpPr>
+        <p:spPr>
+          <a:xfrm>
+            <a:off x="2268070" y="1154814"/>
+            <a:ext cx="2841811" cy="448235"/>
+          </a:xfrm>
+          <a:prstGeom prst="rect">
+            <a:avLst/>
+          </a:prstGeom>
+        </p:spPr>
+        <p:style>
+          <a:lnRef idx="1">
+            <a:schemeClr val="accent1"/>
+          </a:lnRef>
+          <a:fillRef idx="2">
+            <a:schemeClr val="accent1"/>
+          </a:fillRef>
+          <a:effectRef idx="1">
+            <a:schemeClr val="accent1"/>
+          </a:effectRef>
+          <a:fontRef idx="minor">
+            <a:schemeClr val="dk1"/>
+          </a:fontRef>
+        </p:style>
+        <p:txBody>
+          <a:bodyPr rtlCol="0" anchor="ctr"/>
+          <a:lstStyle/>
+          <a:p>
+            <a:pPr algn="ctr"/>
+            <a:endParaRPr lang="en-IN"/>
+          </a:p>
+        </p:txBody>
+      </p:sp>
+      <p:cxnSp>
+        <p:nvCxnSpPr>
+          <p:cNvPr id="7" name="Straight Arrow Connector 6">
+            <a:extLst>
+              <a:ext uri="{FF2B5EF4-FFF2-40B4-BE49-F238E27FC236}">
+                <a16:creationId xmlns:a16="http://schemas.microsoft.com/office/drawing/2014/main" id="{C068826A-897D-4066-802E-9D7BD60B5E46}"/>
+              </a:ext>
+            </a:extLst>
+          </p:cNvPr>
+          <p:cNvCxnSpPr>
+            <a:cxnSpLocks/>
+          </p:cNvCxnSpPr>
+          <p:nvPr/>
+        </p:nvCxnSpPr>
+        <p:spPr>
+          <a:xfrm>
+            <a:off x="3599324" y="590038"/>
+            <a:ext cx="623049" cy="0"/>
+          </a:xfrm>
+          <a:prstGeom prst="straightConnector1">
+            <a:avLst/>
+          </a:prstGeom>
+          <a:ln w="57150">
+            <a:tailEnd type="triangle"/>
+          </a:ln>
+        </p:spPr>
+        <p:style>
+          <a:lnRef idx="1">
+            <a:schemeClr val="dk1"/>
+          </a:lnRef>
+          <a:fillRef idx="0">
+            <a:schemeClr val="dk1"/>
+          </a:fillRef>
+          <a:effectRef idx="0">
+            <a:schemeClr val="dk1"/>
+          </a:effectRef>
+          <a:fontRef idx="minor">
+            <a:schemeClr val="tx1"/>
+          </a:fontRef>
+        </p:style>
+      </p:cxnSp>
+      <p:cxnSp>
+        <p:nvCxnSpPr>
+          <p:cNvPr id="18" name="Straight Arrow Connector 17">
+            <a:extLst>
+              <a:ext uri="{FF2B5EF4-FFF2-40B4-BE49-F238E27FC236}">
+                <a16:creationId xmlns:a16="http://schemas.microsoft.com/office/drawing/2014/main" id="{50579FBE-8660-4490-908B-F551C54D3040}"/>
+              </a:ext>
+            </a:extLst>
+          </p:cNvPr>
+          <p:cNvCxnSpPr>
+            <a:cxnSpLocks/>
+          </p:cNvCxnSpPr>
+          <p:nvPr/>
+        </p:nvCxnSpPr>
+        <p:spPr>
+          <a:xfrm flipH="1">
+            <a:off x="3182470" y="2185755"/>
+            <a:ext cx="600634" cy="0"/>
+          </a:xfrm>
+          <a:prstGeom prst="straightConnector1">
+            <a:avLst/>
+          </a:prstGeom>
+          <a:ln w="57150">
+            <a:tailEnd type="triangle"/>
+          </a:ln>
+        </p:spPr>
+        <p:style>
+          <a:lnRef idx="1">
+            <a:schemeClr val="dk1"/>
+          </a:lnRef>
+          <a:fillRef idx="0">
+            <a:schemeClr val="dk1"/>
+          </a:fillRef>
+          <a:effectRef idx="0">
+            <a:schemeClr val="dk1"/>
+          </a:effectRef>
+          <a:fontRef idx="minor">
+            <a:schemeClr val="tx1"/>
+          </a:fontRef>
+        </p:style>
+      </p:cxnSp>
+      <p:sp>
+        <p:nvSpPr>
+          <p:cNvPr id="21" name="TextBox 20">
+            <a:extLst>
+              <a:ext uri="{FF2B5EF4-FFF2-40B4-BE49-F238E27FC236}">
+                <a16:creationId xmlns:a16="http://schemas.microsoft.com/office/drawing/2014/main" id="{46E91317-1D0A-43B9-9949-6B848FDD5CE6}"/>
+              </a:ext>
+            </a:extLst>
+          </p:cNvPr>
+          <p:cNvSpPr txBox="1"/>
+          <p:nvPr/>
+        </p:nvSpPr>
+        <p:spPr>
+          <a:xfrm>
+            <a:off x="2819400" y="1906214"/>
+            <a:ext cx="484654" cy="523220"/>
+          </a:xfrm>
+          <a:prstGeom prst="rect">
+            <a:avLst/>
+          </a:prstGeom>
+          <a:noFill/>
+        </p:spPr>
+        <p:txBody>
+          <a:bodyPr wrap="square" rtlCol="0">
+            <a:spAutoFit/>
+          </a:bodyPr>
+          <a:lstStyle/>
+          <a:p>
+            <a:r>
+              <a:rPr lang="en-IN" sz="2800" b="1"/>
+              <a:t>P</a:t>
+            </a:r>
+          </a:p>
+        </p:txBody>
+      </p:sp>
+      <p:sp>
+        <p:nvSpPr>
+          <p:cNvPr id="22" name="TextBox 21">
+            <a:extLst>
+              <a:ext uri="{FF2B5EF4-FFF2-40B4-BE49-F238E27FC236}">
+                <a16:creationId xmlns:a16="http://schemas.microsoft.com/office/drawing/2014/main" id="{7E457FA5-E80E-4D9C-BDF0-A7E694E0A45A}"/>
+              </a:ext>
+            </a:extLst>
+          </p:cNvPr>
+          <p:cNvSpPr txBox="1"/>
+          <p:nvPr/>
+        </p:nvSpPr>
+        <p:spPr>
+          <a:xfrm>
+            <a:off x="4204165" y="328428"/>
+            <a:ext cx="484654" cy="523220"/>
+          </a:xfrm>
+          <a:prstGeom prst="rect">
+            <a:avLst/>
+          </a:prstGeom>
+          <a:noFill/>
+        </p:spPr>
+        <p:txBody>
+          <a:bodyPr wrap="square" rtlCol="0">
+            <a:spAutoFit/>
+          </a:bodyPr>
+          <a:lstStyle/>
+          <a:p>
+            <a:r>
+              <a:rPr lang="en-IN" sz="2800" b="1"/>
+              <a:t>P</a:t>
+            </a:r>
+          </a:p>
+        </p:txBody>
+      </p:sp>
+      <p:cxnSp>
+        <p:nvCxnSpPr>
+          <p:cNvPr id="12" name="Straight Connector 11">
+            <a:extLst>
+              <a:ext uri="{FF2B5EF4-FFF2-40B4-BE49-F238E27FC236}">
+                <a16:creationId xmlns:a16="http://schemas.microsoft.com/office/drawing/2014/main" id="{61D9CB60-A278-489E-A5A6-282C8E032FFA}"/>
+              </a:ext>
+            </a:extLst>
+          </p:cNvPr>
+          <p:cNvCxnSpPr/>
+          <p:nvPr/>
+        </p:nvCxnSpPr>
+        <p:spPr>
+          <a:xfrm flipV="1">
+            <a:off x="3304054" y="590038"/>
+            <a:ext cx="0" cy="564776"/>
+          </a:xfrm>
+          <a:prstGeom prst="line">
+            <a:avLst/>
+          </a:prstGeom>
+          <a:ln w="38100"/>
+        </p:spPr>
+        <p:style>
+          <a:lnRef idx="1">
+            <a:schemeClr val="dk1"/>
+          </a:lnRef>
+          <a:fillRef idx="0">
+            <a:schemeClr val="dk1"/>
+          </a:fillRef>
+          <a:effectRef idx="0">
+            <a:schemeClr val="dk1"/>
+          </a:effectRef>
+          <a:fontRef idx="minor">
+            <a:schemeClr val="tx1"/>
+          </a:fontRef>
+        </p:style>
+      </p:cxnSp>
+      <p:cxnSp>
+        <p:nvCxnSpPr>
+          <p:cNvPr id="19" name="Straight Connector 18">
+            <a:extLst>
+              <a:ext uri="{FF2B5EF4-FFF2-40B4-BE49-F238E27FC236}">
+                <a16:creationId xmlns:a16="http://schemas.microsoft.com/office/drawing/2014/main" id="{C2CE69AE-E060-44D7-BD4C-BCF21B63A7F4}"/>
+              </a:ext>
+            </a:extLst>
+          </p:cNvPr>
+          <p:cNvCxnSpPr/>
+          <p:nvPr/>
+        </p:nvCxnSpPr>
+        <p:spPr>
+          <a:xfrm flipH="1">
+            <a:off x="3155575" y="590038"/>
+            <a:ext cx="300317" cy="0"/>
+          </a:xfrm>
+          <a:prstGeom prst="line">
+            <a:avLst/>
+          </a:prstGeom>
+          <a:ln w="28575"/>
+        </p:spPr>
+        <p:style>
+          <a:lnRef idx="1">
+            <a:schemeClr val="dk1"/>
+          </a:lnRef>
+          <a:fillRef idx="0">
+            <a:schemeClr val="dk1"/>
+          </a:fillRef>
+          <a:effectRef idx="0">
+            <a:schemeClr val="dk1"/>
+          </a:effectRef>
+          <a:fontRef idx="minor">
+            <a:schemeClr val="tx1"/>
+          </a:fontRef>
+        </p:style>
+      </p:cxnSp>
+      <p:cxnSp>
+        <p:nvCxnSpPr>
+          <p:cNvPr id="27" name="Straight Connector 26">
+            <a:extLst>
+              <a:ext uri="{FF2B5EF4-FFF2-40B4-BE49-F238E27FC236}">
+                <a16:creationId xmlns:a16="http://schemas.microsoft.com/office/drawing/2014/main" id="{633F7756-5BCB-4104-BABF-41766487BFD9}"/>
+              </a:ext>
+            </a:extLst>
+          </p:cNvPr>
+          <p:cNvCxnSpPr/>
+          <p:nvPr/>
+        </p:nvCxnSpPr>
+        <p:spPr>
+          <a:xfrm flipH="1">
+            <a:off x="3142690" y="1154814"/>
+            <a:ext cx="300317" cy="0"/>
+          </a:xfrm>
+          <a:prstGeom prst="line">
+            <a:avLst/>
+          </a:prstGeom>
+          <a:ln w="28575"/>
+        </p:spPr>
+        <p:style>
+          <a:lnRef idx="1">
+            <a:schemeClr val="dk1"/>
+          </a:lnRef>
+          <a:fillRef idx="0">
+            <a:schemeClr val="dk1"/>
+          </a:fillRef>
+          <a:effectRef idx="0">
+            <a:schemeClr val="dk1"/>
+          </a:effectRef>
+          <a:fontRef idx="minor">
+            <a:schemeClr val="tx1"/>
+          </a:fontRef>
+        </p:style>
+      </p:cxnSp>
+      <p:sp>
+        <p:nvSpPr>
+          <p:cNvPr id="28" name="TextBox 27">
+            <a:extLst>
+              <a:ext uri="{FF2B5EF4-FFF2-40B4-BE49-F238E27FC236}">
+                <a16:creationId xmlns:a16="http://schemas.microsoft.com/office/drawing/2014/main" id="{6E74DB0A-AE12-462A-B1BA-3DABD02C2808}"/>
+              </a:ext>
+            </a:extLst>
+          </p:cNvPr>
+          <p:cNvSpPr txBox="1"/>
+          <p:nvPr/>
+        </p:nvSpPr>
+        <p:spPr>
+          <a:xfrm>
+            <a:off x="2902463" y="607970"/>
+            <a:ext cx="300316" cy="523220"/>
+          </a:xfrm>
+          <a:prstGeom prst="rect">
+            <a:avLst/>
+          </a:prstGeom>
+          <a:noFill/>
+        </p:spPr>
+        <p:txBody>
+          <a:bodyPr wrap="square" rtlCol="0">
+            <a:spAutoFit/>
+          </a:bodyPr>
+          <a:lstStyle/>
+          <a:p>
+            <a:r>
+              <a:rPr lang="en-IN" sz="2800" b="1"/>
+              <a:t>a</a:t>
+            </a:r>
+          </a:p>
+        </p:txBody>
+      </p:sp>
+      <p:cxnSp>
+        <p:nvCxnSpPr>
+          <p:cNvPr id="29" name="Straight Connector 28">
+            <a:extLst>
+              <a:ext uri="{FF2B5EF4-FFF2-40B4-BE49-F238E27FC236}">
+                <a16:creationId xmlns:a16="http://schemas.microsoft.com/office/drawing/2014/main" id="{6F567DA2-C1EE-47C7-9AD9-8A6EACBEDACF}"/>
+              </a:ext>
+            </a:extLst>
+          </p:cNvPr>
+          <p:cNvCxnSpPr/>
+          <p:nvPr/>
+        </p:nvCxnSpPr>
+        <p:spPr>
+          <a:xfrm flipV="1">
+            <a:off x="4048125" y="1603049"/>
+            <a:ext cx="0" cy="564776"/>
+          </a:xfrm>
+          <a:prstGeom prst="line">
+            <a:avLst/>
+          </a:prstGeom>
+          <a:ln w="38100"/>
+        </p:spPr>
+        <p:style>
+          <a:lnRef idx="1">
+            <a:schemeClr val="dk1"/>
+          </a:lnRef>
+          <a:fillRef idx="0">
+            <a:schemeClr val="dk1"/>
+          </a:fillRef>
+          <a:effectRef idx="0">
+            <a:schemeClr val="dk1"/>
+          </a:effectRef>
+          <a:fontRef idx="minor">
+            <a:schemeClr val="tx1"/>
+          </a:fontRef>
+        </p:style>
+      </p:cxnSp>
+      <p:cxnSp>
+        <p:nvCxnSpPr>
+          <p:cNvPr id="30" name="Straight Connector 29">
+            <a:extLst>
+              <a:ext uri="{FF2B5EF4-FFF2-40B4-BE49-F238E27FC236}">
+                <a16:creationId xmlns:a16="http://schemas.microsoft.com/office/drawing/2014/main" id="{454A7901-8D44-4FD2-A8D0-F52C192C7B8F}"/>
+              </a:ext>
+            </a:extLst>
+          </p:cNvPr>
+          <p:cNvCxnSpPr/>
+          <p:nvPr/>
+        </p:nvCxnSpPr>
+        <p:spPr>
+          <a:xfrm flipH="1">
+            <a:off x="3899646" y="1603049"/>
+            <a:ext cx="300317" cy="0"/>
+          </a:xfrm>
+          <a:prstGeom prst="line">
+            <a:avLst/>
+          </a:prstGeom>
+          <a:ln w="28575"/>
+        </p:spPr>
+        <p:style>
+          <a:lnRef idx="1">
+            <a:schemeClr val="dk1"/>
+          </a:lnRef>
+          <a:fillRef idx="0">
+            <a:schemeClr val="dk1"/>
+          </a:fillRef>
+          <a:effectRef idx="0">
+            <a:schemeClr val="dk1"/>
+          </a:effectRef>
+          <a:fontRef idx="minor">
+            <a:schemeClr val="tx1"/>
+          </a:fontRef>
+        </p:style>
+      </p:cxnSp>
+      <p:cxnSp>
+        <p:nvCxnSpPr>
+          <p:cNvPr id="31" name="Straight Connector 30">
+            <a:extLst>
+              <a:ext uri="{FF2B5EF4-FFF2-40B4-BE49-F238E27FC236}">
+                <a16:creationId xmlns:a16="http://schemas.microsoft.com/office/drawing/2014/main" id="{1712536A-E64C-483B-8476-72F27E404A10}"/>
+              </a:ext>
+            </a:extLst>
+          </p:cNvPr>
+          <p:cNvCxnSpPr/>
+          <p:nvPr/>
+        </p:nvCxnSpPr>
+        <p:spPr>
+          <a:xfrm flipH="1">
+            <a:off x="3886761" y="2167825"/>
+            <a:ext cx="300317" cy="0"/>
+          </a:xfrm>
+          <a:prstGeom prst="line">
+            <a:avLst/>
+          </a:prstGeom>
+          <a:ln w="28575"/>
+        </p:spPr>
+        <p:style>
+          <a:lnRef idx="1">
+            <a:schemeClr val="dk1"/>
+          </a:lnRef>
+          <a:fillRef idx="0">
+            <a:schemeClr val="dk1"/>
+          </a:fillRef>
+          <a:effectRef idx="0">
+            <a:schemeClr val="dk1"/>
+          </a:effectRef>
+          <a:fontRef idx="minor">
+            <a:schemeClr val="tx1"/>
+          </a:fontRef>
+        </p:style>
+      </p:cxnSp>
+      <p:sp>
+        <p:nvSpPr>
+          <p:cNvPr id="32" name="TextBox 31">
+            <a:extLst>
+              <a:ext uri="{FF2B5EF4-FFF2-40B4-BE49-F238E27FC236}">
+                <a16:creationId xmlns:a16="http://schemas.microsoft.com/office/drawing/2014/main" id="{4789E3C4-FD26-4457-BF75-F87308EEF0CC}"/>
+              </a:ext>
+            </a:extLst>
+          </p:cNvPr>
+          <p:cNvSpPr txBox="1"/>
+          <p:nvPr/>
+        </p:nvSpPr>
+        <p:spPr>
+          <a:xfrm>
+            <a:off x="4048126" y="1603048"/>
+            <a:ext cx="300316" cy="523220"/>
+          </a:xfrm>
+          <a:prstGeom prst="rect">
+            <a:avLst/>
+          </a:prstGeom>
+          <a:noFill/>
+        </p:spPr>
+        <p:txBody>
+          <a:bodyPr wrap="square" rtlCol="0">
+            <a:spAutoFit/>
+          </a:bodyPr>
+          <a:lstStyle/>
+          <a:p>
+            <a:r>
+              <a:rPr lang="en-IN" sz="2800" b="1"/>
+              <a:t>a</a:t>
+            </a:r>
+          </a:p>
+        </p:txBody>
+      </p:sp>
+      <p:sp>
+        <p:nvSpPr>
+          <p:cNvPr id="33" name="Rectangle 32">
+            <a:extLst>
+              <a:ext uri="{FF2B5EF4-FFF2-40B4-BE49-F238E27FC236}">
+                <a16:creationId xmlns:a16="http://schemas.microsoft.com/office/drawing/2014/main" id="{903A5B5D-90C4-4767-9BF1-878F7C1D51A4}"/>
+              </a:ext>
+            </a:extLst>
+          </p:cNvPr>
+          <p:cNvSpPr/>
+          <p:nvPr/>
+        </p:nvSpPr>
+        <p:spPr>
+          <a:xfrm>
+            <a:off x="3579578" y="2833874"/>
+            <a:ext cx="203523" cy="1007504"/>
+          </a:xfrm>
+          <a:prstGeom prst="rect">
+            <a:avLst/>
+          </a:prstGeom>
+        </p:spPr>
+        <p:style>
+          <a:lnRef idx="1">
+            <a:schemeClr val="accent1"/>
+          </a:lnRef>
+          <a:fillRef idx="2">
+            <a:schemeClr val="accent1"/>
+          </a:fillRef>
+          <a:effectRef idx="1">
+            <a:schemeClr val="accent1"/>
+          </a:effectRef>
+          <a:fontRef idx="minor">
+            <a:schemeClr val="dk1"/>
+          </a:fontRef>
+        </p:style>
+        <p:txBody>
+          <a:bodyPr rtlCol="0" anchor="ctr"/>
+          <a:lstStyle/>
+          <a:p>
+            <a:pPr algn="ctr"/>
+            <a:endParaRPr lang="en-IN"/>
+          </a:p>
+        </p:txBody>
+      </p:sp>
+      <p:cxnSp>
+        <p:nvCxnSpPr>
+          <p:cNvPr id="34" name="Straight Arrow Connector 33">
+            <a:extLst>
+              <a:ext uri="{FF2B5EF4-FFF2-40B4-BE49-F238E27FC236}">
+                <a16:creationId xmlns:a16="http://schemas.microsoft.com/office/drawing/2014/main" id="{75AE8B38-9854-4FB4-A35A-000DE0D84490}"/>
+              </a:ext>
+            </a:extLst>
+          </p:cNvPr>
+          <p:cNvCxnSpPr>
+            <a:cxnSpLocks/>
+          </p:cNvCxnSpPr>
+          <p:nvPr/>
+        </p:nvCxnSpPr>
+        <p:spPr>
+          <a:xfrm>
+            <a:off x="3575093" y="2833873"/>
+            <a:ext cx="623049" cy="0"/>
+          </a:xfrm>
+          <a:prstGeom prst="straightConnector1">
+            <a:avLst/>
+          </a:prstGeom>
+          <a:ln w="57150">
+            <a:tailEnd type="triangle"/>
+          </a:ln>
+        </p:spPr>
+        <p:style>
+          <a:lnRef idx="1">
+            <a:schemeClr val="dk1"/>
+          </a:lnRef>
+          <a:fillRef idx="0">
+            <a:schemeClr val="dk1"/>
+          </a:fillRef>
+          <a:effectRef idx="0">
+            <a:schemeClr val="dk1"/>
+          </a:effectRef>
+          <a:fontRef idx="minor">
+            <a:schemeClr val="tx1"/>
+          </a:fontRef>
+        </p:style>
+      </p:cxnSp>
+      <p:sp>
+        <p:nvSpPr>
+          <p:cNvPr id="35" name="TextBox 34">
+            <a:extLst>
+              <a:ext uri="{FF2B5EF4-FFF2-40B4-BE49-F238E27FC236}">
+                <a16:creationId xmlns:a16="http://schemas.microsoft.com/office/drawing/2014/main" id="{6A641363-BB8B-4FE5-9736-A096FCC86A0F}"/>
+              </a:ext>
+            </a:extLst>
+          </p:cNvPr>
+          <p:cNvSpPr txBox="1"/>
+          <p:nvPr/>
+        </p:nvSpPr>
+        <p:spPr>
+          <a:xfrm>
+            <a:off x="4188899" y="2572263"/>
+            <a:ext cx="484654" cy="523220"/>
+          </a:xfrm>
+          <a:prstGeom prst="rect">
+            <a:avLst/>
+          </a:prstGeom>
+          <a:noFill/>
+        </p:spPr>
+        <p:txBody>
+          <a:bodyPr wrap="square" rtlCol="0">
+            <a:spAutoFit/>
+          </a:bodyPr>
+          <a:lstStyle/>
+          <a:p>
+            <a:r>
+              <a:rPr lang="en-IN" sz="2800" b="1"/>
+              <a:t>P</a:t>
+            </a:r>
+          </a:p>
+        </p:txBody>
+      </p:sp>
+      <p:cxnSp>
+        <p:nvCxnSpPr>
+          <p:cNvPr id="36" name="Straight Connector 35">
+            <a:extLst>
+              <a:ext uri="{FF2B5EF4-FFF2-40B4-BE49-F238E27FC236}">
+                <a16:creationId xmlns:a16="http://schemas.microsoft.com/office/drawing/2014/main" id="{F4ADCB9D-C378-4BDB-AE09-895DDAAA8F4B}"/>
+              </a:ext>
+            </a:extLst>
+          </p:cNvPr>
+          <p:cNvCxnSpPr/>
+          <p:nvPr/>
+        </p:nvCxnSpPr>
+        <p:spPr>
+          <a:xfrm flipV="1">
+            <a:off x="3288788" y="2833873"/>
+            <a:ext cx="0" cy="564776"/>
+          </a:xfrm>
+          <a:prstGeom prst="line">
+            <a:avLst/>
+          </a:prstGeom>
+          <a:ln w="38100"/>
+        </p:spPr>
+        <p:style>
+          <a:lnRef idx="1">
+            <a:schemeClr val="dk1"/>
+          </a:lnRef>
+          <a:fillRef idx="0">
+            <a:schemeClr val="dk1"/>
+          </a:fillRef>
+          <a:effectRef idx="0">
+            <a:schemeClr val="dk1"/>
+          </a:effectRef>
+          <a:fontRef idx="minor">
+            <a:schemeClr val="tx1"/>
+          </a:fontRef>
+        </p:style>
+      </p:cxnSp>
+      <p:cxnSp>
+        <p:nvCxnSpPr>
+          <p:cNvPr id="37" name="Straight Connector 36">
+            <a:extLst>
+              <a:ext uri="{FF2B5EF4-FFF2-40B4-BE49-F238E27FC236}">
+                <a16:creationId xmlns:a16="http://schemas.microsoft.com/office/drawing/2014/main" id="{1816867F-CBD5-4AC4-806F-EEA0E07A1CE4}"/>
+              </a:ext>
+            </a:extLst>
+          </p:cNvPr>
+          <p:cNvCxnSpPr/>
+          <p:nvPr/>
+        </p:nvCxnSpPr>
+        <p:spPr>
+          <a:xfrm flipH="1">
+            <a:off x="3140309" y="2833873"/>
+            <a:ext cx="300317" cy="0"/>
+          </a:xfrm>
+          <a:prstGeom prst="line">
+            <a:avLst/>
+          </a:prstGeom>
+          <a:ln w="28575"/>
+        </p:spPr>
+        <p:style>
+          <a:lnRef idx="1">
+            <a:schemeClr val="dk1"/>
+          </a:lnRef>
+          <a:fillRef idx="0">
+            <a:schemeClr val="dk1"/>
+          </a:fillRef>
+          <a:effectRef idx="0">
+            <a:schemeClr val="dk1"/>
+          </a:effectRef>
+          <a:fontRef idx="minor">
+            <a:schemeClr val="tx1"/>
+          </a:fontRef>
+        </p:style>
+      </p:cxnSp>
+      <p:cxnSp>
+        <p:nvCxnSpPr>
+          <p:cNvPr id="38" name="Straight Connector 37">
+            <a:extLst>
+              <a:ext uri="{FF2B5EF4-FFF2-40B4-BE49-F238E27FC236}">
+                <a16:creationId xmlns:a16="http://schemas.microsoft.com/office/drawing/2014/main" id="{5E5EEA3D-E50F-4EEE-A90A-D334FA45F275}"/>
+              </a:ext>
+            </a:extLst>
+          </p:cNvPr>
+          <p:cNvCxnSpPr/>
+          <p:nvPr/>
+        </p:nvCxnSpPr>
+        <p:spPr>
+          <a:xfrm flipH="1">
+            <a:off x="3127424" y="3398649"/>
+            <a:ext cx="300317" cy="0"/>
+          </a:xfrm>
+          <a:prstGeom prst="line">
+            <a:avLst/>
+          </a:prstGeom>
+          <a:ln w="28575"/>
+        </p:spPr>
+        <p:style>
+          <a:lnRef idx="1">
+            <a:schemeClr val="dk1"/>
+          </a:lnRef>
+          <a:fillRef idx="0">
+            <a:schemeClr val="dk1"/>
+          </a:fillRef>
+          <a:effectRef idx="0">
+            <a:schemeClr val="dk1"/>
+          </a:effectRef>
+          <a:fontRef idx="minor">
+            <a:schemeClr val="tx1"/>
+          </a:fontRef>
+        </p:style>
+      </p:cxnSp>
+      <p:sp>
+        <p:nvSpPr>
+          <p:cNvPr id="39" name="TextBox 38">
+            <a:extLst>
+              <a:ext uri="{FF2B5EF4-FFF2-40B4-BE49-F238E27FC236}">
+                <a16:creationId xmlns:a16="http://schemas.microsoft.com/office/drawing/2014/main" id="{C8B7C981-A99F-4C0B-9DD1-2B2A40472152}"/>
+              </a:ext>
+            </a:extLst>
+          </p:cNvPr>
+          <p:cNvSpPr txBox="1"/>
+          <p:nvPr/>
+        </p:nvSpPr>
+        <p:spPr>
+          <a:xfrm>
+            <a:off x="2887197" y="2851805"/>
+            <a:ext cx="300316" cy="523220"/>
+          </a:xfrm>
+          <a:prstGeom prst="rect">
+            <a:avLst/>
+          </a:prstGeom>
+          <a:noFill/>
+        </p:spPr>
+        <p:txBody>
+          <a:bodyPr wrap="square" rtlCol="0">
+            <a:spAutoFit/>
+          </a:bodyPr>
+          <a:lstStyle/>
+          <a:p>
+            <a:r>
+              <a:rPr lang="en-IN" sz="2800" b="1"/>
+              <a:t>a</a:t>
+            </a:r>
+          </a:p>
+        </p:txBody>
+      </p:sp>
+      <p:sp>
+        <p:nvSpPr>
+          <p:cNvPr id="15" name="Rectangle 14">
+            <a:extLst>
+              <a:ext uri="{FF2B5EF4-FFF2-40B4-BE49-F238E27FC236}">
+                <a16:creationId xmlns:a16="http://schemas.microsoft.com/office/drawing/2014/main" id="{A5CF14C6-5B12-4FE5-B23F-7E5B82568BAF}"/>
+              </a:ext>
+            </a:extLst>
+          </p:cNvPr>
+          <p:cNvSpPr/>
+          <p:nvPr/>
+        </p:nvSpPr>
+        <p:spPr>
+          <a:xfrm>
+            <a:off x="2268070" y="3402107"/>
+            <a:ext cx="2841811" cy="448235"/>
+          </a:xfrm>
+          <a:prstGeom prst="rect">
+            <a:avLst/>
+          </a:prstGeom>
+        </p:spPr>
+        <p:style>
+          <a:lnRef idx="1">
+            <a:schemeClr val="accent1"/>
+          </a:lnRef>
+          <a:fillRef idx="2">
+            <a:schemeClr val="accent1"/>
+          </a:fillRef>
+          <a:effectRef idx="1">
+            <a:schemeClr val="accent1"/>
+          </a:effectRef>
+          <a:fontRef idx="minor">
+            <a:schemeClr val="dk1"/>
+          </a:fontRef>
+        </p:style>
+        <p:txBody>
+          <a:bodyPr rtlCol="0" anchor="ctr"/>
+          <a:lstStyle/>
+          <a:p>
+            <a:pPr algn="ctr"/>
+            <a:endParaRPr lang="en-IN"/>
+          </a:p>
+        </p:txBody>
+      </p:sp>
+      <p:sp>
+        <p:nvSpPr>
+          <p:cNvPr id="40" name="Rectangle 39">
+            <a:extLst>
+              <a:ext uri="{FF2B5EF4-FFF2-40B4-BE49-F238E27FC236}">
+                <a16:creationId xmlns:a16="http://schemas.microsoft.com/office/drawing/2014/main" id="{95C7FD66-B440-4409-B732-4A93653B9612}"/>
+              </a:ext>
+            </a:extLst>
+          </p:cNvPr>
+          <p:cNvSpPr/>
+          <p:nvPr/>
+        </p:nvSpPr>
+        <p:spPr>
+          <a:xfrm>
+            <a:off x="3579578" y="5081167"/>
+            <a:ext cx="203523" cy="1007504"/>
+          </a:xfrm>
+          <a:prstGeom prst="rect">
+            <a:avLst/>
+          </a:prstGeom>
+        </p:spPr>
+        <p:style>
+          <a:lnRef idx="1">
+            <a:schemeClr val="accent1"/>
+          </a:lnRef>
+          <a:fillRef idx="2">
+            <a:schemeClr val="accent1"/>
+          </a:fillRef>
+          <a:effectRef idx="1">
+            <a:schemeClr val="accent1"/>
+          </a:effectRef>
+          <a:fontRef idx="minor">
+            <a:schemeClr val="dk1"/>
+          </a:fontRef>
+        </p:style>
+        <p:txBody>
+          <a:bodyPr rtlCol="0" anchor="ctr"/>
+          <a:lstStyle/>
+          <a:p>
+            <a:pPr algn="ctr"/>
+            <a:endParaRPr lang="en-IN"/>
+          </a:p>
+        </p:txBody>
+      </p:sp>
+      <p:sp>
+        <p:nvSpPr>
+          <p:cNvPr id="42" name="TextBox 41">
+            <a:extLst>
+              <a:ext uri="{FF2B5EF4-FFF2-40B4-BE49-F238E27FC236}">
+                <a16:creationId xmlns:a16="http://schemas.microsoft.com/office/drawing/2014/main" id="{6619A9A3-3373-4974-9CB7-2DFF1CF82312}"/>
+              </a:ext>
+            </a:extLst>
+          </p:cNvPr>
+          <p:cNvSpPr txBox="1"/>
+          <p:nvPr/>
+        </p:nvSpPr>
+        <p:spPr>
+          <a:xfrm>
+            <a:off x="4204165" y="4099721"/>
+            <a:ext cx="484654" cy="523220"/>
+          </a:xfrm>
+          <a:prstGeom prst="rect">
+            <a:avLst/>
+          </a:prstGeom>
+          <a:noFill/>
+        </p:spPr>
+        <p:txBody>
+          <a:bodyPr wrap="square" rtlCol="0">
+            <a:spAutoFit/>
+          </a:bodyPr>
+          <a:lstStyle/>
+          <a:p>
+            <a:r>
+              <a:rPr lang="en-IN" sz="2800" b="1"/>
+              <a:t>P</a:t>
+            </a:r>
+          </a:p>
+        </p:txBody>
+      </p:sp>
+      <p:cxnSp>
+        <p:nvCxnSpPr>
+          <p:cNvPr id="43" name="Straight Connector 42">
+            <a:extLst>
+              <a:ext uri="{FF2B5EF4-FFF2-40B4-BE49-F238E27FC236}">
+                <a16:creationId xmlns:a16="http://schemas.microsoft.com/office/drawing/2014/main" id="{43B7DC92-84C1-4F1A-9BEC-174B3DF85C56}"/>
+              </a:ext>
+            </a:extLst>
+          </p:cNvPr>
+          <p:cNvCxnSpPr/>
+          <p:nvPr/>
+        </p:nvCxnSpPr>
+        <p:spPr>
+          <a:xfrm flipV="1">
+            <a:off x="3288788" y="5081166"/>
+            <a:ext cx="0" cy="564776"/>
+          </a:xfrm>
+          <a:prstGeom prst="line">
+            <a:avLst/>
+          </a:prstGeom>
+          <a:ln w="38100"/>
+        </p:spPr>
+        <p:style>
+          <a:lnRef idx="1">
+            <a:schemeClr val="dk1"/>
+          </a:lnRef>
+          <a:fillRef idx="0">
+            <a:schemeClr val="dk1"/>
+          </a:fillRef>
+          <a:effectRef idx="0">
+            <a:schemeClr val="dk1"/>
+          </a:effectRef>
+          <a:fontRef idx="minor">
+            <a:schemeClr val="tx1"/>
+          </a:fontRef>
+        </p:style>
+      </p:cxnSp>
+      <p:cxnSp>
+        <p:nvCxnSpPr>
+          <p:cNvPr id="44" name="Straight Connector 43">
+            <a:extLst>
+              <a:ext uri="{FF2B5EF4-FFF2-40B4-BE49-F238E27FC236}">
+                <a16:creationId xmlns:a16="http://schemas.microsoft.com/office/drawing/2014/main" id="{6E41CF1F-3EA0-4281-8826-A41204039B6C}"/>
+              </a:ext>
+            </a:extLst>
+          </p:cNvPr>
+          <p:cNvCxnSpPr/>
+          <p:nvPr/>
+        </p:nvCxnSpPr>
+        <p:spPr>
+          <a:xfrm flipH="1">
+            <a:off x="3140309" y="5081166"/>
+            <a:ext cx="300317" cy="0"/>
+          </a:xfrm>
+          <a:prstGeom prst="line">
+            <a:avLst/>
+          </a:prstGeom>
+          <a:ln w="28575"/>
+        </p:spPr>
+        <p:style>
+          <a:lnRef idx="1">
+            <a:schemeClr val="dk1"/>
+          </a:lnRef>
+          <a:fillRef idx="0">
+            <a:schemeClr val="dk1"/>
+          </a:fillRef>
+          <a:effectRef idx="0">
+            <a:schemeClr val="dk1"/>
+          </a:effectRef>
+          <a:fontRef idx="minor">
+            <a:schemeClr val="tx1"/>
+          </a:fontRef>
+        </p:style>
+      </p:cxnSp>
+      <p:cxnSp>
+        <p:nvCxnSpPr>
+          <p:cNvPr id="45" name="Straight Connector 44">
+            <a:extLst>
+              <a:ext uri="{FF2B5EF4-FFF2-40B4-BE49-F238E27FC236}">
+                <a16:creationId xmlns:a16="http://schemas.microsoft.com/office/drawing/2014/main" id="{16BFDFB0-3F71-47EF-89F9-5AFC52063070}"/>
+              </a:ext>
+            </a:extLst>
+          </p:cNvPr>
+          <p:cNvCxnSpPr/>
+          <p:nvPr/>
+        </p:nvCxnSpPr>
+        <p:spPr>
+          <a:xfrm flipH="1">
+            <a:off x="3127424" y="5645942"/>
+            <a:ext cx="300317" cy="0"/>
+          </a:xfrm>
+          <a:prstGeom prst="line">
+            <a:avLst/>
+          </a:prstGeom>
+          <a:ln w="28575"/>
+        </p:spPr>
+        <p:style>
+          <a:lnRef idx="1">
+            <a:schemeClr val="dk1"/>
+          </a:lnRef>
+          <a:fillRef idx="0">
+            <a:schemeClr val="dk1"/>
+          </a:fillRef>
+          <a:effectRef idx="0">
+            <a:schemeClr val="dk1"/>
+          </a:effectRef>
+          <a:fontRef idx="minor">
+            <a:schemeClr val="tx1"/>
+          </a:fontRef>
+        </p:style>
+      </p:cxnSp>
+      <p:sp>
+        <p:nvSpPr>
+          <p:cNvPr id="46" name="TextBox 45">
+            <a:extLst>
+              <a:ext uri="{FF2B5EF4-FFF2-40B4-BE49-F238E27FC236}">
+                <a16:creationId xmlns:a16="http://schemas.microsoft.com/office/drawing/2014/main" id="{BAE7100E-A37F-4BA6-9873-60CD2A477E7B}"/>
+              </a:ext>
+            </a:extLst>
+          </p:cNvPr>
+          <p:cNvSpPr txBox="1"/>
+          <p:nvPr/>
+        </p:nvSpPr>
+        <p:spPr>
+          <a:xfrm>
+            <a:off x="2887197" y="5099098"/>
+            <a:ext cx="300316" cy="523220"/>
+          </a:xfrm>
+          <a:prstGeom prst="rect">
+            <a:avLst/>
+          </a:prstGeom>
+          <a:noFill/>
+        </p:spPr>
+        <p:txBody>
+          <a:bodyPr wrap="square" rtlCol="0">
+            <a:spAutoFit/>
+          </a:bodyPr>
+          <a:lstStyle/>
+          <a:p>
+            <a:r>
+              <a:rPr lang="en-IN" sz="2800" b="1"/>
+              <a:t>a</a:t>
+            </a:r>
+          </a:p>
+        </p:txBody>
+      </p:sp>
+      <p:sp>
+        <p:nvSpPr>
+          <p:cNvPr id="47" name="Rectangle 46">
+            <a:extLst>
+              <a:ext uri="{FF2B5EF4-FFF2-40B4-BE49-F238E27FC236}">
+                <a16:creationId xmlns:a16="http://schemas.microsoft.com/office/drawing/2014/main" id="{9F851FA1-1F8B-4CC6-9FB2-EC0271238B8B}"/>
+              </a:ext>
+            </a:extLst>
+          </p:cNvPr>
+          <p:cNvSpPr/>
+          <p:nvPr/>
+        </p:nvSpPr>
+        <p:spPr>
+          <a:xfrm>
+            <a:off x="2268070" y="5649400"/>
+            <a:ext cx="2841811" cy="448235"/>
+          </a:xfrm>
+          <a:prstGeom prst="rect">
+            <a:avLst/>
+          </a:prstGeom>
+        </p:spPr>
+        <p:style>
+          <a:lnRef idx="1">
+            <a:schemeClr val="accent1"/>
+          </a:lnRef>
+          <a:fillRef idx="2">
+            <a:schemeClr val="accent1"/>
+          </a:fillRef>
+          <a:effectRef idx="1">
+            <a:schemeClr val="accent1"/>
+          </a:effectRef>
+          <a:fontRef idx="minor">
+            <a:schemeClr val="dk1"/>
+          </a:fontRef>
+        </p:style>
+        <p:txBody>
+          <a:bodyPr rtlCol="0" anchor="ctr"/>
+          <a:lstStyle/>
+          <a:p>
+            <a:pPr algn="ctr"/>
+            <a:endParaRPr lang="en-IN"/>
+          </a:p>
+        </p:txBody>
+      </p:sp>
+      <p:sp>
+        <p:nvSpPr>
+          <p:cNvPr id="48" name="Rectangle 47">
+            <a:extLst>
+              <a:ext uri="{FF2B5EF4-FFF2-40B4-BE49-F238E27FC236}">
+                <a16:creationId xmlns:a16="http://schemas.microsoft.com/office/drawing/2014/main" id="{D3CAB865-F0AF-4599-AAAB-BE864E265435}"/>
+              </a:ext>
+            </a:extLst>
+          </p:cNvPr>
+          <p:cNvSpPr/>
+          <p:nvPr/>
+        </p:nvSpPr>
+        <p:spPr>
+          <a:xfrm flipH="1">
+            <a:off x="3580137" y="5073836"/>
+            <a:ext cx="797447" cy="251317"/>
+          </a:xfrm>
+          <a:prstGeom prst="rect">
+            <a:avLst/>
+          </a:prstGeom>
+        </p:spPr>
+        <p:style>
+          <a:lnRef idx="1">
+            <a:schemeClr val="accent1"/>
+          </a:lnRef>
+          <a:fillRef idx="2">
+            <a:schemeClr val="accent1"/>
+          </a:fillRef>
+          <a:effectRef idx="1">
+            <a:schemeClr val="accent1"/>
+          </a:effectRef>
+          <a:fontRef idx="minor">
+            <a:schemeClr val="dk1"/>
+          </a:fontRef>
+        </p:style>
+        <p:txBody>
+          <a:bodyPr rtlCol="0" anchor="ctr"/>
+          <a:lstStyle/>
+          <a:p>
+            <a:pPr algn="ctr"/>
+            <a:endParaRPr lang="en-IN"/>
+          </a:p>
+        </p:txBody>
+      </p:sp>
+      <p:cxnSp>
+        <p:nvCxnSpPr>
+          <p:cNvPr id="49" name="Straight Arrow Connector 48">
+            <a:extLst>
+              <a:ext uri="{FF2B5EF4-FFF2-40B4-BE49-F238E27FC236}">
+                <a16:creationId xmlns:a16="http://schemas.microsoft.com/office/drawing/2014/main" id="{095BD049-4D34-49FC-AED4-58AF8A40DE45}"/>
+              </a:ext>
+            </a:extLst>
+          </p:cNvPr>
+          <p:cNvCxnSpPr>
+            <a:cxnSpLocks/>
+          </p:cNvCxnSpPr>
+          <p:nvPr/>
+        </p:nvCxnSpPr>
+        <p:spPr>
+          <a:xfrm>
+            <a:off x="4377584" y="4562847"/>
+            <a:ext cx="0" cy="510989"/>
+          </a:xfrm>
+          <a:prstGeom prst="straightConnector1">
+            <a:avLst/>
+          </a:prstGeom>
+          <a:ln w="57150">
+            <a:tailEnd type="triangle"/>
+          </a:ln>
+        </p:spPr>
+        <p:style>
+          <a:lnRef idx="1">
+            <a:schemeClr val="dk1"/>
+          </a:lnRef>
+          <a:fillRef idx="0">
+            <a:schemeClr val="dk1"/>
+          </a:fillRef>
+          <a:effectRef idx="0">
+            <a:schemeClr val="dk1"/>
+          </a:effectRef>
+          <a:fontRef idx="minor">
+            <a:schemeClr val="tx1"/>
+          </a:fontRef>
+        </p:style>
+      </p:cxnSp>
+      <p:cxnSp>
+        <p:nvCxnSpPr>
+          <p:cNvPr id="24" name="Straight Connector 23">
+            <a:extLst>
+              <a:ext uri="{FF2B5EF4-FFF2-40B4-BE49-F238E27FC236}">
+                <a16:creationId xmlns:a16="http://schemas.microsoft.com/office/drawing/2014/main" id="{41E2B9C6-0833-4F8A-974A-9B8348F520E7}"/>
+              </a:ext>
+            </a:extLst>
+          </p:cNvPr>
+          <p:cNvCxnSpPr/>
+          <p:nvPr/>
+        </p:nvCxnSpPr>
+        <p:spPr>
+          <a:xfrm>
+            <a:off x="3594845" y="6275294"/>
+            <a:ext cx="782739" cy="0"/>
+          </a:xfrm>
+          <a:prstGeom prst="line">
+            <a:avLst/>
+          </a:prstGeom>
+          <a:ln w="38100"/>
+        </p:spPr>
+        <p:style>
+          <a:lnRef idx="1">
+            <a:schemeClr val="dk1"/>
+          </a:lnRef>
+          <a:fillRef idx="0">
+            <a:schemeClr val="dk1"/>
+          </a:fillRef>
+          <a:effectRef idx="0">
+            <a:schemeClr val="dk1"/>
+          </a:effectRef>
+          <a:fontRef idx="minor">
+            <a:schemeClr val="tx1"/>
+          </a:fontRef>
+        </p:style>
+      </p:cxnSp>
+      <p:cxnSp>
+        <p:nvCxnSpPr>
+          <p:cNvPr id="53" name="Straight Connector 52">
+            <a:extLst>
+              <a:ext uri="{FF2B5EF4-FFF2-40B4-BE49-F238E27FC236}">
+                <a16:creationId xmlns:a16="http://schemas.microsoft.com/office/drawing/2014/main" id="{E54DA9D5-A8CD-4692-9909-3E41DAA53AB4}"/>
+              </a:ext>
+            </a:extLst>
+          </p:cNvPr>
+          <p:cNvCxnSpPr>
+            <a:cxnSpLocks/>
+          </p:cNvCxnSpPr>
+          <p:nvPr/>
+        </p:nvCxnSpPr>
+        <p:spPr>
+          <a:xfrm flipV="1">
+            <a:off x="3573834" y="6097635"/>
+            <a:ext cx="0" cy="356953"/>
+          </a:xfrm>
+          <a:prstGeom prst="line">
+            <a:avLst/>
+          </a:prstGeom>
+          <a:ln w="38100"/>
+        </p:spPr>
+        <p:style>
+          <a:lnRef idx="1">
+            <a:schemeClr val="dk1"/>
+          </a:lnRef>
+          <a:fillRef idx="0">
+            <a:schemeClr val="dk1"/>
+          </a:fillRef>
+          <a:effectRef idx="0">
+            <a:schemeClr val="dk1"/>
+          </a:effectRef>
+          <a:fontRef idx="minor">
+            <a:schemeClr val="tx1"/>
+          </a:fontRef>
+        </p:style>
+      </p:cxnSp>
+      <p:cxnSp>
+        <p:nvCxnSpPr>
+          <p:cNvPr id="55" name="Straight Connector 54">
+            <a:extLst>
+              <a:ext uri="{FF2B5EF4-FFF2-40B4-BE49-F238E27FC236}">
+                <a16:creationId xmlns:a16="http://schemas.microsoft.com/office/drawing/2014/main" id="{FF0F2A74-127A-4085-BA9B-C5A5D34D8C87}"/>
+              </a:ext>
+            </a:extLst>
+          </p:cNvPr>
+          <p:cNvCxnSpPr>
+            <a:cxnSpLocks/>
+          </p:cNvCxnSpPr>
+          <p:nvPr/>
+        </p:nvCxnSpPr>
+        <p:spPr>
+          <a:xfrm flipV="1">
+            <a:off x="4377584" y="6097635"/>
+            <a:ext cx="0" cy="356953"/>
+          </a:xfrm>
+          <a:prstGeom prst="line">
+            <a:avLst/>
+          </a:prstGeom>
+          <a:ln w="38100"/>
+        </p:spPr>
+        <p:style>
+          <a:lnRef idx="1">
+            <a:schemeClr val="dk1"/>
+          </a:lnRef>
+          <a:fillRef idx="0">
+            <a:schemeClr val="dk1"/>
+          </a:fillRef>
+          <a:effectRef idx="0">
+            <a:schemeClr val="dk1"/>
+          </a:effectRef>
+          <a:fontRef idx="minor">
+            <a:schemeClr val="tx1"/>
+          </a:fontRef>
+        </p:style>
+      </p:cxnSp>
+      <p:sp>
+        <p:nvSpPr>
+          <p:cNvPr id="56" name="TextBox 55">
+            <a:extLst>
+              <a:ext uri="{FF2B5EF4-FFF2-40B4-BE49-F238E27FC236}">
+                <a16:creationId xmlns:a16="http://schemas.microsoft.com/office/drawing/2014/main" id="{1964492E-AB5A-4746-8960-839B78C07FF9}"/>
+              </a:ext>
+            </a:extLst>
+          </p:cNvPr>
+          <p:cNvSpPr txBox="1"/>
+          <p:nvPr/>
+        </p:nvSpPr>
+        <p:spPr>
+          <a:xfrm>
+            <a:off x="3783101" y="6146524"/>
+            <a:ext cx="300316" cy="523220"/>
+          </a:xfrm>
+          <a:prstGeom prst="rect">
+            <a:avLst/>
+          </a:prstGeom>
+          <a:noFill/>
+        </p:spPr>
+        <p:txBody>
+          <a:bodyPr wrap="square" rtlCol="0">
+            <a:spAutoFit/>
+          </a:bodyPr>
+          <a:lstStyle/>
+          <a:p>
+            <a:r>
+              <a:rPr lang="en-IN" sz="2800" b="1"/>
+              <a:t>a</a:t>
+            </a:r>
+          </a:p>
+        </p:txBody>
+      </p:sp>
+      <p:sp>
+        <p:nvSpPr>
+          <p:cNvPr id="57" name="TextBox 56">
+            <a:extLst>
+              <a:ext uri="{FF2B5EF4-FFF2-40B4-BE49-F238E27FC236}">
+                <a16:creationId xmlns:a16="http://schemas.microsoft.com/office/drawing/2014/main" id="{C19B2BA9-5C26-4182-B6C5-44F130444B1F}"/>
+              </a:ext>
+            </a:extLst>
+          </p:cNvPr>
+          <p:cNvSpPr txBox="1"/>
+          <p:nvPr/>
+        </p:nvSpPr>
+        <p:spPr>
+          <a:xfrm>
+            <a:off x="6096000" y="948952"/>
+            <a:ext cx="484654" cy="707886"/>
+          </a:xfrm>
+          <a:prstGeom prst="rect">
+            <a:avLst/>
+          </a:prstGeom>
+          <a:noFill/>
+        </p:spPr>
+        <p:txBody>
+          <a:bodyPr wrap="square" rtlCol="0">
+            <a:spAutoFit/>
+          </a:bodyPr>
+          <a:lstStyle/>
+          <a:p>
+            <a:r>
+              <a:rPr lang="en-IN" sz="4000" b="1"/>
+              <a:t>=</a:t>
+            </a:r>
+          </a:p>
+        </p:txBody>
+      </p:sp>
+      <p:sp>
+        <p:nvSpPr>
+          <p:cNvPr id="60" name="TextBox 59">
+            <a:extLst>
+              <a:ext uri="{FF2B5EF4-FFF2-40B4-BE49-F238E27FC236}">
+                <a16:creationId xmlns:a16="http://schemas.microsoft.com/office/drawing/2014/main" id="{8090D1E7-724A-43FC-978B-8AF99185375A}"/>
+              </a:ext>
+            </a:extLst>
+          </p:cNvPr>
+          <p:cNvSpPr txBox="1"/>
+          <p:nvPr/>
+        </p:nvSpPr>
+        <p:spPr>
+          <a:xfrm>
+            <a:off x="6096000" y="3272281"/>
+            <a:ext cx="484654" cy="707886"/>
+          </a:xfrm>
+          <a:prstGeom prst="rect">
+            <a:avLst/>
+          </a:prstGeom>
+          <a:noFill/>
+        </p:spPr>
+        <p:txBody>
+          <a:bodyPr wrap="square" rtlCol="0">
+            <a:spAutoFit/>
+          </a:bodyPr>
+          <a:lstStyle/>
+          <a:p>
+            <a:r>
+              <a:rPr lang="en-IN" sz="4000" b="1"/>
+              <a:t>=</a:t>
+            </a:r>
+          </a:p>
+        </p:txBody>
+      </p:sp>
+      <p:sp>
+        <p:nvSpPr>
+          <p:cNvPr id="61" name="TextBox 60">
+            <a:extLst>
+              <a:ext uri="{FF2B5EF4-FFF2-40B4-BE49-F238E27FC236}">
+                <a16:creationId xmlns:a16="http://schemas.microsoft.com/office/drawing/2014/main" id="{2BE14721-1E7C-487F-BEC9-5E4DF91B06FA}"/>
+              </a:ext>
+            </a:extLst>
+          </p:cNvPr>
+          <p:cNvSpPr txBox="1"/>
+          <p:nvPr/>
+        </p:nvSpPr>
+        <p:spPr>
+          <a:xfrm>
+            <a:off x="6137458" y="5450615"/>
+            <a:ext cx="484654" cy="707886"/>
+          </a:xfrm>
+          <a:prstGeom prst="rect">
+            <a:avLst/>
+          </a:prstGeom>
+          <a:noFill/>
+        </p:spPr>
+        <p:txBody>
+          <a:bodyPr wrap="square" rtlCol="0">
+            <a:spAutoFit/>
+          </a:bodyPr>
+          <a:lstStyle/>
+          <a:p>
+            <a:r>
+              <a:rPr lang="en-IN" sz="4000" b="1"/>
+              <a:t>=</a:t>
+            </a:r>
+          </a:p>
+        </p:txBody>
+      </p:sp>
+      <p:sp>
+        <p:nvSpPr>
+          <p:cNvPr id="62" name="Rectangle 61">
+            <a:extLst>
+              <a:ext uri="{FF2B5EF4-FFF2-40B4-BE49-F238E27FC236}">
+                <a16:creationId xmlns:a16="http://schemas.microsoft.com/office/drawing/2014/main" id="{EBC891C9-F59B-4A12-A719-058CD7B2C151}"/>
+              </a:ext>
+            </a:extLst>
+          </p:cNvPr>
+          <p:cNvSpPr/>
+          <p:nvPr/>
+        </p:nvSpPr>
+        <p:spPr>
+          <a:xfrm>
+            <a:off x="7521110" y="1145850"/>
+            <a:ext cx="2841811" cy="448235"/>
+          </a:xfrm>
+          <a:prstGeom prst="rect">
+            <a:avLst/>
+          </a:prstGeom>
+        </p:spPr>
+        <p:style>
+          <a:lnRef idx="1">
+            <a:schemeClr val="accent1"/>
+          </a:lnRef>
+          <a:fillRef idx="2">
+            <a:schemeClr val="accent1"/>
+          </a:fillRef>
+          <a:effectRef idx="1">
+            <a:schemeClr val="accent1"/>
+          </a:effectRef>
+          <a:fontRef idx="minor">
+            <a:schemeClr val="dk1"/>
+          </a:fontRef>
+        </p:style>
+        <p:txBody>
+          <a:bodyPr rtlCol="0" anchor="ctr"/>
+          <a:lstStyle/>
+          <a:p>
+            <a:pPr algn="ctr"/>
+            <a:endParaRPr lang="en-IN"/>
+          </a:p>
+        </p:txBody>
+      </p:sp>
+      <p:sp>
+        <p:nvSpPr>
+          <p:cNvPr id="63" name="Rectangle 62">
+            <a:extLst>
+              <a:ext uri="{FF2B5EF4-FFF2-40B4-BE49-F238E27FC236}">
+                <a16:creationId xmlns:a16="http://schemas.microsoft.com/office/drawing/2014/main" id="{9C3306AB-31FD-48A5-A2BA-E1CBA9642A5B}"/>
+              </a:ext>
+            </a:extLst>
+          </p:cNvPr>
+          <p:cNvSpPr/>
+          <p:nvPr/>
+        </p:nvSpPr>
+        <p:spPr>
+          <a:xfrm>
+            <a:off x="7521110" y="3393143"/>
+            <a:ext cx="2841811" cy="448235"/>
+          </a:xfrm>
+          <a:prstGeom prst="rect">
+            <a:avLst/>
+          </a:prstGeom>
+        </p:spPr>
+        <p:style>
+          <a:lnRef idx="1">
+            <a:schemeClr val="accent1"/>
+          </a:lnRef>
+          <a:fillRef idx="2">
+            <a:schemeClr val="accent1"/>
+          </a:fillRef>
+          <a:effectRef idx="1">
+            <a:schemeClr val="accent1"/>
+          </a:effectRef>
+          <a:fontRef idx="minor">
+            <a:schemeClr val="dk1"/>
+          </a:fontRef>
+        </p:style>
+        <p:txBody>
+          <a:bodyPr rtlCol="0" anchor="ctr"/>
+          <a:lstStyle/>
+          <a:p>
+            <a:pPr algn="ctr"/>
+            <a:endParaRPr lang="en-IN"/>
+          </a:p>
+        </p:txBody>
+      </p:sp>
+      <p:sp>
+        <p:nvSpPr>
+          <p:cNvPr id="64" name="Rectangle 63">
+            <a:extLst>
+              <a:ext uri="{FF2B5EF4-FFF2-40B4-BE49-F238E27FC236}">
+                <a16:creationId xmlns:a16="http://schemas.microsoft.com/office/drawing/2014/main" id="{48FDC6AC-E123-4B6E-A68E-AE8BD3AC77A9}"/>
+              </a:ext>
+            </a:extLst>
+          </p:cNvPr>
+          <p:cNvSpPr/>
+          <p:nvPr/>
+        </p:nvSpPr>
+        <p:spPr>
+          <a:xfrm>
+            <a:off x="7521110" y="5640436"/>
+            <a:ext cx="2841811" cy="448235"/>
+          </a:xfrm>
+          <a:prstGeom prst="rect">
+            <a:avLst/>
+          </a:prstGeom>
+        </p:spPr>
+        <p:style>
+          <a:lnRef idx="1">
+            <a:schemeClr val="accent1"/>
+          </a:lnRef>
+          <a:fillRef idx="2">
+            <a:schemeClr val="accent1"/>
+          </a:fillRef>
+          <a:effectRef idx="1">
+            <a:schemeClr val="accent1"/>
+          </a:effectRef>
+          <a:fontRef idx="minor">
+            <a:schemeClr val="dk1"/>
+          </a:fontRef>
+        </p:style>
+        <p:txBody>
+          <a:bodyPr rtlCol="0" anchor="ctr"/>
+          <a:lstStyle/>
+          <a:p>
+            <a:pPr algn="ctr"/>
+            <a:endParaRPr lang="en-IN"/>
+          </a:p>
+        </p:txBody>
+      </p:sp>
+      <p:sp>
+        <p:nvSpPr>
+          <p:cNvPr id="26" name="Arc 25">
+            <a:extLst>
+              <a:ext uri="{FF2B5EF4-FFF2-40B4-BE49-F238E27FC236}">
+                <a16:creationId xmlns:a16="http://schemas.microsoft.com/office/drawing/2014/main" id="{026C0942-CF69-49FE-8E83-B01805B2146B}"/>
+              </a:ext>
+            </a:extLst>
+          </p:cNvPr>
+          <p:cNvSpPr/>
+          <p:nvPr/>
+        </p:nvSpPr>
+        <p:spPr>
+          <a:xfrm>
+            <a:off x="8436351" y="920425"/>
+            <a:ext cx="914400" cy="914400"/>
+          </a:xfrm>
+          <a:prstGeom prst="arc">
+            <a:avLst>
+              <a:gd name="adj1" fmla="val 16200000"/>
+              <a:gd name="adj2" fmla="val 5430758"/>
+            </a:avLst>
+          </a:prstGeom>
+          <a:ln w="57150"/>
+        </p:spPr>
+        <p:style>
+          <a:lnRef idx="1">
+            <a:schemeClr val="dk1"/>
+          </a:lnRef>
+          <a:fillRef idx="0">
+            <a:schemeClr val="dk1"/>
+          </a:fillRef>
+          <a:effectRef idx="0">
+            <a:schemeClr val="dk1"/>
+          </a:effectRef>
+          <a:fontRef idx="minor">
+            <a:schemeClr val="tx1"/>
+          </a:fontRef>
+        </p:style>
+        <p:txBody>
+          <a:bodyPr rtlCol="0" anchor="ctr"/>
+          <a:lstStyle/>
+          <a:p>
+            <a:pPr algn="ctr"/>
+            <a:endParaRPr lang="en-IN"/>
+          </a:p>
+        </p:txBody>
+      </p:sp>
+      <p:cxnSp>
+        <p:nvCxnSpPr>
+          <p:cNvPr id="51" name="Straight Connector 50">
+            <a:extLst>
+              <a:ext uri="{FF2B5EF4-FFF2-40B4-BE49-F238E27FC236}">
+                <a16:creationId xmlns:a16="http://schemas.microsoft.com/office/drawing/2014/main" id="{34AC7D35-4EB7-4A9A-AE4E-E361C34568B0}"/>
+              </a:ext>
+            </a:extLst>
+          </p:cNvPr>
+          <p:cNvCxnSpPr>
+            <a:cxnSpLocks/>
+          </p:cNvCxnSpPr>
+          <p:nvPr/>
+        </p:nvCxnSpPr>
+        <p:spPr>
+          <a:xfrm flipH="1">
+            <a:off x="8880495" y="1687830"/>
+            <a:ext cx="112230" cy="155942"/>
+          </a:xfrm>
+          <a:prstGeom prst="line">
+            <a:avLst/>
+          </a:prstGeom>
+          <a:ln w="57150"/>
+        </p:spPr>
+        <p:style>
+          <a:lnRef idx="1">
+            <a:schemeClr val="dk1"/>
+          </a:lnRef>
+          <a:fillRef idx="0">
+            <a:schemeClr val="dk1"/>
+          </a:fillRef>
+          <a:effectRef idx="0">
+            <a:schemeClr val="dk1"/>
+          </a:effectRef>
+          <a:fontRef idx="minor">
+            <a:schemeClr val="tx1"/>
+          </a:fontRef>
+        </p:style>
+      </p:cxnSp>
+      <p:cxnSp>
+        <p:nvCxnSpPr>
+          <p:cNvPr id="69" name="Straight Connector 68">
+            <a:extLst>
+              <a:ext uri="{FF2B5EF4-FFF2-40B4-BE49-F238E27FC236}">
+                <a16:creationId xmlns:a16="http://schemas.microsoft.com/office/drawing/2014/main" id="{C0340B00-DD1B-4A4F-A9F9-CA9AAA95F3C4}"/>
+              </a:ext>
+            </a:extLst>
+          </p:cNvPr>
+          <p:cNvCxnSpPr>
+            <a:cxnSpLocks/>
+          </p:cNvCxnSpPr>
+          <p:nvPr/>
+        </p:nvCxnSpPr>
+        <p:spPr>
+          <a:xfrm flipH="1" flipV="1">
+            <a:off x="8880495" y="1834808"/>
+            <a:ext cx="175875" cy="102709"/>
+          </a:xfrm>
+          <a:prstGeom prst="line">
+            <a:avLst/>
+          </a:prstGeom>
+          <a:ln w="57150"/>
+        </p:spPr>
+        <p:style>
+          <a:lnRef idx="1">
+            <a:schemeClr val="dk1"/>
+          </a:lnRef>
+          <a:fillRef idx="0">
+            <a:schemeClr val="dk1"/>
+          </a:fillRef>
+          <a:effectRef idx="0">
+            <a:schemeClr val="dk1"/>
+          </a:effectRef>
+          <a:fontRef idx="minor">
+            <a:schemeClr val="tx1"/>
+          </a:fontRef>
+        </p:style>
+      </p:cxnSp>
+      <p:sp>
+        <p:nvSpPr>
+          <p:cNvPr id="74" name="Arc 73">
+            <a:extLst>
+              <a:ext uri="{FF2B5EF4-FFF2-40B4-BE49-F238E27FC236}">
+                <a16:creationId xmlns:a16="http://schemas.microsoft.com/office/drawing/2014/main" id="{512E083E-A24D-46E7-ABE7-C0ED76151B3E}"/>
+              </a:ext>
+            </a:extLst>
+          </p:cNvPr>
+          <p:cNvSpPr/>
+          <p:nvPr/>
+        </p:nvSpPr>
+        <p:spPr>
+          <a:xfrm>
+            <a:off x="8535525" y="3176683"/>
+            <a:ext cx="914400" cy="914400"/>
+          </a:xfrm>
+          <a:prstGeom prst="arc">
+            <a:avLst>
+              <a:gd name="adj1" fmla="val 16200000"/>
+              <a:gd name="adj2" fmla="val 5430758"/>
+            </a:avLst>
+          </a:prstGeom>
+          <a:ln w="57150"/>
+        </p:spPr>
+        <p:style>
+          <a:lnRef idx="1">
+            <a:schemeClr val="dk1"/>
+          </a:lnRef>
+          <a:fillRef idx="0">
+            <a:schemeClr val="dk1"/>
+          </a:fillRef>
+          <a:effectRef idx="0">
+            <a:schemeClr val="dk1"/>
+          </a:effectRef>
+          <a:fontRef idx="minor">
+            <a:schemeClr val="tx1"/>
+          </a:fontRef>
+        </p:style>
+        <p:txBody>
+          <a:bodyPr rtlCol="0" anchor="ctr"/>
+          <a:lstStyle/>
+          <a:p>
+            <a:pPr algn="ctr"/>
+            <a:endParaRPr lang="en-IN"/>
+          </a:p>
+        </p:txBody>
+      </p:sp>
+      <p:cxnSp>
+        <p:nvCxnSpPr>
+          <p:cNvPr id="75" name="Straight Connector 74">
+            <a:extLst>
+              <a:ext uri="{FF2B5EF4-FFF2-40B4-BE49-F238E27FC236}">
+                <a16:creationId xmlns:a16="http://schemas.microsoft.com/office/drawing/2014/main" id="{A74A5686-78BB-445D-A4BE-BE5B07BC2F03}"/>
+              </a:ext>
+            </a:extLst>
+          </p:cNvPr>
+          <p:cNvCxnSpPr>
+            <a:cxnSpLocks/>
+          </p:cNvCxnSpPr>
+          <p:nvPr/>
+        </p:nvCxnSpPr>
+        <p:spPr>
+          <a:xfrm flipH="1">
+            <a:off x="8979669" y="3944088"/>
+            <a:ext cx="112230" cy="155942"/>
+          </a:xfrm>
+          <a:prstGeom prst="line">
+            <a:avLst/>
+          </a:prstGeom>
+          <a:ln w="57150"/>
+        </p:spPr>
+        <p:style>
+          <a:lnRef idx="1">
+            <a:schemeClr val="dk1"/>
+          </a:lnRef>
+          <a:fillRef idx="0">
+            <a:schemeClr val="dk1"/>
+          </a:fillRef>
+          <a:effectRef idx="0">
+            <a:schemeClr val="dk1"/>
+          </a:effectRef>
+          <a:fontRef idx="minor">
+            <a:schemeClr val="tx1"/>
+          </a:fontRef>
+        </p:style>
+      </p:cxnSp>
+      <p:cxnSp>
+        <p:nvCxnSpPr>
+          <p:cNvPr id="76" name="Straight Connector 75">
+            <a:extLst>
+              <a:ext uri="{FF2B5EF4-FFF2-40B4-BE49-F238E27FC236}">
+                <a16:creationId xmlns:a16="http://schemas.microsoft.com/office/drawing/2014/main" id="{20D42814-5598-4909-81C1-8C9CA830697D}"/>
+              </a:ext>
+            </a:extLst>
+          </p:cNvPr>
+          <p:cNvCxnSpPr>
+            <a:cxnSpLocks/>
+          </p:cNvCxnSpPr>
+          <p:nvPr/>
+        </p:nvCxnSpPr>
+        <p:spPr>
+          <a:xfrm flipH="1" flipV="1">
+            <a:off x="8979669" y="4091066"/>
+            <a:ext cx="175875" cy="102709"/>
+          </a:xfrm>
+          <a:prstGeom prst="line">
+            <a:avLst/>
+          </a:prstGeom>
+          <a:ln w="57150"/>
+        </p:spPr>
+        <p:style>
+          <a:lnRef idx="1">
+            <a:schemeClr val="dk1"/>
+          </a:lnRef>
+          <a:fillRef idx="0">
+            <a:schemeClr val="dk1"/>
+          </a:fillRef>
+          <a:effectRef idx="0">
+            <a:schemeClr val="dk1"/>
+          </a:effectRef>
+          <a:fontRef idx="minor">
+            <a:schemeClr val="tx1"/>
+          </a:fontRef>
+        </p:style>
+      </p:cxnSp>
+      <p:sp>
+        <p:nvSpPr>
+          <p:cNvPr id="77" name="Arc 76">
+            <a:extLst>
+              <a:ext uri="{FF2B5EF4-FFF2-40B4-BE49-F238E27FC236}">
+                <a16:creationId xmlns:a16="http://schemas.microsoft.com/office/drawing/2014/main" id="{3959CB5D-4747-4053-91A0-A006D6E1238F}"/>
+              </a:ext>
+            </a:extLst>
+          </p:cNvPr>
+          <p:cNvSpPr/>
+          <p:nvPr/>
+        </p:nvSpPr>
+        <p:spPr>
+          <a:xfrm>
+            <a:off x="8599170" y="5423339"/>
+            <a:ext cx="914400" cy="914400"/>
+          </a:xfrm>
+          <a:prstGeom prst="arc">
+            <a:avLst>
+              <a:gd name="adj1" fmla="val 15114993"/>
+              <a:gd name="adj2" fmla="val 5430758"/>
+            </a:avLst>
+          </a:prstGeom>
+          <a:ln w="57150"/>
+        </p:spPr>
+        <p:style>
+          <a:lnRef idx="1">
+            <a:schemeClr val="dk1"/>
+          </a:lnRef>
+          <a:fillRef idx="0">
+            <a:schemeClr val="dk1"/>
+          </a:fillRef>
+          <a:effectRef idx="0">
+            <a:schemeClr val="dk1"/>
+          </a:effectRef>
+          <a:fontRef idx="minor">
+            <a:schemeClr val="tx1"/>
+          </a:fontRef>
+        </p:style>
+        <p:txBody>
+          <a:bodyPr rtlCol="0" anchor="ctr"/>
+          <a:lstStyle/>
+          <a:p>
+            <a:pPr algn="ctr"/>
+            <a:endParaRPr lang="en-IN"/>
+          </a:p>
+        </p:txBody>
+      </p:sp>
+      <p:cxnSp>
+        <p:nvCxnSpPr>
+          <p:cNvPr id="78" name="Straight Connector 77">
+            <a:extLst>
+              <a:ext uri="{FF2B5EF4-FFF2-40B4-BE49-F238E27FC236}">
+                <a16:creationId xmlns:a16="http://schemas.microsoft.com/office/drawing/2014/main" id="{A221E5F4-7689-47A2-86DC-6526772FFE23}"/>
+              </a:ext>
+            </a:extLst>
+          </p:cNvPr>
+          <p:cNvCxnSpPr>
+            <a:cxnSpLocks/>
+          </p:cNvCxnSpPr>
+          <p:nvPr/>
+        </p:nvCxnSpPr>
+        <p:spPr>
+          <a:xfrm flipH="1">
+            <a:off x="9043314" y="6190744"/>
+            <a:ext cx="112230" cy="155942"/>
+          </a:xfrm>
+          <a:prstGeom prst="line">
+            <a:avLst/>
+          </a:prstGeom>
+          <a:ln w="57150"/>
+        </p:spPr>
+        <p:style>
+          <a:lnRef idx="1">
+            <a:schemeClr val="dk1"/>
+          </a:lnRef>
+          <a:fillRef idx="0">
+            <a:schemeClr val="dk1"/>
+          </a:fillRef>
+          <a:effectRef idx="0">
+            <a:schemeClr val="dk1"/>
+          </a:effectRef>
+          <a:fontRef idx="minor">
+            <a:schemeClr val="tx1"/>
+          </a:fontRef>
+        </p:style>
+      </p:cxnSp>
+      <p:cxnSp>
+        <p:nvCxnSpPr>
+          <p:cNvPr id="79" name="Straight Connector 78">
+            <a:extLst>
+              <a:ext uri="{FF2B5EF4-FFF2-40B4-BE49-F238E27FC236}">
+                <a16:creationId xmlns:a16="http://schemas.microsoft.com/office/drawing/2014/main" id="{9D5B3A1F-8B59-432C-AD2E-503B06419DE6}"/>
+              </a:ext>
+            </a:extLst>
+          </p:cNvPr>
+          <p:cNvCxnSpPr>
+            <a:cxnSpLocks/>
+          </p:cNvCxnSpPr>
+          <p:nvPr/>
+        </p:nvCxnSpPr>
+        <p:spPr>
+          <a:xfrm flipH="1" flipV="1">
+            <a:off x="9043314" y="6337722"/>
+            <a:ext cx="175875" cy="102709"/>
+          </a:xfrm>
+          <a:prstGeom prst="line">
+            <a:avLst/>
+          </a:prstGeom>
+          <a:ln w="57150"/>
+        </p:spPr>
+        <p:style>
+          <a:lnRef idx="1">
+            <a:schemeClr val="dk1"/>
+          </a:lnRef>
+          <a:fillRef idx="0">
+            <a:schemeClr val="dk1"/>
+          </a:fillRef>
+          <a:effectRef idx="0">
+            <a:schemeClr val="dk1"/>
+          </a:effectRef>
+          <a:fontRef idx="minor">
+            <a:schemeClr val="tx1"/>
+          </a:fontRef>
+        </p:style>
+      </p:cxnSp>
+      <p:sp>
+        <p:nvSpPr>
+          <p:cNvPr id="80" name="TextBox 79">
+            <a:extLst>
+              <a:ext uri="{FF2B5EF4-FFF2-40B4-BE49-F238E27FC236}">
+                <a16:creationId xmlns:a16="http://schemas.microsoft.com/office/drawing/2014/main" id="{0AF20B53-B3B4-42F5-AD2F-7F1CDC52F404}"/>
+              </a:ext>
+            </a:extLst>
+          </p:cNvPr>
+          <p:cNvSpPr txBox="1"/>
+          <p:nvPr/>
+        </p:nvSpPr>
+        <p:spPr>
+          <a:xfrm>
+            <a:off x="8793456" y="1953194"/>
+            <a:ext cx="969821" cy="523220"/>
+          </a:xfrm>
+          <a:prstGeom prst="rect">
+            <a:avLst/>
+          </a:prstGeom>
+          <a:noFill/>
+        </p:spPr>
+        <p:txBody>
+          <a:bodyPr wrap="square" rtlCol="0">
+            <a:spAutoFit/>
+          </a:bodyPr>
+          <a:lstStyle/>
+          <a:p>
+            <a:r>
+              <a:rPr lang="en-IN" sz="2800" b="1"/>
+              <a:t>2Pa</a:t>
+            </a:r>
+          </a:p>
+        </p:txBody>
+      </p:sp>
+      <p:sp>
+        <p:nvSpPr>
+          <p:cNvPr id="81" name="TextBox 80">
+            <a:extLst>
+              <a:ext uri="{FF2B5EF4-FFF2-40B4-BE49-F238E27FC236}">
+                <a16:creationId xmlns:a16="http://schemas.microsoft.com/office/drawing/2014/main" id="{47DC358D-A8DD-4C38-8D56-40955369EB37}"/>
+              </a:ext>
+            </a:extLst>
+          </p:cNvPr>
+          <p:cNvSpPr txBox="1"/>
+          <p:nvPr/>
+        </p:nvSpPr>
+        <p:spPr>
+          <a:xfrm>
+            <a:off x="8436058" y="3823803"/>
+            <a:ext cx="631127" cy="523220"/>
+          </a:xfrm>
+          <a:prstGeom prst="rect">
+            <a:avLst/>
+          </a:prstGeom>
+          <a:noFill/>
+        </p:spPr>
+        <p:txBody>
+          <a:bodyPr wrap="square" rtlCol="0">
+            <a:spAutoFit/>
+          </a:bodyPr>
+          <a:lstStyle/>
+          <a:p>
+            <a:r>
+              <a:rPr lang="en-IN" sz="2800" b="1"/>
+              <a:t>Pa</a:t>
+            </a:r>
+          </a:p>
+        </p:txBody>
+      </p:sp>
+      <p:cxnSp>
+        <p:nvCxnSpPr>
+          <p:cNvPr id="82" name="Straight Arrow Connector 81">
+            <a:extLst>
+              <a:ext uri="{FF2B5EF4-FFF2-40B4-BE49-F238E27FC236}">
+                <a16:creationId xmlns:a16="http://schemas.microsoft.com/office/drawing/2014/main" id="{1E655ADF-D567-4385-8DE8-593857DEC9C5}"/>
+              </a:ext>
+            </a:extLst>
+          </p:cNvPr>
+          <p:cNvCxnSpPr>
+            <a:cxnSpLocks/>
+          </p:cNvCxnSpPr>
+          <p:nvPr/>
+        </p:nvCxnSpPr>
+        <p:spPr>
+          <a:xfrm>
+            <a:off x="9016228" y="3637393"/>
+            <a:ext cx="741786" cy="0"/>
+          </a:xfrm>
+          <a:prstGeom prst="straightConnector1">
+            <a:avLst/>
+          </a:prstGeom>
+          <a:ln w="57150">
+            <a:tailEnd type="triangle"/>
+          </a:ln>
+        </p:spPr>
+        <p:style>
+          <a:lnRef idx="1">
+            <a:schemeClr val="dk1"/>
+          </a:lnRef>
+          <a:fillRef idx="0">
+            <a:schemeClr val="dk1"/>
+          </a:fillRef>
+          <a:effectRef idx="0">
+            <a:schemeClr val="dk1"/>
+          </a:effectRef>
+          <a:fontRef idx="minor">
+            <a:schemeClr val="tx1"/>
+          </a:fontRef>
+        </p:style>
+      </p:cxnSp>
+      <p:sp>
+        <p:nvSpPr>
+          <p:cNvPr id="83" name="TextBox 82">
+            <a:extLst>
+              <a:ext uri="{FF2B5EF4-FFF2-40B4-BE49-F238E27FC236}">
+                <a16:creationId xmlns:a16="http://schemas.microsoft.com/office/drawing/2014/main" id="{8956F06B-2C98-447C-943D-D88FBAE517EA}"/>
+              </a:ext>
+            </a:extLst>
+          </p:cNvPr>
+          <p:cNvSpPr txBox="1"/>
+          <p:nvPr/>
+        </p:nvSpPr>
+        <p:spPr>
+          <a:xfrm>
+            <a:off x="9739806" y="3375783"/>
+            <a:ext cx="484654" cy="523220"/>
+          </a:xfrm>
+          <a:prstGeom prst="rect">
+            <a:avLst/>
+          </a:prstGeom>
+          <a:noFill/>
+        </p:spPr>
+        <p:txBody>
+          <a:bodyPr wrap="square" rtlCol="0">
+            <a:spAutoFit/>
+          </a:bodyPr>
+          <a:lstStyle/>
+          <a:p>
+            <a:r>
+              <a:rPr lang="en-IN" sz="2800" b="1"/>
+              <a:t>P</a:t>
+            </a:r>
+          </a:p>
+        </p:txBody>
+      </p:sp>
+      <p:sp>
+        <p:nvSpPr>
+          <p:cNvPr id="85" name="TextBox 84">
+            <a:extLst>
+              <a:ext uri="{FF2B5EF4-FFF2-40B4-BE49-F238E27FC236}">
+                <a16:creationId xmlns:a16="http://schemas.microsoft.com/office/drawing/2014/main" id="{751179BA-CA83-4C3A-A0AE-D974D7D2AF99}"/>
+              </a:ext>
+            </a:extLst>
+          </p:cNvPr>
+          <p:cNvSpPr txBox="1"/>
+          <p:nvPr/>
+        </p:nvSpPr>
+        <p:spPr>
+          <a:xfrm>
+            <a:off x="8866097" y="4585986"/>
+            <a:ext cx="484654" cy="523220"/>
+          </a:xfrm>
+          <a:prstGeom prst="rect">
+            <a:avLst/>
+          </a:prstGeom>
+          <a:noFill/>
+        </p:spPr>
+        <p:txBody>
+          <a:bodyPr wrap="square" rtlCol="0">
+            <a:spAutoFit/>
+          </a:bodyPr>
+          <a:lstStyle/>
+          <a:p>
+            <a:r>
+              <a:rPr lang="en-IN" sz="2800" b="1"/>
+              <a:t>P</a:t>
+            </a:r>
+          </a:p>
+        </p:txBody>
+      </p:sp>
+      <p:cxnSp>
+        <p:nvCxnSpPr>
+          <p:cNvPr id="86" name="Straight Arrow Connector 85">
+            <a:extLst>
+              <a:ext uri="{FF2B5EF4-FFF2-40B4-BE49-F238E27FC236}">
+                <a16:creationId xmlns:a16="http://schemas.microsoft.com/office/drawing/2014/main" id="{73F73FC7-EC7A-4D26-8ED9-B4BEC966DC34}"/>
+              </a:ext>
+            </a:extLst>
+          </p:cNvPr>
+          <p:cNvCxnSpPr>
+            <a:cxnSpLocks/>
+          </p:cNvCxnSpPr>
+          <p:nvPr/>
+        </p:nvCxnSpPr>
+        <p:spPr>
+          <a:xfrm>
+            <a:off x="9067185" y="5070942"/>
+            <a:ext cx="19451" cy="843115"/>
+          </a:xfrm>
+          <a:prstGeom prst="straightConnector1">
+            <a:avLst/>
+          </a:prstGeom>
+          <a:ln w="57150">
+            <a:tailEnd type="triangle"/>
+          </a:ln>
+        </p:spPr>
+        <p:style>
+          <a:lnRef idx="1">
+            <a:schemeClr val="dk1"/>
+          </a:lnRef>
+          <a:fillRef idx="0">
+            <a:schemeClr val="dk1"/>
+          </a:fillRef>
+          <a:effectRef idx="0">
+            <a:schemeClr val="dk1"/>
+          </a:effectRef>
+          <a:fontRef idx="minor">
+            <a:schemeClr val="tx1"/>
+          </a:fontRef>
+        </p:style>
+      </p:cxnSp>
+      <p:sp>
+        <p:nvSpPr>
+          <p:cNvPr id="89" name="TextBox 88">
+            <a:extLst>
+              <a:ext uri="{FF2B5EF4-FFF2-40B4-BE49-F238E27FC236}">
+                <a16:creationId xmlns:a16="http://schemas.microsoft.com/office/drawing/2014/main" id="{90E946BC-88C2-461E-BDEA-8FD043CADB9A}"/>
+              </a:ext>
+            </a:extLst>
+          </p:cNvPr>
+          <p:cNvSpPr txBox="1"/>
+          <p:nvPr/>
+        </p:nvSpPr>
+        <p:spPr>
+          <a:xfrm>
+            <a:off x="8483356" y="6088456"/>
+            <a:ext cx="631127" cy="523220"/>
+          </a:xfrm>
+          <a:prstGeom prst="rect">
+            <a:avLst/>
+          </a:prstGeom>
+          <a:noFill/>
+        </p:spPr>
+        <p:txBody>
+          <a:bodyPr wrap="square" rtlCol="0">
+            <a:spAutoFit/>
+          </a:bodyPr>
+          <a:lstStyle/>
+          <a:p>
+            <a:r>
+              <a:rPr lang="en-IN" sz="2800" b="1"/>
+              <a:t>Pa</a:t>
+            </a:r>
+          </a:p>
+        </p:txBody>
+      </p:sp>
+    </p:spTree>
+    <p:extLst>
+      <p:ext uri="{BB962C8B-B14F-4D97-AF65-F5344CB8AC3E}">
+        <p14:creationId xmlns:p14="http://schemas.microsoft.com/office/powerpoint/2010/main" val="316470897"/>
+      </p:ext>
+    </p:extLst>
+  </p:cSld>
+  <p:clrMapOvr>
+    <a:masterClrMapping/>
+  </p:clrMapOvr>
+</p:sld>
+</file>
+
 <file path=ppt/slides/slide2.xml><?xml version="1.0" encoding="utf-8"?>
 <p:sld xmlns:a="http://schemas.openxmlformats.org/drawingml/2006/main" xmlns:r="http://schemas.openxmlformats.org/officeDocument/2006/relationships" xmlns:p="http://schemas.openxmlformats.org/presentationml/2006/main">
   <p:cSld>

</xml_diff>

<commit_message>
Perpendicular axis theorem added
</commit_message>
<xml_diff>
--- a/STRENGTH OF MATERIALS SHORTNOTES/SOM Revision.pptx
+++ b/STRENGTH OF MATERIALS SHORTNOTES/SOM Revision.pptx
@@ -21,6 +21,7 @@
     <p:sldId id="270" r:id="rId15"/>
     <p:sldId id="269" r:id="rId16"/>
     <p:sldId id="271" r:id="rId17"/>
+    <p:sldId id="272" r:id="rId18"/>
   </p:sldIdLst>
   <p:sldSz cx="12192000" cy="6858000"/>
   <p:notesSz cx="6858000" cy="9144000"/>
@@ -15282,6 +15283,356 @@
 </p:sld>
 </file>
 
+<file path=ppt/slides/slide17.xml><?xml version="1.0" encoding="utf-8"?>
+<p:sld xmlns:a="http://schemas.openxmlformats.org/drawingml/2006/main" xmlns:r="http://schemas.openxmlformats.org/officeDocument/2006/relationships" xmlns:p="http://schemas.openxmlformats.org/presentationml/2006/main">
+  <p:cSld>
+    <p:spTree>
+      <p:nvGrpSpPr>
+        <p:cNvPr id="1" name=""/>
+        <p:cNvGrpSpPr/>
+        <p:nvPr/>
+      </p:nvGrpSpPr>
+      <p:grpSpPr>
+        <a:xfrm>
+          <a:off x="0" y="0"/>
+          <a:ext cx="0" cy="0"/>
+          <a:chOff x="0" y="0"/>
+          <a:chExt cx="0" cy="0"/>
+        </a:xfrm>
+      </p:grpSpPr>
+      <p:pic>
+        <p:nvPicPr>
+          <p:cNvPr id="40" name="Picture 39">
+            <a:extLst>
+              <a:ext uri="{FF2B5EF4-FFF2-40B4-BE49-F238E27FC236}">
+                <a16:creationId xmlns:a16="http://schemas.microsoft.com/office/drawing/2014/main" id="{7E33C27F-484B-4390-BB9F-0F1A45A7FFCA}"/>
+              </a:ext>
+            </a:extLst>
+          </p:cNvPr>
+          <p:cNvPicPr>
+            <a:picLocks noChangeAspect="1"/>
+          </p:cNvPicPr>
+          <p:nvPr/>
+        </p:nvPicPr>
+        <p:blipFill>
+          <a:blip r:embed="rId2"/>
+          <a:stretch>
+            <a:fillRect/>
+          </a:stretch>
+        </p:blipFill>
+        <p:spPr>
+          <a:xfrm>
+            <a:off x="379789" y="1873745"/>
+            <a:ext cx="7789378" cy="3406466"/>
+          </a:xfrm>
+          <a:prstGeom prst="rect">
+            <a:avLst/>
+          </a:prstGeom>
+        </p:spPr>
+      </p:pic>
+      <p:sp>
+        <p:nvSpPr>
+          <p:cNvPr id="45" name="Rectangle 44">
+            <a:extLst>
+              <a:ext uri="{FF2B5EF4-FFF2-40B4-BE49-F238E27FC236}">
+                <a16:creationId xmlns:a16="http://schemas.microsoft.com/office/drawing/2014/main" id="{9ADBA495-3A44-47F1-8620-939E18452F1A}"/>
+              </a:ext>
+            </a:extLst>
+          </p:cNvPr>
+          <p:cNvSpPr/>
+          <p:nvPr/>
+        </p:nvSpPr>
+        <p:spPr>
+          <a:xfrm>
+            <a:off x="8807902" y="2229848"/>
+            <a:ext cx="2698376" cy="394447"/>
+          </a:xfrm>
+          <a:prstGeom prst="rect">
+            <a:avLst/>
+          </a:prstGeom>
+        </p:spPr>
+        <p:style>
+          <a:lnRef idx="2">
+            <a:schemeClr val="accent1">
+              <a:shade val="50000"/>
+            </a:schemeClr>
+          </a:lnRef>
+          <a:fillRef idx="1">
+            <a:schemeClr val="accent1"/>
+          </a:fillRef>
+          <a:effectRef idx="0">
+            <a:schemeClr val="accent1"/>
+          </a:effectRef>
+          <a:fontRef idx="minor">
+            <a:schemeClr val="lt1"/>
+          </a:fontRef>
+        </p:style>
+        <p:txBody>
+          <a:bodyPr rtlCol="0" anchor="ctr"/>
+          <a:lstStyle/>
+          <a:p>
+            <a:pPr algn="ctr"/>
+            <a:endParaRPr lang="en-IN"/>
+          </a:p>
+        </p:txBody>
+      </p:sp>
+      <p:sp>
+        <p:nvSpPr>
+          <p:cNvPr id="118" name="Rectangle 117">
+            <a:extLst>
+              <a:ext uri="{FF2B5EF4-FFF2-40B4-BE49-F238E27FC236}">
+                <a16:creationId xmlns:a16="http://schemas.microsoft.com/office/drawing/2014/main" id="{B5AB6CA9-42F1-4AFC-8A0E-439AC51B6C1E}"/>
+              </a:ext>
+            </a:extLst>
+          </p:cNvPr>
+          <p:cNvSpPr/>
+          <p:nvPr/>
+        </p:nvSpPr>
+        <p:spPr>
+          <a:xfrm rot="5400000">
+            <a:off x="8814626" y="4027397"/>
+            <a:ext cx="2698376" cy="394447"/>
+          </a:xfrm>
+          <a:prstGeom prst="rect">
+            <a:avLst/>
+          </a:prstGeom>
+        </p:spPr>
+        <p:style>
+          <a:lnRef idx="2">
+            <a:schemeClr val="accent1">
+              <a:shade val="50000"/>
+            </a:schemeClr>
+          </a:lnRef>
+          <a:fillRef idx="1">
+            <a:schemeClr val="accent1"/>
+          </a:fillRef>
+          <a:effectRef idx="0">
+            <a:schemeClr val="accent1"/>
+          </a:effectRef>
+          <a:fontRef idx="minor">
+            <a:schemeClr val="lt1"/>
+          </a:fontRef>
+        </p:style>
+        <p:txBody>
+          <a:bodyPr rtlCol="0" anchor="ctr"/>
+          <a:lstStyle/>
+          <a:p>
+            <a:pPr algn="ctr"/>
+            <a:endParaRPr lang="en-IN"/>
+          </a:p>
+        </p:txBody>
+      </p:sp>
+      <p:cxnSp>
+        <p:nvCxnSpPr>
+          <p:cNvPr id="47" name="Straight Connector 46">
+            <a:extLst>
+              <a:ext uri="{FF2B5EF4-FFF2-40B4-BE49-F238E27FC236}">
+                <a16:creationId xmlns:a16="http://schemas.microsoft.com/office/drawing/2014/main" id="{00547025-009A-41ED-B534-57CAA1E95260}"/>
+              </a:ext>
+            </a:extLst>
+          </p:cNvPr>
+          <p:cNvCxnSpPr/>
+          <p:nvPr/>
+        </p:nvCxnSpPr>
+        <p:spPr>
+          <a:xfrm>
+            <a:off x="8458279" y="2427071"/>
+            <a:ext cx="3397624" cy="0"/>
+          </a:xfrm>
+          <a:prstGeom prst="line">
+            <a:avLst/>
+          </a:prstGeom>
+          <a:ln w="57150"/>
+        </p:spPr>
+        <p:style>
+          <a:lnRef idx="1">
+            <a:schemeClr val="accent2"/>
+          </a:lnRef>
+          <a:fillRef idx="0">
+            <a:schemeClr val="accent2"/>
+          </a:fillRef>
+          <a:effectRef idx="0">
+            <a:schemeClr val="accent2"/>
+          </a:effectRef>
+          <a:fontRef idx="minor">
+            <a:schemeClr val="tx1"/>
+          </a:fontRef>
+        </p:style>
+      </p:cxnSp>
+      <p:cxnSp>
+        <p:nvCxnSpPr>
+          <p:cNvPr id="119" name="Straight Connector 118">
+            <a:extLst>
+              <a:ext uri="{FF2B5EF4-FFF2-40B4-BE49-F238E27FC236}">
+                <a16:creationId xmlns:a16="http://schemas.microsoft.com/office/drawing/2014/main" id="{EF42868F-9958-4C9E-9620-215449C5E8C4}"/>
+              </a:ext>
+            </a:extLst>
+          </p:cNvPr>
+          <p:cNvCxnSpPr/>
+          <p:nvPr/>
+        </p:nvCxnSpPr>
+        <p:spPr>
+          <a:xfrm>
+            <a:off x="8343978" y="4224741"/>
+            <a:ext cx="3397624" cy="0"/>
+          </a:xfrm>
+          <a:prstGeom prst="line">
+            <a:avLst/>
+          </a:prstGeom>
+          <a:ln w="57150"/>
+        </p:spPr>
+        <p:style>
+          <a:lnRef idx="1">
+            <a:schemeClr val="accent2"/>
+          </a:lnRef>
+          <a:fillRef idx="0">
+            <a:schemeClr val="accent2"/>
+          </a:fillRef>
+          <a:effectRef idx="0">
+            <a:schemeClr val="accent2"/>
+          </a:effectRef>
+          <a:fontRef idx="minor">
+            <a:schemeClr val="tx1"/>
+          </a:fontRef>
+        </p:style>
+      </p:cxnSp>
+      <p:sp>
+        <p:nvSpPr>
+          <p:cNvPr id="48" name="TextBox 47">
+            <a:extLst>
+              <a:ext uri="{FF2B5EF4-FFF2-40B4-BE49-F238E27FC236}">
+                <a16:creationId xmlns:a16="http://schemas.microsoft.com/office/drawing/2014/main" id="{7500D59F-9628-41B2-BF99-AFC5A3705133}"/>
+              </a:ext>
+            </a:extLst>
+          </p:cNvPr>
+          <p:cNvSpPr txBox="1"/>
+          <p:nvPr/>
+        </p:nvSpPr>
+        <p:spPr>
+          <a:xfrm>
+            <a:off x="7021684" y="3055186"/>
+            <a:ext cx="2294965" cy="369332"/>
+          </a:xfrm>
+          <a:prstGeom prst="rect">
+            <a:avLst/>
+          </a:prstGeom>
+          <a:noFill/>
+        </p:spPr>
+        <p:txBody>
+          <a:bodyPr wrap="square" rtlCol="0">
+            <a:spAutoFit/>
+          </a:bodyPr>
+          <a:lstStyle/>
+          <a:p>
+            <a:pPr algn="ctr"/>
+            <a:r>
+              <a:rPr lang="en-US"/>
+              <a:t>Bending Axis</a:t>
+            </a:r>
+            <a:endParaRPr lang="en-IN"/>
+          </a:p>
+        </p:txBody>
+      </p:sp>
+      <p:cxnSp>
+        <p:nvCxnSpPr>
+          <p:cNvPr id="57" name="Connector: Curved 56">
+            <a:extLst>
+              <a:ext uri="{FF2B5EF4-FFF2-40B4-BE49-F238E27FC236}">
+                <a16:creationId xmlns:a16="http://schemas.microsoft.com/office/drawing/2014/main" id="{F444D2C8-E62E-41CB-AD36-1960A10A5569}"/>
+              </a:ext>
+            </a:extLst>
+          </p:cNvPr>
+          <p:cNvCxnSpPr>
+            <a:cxnSpLocks/>
+            <a:stCxn id="48" idx="2"/>
+          </p:cNvCxnSpPr>
+          <p:nvPr/>
+        </p:nvCxnSpPr>
+        <p:spPr>
+          <a:xfrm rot="16200000" flipH="1">
+            <a:off x="7977545" y="3616140"/>
+            <a:ext cx="800102" cy="416858"/>
+          </a:xfrm>
+          <a:prstGeom prst="curvedConnector3">
+            <a:avLst>
+              <a:gd name="adj1" fmla="val 50000"/>
+            </a:avLst>
+          </a:prstGeom>
+          <a:ln w="28575">
+            <a:tailEnd type="triangle"/>
+          </a:ln>
+        </p:spPr>
+        <p:style>
+          <a:lnRef idx="1">
+            <a:schemeClr val="dk1"/>
+          </a:lnRef>
+          <a:fillRef idx="0">
+            <a:schemeClr val="dk1"/>
+          </a:fillRef>
+          <a:effectRef idx="0">
+            <a:schemeClr val="dk1"/>
+          </a:effectRef>
+          <a:fontRef idx="minor">
+            <a:schemeClr val="tx1"/>
+          </a:fontRef>
+        </p:style>
+      </p:cxnSp>
+      <p:cxnSp>
+        <p:nvCxnSpPr>
+          <p:cNvPr id="120" name="Connector: Curved 119">
+            <a:extLst>
+              <a:ext uri="{FF2B5EF4-FFF2-40B4-BE49-F238E27FC236}">
+                <a16:creationId xmlns:a16="http://schemas.microsoft.com/office/drawing/2014/main" id="{8FB3BD0B-D698-452F-8E13-FC2200D9FA80}"/>
+              </a:ext>
+            </a:extLst>
+          </p:cNvPr>
+          <p:cNvCxnSpPr>
+            <a:cxnSpLocks/>
+          </p:cNvCxnSpPr>
+          <p:nvPr/>
+        </p:nvCxnSpPr>
+        <p:spPr>
+          <a:xfrm rot="5400000" flipH="1" flipV="1">
+            <a:off x="8127059" y="2469058"/>
+            <a:ext cx="566068" cy="481852"/>
+          </a:xfrm>
+          <a:prstGeom prst="curvedConnector3">
+            <a:avLst>
+              <a:gd name="adj1" fmla="val 50000"/>
+            </a:avLst>
+          </a:prstGeom>
+          <a:ln w="28575">
+            <a:tailEnd type="triangle"/>
+          </a:ln>
+        </p:spPr>
+        <p:style>
+          <a:lnRef idx="1">
+            <a:schemeClr val="dk1"/>
+          </a:lnRef>
+          <a:fillRef idx="0">
+            <a:schemeClr val="dk1"/>
+          </a:fillRef>
+          <a:effectRef idx="0">
+            <a:schemeClr val="dk1"/>
+          </a:effectRef>
+          <a:fontRef idx="minor">
+            <a:schemeClr val="tx1"/>
+          </a:fontRef>
+        </p:style>
+      </p:cxnSp>
+    </p:spTree>
+    <p:extLst>
+      <p:ext uri="{BB962C8B-B14F-4D97-AF65-F5344CB8AC3E}">
+        <p14:creationId xmlns:p14="http://schemas.microsoft.com/office/powerpoint/2010/main" val="1693534150"/>
+      </p:ext>
+    </p:extLst>
+  </p:cSld>
+  <p:clrMapOvr>
+    <a:masterClrMapping/>
+  </p:clrMapOvr>
+</p:sld>
+</file>
+
 <file path=ppt/slides/slide2.xml><?xml version="1.0" encoding="utf-8"?>
 <p:sld xmlns:a="http://schemas.openxmlformats.org/drawingml/2006/main" xmlns:r="http://schemas.openxmlformats.org/officeDocument/2006/relationships" xmlns:p="http://schemas.openxmlformats.org/presentationml/2006/main">
   <p:cSld>

</xml_diff>

<commit_message>
Upto Perpendicular Axis theorem
</commit_message>
<xml_diff>
--- a/STRENGTH OF MATERIALS SHORTNOTES/SOM Revision.pptx
+++ b/STRENGTH OF MATERIALS SHORTNOTES/SOM Revision.pptx
@@ -22,6 +22,10 @@
     <p:sldId id="269" r:id="rId16"/>
     <p:sldId id="271" r:id="rId17"/>
     <p:sldId id="272" r:id="rId18"/>
+    <p:sldId id="273" r:id="rId19"/>
+    <p:sldId id="274" r:id="rId20"/>
+    <p:sldId id="275" r:id="rId21"/>
+    <p:sldId id="276" r:id="rId22"/>
   </p:sldIdLst>
   <p:sldSz cx="12192000" cy="6858000"/>
   <p:notesSz cx="6858000" cy="9144000"/>
@@ -277,7 +281,7 @@
           <a:p>
             <a:fld id="{EA402788-B3D0-4CAD-96CC-4B452FA47DBC}" type="datetimeFigureOut">
               <a:rPr lang="en-IN" smtClean="0"/>
-              <a:t>30-01-2023</a:t>
+              <a:t>31-01-2023</a:t>
             </a:fld>
             <a:endParaRPr lang="en-IN"/>
           </a:p>
@@ -477,7 +481,7 @@
           <a:p>
             <a:fld id="{EA402788-B3D0-4CAD-96CC-4B452FA47DBC}" type="datetimeFigureOut">
               <a:rPr lang="en-IN" smtClean="0"/>
-              <a:t>30-01-2023</a:t>
+              <a:t>31-01-2023</a:t>
             </a:fld>
             <a:endParaRPr lang="en-IN"/>
           </a:p>
@@ -687,7 +691,7 @@
           <a:p>
             <a:fld id="{EA402788-B3D0-4CAD-96CC-4B452FA47DBC}" type="datetimeFigureOut">
               <a:rPr lang="en-IN" smtClean="0"/>
-              <a:t>30-01-2023</a:t>
+              <a:t>31-01-2023</a:t>
             </a:fld>
             <a:endParaRPr lang="en-IN"/>
           </a:p>
@@ -887,7 +891,7 @@
           <a:p>
             <a:fld id="{EA402788-B3D0-4CAD-96CC-4B452FA47DBC}" type="datetimeFigureOut">
               <a:rPr lang="en-IN" smtClean="0"/>
-              <a:t>30-01-2023</a:t>
+              <a:t>31-01-2023</a:t>
             </a:fld>
             <a:endParaRPr lang="en-IN"/>
           </a:p>
@@ -1163,7 +1167,7 @@
           <a:p>
             <a:fld id="{EA402788-B3D0-4CAD-96CC-4B452FA47DBC}" type="datetimeFigureOut">
               <a:rPr lang="en-IN" smtClean="0"/>
-              <a:t>30-01-2023</a:t>
+              <a:t>31-01-2023</a:t>
             </a:fld>
             <a:endParaRPr lang="en-IN"/>
           </a:p>
@@ -1431,7 +1435,7 @@
           <a:p>
             <a:fld id="{EA402788-B3D0-4CAD-96CC-4B452FA47DBC}" type="datetimeFigureOut">
               <a:rPr lang="en-IN" smtClean="0"/>
-              <a:t>30-01-2023</a:t>
+              <a:t>31-01-2023</a:t>
             </a:fld>
             <a:endParaRPr lang="en-IN"/>
           </a:p>
@@ -1846,7 +1850,7 @@
           <a:p>
             <a:fld id="{EA402788-B3D0-4CAD-96CC-4B452FA47DBC}" type="datetimeFigureOut">
               <a:rPr lang="en-IN" smtClean="0"/>
-              <a:t>30-01-2023</a:t>
+              <a:t>31-01-2023</a:t>
             </a:fld>
             <a:endParaRPr lang="en-IN"/>
           </a:p>
@@ -1988,7 +1992,7 @@
           <a:p>
             <a:fld id="{EA402788-B3D0-4CAD-96CC-4B452FA47DBC}" type="datetimeFigureOut">
               <a:rPr lang="en-IN" smtClean="0"/>
-              <a:t>30-01-2023</a:t>
+              <a:t>31-01-2023</a:t>
             </a:fld>
             <a:endParaRPr lang="en-IN"/>
           </a:p>
@@ -2101,7 +2105,7 @@
           <a:p>
             <a:fld id="{EA402788-B3D0-4CAD-96CC-4B452FA47DBC}" type="datetimeFigureOut">
               <a:rPr lang="en-IN" smtClean="0"/>
-              <a:t>30-01-2023</a:t>
+              <a:t>31-01-2023</a:t>
             </a:fld>
             <a:endParaRPr lang="en-IN"/>
           </a:p>
@@ -2414,7 +2418,7 @@
           <a:p>
             <a:fld id="{EA402788-B3D0-4CAD-96CC-4B452FA47DBC}" type="datetimeFigureOut">
               <a:rPr lang="en-IN" smtClean="0"/>
-              <a:t>30-01-2023</a:t>
+              <a:t>31-01-2023</a:t>
             </a:fld>
             <a:endParaRPr lang="en-IN"/>
           </a:p>
@@ -2703,7 +2707,7 @@
           <a:p>
             <a:fld id="{EA402788-B3D0-4CAD-96CC-4B452FA47DBC}" type="datetimeFigureOut">
               <a:rPr lang="en-IN" smtClean="0"/>
-              <a:t>30-01-2023</a:t>
+              <a:t>31-01-2023</a:t>
             </a:fld>
             <a:endParaRPr lang="en-IN"/>
           </a:p>
@@ -2946,7 +2950,7 @@
           <a:p>
             <a:fld id="{EA402788-B3D0-4CAD-96CC-4B452FA47DBC}" type="datetimeFigureOut">
               <a:rPr lang="en-IN" smtClean="0"/>
-              <a:t>30-01-2023</a:t>
+              <a:t>31-01-2023</a:t>
             </a:fld>
             <a:endParaRPr lang="en-IN"/>
           </a:p>
@@ -15633,6 +15637,3490 @@
 </p:sld>
 </file>
 
+<file path=ppt/slides/slide18.xml><?xml version="1.0" encoding="utf-8"?>
+<p:sld xmlns:a="http://schemas.openxmlformats.org/drawingml/2006/main" xmlns:r="http://schemas.openxmlformats.org/officeDocument/2006/relationships" xmlns:p="http://schemas.openxmlformats.org/presentationml/2006/main">
+  <p:cSld>
+    <p:spTree>
+      <p:nvGrpSpPr>
+        <p:cNvPr id="1" name=""/>
+        <p:cNvGrpSpPr/>
+        <p:nvPr/>
+      </p:nvGrpSpPr>
+      <p:grpSpPr>
+        <a:xfrm>
+          <a:off x="0" y="0"/>
+          <a:ext cx="0" cy="0"/>
+          <a:chOff x="0" y="0"/>
+          <a:chExt cx="0" cy="0"/>
+        </a:xfrm>
+      </p:grpSpPr>
+      <p:sp>
+        <p:nvSpPr>
+          <p:cNvPr id="2" name="Rectangle 1">
+            <a:extLst>
+              <a:ext uri="{FF2B5EF4-FFF2-40B4-BE49-F238E27FC236}">
+                <a16:creationId xmlns:a16="http://schemas.microsoft.com/office/drawing/2014/main" id="{258D8923-658C-4A0F-A2FA-2A112969D0A9}"/>
+              </a:ext>
+            </a:extLst>
+          </p:cNvPr>
+          <p:cNvSpPr/>
+          <p:nvPr/>
+        </p:nvSpPr>
+        <p:spPr>
+          <a:xfrm>
+            <a:off x="2008094" y="1577788"/>
+            <a:ext cx="2886635" cy="3845859"/>
+          </a:xfrm>
+          <a:prstGeom prst="rect">
+            <a:avLst/>
+          </a:prstGeom>
+          <a:ln>
+            <a:solidFill>
+              <a:schemeClr val="tx1"/>
+            </a:solidFill>
+          </a:ln>
+        </p:spPr>
+        <p:style>
+          <a:lnRef idx="1">
+            <a:schemeClr val="accent5"/>
+          </a:lnRef>
+          <a:fillRef idx="2">
+            <a:schemeClr val="accent5"/>
+          </a:fillRef>
+          <a:effectRef idx="1">
+            <a:schemeClr val="accent5"/>
+          </a:effectRef>
+          <a:fontRef idx="minor">
+            <a:schemeClr val="dk1"/>
+          </a:fontRef>
+        </p:style>
+        <p:txBody>
+          <a:bodyPr rtlCol="0" anchor="ctr"/>
+          <a:lstStyle/>
+          <a:p>
+            <a:pPr algn="ctr"/>
+            <a:endParaRPr lang="en-IN"/>
+          </a:p>
+        </p:txBody>
+      </p:sp>
+      <p:sp>
+        <p:nvSpPr>
+          <p:cNvPr id="11" name="Rectangle 10">
+            <a:extLst>
+              <a:ext uri="{FF2B5EF4-FFF2-40B4-BE49-F238E27FC236}">
+                <a16:creationId xmlns:a16="http://schemas.microsoft.com/office/drawing/2014/main" id="{FD0CB9B8-8BDB-4F68-9A38-B1DC131CB387}"/>
+              </a:ext>
+            </a:extLst>
+          </p:cNvPr>
+          <p:cNvSpPr/>
+          <p:nvPr/>
+        </p:nvSpPr>
+        <p:spPr>
+          <a:xfrm>
+            <a:off x="7826188" y="1577788"/>
+            <a:ext cx="2886635" cy="3845859"/>
+          </a:xfrm>
+          <a:prstGeom prst="rect">
+            <a:avLst/>
+          </a:prstGeom>
+          <a:ln>
+            <a:solidFill>
+              <a:schemeClr val="tx1"/>
+            </a:solidFill>
+          </a:ln>
+        </p:spPr>
+        <p:style>
+          <a:lnRef idx="1">
+            <a:schemeClr val="accent5"/>
+          </a:lnRef>
+          <a:fillRef idx="2">
+            <a:schemeClr val="accent5"/>
+          </a:fillRef>
+          <a:effectRef idx="1">
+            <a:schemeClr val="accent5"/>
+          </a:effectRef>
+          <a:fontRef idx="minor">
+            <a:schemeClr val="dk1"/>
+          </a:fontRef>
+        </p:style>
+        <p:txBody>
+          <a:bodyPr rtlCol="0" anchor="ctr"/>
+          <a:lstStyle/>
+          <a:p>
+            <a:pPr algn="ctr"/>
+            <a:endParaRPr lang="en-IN"/>
+          </a:p>
+        </p:txBody>
+      </p:sp>
+      <p:cxnSp>
+        <p:nvCxnSpPr>
+          <p:cNvPr id="4" name="Straight Connector 3">
+            <a:extLst>
+              <a:ext uri="{FF2B5EF4-FFF2-40B4-BE49-F238E27FC236}">
+                <a16:creationId xmlns:a16="http://schemas.microsoft.com/office/drawing/2014/main" id="{063ECBD7-DCA2-436E-9C7C-AF8959909038}"/>
+              </a:ext>
+            </a:extLst>
+          </p:cNvPr>
+          <p:cNvCxnSpPr/>
+          <p:nvPr/>
+        </p:nvCxnSpPr>
+        <p:spPr>
+          <a:xfrm>
+            <a:off x="3451411" y="869576"/>
+            <a:ext cx="0" cy="5342965"/>
+          </a:xfrm>
+          <a:prstGeom prst="line">
+            <a:avLst/>
+          </a:prstGeom>
+          <a:ln w="19050">
+            <a:prstDash val="dashDot"/>
+          </a:ln>
+        </p:spPr>
+        <p:style>
+          <a:lnRef idx="1">
+            <a:schemeClr val="accent1"/>
+          </a:lnRef>
+          <a:fillRef idx="0">
+            <a:schemeClr val="accent1"/>
+          </a:fillRef>
+          <a:effectRef idx="0">
+            <a:schemeClr val="accent1"/>
+          </a:effectRef>
+          <a:fontRef idx="minor">
+            <a:schemeClr val="tx1"/>
+          </a:fontRef>
+        </p:style>
+      </p:cxnSp>
+      <p:cxnSp>
+        <p:nvCxnSpPr>
+          <p:cNvPr id="6" name="Straight Connector 5">
+            <a:extLst>
+              <a:ext uri="{FF2B5EF4-FFF2-40B4-BE49-F238E27FC236}">
+                <a16:creationId xmlns:a16="http://schemas.microsoft.com/office/drawing/2014/main" id="{F3331E89-CA08-4F30-9B73-404C022E0431}"/>
+              </a:ext>
+            </a:extLst>
+          </p:cNvPr>
+          <p:cNvCxnSpPr/>
+          <p:nvPr/>
+        </p:nvCxnSpPr>
+        <p:spPr>
+          <a:xfrm>
+            <a:off x="1541931" y="3500717"/>
+            <a:ext cx="3756211" cy="0"/>
+          </a:xfrm>
+          <a:prstGeom prst="line">
+            <a:avLst/>
+          </a:prstGeom>
+          <a:ln w="19050">
+            <a:prstDash val="dashDot"/>
+          </a:ln>
+        </p:spPr>
+        <p:style>
+          <a:lnRef idx="1">
+            <a:schemeClr val="accent1"/>
+          </a:lnRef>
+          <a:fillRef idx="0">
+            <a:schemeClr val="accent1"/>
+          </a:fillRef>
+          <a:effectRef idx="0">
+            <a:schemeClr val="accent1"/>
+          </a:effectRef>
+          <a:fontRef idx="minor">
+            <a:schemeClr val="tx1"/>
+          </a:fontRef>
+        </p:style>
+      </p:cxnSp>
+      <p:cxnSp>
+        <p:nvCxnSpPr>
+          <p:cNvPr id="17" name="Straight Connector 16">
+            <a:extLst>
+              <a:ext uri="{FF2B5EF4-FFF2-40B4-BE49-F238E27FC236}">
+                <a16:creationId xmlns:a16="http://schemas.microsoft.com/office/drawing/2014/main" id="{BAA5B39B-6D95-476B-B2DB-5D7E00BA2C8A}"/>
+              </a:ext>
+            </a:extLst>
+          </p:cNvPr>
+          <p:cNvCxnSpPr/>
+          <p:nvPr/>
+        </p:nvCxnSpPr>
+        <p:spPr>
+          <a:xfrm>
+            <a:off x="9269505" y="869575"/>
+            <a:ext cx="0" cy="5342965"/>
+          </a:xfrm>
+          <a:prstGeom prst="line">
+            <a:avLst/>
+          </a:prstGeom>
+          <a:ln w="19050">
+            <a:prstDash val="dashDot"/>
+          </a:ln>
+        </p:spPr>
+        <p:style>
+          <a:lnRef idx="1">
+            <a:schemeClr val="accent1"/>
+          </a:lnRef>
+          <a:fillRef idx="0">
+            <a:schemeClr val="accent1"/>
+          </a:fillRef>
+          <a:effectRef idx="0">
+            <a:schemeClr val="accent1"/>
+          </a:effectRef>
+          <a:fontRef idx="minor">
+            <a:schemeClr val="tx1"/>
+          </a:fontRef>
+        </p:style>
+      </p:cxnSp>
+      <p:cxnSp>
+        <p:nvCxnSpPr>
+          <p:cNvPr id="18" name="Straight Connector 17">
+            <a:extLst>
+              <a:ext uri="{FF2B5EF4-FFF2-40B4-BE49-F238E27FC236}">
+                <a16:creationId xmlns:a16="http://schemas.microsoft.com/office/drawing/2014/main" id="{90D28447-F07B-4DB0-B90E-B3C89814308A}"/>
+              </a:ext>
+            </a:extLst>
+          </p:cNvPr>
+          <p:cNvCxnSpPr/>
+          <p:nvPr/>
+        </p:nvCxnSpPr>
+        <p:spPr>
+          <a:xfrm>
+            <a:off x="7297272" y="3487269"/>
+            <a:ext cx="3756211" cy="0"/>
+          </a:xfrm>
+          <a:prstGeom prst="line">
+            <a:avLst/>
+          </a:prstGeom>
+          <a:ln w="19050">
+            <a:prstDash val="dashDot"/>
+          </a:ln>
+        </p:spPr>
+        <p:style>
+          <a:lnRef idx="1">
+            <a:schemeClr val="accent1"/>
+          </a:lnRef>
+          <a:fillRef idx="0">
+            <a:schemeClr val="accent1"/>
+          </a:fillRef>
+          <a:effectRef idx="0">
+            <a:schemeClr val="accent1"/>
+          </a:effectRef>
+          <a:fontRef idx="minor">
+            <a:schemeClr val="tx1"/>
+          </a:fontRef>
+        </p:style>
+      </p:cxnSp>
+      <p:sp>
+        <p:nvSpPr>
+          <p:cNvPr id="7" name="Rectangle 6">
+            <a:extLst>
+              <a:ext uri="{FF2B5EF4-FFF2-40B4-BE49-F238E27FC236}">
+                <a16:creationId xmlns:a16="http://schemas.microsoft.com/office/drawing/2014/main" id="{E749182B-8D4E-4E46-8CCB-A9DCC1D9F63E}"/>
+              </a:ext>
+            </a:extLst>
+          </p:cNvPr>
+          <p:cNvSpPr/>
+          <p:nvPr/>
+        </p:nvSpPr>
+        <p:spPr>
+          <a:xfrm>
+            <a:off x="2008094" y="2196353"/>
+            <a:ext cx="2886635" cy="259975"/>
+          </a:xfrm>
+          <a:prstGeom prst="rect">
+            <a:avLst/>
+          </a:prstGeom>
+        </p:spPr>
+        <p:style>
+          <a:lnRef idx="2">
+            <a:schemeClr val="accent1">
+              <a:shade val="50000"/>
+            </a:schemeClr>
+          </a:lnRef>
+          <a:fillRef idx="1">
+            <a:schemeClr val="accent1"/>
+          </a:fillRef>
+          <a:effectRef idx="0">
+            <a:schemeClr val="accent1"/>
+          </a:effectRef>
+          <a:fontRef idx="minor">
+            <a:schemeClr val="lt1"/>
+          </a:fontRef>
+        </p:style>
+        <p:txBody>
+          <a:bodyPr rtlCol="0" anchor="ctr"/>
+          <a:lstStyle/>
+          <a:p>
+            <a:pPr algn="ctr"/>
+            <a:endParaRPr lang="en-IN"/>
+          </a:p>
+        </p:txBody>
+      </p:sp>
+      <p:sp>
+        <p:nvSpPr>
+          <p:cNvPr id="20" name="Rectangle 19">
+            <a:extLst>
+              <a:ext uri="{FF2B5EF4-FFF2-40B4-BE49-F238E27FC236}">
+                <a16:creationId xmlns:a16="http://schemas.microsoft.com/office/drawing/2014/main" id="{8E33FA49-CD1B-4541-AF00-28DC3D29DFA5}"/>
+              </a:ext>
+            </a:extLst>
+          </p:cNvPr>
+          <p:cNvSpPr/>
+          <p:nvPr/>
+        </p:nvSpPr>
+        <p:spPr>
+          <a:xfrm>
+            <a:off x="9892555" y="1577788"/>
+            <a:ext cx="273420" cy="3845859"/>
+          </a:xfrm>
+          <a:prstGeom prst="rect">
+            <a:avLst/>
+          </a:prstGeom>
+        </p:spPr>
+        <p:style>
+          <a:lnRef idx="2">
+            <a:schemeClr val="accent1">
+              <a:shade val="50000"/>
+            </a:schemeClr>
+          </a:lnRef>
+          <a:fillRef idx="1">
+            <a:schemeClr val="accent1"/>
+          </a:fillRef>
+          <a:effectRef idx="0">
+            <a:schemeClr val="accent1"/>
+          </a:effectRef>
+          <a:fontRef idx="minor">
+            <a:schemeClr val="lt1"/>
+          </a:fontRef>
+        </p:style>
+        <p:txBody>
+          <a:bodyPr rtlCol="0" anchor="ctr"/>
+          <a:lstStyle/>
+          <a:p>
+            <a:pPr algn="ctr"/>
+            <a:endParaRPr lang="en-IN"/>
+          </a:p>
+        </p:txBody>
+      </p:sp>
+      <p:cxnSp>
+        <p:nvCxnSpPr>
+          <p:cNvPr id="9" name="Straight Arrow Connector 8">
+            <a:extLst>
+              <a:ext uri="{FF2B5EF4-FFF2-40B4-BE49-F238E27FC236}">
+                <a16:creationId xmlns:a16="http://schemas.microsoft.com/office/drawing/2014/main" id="{F5E67228-6B2E-4481-A8A8-2AFA37CCA9F5}"/>
+              </a:ext>
+            </a:extLst>
+          </p:cNvPr>
+          <p:cNvCxnSpPr>
+            <a:cxnSpLocks/>
+          </p:cNvCxnSpPr>
+          <p:nvPr/>
+        </p:nvCxnSpPr>
+        <p:spPr>
+          <a:xfrm>
+            <a:off x="2008094" y="5737412"/>
+            <a:ext cx="1443317" cy="0"/>
+          </a:xfrm>
+          <a:prstGeom prst="straightConnector1">
+            <a:avLst/>
+          </a:prstGeom>
+          <a:ln w="57150">
+            <a:headEnd type="triangle"/>
+            <a:tailEnd type="triangle"/>
+          </a:ln>
+        </p:spPr>
+        <p:style>
+          <a:lnRef idx="1">
+            <a:schemeClr val="dk1"/>
+          </a:lnRef>
+          <a:fillRef idx="0">
+            <a:schemeClr val="dk1"/>
+          </a:fillRef>
+          <a:effectRef idx="0">
+            <a:schemeClr val="dk1"/>
+          </a:effectRef>
+          <a:fontRef idx="minor">
+            <a:schemeClr val="tx1"/>
+          </a:fontRef>
+        </p:style>
+      </p:cxnSp>
+      <p:cxnSp>
+        <p:nvCxnSpPr>
+          <p:cNvPr id="23" name="Straight Arrow Connector 22">
+            <a:extLst>
+              <a:ext uri="{FF2B5EF4-FFF2-40B4-BE49-F238E27FC236}">
+                <a16:creationId xmlns:a16="http://schemas.microsoft.com/office/drawing/2014/main" id="{3BB5398C-C576-41BF-B4E3-C99F698A291B}"/>
+              </a:ext>
+            </a:extLst>
+          </p:cNvPr>
+          <p:cNvCxnSpPr>
+            <a:cxnSpLocks/>
+          </p:cNvCxnSpPr>
+          <p:nvPr/>
+        </p:nvCxnSpPr>
+        <p:spPr>
+          <a:xfrm>
+            <a:off x="1712258" y="1618127"/>
+            <a:ext cx="0" cy="1869142"/>
+          </a:xfrm>
+          <a:prstGeom prst="straightConnector1">
+            <a:avLst/>
+          </a:prstGeom>
+          <a:ln w="57150">
+            <a:headEnd type="triangle"/>
+            <a:tailEnd type="triangle"/>
+          </a:ln>
+        </p:spPr>
+        <p:style>
+          <a:lnRef idx="1">
+            <a:schemeClr val="dk1"/>
+          </a:lnRef>
+          <a:fillRef idx="0">
+            <a:schemeClr val="dk1"/>
+          </a:fillRef>
+          <a:effectRef idx="0">
+            <a:schemeClr val="dk1"/>
+          </a:effectRef>
+          <a:fontRef idx="minor">
+            <a:schemeClr val="tx1"/>
+          </a:fontRef>
+        </p:style>
+      </p:cxnSp>
+      <p:sp>
+        <p:nvSpPr>
+          <p:cNvPr id="26" name="TextBox 25">
+            <a:extLst>
+              <a:ext uri="{FF2B5EF4-FFF2-40B4-BE49-F238E27FC236}">
+                <a16:creationId xmlns:a16="http://schemas.microsoft.com/office/drawing/2014/main" id="{EC6B8838-F59B-4877-A266-A5EAD999BD0B}"/>
+              </a:ext>
+            </a:extLst>
+          </p:cNvPr>
+          <p:cNvSpPr txBox="1"/>
+          <p:nvPr/>
+        </p:nvSpPr>
+        <p:spPr>
+          <a:xfrm>
+            <a:off x="4988374" y="3197135"/>
+            <a:ext cx="941538" cy="523220"/>
+          </a:xfrm>
+          <a:prstGeom prst="rect">
+            <a:avLst/>
+          </a:prstGeom>
+          <a:noFill/>
+        </p:spPr>
+        <p:txBody>
+          <a:bodyPr wrap="square" rtlCol="0">
+            <a:spAutoFit/>
+          </a:bodyPr>
+          <a:lstStyle/>
+          <a:p>
+            <a:pPr algn="ctr"/>
+            <a:r>
+              <a:rPr lang="en-US" sz="2800" b="1"/>
+              <a:t>x</a:t>
+            </a:r>
+            <a:endParaRPr lang="en-IN" sz="2800" b="1"/>
+          </a:p>
+        </p:txBody>
+      </p:sp>
+      <p:sp>
+        <p:nvSpPr>
+          <p:cNvPr id="27" name="TextBox 26">
+            <a:extLst>
+              <a:ext uri="{FF2B5EF4-FFF2-40B4-BE49-F238E27FC236}">
+                <a16:creationId xmlns:a16="http://schemas.microsoft.com/office/drawing/2014/main" id="{7F62231C-F03A-473D-A631-056ECB8E75F5}"/>
+              </a:ext>
+            </a:extLst>
+          </p:cNvPr>
+          <p:cNvSpPr txBox="1"/>
+          <p:nvPr/>
+        </p:nvSpPr>
+        <p:spPr>
+          <a:xfrm>
+            <a:off x="2980642" y="354714"/>
+            <a:ext cx="941538" cy="523220"/>
+          </a:xfrm>
+          <a:prstGeom prst="rect">
+            <a:avLst/>
+          </a:prstGeom>
+          <a:noFill/>
+        </p:spPr>
+        <p:txBody>
+          <a:bodyPr wrap="square" rtlCol="0">
+            <a:spAutoFit/>
+          </a:bodyPr>
+          <a:lstStyle/>
+          <a:p>
+            <a:pPr algn="ctr"/>
+            <a:r>
+              <a:rPr lang="en-US" sz="2800" b="1"/>
+              <a:t>y</a:t>
+            </a:r>
+            <a:endParaRPr lang="en-IN" sz="2800" b="1"/>
+          </a:p>
+        </p:txBody>
+      </p:sp>
+      <p:sp>
+        <p:nvSpPr>
+          <p:cNvPr id="28" name="TextBox 27">
+            <a:extLst>
+              <a:ext uri="{FF2B5EF4-FFF2-40B4-BE49-F238E27FC236}">
+                <a16:creationId xmlns:a16="http://schemas.microsoft.com/office/drawing/2014/main" id="{FF812D51-54F5-4356-B5E2-7DF9B092FD1C}"/>
+              </a:ext>
+            </a:extLst>
+          </p:cNvPr>
+          <p:cNvSpPr txBox="1"/>
+          <p:nvPr/>
+        </p:nvSpPr>
+        <p:spPr>
+          <a:xfrm>
+            <a:off x="6723649" y="3194285"/>
+            <a:ext cx="941538" cy="523220"/>
+          </a:xfrm>
+          <a:prstGeom prst="rect">
+            <a:avLst/>
+          </a:prstGeom>
+          <a:noFill/>
+        </p:spPr>
+        <p:txBody>
+          <a:bodyPr wrap="square" rtlCol="0">
+            <a:spAutoFit/>
+          </a:bodyPr>
+          <a:lstStyle/>
+          <a:p>
+            <a:pPr algn="ctr"/>
+            <a:r>
+              <a:rPr lang="en-US" sz="2800" b="1"/>
+              <a:t>x</a:t>
+            </a:r>
+            <a:endParaRPr lang="en-IN" sz="2800" b="1"/>
+          </a:p>
+        </p:txBody>
+      </p:sp>
+      <p:sp>
+        <p:nvSpPr>
+          <p:cNvPr id="29" name="TextBox 28">
+            <a:extLst>
+              <a:ext uri="{FF2B5EF4-FFF2-40B4-BE49-F238E27FC236}">
+                <a16:creationId xmlns:a16="http://schemas.microsoft.com/office/drawing/2014/main" id="{B23AD6DA-9993-4D06-9642-B431480E0F9D}"/>
+              </a:ext>
+            </a:extLst>
+          </p:cNvPr>
+          <p:cNvSpPr txBox="1"/>
+          <p:nvPr/>
+        </p:nvSpPr>
+        <p:spPr>
+          <a:xfrm>
+            <a:off x="8790015" y="323340"/>
+            <a:ext cx="941538" cy="523220"/>
+          </a:xfrm>
+          <a:prstGeom prst="rect">
+            <a:avLst/>
+          </a:prstGeom>
+          <a:noFill/>
+        </p:spPr>
+        <p:txBody>
+          <a:bodyPr wrap="square" rtlCol="0">
+            <a:spAutoFit/>
+          </a:bodyPr>
+          <a:lstStyle/>
+          <a:p>
+            <a:pPr algn="ctr"/>
+            <a:r>
+              <a:rPr lang="en-US" sz="2800" b="1"/>
+              <a:t>y</a:t>
+            </a:r>
+            <a:endParaRPr lang="en-IN" sz="2800" b="1"/>
+          </a:p>
+        </p:txBody>
+      </p:sp>
+      <p:sp>
+        <p:nvSpPr>
+          <p:cNvPr id="30" name="TextBox 29">
+            <a:extLst>
+              <a:ext uri="{FF2B5EF4-FFF2-40B4-BE49-F238E27FC236}">
+                <a16:creationId xmlns:a16="http://schemas.microsoft.com/office/drawing/2014/main" id="{230154BF-91F1-4FA0-86F2-EB48E3031EF9}"/>
+              </a:ext>
+            </a:extLst>
+          </p:cNvPr>
+          <p:cNvSpPr txBox="1"/>
+          <p:nvPr/>
+        </p:nvSpPr>
+        <p:spPr>
+          <a:xfrm>
+            <a:off x="815667" y="2264195"/>
+            <a:ext cx="941538" cy="523220"/>
+          </a:xfrm>
+          <a:prstGeom prst="rect">
+            <a:avLst/>
+          </a:prstGeom>
+          <a:noFill/>
+        </p:spPr>
+        <p:txBody>
+          <a:bodyPr wrap="square" rtlCol="0">
+            <a:spAutoFit/>
+          </a:bodyPr>
+          <a:lstStyle/>
+          <a:p>
+            <a:pPr algn="ctr"/>
+            <a:r>
+              <a:rPr lang="en-US" sz="2800" b="1"/>
+              <a:t>d/2</a:t>
+            </a:r>
+            <a:endParaRPr lang="en-IN" sz="2800" b="1"/>
+          </a:p>
+        </p:txBody>
+      </p:sp>
+      <p:cxnSp>
+        <p:nvCxnSpPr>
+          <p:cNvPr id="32" name="Straight Arrow Connector 31">
+            <a:extLst>
+              <a:ext uri="{FF2B5EF4-FFF2-40B4-BE49-F238E27FC236}">
+                <a16:creationId xmlns:a16="http://schemas.microsoft.com/office/drawing/2014/main" id="{BC27B4C8-1D35-4B1D-8173-97EC76DC29D5}"/>
+              </a:ext>
+            </a:extLst>
+          </p:cNvPr>
+          <p:cNvCxnSpPr>
+            <a:cxnSpLocks/>
+          </p:cNvCxnSpPr>
+          <p:nvPr/>
+        </p:nvCxnSpPr>
+        <p:spPr>
+          <a:xfrm>
+            <a:off x="1712258" y="3487269"/>
+            <a:ext cx="0" cy="1936378"/>
+          </a:xfrm>
+          <a:prstGeom prst="straightConnector1">
+            <a:avLst/>
+          </a:prstGeom>
+          <a:ln w="57150">
+            <a:headEnd type="triangle"/>
+            <a:tailEnd type="triangle"/>
+          </a:ln>
+        </p:spPr>
+        <p:style>
+          <a:lnRef idx="1">
+            <a:schemeClr val="dk1"/>
+          </a:lnRef>
+          <a:fillRef idx="0">
+            <a:schemeClr val="dk1"/>
+          </a:fillRef>
+          <a:effectRef idx="0">
+            <a:schemeClr val="dk1"/>
+          </a:effectRef>
+          <a:fontRef idx="minor">
+            <a:schemeClr val="tx1"/>
+          </a:fontRef>
+        </p:style>
+      </p:cxnSp>
+      <p:sp>
+        <p:nvSpPr>
+          <p:cNvPr id="34" name="TextBox 33">
+            <a:extLst>
+              <a:ext uri="{FF2B5EF4-FFF2-40B4-BE49-F238E27FC236}">
+                <a16:creationId xmlns:a16="http://schemas.microsoft.com/office/drawing/2014/main" id="{081752AE-4D85-4D0D-A3F8-2AB62989DD58}"/>
+              </a:ext>
+            </a:extLst>
+          </p:cNvPr>
+          <p:cNvSpPr txBox="1"/>
+          <p:nvPr/>
+        </p:nvSpPr>
+        <p:spPr>
+          <a:xfrm>
+            <a:off x="831172" y="4133337"/>
+            <a:ext cx="941538" cy="523220"/>
+          </a:xfrm>
+          <a:prstGeom prst="rect">
+            <a:avLst/>
+          </a:prstGeom>
+          <a:noFill/>
+        </p:spPr>
+        <p:txBody>
+          <a:bodyPr wrap="square" rtlCol="0">
+            <a:spAutoFit/>
+          </a:bodyPr>
+          <a:lstStyle/>
+          <a:p>
+            <a:pPr algn="ctr"/>
+            <a:r>
+              <a:rPr lang="en-US" sz="2800" b="1"/>
+              <a:t>d/2</a:t>
+            </a:r>
+            <a:endParaRPr lang="en-IN" sz="2800" b="1"/>
+          </a:p>
+        </p:txBody>
+      </p:sp>
+      <p:sp>
+        <p:nvSpPr>
+          <p:cNvPr id="35" name="TextBox 34">
+            <a:extLst>
+              <a:ext uri="{FF2B5EF4-FFF2-40B4-BE49-F238E27FC236}">
+                <a16:creationId xmlns:a16="http://schemas.microsoft.com/office/drawing/2014/main" id="{36531CEC-282F-49C9-BD04-3C18A5E893CA}"/>
+              </a:ext>
+            </a:extLst>
+          </p:cNvPr>
+          <p:cNvSpPr txBox="1"/>
+          <p:nvPr/>
+        </p:nvSpPr>
+        <p:spPr>
+          <a:xfrm>
+            <a:off x="2292417" y="5780602"/>
+            <a:ext cx="941538" cy="523220"/>
+          </a:xfrm>
+          <a:prstGeom prst="rect">
+            <a:avLst/>
+          </a:prstGeom>
+          <a:noFill/>
+        </p:spPr>
+        <p:txBody>
+          <a:bodyPr wrap="square" rtlCol="0">
+            <a:spAutoFit/>
+          </a:bodyPr>
+          <a:lstStyle/>
+          <a:p>
+            <a:pPr algn="ctr"/>
+            <a:r>
+              <a:rPr lang="en-US" sz="2800" b="1"/>
+              <a:t>b/2</a:t>
+            </a:r>
+            <a:endParaRPr lang="en-IN" sz="2800" b="1"/>
+          </a:p>
+        </p:txBody>
+      </p:sp>
+      <p:cxnSp>
+        <p:nvCxnSpPr>
+          <p:cNvPr id="37" name="Straight Arrow Connector 36">
+            <a:extLst>
+              <a:ext uri="{FF2B5EF4-FFF2-40B4-BE49-F238E27FC236}">
+                <a16:creationId xmlns:a16="http://schemas.microsoft.com/office/drawing/2014/main" id="{0310B905-595F-49A4-AB01-B92758998CD0}"/>
+              </a:ext>
+            </a:extLst>
+          </p:cNvPr>
+          <p:cNvCxnSpPr>
+            <a:cxnSpLocks/>
+          </p:cNvCxnSpPr>
+          <p:nvPr/>
+        </p:nvCxnSpPr>
+        <p:spPr>
+          <a:xfrm>
+            <a:off x="3484967" y="5737412"/>
+            <a:ext cx="1443317" cy="0"/>
+          </a:xfrm>
+          <a:prstGeom prst="straightConnector1">
+            <a:avLst/>
+          </a:prstGeom>
+          <a:ln w="57150">
+            <a:headEnd type="triangle"/>
+            <a:tailEnd type="triangle"/>
+          </a:ln>
+        </p:spPr>
+        <p:style>
+          <a:lnRef idx="1">
+            <a:schemeClr val="dk1"/>
+          </a:lnRef>
+          <a:fillRef idx="0">
+            <a:schemeClr val="dk1"/>
+          </a:fillRef>
+          <a:effectRef idx="0">
+            <a:schemeClr val="dk1"/>
+          </a:effectRef>
+          <a:fontRef idx="minor">
+            <a:schemeClr val="tx1"/>
+          </a:fontRef>
+        </p:style>
+      </p:cxnSp>
+      <p:sp>
+        <p:nvSpPr>
+          <p:cNvPr id="38" name="TextBox 37">
+            <a:extLst>
+              <a:ext uri="{FF2B5EF4-FFF2-40B4-BE49-F238E27FC236}">
+                <a16:creationId xmlns:a16="http://schemas.microsoft.com/office/drawing/2014/main" id="{9BEB4E13-0169-4766-A4FD-7FF843A09A4D}"/>
+              </a:ext>
+            </a:extLst>
+          </p:cNvPr>
+          <p:cNvSpPr txBox="1"/>
+          <p:nvPr/>
+        </p:nvSpPr>
+        <p:spPr>
+          <a:xfrm>
+            <a:off x="3769290" y="5780602"/>
+            <a:ext cx="941538" cy="523220"/>
+          </a:xfrm>
+          <a:prstGeom prst="rect">
+            <a:avLst/>
+          </a:prstGeom>
+          <a:noFill/>
+        </p:spPr>
+        <p:txBody>
+          <a:bodyPr wrap="square" rtlCol="0">
+            <a:spAutoFit/>
+          </a:bodyPr>
+          <a:lstStyle/>
+          <a:p>
+            <a:pPr algn="ctr"/>
+            <a:r>
+              <a:rPr lang="en-US" sz="2800" b="1"/>
+              <a:t>b/2</a:t>
+            </a:r>
+            <a:endParaRPr lang="en-IN" sz="2800" b="1"/>
+          </a:p>
+        </p:txBody>
+      </p:sp>
+      <p:sp>
+        <p:nvSpPr>
+          <p:cNvPr id="39" name="TextBox 38">
+            <a:extLst>
+              <a:ext uri="{FF2B5EF4-FFF2-40B4-BE49-F238E27FC236}">
+                <a16:creationId xmlns:a16="http://schemas.microsoft.com/office/drawing/2014/main" id="{F8442C62-2A3A-443E-8DF1-61097AFB8E4D}"/>
+              </a:ext>
+            </a:extLst>
+          </p:cNvPr>
+          <p:cNvSpPr txBox="1"/>
+          <p:nvPr/>
+        </p:nvSpPr>
+        <p:spPr>
+          <a:xfrm>
+            <a:off x="4827373" y="2055654"/>
+            <a:ext cx="941538" cy="523220"/>
+          </a:xfrm>
+          <a:prstGeom prst="rect">
+            <a:avLst/>
+          </a:prstGeom>
+          <a:noFill/>
+        </p:spPr>
+        <p:txBody>
+          <a:bodyPr wrap="square" rtlCol="0">
+            <a:spAutoFit/>
+          </a:bodyPr>
+          <a:lstStyle/>
+          <a:p>
+            <a:pPr algn="ctr"/>
+            <a:r>
+              <a:rPr lang="en-US" sz="2800" b="1"/>
+              <a:t>dy</a:t>
+            </a:r>
+            <a:endParaRPr lang="en-IN" sz="2800" b="1"/>
+          </a:p>
+        </p:txBody>
+      </p:sp>
+      <p:cxnSp>
+        <p:nvCxnSpPr>
+          <p:cNvPr id="41" name="Straight Arrow Connector 40">
+            <a:extLst>
+              <a:ext uri="{FF2B5EF4-FFF2-40B4-BE49-F238E27FC236}">
+                <a16:creationId xmlns:a16="http://schemas.microsoft.com/office/drawing/2014/main" id="{378789C0-F840-4E25-9832-65CF366C79A0}"/>
+              </a:ext>
+            </a:extLst>
+          </p:cNvPr>
+          <p:cNvCxnSpPr>
+            <a:cxnSpLocks/>
+          </p:cNvCxnSpPr>
+          <p:nvPr/>
+        </p:nvCxnSpPr>
+        <p:spPr>
+          <a:xfrm>
+            <a:off x="4206625" y="2494429"/>
+            <a:ext cx="0" cy="992840"/>
+          </a:xfrm>
+          <a:prstGeom prst="straightConnector1">
+            <a:avLst/>
+          </a:prstGeom>
+          <a:ln w="57150">
+            <a:headEnd type="triangle"/>
+            <a:tailEnd type="triangle"/>
+          </a:ln>
+        </p:spPr>
+        <p:style>
+          <a:lnRef idx="1">
+            <a:schemeClr val="dk1"/>
+          </a:lnRef>
+          <a:fillRef idx="0">
+            <a:schemeClr val="dk1"/>
+          </a:fillRef>
+          <a:effectRef idx="0">
+            <a:schemeClr val="dk1"/>
+          </a:effectRef>
+          <a:fontRef idx="minor">
+            <a:schemeClr val="tx1"/>
+          </a:fontRef>
+        </p:style>
+      </p:cxnSp>
+      <p:sp>
+        <p:nvSpPr>
+          <p:cNvPr id="42" name="TextBox 41">
+            <a:extLst>
+              <a:ext uri="{FF2B5EF4-FFF2-40B4-BE49-F238E27FC236}">
+                <a16:creationId xmlns:a16="http://schemas.microsoft.com/office/drawing/2014/main" id="{D8BB8A2E-EAF3-446F-ADDC-5D1C037C3DD8}"/>
+              </a:ext>
+            </a:extLst>
+          </p:cNvPr>
+          <p:cNvSpPr txBox="1"/>
+          <p:nvPr/>
+        </p:nvSpPr>
+        <p:spPr>
+          <a:xfrm>
+            <a:off x="3894556" y="2670950"/>
+            <a:ext cx="941538" cy="523220"/>
+          </a:xfrm>
+          <a:prstGeom prst="rect">
+            <a:avLst/>
+          </a:prstGeom>
+          <a:noFill/>
+        </p:spPr>
+        <p:txBody>
+          <a:bodyPr wrap="square" rtlCol="0">
+            <a:spAutoFit/>
+          </a:bodyPr>
+          <a:lstStyle/>
+          <a:p>
+            <a:pPr algn="ctr"/>
+            <a:r>
+              <a:rPr lang="en-US" sz="2800" b="1"/>
+              <a:t>y</a:t>
+            </a:r>
+            <a:endParaRPr lang="en-IN" sz="2800" b="1"/>
+          </a:p>
+        </p:txBody>
+      </p:sp>
+      <p:cxnSp>
+        <p:nvCxnSpPr>
+          <p:cNvPr id="43" name="Straight Arrow Connector 42">
+            <a:extLst>
+              <a:ext uri="{FF2B5EF4-FFF2-40B4-BE49-F238E27FC236}">
+                <a16:creationId xmlns:a16="http://schemas.microsoft.com/office/drawing/2014/main" id="{519C9EB6-C9A1-4868-9E18-A9FC895B3EBD}"/>
+              </a:ext>
+            </a:extLst>
+          </p:cNvPr>
+          <p:cNvCxnSpPr>
+            <a:cxnSpLocks/>
+          </p:cNvCxnSpPr>
+          <p:nvPr/>
+        </p:nvCxnSpPr>
+        <p:spPr>
+          <a:xfrm>
+            <a:off x="9307606" y="2525805"/>
+            <a:ext cx="584949" cy="0"/>
+          </a:xfrm>
+          <a:prstGeom prst="straightConnector1">
+            <a:avLst/>
+          </a:prstGeom>
+          <a:ln w="57150">
+            <a:headEnd type="triangle"/>
+            <a:tailEnd type="triangle"/>
+          </a:ln>
+        </p:spPr>
+        <p:style>
+          <a:lnRef idx="1">
+            <a:schemeClr val="dk1"/>
+          </a:lnRef>
+          <a:fillRef idx="0">
+            <a:schemeClr val="dk1"/>
+          </a:fillRef>
+          <a:effectRef idx="0">
+            <a:schemeClr val="dk1"/>
+          </a:effectRef>
+          <a:fontRef idx="minor">
+            <a:schemeClr val="tx1"/>
+          </a:fontRef>
+        </p:style>
+      </p:cxnSp>
+      <p:sp>
+        <p:nvSpPr>
+          <p:cNvPr id="46" name="TextBox 45">
+            <a:extLst>
+              <a:ext uri="{FF2B5EF4-FFF2-40B4-BE49-F238E27FC236}">
+                <a16:creationId xmlns:a16="http://schemas.microsoft.com/office/drawing/2014/main" id="{87A17B89-7707-437F-94BD-245387E2ADA1}"/>
+              </a:ext>
+            </a:extLst>
+          </p:cNvPr>
+          <p:cNvSpPr txBox="1"/>
+          <p:nvPr/>
+        </p:nvSpPr>
+        <p:spPr>
+          <a:xfrm>
+            <a:off x="9140212" y="2436766"/>
+            <a:ext cx="941538" cy="523220"/>
+          </a:xfrm>
+          <a:prstGeom prst="rect">
+            <a:avLst/>
+          </a:prstGeom>
+          <a:noFill/>
+        </p:spPr>
+        <p:txBody>
+          <a:bodyPr wrap="square" rtlCol="0">
+            <a:spAutoFit/>
+          </a:bodyPr>
+          <a:lstStyle/>
+          <a:p>
+            <a:pPr algn="ctr"/>
+            <a:r>
+              <a:rPr lang="en-US" sz="2800" b="1"/>
+              <a:t>x</a:t>
+            </a:r>
+            <a:endParaRPr lang="en-IN" sz="2800" b="1"/>
+          </a:p>
+        </p:txBody>
+      </p:sp>
+      <p:sp>
+        <p:nvSpPr>
+          <p:cNvPr id="49" name="TextBox 48">
+            <a:extLst>
+              <a:ext uri="{FF2B5EF4-FFF2-40B4-BE49-F238E27FC236}">
+                <a16:creationId xmlns:a16="http://schemas.microsoft.com/office/drawing/2014/main" id="{CC787C8A-6DDA-4951-BB58-BB7C93D67680}"/>
+              </a:ext>
+            </a:extLst>
+          </p:cNvPr>
+          <p:cNvSpPr txBox="1"/>
+          <p:nvPr/>
+        </p:nvSpPr>
+        <p:spPr>
+          <a:xfrm>
+            <a:off x="9543715" y="1139122"/>
+            <a:ext cx="941538" cy="523220"/>
+          </a:xfrm>
+          <a:prstGeom prst="rect">
+            <a:avLst/>
+          </a:prstGeom>
+          <a:noFill/>
+        </p:spPr>
+        <p:txBody>
+          <a:bodyPr wrap="square" rtlCol="0">
+            <a:spAutoFit/>
+          </a:bodyPr>
+          <a:lstStyle/>
+          <a:p>
+            <a:pPr algn="ctr"/>
+            <a:r>
+              <a:rPr lang="en-US" sz="2800" b="1"/>
+              <a:t>dx</a:t>
+            </a:r>
+            <a:endParaRPr lang="en-IN" sz="2800" b="1"/>
+          </a:p>
+        </p:txBody>
+      </p:sp>
+      <p:sp>
+        <p:nvSpPr>
+          <p:cNvPr id="50" name="Oval 49">
+            <a:extLst>
+              <a:ext uri="{FF2B5EF4-FFF2-40B4-BE49-F238E27FC236}">
+                <a16:creationId xmlns:a16="http://schemas.microsoft.com/office/drawing/2014/main" id="{D61F349F-71C2-4DBD-9491-D4D1A79DDF2D}"/>
+              </a:ext>
+            </a:extLst>
+          </p:cNvPr>
+          <p:cNvSpPr/>
+          <p:nvPr/>
+        </p:nvSpPr>
+        <p:spPr>
+          <a:xfrm>
+            <a:off x="3371122" y="3429000"/>
+            <a:ext cx="160577" cy="156440"/>
+          </a:xfrm>
+          <a:prstGeom prst="ellipse">
+            <a:avLst/>
+          </a:prstGeom>
+        </p:spPr>
+        <p:style>
+          <a:lnRef idx="2">
+            <a:schemeClr val="dk1">
+              <a:shade val="50000"/>
+            </a:schemeClr>
+          </a:lnRef>
+          <a:fillRef idx="1">
+            <a:schemeClr val="dk1"/>
+          </a:fillRef>
+          <a:effectRef idx="0">
+            <a:schemeClr val="dk1"/>
+          </a:effectRef>
+          <a:fontRef idx="minor">
+            <a:schemeClr val="lt1"/>
+          </a:fontRef>
+        </p:style>
+        <p:txBody>
+          <a:bodyPr rtlCol="0" anchor="ctr"/>
+          <a:lstStyle/>
+          <a:p>
+            <a:pPr algn="ctr"/>
+            <a:endParaRPr lang="en-IN"/>
+          </a:p>
+        </p:txBody>
+      </p:sp>
+      <p:sp>
+        <p:nvSpPr>
+          <p:cNvPr id="51" name="Oval 50">
+            <a:extLst>
+              <a:ext uri="{FF2B5EF4-FFF2-40B4-BE49-F238E27FC236}">
+                <a16:creationId xmlns:a16="http://schemas.microsoft.com/office/drawing/2014/main" id="{8801D576-5170-4D89-914C-FC4C36E0FF0C}"/>
+              </a:ext>
+            </a:extLst>
+          </p:cNvPr>
+          <p:cNvSpPr/>
+          <p:nvPr/>
+        </p:nvSpPr>
+        <p:spPr>
+          <a:xfrm>
+            <a:off x="9180253" y="3377675"/>
+            <a:ext cx="160577" cy="156440"/>
+          </a:xfrm>
+          <a:prstGeom prst="ellipse">
+            <a:avLst/>
+          </a:prstGeom>
+        </p:spPr>
+        <p:style>
+          <a:lnRef idx="2">
+            <a:schemeClr val="dk1">
+              <a:shade val="50000"/>
+            </a:schemeClr>
+          </a:lnRef>
+          <a:fillRef idx="1">
+            <a:schemeClr val="dk1"/>
+          </a:fillRef>
+          <a:effectRef idx="0">
+            <a:schemeClr val="dk1"/>
+          </a:effectRef>
+          <a:fontRef idx="minor">
+            <a:schemeClr val="lt1"/>
+          </a:fontRef>
+        </p:style>
+        <p:txBody>
+          <a:bodyPr rtlCol="0" anchor="ctr"/>
+          <a:lstStyle/>
+          <a:p>
+            <a:pPr algn="ctr"/>
+            <a:endParaRPr lang="en-IN"/>
+          </a:p>
+        </p:txBody>
+      </p:sp>
+      <p:sp>
+        <p:nvSpPr>
+          <p:cNvPr id="52" name="TextBox 51">
+            <a:extLst>
+              <a:ext uri="{FF2B5EF4-FFF2-40B4-BE49-F238E27FC236}">
+                <a16:creationId xmlns:a16="http://schemas.microsoft.com/office/drawing/2014/main" id="{044F3280-C634-4904-901C-1FA03D063A3F}"/>
+              </a:ext>
+            </a:extLst>
+          </p:cNvPr>
+          <p:cNvSpPr txBox="1"/>
+          <p:nvPr/>
+        </p:nvSpPr>
+        <p:spPr>
+          <a:xfrm>
+            <a:off x="3179199" y="3447422"/>
+            <a:ext cx="941538" cy="523220"/>
+          </a:xfrm>
+          <a:prstGeom prst="rect">
+            <a:avLst/>
+          </a:prstGeom>
+          <a:noFill/>
+        </p:spPr>
+        <p:txBody>
+          <a:bodyPr wrap="square" rtlCol="0">
+            <a:spAutoFit/>
+          </a:bodyPr>
+          <a:lstStyle/>
+          <a:p>
+            <a:pPr algn="ctr"/>
+            <a:r>
+              <a:rPr lang="en-US" sz="2800" b="1"/>
+              <a:t>c</a:t>
+            </a:r>
+            <a:endParaRPr lang="en-IN" sz="2800" b="1"/>
+          </a:p>
+        </p:txBody>
+      </p:sp>
+      <p:sp>
+        <p:nvSpPr>
+          <p:cNvPr id="53" name="TextBox 52">
+            <a:extLst>
+              <a:ext uri="{FF2B5EF4-FFF2-40B4-BE49-F238E27FC236}">
+                <a16:creationId xmlns:a16="http://schemas.microsoft.com/office/drawing/2014/main" id="{3A9577D6-991A-4A30-A0E8-94E4C684A457}"/>
+              </a:ext>
+            </a:extLst>
+          </p:cNvPr>
+          <p:cNvSpPr txBox="1"/>
+          <p:nvPr/>
+        </p:nvSpPr>
+        <p:spPr>
+          <a:xfrm>
+            <a:off x="8951017" y="3367043"/>
+            <a:ext cx="941538" cy="523220"/>
+          </a:xfrm>
+          <a:prstGeom prst="rect">
+            <a:avLst/>
+          </a:prstGeom>
+          <a:noFill/>
+        </p:spPr>
+        <p:txBody>
+          <a:bodyPr wrap="square" rtlCol="0">
+            <a:spAutoFit/>
+          </a:bodyPr>
+          <a:lstStyle/>
+          <a:p>
+            <a:pPr algn="ctr"/>
+            <a:r>
+              <a:rPr lang="en-US" sz="2800" b="1"/>
+              <a:t>c</a:t>
+            </a:r>
+            <a:endParaRPr lang="en-IN" sz="2800" b="1"/>
+          </a:p>
+        </p:txBody>
+      </p:sp>
+      <p:cxnSp>
+        <p:nvCxnSpPr>
+          <p:cNvPr id="54" name="Straight Arrow Connector 53">
+            <a:extLst>
+              <a:ext uri="{FF2B5EF4-FFF2-40B4-BE49-F238E27FC236}">
+                <a16:creationId xmlns:a16="http://schemas.microsoft.com/office/drawing/2014/main" id="{B38F5F86-5136-4A18-A92F-4FE5F863D0CD}"/>
+              </a:ext>
+            </a:extLst>
+          </p:cNvPr>
+          <p:cNvCxnSpPr>
+            <a:cxnSpLocks/>
+          </p:cNvCxnSpPr>
+          <p:nvPr/>
+        </p:nvCxnSpPr>
+        <p:spPr>
+          <a:xfrm>
+            <a:off x="7826188" y="5737412"/>
+            <a:ext cx="1443317" cy="0"/>
+          </a:xfrm>
+          <a:prstGeom prst="straightConnector1">
+            <a:avLst/>
+          </a:prstGeom>
+          <a:ln w="57150">
+            <a:headEnd type="triangle"/>
+            <a:tailEnd type="triangle"/>
+          </a:ln>
+        </p:spPr>
+        <p:style>
+          <a:lnRef idx="1">
+            <a:schemeClr val="dk1"/>
+          </a:lnRef>
+          <a:fillRef idx="0">
+            <a:schemeClr val="dk1"/>
+          </a:fillRef>
+          <a:effectRef idx="0">
+            <a:schemeClr val="dk1"/>
+          </a:effectRef>
+          <a:fontRef idx="minor">
+            <a:schemeClr val="tx1"/>
+          </a:fontRef>
+        </p:style>
+      </p:cxnSp>
+      <p:cxnSp>
+        <p:nvCxnSpPr>
+          <p:cNvPr id="55" name="Straight Arrow Connector 54">
+            <a:extLst>
+              <a:ext uri="{FF2B5EF4-FFF2-40B4-BE49-F238E27FC236}">
+                <a16:creationId xmlns:a16="http://schemas.microsoft.com/office/drawing/2014/main" id="{1B6289B7-4C58-4AD8-8802-CB9D2F77237D}"/>
+              </a:ext>
+            </a:extLst>
+          </p:cNvPr>
+          <p:cNvCxnSpPr>
+            <a:cxnSpLocks/>
+          </p:cNvCxnSpPr>
+          <p:nvPr/>
+        </p:nvCxnSpPr>
+        <p:spPr>
+          <a:xfrm>
+            <a:off x="7530352" y="1618127"/>
+            <a:ext cx="0" cy="1869142"/>
+          </a:xfrm>
+          <a:prstGeom prst="straightConnector1">
+            <a:avLst/>
+          </a:prstGeom>
+          <a:ln w="57150">
+            <a:headEnd type="triangle"/>
+            <a:tailEnd type="triangle"/>
+          </a:ln>
+        </p:spPr>
+        <p:style>
+          <a:lnRef idx="1">
+            <a:schemeClr val="dk1"/>
+          </a:lnRef>
+          <a:fillRef idx="0">
+            <a:schemeClr val="dk1"/>
+          </a:fillRef>
+          <a:effectRef idx="0">
+            <a:schemeClr val="dk1"/>
+          </a:effectRef>
+          <a:fontRef idx="minor">
+            <a:schemeClr val="tx1"/>
+          </a:fontRef>
+        </p:style>
+      </p:cxnSp>
+      <p:sp>
+        <p:nvSpPr>
+          <p:cNvPr id="56" name="TextBox 55">
+            <a:extLst>
+              <a:ext uri="{FF2B5EF4-FFF2-40B4-BE49-F238E27FC236}">
+                <a16:creationId xmlns:a16="http://schemas.microsoft.com/office/drawing/2014/main" id="{FA8A107D-5674-45F9-8CBC-7931311E5ECF}"/>
+              </a:ext>
+            </a:extLst>
+          </p:cNvPr>
+          <p:cNvSpPr txBox="1"/>
+          <p:nvPr/>
+        </p:nvSpPr>
+        <p:spPr>
+          <a:xfrm>
+            <a:off x="6633761" y="2264195"/>
+            <a:ext cx="941538" cy="523220"/>
+          </a:xfrm>
+          <a:prstGeom prst="rect">
+            <a:avLst/>
+          </a:prstGeom>
+          <a:noFill/>
+        </p:spPr>
+        <p:txBody>
+          <a:bodyPr wrap="square" rtlCol="0">
+            <a:spAutoFit/>
+          </a:bodyPr>
+          <a:lstStyle/>
+          <a:p>
+            <a:pPr algn="ctr"/>
+            <a:r>
+              <a:rPr lang="en-US" sz="2800" b="1"/>
+              <a:t>d/2</a:t>
+            </a:r>
+            <a:endParaRPr lang="en-IN" sz="2800" b="1"/>
+          </a:p>
+        </p:txBody>
+      </p:sp>
+      <p:cxnSp>
+        <p:nvCxnSpPr>
+          <p:cNvPr id="58" name="Straight Arrow Connector 57">
+            <a:extLst>
+              <a:ext uri="{FF2B5EF4-FFF2-40B4-BE49-F238E27FC236}">
+                <a16:creationId xmlns:a16="http://schemas.microsoft.com/office/drawing/2014/main" id="{8B7A4272-F811-46D3-811B-BBC579FE47A7}"/>
+              </a:ext>
+            </a:extLst>
+          </p:cNvPr>
+          <p:cNvCxnSpPr>
+            <a:cxnSpLocks/>
+          </p:cNvCxnSpPr>
+          <p:nvPr/>
+        </p:nvCxnSpPr>
+        <p:spPr>
+          <a:xfrm>
+            <a:off x="7530352" y="3487269"/>
+            <a:ext cx="0" cy="1936378"/>
+          </a:xfrm>
+          <a:prstGeom prst="straightConnector1">
+            <a:avLst/>
+          </a:prstGeom>
+          <a:ln w="57150">
+            <a:headEnd type="triangle"/>
+            <a:tailEnd type="triangle"/>
+          </a:ln>
+        </p:spPr>
+        <p:style>
+          <a:lnRef idx="1">
+            <a:schemeClr val="dk1"/>
+          </a:lnRef>
+          <a:fillRef idx="0">
+            <a:schemeClr val="dk1"/>
+          </a:fillRef>
+          <a:effectRef idx="0">
+            <a:schemeClr val="dk1"/>
+          </a:effectRef>
+          <a:fontRef idx="minor">
+            <a:schemeClr val="tx1"/>
+          </a:fontRef>
+        </p:style>
+      </p:cxnSp>
+      <p:sp>
+        <p:nvSpPr>
+          <p:cNvPr id="59" name="TextBox 58">
+            <a:extLst>
+              <a:ext uri="{FF2B5EF4-FFF2-40B4-BE49-F238E27FC236}">
+                <a16:creationId xmlns:a16="http://schemas.microsoft.com/office/drawing/2014/main" id="{849395FD-EAD6-46E5-A55D-73F20DD57FE2}"/>
+              </a:ext>
+            </a:extLst>
+          </p:cNvPr>
+          <p:cNvSpPr txBox="1"/>
+          <p:nvPr/>
+        </p:nvSpPr>
+        <p:spPr>
+          <a:xfrm>
+            <a:off x="6649266" y="4133337"/>
+            <a:ext cx="941538" cy="523220"/>
+          </a:xfrm>
+          <a:prstGeom prst="rect">
+            <a:avLst/>
+          </a:prstGeom>
+          <a:noFill/>
+        </p:spPr>
+        <p:txBody>
+          <a:bodyPr wrap="square" rtlCol="0">
+            <a:spAutoFit/>
+          </a:bodyPr>
+          <a:lstStyle/>
+          <a:p>
+            <a:pPr algn="ctr"/>
+            <a:r>
+              <a:rPr lang="en-US" sz="2800" b="1"/>
+              <a:t>d/2</a:t>
+            </a:r>
+            <a:endParaRPr lang="en-IN" sz="2800" b="1"/>
+          </a:p>
+        </p:txBody>
+      </p:sp>
+      <p:sp>
+        <p:nvSpPr>
+          <p:cNvPr id="60" name="TextBox 59">
+            <a:extLst>
+              <a:ext uri="{FF2B5EF4-FFF2-40B4-BE49-F238E27FC236}">
+                <a16:creationId xmlns:a16="http://schemas.microsoft.com/office/drawing/2014/main" id="{1864EA0D-0D26-4569-A459-5D1273AAEE73}"/>
+              </a:ext>
+            </a:extLst>
+          </p:cNvPr>
+          <p:cNvSpPr txBox="1"/>
+          <p:nvPr/>
+        </p:nvSpPr>
+        <p:spPr>
+          <a:xfrm>
+            <a:off x="8110511" y="5780602"/>
+            <a:ext cx="941538" cy="523220"/>
+          </a:xfrm>
+          <a:prstGeom prst="rect">
+            <a:avLst/>
+          </a:prstGeom>
+          <a:noFill/>
+        </p:spPr>
+        <p:txBody>
+          <a:bodyPr wrap="square" rtlCol="0">
+            <a:spAutoFit/>
+          </a:bodyPr>
+          <a:lstStyle/>
+          <a:p>
+            <a:pPr algn="ctr"/>
+            <a:r>
+              <a:rPr lang="en-US" sz="2800" b="1"/>
+              <a:t>b/2</a:t>
+            </a:r>
+            <a:endParaRPr lang="en-IN" sz="2800" b="1"/>
+          </a:p>
+        </p:txBody>
+      </p:sp>
+      <p:cxnSp>
+        <p:nvCxnSpPr>
+          <p:cNvPr id="61" name="Straight Arrow Connector 60">
+            <a:extLst>
+              <a:ext uri="{FF2B5EF4-FFF2-40B4-BE49-F238E27FC236}">
+                <a16:creationId xmlns:a16="http://schemas.microsoft.com/office/drawing/2014/main" id="{928613E2-4CC9-4364-BF93-580BCA9D4DBE}"/>
+              </a:ext>
+            </a:extLst>
+          </p:cNvPr>
+          <p:cNvCxnSpPr>
+            <a:cxnSpLocks/>
+          </p:cNvCxnSpPr>
+          <p:nvPr/>
+        </p:nvCxnSpPr>
+        <p:spPr>
+          <a:xfrm>
+            <a:off x="9303061" y="5737412"/>
+            <a:ext cx="1443317" cy="0"/>
+          </a:xfrm>
+          <a:prstGeom prst="straightConnector1">
+            <a:avLst/>
+          </a:prstGeom>
+          <a:ln w="57150">
+            <a:headEnd type="triangle"/>
+            <a:tailEnd type="triangle"/>
+          </a:ln>
+        </p:spPr>
+        <p:style>
+          <a:lnRef idx="1">
+            <a:schemeClr val="dk1"/>
+          </a:lnRef>
+          <a:fillRef idx="0">
+            <a:schemeClr val="dk1"/>
+          </a:fillRef>
+          <a:effectRef idx="0">
+            <a:schemeClr val="dk1"/>
+          </a:effectRef>
+          <a:fontRef idx="minor">
+            <a:schemeClr val="tx1"/>
+          </a:fontRef>
+        </p:style>
+      </p:cxnSp>
+      <p:sp>
+        <p:nvSpPr>
+          <p:cNvPr id="62" name="TextBox 61">
+            <a:extLst>
+              <a:ext uri="{FF2B5EF4-FFF2-40B4-BE49-F238E27FC236}">
+                <a16:creationId xmlns:a16="http://schemas.microsoft.com/office/drawing/2014/main" id="{C144E34F-1A29-4E6E-A154-3772387C2F16}"/>
+              </a:ext>
+            </a:extLst>
+          </p:cNvPr>
+          <p:cNvSpPr txBox="1"/>
+          <p:nvPr/>
+        </p:nvSpPr>
+        <p:spPr>
+          <a:xfrm>
+            <a:off x="9587384" y="5780602"/>
+            <a:ext cx="941538" cy="523220"/>
+          </a:xfrm>
+          <a:prstGeom prst="rect">
+            <a:avLst/>
+          </a:prstGeom>
+          <a:noFill/>
+        </p:spPr>
+        <p:txBody>
+          <a:bodyPr wrap="square" rtlCol="0">
+            <a:spAutoFit/>
+          </a:bodyPr>
+          <a:lstStyle/>
+          <a:p>
+            <a:pPr algn="ctr"/>
+            <a:r>
+              <a:rPr lang="en-US" sz="2800" b="1"/>
+              <a:t>b/2</a:t>
+            </a:r>
+            <a:endParaRPr lang="en-IN" sz="2800" b="1"/>
+          </a:p>
+        </p:txBody>
+      </p:sp>
+    </p:spTree>
+    <p:extLst>
+      <p:ext uri="{BB962C8B-B14F-4D97-AF65-F5344CB8AC3E}">
+        <p14:creationId xmlns:p14="http://schemas.microsoft.com/office/powerpoint/2010/main" val="399417818"/>
+      </p:ext>
+    </p:extLst>
+  </p:cSld>
+  <p:clrMapOvr>
+    <a:masterClrMapping/>
+  </p:clrMapOvr>
+</p:sld>
+</file>
+
+<file path=ppt/slides/slide19.xml><?xml version="1.0" encoding="utf-8"?>
+<p:sld xmlns:a="http://schemas.openxmlformats.org/drawingml/2006/main" xmlns:r="http://schemas.openxmlformats.org/officeDocument/2006/relationships" xmlns:p="http://schemas.openxmlformats.org/presentationml/2006/main">
+  <p:cSld>
+    <p:spTree>
+      <p:nvGrpSpPr>
+        <p:cNvPr id="1" name=""/>
+        <p:cNvGrpSpPr/>
+        <p:nvPr/>
+      </p:nvGrpSpPr>
+      <p:grpSpPr>
+        <a:xfrm>
+          <a:off x="0" y="0"/>
+          <a:ext cx="0" cy="0"/>
+          <a:chOff x="0" y="0"/>
+          <a:chExt cx="0" cy="0"/>
+        </a:xfrm>
+      </p:grpSpPr>
+      <p:sp>
+        <p:nvSpPr>
+          <p:cNvPr id="4" name="Rectangle 3">
+            <a:extLst>
+              <a:ext uri="{FF2B5EF4-FFF2-40B4-BE49-F238E27FC236}">
+                <a16:creationId xmlns:a16="http://schemas.microsoft.com/office/drawing/2014/main" id="{9309D94E-ED23-4194-8EE7-010C085B27C6}"/>
+              </a:ext>
+            </a:extLst>
+          </p:cNvPr>
+          <p:cNvSpPr/>
+          <p:nvPr/>
+        </p:nvSpPr>
+        <p:spPr>
+          <a:xfrm>
+            <a:off x="2008094" y="1577788"/>
+            <a:ext cx="2886635" cy="3845859"/>
+          </a:xfrm>
+          <a:prstGeom prst="rect">
+            <a:avLst/>
+          </a:prstGeom>
+          <a:ln>
+            <a:solidFill>
+              <a:schemeClr val="tx1"/>
+            </a:solidFill>
+          </a:ln>
+        </p:spPr>
+        <p:style>
+          <a:lnRef idx="1">
+            <a:schemeClr val="accent5"/>
+          </a:lnRef>
+          <a:fillRef idx="2">
+            <a:schemeClr val="accent5"/>
+          </a:fillRef>
+          <a:effectRef idx="1">
+            <a:schemeClr val="accent5"/>
+          </a:effectRef>
+          <a:fontRef idx="minor">
+            <a:schemeClr val="dk1"/>
+          </a:fontRef>
+        </p:style>
+        <p:txBody>
+          <a:bodyPr rtlCol="0" anchor="ctr"/>
+          <a:lstStyle/>
+          <a:p>
+            <a:pPr algn="ctr"/>
+            <a:endParaRPr lang="en-IN"/>
+          </a:p>
+        </p:txBody>
+      </p:sp>
+      <p:cxnSp>
+        <p:nvCxnSpPr>
+          <p:cNvPr id="5" name="Straight Connector 4">
+            <a:extLst>
+              <a:ext uri="{FF2B5EF4-FFF2-40B4-BE49-F238E27FC236}">
+                <a16:creationId xmlns:a16="http://schemas.microsoft.com/office/drawing/2014/main" id="{5F3AC277-82DB-4D53-8362-125AB947AFE4}"/>
+              </a:ext>
+            </a:extLst>
+          </p:cNvPr>
+          <p:cNvCxnSpPr/>
+          <p:nvPr/>
+        </p:nvCxnSpPr>
+        <p:spPr>
+          <a:xfrm>
+            <a:off x="3451411" y="869576"/>
+            <a:ext cx="0" cy="5342965"/>
+          </a:xfrm>
+          <a:prstGeom prst="line">
+            <a:avLst/>
+          </a:prstGeom>
+          <a:ln>
+            <a:prstDash val="lgDash"/>
+          </a:ln>
+        </p:spPr>
+        <p:style>
+          <a:lnRef idx="1">
+            <a:schemeClr val="dk1"/>
+          </a:lnRef>
+          <a:fillRef idx="0">
+            <a:schemeClr val="dk1"/>
+          </a:fillRef>
+          <a:effectRef idx="0">
+            <a:schemeClr val="dk1"/>
+          </a:effectRef>
+          <a:fontRef idx="minor">
+            <a:schemeClr val="tx1"/>
+          </a:fontRef>
+        </p:style>
+      </p:cxnSp>
+      <p:cxnSp>
+        <p:nvCxnSpPr>
+          <p:cNvPr id="6" name="Straight Connector 5">
+            <a:extLst>
+              <a:ext uri="{FF2B5EF4-FFF2-40B4-BE49-F238E27FC236}">
+                <a16:creationId xmlns:a16="http://schemas.microsoft.com/office/drawing/2014/main" id="{6ADB8536-B9B7-43E9-A2A5-E01283FD228B}"/>
+              </a:ext>
+            </a:extLst>
+          </p:cNvPr>
+          <p:cNvCxnSpPr/>
+          <p:nvPr/>
+        </p:nvCxnSpPr>
+        <p:spPr>
+          <a:xfrm>
+            <a:off x="1541931" y="3500717"/>
+            <a:ext cx="3756211" cy="0"/>
+          </a:xfrm>
+          <a:prstGeom prst="line">
+            <a:avLst/>
+          </a:prstGeom>
+          <a:ln>
+            <a:prstDash val="lgDash"/>
+          </a:ln>
+        </p:spPr>
+        <p:style>
+          <a:lnRef idx="1">
+            <a:schemeClr val="dk1"/>
+          </a:lnRef>
+          <a:fillRef idx="0">
+            <a:schemeClr val="dk1"/>
+          </a:fillRef>
+          <a:effectRef idx="0">
+            <a:schemeClr val="dk1"/>
+          </a:effectRef>
+          <a:fontRef idx="minor">
+            <a:schemeClr val="tx1"/>
+          </a:fontRef>
+        </p:style>
+      </p:cxnSp>
+      <p:sp>
+        <p:nvSpPr>
+          <p:cNvPr id="7" name="Rectangle 6">
+            <a:extLst>
+              <a:ext uri="{FF2B5EF4-FFF2-40B4-BE49-F238E27FC236}">
+                <a16:creationId xmlns:a16="http://schemas.microsoft.com/office/drawing/2014/main" id="{15F70E6D-BD25-4B57-836F-AA211E14CC1D}"/>
+              </a:ext>
+            </a:extLst>
+          </p:cNvPr>
+          <p:cNvSpPr/>
+          <p:nvPr/>
+        </p:nvSpPr>
+        <p:spPr>
+          <a:xfrm>
+            <a:off x="2008094" y="2196353"/>
+            <a:ext cx="2886635" cy="259975"/>
+          </a:xfrm>
+          <a:prstGeom prst="rect">
+            <a:avLst/>
+          </a:prstGeom>
+        </p:spPr>
+        <p:style>
+          <a:lnRef idx="2">
+            <a:schemeClr val="accent1">
+              <a:shade val="50000"/>
+            </a:schemeClr>
+          </a:lnRef>
+          <a:fillRef idx="1">
+            <a:schemeClr val="accent1"/>
+          </a:fillRef>
+          <a:effectRef idx="0">
+            <a:schemeClr val="accent1"/>
+          </a:effectRef>
+          <a:fontRef idx="minor">
+            <a:schemeClr val="lt1"/>
+          </a:fontRef>
+        </p:style>
+        <p:txBody>
+          <a:bodyPr rtlCol="0" anchor="ctr"/>
+          <a:lstStyle/>
+          <a:p>
+            <a:pPr algn="ctr"/>
+            <a:endParaRPr lang="en-IN"/>
+          </a:p>
+        </p:txBody>
+      </p:sp>
+      <p:cxnSp>
+        <p:nvCxnSpPr>
+          <p:cNvPr id="9" name="Straight Arrow Connector 8">
+            <a:extLst>
+              <a:ext uri="{FF2B5EF4-FFF2-40B4-BE49-F238E27FC236}">
+                <a16:creationId xmlns:a16="http://schemas.microsoft.com/office/drawing/2014/main" id="{EF158862-E5BC-48D8-B3C5-FD9575B73228}"/>
+              </a:ext>
+            </a:extLst>
+          </p:cNvPr>
+          <p:cNvCxnSpPr>
+            <a:cxnSpLocks/>
+          </p:cNvCxnSpPr>
+          <p:nvPr/>
+        </p:nvCxnSpPr>
+        <p:spPr>
+          <a:xfrm>
+            <a:off x="1424718" y="1577788"/>
+            <a:ext cx="0" cy="3873966"/>
+          </a:xfrm>
+          <a:prstGeom prst="straightConnector1">
+            <a:avLst/>
+          </a:prstGeom>
+          <a:ln w="57150">
+            <a:headEnd type="triangle"/>
+            <a:tailEnd type="triangle"/>
+          </a:ln>
+        </p:spPr>
+        <p:style>
+          <a:lnRef idx="1">
+            <a:schemeClr val="dk1"/>
+          </a:lnRef>
+          <a:fillRef idx="0">
+            <a:schemeClr val="dk1"/>
+          </a:fillRef>
+          <a:effectRef idx="0">
+            <a:schemeClr val="dk1"/>
+          </a:effectRef>
+          <a:fontRef idx="minor">
+            <a:schemeClr val="tx1"/>
+          </a:fontRef>
+        </p:style>
+      </p:cxnSp>
+      <p:sp>
+        <p:nvSpPr>
+          <p:cNvPr id="10" name="TextBox 9">
+            <a:extLst>
+              <a:ext uri="{FF2B5EF4-FFF2-40B4-BE49-F238E27FC236}">
+                <a16:creationId xmlns:a16="http://schemas.microsoft.com/office/drawing/2014/main" id="{6FF23D0A-63E6-424F-A2A9-D43DB9DF6BB3}"/>
+              </a:ext>
+            </a:extLst>
+          </p:cNvPr>
+          <p:cNvSpPr txBox="1"/>
+          <p:nvPr/>
+        </p:nvSpPr>
+        <p:spPr>
+          <a:xfrm>
+            <a:off x="4988374" y="3197135"/>
+            <a:ext cx="941538" cy="523220"/>
+          </a:xfrm>
+          <a:prstGeom prst="rect">
+            <a:avLst/>
+          </a:prstGeom>
+          <a:noFill/>
+        </p:spPr>
+        <p:txBody>
+          <a:bodyPr wrap="square" rtlCol="0">
+            <a:spAutoFit/>
+          </a:bodyPr>
+          <a:lstStyle/>
+          <a:p>
+            <a:pPr algn="ctr"/>
+            <a:r>
+              <a:rPr lang="en-US" sz="2800" b="1"/>
+              <a:t>x</a:t>
+            </a:r>
+            <a:endParaRPr lang="en-IN" sz="2800" b="1"/>
+          </a:p>
+        </p:txBody>
+      </p:sp>
+      <p:sp>
+        <p:nvSpPr>
+          <p:cNvPr id="11" name="TextBox 10">
+            <a:extLst>
+              <a:ext uri="{FF2B5EF4-FFF2-40B4-BE49-F238E27FC236}">
+                <a16:creationId xmlns:a16="http://schemas.microsoft.com/office/drawing/2014/main" id="{919457B6-F911-453E-A73B-19DDEF403574}"/>
+              </a:ext>
+            </a:extLst>
+          </p:cNvPr>
+          <p:cNvSpPr txBox="1"/>
+          <p:nvPr/>
+        </p:nvSpPr>
+        <p:spPr>
+          <a:xfrm>
+            <a:off x="2980642" y="354714"/>
+            <a:ext cx="941538" cy="523220"/>
+          </a:xfrm>
+          <a:prstGeom prst="rect">
+            <a:avLst/>
+          </a:prstGeom>
+          <a:noFill/>
+        </p:spPr>
+        <p:txBody>
+          <a:bodyPr wrap="square" rtlCol="0">
+            <a:spAutoFit/>
+          </a:bodyPr>
+          <a:lstStyle/>
+          <a:p>
+            <a:pPr algn="ctr"/>
+            <a:r>
+              <a:rPr lang="en-US" sz="2800" b="1"/>
+              <a:t>y</a:t>
+            </a:r>
+            <a:endParaRPr lang="en-IN" sz="2800" b="1"/>
+          </a:p>
+        </p:txBody>
+      </p:sp>
+      <p:sp>
+        <p:nvSpPr>
+          <p:cNvPr id="12" name="TextBox 11">
+            <a:extLst>
+              <a:ext uri="{FF2B5EF4-FFF2-40B4-BE49-F238E27FC236}">
+                <a16:creationId xmlns:a16="http://schemas.microsoft.com/office/drawing/2014/main" id="{6E355D35-41DF-4AF0-9463-75542E925260}"/>
+              </a:ext>
+            </a:extLst>
+          </p:cNvPr>
+          <p:cNvSpPr txBox="1"/>
+          <p:nvPr/>
+        </p:nvSpPr>
+        <p:spPr>
+          <a:xfrm>
+            <a:off x="688950" y="3239107"/>
+            <a:ext cx="941538" cy="523220"/>
+          </a:xfrm>
+          <a:prstGeom prst="rect">
+            <a:avLst/>
+          </a:prstGeom>
+          <a:noFill/>
+        </p:spPr>
+        <p:txBody>
+          <a:bodyPr wrap="square" rtlCol="0">
+            <a:spAutoFit/>
+          </a:bodyPr>
+          <a:lstStyle/>
+          <a:p>
+            <a:pPr algn="ctr"/>
+            <a:r>
+              <a:rPr lang="en-US" sz="2800" b="1"/>
+              <a:t>d</a:t>
+            </a:r>
+            <a:endParaRPr lang="en-IN" sz="2800" b="1"/>
+          </a:p>
+        </p:txBody>
+      </p:sp>
+      <p:cxnSp>
+        <p:nvCxnSpPr>
+          <p:cNvPr id="16" name="Straight Arrow Connector 15">
+            <a:extLst>
+              <a:ext uri="{FF2B5EF4-FFF2-40B4-BE49-F238E27FC236}">
+                <a16:creationId xmlns:a16="http://schemas.microsoft.com/office/drawing/2014/main" id="{6BBB4284-1EC1-4A4F-AABC-CA8BCB1E0035}"/>
+              </a:ext>
+            </a:extLst>
+          </p:cNvPr>
+          <p:cNvCxnSpPr>
+            <a:cxnSpLocks/>
+          </p:cNvCxnSpPr>
+          <p:nvPr/>
+        </p:nvCxnSpPr>
+        <p:spPr>
+          <a:xfrm>
+            <a:off x="1998960" y="5977825"/>
+            <a:ext cx="2895769" cy="0"/>
+          </a:xfrm>
+          <a:prstGeom prst="straightConnector1">
+            <a:avLst/>
+          </a:prstGeom>
+          <a:ln w="57150">
+            <a:headEnd type="triangle"/>
+            <a:tailEnd type="triangle"/>
+          </a:ln>
+        </p:spPr>
+        <p:style>
+          <a:lnRef idx="1">
+            <a:schemeClr val="dk1"/>
+          </a:lnRef>
+          <a:fillRef idx="0">
+            <a:schemeClr val="dk1"/>
+          </a:fillRef>
+          <a:effectRef idx="0">
+            <a:schemeClr val="dk1"/>
+          </a:effectRef>
+          <a:fontRef idx="minor">
+            <a:schemeClr val="tx1"/>
+          </a:fontRef>
+        </p:style>
+      </p:cxnSp>
+      <p:sp>
+        <p:nvSpPr>
+          <p:cNvPr id="18" name="TextBox 17">
+            <a:extLst>
+              <a:ext uri="{FF2B5EF4-FFF2-40B4-BE49-F238E27FC236}">
+                <a16:creationId xmlns:a16="http://schemas.microsoft.com/office/drawing/2014/main" id="{B77BEBF7-BAE7-4C96-A94E-BCD256216B7D}"/>
+              </a:ext>
+            </a:extLst>
+          </p:cNvPr>
+          <p:cNvSpPr txBox="1"/>
+          <p:nvPr/>
+        </p:nvSpPr>
+        <p:spPr>
+          <a:xfrm>
+            <a:off x="4827373" y="2055654"/>
+            <a:ext cx="941538" cy="523220"/>
+          </a:xfrm>
+          <a:prstGeom prst="rect">
+            <a:avLst/>
+          </a:prstGeom>
+          <a:noFill/>
+        </p:spPr>
+        <p:txBody>
+          <a:bodyPr wrap="square" rtlCol="0">
+            <a:spAutoFit/>
+          </a:bodyPr>
+          <a:lstStyle/>
+          <a:p>
+            <a:pPr algn="ctr"/>
+            <a:r>
+              <a:rPr lang="en-US" sz="2800" b="1"/>
+              <a:t>dy</a:t>
+            </a:r>
+            <a:endParaRPr lang="en-IN" sz="2800" b="1"/>
+          </a:p>
+        </p:txBody>
+      </p:sp>
+      <p:cxnSp>
+        <p:nvCxnSpPr>
+          <p:cNvPr id="19" name="Straight Arrow Connector 18">
+            <a:extLst>
+              <a:ext uri="{FF2B5EF4-FFF2-40B4-BE49-F238E27FC236}">
+                <a16:creationId xmlns:a16="http://schemas.microsoft.com/office/drawing/2014/main" id="{7F73C784-3586-4D70-B188-C1BD40FCD52B}"/>
+              </a:ext>
+            </a:extLst>
+          </p:cNvPr>
+          <p:cNvCxnSpPr>
+            <a:cxnSpLocks/>
+          </p:cNvCxnSpPr>
+          <p:nvPr/>
+        </p:nvCxnSpPr>
+        <p:spPr>
+          <a:xfrm>
+            <a:off x="4206625" y="2494429"/>
+            <a:ext cx="0" cy="2957325"/>
+          </a:xfrm>
+          <a:prstGeom prst="straightConnector1">
+            <a:avLst/>
+          </a:prstGeom>
+          <a:ln w="57150">
+            <a:headEnd type="triangle"/>
+            <a:tailEnd type="triangle"/>
+          </a:ln>
+        </p:spPr>
+        <p:style>
+          <a:lnRef idx="1">
+            <a:schemeClr val="dk1"/>
+          </a:lnRef>
+          <a:fillRef idx="0">
+            <a:schemeClr val="dk1"/>
+          </a:fillRef>
+          <a:effectRef idx="0">
+            <a:schemeClr val="dk1"/>
+          </a:effectRef>
+          <a:fontRef idx="minor">
+            <a:schemeClr val="tx1"/>
+          </a:fontRef>
+        </p:style>
+      </p:cxnSp>
+      <p:sp>
+        <p:nvSpPr>
+          <p:cNvPr id="20" name="TextBox 19">
+            <a:extLst>
+              <a:ext uri="{FF2B5EF4-FFF2-40B4-BE49-F238E27FC236}">
+                <a16:creationId xmlns:a16="http://schemas.microsoft.com/office/drawing/2014/main" id="{F2F615A4-6B2F-4389-84B3-C299A48F33EE}"/>
+              </a:ext>
+            </a:extLst>
+          </p:cNvPr>
+          <p:cNvSpPr txBox="1"/>
+          <p:nvPr/>
+        </p:nvSpPr>
+        <p:spPr>
+          <a:xfrm>
+            <a:off x="3891282" y="3895465"/>
+            <a:ext cx="941538" cy="523220"/>
+          </a:xfrm>
+          <a:prstGeom prst="rect">
+            <a:avLst/>
+          </a:prstGeom>
+          <a:noFill/>
+        </p:spPr>
+        <p:txBody>
+          <a:bodyPr wrap="square" rtlCol="0">
+            <a:spAutoFit/>
+          </a:bodyPr>
+          <a:lstStyle/>
+          <a:p>
+            <a:pPr algn="ctr"/>
+            <a:r>
+              <a:rPr lang="en-US" sz="2800" b="1"/>
+              <a:t>y</a:t>
+            </a:r>
+            <a:endParaRPr lang="en-IN" sz="2800" b="1"/>
+          </a:p>
+        </p:txBody>
+      </p:sp>
+      <p:sp>
+        <p:nvSpPr>
+          <p:cNvPr id="21" name="Oval 20">
+            <a:extLst>
+              <a:ext uri="{FF2B5EF4-FFF2-40B4-BE49-F238E27FC236}">
+                <a16:creationId xmlns:a16="http://schemas.microsoft.com/office/drawing/2014/main" id="{E4B43A4E-37B7-46DF-B82C-EF6058587F2B}"/>
+              </a:ext>
+            </a:extLst>
+          </p:cNvPr>
+          <p:cNvSpPr/>
+          <p:nvPr/>
+        </p:nvSpPr>
+        <p:spPr>
+          <a:xfrm>
+            <a:off x="3371122" y="3402105"/>
+            <a:ext cx="160577" cy="156440"/>
+          </a:xfrm>
+          <a:prstGeom prst="ellipse">
+            <a:avLst/>
+          </a:prstGeom>
+        </p:spPr>
+        <p:style>
+          <a:lnRef idx="2">
+            <a:schemeClr val="dk1">
+              <a:shade val="50000"/>
+            </a:schemeClr>
+          </a:lnRef>
+          <a:fillRef idx="1">
+            <a:schemeClr val="dk1"/>
+          </a:fillRef>
+          <a:effectRef idx="0">
+            <a:schemeClr val="dk1"/>
+          </a:effectRef>
+          <a:fontRef idx="minor">
+            <a:schemeClr val="lt1"/>
+          </a:fontRef>
+        </p:style>
+        <p:txBody>
+          <a:bodyPr rtlCol="0" anchor="ctr"/>
+          <a:lstStyle/>
+          <a:p>
+            <a:pPr algn="ctr"/>
+            <a:endParaRPr lang="en-IN"/>
+          </a:p>
+        </p:txBody>
+      </p:sp>
+      <p:sp>
+        <p:nvSpPr>
+          <p:cNvPr id="22" name="TextBox 21">
+            <a:extLst>
+              <a:ext uri="{FF2B5EF4-FFF2-40B4-BE49-F238E27FC236}">
+                <a16:creationId xmlns:a16="http://schemas.microsoft.com/office/drawing/2014/main" id="{30C6158B-9478-46DB-815B-DB340CBAD365}"/>
+              </a:ext>
+            </a:extLst>
+          </p:cNvPr>
+          <p:cNvSpPr txBox="1"/>
+          <p:nvPr/>
+        </p:nvSpPr>
+        <p:spPr>
+          <a:xfrm>
+            <a:off x="3458434" y="3383732"/>
+            <a:ext cx="357256" cy="523220"/>
+          </a:xfrm>
+          <a:prstGeom prst="rect">
+            <a:avLst/>
+          </a:prstGeom>
+          <a:noFill/>
+        </p:spPr>
+        <p:txBody>
+          <a:bodyPr wrap="square" rtlCol="0">
+            <a:spAutoFit/>
+          </a:bodyPr>
+          <a:lstStyle/>
+          <a:p>
+            <a:pPr algn="ctr"/>
+            <a:r>
+              <a:rPr lang="en-US" sz="2800" b="1"/>
+              <a:t>c</a:t>
+            </a:r>
+            <a:endParaRPr lang="en-IN" sz="2800" b="1"/>
+          </a:p>
+        </p:txBody>
+      </p:sp>
+      <p:cxnSp>
+        <p:nvCxnSpPr>
+          <p:cNvPr id="23" name="Straight Connector 22">
+            <a:extLst>
+              <a:ext uri="{FF2B5EF4-FFF2-40B4-BE49-F238E27FC236}">
+                <a16:creationId xmlns:a16="http://schemas.microsoft.com/office/drawing/2014/main" id="{CB80F7BE-F72F-41F3-BF6E-2183637D3F1B}"/>
+              </a:ext>
+            </a:extLst>
+          </p:cNvPr>
+          <p:cNvCxnSpPr>
+            <a:cxnSpLocks/>
+          </p:cNvCxnSpPr>
+          <p:nvPr/>
+        </p:nvCxnSpPr>
+        <p:spPr>
+          <a:xfrm>
+            <a:off x="1990163" y="887506"/>
+            <a:ext cx="0" cy="4554071"/>
+          </a:xfrm>
+          <a:prstGeom prst="line">
+            <a:avLst/>
+          </a:prstGeom>
+          <a:ln w="38100">
+            <a:prstDash val="dash"/>
+          </a:ln>
+        </p:spPr>
+        <p:style>
+          <a:lnRef idx="1">
+            <a:schemeClr val="accent2"/>
+          </a:lnRef>
+          <a:fillRef idx="0">
+            <a:schemeClr val="accent2"/>
+          </a:fillRef>
+          <a:effectRef idx="0">
+            <a:schemeClr val="accent2"/>
+          </a:effectRef>
+          <a:fontRef idx="minor">
+            <a:schemeClr val="tx1"/>
+          </a:fontRef>
+        </p:style>
+      </p:cxnSp>
+      <p:cxnSp>
+        <p:nvCxnSpPr>
+          <p:cNvPr id="26" name="Straight Connector 25">
+            <a:extLst>
+              <a:ext uri="{FF2B5EF4-FFF2-40B4-BE49-F238E27FC236}">
+                <a16:creationId xmlns:a16="http://schemas.microsoft.com/office/drawing/2014/main" id="{9FCC5577-B4B8-40F9-B108-43460A9AE19B}"/>
+              </a:ext>
+            </a:extLst>
+          </p:cNvPr>
+          <p:cNvCxnSpPr>
+            <a:cxnSpLocks/>
+          </p:cNvCxnSpPr>
+          <p:nvPr/>
+        </p:nvCxnSpPr>
+        <p:spPr>
+          <a:xfrm flipH="1">
+            <a:off x="1952305" y="5429733"/>
+            <a:ext cx="3939749" cy="22021"/>
+          </a:xfrm>
+          <a:prstGeom prst="line">
+            <a:avLst/>
+          </a:prstGeom>
+          <a:ln w="38100">
+            <a:prstDash val="dash"/>
+          </a:ln>
+        </p:spPr>
+        <p:style>
+          <a:lnRef idx="1">
+            <a:schemeClr val="accent2"/>
+          </a:lnRef>
+          <a:fillRef idx="0">
+            <a:schemeClr val="accent2"/>
+          </a:fillRef>
+          <a:effectRef idx="0">
+            <a:schemeClr val="accent2"/>
+          </a:effectRef>
+          <a:fontRef idx="minor">
+            <a:schemeClr val="tx1"/>
+          </a:fontRef>
+        </p:style>
+      </p:cxnSp>
+      <p:sp>
+        <p:nvSpPr>
+          <p:cNvPr id="31" name="TextBox 30">
+            <a:extLst>
+              <a:ext uri="{FF2B5EF4-FFF2-40B4-BE49-F238E27FC236}">
+                <a16:creationId xmlns:a16="http://schemas.microsoft.com/office/drawing/2014/main" id="{FCE30B76-9CF8-433E-B54B-116327C664CA}"/>
+              </a:ext>
+            </a:extLst>
+          </p:cNvPr>
+          <p:cNvSpPr txBox="1"/>
+          <p:nvPr/>
+        </p:nvSpPr>
+        <p:spPr>
+          <a:xfrm>
+            <a:off x="3417609" y="533399"/>
+            <a:ext cx="357256" cy="523220"/>
+          </a:xfrm>
+          <a:prstGeom prst="rect">
+            <a:avLst/>
+          </a:prstGeom>
+          <a:noFill/>
+        </p:spPr>
+        <p:txBody>
+          <a:bodyPr wrap="square" rtlCol="0">
+            <a:spAutoFit/>
+          </a:bodyPr>
+          <a:lstStyle/>
+          <a:p>
+            <a:pPr algn="ctr"/>
+            <a:r>
+              <a:rPr lang="en-US" sz="2800" b="1"/>
+              <a:t>c</a:t>
+            </a:r>
+            <a:endParaRPr lang="en-IN" sz="2800" b="1"/>
+          </a:p>
+        </p:txBody>
+      </p:sp>
+      <p:sp>
+        <p:nvSpPr>
+          <p:cNvPr id="32" name="TextBox 31">
+            <a:extLst>
+              <a:ext uri="{FF2B5EF4-FFF2-40B4-BE49-F238E27FC236}">
+                <a16:creationId xmlns:a16="http://schemas.microsoft.com/office/drawing/2014/main" id="{26C73E32-D89A-48F4-AE19-700713F1E498}"/>
+              </a:ext>
+            </a:extLst>
+          </p:cNvPr>
+          <p:cNvSpPr txBox="1"/>
+          <p:nvPr/>
+        </p:nvSpPr>
+        <p:spPr>
+          <a:xfrm>
+            <a:off x="5425274" y="3359937"/>
+            <a:ext cx="357256" cy="523220"/>
+          </a:xfrm>
+          <a:prstGeom prst="rect">
+            <a:avLst/>
+          </a:prstGeom>
+          <a:noFill/>
+        </p:spPr>
+        <p:txBody>
+          <a:bodyPr wrap="square" rtlCol="0">
+            <a:spAutoFit/>
+          </a:bodyPr>
+          <a:lstStyle/>
+          <a:p>
+            <a:pPr algn="ctr"/>
+            <a:r>
+              <a:rPr lang="en-US" sz="2800" b="1"/>
+              <a:t>c</a:t>
+            </a:r>
+            <a:endParaRPr lang="en-IN" sz="2800" b="1"/>
+          </a:p>
+        </p:txBody>
+      </p:sp>
+      <p:sp>
+        <p:nvSpPr>
+          <p:cNvPr id="33" name="TextBox 32">
+            <a:extLst>
+              <a:ext uri="{FF2B5EF4-FFF2-40B4-BE49-F238E27FC236}">
+                <a16:creationId xmlns:a16="http://schemas.microsoft.com/office/drawing/2014/main" id="{052E9726-0624-46EA-8A66-B93B720FBA0C}"/>
+              </a:ext>
+            </a:extLst>
+          </p:cNvPr>
+          <p:cNvSpPr txBox="1"/>
+          <p:nvPr/>
+        </p:nvSpPr>
+        <p:spPr>
+          <a:xfrm>
+            <a:off x="1528191" y="364286"/>
+            <a:ext cx="941538" cy="523220"/>
+          </a:xfrm>
+          <a:prstGeom prst="rect">
+            <a:avLst/>
+          </a:prstGeom>
+          <a:noFill/>
+        </p:spPr>
+        <p:txBody>
+          <a:bodyPr wrap="square" rtlCol="0">
+            <a:spAutoFit/>
+          </a:bodyPr>
+          <a:lstStyle/>
+          <a:p>
+            <a:pPr algn="ctr"/>
+            <a:r>
+              <a:rPr lang="en-US" sz="2800" b="1"/>
+              <a:t>y</a:t>
+            </a:r>
+            <a:endParaRPr lang="en-IN" sz="2800" b="1"/>
+          </a:p>
+        </p:txBody>
+      </p:sp>
+      <p:sp>
+        <p:nvSpPr>
+          <p:cNvPr id="34" name="TextBox 33">
+            <a:extLst>
+              <a:ext uri="{FF2B5EF4-FFF2-40B4-BE49-F238E27FC236}">
+                <a16:creationId xmlns:a16="http://schemas.microsoft.com/office/drawing/2014/main" id="{C6FE9FDE-49FF-46D7-952C-AA5F22CF5911}"/>
+              </a:ext>
+            </a:extLst>
+          </p:cNvPr>
+          <p:cNvSpPr txBox="1"/>
+          <p:nvPr/>
+        </p:nvSpPr>
+        <p:spPr>
+          <a:xfrm>
+            <a:off x="5590590" y="5137878"/>
+            <a:ext cx="941538" cy="523220"/>
+          </a:xfrm>
+          <a:prstGeom prst="rect">
+            <a:avLst/>
+          </a:prstGeom>
+          <a:noFill/>
+        </p:spPr>
+        <p:txBody>
+          <a:bodyPr wrap="square" rtlCol="0">
+            <a:spAutoFit/>
+          </a:bodyPr>
+          <a:lstStyle/>
+          <a:p>
+            <a:pPr algn="ctr"/>
+            <a:r>
+              <a:rPr lang="en-US" sz="2800" b="1"/>
+              <a:t>x</a:t>
+            </a:r>
+            <a:endParaRPr lang="en-IN" sz="2800" b="1"/>
+          </a:p>
+        </p:txBody>
+      </p:sp>
+      <p:sp>
+        <p:nvSpPr>
+          <p:cNvPr id="35" name="TextBox 34">
+            <a:extLst>
+              <a:ext uri="{FF2B5EF4-FFF2-40B4-BE49-F238E27FC236}">
+                <a16:creationId xmlns:a16="http://schemas.microsoft.com/office/drawing/2014/main" id="{392573FC-D98A-487B-900F-C859DBB64EDE}"/>
+              </a:ext>
+            </a:extLst>
+          </p:cNvPr>
+          <p:cNvSpPr txBox="1"/>
+          <p:nvPr/>
+        </p:nvSpPr>
+        <p:spPr>
+          <a:xfrm>
+            <a:off x="1675730" y="5320666"/>
+            <a:ext cx="357256" cy="523220"/>
+          </a:xfrm>
+          <a:prstGeom prst="rect">
+            <a:avLst/>
+          </a:prstGeom>
+          <a:noFill/>
+        </p:spPr>
+        <p:txBody>
+          <a:bodyPr wrap="square" rtlCol="0">
+            <a:spAutoFit/>
+          </a:bodyPr>
+          <a:lstStyle/>
+          <a:p>
+            <a:pPr algn="ctr"/>
+            <a:r>
+              <a:rPr lang="en-US" sz="2800" b="1"/>
+              <a:t>0</a:t>
+            </a:r>
+            <a:endParaRPr lang="en-IN" sz="2800" b="1"/>
+          </a:p>
+        </p:txBody>
+      </p:sp>
+      <p:sp>
+        <p:nvSpPr>
+          <p:cNvPr id="37" name="TextBox 36">
+            <a:extLst>
+              <a:ext uri="{FF2B5EF4-FFF2-40B4-BE49-F238E27FC236}">
+                <a16:creationId xmlns:a16="http://schemas.microsoft.com/office/drawing/2014/main" id="{6560C99E-29AD-4FE7-8DC4-CB541685B58E}"/>
+              </a:ext>
+            </a:extLst>
+          </p:cNvPr>
+          <p:cNvSpPr txBox="1"/>
+          <p:nvPr/>
+        </p:nvSpPr>
+        <p:spPr>
+          <a:xfrm>
+            <a:off x="2980642" y="6002023"/>
+            <a:ext cx="941538" cy="523220"/>
+          </a:xfrm>
+          <a:prstGeom prst="rect">
+            <a:avLst/>
+          </a:prstGeom>
+          <a:noFill/>
+        </p:spPr>
+        <p:txBody>
+          <a:bodyPr wrap="square" rtlCol="0">
+            <a:spAutoFit/>
+          </a:bodyPr>
+          <a:lstStyle/>
+          <a:p>
+            <a:pPr algn="ctr"/>
+            <a:r>
+              <a:rPr lang="en-US" sz="2800" b="1"/>
+              <a:t>b</a:t>
+            </a:r>
+            <a:endParaRPr lang="en-IN" sz="2800" b="1"/>
+          </a:p>
+        </p:txBody>
+      </p:sp>
+      <p:sp>
+        <p:nvSpPr>
+          <p:cNvPr id="40" name="Rectangle 39">
+            <a:extLst>
+              <a:ext uri="{FF2B5EF4-FFF2-40B4-BE49-F238E27FC236}">
+                <a16:creationId xmlns:a16="http://schemas.microsoft.com/office/drawing/2014/main" id="{0965F33F-96CF-4DAB-A294-97F754A9BD2F}"/>
+              </a:ext>
+            </a:extLst>
+          </p:cNvPr>
+          <p:cNvSpPr/>
+          <p:nvPr/>
+        </p:nvSpPr>
+        <p:spPr>
+          <a:xfrm>
+            <a:off x="7635986" y="1553630"/>
+            <a:ext cx="2886635" cy="3845859"/>
+          </a:xfrm>
+          <a:prstGeom prst="rect">
+            <a:avLst/>
+          </a:prstGeom>
+          <a:ln>
+            <a:solidFill>
+              <a:schemeClr val="tx1"/>
+            </a:solidFill>
+          </a:ln>
+        </p:spPr>
+        <p:style>
+          <a:lnRef idx="1">
+            <a:schemeClr val="accent5"/>
+          </a:lnRef>
+          <a:fillRef idx="2">
+            <a:schemeClr val="accent5"/>
+          </a:fillRef>
+          <a:effectRef idx="1">
+            <a:schemeClr val="accent5"/>
+          </a:effectRef>
+          <a:fontRef idx="minor">
+            <a:schemeClr val="dk1"/>
+          </a:fontRef>
+        </p:style>
+        <p:txBody>
+          <a:bodyPr rtlCol="0" anchor="ctr"/>
+          <a:lstStyle/>
+          <a:p>
+            <a:pPr algn="ctr"/>
+            <a:endParaRPr lang="en-IN"/>
+          </a:p>
+        </p:txBody>
+      </p:sp>
+      <p:cxnSp>
+        <p:nvCxnSpPr>
+          <p:cNvPr id="41" name="Straight Connector 40">
+            <a:extLst>
+              <a:ext uri="{FF2B5EF4-FFF2-40B4-BE49-F238E27FC236}">
+                <a16:creationId xmlns:a16="http://schemas.microsoft.com/office/drawing/2014/main" id="{F7B078BF-AD1A-4997-85E7-E2043F91471F}"/>
+              </a:ext>
+            </a:extLst>
+          </p:cNvPr>
+          <p:cNvCxnSpPr/>
+          <p:nvPr/>
+        </p:nvCxnSpPr>
+        <p:spPr>
+          <a:xfrm>
+            <a:off x="9079303" y="845418"/>
+            <a:ext cx="0" cy="5342965"/>
+          </a:xfrm>
+          <a:prstGeom prst="line">
+            <a:avLst/>
+          </a:prstGeom>
+          <a:ln>
+            <a:prstDash val="lgDash"/>
+          </a:ln>
+        </p:spPr>
+        <p:style>
+          <a:lnRef idx="1">
+            <a:schemeClr val="dk1"/>
+          </a:lnRef>
+          <a:fillRef idx="0">
+            <a:schemeClr val="dk1"/>
+          </a:fillRef>
+          <a:effectRef idx="0">
+            <a:schemeClr val="dk1"/>
+          </a:effectRef>
+          <a:fontRef idx="minor">
+            <a:schemeClr val="tx1"/>
+          </a:fontRef>
+        </p:style>
+      </p:cxnSp>
+      <p:cxnSp>
+        <p:nvCxnSpPr>
+          <p:cNvPr id="42" name="Straight Connector 41">
+            <a:extLst>
+              <a:ext uri="{FF2B5EF4-FFF2-40B4-BE49-F238E27FC236}">
+                <a16:creationId xmlns:a16="http://schemas.microsoft.com/office/drawing/2014/main" id="{ED3B2EBA-CBEE-442F-B6DE-B71F93F5ED8A}"/>
+              </a:ext>
+            </a:extLst>
+          </p:cNvPr>
+          <p:cNvCxnSpPr/>
+          <p:nvPr/>
+        </p:nvCxnSpPr>
+        <p:spPr>
+          <a:xfrm>
+            <a:off x="7169823" y="3476559"/>
+            <a:ext cx="3756211" cy="0"/>
+          </a:xfrm>
+          <a:prstGeom prst="line">
+            <a:avLst/>
+          </a:prstGeom>
+          <a:ln>
+            <a:prstDash val="lgDash"/>
+          </a:ln>
+        </p:spPr>
+        <p:style>
+          <a:lnRef idx="1">
+            <a:schemeClr val="dk1"/>
+          </a:lnRef>
+          <a:fillRef idx="0">
+            <a:schemeClr val="dk1"/>
+          </a:fillRef>
+          <a:effectRef idx="0">
+            <a:schemeClr val="dk1"/>
+          </a:effectRef>
+          <a:fontRef idx="minor">
+            <a:schemeClr val="tx1"/>
+          </a:fontRef>
+        </p:style>
+      </p:cxnSp>
+      <p:cxnSp>
+        <p:nvCxnSpPr>
+          <p:cNvPr id="44" name="Straight Arrow Connector 43">
+            <a:extLst>
+              <a:ext uri="{FF2B5EF4-FFF2-40B4-BE49-F238E27FC236}">
+                <a16:creationId xmlns:a16="http://schemas.microsoft.com/office/drawing/2014/main" id="{B8C6BD05-0AA4-452A-9A8F-18AC7E599E37}"/>
+              </a:ext>
+            </a:extLst>
+          </p:cNvPr>
+          <p:cNvCxnSpPr>
+            <a:cxnSpLocks/>
+          </p:cNvCxnSpPr>
+          <p:nvPr/>
+        </p:nvCxnSpPr>
+        <p:spPr>
+          <a:xfrm>
+            <a:off x="7052610" y="1553630"/>
+            <a:ext cx="0" cy="3873966"/>
+          </a:xfrm>
+          <a:prstGeom prst="straightConnector1">
+            <a:avLst/>
+          </a:prstGeom>
+          <a:ln w="57150">
+            <a:headEnd type="triangle"/>
+            <a:tailEnd type="triangle"/>
+          </a:ln>
+        </p:spPr>
+        <p:style>
+          <a:lnRef idx="1">
+            <a:schemeClr val="dk1"/>
+          </a:lnRef>
+          <a:fillRef idx="0">
+            <a:schemeClr val="dk1"/>
+          </a:fillRef>
+          <a:effectRef idx="0">
+            <a:schemeClr val="dk1"/>
+          </a:effectRef>
+          <a:fontRef idx="minor">
+            <a:schemeClr val="tx1"/>
+          </a:fontRef>
+        </p:style>
+      </p:cxnSp>
+      <p:sp>
+        <p:nvSpPr>
+          <p:cNvPr id="45" name="TextBox 44">
+            <a:extLst>
+              <a:ext uri="{FF2B5EF4-FFF2-40B4-BE49-F238E27FC236}">
+                <a16:creationId xmlns:a16="http://schemas.microsoft.com/office/drawing/2014/main" id="{D1B77038-E0B6-4A80-8C1D-B6BADF77ECC3}"/>
+              </a:ext>
+            </a:extLst>
+          </p:cNvPr>
+          <p:cNvSpPr txBox="1"/>
+          <p:nvPr/>
+        </p:nvSpPr>
+        <p:spPr>
+          <a:xfrm>
+            <a:off x="10616266" y="3172977"/>
+            <a:ext cx="941538" cy="523220"/>
+          </a:xfrm>
+          <a:prstGeom prst="rect">
+            <a:avLst/>
+          </a:prstGeom>
+          <a:noFill/>
+        </p:spPr>
+        <p:txBody>
+          <a:bodyPr wrap="square" rtlCol="0">
+            <a:spAutoFit/>
+          </a:bodyPr>
+          <a:lstStyle/>
+          <a:p>
+            <a:pPr algn="ctr"/>
+            <a:r>
+              <a:rPr lang="en-US" sz="2800" b="1"/>
+              <a:t>x</a:t>
+            </a:r>
+            <a:endParaRPr lang="en-IN" sz="2800" b="1"/>
+          </a:p>
+        </p:txBody>
+      </p:sp>
+      <p:sp>
+        <p:nvSpPr>
+          <p:cNvPr id="46" name="TextBox 45">
+            <a:extLst>
+              <a:ext uri="{FF2B5EF4-FFF2-40B4-BE49-F238E27FC236}">
+                <a16:creationId xmlns:a16="http://schemas.microsoft.com/office/drawing/2014/main" id="{4CF1F3D7-A5DF-4BDD-B731-61895587BA81}"/>
+              </a:ext>
+            </a:extLst>
+          </p:cNvPr>
+          <p:cNvSpPr txBox="1"/>
+          <p:nvPr/>
+        </p:nvSpPr>
+        <p:spPr>
+          <a:xfrm>
+            <a:off x="8608534" y="330556"/>
+            <a:ext cx="941538" cy="523220"/>
+          </a:xfrm>
+          <a:prstGeom prst="rect">
+            <a:avLst/>
+          </a:prstGeom>
+          <a:noFill/>
+        </p:spPr>
+        <p:txBody>
+          <a:bodyPr wrap="square" rtlCol="0">
+            <a:spAutoFit/>
+          </a:bodyPr>
+          <a:lstStyle/>
+          <a:p>
+            <a:pPr algn="ctr"/>
+            <a:r>
+              <a:rPr lang="en-US" sz="2800" b="1"/>
+              <a:t>y</a:t>
+            </a:r>
+            <a:endParaRPr lang="en-IN" sz="2800" b="1"/>
+          </a:p>
+        </p:txBody>
+      </p:sp>
+      <p:sp>
+        <p:nvSpPr>
+          <p:cNvPr id="47" name="TextBox 46">
+            <a:extLst>
+              <a:ext uri="{FF2B5EF4-FFF2-40B4-BE49-F238E27FC236}">
+                <a16:creationId xmlns:a16="http://schemas.microsoft.com/office/drawing/2014/main" id="{80CABB4D-16BB-4B1F-9E5E-FF18350B62BA}"/>
+              </a:ext>
+            </a:extLst>
+          </p:cNvPr>
+          <p:cNvSpPr txBox="1"/>
+          <p:nvPr/>
+        </p:nvSpPr>
+        <p:spPr>
+          <a:xfrm>
+            <a:off x="6316842" y="3214949"/>
+            <a:ext cx="941538" cy="523220"/>
+          </a:xfrm>
+          <a:prstGeom prst="rect">
+            <a:avLst/>
+          </a:prstGeom>
+          <a:noFill/>
+        </p:spPr>
+        <p:txBody>
+          <a:bodyPr wrap="square" rtlCol="0">
+            <a:spAutoFit/>
+          </a:bodyPr>
+          <a:lstStyle/>
+          <a:p>
+            <a:pPr algn="ctr"/>
+            <a:r>
+              <a:rPr lang="en-US" sz="2800" b="1"/>
+              <a:t>d</a:t>
+            </a:r>
+            <a:endParaRPr lang="en-IN" sz="2800" b="1"/>
+          </a:p>
+        </p:txBody>
+      </p:sp>
+      <p:cxnSp>
+        <p:nvCxnSpPr>
+          <p:cNvPr id="48" name="Straight Arrow Connector 47">
+            <a:extLst>
+              <a:ext uri="{FF2B5EF4-FFF2-40B4-BE49-F238E27FC236}">
+                <a16:creationId xmlns:a16="http://schemas.microsoft.com/office/drawing/2014/main" id="{4174FA00-FD8C-44C9-874B-8D92655F0B76}"/>
+              </a:ext>
+            </a:extLst>
+          </p:cNvPr>
+          <p:cNvCxnSpPr>
+            <a:cxnSpLocks/>
+          </p:cNvCxnSpPr>
+          <p:nvPr/>
+        </p:nvCxnSpPr>
+        <p:spPr>
+          <a:xfrm>
+            <a:off x="7626852" y="5953667"/>
+            <a:ext cx="2895769" cy="0"/>
+          </a:xfrm>
+          <a:prstGeom prst="straightConnector1">
+            <a:avLst/>
+          </a:prstGeom>
+          <a:ln w="57150">
+            <a:headEnd type="triangle"/>
+            <a:tailEnd type="triangle"/>
+          </a:ln>
+        </p:spPr>
+        <p:style>
+          <a:lnRef idx="1">
+            <a:schemeClr val="dk1"/>
+          </a:lnRef>
+          <a:fillRef idx="0">
+            <a:schemeClr val="dk1"/>
+          </a:fillRef>
+          <a:effectRef idx="0">
+            <a:schemeClr val="dk1"/>
+          </a:effectRef>
+          <a:fontRef idx="minor">
+            <a:schemeClr val="tx1"/>
+          </a:fontRef>
+        </p:style>
+      </p:cxnSp>
+      <p:sp>
+        <p:nvSpPr>
+          <p:cNvPr id="52" name="Oval 51">
+            <a:extLst>
+              <a:ext uri="{FF2B5EF4-FFF2-40B4-BE49-F238E27FC236}">
+                <a16:creationId xmlns:a16="http://schemas.microsoft.com/office/drawing/2014/main" id="{1C4FA125-206E-4789-B45A-65A71C5CB10D}"/>
+              </a:ext>
+            </a:extLst>
+          </p:cNvPr>
+          <p:cNvSpPr/>
+          <p:nvPr/>
+        </p:nvSpPr>
+        <p:spPr>
+          <a:xfrm>
+            <a:off x="8999014" y="3377947"/>
+            <a:ext cx="160577" cy="156440"/>
+          </a:xfrm>
+          <a:prstGeom prst="ellipse">
+            <a:avLst/>
+          </a:prstGeom>
+        </p:spPr>
+        <p:style>
+          <a:lnRef idx="2">
+            <a:schemeClr val="dk1">
+              <a:shade val="50000"/>
+            </a:schemeClr>
+          </a:lnRef>
+          <a:fillRef idx="1">
+            <a:schemeClr val="dk1"/>
+          </a:fillRef>
+          <a:effectRef idx="0">
+            <a:schemeClr val="dk1"/>
+          </a:effectRef>
+          <a:fontRef idx="minor">
+            <a:schemeClr val="lt1"/>
+          </a:fontRef>
+        </p:style>
+        <p:txBody>
+          <a:bodyPr rtlCol="0" anchor="ctr"/>
+          <a:lstStyle/>
+          <a:p>
+            <a:pPr algn="ctr"/>
+            <a:endParaRPr lang="en-IN"/>
+          </a:p>
+        </p:txBody>
+      </p:sp>
+      <p:sp>
+        <p:nvSpPr>
+          <p:cNvPr id="53" name="TextBox 52">
+            <a:extLst>
+              <a:ext uri="{FF2B5EF4-FFF2-40B4-BE49-F238E27FC236}">
+                <a16:creationId xmlns:a16="http://schemas.microsoft.com/office/drawing/2014/main" id="{CCD52A25-E0C7-4086-8C84-AE864B8DC2BE}"/>
+              </a:ext>
+            </a:extLst>
+          </p:cNvPr>
+          <p:cNvSpPr txBox="1"/>
+          <p:nvPr/>
+        </p:nvSpPr>
+        <p:spPr>
+          <a:xfrm>
+            <a:off x="9086326" y="3359574"/>
+            <a:ext cx="357256" cy="523220"/>
+          </a:xfrm>
+          <a:prstGeom prst="rect">
+            <a:avLst/>
+          </a:prstGeom>
+          <a:noFill/>
+        </p:spPr>
+        <p:txBody>
+          <a:bodyPr wrap="square" rtlCol="0">
+            <a:spAutoFit/>
+          </a:bodyPr>
+          <a:lstStyle/>
+          <a:p>
+            <a:pPr algn="ctr"/>
+            <a:r>
+              <a:rPr lang="en-US" sz="2800" b="1"/>
+              <a:t>c</a:t>
+            </a:r>
+            <a:endParaRPr lang="en-IN" sz="2800" b="1"/>
+          </a:p>
+        </p:txBody>
+      </p:sp>
+      <p:cxnSp>
+        <p:nvCxnSpPr>
+          <p:cNvPr id="54" name="Straight Connector 53">
+            <a:extLst>
+              <a:ext uri="{FF2B5EF4-FFF2-40B4-BE49-F238E27FC236}">
+                <a16:creationId xmlns:a16="http://schemas.microsoft.com/office/drawing/2014/main" id="{E81632C9-3909-48F9-A0A8-4E3494D5337A}"/>
+              </a:ext>
+            </a:extLst>
+          </p:cNvPr>
+          <p:cNvCxnSpPr>
+            <a:cxnSpLocks/>
+          </p:cNvCxnSpPr>
+          <p:nvPr/>
+        </p:nvCxnSpPr>
+        <p:spPr>
+          <a:xfrm>
+            <a:off x="7618055" y="863348"/>
+            <a:ext cx="0" cy="4554071"/>
+          </a:xfrm>
+          <a:prstGeom prst="line">
+            <a:avLst/>
+          </a:prstGeom>
+          <a:ln w="38100">
+            <a:prstDash val="dash"/>
+          </a:ln>
+        </p:spPr>
+        <p:style>
+          <a:lnRef idx="1">
+            <a:schemeClr val="accent2"/>
+          </a:lnRef>
+          <a:fillRef idx="0">
+            <a:schemeClr val="accent2"/>
+          </a:fillRef>
+          <a:effectRef idx="0">
+            <a:schemeClr val="accent2"/>
+          </a:effectRef>
+          <a:fontRef idx="minor">
+            <a:schemeClr val="tx1"/>
+          </a:fontRef>
+        </p:style>
+      </p:cxnSp>
+      <p:cxnSp>
+        <p:nvCxnSpPr>
+          <p:cNvPr id="55" name="Straight Connector 54">
+            <a:extLst>
+              <a:ext uri="{FF2B5EF4-FFF2-40B4-BE49-F238E27FC236}">
+                <a16:creationId xmlns:a16="http://schemas.microsoft.com/office/drawing/2014/main" id="{B996FFF3-B5CF-468B-9145-C0D5EEB01BA7}"/>
+              </a:ext>
+            </a:extLst>
+          </p:cNvPr>
+          <p:cNvCxnSpPr>
+            <a:cxnSpLocks/>
+          </p:cNvCxnSpPr>
+          <p:nvPr/>
+        </p:nvCxnSpPr>
+        <p:spPr>
+          <a:xfrm flipH="1">
+            <a:off x="7580197" y="5405575"/>
+            <a:ext cx="3939749" cy="22021"/>
+          </a:xfrm>
+          <a:prstGeom prst="line">
+            <a:avLst/>
+          </a:prstGeom>
+          <a:ln w="38100">
+            <a:prstDash val="dash"/>
+          </a:ln>
+        </p:spPr>
+        <p:style>
+          <a:lnRef idx="1">
+            <a:schemeClr val="accent2"/>
+          </a:lnRef>
+          <a:fillRef idx="0">
+            <a:schemeClr val="accent2"/>
+          </a:fillRef>
+          <a:effectRef idx="0">
+            <a:schemeClr val="accent2"/>
+          </a:effectRef>
+          <a:fontRef idx="minor">
+            <a:schemeClr val="tx1"/>
+          </a:fontRef>
+        </p:style>
+      </p:cxnSp>
+      <p:sp>
+        <p:nvSpPr>
+          <p:cNvPr id="56" name="TextBox 55">
+            <a:extLst>
+              <a:ext uri="{FF2B5EF4-FFF2-40B4-BE49-F238E27FC236}">
+                <a16:creationId xmlns:a16="http://schemas.microsoft.com/office/drawing/2014/main" id="{D140E8A8-3370-4D99-92DA-63564D042677}"/>
+              </a:ext>
+            </a:extLst>
+          </p:cNvPr>
+          <p:cNvSpPr txBox="1"/>
+          <p:nvPr/>
+        </p:nvSpPr>
+        <p:spPr>
+          <a:xfrm>
+            <a:off x="9045501" y="509241"/>
+            <a:ext cx="357256" cy="523220"/>
+          </a:xfrm>
+          <a:prstGeom prst="rect">
+            <a:avLst/>
+          </a:prstGeom>
+          <a:noFill/>
+        </p:spPr>
+        <p:txBody>
+          <a:bodyPr wrap="square" rtlCol="0">
+            <a:spAutoFit/>
+          </a:bodyPr>
+          <a:lstStyle/>
+          <a:p>
+            <a:pPr algn="ctr"/>
+            <a:r>
+              <a:rPr lang="en-US" sz="2800" b="1"/>
+              <a:t>c</a:t>
+            </a:r>
+            <a:endParaRPr lang="en-IN" sz="2800" b="1"/>
+          </a:p>
+        </p:txBody>
+      </p:sp>
+      <p:sp>
+        <p:nvSpPr>
+          <p:cNvPr id="57" name="TextBox 56">
+            <a:extLst>
+              <a:ext uri="{FF2B5EF4-FFF2-40B4-BE49-F238E27FC236}">
+                <a16:creationId xmlns:a16="http://schemas.microsoft.com/office/drawing/2014/main" id="{D570C96A-84AC-40D2-A1F8-D1F2AFBAD047}"/>
+              </a:ext>
+            </a:extLst>
+          </p:cNvPr>
+          <p:cNvSpPr txBox="1"/>
+          <p:nvPr/>
+        </p:nvSpPr>
+        <p:spPr>
+          <a:xfrm>
+            <a:off x="11053166" y="3335779"/>
+            <a:ext cx="357256" cy="523220"/>
+          </a:xfrm>
+          <a:prstGeom prst="rect">
+            <a:avLst/>
+          </a:prstGeom>
+          <a:noFill/>
+        </p:spPr>
+        <p:txBody>
+          <a:bodyPr wrap="square" rtlCol="0">
+            <a:spAutoFit/>
+          </a:bodyPr>
+          <a:lstStyle/>
+          <a:p>
+            <a:pPr algn="ctr"/>
+            <a:r>
+              <a:rPr lang="en-US" sz="2800" b="1"/>
+              <a:t>c</a:t>
+            </a:r>
+            <a:endParaRPr lang="en-IN" sz="2800" b="1"/>
+          </a:p>
+        </p:txBody>
+      </p:sp>
+      <p:sp>
+        <p:nvSpPr>
+          <p:cNvPr id="58" name="TextBox 57">
+            <a:extLst>
+              <a:ext uri="{FF2B5EF4-FFF2-40B4-BE49-F238E27FC236}">
+                <a16:creationId xmlns:a16="http://schemas.microsoft.com/office/drawing/2014/main" id="{8C3B8011-3B4C-49CB-9D5C-AF378D61842A}"/>
+              </a:ext>
+            </a:extLst>
+          </p:cNvPr>
+          <p:cNvSpPr txBox="1"/>
+          <p:nvPr/>
+        </p:nvSpPr>
+        <p:spPr>
+          <a:xfrm>
+            <a:off x="7156083" y="340128"/>
+            <a:ext cx="941538" cy="523220"/>
+          </a:xfrm>
+          <a:prstGeom prst="rect">
+            <a:avLst/>
+          </a:prstGeom>
+          <a:noFill/>
+        </p:spPr>
+        <p:txBody>
+          <a:bodyPr wrap="square" rtlCol="0">
+            <a:spAutoFit/>
+          </a:bodyPr>
+          <a:lstStyle/>
+          <a:p>
+            <a:pPr algn="ctr"/>
+            <a:r>
+              <a:rPr lang="en-US" sz="2800" b="1"/>
+              <a:t>y</a:t>
+            </a:r>
+            <a:endParaRPr lang="en-IN" sz="2800" b="1"/>
+          </a:p>
+        </p:txBody>
+      </p:sp>
+      <p:sp>
+        <p:nvSpPr>
+          <p:cNvPr id="59" name="TextBox 58">
+            <a:extLst>
+              <a:ext uri="{FF2B5EF4-FFF2-40B4-BE49-F238E27FC236}">
+                <a16:creationId xmlns:a16="http://schemas.microsoft.com/office/drawing/2014/main" id="{DA2E1672-267B-4C44-AE99-0049D950906E}"/>
+              </a:ext>
+            </a:extLst>
+          </p:cNvPr>
+          <p:cNvSpPr txBox="1"/>
+          <p:nvPr/>
+        </p:nvSpPr>
+        <p:spPr>
+          <a:xfrm>
+            <a:off x="11210904" y="5137879"/>
+            <a:ext cx="941538" cy="523220"/>
+          </a:xfrm>
+          <a:prstGeom prst="rect">
+            <a:avLst/>
+          </a:prstGeom>
+          <a:noFill/>
+        </p:spPr>
+        <p:txBody>
+          <a:bodyPr wrap="square" rtlCol="0">
+            <a:spAutoFit/>
+          </a:bodyPr>
+          <a:lstStyle/>
+          <a:p>
+            <a:pPr algn="ctr"/>
+            <a:r>
+              <a:rPr lang="en-US" sz="2800" b="1"/>
+              <a:t>x</a:t>
+            </a:r>
+            <a:endParaRPr lang="en-IN" sz="2800" b="1"/>
+          </a:p>
+        </p:txBody>
+      </p:sp>
+      <p:sp>
+        <p:nvSpPr>
+          <p:cNvPr id="60" name="TextBox 59">
+            <a:extLst>
+              <a:ext uri="{FF2B5EF4-FFF2-40B4-BE49-F238E27FC236}">
+                <a16:creationId xmlns:a16="http://schemas.microsoft.com/office/drawing/2014/main" id="{F096F57D-6D5E-4018-A982-920D915BA984}"/>
+              </a:ext>
+            </a:extLst>
+          </p:cNvPr>
+          <p:cNvSpPr txBox="1"/>
+          <p:nvPr/>
+        </p:nvSpPr>
+        <p:spPr>
+          <a:xfrm>
+            <a:off x="7303622" y="5296508"/>
+            <a:ext cx="357256" cy="523220"/>
+          </a:xfrm>
+          <a:prstGeom prst="rect">
+            <a:avLst/>
+          </a:prstGeom>
+          <a:noFill/>
+        </p:spPr>
+        <p:txBody>
+          <a:bodyPr wrap="square" rtlCol="0">
+            <a:spAutoFit/>
+          </a:bodyPr>
+          <a:lstStyle/>
+          <a:p>
+            <a:pPr algn="ctr"/>
+            <a:r>
+              <a:rPr lang="en-US" sz="2800" b="1"/>
+              <a:t>0</a:t>
+            </a:r>
+            <a:endParaRPr lang="en-IN" sz="2800" b="1"/>
+          </a:p>
+        </p:txBody>
+      </p:sp>
+      <p:sp>
+        <p:nvSpPr>
+          <p:cNvPr id="61" name="TextBox 60">
+            <a:extLst>
+              <a:ext uri="{FF2B5EF4-FFF2-40B4-BE49-F238E27FC236}">
+                <a16:creationId xmlns:a16="http://schemas.microsoft.com/office/drawing/2014/main" id="{F347EB34-2290-4C9E-994F-6C6E6CA32ADA}"/>
+              </a:ext>
+            </a:extLst>
+          </p:cNvPr>
+          <p:cNvSpPr txBox="1"/>
+          <p:nvPr/>
+        </p:nvSpPr>
+        <p:spPr>
+          <a:xfrm>
+            <a:off x="8608534" y="5977865"/>
+            <a:ext cx="941538" cy="523220"/>
+          </a:xfrm>
+          <a:prstGeom prst="rect">
+            <a:avLst/>
+          </a:prstGeom>
+          <a:noFill/>
+        </p:spPr>
+        <p:txBody>
+          <a:bodyPr wrap="square" rtlCol="0">
+            <a:spAutoFit/>
+          </a:bodyPr>
+          <a:lstStyle/>
+          <a:p>
+            <a:pPr algn="ctr"/>
+            <a:r>
+              <a:rPr lang="en-US" sz="2800" b="1"/>
+              <a:t>b</a:t>
+            </a:r>
+            <a:endParaRPr lang="en-IN" sz="2800" b="1"/>
+          </a:p>
+        </p:txBody>
+      </p:sp>
+      <p:sp>
+        <p:nvSpPr>
+          <p:cNvPr id="62" name="Rectangle 61">
+            <a:extLst>
+              <a:ext uri="{FF2B5EF4-FFF2-40B4-BE49-F238E27FC236}">
+                <a16:creationId xmlns:a16="http://schemas.microsoft.com/office/drawing/2014/main" id="{DDE09108-076B-4CF7-B891-FED3A895CF9A}"/>
+              </a:ext>
+            </a:extLst>
+          </p:cNvPr>
+          <p:cNvSpPr/>
+          <p:nvPr/>
+        </p:nvSpPr>
+        <p:spPr>
+          <a:xfrm>
+            <a:off x="9892555" y="1577788"/>
+            <a:ext cx="273420" cy="3845859"/>
+          </a:xfrm>
+          <a:prstGeom prst="rect">
+            <a:avLst/>
+          </a:prstGeom>
+        </p:spPr>
+        <p:style>
+          <a:lnRef idx="2">
+            <a:schemeClr val="accent1">
+              <a:shade val="50000"/>
+            </a:schemeClr>
+          </a:lnRef>
+          <a:fillRef idx="1">
+            <a:schemeClr val="accent1"/>
+          </a:fillRef>
+          <a:effectRef idx="0">
+            <a:schemeClr val="accent1"/>
+          </a:effectRef>
+          <a:fontRef idx="minor">
+            <a:schemeClr val="lt1"/>
+          </a:fontRef>
+        </p:style>
+        <p:txBody>
+          <a:bodyPr rtlCol="0" anchor="ctr"/>
+          <a:lstStyle/>
+          <a:p>
+            <a:pPr algn="ctr"/>
+            <a:endParaRPr lang="en-IN"/>
+          </a:p>
+        </p:txBody>
+      </p:sp>
+      <p:sp>
+        <p:nvSpPr>
+          <p:cNvPr id="63" name="TextBox 62">
+            <a:extLst>
+              <a:ext uri="{FF2B5EF4-FFF2-40B4-BE49-F238E27FC236}">
+                <a16:creationId xmlns:a16="http://schemas.microsoft.com/office/drawing/2014/main" id="{595E870F-ABFB-449A-AEF3-4DEFBE33C4EB}"/>
+              </a:ext>
+            </a:extLst>
+          </p:cNvPr>
+          <p:cNvSpPr txBox="1"/>
+          <p:nvPr/>
+        </p:nvSpPr>
+        <p:spPr>
+          <a:xfrm>
+            <a:off x="8282591" y="1871847"/>
+            <a:ext cx="941538" cy="523220"/>
+          </a:xfrm>
+          <a:prstGeom prst="rect">
+            <a:avLst/>
+          </a:prstGeom>
+          <a:noFill/>
+        </p:spPr>
+        <p:txBody>
+          <a:bodyPr wrap="square" rtlCol="0">
+            <a:spAutoFit/>
+          </a:bodyPr>
+          <a:lstStyle/>
+          <a:p>
+            <a:pPr algn="ctr"/>
+            <a:r>
+              <a:rPr lang="en-US" sz="2800" b="1"/>
+              <a:t>x</a:t>
+            </a:r>
+            <a:endParaRPr lang="en-IN" sz="2800" b="1"/>
+          </a:p>
+        </p:txBody>
+      </p:sp>
+      <p:sp>
+        <p:nvSpPr>
+          <p:cNvPr id="64" name="TextBox 63">
+            <a:extLst>
+              <a:ext uri="{FF2B5EF4-FFF2-40B4-BE49-F238E27FC236}">
+                <a16:creationId xmlns:a16="http://schemas.microsoft.com/office/drawing/2014/main" id="{B65274F2-28CD-4ABA-82A1-2244338BC516}"/>
+              </a:ext>
+            </a:extLst>
+          </p:cNvPr>
+          <p:cNvSpPr txBox="1"/>
+          <p:nvPr/>
+        </p:nvSpPr>
+        <p:spPr>
+          <a:xfrm>
+            <a:off x="9543715" y="1139122"/>
+            <a:ext cx="941538" cy="523220"/>
+          </a:xfrm>
+          <a:prstGeom prst="rect">
+            <a:avLst/>
+          </a:prstGeom>
+          <a:noFill/>
+        </p:spPr>
+        <p:txBody>
+          <a:bodyPr wrap="square" rtlCol="0">
+            <a:spAutoFit/>
+          </a:bodyPr>
+          <a:lstStyle/>
+          <a:p>
+            <a:pPr algn="ctr"/>
+            <a:r>
+              <a:rPr lang="en-US" sz="2800" b="1"/>
+              <a:t>dx</a:t>
+            </a:r>
+            <a:endParaRPr lang="en-IN" sz="2800" b="1"/>
+          </a:p>
+        </p:txBody>
+      </p:sp>
+      <p:cxnSp>
+        <p:nvCxnSpPr>
+          <p:cNvPr id="65" name="Straight Arrow Connector 64">
+            <a:extLst>
+              <a:ext uri="{FF2B5EF4-FFF2-40B4-BE49-F238E27FC236}">
+                <a16:creationId xmlns:a16="http://schemas.microsoft.com/office/drawing/2014/main" id="{522E7135-81AE-458F-8130-9B295AA264C8}"/>
+              </a:ext>
+            </a:extLst>
+          </p:cNvPr>
+          <p:cNvCxnSpPr>
+            <a:cxnSpLocks/>
+          </p:cNvCxnSpPr>
+          <p:nvPr/>
+        </p:nvCxnSpPr>
+        <p:spPr>
+          <a:xfrm>
+            <a:off x="7660878" y="2311260"/>
+            <a:ext cx="2231677" cy="0"/>
+          </a:xfrm>
+          <a:prstGeom prst="straightConnector1">
+            <a:avLst/>
+          </a:prstGeom>
+          <a:ln w="57150">
+            <a:headEnd type="triangle"/>
+            <a:tailEnd type="triangle"/>
+          </a:ln>
+        </p:spPr>
+        <p:style>
+          <a:lnRef idx="1">
+            <a:schemeClr val="dk1"/>
+          </a:lnRef>
+          <a:fillRef idx="0">
+            <a:schemeClr val="dk1"/>
+          </a:fillRef>
+          <a:effectRef idx="0">
+            <a:schemeClr val="dk1"/>
+          </a:effectRef>
+          <a:fontRef idx="minor">
+            <a:schemeClr val="tx1"/>
+          </a:fontRef>
+        </p:style>
+      </p:cxnSp>
+      <p:cxnSp>
+        <p:nvCxnSpPr>
+          <p:cNvPr id="67" name="Straight Arrow Connector 66">
+            <a:extLst>
+              <a:ext uri="{FF2B5EF4-FFF2-40B4-BE49-F238E27FC236}">
+                <a16:creationId xmlns:a16="http://schemas.microsoft.com/office/drawing/2014/main" id="{B5F71FB0-B7C4-4867-BFE4-650379E0D40A}"/>
+              </a:ext>
+            </a:extLst>
+          </p:cNvPr>
+          <p:cNvCxnSpPr>
+            <a:cxnSpLocks/>
+          </p:cNvCxnSpPr>
+          <p:nvPr/>
+        </p:nvCxnSpPr>
+        <p:spPr>
+          <a:xfrm flipH="1" flipV="1">
+            <a:off x="2339279" y="3493798"/>
+            <a:ext cx="10448" cy="1940026"/>
+          </a:xfrm>
+          <a:prstGeom prst="straightConnector1">
+            <a:avLst/>
+          </a:prstGeom>
+          <a:ln w="57150">
+            <a:headEnd type="triangle"/>
+            <a:tailEnd type="triangle"/>
+          </a:ln>
+        </p:spPr>
+        <p:style>
+          <a:lnRef idx="1">
+            <a:schemeClr val="dk1"/>
+          </a:lnRef>
+          <a:fillRef idx="0">
+            <a:schemeClr val="dk1"/>
+          </a:fillRef>
+          <a:effectRef idx="0">
+            <a:schemeClr val="dk1"/>
+          </a:effectRef>
+          <a:fontRef idx="minor">
+            <a:schemeClr val="tx1"/>
+          </a:fontRef>
+        </p:style>
+      </p:cxnSp>
+      <p:cxnSp>
+        <p:nvCxnSpPr>
+          <p:cNvPr id="70" name="Straight Arrow Connector 69">
+            <a:extLst>
+              <a:ext uri="{FF2B5EF4-FFF2-40B4-BE49-F238E27FC236}">
+                <a16:creationId xmlns:a16="http://schemas.microsoft.com/office/drawing/2014/main" id="{DA96C267-82E3-4749-89F2-4F7150818CFB}"/>
+              </a:ext>
+            </a:extLst>
+          </p:cNvPr>
+          <p:cNvCxnSpPr>
+            <a:cxnSpLocks/>
+          </p:cNvCxnSpPr>
+          <p:nvPr/>
+        </p:nvCxnSpPr>
+        <p:spPr>
+          <a:xfrm flipH="1">
+            <a:off x="7660878" y="4753021"/>
+            <a:ext cx="1427445" cy="0"/>
+          </a:xfrm>
+          <a:prstGeom prst="straightConnector1">
+            <a:avLst/>
+          </a:prstGeom>
+          <a:ln w="57150">
+            <a:headEnd type="triangle"/>
+            <a:tailEnd type="triangle"/>
+          </a:ln>
+        </p:spPr>
+        <p:style>
+          <a:lnRef idx="1">
+            <a:schemeClr val="dk1"/>
+          </a:lnRef>
+          <a:fillRef idx="0">
+            <a:schemeClr val="dk1"/>
+          </a:fillRef>
+          <a:effectRef idx="0">
+            <a:schemeClr val="dk1"/>
+          </a:effectRef>
+          <a:fontRef idx="minor">
+            <a:schemeClr val="tx1"/>
+          </a:fontRef>
+        </p:style>
+      </p:cxnSp>
+      <p:sp>
+        <p:nvSpPr>
+          <p:cNvPr id="74" name="TextBox 73">
+            <a:extLst>
+              <a:ext uri="{FF2B5EF4-FFF2-40B4-BE49-F238E27FC236}">
+                <a16:creationId xmlns:a16="http://schemas.microsoft.com/office/drawing/2014/main" id="{B2E5A622-E0E6-4DBC-956A-007051DF619A}"/>
+              </a:ext>
+            </a:extLst>
+          </p:cNvPr>
+          <p:cNvSpPr txBox="1"/>
+          <p:nvPr/>
+        </p:nvSpPr>
+        <p:spPr>
+          <a:xfrm>
+            <a:off x="2065025" y="4253323"/>
+            <a:ext cx="1556044" cy="369332"/>
+          </a:xfrm>
+          <a:prstGeom prst="rect">
+            <a:avLst/>
+          </a:prstGeom>
+          <a:noFill/>
+        </p:spPr>
+        <p:txBody>
+          <a:bodyPr wrap="square" rtlCol="0">
+            <a:spAutoFit/>
+          </a:bodyPr>
+          <a:lstStyle/>
+          <a:p>
+            <a:pPr algn="ctr"/>
+            <a:r>
+              <a:rPr lang="en-US" b="1"/>
+              <a:t>D1 = d/2</a:t>
+            </a:r>
+            <a:endParaRPr lang="en-IN" b="1"/>
+          </a:p>
+        </p:txBody>
+      </p:sp>
+      <p:sp>
+        <p:nvSpPr>
+          <p:cNvPr id="75" name="TextBox 74">
+            <a:extLst>
+              <a:ext uri="{FF2B5EF4-FFF2-40B4-BE49-F238E27FC236}">
+                <a16:creationId xmlns:a16="http://schemas.microsoft.com/office/drawing/2014/main" id="{2B5380F4-A15A-4DAD-9195-C282246BDCA6}"/>
+              </a:ext>
+            </a:extLst>
+          </p:cNvPr>
+          <p:cNvSpPr txBox="1"/>
+          <p:nvPr/>
+        </p:nvSpPr>
+        <p:spPr>
+          <a:xfrm>
+            <a:off x="7618055" y="4373512"/>
+            <a:ext cx="1556044" cy="369332"/>
+          </a:xfrm>
+          <a:prstGeom prst="rect">
+            <a:avLst/>
+          </a:prstGeom>
+          <a:noFill/>
+        </p:spPr>
+        <p:txBody>
+          <a:bodyPr wrap="square" rtlCol="0">
+            <a:spAutoFit/>
+          </a:bodyPr>
+          <a:lstStyle/>
+          <a:p>
+            <a:pPr algn="ctr"/>
+            <a:r>
+              <a:rPr lang="en-US" b="1"/>
+              <a:t>D2 = b/2</a:t>
+            </a:r>
+            <a:endParaRPr lang="en-IN" b="1"/>
+          </a:p>
+        </p:txBody>
+      </p:sp>
+    </p:spTree>
+    <p:extLst>
+      <p:ext uri="{BB962C8B-B14F-4D97-AF65-F5344CB8AC3E}">
+        <p14:creationId xmlns:p14="http://schemas.microsoft.com/office/powerpoint/2010/main" val="3328059199"/>
+      </p:ext>
+    </p:extLst>
+  </p:cSld>
+  <p:clrMapOvr>
+    <a:masterClrMapping/>
+  </p:clrMapOvr>
+</p:sld>
+</file>
+
 <file path=ppt/slides/slide2.xml><?xml version="1.0" encoding="utf-8"?>
 <p:sld xmlns:a="http://schemas.openxmlformats.org/drawingml/2006/main" xmlns:r="http://schemas.openxmlformats.org/officeDocument/2006/relationships" xmlns:p="http://schemas.openxmlformats.org/presentationml/2006/main">
   <p:cSld>
@@ -15879,6 +19367,1216 @@
     <p:extLst>
       <p:ext uri="{BB962C8B-B14F-4D97-AF65-F5344CB8AC3E}">
         <p14:creationId xmlns:p14="http://schemas.microsoft.com/office/powerpoint/2010/main" val="1399090415"/>
+      </p:ext>
+    </p:extLst>
+  </p:cSld>
+  <p:clrMapOvr>
+    <a:masterClrMapping/>
+  </p:clrMapOvr>
+</p:sld>
+</file>
+
+<file path=ppt/slides/slide20.xml><?xml version="1.0" encoding="utf-8"?>
+<p:sld xmlns:a="http://schemas.openxmlformats.org/drawingml/2006/main" xmlns:r="http://schemas.openxmlformats.org/officeDocument/2006/relationships" xmlns:p="http://schemas.openxmlformats.org/presentationml/2006/main">
+  <p:cSld>
+    <p:spTree>
+      <p:nvGrpSpPr>
+        <p:cNvPr id="1" name=""/>
+        <p:cNvGrpSpPr/>
+        <p:nvPr/>
+      </p:nvGrpSpPr>
+      <p:grpSpPr>
+        <a:xfrm>
+          <a:off x="0" y="0"/>
+          <a:ext cx="0" cy="0"/>
+          <a:chOff x="0" y="0"/>
+          <a:chExt cx="0" cy="0"/>
+        </a:xfrm>
+      </p:grpSpPr>
+      <p:sp>
+        <p:nvSpPr>
+          <p:cNvPr id="8" name="Freeform: Shape 7">
+            <a:extLst>
+              <a:ext uri="{FF2B5EF4-FFF2-40B4-BE49-F238E27FC236}">
+                <a16:creationId xmlns:a16="http://schemas.microsoft.com/office/drawing/2014/main" id="{0CF1346C-8E2A-4E39-9E99-480BD2B82568}"/>
+              </a:ext>
+            </a:extLst>
+          </p:cNvPr>
+          <p:cNvSpPr/>
+          <p:nvPr/>
+        </p:nvSpPr>
+        <p:spPr>
+          <a:xfrm>
+            <a:off x="4122060" y="1884013"/>
+            <a:ext cx="4170872" cy="3226283"/>
+          </a:xfrm>
+          <a:custGeom>
+            <a:avLst/>
+            <a:gdLst>
+              <a:gd name="connsiteX0" fmla="*/ 82387 w 4170872"/>
+              <a:gd name="connsiteY0" fmla="*/ 2150104 h 3226283"/>
+              <a:gd name="connsiteX1" fmla="*/ 127211 w 4170872"/>
+              <a:gd name="connsiteY1" fmla="*/ 1477751 h 3226283"/>
+              <a:gd name="connsiteX2" fmla="*/ 826458 w 4170872"/>
+              <a:gd name="connsiteY2" fmla="*/ 877116 h 3226283"/>
+              <a:gd name="connsiteX3" fmla="*/ 1929116 w 4170872"/>
+              <a:gd name="connsiteY3" fmla="*/ 760575 h 3226283"/>
+              <a:gd name="connsiteX4" fmla="*/ 2700081 w 4170872"/>
+              <a:gd name="connsiteY4" fmla="*/ 7539 h 3226283"/>
+              <a:gd name="connsiteX5" fmla="*/ 3641375 w 4170872"/>
+              <a:gd name="connsiteY5" fmla="*/ 455775 h 3226283"/>
+              <a:gd name="connsiteX6" fmla="*/ 4161328 w 4170872"/>
+              <a:gd name="connsiteY6" fmla="*/ 1728763 h 3226283"/>
+              <a:gd name="connsiteX7" fmla="*/ 3211069 w 4170872"/>
+              <a:gd name="connsiteY7" fmla="*/ 2768669 h 3226283"/>
+              <a:gd name="connsiteX8" fmla="*/ 1704999 w 4170872"/>
+              <a:gd name="connsiteY8" fmla="*/ 2867281 h 3226283"/>
+              <a:gd name="connsiteX9" fmla="*/ 683022 w 4170872"/>
+              <a:gd name="connsiteY9" fmla="*/ 3225869 h 3226283"/>
+              <a:gd name="connsiteX10" fmla="*/ 37563 w 4170872"/>
+              <a:gd name="connsiteY10" fmla="*/ 2921069 h 3226283"/>
+              <a:gd name="connsiteX11" fmla="*/ 82387 w 4170872"/>
+              <a:gd name="connsiteY11" fmla="*/ 2150104 h 3226283"/>
+            </a:gdLst>
+            <a:ahLst/>
+            <a:cxnLst>
+              <a:cxn ang="0">
+                <a:pos x="connsiteX0" y="connsiteY0"/>
+              </a:cxn>
+              <a:cxn ang="0">
+                <a:pos x="connsiteX1" y="connsiteY1"/>
+              </a:cxn>
+              <a:cxn ang="0">
+                <a:pos x="connsiteX2" y="connsiteY2"/>
+              </a:cxn>
+              <a:cxn ang="0">
+                <a:pos x="connsiteX3" y="connsiteY3"/>
+              </a:cxn>
+              <a:cxn ang="0">
+                <a:pos x="connsiteX4" y="connsiteY4"/>
+              </a:cxn>
+              <a:cxn ang="0">
+                <a:pos x="connsiteX5" y="connsiteY5"/>
+              </a:cxn>
+              <a:cxn ang="0">
+                <a:pos x="connsiteX6" y="connsiteY6"/>
+              </a:cxn>
+              <a:cxn ang="0">
+                <a:pos x="connsiteX7" y="connsiteY7"/>
+              </a:cxn>
+              <a:cxn ang="0">
+                <a:pos x="connsiteX8" y="connsiteY8"/>
+              </a:cxn>
+              <a:cxn ang="0">
+                <a:pos x="connsiteX9" y="connsiteY9"/>
+              </a:cxn>
+              <a:cxn ang="0">
+                <a:pos x="connsiteX10" y="connsiteY10"/>
+              </a:cxn>
+              <a:cxn ang="0">
+                <a:pos x="connsiteX11" y="connsiteY11"/>
+              </a:cxn>
+            </a:cxnLst>
+            <a:rect l="l" t="t" r="r" b="b"/>
+            <a:pathLst>
+              <a:path w="4170872" h="3226283">
+                <a:moveTo>
+                  <a:pt x="82387" y="2150104"/>
+                </a:moveTo>
+                <a:cubicBezTo>
+                  <a:pt x="97328" y="1909551"/>
+                  <a:pt x="3199" y="1689916"/>
+                  <a:pt x="127211" y="1477751"/>
+                </a:cubicBezTo>
+                <a:cubicBezTo>
+                  <a:pt x="251223" y="1265586"/>
+                  <a:pt x="526140" y="996645"/>
+                  <a:pt x="826458" y="877116"/>
+                </a:cubicBezTo>
+                <a:cubicBezTo>
+                  <a:pt x="1126776" y="757587"/>
+                  <a:pt x="1616845" y="905505"/>
+                  <a:pt x="1929116" y="760575"/>
+                </a:cubicBezTo>
+                <a:cubicBezTo>
+                  <a:pt x="2241387" y="615645"/>
+                  <a:pt x="2414705" y="58339"/>
+                  <a:pt x="2700081" y="7539"/>
+                </a:cubicBezTo>
+                <a:cubicBezTo>
+                  <a:pt x="2985457" y="-43261"/>
+                  <a:pt x="3397834" y="168904"/>
+                  <a:pt x="3641375" y="455775"/>
+                </a:cubicBezTo>
+                <a:cubicBezTo>
+                  <a:pt x="3884916" y="742646"/>
+                  <a:pt x="4233046" y="1343281"/>
+                  <a:pt x="4161328" y="1728763"/>
+                </a:cubicBezTo>
+                <a:cubicBezTo>
+                  <a:pt x="4089610" y="2114245"/>
+                  <a:pt x="3620457" y="2578916"/>
+                  <a:pt x="3211069" y="2768669"/>
+                </a:cubicBezTo>
+                <a:cubicBezTo>
+                  <a:pt x="2801681" y="2958422"/>
+                  <a:pt x="2126340" y="2791081"/>
+                  <a:pt x="1704999" y="2867281"/>
+                </a:cubicBezTo>
+                <a:cubicBezTo>
+                  <a:pt x="1283658" y="2943481"/>
+                  <a:pt x="960928" y="3216904"/>
+                  <a:pt x="683022" y="3225869"/>
+                </a:cubicBezTo>
+                <a:cubicBezTo>
+                  <a:pt x="405116" y="3234834"/>
+                  <a:pt x="137669" y="3097375"/>
+                  <a:pt x="37563" y="2921069"/>
+                </a:cubicBezTo>
+                <a:cubicBezTo>
+                  <a:pt x="-62543" y="2744763"/>
+                  <a:pt x="67446" y="2390657"/>
+                  <a:pt x="82387" y="2150104"/>
+                </a:cubicBezTo>
+                <a:close/>
+              </a:path>
+            </a:pathLst>
+          </a:custGeom>
+          <a:ln>
+            <a:solidFill>
+              <a:schemeClr val="accent1"/>
+            </a:solidFill>
+          </a:ln>
+        </p:spPr>
+        <p:style>
+          <a:lnRef idx="1">
+            <a:schemeClr val="accent5"/>
+          </a:lnRef>
+          <a:fillRef idx="2">
+            <a:schemeClr val="accent5"/>
+          </a:fillRef>
+          <a:effectRef idx="1">
+            <a:schemeClr val="accent5"/>
+          </a:effectRef>
+          <a:fontRef idx="minor">
+            <a:schemeClr val="dk1"/>
+          </a:fontRef>
+        </p:style>
+        <p:txBody>
+          <a:bodyPr rtlCol="0" anchor="ctr"/>
+          <a:lstStyle/>
+          <a:p>
+            <a:pPr algn="ctr"/>
+            <a:endParaRPr lang="en-IN"/>
+          </a:p>
+        </p:txBody>
+      </p:sp>
+      <p:cxnSp>
+        <p:nvCxnSpPr>
+          <p:cNvPr id="14" name="Straight Connector 13">
+            <a:extLst>
+              <a:ext uri="{FF2B5EF4-FFF2-40B4-BE49-F238E27FC236}">
+                <a16:creationId xmlns:a16="http://schemas.microsoft.com/office/drawing/2014/main" id="{CEA5FE1B-7585-4BDA-B0C0-FDF8E21BE366}"/>
+              </a:ext>
+            </a:extLst>
+          </p:cNvPr>
+          <p:cNvCxnSpPr/>
+          <p:nvPr/>
+        </p:nvCxnSpPr>
+        <p:spPr>
+          <a:xfrm>
+            <a:off x="6024282" y="1174376"/>
+            <a:ext cx="71718" cy="4876800"/>
+          </a:xfrm>
+          <a:prstGeom prst="line">
+            <a:avLst/>
+          </a:prstGeom>
+          <a:ln w="38100">
+            <a:prstDash val="dashDot"/>
+          </a:ln>
+        </p:spPr>
+        <p:style>
+          <a:lnRef idx="1">
+            <a:schemeClr val="dk1"/>
+          </a:lnRef>
+          <a:fillRef idx="0">
+            <a:schemeClr val="dk1"/>
+          </a:fillRef>
+          <a:effectRef idx="0">
+            <a:schemeClr val="dk1"/>
+          </a:effectRef>
+          <a:fontRef idx="minor">
+            <a:schemeClr val="tx1"/>
+          </a:fontRef>
+        </p:style>
+      </p:cxnSp>
+      <p:cxnSp>
+        <p:nvCxnSpPr>
+          <p:cNvPr id="66" name="Straight Connector 65">
+            <a:extLst>
+              <a:ext uri="{FF2B5EF4-FFF2-40B4-BE49-F238E27FC236}">
+                <a16:creationId xmlns:a16="http://schemas.microsoft.com/office/drawing/2014/main" id="{97772EE1-81E5-4092-B01E-A796FE44B1F9}"/>
+              </a:ext>
+            </a:extLst>
+          </p:cNvPr>
+          <p:cNvCxnSpPr>
+            <a:cxnSpLocks/>
+          </p:cNvCxnSpPr>
+          <p:nvPr/>
+        </p:nvCxnSpPr>
+        <p:spPr>
+          <a:xfrm flipH="1">
+            <a:off x="3361765" y="3612776"/>
+            <a:ext cx="5531223" cy="0"/>
+          </a:xfrm>
+          <a:prstGeom prst="line">
+            <a:avLst/>
+          </a:prstGeom>
+          <a:ln w="38100">
+            <a:prstDash val="dashDot"/>
+          </a:ln>
+        </p:spPr>
+        <p:style>
+          <a:lnRef idx="1">
+            <a:schemeClr val="dk1"/>
+          </a:lnRef>
+          <a:fillRef idx="0">
+            <a:schemeClr val="dk1"/>
+          </a:fillRef>
+          <a:effectRef idx="0">
+            <a:schemeClr val="dk1"/>
+          </a:effectRef>
+          <a:fontRef idx="minor">
+            <a:schemeClr val="tx1"/>
+          </a:fontRef>
+        </p:style>
+      </p:cxnSp>
+      <p:sp>
+        <p:nvSpPr>
+          <p:cNvPr id="24" name="Rectangle 23">
+            <a:extLst>
+              <a:ext uri="{FF2B5EF4-FFF2-40B4-BE49-F238E27FC236}">
+                <a16:creationId xmlns:a16="http://schemas.microsoft.com/office/drawing/2014/main" id="{FC8158B6-CF31-49B8-89BE-98C8ED378C0F}"/>
+              </a:ext>
+            </a:extLst>
+          </p:cNvPr>
+          <p:cNvSpPr/>
+          <p:nvPr/>
+        </p:nvSpPr>
+        <p:spPr>
+          <a:xfrm>
+            <a:off x="7212107" y="2474672"/>
+            <a:ext cx="204483" cy="197224"/>
+          </a:xfrm>
+          <a:prstGeom prst="rect">
+            <a:avLst/>
+          </a:prstGeom>
+        </p:spPr>
+        <p:style>
+          <a:lnRef idx="2">
+            <a:schemeClr val="accent2">
+              <a:shade val="50000"/>
+            </a:schemeClr>
+          </a:lnRef>
+          <a:fillRef idx="1">
+            <a:schemeClr val="accent2"/>
+          </a:fillRef>
+          <a:effectRef idx="0">
+            <a:schemeClr val="accent2"/>
+          </a:effectRef>
+          <a:fontRef idx="minor">
+            <a:schemeClr val="lt1"/>
+          </a:fontRef>
+        </p:style>
+        <p:txBody>
+          <a:bodyPr rtlCol="0" anchor="ctr"/>
+          <a:lstStyle/>
+          <a:p>
+            <a:pPr algn="ctr"/>
+            <a:endParaRPr lang="en-IN"/>
+          </a:p>
+        </p:txBody>
+      </p:sp>
+      <p:cxnSp>
+        <p:nvCxnSpPr>
+          <p:cNvPr id="27" name="Straight Arrow Connector 26">
+            <a:extLst>
+              <a:ext uri="{FF2B5EF4-FFF2-40B4-BE49-F238E27FC236}">
+                <a16:creationId xmlns:a16="http://schemas.microsoft.com/office/drawing/2014/main" id="{4B5B95E7-4171-41D1-95A2-2F8CE68C3917}"/>
+              </a:ext>
+            </a:extLst>
+          </p:cNvPr>
+          <p:cNvCxnSpPr>
+            <a:cxnSpLocks/>
+          </p:cNvCxnSpPr>
+          <p:nvPr/>
+        </p:nvCxnSpPr>
+        <p:spPr>
+          <a:xfrm flipV="1">
+            <a:off x="6060141" y="2571827"/>
+            <a:ext cx="1254208" cy="1026718"/>
+          </a:xfrm>
+          <a:prstGeom prst="straightConnector1">
+            <a:avLst/>
+          </a:prstGeom>
+          <a:ln w="57150">
+            <a:tailEnd type="triangle"/>
+          </a:ln>
+        </p:spPr>
+        <p:style>
+          <a:lnRef idx="1">
+            <a:schemeClr val="dk1"/>
+          </a:lnRef>
+          <a:fillRef idx="0">
+            <a:schemeClr val="dk1"/>
+          </a:fillRef>
+          <a:effectRef idx="0">
+            <a:schemeClr val="dk1"/>
+          </a:effectRef>
+          <a:fontRef idx="minor">
+            <a:schemeClr val="tx1"/>
+          </a:fontRef>
+        </p:style>
+      </p:cxnSp>
+      <p:sp>
+        <p:nvSpPr>
+          <p:cNvPr id="68" name="TextBox 67">
+            <a:extLst>
+              <a:ext uri="{FF2B5EF4-FFF2-40B4-BE49-F238E27FC236}">
+                <a16:creationId xmlns:a16="http://schemas.microsoft.com/office/drawing/2014/main" id="{816AB260-021F-420E-A1AB-BB28BDD7434D}"/>
+              </a:ext>
+            </a:extLst>
+          </p:cNvPr>
+          <p:cNvSpPr txBox="1"/>
+          <p:nvPr/>
+        </p:nvSpPr>
+        <p:spPr>
+          <a:xfrm>
+            <a:off x="6687245" y="2880726"/>
+            <a:ext cx="363312" cy="523220"/>
+          </a:xfrm>
+          <a:prstGeom prst="rect">
+            <a:avLst/>
+          </a:prstGeom>
+          <a:noFill/>
+        </p:spPr>
+        <p:txBody>
+          <a:bodyPr wrap="square" rtlCol="0">
+            <a:spAutoFit/>
+          </a:bodyPr>
+          <a:lstStyle/>
+          <a:p>
+            <a:pPr algn="ctr"/>
+            <a:r>
+              <a:rPr lang="en-US" sz="2800" b="1"/>
+              <a:t>ρ</a:t>
+            </a:r>
+            <a:endParaRPr lang="en-IN" sz="2800" b="1"/>
+          </a:p>
+        </p:txBody>
+      </p:sp>
+      <p:cxnSp>
+        <p:nvCxnSpPr>
+          <p:cNvPr id="69" name="Straight Arrow Connector 68">
+            <a:extLst>
+              <a:ext uri="{FF2B5EF4-FFF2-40B4-BE49-F238E27FC236}">
+                <a16:creationId xmlns:a16="http://schemas.microsoft.com/office/drawing/2014/main" id="{F9E4FC67-ADED-49F0-AF1F-704A32072FB7}"/>
+              </a:ext>
+            </a:extLst>
+          </p:cNvPr>
+          <p:cNvCxnSpPr>
+            <a:cxnSpLocks/>
+          </p:cNvCxnSpPr>
+          <p:nvPr/>
+        </p:nvCxnSpPr>
+        <p:spPr>
+          <a:xfrm>
+            <a:off x="6060141" y="2547884"/>
+            <a:ext cx="1248486" cy="0"/>
+          </a:xfrm>
+          <a:prstGeom prst="straightConnector1">
+            <a:avLst/>
+          </a:prstGeom>
+          <a:ln w="57150">
+            <a:headEnd type="triangle"/>
+            <a:tailEnd type="triangle"/>
+          </a:ln>
+        </p:spPr>
+        <p:style>
+          <a:lnRef idx="1">
+            <a:schemeClr val="dk1"/>
+          </a:lnRef>
+          <a:fillRef idx="0">
+            <a:schemeClr val="dk1"/>
+          </a:fillRef>
+          <a:effectRef idx="0">
+            <a:schemeClr val="dk1"/>
+          </a:effectRef>
+          <a:fontRef idx="minor">
+            <a:schemeClr val="tx1"/>
+          </a:fontRef>
+        </p:style>
+      </p:cxnSp>
+      <p:cxnSp>
+        <p:nvCxnSpPr>
+          <p:cNvPr id="71" name="Straight Arrow Connector 70">
+            <a:extLst>
+              <a:ext uri="{FF2B5EF4-FFF2-40B4-BE49-F238E27FC236}">
+                <a16:creationId xmlns:a16="http://schemas.microsoft.com/office/drawing/2014/main" id="{C2D93CE8-8B16-41E0-B639-C00462B74511}"/>
+              </a:ext>
+            </a:extLst>
+          </p:cNvPr>
+          <p:cNvCxnSpPr>
+            <a:cxnSpLocks/>
+          </p:cNvCxnSpPr>
+          <p:nvPr/>
+        </p:nvCxnSpPr>
+        <p:spPr>
+          <a:xfrm>
+            <a:off x="7308627" y="2547884"/>
+            <a:ext cx="0" cy="1064892"/>
+          </a:xfrm>
+          <a:prstGeom prst="straightConnector1">
+            <a:avLst/>
+          </a:prstGeom>
+          <a:ln w="57150">
+            <a:headEnd type="triangle"/>
+            <a:tailEnd type="triangle"/>
+          </a:ln>
+        </p:spPr>
+        <p:style>
+          <a:lnRef idx="1">
+            <a:schemeClr val="dk1"/>
+          </a:lnRef>
+          <a:fillRef idx="0">
+            <a:schemeClr val="dk1"/>
+          </a:fillRef>
+          <a:effectRef idx="0">
+            <a:schemeClr val="dk1"/>
+          </a:effectRef>
+          <a:fontRef idx="minor">
+            <a:schemeClr val="tx1"/>
+          </a:fontRef>
+        </p:style>
+      </p:cxnSp>
+      <p:sp>
+        <p:nvSpPr>
+          <p:cNvPr id="73" name="TextBox 72">
+            <a:extLst>
+              <a:ext uri="{FF2B5EF4-FFF2-40B4-BE49-F238E27FC236}">
+                <a16:creationId xmlns:a16="http://schemas.microsoft.com/office/drawing/2014/main" id="{BA7306EE-F26C-4EF3-92B7-2D8C93C80528}"/>
+              </a:ext>
+            </a:extLst>
+          </p:cNvPr>
+          <p:cNvSpPr txBox="1"/>
+          <p:nvPr/>
+        </p:nvSpPr>
+        <p:spPr>
+          <a:xfrm>
+            <a:off x="6492983" y="2024664"/>
+            <a:ext cx="363312" cy="523220"/>
+          </a:xfrm>
+          <a:prstGeom prst="rect">
+            <a:avLst/>
+          </a:prstGeom>
+          <a:noFill/>
+        </p:spPr>
+        <p:txBody>
+          <a:bodyPr wrap="square" rtlCol="0">
+            <a:spAutoFit/>
+          </a:bodyPr>
+          <a:lstStyle/>
+          <a:p>
+            <a:pPr algn="ctr"/>
+            <a:r>
+              <a:rPr lang="en-US" sz="2800" b="1"/>
+              <a:t>x</a:t>
+            </a:r>
+            <a:endParaRPr lang="en-IN" sz="2800" b="1"/>
+          </a:p>
+        </p:txBody>
+      </p:sp>
+      <p:sp>
+        <p:nvSpPr>
+          <p:cNvPr id="76" name="TextBox 75">
+            <a:extLst>
+              <a:ext uri="{FF2B5EF4-FFF2-40B4-BE49-F238E27FC236}">
+                <a16:creationId xmlns:a16="http://schemas.microsoft.com/office/drawing/2014/main" id="{735FC62C-7658-48E8-A09F-17CE69CBC586}"/>
+              </a:ext>
+            </a:extLst>
+          </p:cNvPr>
+          <p:cNvSpPr txBox="1"/>
+          <p:nvPr/>
+        </p:nvSpPr>
+        <p:spPr>
+          <a:xfrm>
+            <a:off x="7314348" y="2773424"/>
+            <a:ext cx="363312" cy="523220"/>
+          </a:xfrm>
+          <a:prstGeom prst="rect">
+            <a:avLst/>
+          </a:prstGeom>
+          <a:noFill/>
+        </p:spPr>
+        <p:txBody>
+          <a:bodyPr wrap="square" rtlCol="0">
+            <a:spAutoFit/>
+          </a:bodyPr>
+          <a:lstStyle/>
+          <a:p>
+            <a:pPr algn="ctr"/>
+            <a:r>
+              <a:rPr lang="en-US" sz="2800" b="1"/>
+              <a:t>y</a:t>
+            </a:r>
+            <a:endParaRPr lang="en-IN" sz="2800" b="1"/>
+          </a:p>
+        </p:txBody>
+      </p:sp>
+      <p:sp>
+        <p:nvSpPr>
+          <p:cNvPr id="77" name="TextBox 76">
+            <a:extLst>
+              <a:ext uri="{FF2B5EF4-FFF2-40B4-BE49-F238E27FC236}">
+                <a16:creationId xmlns:a16="http://schemas.microsoft.com/office/drawing/2014/main" id="{3B8FE89D-FB71-4D18-A073-D97AB391BDF5}"/>
+              </a:ext>
+            </a:extLst>
+          </p:cNvPr>
+          <p:cNvSpPr txBox="1"/>
+          <p:nvPr/>
+        </p:nvSpPr>
+        <p:spPr>
+          <a:xfrm>
+            <a:off x="5842626" y="651156"/>
+            <a:ext cx="363312" cy="523220"/>
+          </a:xfrm>
+          <a:prstGeom prst="rect">
+            <a:avLst/>
+          </a:prstGeom>
+          <a:noFill/>
+        </p:spPr>
+        <p:txBody>
+          <a:bodyPr wrap="square" rtlCol="0">
+            <a:spAutoFit/>
+          </a:bodyPr>
+          <a:lstStyle/>
+          <a:p>
+            <a:pPr algn="ctr"/>
+            <a:r>
+              <a:rPr lang="en-US" sz="2800" b="1"/>
+              <a:t>y</a:t>
+            </a:r>
+            <a:endParaRPr lang="en-IN" sz="2800" b="1"/>
+          </a:p>
+        </p:txBody>
+      </p:sp>
+      <p:sp>
+        <p:nvSpPr>
+          <p:cNvPr id="78" name="TextBox 77">
+            <a:extLst>
+              <a:ext uri="{FF2B5EF4-FFF2-40B4-BE49-F238E27FC236}">
+                <a16:creationId xmlns:a16="http://schemas.microsoft.com/office/drawing/2014/main" id="{C59C3E78-99C0-4919-99C4-883B403174E4}"/>
+              </a:ext>
+            </a:extLst>
+          </p:cNvPr>
+          <p:cNvSpPr txBox="1"/>
+          <p:nvPr/>
+        </p:nvSpPr>
+        <p:spPr>
+          <a:xfrm>
+            <a:off x="8846430" y="3296644"/>
+            <a:ext cx="363312" cy="523220"/>
+          </a:xfrm>
+          <a:prstGeom prst="rect">
+            <a:avLst/>
+          </a:prstGeom>
+          <a:noFill/>
+        </p:spPr>
+        <p:txBody>
+          <a:bodyPr wrap="square" rtlCol="0">
+            <a:spAutoFit/>
+          </a:bodyPr>
+          <a:lstStyle/>
+          <a:p>
+            <a:pPr algn="ctr"/>
+            <a:r>
+              <a:rPr lang="en-US" sz="2800" b="1"/>
+              <a:t>x</a:t>
+            </a:r>
+            <a:endParaRPr lang="en-IN" sz="2800" b="1"/>
+          </a:p>
+        </p:txBody>
+      </p:sp>
+    </p:spTree>
+    <p:extLst>
+      <p:ext uri="{BB962C8B-B14F-4D97-AF65-F5344CB8AC3E}">
+        <p14:creationId xmlns:p14="http://schemas.microsoft.com/office/powerpoint/2010/main" val="419902949"/>
+      </p:ext>
+    </p:extLst>
+  </p:cSld>
+  <p:clrMapOvr>
+    <a:masterClrMapping/>
+  </p:clrMapOvr>
+</p:sld>
+</file>
+
+<file path=ppt/slides/slide21.xml><?xml version="1.0" encoding="utf-8"?>
+<p:sld xmlns:a="http://schemas.openxmlformats.org/drawingml/2006/main" xmlns:r="http://schemas.openxmlformats.org/officeDocument/2006/relationships" xmlns:p="http://schemas.openxmlformats.org/presentationml/2006/main">
+  <p:cSld>
+    <p:spTree>
+      <p:nvGrpSpPr>
+        <p:cNvPr id="1" name=""/>
+        <p:cNvGrpSpPr/>
+        <p:nvPr/>
+      </p:nvGrpSpPr>
+      <p:grpSpPr>
+        <a:xfrm>
+          <a:off x="0" y="0"/>
+          <a:ext cx="0" cy="0"/>
+          <a:chOff x="0" y="0"/>
+          <a:chExt cx="0" cy="0"/>
+        </a:xfrm>
+      </p:grpSpPr>
+      <p:sp>
+        <p:nvSpPr>
+          <p:cNvPr id="2" name="Oval 1">
+            <a:extLst>
+              <a:ext uri="{FF2B5EF4-FFF2-40B4-BE49-F238E27FC236}">
+                <a16:creationId xmlns:a16="http://schemas.microsoft.com/office/drawing/2014/main" id="{CF2CE001-2DD0-405A-B905-CDCF33C0B2FE}"/>
+              </a:ext>
+            </a:extLst>
+          </p:cNvPr>
+          <p:cNvSpPr/>
+          <p:nvPr/>
+        </p:nvSpPr>
+        <p:spPr>
+          <a:xfrm>
+            <a:off x="3830291" y="1461246"/>
+            <a:ext cx="4370052" cy="4285129"/>
+          </a:xfrm>
+          <a:prstGeom prst="ellipse">
+            <a:avLst/>
+          </a:prstGeom>
+          <a:ln>
+            <a:solidFill>
+              <a:schemeClr val="tx1"/>
+            </a:solidFill>
+          </a:ln>
+        </p:spPr>
+        <p:style>
+          <a:lnRef idx="1">
+            <a:schemeClr val="accent5"/>
+          </a:lnRef>
+          <a:fillRef idx="2">
+            <a:schemeClr val="accent5"/>
+          </a:fillRef>
+          <a:effectRef idx="1">
+            <a:schemeClr val="accent5"/>
+          </a:effectRef>
+          <a:fontRef idx="minor">
+            <a:schemeClr val="dk1"/>
+          </a:fontRef>
+        </p:style>
+        <p:txBody>
+          <a:bodyPr rtlCol="0" anchor="ctr"/>
+          <a:lstStyle/>
+          <a:p>
+            <a:pPr algn="ctr"/>
+            <a:endParaRPr lang="en-IN"/>
+          </a:p>
+        </p:txBody>
+      </p:sp>
+      <p:sp>
+        <p:nvSpPr>
+          <p:cNvPr id="20" name="Oval 19">
+            <a:extLst>
+              <a:ext uri="{FF2B5EF4-FFF2-40B4-BE49-F238E27FC236}">
+                <a16:creationId xmlns:a16="http://schemas.microsoft.com/office/drawing/2014/main" id="{D1DD685F-4126-4D39-AE4E-81CDF3F730A4}"/>
+              </a:ext>
+            </a:extLst>
+          </p:cNvPr>
+          <p:cNvSpPr/>
+          <p:nvPr/>
+        </p:nvSpPr>
+        <p:spPr>
+          <a:xfrm>
+            <a:off x="4480560" y="2072640"/>
+            <a:ext cx="3078480" cy="3102864"/>
+          </a:xfrm>
+          <a:prstGeom prst="ellipse">
+            <a:avLst/>
+          </a:prstGeom>
+          <a:ln>
+            <a:solidFill>
+              <a:schemeClr val="tx1"/>
+            </a:solidFill>
+          </a:ln>
+        </p:spPr>
+        <p:style>
+          <a:lnRef idx="1">
+            <a:schemeClr val="accent5"/>
+          </a:lnRef>
+          <a:fillRef idx="2">
+            <a:schemeClr val="accent5"/>
+          </a:fillRef>
+          <a:effectRef idx="1">
+            <a:schemeClr val="accent5"/>
+          </a:effectRef>
+          <a:fontRef idx="minor">
+            <a:schemeClr val="dk1"/>
+          </a:fontRef>
+        </p:style>
+        <p:txBody>
+          <a:bodyPr rtlCol="0" anchor="ctr"/>
+          <a:lstStyle/>
+          <a:p>
+            <a:pPr algn="ctr"/>
+            <a:endParaRPr lang="en-IN"/>
+          </a:p>
+        </p:txBody>
+      </p:sp>
+      <p:sp>
+        <p:nvSpPr>
+          <p:cNvPr id="17" name="TextBox 16">
+            <a:extLst>
+              <a:ext uri="{FF2B5EF4-FFF2-40B4-BE49-F238E27FC236}">
+                <a16:creationId xmlns:a16="http://schemas.microsoft.com/office/drawing/2014/main" id="{6EDCD23F-AF8B-4320-890A-C8B0B233380D}"/>
+              </a:ext>
+            </a:extLst>
+          </p:cNvPr>
+          <p:cNvSpPr txBox="1"/>
+          <p:nvPr/>
+        </p:nvSpPr>
+        <p:spPr>
+          <a:xfrm>
+            <a:off x="5842626" y="651156"/>
+            <a:ext cx="363312" cy="523220"/>
+          </a:xfrm>
+          <a:prstGeom prst="rect">
+            <a:avLst/>
+          </a:prstGeom>
+          <a:noFill/>
+        </p:spPr>
+        <p:txBody>
+          <a:bodyPr wrap="square" rtlCol="0">
+            <a:spAutoFit/>
+          </a:bodyPr>
+          <a:lstStyle/>
+          <a:p>
+            <a:pPr algn="ctr"/>
+            <a:r>
+              <a:rPr lang="en-US" sz="2800" b="1"/>
+              <a:t>y</a:t>
+            </a:r>
+            <a:endParaRPr lang="en-IN" sz="2800" b="1"/>
+          </a:p>
+        </p:txBody>
+      </p:sp>
+      <p:sp>
+        <p:nvSpPr>
+          <p:cNvPr id="18" name="TextBox 17">
+            <a:extLst>
+              <a:ext uri="{FF2B5EF4-FFF2-40B4-BE49-F238E27FC236}">
+                <a16:creationId xmlns:a16="http://schemas.microsoft.com/office/drawing/2014/main" id="{DDB9AA4B-961C-4EA3-8C42-60F19530213D}"/>
+              </a:ext>
+            </a:extLst>
+          </p:cNvPr>
+          <p:cNvSpPr txBox="1"/>
+          <p:nvPr/>
+        </p:nvSpPr>
+        <p:spPr>
+          <a:xfrm>
+            <a:off x="8846430" y="3296644"/>
+            <a:ext cx="363312" cy="523220"/>
+          </a:xfrm>
+          <a:prstGeom prst="rect">
+            <a:avLst/>
+          </a:prstGeom>
+          <a:noFill/>
+        </p:spPr>
+        <p:txBody>
+          <a:bodyPr wrap="square" rtlCol="0">
+            <a:spAutoFit/>
+          </a:bodyPr>
+          <a:lstStyle/>
+          <a:p>
+            <a:pPr algn="ctr"/>
+            <a:r>
+              <a:rPr lang="en-US" sz="2800" b="1"/>
+              <a:t>x</a:t>
+            </a:r>
+            <a:endParaRPr lang="en-IN" sz="2800" b="1"/>
+          </a:p>
+        </p:txBody>
+      </p:sp>
+      <p:sp>
+        <p:nvSpPr>
+          <p:cNvPr id="3" name="Oval 2">
+            <a:extLst>
+              <a:ext uri="{FF2B5EF4-FFF2-40B4-BE49-F238E27FC236}">
+                <a16:creationId xmlns:a16="http://schemas.microsoft.com/office/drawing/2014/main" id="{CB70273E-68CA-42F3-9D7D-AD0392F09BBB}"/>
+              </a:ext>
+            </a:extLst>
+          </p:cNvPr>
+          <p:cNvSpPr/>
+          <p:nvPr/>
+        </p:nvSpPr>
+        <p:spPr>
+          <a:xfrm>
+            <a:off x="4670611" y="2259104"/>
+            <a:ext cx="2707342" cy="2707341"/>
+          </a:xfrm>
+          <a:prstGeom prst="ellipse">
+            <a:avLst/>
+          </a:prstGeom>
+          <a:ln>
+            <a:solidFill>
+              <a:schemeClr val="tx1"/>
+            </a:solidFill>
+          </a:ln>
+        </p:spPr>
+        <p:style>
+          <a:lnRef idx="1">
+            <a:schemeClr val="accent5"/>
+          </a:lnRef>
+          <a:fillRef idx="2">
+            <a:schemeClr val="accent5"/>
+          </a:fillRef>
+          <a:effectRef idx="1">
+            <a:schemeClr val="accent5"/>
+          </a:effectRef>
+          <a:fontRef idx="minor">
+            <a:schemeClr val="dk1"/>
+          </a:fontRef>
+        </p:style>
+        <p:txBody>
+          <a:bodyPr rtlCol="0" anchor="ctr"/>
+          <a:lstStyle/>
+          <a:p>
+            <a:pPr algn="ctr"/>
+            <a:endParaRPr lang="en-IN"/>
+          </a:p>
+        </p:txBody>
+      </p:sp>
+      <p:cxnSp>
+        <p:nvCxnSpPr>
+          <p:cNvPr id="15" name="Straight Connector 14">
+            <a:extLst>
+              <a:ext uri="{FF2B5EF4-FFF2-40B4-BE49-F238E27FC236}">
+                <a16:creationId xmlns:a16="http://schemas.microsoft.com/office/drawing/2014/main" id="{979288ED-2B0C-413F-B19E-2486B6E7BAB7}"/>
+              </a:ext>
+            </a:extLst>
+          </p:cNvPr>
+          <p:cNvCxnSpPr/>
+          <p:nvPr/>
+        </p:nvCxnSpPr>
+        <p:spPr>
+          <a:xfrm>
+            <a:off x="6024282" y="1174376"/>
+            <a:ext cx="71718" cy="4876800"/>
+          </a:xfrm>
+          <a:prstGeom prst="line">
+            <a:avLst/>
+          </a:prstGeom>
+          <a:ln w="38100">
+            <a:prstDash val="dashDot"/>
+          </a:ln>
+        </p:spPr>
+        <p:style>
+          <a:lnRef idx="1">
+            <a:schemeClr val="dk1"/>
+          </a:lnRef>
+          <a:fillRef idx="0">
+            <a:schemeClr val="dk1"/>
+          </a:fillRef>
+          <a:effectRef idx="0">
+            <a:schemeClr val="dk1"/>
+          </a:effectRef>
+          <a:fontRef idx="minor">
+            <a:schemeClr val="tx1"/>
+          </a:fontRef>
+        </p:style>
+      </p:cxnSp>
+      <p:cxnSp>
+        <p:nvCxnSpPr>
+          <p:cNvPr id="16" name="Straight Connector 15">
+            <a:extLst>
+              <a:ext uri="{FF2B5EF4-FFF2-40B4-BE49-F238E27FC236}">
+                <a16:creationId xmlns:a16="http://schemas.microsoft.com/office/drawing/2014/main" id="{6A7689AA-8029-4A91-AC03-9C8AA0C5C267}"/>
+              </a:ext>
+            </a:extLst>
+          </p:cNvPr>
+          <p:cNvCxnSpPr>
+            <a:cxnSpLocks/>
+          </p:cNvCxnSpPr>
+          <p:nvPr/>
+        </p:nvCxnSpPr>
+        <p:spPr>
+          <a:xfrm flipH="1">
+            <a:off x="3361765" y="3612776"/>
+            <a:ext cx="5531223" cy="0"/>
+          </a:xfrm>
+          <a:prstGeom prst="line">
+            <a:avLst/>
+          </a:prstGeom>
+          <a:ln w="38100">
+            <a:prstDash val="dashDot"/>
+          </a:ln>
+        </p:spPr>
+        <p:style>
+          <a:lnRef idx="1">
+            <a:schemeClr val="dk1"/>
+          </a:lnRef>
+          <a:fillRef idx="0">
+            <a:schemeClr val="dk1"/>
+          </a:fillRef>
+          <a:effectRef idx="0">
+            <a:schemeClr val="dk1"/>
+          </a:effectRef>
+          <a:fontRef idx="minor">
+            <a:schemeClr val="tx1"/>
+          </a:fontRef>
+        </p:style>
+      </p:cxnSp>
+      <p:cxnSp>
+        <p:nvCxnSpPr>
+          <p:cNvPr id="5" name="Straight Arrow Connector 4">
+            <a:extLst>
+              <a:ext uri="{FF2B5EF4-FFF2-40B4-BE49-F238E27FC236}">
+                <a16:creationId xmlns:a16="http://schemas.microsoft.com/office/drawing/2014/main" id="{7BA6FF05-8FDF-4D9E-966B-B409ECB8E7D8}"/>
+              </a:ext>
+            </a:extLst>
+          </p:cNvPr>
+          <p:cNvCxnSpPr>
+            <a:endCxn id="3" idx="7"/>
+          </p:cNvCxnSpPr>
+          <p:nvPr/>
+        </p:nvCxnSpPr>
+        <p:spPr>
+          <a:xfrm flipV="1">
+            <a:off x="6096000" y="2655585"/>
+            <a:ext cx="885472" cy="957191"/>
+          </a:xfrm>
+          <a:prstGeom prst="straightConnector1">
+            <a:avLst/>
+          </a:prstGeom>
+          <a:ln w="38100">
+            <a:tailEnd type="triangle"/>
+          </a:ln>
+        </p:spPr>
+        <p:style>
+          <a:lnRef idx="1">
+            <a:schemeClr val="dk1"/>
+          </a:lnRef>
+          <a:fillRef idx="0">
+            <a:schemeClr val="dk1"/>
+          </a:fillRef>
+          <a:effectRef idx="0">
+            <a:schemeClr val="dk1"/>
+          </a:effectRef>
+          <a:fontRef idx="minor">
+            <a:schemeClr val="tx1"/>
+          </a:fontRef>
+        </p:style>
+      </p:cxnSp>
+      <p:sp>
+        <p:nvSpPr>
+          <p:cNvPr id="23" name="TextBox 22">
+            <a:extLst>
+              <a:ext uri="{FF2B5EF4-FFF2-40B4-BE49-F238E27FC236}">
+                <a16:creationId xmlns:a16="http://schemas.microsoft.com/office/drawing/2014/main" id="{20FA3858-D1F0-4E51-B82F-E7C54D18BA51}"/>
+              </a:ext>
+            </a:extLst>
+          </p:cNvPr>
+          <p:cNvSpPr txBox="1"/>
+          <p:nvPr/>
+        </p:nvSpPr>
+        <p:spPr>
+          <a:xfrm>
+            <a:off x="6538736" y="2946121"/>
+            <a:ext cx="363312" cy="523220"/>
+          </a:xfrm>
+          <a:prstGeom prst="rect">
+            <a:avLst/>
+          </a:prstGeom>
+          <a:noFill/>
+        </p:spPr>
+        <p:txBody>
+          <a:bodyPr wrap="square" rtlCol="0">
+            <a:spAutoFit/>
+          </a:bodyPr>
+          <a:lstStyle/>
+          <a:p>
+            <a:pPr algn="ctr"/>
+            <a:r>
+              <a:rPr lang="en-US" sz="2800" b="1"/>
+              <a:t>ρ</a:t>
+            </a:r>
+            <a:endParaRPr lang="en-IN" sz="2800" b="1"/>
+          </a:p>
+        </p:txBody>
+      </p:sp>
+      <p:cxnSp>
+        <p:nvCxnSpPr>
+          <p:cNvPr id="25" name="Straight Arrow Connector 24">
+            <a:extLst>
+              <a:ext uri="{FF2B5EF4-FFF2-40B4-BE49-F238E27FC236}">
+                <a16:creationId xmlns:a16="http://schemas.microsoft.com/office/drawing/2014/main" id="{5C94FE43-DDBE-4913-926F-5334EAFD62D1}"/>
+              </a:ext>
+            </a:extLst>
+          </p:cNvPr>
+          <p:cNvCxnSpPr>
+            <a:cxnSpLocks/>
+          </p:cNvCxnSpPr>
+          <p:nvPr/>
+        </p:nvCxnSpPr>
+        <p:spPr>
+          <a:xfrm flipH="1" flipV="1">
+            <a:off x="5003978" y="2471810"/>
+            <a:ext cx="1092022" cy="1152262"/>
+          </a:xfrm>
+          <a:prstGeom prst="straightConnector1">
+            <a:avLst/>
+          </a:prstGeom>
+          <a:ln w="38100">
+            <a:tailEnd type="triangle"/>
+          </a:ln>
+        </p:spPr>
+        <p:style>
+          <a:lnRef idx="1">
+            <a:schemeClr val="dk1"/>
+          </a:lnRef>
+          <a:fillRef idx="0">
+            <a:schemeClr val="dk1"/>
+          </a:fillRef>
+          <a:effectRef idx="0">
+            <a:schemeClr val="dk1"/>
+          </a:effectRef>
+          <a:fontRef idx="minor">
+            <a:schemeClr val="tx1"/>
+          </a:fontRef>
+        </p:style>
+      </p:cxnSp>
+      <p:sp>
+        <p:nvSpPr>
+          <p:cNvPr id="26" name="TextBox 25">
+            <a:extLst>
+              <a:ext uri="{FF2B5EF4-FFF2-40B4-BE49-F238E27FC236}">
+                <a16:creationId xmlns:a16="http://schemas.microsoft.com/office/drawing/2014/main" id="{A6478EFD-C0E8-498C-87FC-BFC29D20AC3F}"/>
+              </a:ext>
+            </a:extLst>
+          </p:cNvPr>
+          <p:cNvSpPr txBox="1"/>
+          <p:nvPr/>
+        </p:nvSpPr>
+        <p:spPr>
+          <a:xfrm rot="2932917">
+            <a:off x="4822611" y="2872569"/>
+            <a:ext cx="1201271" cy="523220"/>
+          </a:xfrm>
+          <a:prstGeom prst="rect">
+            <a:avLst/>
+          </a:prstGeom>
+          <a:noFill/>
+        </p:spPr>
+        <p:txBody>
+          <a:bodyPr wrap="square" rtlCol="0">
+            <a:spAutoFit/>
+          </a:bodyPr>
+          <a:lstStyle/>
+          <a:p>
+            <a:pPr algn="ctr"/>
+            <a:r>
+              <a:rPr lang="en-US" sz="2800" b="1"/>
+              <a:t>ρ+dρ</a:t>
+            </a:r>
+            <a:endParaRPr lang="en-IN" sz="2800" b="1"/>
+          </a:p>
+        </p:txBody>
+      </p:sp>
+      <p:cxnSp>
+        <p:nvCxnSpPr>
+          <p:cNvPr id="28" name="Straight Arrow Connector 27">
+            <a:extLst>
+              <a:ext uri="{FF2B5EF4-FFF2-40B4-BE49-F238E27FC236}">
+                <a16:creationId xmlns:a16="http://schemas.microsoft.com/office/drawing/2014/main" id="{CBB5EBCA-C59A-4F62-9601-ABF11ADDEC83}"/>
+              </a:ext>
+            </a:extLst>
+          </p:cNvPr>
+          <p:cNvCxnSpPr>
+            <a:cxnSpLocks/>
+            <a:endCxn id="2" idx="5"/>
+          </p:cNvCxnSpPr>
+          <p:nvPr/>
+        </p:nvCxnSpPr>
+        <p:spPr>
+          <a:xfrm>
+            <a:off x="6080995" y="3624072"/>
+            <a:ext cx="1479369" cy="1494760"/>
+          </a:xfrm>
+          <a:prstGeom prst="straightConnector1">
+            <a:avLst/>
+          </a:prstGeom>
+          <a:ln w="38100">
+            <a:tailEnd type="triangle"/>
+          </a:ln>
+        </p:spPr>
+        <p:style>
+          <a:lnRef idx="1">
+            <a:schemeClr val="dk1"/>
+          </a:lnRef>
+          <a:fillRef idx="0">
+            <a:schemeClr val="dk1"/>
+          </a:fillRef>
+          <a:effectRef idx="0">
+            <a:schemeClr val="dk1"/>
+          </a:effectRef>
+          <a:fontRef idx="minor">
+            <a:schemeClr val="tx1"/>
+          </a:fontRef>
+        </p:style>
+      </p:cxnSp>
+      <p:sp>
+        <p:nvSpPr>
+          <p:cNvPr id="30" name="TextBox 29">
+            <a:extLst>
+              <a:ext uri="{FF2B5EF4-FFF2-40B4-BE49-F238E27FC236}">
+                <a16:creationId xmlns:a16="http://schemas.microsoft.com/office/drawing/2014/main" id="{F78526B7-B85D-4C83-81CD-B8742F810D0F}"/>
+              </a:ext>
+            </a:extLst>
+          </p:cNvPr>
+          <p:cNvSpPr txBox="1"/>
+          <p:nvPr/>
+        </p:nvSpPr>
+        <p:spPr>
+          <a:xfrm>
+            <a:off x="6286051" y="4028000"/>
+            <a:ext cx="363312" cy="523220"/>
+          </a:xfrm>
+          <a:prstGeom prst="rect">
+            <a:avLst/>
+          </a:prstGeom>
+          <a:noFill/>
+        </p:spPr>
+        <p:txBody>
+          <a:bodyPr wrap="square" rtlCol="0">
+            <a:spAutoFit/>
+          </a:bodyPr>
+          <a:lstStyle/>
+          <a:p>
+            <a:pPr algn="r"/>
+            <a:r>
+              <a:rPr lang="en-US" sz="2800" b="1"/>
+              <a:t>R</a:t>
+            </a:r>
+            <a:endParaRPr lang="en-IN" sz="2800" b="1"/>
+          </a:p>
+        </p:txBody>
+      </p:sp>
+    </p:spTree>
+    <p:extLst>
+      <p:ext uri="{BB962C8B-B14F-4D97-AF65-F5344CB8AC3E}">
+        <p14:creationId xmlns:p14="http://schemas.microsoft.com/office/powerpoint/2010/main" val="4171321756"/>
       </p:ext>
     </p:extLst>
   </p:cSld>

</xml_diff>

<commit_message>
Force on a partial section
</commit_message>
<xml_diff>
--- a/STRENGTH OF MATERIALS SHORTNOTES/SOM Revision.pptx
+++ b/STRENGTH OF MATERIALS SHORTNOTES/SOM Revision.pptx
@@ -27,6 +27,9 @@
     <p:sldId id="275" r:id="rId21"/>
     <p:sldId id="276" r:id="rId22"/>
     <p:sldId id="277" r:id="rId23"/>
+    <p:sldId id="278" r:id="rId24"/>
+    <p:sldId id="279" r:id="rId25"/>
+    <p:sldId id="280" r:id="rId26"/>
   </p:sldIdLst>
   <p:sldSz cx="12192000" cy="6858000"/>
   <p:notesSz cx="6858000" cy="9144000"/>
@@ -282,7 +285,7 @@
           <a:p>
             <a:fld id="{EA402788-B3D0-4CAD-96CC-4B452FA47DBC}" type="datetimeFigureOut">
               <a:rPr lang="en-IN" smtClean="0"/>
-              <a:t>31-01-2023</a:t>
+              <a:t>01-02-2023</a:t>
             </a:fld>
             <a:endParaRPr lang="en-IN"/>
           </a:p>
@@ -482,7 +485,7 @@
           <a:p>
             <a:fld id="{EA402788-B3D0-4CAD-96CC-4B452FA47DBC}" type="datetimeFigureOut">
               <a:rPr lang="en-IN" smtClean="0"/>
-              <a:t>31-01-2023</a:t>
+              <a:t>01-02-2023</a:t>
             </a:fld>
             <a:endParaRPr lang="en-IN"/>
           </a:p>
@@ -692,7 +695,7 @@
           <a:p>
             <a:fld id="{EA402788-B3D0-4CAD-96CC-4B452FA47DBC}" type="datetimeFigureOut">
               <a:rPr lang="en-IN" smtClean="0"/>
-              <a:t>31-01-2023</a:t>
+              <a:t>01-02-2023</a:t>
             </a:fld>
             <a:endParaRPr lang="en-IN"/>
           </a:p>
@@ -892,7 +895,7 @@
           <a:p>
             <a:fld id="{EA402788-B3D0-4CAD-96CC-4B452FA47DBC}" type="datetimeFigureOut">
               <a:rPr lang="en-IN" smtClean="0"/>
-              <a:t>31-01-2023</a:t>
+              <a:t>01-02-2023</a:t>
             </a:fld>
             <a:endParaRPr lang="en-IN"/>
           </a:p>
@@ -1168,7 +1171,7 @@
           <a:p>
             <a:fld id="{EA402788-B3D0-4CAD-96CC-4B452FA47DBC}" type="datetimeFigureOut">
               <a:rPr lang="en-IN" smtClean="0"/>
-              <a:t>31-01-2023</a:t>
+              <a:t>01-02-2023</a:t>
             </a:fld>
             <a:endParaRPr lang="en-IN"/>
           </a:p>
@@ -1436,7 +1439,7 @@
           <a:p>
             <a:fld id="{EA402788-B3D0-4CAD-96CC-4B452FA47DBC}" type="datetimeFigureOut">
               <a:rPr lang="en-IN" smtClean="0"/>
-              <a:t>31-01-2023</a:t>
+              <a:t>01-02-2023</a:t>
             </a:fld>
             <a:endParaRPr lang="en-IN"/>
           </a:p>
@@ -1851,7 +1854,7 @@
           <a:p>
             <a:fld id="{EA402788-B3D0-4CAD-96CC-4B452FA47DBC}" type="datetimeFigureOut">
               <a:rPr lang="en-IN" smtClean="0"/>
-              <a:t>31-01-2023</a:t>
+              <a:t>01-02-2023</a:t>
             </a:fld>
             <a:endParaRPr lang="en-IN"/>
           </a:p>
@@ -1993,7 +1996,7 @@
           <a:p>
             <a:fld id="{EA402788-B3D0-4CAD-96CC-4B452FA47DBC}" type="datetimeFigureOut">
               <a:rPr lang="en-IN" smtClean="0"/>
-              <a:t>31-01-2023</a:t>
+              <a:t>01-02-2023</a:t>
             </a:fld>
             <a:endParaRPr lang="en-IN"/>
           </a:p>
@@ -2106,7 +2109,7 @@
           <a:p>
             <a:fld id="{EA402788-B3D0-4CAD-96CC-4B452FA47DBC}" type="datetimeFigureOut">
               <a:rPr lang="en-IN" smtClean="0"/>
-              <a:t>31-01-2023</a:t>
+              <a:t>01-02-2023</a:t>
             </a:fld>
             <a:endParaRPr lang="en-IN"/>
           </a:p>
@@ -2419,7 +2422,7 @@
           <a:p>
             <a:fld id="{EA402788-B3D0-4CAD-96CC-4B452FA47DBC}" type="datetimeFigureOut">
               <a:rPr lang="en-IN" smtClean="0"/>
-              <a:t>31-01-2023</a:t>
+              <a:t>01-02-2023</a:t>
             </a:fld>
             <a:endParaRPr lang="en-IN"/>
           </a:p>
@@ -2708,7 +2711,7 @@
           <a:p>
             <a:fld id="{EA402788-B3D0-4CAD-96CC-4B452FA47DBC}" type="datetimeFigureOut">
               <a:rPr lang="en-IN" smtClean="0"/>
-              <a:t>31-01-2023</a:t>
+              <a:t>01-02-2023</a:t>
             </a:fld>
             <a:endParaRPr lang="en-IN"/>
           </a:p>
@@ -2951,7 +2954,7 @@
           <a:p>
             <a:fld id="{EA402788-B3D0-4CAD-96CC-4B452FA47DBC}" type="datetimeFigureOut">
               <a:rPr lang="en-IN" smtClean="0"/>
-              <a:t>31-01-2023</a:t>
+              <a:t>01-02-2023</a:t>
             </a:fld>
             <a:endParaRPr lang="en-IN"/>
           </a:p>
@@ -21226,6 +21229,4382 @@
 </p:sld>
 </file>
 
+<file path=ppt/slides/slide23.xml><?xml version="1.0" encoding="utf-8"?>
+<p:sld xmlns:a="http://schemas.openxmlformats.org/drawingml/2006/main" xmlns:r="http://schemas.openxmlformats.org/officeDocument/2006/relationships" xmlns:p="http://schemas.openxmlformats.org/presentationml/2006/main">
+  <p:cSld>
+    <p:spTree>
+      <p:nvGrpSpPr>
+        <p:cNvPr id="1" name=""/>
+        <p:cNvGrpSpPr/>
+        <p:nvPr/>
+      </p:nvGrpSpPr>
+      <p:grpSpPr>
+        <a:xfrm>
+          <a:off x="0" y="0"/>
+          <a:ext cx="0" cy="0"/>
+          <a:chOff x="0" y="0"/>
+          <a:chExt cx="0" cy="0"/>
+        </a:xfrm>
+      </p:grpSpPr>
+      <p:sp>
+        <p:nvSpPr>
+          <p:cNvPr id="2" name="Isosceles Triangle 1">
+            <a:extLst>
+              <a:ext uri="{FF2B5EF4-FFF2-40B4-BE49-F238E27FC236}">
+                <a16:creationId xmlns:a16="http://schemas.microsoft.com/office/drawing/2014/main" id="{026FBBBE-9BAF-4BC6-AE89-C128C041E6B5}"/>
+              </a:ext>
+            </a:extLst>
+          </p:cNvPr>
+          <p:cNvSpPr/>
+          <p:nvPr/>
+        </p:nvSpPr>
+        <p:spPr>
+          <a:xfrm>
+            <a:off x="403411" y="1290917"/>
+            <a:ext cx="466165" cy="466165"/>
+          </a:xfrm>
+          <a:prstGeom prst="triangle">
+            <a:avLst/>
+          </a:prstGeom>
+        </p:spPr>
+        <p:style>
+          <a:lnRef idx="2">
+            <a:schemeClr val="dk1">
+              <a:shade val="50000"/>
+            </a:schemeClr>
+          </a:lnRef>
+          <a:fillRef idx="1">
+            <a:schemeClr val="dk1"/>
+          </a:fillRef>
+          <a:effectRef idx="0">
+            <a:schemeClr val="dk1"/>
+          </a:effectRef>
+          <a:fontRef idx="minor">
+            <a:schemeClr val="lt1"/>
+          </a:fontRef>
+        </p:style>
+        <p:txBody>
+          <a:bodyPr rtlCol="0" anchor="ctr"/>
+          <a:lstStyle/>
+          <a:p>
+            <a:pPr algn="ctr"/>
+            <a:endParaRPr lang="en-IN"/>
+          </a:p>
+        </p:txBody>
+      </p:sp>
+      <p:sp>
+        <p:nvSpPr>
+          <p:cNvPr id="15" name="Isosceles Triangle 14">
+            <a:extLst>
+              <a:ext uri="{FF2B5EF4-FFF2-40B4-BE49-F238E27FC236}">
+                <a16:creationId xmlns:a16="http://schemas.microsoft.com/office/drawing/2014/main" id="{F92A007F-F8FE-45BD-B636-981FE094E463}"/>
+              </a:ext>
+            </a:extLst>
+          </p:cNvPr>
+          <p:cNvSpPr/>
+          <p:nvPr/>
+        </p:nvSpPr>
+        <p:spPr>
+          <a:xfrm>
+            <a:off x="4213411" y="1290917"/>
+            <a:ext cx="466165" cy="466165"/>
+          </a:xfrm>
+          <a:prstGeom prst="triangle">
+            <a:avLst/>
+          </a:prstGeom>
+        </p:spPr>
+        <p:style>
+          <a:lnRef idx="2">
+            <a:schemeClr val="dk1">
+              <a:shade val="50000"/>
+            </a:schemeClr>
+          </a:lnRef>
+          <a:fillRef idx="1">
+            <a:schemeClr val="dk1"/>
+          </a:fillRef>
+          <a:effectRef idx="0">
+            <a:schemeClr val="dk1"/>
+          </a:effectRef>
+          <a:fontRef idx="minor">
+            <a:schemeClr val="lt1"/>
+          </a:fontRef>
+        </p:style>
+        <p:txBody>
+          <a:bodyPr rtlCol="0" anchor="ctr"/>
+          <a:lstStyle/>
+          <a:p>
+            <a:pPr algn="ctr"/>
+            <a:endParaRPr lang="en-IN"/>
+          </a:p>
+        </p:txBody>
+      </p:sp>
+      <p:sp>
+        <p:nvSpPr>
+          <p:cNvPr id="3" name="Rectangle 2">
+            <a:extLst>
+              <a:ext uri="{FF2B5EF4-FFF2-40B4-BE49-F238E27FC236}">
+                <a16:creationId xmlns:a16="http://schemas.microsoft.com/office/drawing/2014/main" id="{F138419E-240F-4276-B63B-BED5BCDAFEF5}"/>
+              </a:ext>
+            </a:extLst>
+          </p:cNvPr>
+          <p:cNvSpPr/>
+          <p:nvPr/>
+        </p:nvSpPr>
+        <p:spPr>
+          <a:xfrm>
+            <a:off x="636494" y="1039906"/>
+            <a:ext cx="3810000" cy="251012"/>
+          </a:xfrm>
+          <a:prstGeom prst="rect">
+            <a:avLst/>
+          </a:prstGeom>
+        </p:spPr>
+        <p:style>
+          <a:lnRef idx="2">
+            <a:schemeClr val="accent1">
+              <a:shade val="50000"/>
+            </a:schemeClr>
+          </a:lnRef>
+          <a:fillRef idx="1">
+            <a:schemeClr val="accent1"/>
+          </a:fillRef>
+          <a:effectRef idx="0">
+            <a:schemeClr val="accent1"/>
+          </a:effectRef>
+          <a:fontRef idx="minor">
+            <a:schemeClr val="lt1"/>
+          </a:fontRef>
+        </p:style>
+        <p:txBody>
+          <a:bodyPr rtlCol="0" anchor="ctr"/>
+          <a:lstStyle/>
+          <a:p>
+            <a:pPr algn="ctr"/>
+            <a:endParaRPr lang="en-IN"/>
+          </a:p>
+        </p:txBody>
+      </p:sp>
+      <p:cxnSp>
+        <p:nvCxnSpPr>
+          <p:cNvPr id="18" name="Straight Arrow Connector 17">
+            <a:extLst>
+              <a:ext uri="{FF2B5EF4-FFF2-40B4-BE49-F238E27FC236}">
+                <a16:creationId xmlns:a16="http://schemas.microsoft.com/office/drawing/2014/main" id="{8EB3BD74-B0C8-4219-9F12-3F6D170C9A04}"/>
+              </a:ext>
+            </a:extLst>
+          </p:cNvPr>
+          <p:cNvCxnSpPr>
+            <a:cxnSpLocks/>
+          </p:cNvCxnSpPr>
+          <p:nvPr/>
+        </p:nvCxnSpPr>
+        <p:spPr>
+          <a:xfrm>
+            <a:off x="2541494" y="484094"/>
+            <a:ext cx="0" cy="555812"/>
+          </a:xfrm>
+          <a:prstGeom prst="straightConnector1">
+            <a:avLst/>
+          </a:prstGeom>
+          <a:ln w="38100">
+            <a:tailEnd type="triangle"/>
+          </a:ln>
+        </p:spPr>
+        <p:style>
+          <a:lnRef idx="1">
+            <a:schemeClr val="accent2"/>
+          </a:lnRef>
+          <a:fillRef idx="0">
+            <a:schemeClr val="accent2"/>
+          </a:fillRef>
+          <a:effectRef idx="0">
+            <a:schemeClr val="accent2"/>
+          </a:effectRef>
+          <a:fontRef idx="minor">
+            <a:schemeClr val="tx1"/>
+          </a:fontRef>
+        </p:style>
+      </p:cxnSp>
+      <p:sp>
+        <p:nvSpPr>
+          <p:cNvPr id="21" name="Arrow: Chevron 20">
+            <a:extLst>
+              <a:ext uri="{FF2B5EF4-FFF2-40B4-BE49-F238E27FC236}">
+                <a16:creationId xmlns:a16="http://schemas.microsoft.com/office/drawing/2014/main" id="{E8718FEC-6EAC-479A-8BA0-24C561605A5C}"/>
+              </a:ext>
+            </a:extLst>
+          </p:cNvPr>
+          <p:cNvSpPr/>
+          <p:nvPr/>
+        </p:nvSpPr>
+        <p:spPr>
+          <a:xfrm>
+            <a:off x="5396753" y="887506"/>
+            <a:ext cx="448235" cy="475130"/>
+          </a:xfrm>
+          <a:prstGeom prst="chevron">
+            <a:avLst/>
+          </a:prstGeom>
+        </p:spPr>
+        <p:style>
+          <a:lnRef idx="2">
+            <a:schemeClr val="accent6">
+              <a:shade val="50000"/>
+            </a:schemeClr>
+          </a:lnRef>
+          <a:fillRef idx="1">
+            <a:schemeClr val="accent6"/>
+          </a:fillRef>
+          <a:effectRef idx="0">
+            <a:schemeClr val="accent6"/>
+          </a:effectRef>
+          <a:fontRef idx="minor">
+            <a:schemeClr val="lt1"/>
+          </a:fontRef>
+        </p:style>
+        <p:txBody>
+          <a:bodyPr rtlCol="0" anchor="ctr"/>
+          <a:lstStyle/>
+          <a:p>
+            <a:pPr algn="ctr"/>
+            <a:endParaRPr lang="en-IN">
+              <a:solidFill>
+                <a:schemeClr val="tx1"/>
+              </a:solidFill>
+            </a:endParaRPr>
+          </a:p>
+        </p:txBody>
+      </p:sp>
+      <p:sp>
+        <p:nvSpPr>
+          <p:cNvPr id="22" name="Arrow: Chevron 21">
+            <a:extLst>
+              <a:ext uri="{FF2B5EF4-FFF2-40B4-BE49-F238E27FC236}">
+                <a16:creationId xmlns:a16="http://schemas.microsoft.com/office/drawing/2014/main" id="{85722423-A67F-48A7-BE91-98814E359A3C}"/>
+              </a:ext>
+            </a:extLst>
+          </p:cNvPr>
+          <p:cNvSpPr/>
+          <p:nvPr/>
+        </p:nvSpPr>
+        <p:spPr>
+          <a:xfrm>
+            <a:off x="5701553" y="887506"/>
+            <a:ext cx="448235" cy="475130"/>
+          </a:xfrm>
+          <a:prstGeom prst="chevron">
+            <a:avLst/>
+          </a:prstGeom>
+        </p:spPr>
+        <p:style>
+          <a:lnRef idx="2">
+            <a:schemeClr val="accent6">
+              <a:shade val="50000"/>
+            </a:schemeClr>
+          </a:lnRef>
+          <a:fillRef idx="1">
+            <a:schemeClr val="accent6"/>
+          </a:fillRef>
+          <a:effectRef idx="0">
+            <a:schemeClr val="accent6"/>
+          </a:effectRef>
+          <a:fontRef idx="minor">
+            <a:schemeClr val="lt1"/>
+          </a:fontRef>
+        </p:style>
+        <p:txBody>
+          <a:bodyPr rtlCol="0" anchor="ctr"/>
+          <a:lstStyle/>
+          <a:p>
+            <a:pPr algn="ctr"/>
+            <a:endParaRPr lang="en-IN">
+              <a:solidFill>
+                <a:schemeClr val="tx1"/>
+              </a:solidFill>
+            </a:endParaRPr>
+          </a:p>
+        </p:txBody>
+      </p:sp>
+      <p:sp>
+        <p:nvSpPr>
+          <p:cNvPr id="23" name="Arrow: Chevron 22">
+            <a:extLst>
+              <a:ext uri="{FF2B5EF4-FFF2-40B4-BE49-F238E27FC236}">
+                <a16:creationId xmlns:a16="http://schemas.microsoft.com/office/drawing/2014/main" id="{11BDBB02-7F45-40BF-B0FD-73A072026888}"/>
+              </a:ext>
+            </a:extLst>
+          </p:cNvPr>
+          <p:cNvSpPr/>
+          <p:nvPr/>
+        </p:nvSpPr>
+        <p:spPr>
+          <a:xfrm>
+            <a:off x="6006353" y="887506"/>
+            <a:ext cx="448235" cy="475130"/>
+          </a:xfrm>
+          <a:prstGeom prst="chevron">
+            <a:avLst/>
+          </a:prstGeom>
+        </p:spPr>
+        <p:style>
+          <a:lnRef idx="2">
+            <a:schemeClr val="accent6">
+              <a:shade val="50000"/>
+            </a:schemeClr>
+          </a:lnRef>
+          <a:fillRef idx="1">
+            <a:schemeClr val="accent6"/>
+          </a:fillRef>
+          <a:effectRef idx="0">
+            <a:schemeClr val="accent6"/>
+          </a:effectRef>
+          <a:fontRef idx="minor">
+            <a:schemeClr val="lt1"/>
+          </a:fontRef>
+        </p:style>
+        <p:txBody>
+          <a:bodyPr rtlCol="0" anchor="ctr"/>
+          <a:lstStyle/>
+          <a:p>
+            <a:pPr algn="ctr"/>
+            <a:endParaRPr lang="en-IN">
+              <a:solidFill>
+                <a:schemeClr val="tx1"/>
+              </a:solidFill>
+            </a:endParaRPr>
+          </a:p>
+        </p:txBody>
+      </p:sp>
+      <p:sp>
+        <p:nvSpPr>
+          <p:cNvPr id="24" name="Isosceles Triangle 23">
+            <a:extLst>
+              <a:ext uri="{FF2B5EF4-FFF2-40B4-BE49-F238E27FC236}">
+                <a16:creationId xmlns:a16="http://schemas.microsoft.com/office/drawing/2014/main" id="{B2C121CA-FD9E-4695-970A-EB180C8BD6FE}"/>
+              </a:ext>
+            </a:extLst>
+          </p:cNvPr>
+          <p:cNvSpPr/>
+          <p:nvPr/>
+        </p:nvSpPr>
+        <p:spPr>
+          <a:xfrm>
+            <a:off x="7153834" y="1280175"/>
+            <a:ext cx="466165" cy="466165"/>
+          </a:xfrm>
+          <a:prstGeom prst="triangle">
+            <a:avLst/>
+          </a:prstGeom>
+        </p:spPr>
+        <p:style>
+          <a:lnRef idx="2">
+            <a:schemeClr val="dk1">
+              <a:shade val="50000"/>
+            </a:schemeClr>
+          </a:lnRef>
+          <a:fillRef idx="1">
+            <a:schemeClr val="dk1"/>
+          </a:fillRef>
+          <a:effectRef idx="0">
+            <a:schemeClr val="dk1"/>
+          </a:effectRef>
+          <a:fontRef idx="minor">
+            <a:schemeClr val="lt1"/>
+          </a:fontRef>
+        </p:style>
+        <p:txBody>
+          <a:bodyPr rtlCol="0" anchor="ctr"/>
+          <a:lstStyle/>
+          <a:p>
+            <a:pPr algn="ctr"/>
+            <a:endParaRPr lang="en-IN"/>
+          </a:p>
+        </p:txBody>
+      </p:sp>
+      <p:sp>
+        <p:nvSpPr>
+          <p:cNvPr id="25" name="Isosceles Triangle 24">
+            <a:extLst>
+              <a:ext uri="{FF2B5EF4-FFF2-40B4-BE49-F238E27FC236}">
+                <a16:creationId xmlns:a16="http://schemas.microsoft.com/office/drawing/2014/main" id="{3E7846C1-25DF-4054-A57D-89B5AE561577}"/>
+              </a:ext>
+            </a:extLst>
+          </p:cNvPr>
+          <p:cNvSpPr/>
+          <p:nvPr/>
+        </p:nvSpPr>
+        <p:spPr>
+          <a:xfrm>
+            <a:off x="10963834" y="1280175"/>
+            <a:ext cx="466165" cy="466165"/>
+          </a:xfrm>
+          <a:prstGeom prst="triangle">
+            <a:avLst/>
+          </a:prstGeom>
+        </p:spPr>
+        <p:style>
+          <a:lnRef idx="2">
+            <a:schemeClr val="dk1">
+              <a:shade val="50000"/>
+            </a:schemeClr>
+          </a:lnRef>
+          <a:fillRef idx="1">
+            <a:schemeClr val="dk1"/>
+          </a:fillRef>
+          <a:effectRef idx="0">
+            <a:schemeClr val="dk1"/>
+          </a:effectRef>
+          <a:fontRef idx="minor">
+            <a:schemeClr val="lt1"/>
+          </a:fontRef>
+        </p:style>
+        <p:txBody>
+          <a:bodyPr rtlCol="0" anchor="ctr"/>
+          <a:lstStyle/>
+          <a:p>
+            <a:pPr algn="ctr"/>
+            <a:endParaRPr lang="en-IN"/>
+          </a:p>
+        </p:txBody>
+      </p:sp>
+      <p:cxnSp>
+        <p:nvCxnSpPr>
+          <p:cNvPr id="27" name="Straight Arrow Connector 26">
+            <a:extLst>
+              <a:ext uri="{FF2B5EF4-FFF2-40B4-BE49-F238E27FC236}">
+                <a16:creationId xmlns:a16="http://schemas.microsoft.com/office/drawing/2014/main" id="{E0EDF0F1-F6E5-467C-936A-3507BA90FBBC}"/>
+              </a:ext>
+            </a:extLst>
+          </p:cNvPr>
+          <p:cNvCxnSpPr>
+            <a:cxnSpLocks/>
+          </p:cNvCxnSpPr>
+          <p:nvPr/>
+        </p:nvCxnSpPr>
+        <p:spPr>
+          <a:xfrm>
+            <a:off x="9291916" y="957446"/>
+            <a:ext cx="0" cy="555812"/>
+          </a:xfrm>
+          <a:prstGeom prst="straightConnector1">
+            <a:avLst/>
+          </a:prstGeom>
+          <a:ln w="38100">
+            <a:tailEnd type="triangle"/>
+          </a:ln>
+        </p:spPr>
+        <p:style>
+          <a:lnRef idx="1">
+            <a:schemeClr val="accent2"/>
+          </a:lnRef>
+          <a:fillRef idx="0">
+            <a:schemeClr val="accent2"/>
+          </a:fillRef>
+          <a:effectRef idx="0">
+            <a:schemeClr val="accent2"/>
+          </a:effectRef>
+          <a:fontRef idx="minor">
+            <a:schemeClr val="tx1"/>
+          </a:fontRef>
+        </p:style>
+      </p:cxnSp>
+      <p:sp>
+        <p:nvSpPr>
+          <p:cNvPr id="28" name="Arc 27">
+            <a:extLst>
+              <a:ext uri="{FF2B5EF4-FFF2-40B4-BE49-F238E27FC236}">
+                <a16:creationId xmlns:a16="http://schemas.microsoft.com/office/drawing/2014/main" id="{F60C812F-04D7-4811-B07D-783D8A91FBF5}"/>
+              </a:ext>
+            </a:extLst>
+          </p:cNvPr>
+          <p:cNvSpPr/>
+          <p:nvPr/>
+        </p:nvSpPr>
+        <p:spPr>
+          <a:xfrm flipH="1" flipV="1">
+            <a:off x="7301752" y="428528"/>
+            <a:ext cx="3980329" cy="1317812"/>
+          </a:xfrm>
+          <a:prstGeom prst="arc">
+            <a:avLst>
+              <a:gd name="adj1" fmla="val 11152938"/>
+              <a:gd name="adj2" fmla="val 21260736"/>
+            </a:avLst>
+          </a:prstGeom>
+          <a:ln w="28575"/>
+        </p:spPr>
+        <p:style>
+          <a:lnRef idx="1">
+            <a:schemeClr val="accent1"/>
+          </a:lnRef>
+          <a:fillRef idx="0">
+            <a:schemeClr val="accent1"/>
+          </a:fillRef>
+          <a:effectRef idx="0">
+            <a:schemeClr val="accent1"/>
+          </a:effectRef>
+          <a:fontRef idx="minor">
+            <a:schemeClr val="tx1"/>
+          </a:fontRef>
+        </p:style>
+        <p:txBody>
+          <a:bodyPr rtlCol="0" anchor="ctr"/>
+          <a:lstStyle/>
+          <a:p>
+            <a:pPr algn="ctr"/>
+            <a:endParaRPr lang="en-IN"/>
+          </a:p>
+        </p:txBody>
+      </p:sp>
+      <p:sp>
+        <p:nvSpPr>
+          <p:cNvPr id="29" name="Arc 28">
+            <a:extLst>
+              <a:ext uri="{FF2B5EF4-FFF2-40B4-BE49-F238E27FC236}">
+                <a16:creationId xmlns:a16="http://schemas.microsoft.com/office/drawing/2014/main" id="{FB8BC943-AA96-4E07-AFF0-EDA82595ECB1}"/>
+              </a:ext>
+            </a:extLst>
+          </p:cNvPr>
+          <p:cNvSpPr/>
+          <p:nvPr/>
+        </p:nvSpPr>
+        <p:spPr>
+          <a:xfrm flipH="1" flipV="1">
+            <a:off x="7301752" y="195445"/>
+            <a:ext cx="3980329" cy="1317812"/>
+          </a:xfrm>
+          <a:prstGeom prst="arc">
+            <a:avLst>
+              <a:gd name="adj1" fmla="val 11152938"/>
+              <a:gd name="adj2" fmla="val 21260736"/>
+            </a:avLst>
+          </a:prstGeom>
+          <a:ln w="28575"/>
+        </p:spPr>
+        <p:style>
+          <a:lnRef idx="1">
+            <a:schemeClr val="accent1"/>
+          </a:lnRef>
+          <a:fillRef idx="0">
+            <a:schemeClr val="accent1"/>
+          </a:fillRef>
+          <a:effectRef idx="0">
+            <a:schemeClr val="accent1"/>
+          </a:effectRef>
+          <a:fontRef idx="minor">
+            <a:schemeClr val="tx1"/>
+          </a:fontRef>
+        </p:style>
+        <p:txBody>
+          <a:bodyPr rtlCol="0" anchor="ctr"/>
+          <a:lstStyle/>
+          <a:p>
+            <a:pPr algn="ctr"/>
+            <a:endParaRPr lang="en-IN"/>
+          </a:p>
+        </p:txBody>
+      </p:sp>
+      <p:cxnSp>
+        <p:nvCxnSpPr>
+          <p:cNvPr id="31" name="Straight Connector 30">
+            <a:extLst>
+              <a:ext uri="{FF2B5EF4-FFF2-40B4-BE49-F238E27FC236}">
+                <a16:creationId xmlns:a16="http://schemas.microsoft.com/office/drawing/2014/main" id="{43989C61-236D-4F81-832B-8FBC898D4CBE}"/>
+              </a:ext>
+            </a:extLst>
+          </p:cNvPr>
+          <p:cNvCxnSpPr>
+            <a:cxnSpLocks/>
+            <a:stCxn id="29" idx="2"/>
+            <a:endCxn id="28" idx="2"/>
+          </p:cNvCxnSpPr>
+          <p:nvPr/>
+        </p:nvCxnSpPr>
+        <p:spPr>
+          <a:xfrm>
+            <a:off x="7385186" y="1043135"/>
+            <a:ext cx="0" cy="233083"/>
+          </a:xfrm>
+          <a:prstGeom prst="line">
+            <a:avLst/>
+          </a:prstGeom>
+          <a:ln w="28575"/>
+        </p:spPr>
+        <p:style>
+          <a:lnRef idx="1">
+            <a:schemeClr val="accent1"/>
+          </a:lnRef>
+          <a:fillRef idx="0">
+            <a:schemeClr val="accent1"/>
+          </a:fillRef>
+          <a:effectRef idx="0">
+            <a:schemeClr val="accent1"/>
+          </a:effectRef>
+          <a:fontRef idx="minor">
+            <a:schemeClr val="tx1"/>
+          </a:fontRef>
+        </p:style>
+      </p:cxnSp>
+      <p:cxnSp>
+        <p:nvCxnSpPr>
+          <p:cNvPr id="32" name="Straight Connector 31">
+            <a:extLst>
+              <a:ext uri="{FF2B5EF4-FFF2-40B4-BE49-F238E27FC236}">
+                <a16:creationId xmlns:a16="http://schemas.microsoft.com/office/drawing/2014/main" id="{A500CE36-6F7E-4428-8406-3C9D269617E4}"/>
+              </a:ext>
+            </a:extLst>
+          </p:cNvPr>
+          <p:cNvCxnSpPr/>
+          <p:nvPr/>
+        </p:nvCxnSpPr>
+        <p:spPr>
+          <a:xfrm>
+            <a:off x="11196916" y="1043135"/>
+            <a:ext cx="0" cy="233083"/>
+          </a:xfrm>
+          <a:prstGeom prst="line">
+            <a:avLst/>
+          </a:prstGeom>
+          <a:ln w="28575"/>
+        </p:spPr>
+        <p:style>
+          <a:lnRef idx="1">
+            <a:schemeClr val="accent1"/>
+          </a:lnRef>
+          <a:fillRef idx="0">
+            <a:schemeClr val="accent1"/>
+          </a:fillRef>
+          <a:effectRef idx="0">
+            <a:schemeClr val="accent1"/>
+          </a:effectRef>
+          <a:fontRef idx="minor">
+            <a:schemeClr val="tx1"/>
+          </a:fontRef>
+        </p:style>
+      </p:cxnSp>
+      <p:sp>
+        <p:nvSpPr>
+          <p:cNvPr id="33" name="TextBox 32">
+            <a:extLst>
+              <a:ext uri="{FF2B5EF4-FFF2-40B4-BE49-F238E27FC236}">
+                <a16:creationId xmlns:a16="http://schemas.microsoft.com/office/drawing/2014/main" id="{E16A1849-870B-411E-B429-AD7A2C4757B6}"/>
+              </a:ext>
+            </a:extLst>
+          </p:cNvPr>
+          <p:cNvSpPr txBox="1"/>
+          <p:nvPr/>
+        </p:nvSpPr>
+        <p:spPr>
+          <a:xfrm>
+            <a:off x="1609163" y="1513257"/>
+            <a:ext cx="1864659" cy="369332"/>
+          </a:xfrm>
+          <a:prstGeom prst="rect">
+            <a:avLst/>
+          </a:prstGeom>
+          <a:noFill/>
+        </p:spPr>
+        <p:txBody>
+          <a:bodyPr wrap="square" rtlCol="0">
+            <a:spAutoFit/>
+          </a:bodyPr>
+          <a:lstStyle/>
+          <a:p>
+            <a:pPr algn="ctr"/>
+            <a:r>
+              <a:rPr lang="en-IN"/>
+              <a:t>Before Bending</a:t>
+            </a:r>
+          </a:p>
+        </p:txBody>
+      </p:sp>
+      <p:sp>
+        <p:nvSpPr>
+          <p:cNvPr id="34" name="TextBox 33">
+            <a:extLst>
+              <a:ext uri="{FF2B5EF4-FFF2-40B4-BE49-F238E27FC236}">
+                <a16:creationId xmlns:a16="http://schemas.microsoft.com/office/drawing/2014/main" id="{AD548B9E-7F8A-4E6D-9C93-1EBB4FA0FEBE}"/>
+              </a:ext>
+            </a:extLst>
+          </p:cNvPr>
+          <p:cNvSpPr txBox="1"/>
+          <p:nvPr/>
+        </p:nvSpPr>
+        <p:spPr>
+          <a:xfrm>
+            <a:off x="8359586" y="1857509"/>
+            <a:ext cx="1864659" cy="369332"/>
+          </a:xfrm>
+          <a:prstGeom prst="rect">
+            <a:avLst/>
+          </a:prstGeom>
+          <a:noFill/>
+        </p:spPr>
+        <p:txBody>
+          <a:bodyPr wrap="square" rtlCol="0">
+            <a:spAutoFit/>
+          </a:bodyPr>
+          <a:lstStyle/>
+          <a:p>
+            <a:pPr algn="ctr"/>
+            <a:r>
+              <a:rPr lang="en-IN"/>
+              <a:t>After Bending</a:t>
+            </a:r>
+          </a:p>
+        </p:txBody>
+      </p:sp>
+      <p:sp>
+        <p:nvSpPr>
+          <p:cNvPr id="35" name="Rectangle 34">
+            <a:extLst>
+              <a:ext uri="{FF2B5EF4-FFF2-40B4-BE49-F238E27FC236}">
+                <a16:creationId xmlns:a16="http://schemas.microsoft.com/office/drawing/2014/main" id="{AEC1BA2B-ADA0-4D65-87EF-20507DC9D4A0}"/>
+              </a:ext>
+            </a:extLst>
+          </p:cNvPr>
+          <p:cNvSpPr/>
+          <p:nvPr/>
+        </p:nvSpPr>
+        <p:spPr>
+          <a:xfrm>
+            <a:off x="2061882" y="2743200"/>
+            <a:ext cx="1264024" cy="1479176"/>
+          </a:xfrm>
+          <a:prstGeom prst="rect">
+            <a:avLst/>
+          </a:prstGeom>
+        </p:spPr>
+        <p:style>
+          <a:lnRef idx="2">
+            <a:schemeClr val="accent1">
+              <a:shade val="50000"/>
+            </a:schemeClr>
+          </a:lnRef>
+          <a:fillRef idx="1">
+            <a:schemeClr val="accent1"/>
+          </a:fillRef>
+          <a:effectRef idx="0">
+            <a:schemeClr val="accent1"/>
+          </a:effectRef>
+          <a:fontRef idx="minor">
+            <a:schemeClr val="lt1"/>
+          </a:fontRef>
+        </p:style>
+        <p:txBody>
+          <a:bodyPr rtlCol="0" anchor="ctr"/>
+          <a:lstStyle/>
+          <a:p>
+            <a:pPr algn="ctr"/>
+            <a:endParaRPr lang="en-IN"/>
+          </a:p>
+        </p:txBody>
+      </p:sp>
+      <p:sp>
+        <p:nvSpPr>
+          <p:cNvPr id="36" name="TextBox 35">
+            <a:extLst>
+              <a:ext uri="{FF2B5EF4-FFF2-40B4-BE49-F238E27FC236}">
+                <a16:creationId xmlns:a16="http://schemas.microsoft.com/office/drawing/2014/main" id="{12DC242A-905A-4381-97A9-6ACDC287354A}"/>
+              </a:ext>
+            </a:extLst>
+          </p:cNvPr>
+          <p:cNvSpPr txBox="1"/>
+          <p:nvPr/>
+        </p:nvSpPr>
+        <p:spPr>
+          <a:xfrm>
+            <a:off x="1725703" y="4292316"/>
+            <a:ext cx="1864659" cy="646331"/>
+          </a:xfrm>
+          <a:prstGeom prst="rect">
+            <a:avLst/>
+          </a:prstGeom>
+          <a:noFill/>
+        </p:spPr>
+        <p:txBody>
+          <a:bodyPr wrap="square" rtlCol="0">
+            <a:spAutoFit/>
+          </a:bodyPr>
+          <a:lstStyle/>
+          <a:p>
+            <a:pPr algn="ctr"/>
+            <a:r>
+              <a:rPr lang="en-IN"/>
+              <a:t>Cross section </a:t>
+            </a:r>
+            <a:br>
+              <a:rPr lang="en-IN"/>
+            </a:br>
+            <a:r>
+              <a:rPr lang="en-IN"/>
+              <a:t>before bending</a:t>
+            </a:r>
+          </a:p>
+        </p:txBody>
+      </p:sp>
+      <p:sp>
+        <p:nvSpPr>
+          <p:cNvPr id="37" name="Arrow: Chevron 36">
+            <a:extLst>
+              <a:ext uri="{FF2B5EF4-FFF2-40B4-BE49-F238E27FC236}">
+                <a16:creationId xmlns:a16="http://schemas.microsoft.com/office/drawing/2014/main" id="{4CBE199A-65A3-4E49-875F-061C5D29F951}"/>
+              </a:ext>
+            </a:extLst>
+          </p:cNvPr>
+          <p:cNvSpPr/>
+          <p:nvPr/>
+        </p:nvSpPr>
+        <p:spPr>
+          <a:xfrm>
+            <a:off x="5396753" y="3343835"/>
+            <a:ext cx="448235" cy="475130"/>
+          </a:xfrm>
+          <a:prstGeom prst="chevron">
+            <a:avLst/>
+          </a:prstGeom>
+        </p:spPr>
+        <p:style>
+          <a:lnRef idx="2">
+            <a:schemeClr val="accent6">
+              <a:shade val="50000"/>
+            </a:schemeClr>
+          </a:lnRef>
+          <a:fillRef idx="1">
+            <a:schemeClr val="accent6"/>
+          </a:fillRef>
+          <a:effectRef idx="0">
+            <a:schemeClr val="accent6"/>
+          </a:effectRef>
+          <a:fontRef idx="minor">
+            <a:schemeClr val="lt1"/>
+          </a:fontRef>
+        </p:style>
+        <p:txBody>
+          <a:bodyPr rtlCol="0" anchor="ctr"/>
+          <a:lstStyle/>
+          <a:p>
+            <a:pPr algn="ctr"/>
+            <a:endParaRPr lang="en-IN">
+              <a:solidFill>
+                <a:schemeClr val="tx1"/>
+              </a:solidFill>
+            </a:endParaRPr>
+          </a:p>
+        </p:txBody>
+      </p:sp>
+      <p:sp>
+        <p:nvSpPr>
+          <p:cNvPr id="38" name="Arrow: Chevron 37">
+            <a:extLst>
+              <a:ext uri="{FF2B5EF4-FFF2-40B4-BE49-F238E27FC236}">
+                <a16:creationId xmlns:a16="http://schemas.microsoft.com/office/drawing/2014/main" id="{D6DBED29-6A2B-4E2E-A71E-AC69664EBA63}"/>
+              </a:ext>
+            </a:extLst>
+          </p:cNvPr>
+          <p:cNvSpPr/>
+          <p:nvPr/>
+        </p:nvSpPr>
+        <p:spPr>
+          <a:xfrm>
+            <a:off x="5701553" y="3343835"/>
+            <a:ext cx="448235" cy="475130"/>
+          </a:xfrm>
+          <a:prstGeom prst="chevron">
+            <a:avLst/>
+          </a:prstGeom>
+        </p:spPr>
+        <p:style>
+          <a:lnRef idx="2">
+            <a:schemeClr val="accent6">
+              <a:shade val="50000"/>
+            </a:schemeClr>
+          </a:lnRef>
+          <a:fillRef idx="1">
+            <a:schemeClr val="accent6"/>
+          </a:fillRef>
+          <a:effectRef idx="0">
+            <a:schemeClr val="accent6"/>
+          </a:effectRef>
+          <a:fontRef idx="minor">
+            <a:schemeClr val="lt1"/>
+          </a:fontRef>
+        </p:style>
+        <p:txBody>
+          <a:bodyPr rtlCol="0" anchor="ctr"/>
+          <a:lstStyle/>
+          <a:p>
+            <a:pPr algn="ctr"/>
+            <a:endParaRPr lang="en-IN">
+              <a:solidFill>
+                <a:schemeClr val="tx1"/>
+              </a:solidFill>
+            </a:endParaRPr>
+          </a:p>
+        </p:txBody>
+      </p:sp>
+      <p:sp>
+        <p:nvSpPr>
+          <p:cNvPr id="39" name="Arrow: Chevron 38">
+            <a:extLst>
+              <a:ext uri="{FF2B5EF4-FFF2-40B4-BE49-F238E27FC236}">
+                <a16:creationId xmlns:a16="http://schemas.microsoft.com/office/drawing/2014/main" id="{6A75C692-726C-4A7A-B739-DEABA795D7E5}"/>
+              </a:ext>
+            </a:extLst>
+          </p:cNvPr>
+          <p:cNvSpPr/>
+          <p:nvPr/>
+        </p:nvSpPr>
+        <p:spPr>
+          <a:xfrm>
+            <a:off x="6006353" y="3343835"/>
+            <a:ext cx="448235" cy="475130"/>
+          </a:xfrm>
+          <a:prstGeom prst="chevron">
+            <a:avLst/>
+          </a:prstGeom>
+        </p:spPr>
+        <p:style>
+          <a:lnRef idx="2">
+            <a:schemeClr val="accent6">
+              <a:shade val="50000"/>
+            </a:schemeClr>
+          </a:lnRef>
+          <a:fillRef idx="1">
+            <a:schemeClr val="accent6"/>
+          </a:fillRef>
+          <a:effectRef idx="0">
+            <a:schemeClr val="accent6"/>
+          </a:effectRef>
+          <a:fontRef idx="minor">
+            <a:schemeClr val="lt1"/>
+          </a:fontRef>
+        </p:style>
+        <p:txBody>
+          <a:bodyPr rtlCol="0" anchor="ctr"/>
+          <a:lstStyle/>
+          <a:p>
+            <a:pPr algn="ctr"/>
+            <a:endParaRPr lang="en-IN">
+              <a:solidFill>
+                <a:schemeClr val="tx1"/>
+              </a:solidFill>
+            </a:endParaRPr>
+          </a:p>
+        </p:txBody>
+      </p:sp>
+      <p:sp>
+        <p:nvSpPr>
+          <p:cNvPr id="40" name="Trapezoid 39">
+            <a:extLst>
+              <a:ext uri="{FF2B5EF4-FFF2-40B4-BE49-F238E27FC236}">
+                <a16:creationId xmlns:a16="http://schemas.microsoft.com/office/drawing/2014/main" id="{8DB2FB9F-68CE-4265-966C-08CFBA0067EC}"/>
+              </a:ext>
+            </a:extLst>
+          </p:cNvPr>
+          <p:cNvSpPr/>
+          <p:nvPr/>
+        </p:nvSpPr>
+        <p:spPr>
+          <a:xfrm flipV="1">
+            <a:off x="8529921" y="2743200"/>
+            <a:ext cx="1864659" cy="1479175"/>
+          </a:xfrm>
+          <a:prstGeom prst="trapezoid">
+            <a:avLst/>
+          </a:prstGeom>
+        </p:spPr>
+        <p:style>
+          <a:lnRef idx="2">
+            <a:schemeClr val="accent1">
+              <a:shade val="50000"/>
+            </a:schemeClr>
+          </a:lnRef>
+          <a:fillRef idx="1">
+            <a:schemeClr val="accent1"/>
+          </a:fillRef>
+          <a:effectRef idx="0">
+            <a:schemeClr val="accent1"/>
+          </a:effectRef>
+          <a:fontRef idx="minor">
+            <a:schemeClr val="lt1"/>
+          </a:fontRef>
+        </p:style>
+        <p:txBody>
+          <a:bodyPr rtlCol="0" anchor="ctr"/>
+          <a:lstStyle/>
+          <a:p>
+            <a:pPr algn="ctr"/>
+            <a:endParaRPr lang="en-IN"/>
+          </a:p>
+        </p:txBody>
+      </p:sp>
+      <p:sp>
+        <p:nvSpPr>
+          <p:cNvPr id="41" name="TextBox 40">
+            <a:extLst>
+              <a:ext uri="{FF2B5EF4-FFF2-40B4-BE49-F238E27FC236}">
+                <a16:creationId xmlns:a16="http://schemas.microsoft.com/office/drawing/2014/main" id="{7D80AD4E-D968-4227-966D-F463EC57176D}"/>
+              </a:ext>
+            </a:extLst>
+          </p:cNvPr>
+          <p:cNvSpPr txBox="1"/>
+          <p:nvPr/>
+        </p:nvSpPr>
+        <p:spPr>
+          <a:xfrm>
+            <a:off x="8601638" y="4415568"/>
+            <a:ext cx="1864659" cy="646331"/>
+          </a:xfrm>
+          <a:prstGeom prst="rect">
+            <a:avLst/>
+          </a:prstGeom>
+          <a:noFill/>
+        </p:spPr>
+        <p:txBody>
+          <a:bodyPr wrap="square" rtlCol="0">
+            <a:spAutoFit/>
+          </a:bodyPr>
+          <a:lstStyle/>
+          <a:p>
+            <a:pPr algn="ctr"/>
+            <a:r>
+              <a:rPr lang="en-IN"/>
+              <a:t>Cross section </a:t>
+            </a:r>
+            <a:br>
+              <a:rPr lang="en-IN"/>
+            </a:br>
+            <a:r>
+              <a:rPr lang="en-IN"/>
+              <a:t>after bending</a:t>
+            </a:r>
+          </a:p>
+        </p:txBody>
+      </p:sp>
+      <p:cxnSp>
+        <p:nvCxnSpPr>
+          <p:cNvPr id="43" name="Straight Arrow Connector 42">
+            <a:extLst>
+              <a:ext uri="{FF2B5EF4-FFF2-40B4-BE49-F238E27FC236}">
+                <a16:creationId xmlns:a16="http://schemas.microsoft.com/office/drawing/2014/main" id="{E7DB2512-5A68-4576-8E92-D00EB967B0CC}"/>
+              </a:ext>
+            </a:extLst>
+          </p:cNvPr>
+          <p:cNvCxnSpPr/>
+          <p:nvPr/>
+        </p:nvCxnSpPr>
+        <p:spPr>
+          <a:xfrm flipH="1">
+            <a:off x="8359586" y="2563905"/>
+            <a:ext cx="932329" cy="0"/>
+          </a:xfrm>
+          <a:prstGeom prst="straightConnector1">
+            <a:avLst/>
+          </a:prstGeom>
+          <a:ln w="38100">
+            <a:tailEnd type="triangle"/>
+          </a:ln>
+        </p:spPr>
+        <p:style>
+          <a:lnRef idx="1">
+            <a:schemeClr val="dk1"/>
+          </a:lnRef>
+          <a:fillRef idx="0">
+            <a:schemeClr val="dk1"/>
+          </a:fillRef>
+          <a:effectRef idx="0">
+            <a:schemeClr val="dk1"/>
+          </a:effectRef>
+          <a:fontRef idx="minor">
+            <a:schemeClr val="tx1"/>
+          </a:fontRef>
+        </p:style>
+      </p:cxnSp>
+      <p:cxnSp>
+        <p:nvCxnSpPr>
+          <p:cNvPr id="44" name="Straight Arrow Connector 43">
+            <a:extLst>
+              <a:ext uri="{FF2B5EF4-FFF2-40B4-BE49-F238E27FC236}">
+                <a16:creationId xmlns:a16="http://schemas.microsoft.com/office/drawing/2014/main" id="{5AE8126E-C858-48DE-83E1-95622EF9D23D}"/>
+              </a:ext>
+            </a:extLst>
+          </p:cNvPr>
+          <p:cNvCxnSpPr>
+            <a:cxnSpLocks/>
+          </p:cNvCxnSpPr>
+          <p:nvPr/>
+        </p:nvCxnSpPr>
+        <p:spPr>
+          <a:xfrm>
+            <a:off x="9596721" y="2563905"/>
+            <a:ext cx="887501" cy="0"/>
+          </a:xfrm>
+          <a:prstGeom prst="straightConnector1">
+            <a:avLst/>
+          </a:prstGeom>
+          <a:ln w="38100">
+            <a:tailEnd type="triangle"/>
+          </a:ln>
+        </p:spPr>
+        <p:style>
+          <a:lnRef idx="1">
+            <a:schemeClr val="dk1"/>
+          </a:lnRef>
+          <a:fillRef idx="0">
+            <a:schemeClr val="dk1"/>
+          </a:fillRef>
+          <a:effectRef idx="0">
+            <a:schemeClr val="dk1"/>
+          </a:effectRef>
+          <a:fontRef idx="minor">
+            <a:schemeClr val="tx1"/>
+          </a:fontRef>
+        </p:style>
+      </p:cxnSp>
+      <p:cxnSp>
+        <p:nvCxnSpPr>
+          <p:cNvPr id="46" name="Straight Arrow Connector 45">
+            <a:extLst>
+              <a:ext uri="{FF2B5EF4-FFF2-40B4-BE49-F238E27FC236}">
+                <a16:creationId xmlns:a16="http://schemas.microsoft.com/office/drawing/2014/main" id="{B53D5B5A-FAF2-4658-8D19-C75644CA0FBB}"/>
+              </a:ext>
+            </a:extLst>
+          </p:cNvPr>
+          <p:cNvCxnSpPr>
+            <a:cxnSpLocks/>
+          </p:cNvCxnSpPr>
+          <p:nvPr/>
+        </p:nvCxnSpPr>
+        <p:spPr>
+          <a:xfrm>
+            <a:off x="8476128" y="4372998"/>
+            <a:ext cx="986122" cy="0"/>
+          </a:xfrm>
+          <a:prstGeom prst="straightConnector1">
+            <a:avLst/>
+          </a:prstGeom>
+          <a:ln w="38100">
+            <a:tailEnd type="triangle"/>
+          </a:ln>
+        </p:spPr>
+        <p:style>
+          <a:lnRef idx="1">
+            <a:schemeClr val="dk1"/>
+          </a:lnRef>
+          <a:fillRef idx="0">
+            <a:schemeClr val="dk1"/>
+          </a:fillRef>
+          <a:effectRef idx="0">
+            <a:schemeClr val="dk1"/>
+          </a:effectRef>
+          <a:fontRef idx="minor">
+            <a:schemeClr val="tx1"/>
+          </a:fontRef>
+        </p:style>
+      </p:cxnSp>
+      <p:cxnSp>
+        <p:nvCxnSpPr>
+          <p:cNvPr id="48" name="Straight Arrow Connector 47">
+            <a:extLst>
+              <a:ext uri="{FF2B5EF4-FFF2-40B4-BE49-F238E27FC236}">
+                <a16:creationId xmlns:a16="http://schemas.microsoft.com/office/drawing/2014/main" id="{338373C0-7F69-4B12-9076-B2428F6E44DA}"/>
+              </a:ext>
+            </a:extLst>
+          </p:cNvPr>
+          <p:cNvCxnSpPr>
+            <a:cxnSpLocks/>
+          </p:cNvCxnSpPr>
+          <p:nvPr/>
+        </p:nvCxnSpPr>
+        <p:spPr>
+          <a:xfrm flipH="1">
+            <a:off x="9596722" y="4372998"/>
+            <a:ext cx="990596" cy="0"/>
+          </a:xfrm>
+          <a:prstGeom prst="straightConnector1">
+            <a:avLst/>
+          </a:prstGeom>
+          <a:ln w="38100">
+            <a:tailEnd type="triangle"/>
+          </a:ln>
+        </p:spPr>
+        <p:style>
+          <a:lnRef idx="1">
+            <a:schemeClr val="dk1"/>
+          </a:lnRef>
+          <a:fillRef idx="0">
+            <a:schemeClr val="dk1"/>
+          </a:fillRef>
+          <a:effectRef idx="0">
+            <a:schemeClr val="dk1"/>
+          </a:effectRef>
+          <a:fontRef idx="minor">
+            <a:schemeClr val="tx1"/>
+          </a:fontRef>
+        </p:style>
+      </p:cxnSp>
+      <p:sp>
+        <p:nvSpPr>
+          <p:cNvPr id="51" name="TextBox 50">
+            <a:extLst>
+              <a:ext uri="{FF2B5EF4-FFF2-40B4-BE49-F238E27FC236}">
+                <a16:creationId xmlns:a16="http://schemas.microsoft.com/office/drawing/2014/main" id="{D9E0B293-1B5B-4BAA-B3EE-EC9BF20467C1}"/>
+              </a:ext>
+            </a:extLst>
+          </p:cNvPr>
+          <p:cNvSpPr txBox="1"/>
+          <p:nvPr/>
+        </p:nvSpPr>
+        <p:spPr>
+          <a:xfrm>
+            <a:off x="3429000" y="2410578"/>
+            <a:ext cx="1864659" cy="923330"/>
+          </a:xfrm>
+          <a:prstGeom prst="rect">
+            <a:avLst/>
+          </a:prstGeom>
+          <a:noFill/>
+        </p:spPr>
+        <p:txBody>
+          <a:bodyPr wrap="square" rtlCol="0">
+            <a:spAutoFit/>
+          </a:bodyPr>
+          <a:lstStyle/>
+          <a:p>
+            <a:pPr algn="ctr"/>
+            <a:r>
+              <a:rPr lang="en-IN"/>
+              <a:t>Compression side – Top fibres are compressed</a:t>
+            </a:r>
+          </a:p>
+        </p:txBody>
+      </p:sp>
+      <p:sp>
+        <p:nvSpPr>
+          <p:cNvPr id="53" name="Arc 52">
+            <a:extLst>
+              <a:ext uri="{FF2B5EF4-FFF2-40B4-BE49-F238E27FC236}">
+                <a16:creationId xmlns:a16="http://schemas.microsoft.com/office/drawing/2014/main" id="{A0883965-7CD3-4C0A-BD00-3E38ADF9215B}"/>
+              </a:ext>
+            </a:extLst>
+          </p:cNvPr>
+          <p:cNvSpPr/>
+          <p:nvPr/>
+        </p:nvSpPr>
+        <p:spPr>
+          <a:xfrm flipH="1" flipV="1">
+            <a:off x="7301750" y="311987"/>
+            <a:ext cx="3980329" cy="1317812"/>
+          </a:xfrm>
+          <a:prstGeom prst="arc">
+            <a:avLst>
+              <a:gd name="adj1" fmla="val 11066486"/>
+              <a:gd name="adj2" fmla="val 21377554"/>
+            </a:avLst>
+          </a:prstGeom>
+          <a:ln w="38100">
+            <a:prstDash val="sysDot"/>
+          </a:ln>
+        </p:spPr>
+        <p:style>
+          <a:lnRef idx="1">
+            <a:schemeClr val="accent6"/>
+          </a:lnRef>
+          <a:fillRef idx="0">
+            <a:schemeClr val="accent6"/>
+          </a:fillRef>
+          <a:effectRef idx="0">
+            <a:schemeClr val="accent6"/>
+          </a:effectRef>
+          <a:fontRef idx="minor">
+            <a:schemeClr val="tx1"/>
+          </a:fontRef>
+        </p:style>
+        <p:txBody>
+          <a:bodyPr rtlCol="0" anchor="ctr"/>
+          <a:lstStyle/>
+          <a:p>
+            <a:pPr algn="ctr"/>
+            <a:endParaRPr lang="en-IN"/>
+          </a:p>
+        </p:txBody>
+      </p:sp>
+      <p:sp>
+        <p:nvSpPr>
+          <p:cNvPr id="54" name="TextBox 53">
+            <a:extLst>
+              <a:ext uri="{FF2B5EF4-FFF2-40B4-BE49-F238E27FC236}">
+                <a16:creationId xmlns:a16="http://schemas.microsoft.com/office/drawing/2014/main" id="{2C0FAE6D-9285-4D40-B556-7514D0D6623E}"/>
+              </a:ext>
+            </a:extLst>
+          </p:cNvPr>
+          <p:cNvSpPr txBox="1"/>
+          <p:nvPr/>
+        </p:nvSpPr>
+        <p:spPr>
+          <a:xfrm>
+            <a:off x="3429000" y="3700645"/>
+            <a:ext cx="1864659" cy="923330"/>
+          </a:xfrm>
+          <a:prstGeom prst="rect">
+            <a:avLst/>
+          </a:prstGeom>
+          <a:noFill/>
+        </p:spPr>
+        <p:txBody>
+          <a:bodyPr wrap="square" rtlCol="0">
+            <a:spAutoFit/>
+          </a:bodyPr>
+          <a:lstStyle/>
+          <a:p>
+            <a:pPr algn="ctr"/>
+            <a:r>
+              <a:rPr lang="en-IN"/>
+              <a:t>Tension side – Bottom fibres are stretched</a:t>
+            </a:r>
+          </a:p>
+        </p:txBody>
+      </p:sp>
+      <p:cxnSp>
+        <p:nvCxnSpPr>
+          <p:cNvPr id="56" name="Straight Connector 55">
+            <a:extLst>
+              <a:ext uri="{FF2B5EF4-FFF2-40B4-BE49-F238E27FC236}">
+                <a16:creationId xmlns:a16="http://schemas.microsoft.com/office/drawing/2014/main" id="{DA014869-464D-414C-804D-B81DEAC5D38D}"/>
+              </a:ext>
+            </a:extLst>
+          </p:cNvPr>
+          <p:cNvCxnSpPr/>
+          <p:nvPr/>
+        </p:nvCxnSpPr>
+        <p:spPr>
+          <a:xfrm>
+            <a:off x="1725703" y="3482787"/>
+            <a:ext cx="1864659" cy="0"/>
+          </a:xfrm>
+          <a:prstGeom prst="line">
+            <a:avLst/>
+          </a:prstGeom>
+          <a:ln w="38100">
+            <a:prstDash val="sysDash"/>
+          </a:ln>
+        </p:spPr>
+        <p:style>
+          <a:lnRef idx="1">
+            <a:schemeClr val="accent6"/>
+          </a:lnRef>
+          <a:fillRef idx="0">
+            <a:schemeClr val="accent6"/>
+          </a:fillRef>
+          <a:effectRef idx="0">
+            <a:schemeClr val="accent6"/>
+          </a:effectRef>
+          <a:fontRef idx="minor">
+            <a:schemeClr val="tx1"/>
+          </a:fontRef>
+        </p:style>
+      </p:cxnSp>
+      <p:sp>
+        <p:nvSpPr>
+          <p:cNvPr id="57" name="TextBox 56">
+            <a:extLst>
+              <a:ext uri="{FF2B5EF4-FFF2-40B4-BE49-F238E27FC236}">
+                <a16:creationId xmlns:a16="http://schemas.microsoft.com/office/drawing/2014/main" id="{C9C15034-146D-4C2A-A48E-A4234D83AB54}"/>
+              </a:ext>
+            </a:extLst>
+          </p:cNvPr>
+          <p:cNvSpPr txBox="1"/>
+          <p:nvPr/>
+        </p:nvSpPr>
+        <p:spPr>
+          <a:xfrm>
+            <a:off x="152400" y="3271229"/>
+            <a:ext cx="1864659" cy="369332"/>
+          </a:xfrm>
+          <a:prstGeom prst="rect">
+            <a:avLst/>
+          </a:prstGeom>
+          <a:noFill/>
+        </p:spPr>
+        <p:txBody>
+          <a:bodyPr wrap="square" rtlCol="0">
+            <a:spAutoFit/>
+          </a:bodyPr>
+          <a:lstStyle/>
+          <a:p>
+            <a:pPr algn="ctr"/>
+            <a:r>
+              <a:rPr lang="en-IN"/>
+              <a:t>Neutral Axis</a:t>
+            </a:r>
+          </a:p>
+        </p:txBody>
+      </p:sp>
+    </p:spTree>
+    <p:extLst>
+      <p:ext uri="{BB962C8B-B14F-4D97-AF65-F5344CB8AC3E}">
+        <p14:creationId xmlns:p14="http://schemas.microsoft.com/office/powerpoint/2010/main" val="3209470875"/>
+      </p:ext>
+    </p:extLst>
+  </p:cSld>
+  <p:clrMapOvr>
+    <a:masterClrMapping/>
+  </p:clrMapOvr>
+</p:sld>
+</file>
+
+<file path=ppt/slides/slide24.xml><?xml version="1.0" encoding="utf-8"?>
+<p:sld xmlns:a="http://schemas.openxmlformats.org/drawingml/2006/main" xmlns:r="http://schemas.openxmlformats.org/officeDocument/2006/relationships" xmlns:p="http://schemas.openxmlformats.org/presentationml/2006/main">
+  <p:cSld>
+    <p:spTree>
+      <p:nvGrpSpPr>
+        <p:cNvPr id="1" name=""/>
+        <p:cNvGrpSpPr/>
+        <p:nvPr/>
+      </p:nvGrpSpPr>
+      <p:grpSpPr>
+        <a:xfrm>
+          <a:off x="0" y="0"/>
+          <a:ext cx="0" cy="0"/>
+          <a:chOff x="0" y="0"/>
+          <a:chExt cx="0" cy="0"/>
+        </a:xfrm>
+      </p:grpSpPr>
+      <p:sp>
+        <p:nvSpPr>
+          <p:cNvPr id="42" name="Isosceles Triangle 41">
+            <a:extLst>
+              <a:ext uri="{FF2B5EF4-FFF2-40B4-BE49-F238E27FC236}">
+                <a16:creationId xmlns:a16="http://schemas.microsoft.com/office/drawing/2014/main" id="{298C9149-2DC0-4E90-9B3C-E75DA55AF76B}"/>
+              </a:ext>
+            </a:extLst>
+          </p:cNvPr>
+          <p:cNvSpPr/>
+          <p:nvPr/>
+        </p:nvSpPr>
+        <p:spPr>
+          <a:xfrm>
+            <a:off x="2528047" y="3128681"/>
+            <a:ext cx="466165" cy="466165"/>
+          </a:xfrm>
+          <a:prstGeom prst="triangle">
+            <a:avLst/>
+          </a:prstGeom>
+        </p:spPr>
+        <p:style>
+          <a:lnRef idx="2">
+            <a:schemeClr val="dk1">
+              <a:shade val="50000"/>
+            </a:schemeClr>
+          </a:lnRef>
+          <a:fillRef idx="1">
+            <a:schemeClr val="dk1"/>
+          </a:fillRef>
+          <a:effectRef idx="0">
+            <a:schemeClr val="dk1"/>
+          </a:effectRef>
+          <a:fontRef idx="minor">
+            <a:schemeClr val="lt1"/>
+          </a:fontRef>
+        </p:style>
+        <p:txBody>
+          <a:bodyPr rtlCol="0" anchor="ctr"/>
+          <a:lstStyle/>
+          <a:p>
+            <a:pPr algn="ctr"/>
+            <a:endParaRPr lang="en-IN"/>
+          </a:p>
+        </p:txBody>
+      </p:sp>
+      <p:sp>
+        <p:nvSpPr>
+          <p:cNvPr id="45" name="Isosceles Triangle 44">
+            <a:extLst>
+              <a:ext uri="{FF2B5EF4-FFF2-40B4-BE49-F238E27FC236}">
+                <a16:creationId xmlns:a16="http://schemas.microsoft.com/office/drawing/2014/main" id="{7EFDE7C2-9819-4907-A3C5-43B3246A99E2}"/>
+              </a:ext>
+            </a:extLst>
+          </p:cNvPr>
+          <p:cNvSpPr/>
+          <p:nvPr/>
+        </p:nvSpPr>
+        <p:spPr>
+          <a:xfrm>
+            <a:off x="6338047" y="3128681"/>
+            <a:ext cx="466165" cy="466165"/>
+          </a:xfrm>
+          <a:prstGeom prst="triangle">
+            <a:avLst/>
+          </a:prstGeom>
+        </p:spPr>
+        <p:style>
+          <a:lnRef idx="2">
+            <a:schemeClr val="dk1">
+              <a:shade val="50000"/>
+            </a:schemeClr>
+          </a:lnRef>
+          <a:fillRef idx="1">
+            <a:schemeClr val="dk1"/>
+          </a:fillRef>
+          <a:effectRef idx="0">
+            <a:schemeClr val="dk1"/>
+          </a:effectRef>
+          <a:fontRef idx="minor">
+            <a:schemeClr val="lt1"/>
+          </a:fontRef>
+        </p:style>
+        <p:txBody>
+          <a:bodyPr rtlCol="0" anchor="ctr"/>
+          <a:lstStyle/>
+          <a:p>
+            <a:pPr algn="ctr"/>
+            <a:endParaRPr lang="en-IN"/>
+          </a:p>
+        </p:txBody>
+      </p:sp>
+      <p:sp>
+        <p:nvSpPr>
+          <p:cNvPr id="4" name="Circle: Hollow 3">
+            <a:extLst>
+              <a:ext uri="{FF2B5EF4-FFF2-40B4-BE49-F238E27FC236}">
+                <a16:creationId xmlns:a16="http://schemas.microsoft.com/office/drawing/2014/main" id="{4CBC8F64-CC4A-4EF9-93DE-74D39EB8397B}"/>
+              </a:ext>
+            </a:extLst>
+          </p:cNvPr>
+          <p:cNvSpPr/>
+          <p:nvPr/>
+        </p:nvSpPr>
+        <p:spPr>
+          <a:xfrm>
+            <a:off x="2761129" y="1972235"/>
+            <a:ext cx="555812" cy="600635"/>
+          </a:xfrm>
+          <a:prstGeom prst="donut">
+            <a:avLst>
+              <a:gd name="adj" fmla="val 8903"/>
+            </a:avLst>
+          </a:prstGeom>
+        </p:spPr>
+        <p:style>
+          <a:lnRef idx="2">
+            <a:schemeClr val="dk1">
+              <a:shade val="50000"/>
+            </a:schemeClr>
+          </a:lnRef>
+          <a:fillRef idx="1">
+            <a:schemeClr val="dk1"/>
+          </a:fillRef>
+          <a:effectRef idx="0">
+            <a:schemeClr val="dk1"/>
+          </a:effectRef>
+          <a:fontRef idx="minor">
+            <a:schemeClr val="lt1"/>
+          </a:fontRef>
+        </p:style>
+        <p:txBody>
+          <a:bodyPr rtlCol="0" anchor="ctr"/>
+          <a:lstStyle/>
+          <a:p>
+            <a:pPr algn="ctr"/>
+            <a:endParaRPr lang="en-IN">
+              <a:solidFill>
+                <a:schemeClr val="tx1"/>
+              </a:solidFill>
+            </a:endParaRPr>
+          </a:p>
+        </p:txBody>
+      </p:sp>
+      <p:sp>
+        <p:nvSpPr>
+          <p:cNvPr id="49" name="Circle: Hollow 48">
+            <a:extLst>
+              <a:ext uri="{FF2B5EF4-FFF2-40B4-BE49-F238E27FC236}">
+                <a16:creationId xmlns:a16="http://schemas.microsoft.com/office/drawing/2014/main" id="{1AA46A5C-0B69-48E3-ACE5-73CE93C8FF73}"/>
+              </a:ext>
+            </a:extLst>
+          </p:cNvPr>
+          <p:cNvSpPr/>
+          <p:nvPr/>
+        </p:nvSpPr>
+        <p:spPr>
+          <a:xfrm>
+            <a:off x="3307976" y="1972235"/>
+            <a:ext cx="555812" cy="600635"/>
+          </a:xfrm>
+          <a:prstGeom prst="donut">
+            <a:avLst>
+              <a:gd name="adj" fmla="val 8903"/>
+            </a:avLst>
+          </a:prstGeom>
+        </p:spPr>
+        <p:style>
+          <a:lnRef idx="2">
+            <a:schemeClr val="dk1">
+              <a:shade val="50000"/>
+            </a:schemeClr>
+          </a:lnRef>
+          <a:fillRef idx="1">
+            <a:schemeClr val="dk1"/>
+          </a:fillRef>
+          <a:effectRef idx="0">
+            <a:schemeClr val="dk1"/>
+          </a:effectRef>
+          <a:fontRef idx="minor">
+            <a:schemeClr val="lt1"/>
+          </a:fontRef>
+        </p:style>
+        <p:txBody>
+          <a:bodyPr rtlCol="0" anchor="ctr"/>
+          <a:lstStyle/>
+          <a:p>
+            <a:pPr algn="ctr"/>
+            <a:endParaRPr lang="en-IN">
+              <a:solidFill>
+                <a:schemeClr val="tx1"/>
+              </a:solidFill>
+            </a:endParaRPr>
+          </a:p>
+        </p:txBody>
+      </p:sp>
+      <p:sp>
+        <p:nvSpPr>
+          <p:cNvPr id="50" name="Circle: Hollow 49">
+            <a:extLst>
+              <a:ext uri="{FF2B5EF4-FFF2-40B4-BE49-F238E27FC236}">
+                <a16:creationId xmlns:a16="http://schemas.microsoft.com/office/drawing/2014/main" id="{1F4BDEA8-0E38-4C93-A45E-66D92D8E8C50}"/>
+              </a:ext>
+            </a:extLst>
+          </p:cNvPr>
+          <p:cNvSpPr/>
+          <p:nvPr/>
+        </p:nvSpPr>
+        <p:spPr>
+          <a:xfrm>
+            <a:off x="3863787" y="1972235"/>
+            <a:ext cx="555812" cy="600635"/>
+          </a:xfrm>
+          <a:prstGeom prst="donut">
+            <a:avLst>
+              <a:gd name="adj" fmla="val 8903"/>
+            </a:avLst>
+          </a:prstGeom>
+        </p:spPr>
+        <p:style>
+          <a:lnRef idx="2">
+            <a:schemeClr val="dk1">
+              <a:shade val="50000"/>
+            </a:schemeClr>
+          </a:lnRef>
+          <a:fillRef idx="1">
+            <a:schemeClr val="dk1"/>
+          </a:fillRef>
+          <a:effectRef idx="0">
+            <a:schemeClr val="dk1"/>
+          </a:effectRef>
+          <a:fontRef idx="minor">
+            <a:schemeClr val="lt1"/>
+          </a:fontRef>
+        </p:style>
+        <p:txBody>
+          <a:bodyPr rtlCol="0" anchor="ctr"/>
+          <a:lstStyle/>
+          <a:p>
+            <a:pPr algn="ctr"/>
+            <a:endParaRPr lang="en-IN">
+              <a:solidFill>
+                <a:schemeClr val="tx1"/>
+              </a:solidFill>
+            </a:endParaRPr>
+          </a:p>
+        </p:txBody>
+      </p:sp>
+      <p:sp>
+        <p:nvSpPr>
+          <p:cNvPr id="52" name="Circle: Hollow 51">
+            <a:extLst>
+              <a:ext uri="{FF2B5EF4-FFF2-40B4-BE49-F238E27FC236}">
+                <a16:creationId xmlns:a16="http://schemas.microsoft.com/office/drawing/2014/main" id="{D4BCF0DA-6F89-457F-B0D0-54A2464266F9}"/>
+              </a:ext>
+            </a:extLst>
+          </p:cNvPr>
+          <p:cNvSpPr/>
+          <p:nvPr/>
+        </p:nvSpPr>
+        <p:spPr>
+          <a:xfrm>
+            <a:off x="4419599" y="1985681"/>
+            <a:ext cx="555812" cy="600635"/>
+          </a:xfrm>
+          <a:prstGeom prst="donut">
+            <a:avLst>
+              <a:gd name="adj" fmla="val 8903"/>
+            </a:avLst>
+          </a:prstGeom>
+        </p:spPr>
+        <p:style>
+          <a:lnRef idx="2">
+            <a:schemeClr val="dk1">
+              <a:shade val="50000"/>
+            </a:schemeClr>
+          </a:lnRef>
+          <a:fillRef idx="1">
+            <a:schemeClr val="dk1"/>
+          </a:fillRef>
+          <a:effectRef idx="0">
+            <a:schemeClr val="dk1"/>
+          </a:effectRef>
+          <a:fontRef idx="minor">
+            <a:schemeClr val="lt1"/>
+          </a:fontRef>
+        </p:style>
+        <p:txBody>
+          <a:bodyPr rtlCol="0" anchor="ctr"/>
+          <a:lstStyle/>
+          <a:p>
+            <a:pPr algn="ctr"/>
+            <a:endParaRPr lang="en-IN">
+              <a:solidFill>
+                <a:schemeClr val="tx1"/>
+              </a:solidFill>
+            </a:endParaRPr>
+          </a:p>
+        </p:txBody>
+      </p:sp>
+      <p:sp>
+        <p:nvSpPr>
+          <p:cNvPr id="55" name="Circle: Hollow 54">
+            <a:extLst>
+              <a:ext uri="{FF2B5EF4-FFF2-40B4-BE49-F238E27FC236}">
+                <a16:creationId xmlns:a16="http://schemas.microsoft.com/office/drawing/2014/main" id="{8D7BBB01-C405-46BC-9ECB-881DBDD33ABD}"/>
+              </a:ext>
+            </a:extLst>
+          </p:cNvPr>
+          <p:cNvSpPr/>
+          <p:nvPr/>
+        </p:nvSpPr>
+        <p:spPr>
+          <a:xfrm>
+            <a:off x="4966445" y="1972234"/>
+            <a:ext cx="555812" cy="600635"/>
+          </a:xfrm>
+          <a:prstGeom prst="donut">
+            <a:avLst>
+              <a:gd name="adj" fmla="val 8903"/>
+            </a:avLst>
+          </a:prstGeom>
+        </p:spPr>
+        <p:style>
+          <a:lnRef idx="2">
+            <a:schemeClr val="dk1">
+              <a:shade val="50000"/>
+            </a:schemeClr>
+          </a:lnRef>
+          <a:fillRef idx="1">
+            <a:schemeClr val="dk1"/>
+          </a:fillRef>
+          <a:effectRef idx="0">
+            <a:schemeClr val="dk1"/>
+          </a:effectRef>
+          <a:fontRef idx="minor">
+            <a:schemeClr val="lt1"/>
+          </a:fontRef>
+        </p:style>
+        <p:txBody>
+          <a:bodyPr rtlCol="0" anchor="ctr"/>
+          <a:lstStyle/>
+          <a:p>
+            <a:pPr algn="ctr"/>
+            <a:endParaRPr lang="en-IN">
+              <a:solidFill>
+                <a:schemeClr val="tx1"/>
+              </a:solidFill>
+            </a:endParaRPr>
+          </a:p>
+        </p:txBody>
+      </p:sp>
+      <p:sp>
+        <p:nvSpPr>
+          <p:cNvPr id="58" name="Circle: Hollow 57">
+            <a:extLst>
+              <a:ext uri="{FF2B5EF4-FFF2-40B4-BE49-F238E27FC236}">
+                <a16:creationId xmlns:a16="http://schemas.microsoft.com/office/drawing/2014/main" id="{FE49C32C-F975-41F7-857F-6F77CB74935C}"/>
+              </a:ext>
+            </a:extLst>
+          </p:cNvPr>
+          <p:cNvSpPr/>
+          <p:nvPr/>
+        </p:nvSpPr>
+        <p:spPr>
+          <a:xfrm>
+            <a:off x="5522256" y="1958787"/>
+            <a:ext cx="555812" cy="600635"/>
+          </a:xfrm>
+          <a:prstGeom prst="donut">
+            <a:avLst>
+              <a:gd name="adj" fmla="val 8903"/>
+            </a:avLst>
+          </a:prstGeom>
+        </p:spPr>
+        <p:style>
+          <a:lnRef idx="2">
+            <a:schemeClr val="dk1">
+              <a:shade val="50000"/>
+            </a:schemeClr>
+          </a:lnRef>
+          <a:fillRef idx="1">
+            <a:schemeClr val="dk1"/>
+          </a:fillRef>
+          <a:effectRef idx="0">
+            <a:schemeClr val="dk1"/>
+          </a:effectRef>
+          <a:fontRef idx="minor">
+            <a:schemeClr val="lt1"/>
+          </a:fontRef>
+        </p:style>
+        <p:txBody>
+          <a:bodyPr rtlCol="0" anchor="ctr"/>
+          <a:lstStyle/>
+          <a:p>
+            <a:pPr algn="ctr"/>
+            <a:endParaRPr lang="en-IN">
+              <a:solidFill>
+                <a:schemeClr val="tx1"/>
+              </a:solidFill>
+            </a:endParaRPr>
+          </a:p>
+        </p:txBody>
+      </p:sp>
+      <p:sp>
+        <p:nvSpPr>
+          <p:cNvPr id="59" name="Circle: Hollow 58">
+            <a:extLst>
+              <a:ext uri="{FF2B5EF4-FFF2-40B4-BE49-F238E27FC236}">
+                <a16:creationId xmlns:a16="http://schemas.microsoft.com/office/drawing/2014/main" id="{C0B2413B-370E-4E30-AC2F-7F893F50AD66}"/>
+              </a:ext>
+            </a:extLst>
+          </p:cNvPr>
+          <p:cNvSpPr/>
+          <p:nvPr/>
+        </p:nvSpPr>
+        <p:spPr>
+          <a:xfrm>
+            <a:off x="6019798" y="1967750"/>
+            <a:ext cx="555812" cy="600635"/>
+          </a:xfrm>
+          <a:prstGeom prst="donut">
+            <a:avLst>
+              <a:gd name="adj" fmla="val 8903"/>
+            </a:avLst>
+          </a:prstGeom>
+        </p:spPr>
+        <p:style>
+          <a:lnRef idx="2">
+            <a:schemeClr val="dk1">
+              <a:shade val="50000"/>
+            </a:schemeClr>
+          </a:lnRef>
+          <a:fillRef idx="1">
+            <a:schemeClr val="dk1"/>
+          </a:fillRef>
+          <a:effectRef idx="0">
+            <a:schemeClr val="dk1"/>
+          </a:effectRef>
+          <a:fontRef idx="minor">
+            <a:schemeClr val="lt1"/>
+          </a:fontRef>
+        </p:style>
+        <p:txBody>
+          <a:bodyPr rtlCol="0" anchor="ctr"/>
+          <a:lstStyle/>
+          <a:p>
+            <a:pPr algn="ctr"/>
+            <a:endParaRPr lang="en-IN">
+              <a:solidFill>
+                <a:schemeClr val="tx1"/>
+              </a:solidFill>
+            </a:endParaRPr>
+          </a:p>
+        </p:txBody>
+      </p:sp>
+      <p:sp>
+        <p:nvSpPr>
+          <p:cNvPr id="47" name="Rectangle 46">
+            <a:extLst>
+              <a:ext uri="{FF2B5EF4-FFF2-40B4-BE49-F238E27FC236}">
+                <a16:creationId xmlns:a16="http://schemas.microsoft.com/office/drawing/2014/main" id="{1204D102-A7A9-4A94-91CC-B9E454D8A5F8}"/>
+              </a:ext>
+            </a:extLst>
+          </p:cNvPr>
+          <p:cNvSpPr/>
+          <p:nvPr/>
+        </p:nvSpPr>
+        <p:spPr>
+          <a:xfrm>
+            <a:off x="2761130" y="2223247"/>
+            <a:ext cx="3810000" cy="905435"/>
+          </a:xfrm>
+          <a:prstGeom prst="rect">
+            <a:avLst/>
+          </a:prstGeom>
+        </p:spPr>
+        <p:style>
+          <a:lnRef idx="2">
+            <a:schemeClr val="accent1">
+              <a:shade val="50000"/>
+            </a:schemeClr>
+          </a:lnRef>
+          <a:fillRef idx="1">
+            <a:schemeClr val="accent1"/>
+          </a:fillRef>
+          <a:effectRef idx="0">
+            <a:schemeClr val="accent1"/>
+          </a:effectRef>
+          <a:fontRef idx="minor">
+            <a:schemeClr val="lt1"/>
+          </a:fontRef>
+        </p:style>
+        <p:txBody>
+          <a:bodyPr rtlCol="0" anchor="ctr"/>
+          <a:lstStyle/>
+          <a:p>
+            <a:pPr algn="ctr"/>
+            <a:endParaRPr lang="en-IN"/>
+          </a:p>
+        </p:txBody>
+      </p:sp>
+      <p:sp>
+        <p:nvSpPr>
+          <p:cNvPr id="60" name="Rectangle 59">
+            <a:extLst>
+              <a:ext uri="{FF2B5EF4-FFF2-40B4-BE49-F238E27FC236}">
+                <a16:creationId xmlns:a16="http://schemas.microsoft.com/office/drawing/2014/main" id="{2E4FADE2-0AC5-4285-8873-326C98E4FC36}"/>
+              </a:ext>
+            </a:extLst>
+          </p:cNvPr>
+          <p:cNvSpPr/>
+          <p:nvPr/>
+        </p:nvSpPr>
+        <p:spPr>
+          <a:xfrm>
+            <a:off x="7030568" y="2223246"/>
+            <a:ext cx="972673" cy="905435"/>
+          </a:xfrm>
+          <a:prstGeom prst="rect">
+            <a:avLst/>
+          </a:prstGeom>
+        </p:spPr>
+        <p:style>
+          <a:lnRef idx="2">
+            <a:schemeClr val="accent1">
+              <a:shade val="50000"/>
+            </a:schemeClr>
+          </a:lnRef>
+          <a:fillRef idx="1">
+            <a:schemeClr val="accent1"/>
+          </a:fillRef>
+          <a:effectRef idx="0">
+            <a:schemeClr val="accent1"/>
+          </a:effectRef>
+          <a:fontRef idx="minor">
+            <a:schemeClr val="lt1"/>
+          </a:fontRef>
+        </p:style>
+        <p:txBody>
+          <a:bodyPr rtlCol="0" anchor="ctr"/>
+          <a:lstStyle/>
+          <a:p>
+            <a:pPr algn="ctr"/>
+            <a:endParaRPr lang="en-IN"/>
+          </a:p>
+        </p:txBody>
+      </p:sp>
+      <p:cxnSp>
+        <p:nvCxnSpPr>
+          <p:cNvPr id="6" name="Straight Connector 5">
+            <a:extLst>
+              <a:ext uri="{FF2B5EF4-FFF2-40B4-BE49-F238E27FC236}">
+                <a16:creationId xmlns:a16="http://schemas.microsoft.com/office/drawing/2014/main" id="{492E74EE-C3A1-4D6A-AC9D-2BAF711CA229}"/>
+              </a:ext>
+            </a:extLst>
+          </p:cNvPr>
+          <p:cNvCxnSpPr>
+            <a:cxnSpLocks/>
+          </p:cNvCxnSpPr>
+          <p:nvPr/>
+        </p:nvCxnSpPr>
+        <p:spPr>
+          <a:xfrm flipV="1">
+            <a:off x="8892986" y="2223248"/>
+            <a:ext cx="0" cy="905433"/>
+          </a:xfrm>
+          <a:prstGeom prst="line">
+            <a:avLst/>
+          </a:prstGeom>
+          <a:ln w="28575"/>
+        </p:spPr>
+        <p:style>
+          <a:lnRef idx="1">
+            <a:schemeClr val="accent1"/>
+          </a:lnRef>
+          <a:fillRef idx="0">
+            <a:schemeClr val="accent1"/>
+          </a:fillRef>
+          <a:effectRef idx="0">
+            <a:schemeClr val="accent1"/>
+          </a:effectRef>
+          <a:fontRef idx="minor">
+            <a:schemeClr val="tx1"/>
+          </a:fontRef>
+        </p:style>
+      </p:cxnSp>
+      <p:cxnSp>
+        <p:nvCxnSpPr>
+          <p:cNvPr id="9" name="Straight Connector 8">
+            <a:extLst>
+              <a:ext uri="{FF2B5EF4-FFF2-40B4-BE49-F238E27FC236}">
+                <a16:creationId xmlns:a16="http://schemas.microsoft.com/office/drawing/2014/main" id="{2E37CC82-0ED6-4378-89D5-F483C67BBAA2}"/>
+              </a:ext>
+            </a:extLst>
+          </p:cNvPr>
+          <p:cNvCxnSpPr>
+            <a:cxnSpLocks/>
+          </p:cNvCxnSpPr>
+          <p:nvPr/>
+        </p:nvCxnSpPr>
+        <p:spPr>
+          <a:xfrm flipV="1">
+            <a:off x="8229598" y="2223246"/>
+            <a:ext cx="1308847" cy="905435"/>
+          </a:xfrm>
+          <a:prstGeom prst="line">
+            <a:avLst/>
+          </a:prstGeom>
+          <a:ln w="28575"/>
+        </p:spPr>
+        <p:style>
+          <a:lnRef idx="1">
+            <a:schemeClr val="accent1"/>
+          </a:lnRef>
+          <a:fillRef idx="0">
+            <a:schemeClr val="accent1"/>
+          </a:fillRef>
+          <a:effectRef idx="0">
+            <a:schemeClr val="accent1"/>
+          </a:effectRef>
+          <a:fontRef idx="minor">
+            <a:schemeClr val="tx1"/>
+          </a:fontRef>
+        </p:style>
+      </p:cxnSp>
+      <p:cxnSp>
+        <p:nvCxnSpPr>
+          <p:cNvPr id="11" name="Straight Connector 10">
+            <a:extLst>
+              <a:ext uri="{FF2B5EF4-FFF2-40B4-BE49-F238E27FC236}">
+                <a16:creationId xmlns:a16="http://schemas.microsoft.com/office/drawing/2014/main" id="{41E35E5C-E44E-411B-9AB2-6CFF6E2ED4BA}"/>
+              </a:ext>
+            </a:extLst>
+          </p:cNvPr>
+          <p:cNvCxnSpPr>
+            <a:cxnSpLocks/>
+          </p:cNvCxnSpPr>
+          <p:nvPr/>
+        </p:nvCxnSpPr>
+        <p:spPr>
+          <a:xfrm>
+            <a:off x="8892986" y="2223246"/>
+            <a:ext cx="645459" cy="0"/>
+          </a:xfrm>
+          <a:prstGeom prst="line">
+            <a:avLst/>
+          </a:prstGeom>
+          <a:ln w="28575"/>
+        </p:spPr>
+        <p:style>
+          <a:lnRef idx="1">
+            <a:schemeClr val="accent1"/>
+          </a:lnRef>
+          <a:fillRef idx="0">
+            <a:schemeClr val="accent1"/>
+          </a:fillRef>
+          <a:effectRef idx="0">
+            <a:schemeClr val="accent1"/>
+          </a:effectRef>
+          <a:fontRef idx="minor">
+            <a:schemeClr val="tx1"/>
+          </a:fontRef>
+        </p:style>
+      </p:cxnSp>
+      <p:cxnSp>
+        <p:nvCxnSpPr>
+          <p:cNvPr id="13" name="Straight Connector 12">
+            <a:extLst>
+              <a:ext uri="{FF2B5EF4-FFF2-40B4-BE49-F238E27FC236}">
+                <a16:creationId xmlns:a16="http://schemas.microsoft.com/office/drawing/2014/main" id="{3DDD39AB-283A-46A8-9F70-475F62B1D74B}"/>
+              </a:ext>
+            </a:extLst>
+          </p:cNvPr>
+          <p:cNvCxnSpPr/>
+          <p:nvPr/>
+        </p:nvCxnSpPr>
+        <p:spPr>
+          <a:xfrm>
+            <a:off x="8229598" y="3128681"/>
+            <a:ext cx="663388" cy="0"/>
+          </a:xfrm>
+          <a:prstGeom prst="line">
+            <a:avLst/>
+          </a:prstGeom>
+          <a:ln w="28575"/>
+        </p:spPr>
+        <p:style>
+          <a:lnRef idx="1">
+            <a:schemeClr val="accent1"/>
+          </a:lnRef>
+          <a:fillRef idx="0">
+            <a:schemeClr val="accent1"/>
+          </a:fillRef>
+          <a:effectRef idx="0">
+            <a:schemeClr val="accent1"/>
+          </a:effectRef>
+          <a:fontRef idx="minor">
+            <a:schemeClr val="tx1"/>
+          </a:fontRef>
+        </p:style>
+      </p:cxnSp>
+      <p:cxnSp>
+        <p:nvCxnSpPr>
+          <p:cNvPr id="19" name="Straight Connector 18">
+            <a:extLst>
+              <a:ext uri="{FF2B5EF4-FFF2-40B4-BE49-F238E27FC236}">
+                <a16:creationId xmlns:a16="http://schemas.microsoft.com/office/drawing/2014/main" id="{5B1744F4-3734-4DCF-8B88-58FB38EEC838}"/>
+              </a:ext>
+            </a:extLst>
+          </p:cNvPr>
+          <p:cNvCxnSpPr/>
+          <p:nvPr/>
+        </p:nvCxnSpPr>
+        <p:spPr>
+          <a:xfrm>
+            <a:off x="2528047" y="2671482"/>
+            <a:ext cx="6795248" cy="0"/>
+          </a:xfrm>
+          <a:prstGeom prst="line">
+            <a:avLst/>
+          </a:prstGeom>
+          <a:ln w="28575">
+            <a:prstDash val="sysDash"/>
+          </a:ln>
+        </p:spPr>
+        <p:style>
+          <a:lnRef idx="1">
+            <a:schemeClr val="accent6"/>
+          </a:lnRef>
+          <a:fillRef idx="0">
+            <a:schemeClr val="accent6"/>
+          </a:fillRef>
+          <a:effectRef idx="0">
+            <a:schemeClr val="accent6"/>
+          </a:effectRef>
+          <a:fontRef idx="minor">
+            <a:schemeClr val="tx1"/>
+          </a:fontRef>
+        </p:style>
+      </p:cxnSp>
+      <p:sp>
+        <p:nvSpPr>
+          <p:cNvPr id="63" name="Circle: Hollow 62">
+            <a:extLst>
+              <a:ext uri="{FF2B5EF4-FFF2-40B4-BE49-F238E27FC236}">
+                <a16:creationId xmlns:a16="http://schemas.microsoft.com/office/drawing/2014/main" id="{1C422FB8-FBFE-44F3-AC16-71560E42BA73}"/>
+              </a:ext>
+            </a:extLst>
+          </p:cNvPr>
+          <p:cNvSpPr/>
+          <p:nvPr/>
+        </p:nvSpPr>
+        <p:spPr>
+          <a:xfrm>
+            <a:off x="2743199" y="4383742"/>
+            <a:ext cx="555812" cy="600635"/>
+          </a:xfrm>
+          <a:prstGeom prst="donut">
+            <a:avLst>
+              <a:gd name="adj" fmla="val 8903"/>
+            </a:avLst>
+          </a:prstGeom>
+        </p:spPr>
+        <p:style>
+          <a:lnRef idx="2">
+            <a:schemeClr val="dk1">
+              <a:shade val="50000"/>
+            </a:schemeClr>
+          </a:lnRef>
+          <a:fillRef idx="1">
+            <a:schemeClr val="dk1"/>
+          </a:fillRef>
+          <a:effectRef idx="0">
+            <a:schemeClr val="dk1"/>
+          </a:effectRef>
+          <a:fontRef idx="minor">
+            <a:schemeClr val="lt1"/>
+          </a:fontRef>
+        </p:style>
+        <p:txBody>
+          <a:bodyPr rtlCol="0" anchor="ctr"/>
+          <a:lstStyle/>
+          <a:p>
+            <a:pPr algn="ctr"/>
+            <a:endParaRPr lang="en-IN">
+              <a:solidFill>
+                <a:schemeClr val="tx1"/>
+              </a:solidFill>
+            </a:endParaRPr>
+          </a:p>
+        </p:txBody>
+      </p:sp>
+      <p:sp>
+        <p:nvSpPr>
+          <p:cNvPr id="64" name="Circle: Hollow 63">
+            <a:extLst>
+              <a:ext uri="{FF2B5EF4-FFF2-40B4-BE49-F238E27FC236}">
+                <a16:creationId xmlns:a16="http://schemas.microsoft.com/office/drawing/2014/main" id="{BFA0ABB7-F290-41BB-A31C-BBDE25C282B5}"/>
+              </a:ext>
+            </a:extLst>
+          </p:cNvPr>
+          <p:cNvSpPr/>
+          <p:nvPr/>
+        </p:nvSpPr>
+        <p:spPr>
+          <a:xfrm>
+            <a:off x="3290046" y="4383742"/>
+            <a:ext cx="555812" cy="600635"/>
+          </a:xfrm>
+          <a:prstGeom prst="donut">
+            <a:avLst>
+              <a:gd name="adj" fmla="val 8903"/>
+            </a:avLst>
+          </a:prstGeom>
+        </p:spPr>
+        <p:style>
+          <a:lnRef idx="2">
+            <a:schemeClr val="dk1">
+              <a:shade val="50000"/>
+            </a:schemeClr>
+          </a:lnRef>
+          <a:fillRef idx="1">
+            <a:schemeClr val="dk1"/>
+          </a:fillRef>
+          <a:effectRef idx="0">
+            <a:schemeClr val="dk1"/>
+          </a:effectRef>
+          <a:fontRef idx="minor">
+            <a:schemeClr val="lt1"/>
+          </a:fontRef>
+        </p:style>
+        <p:txBody>
+          <a:bodyPr rtlCol="0" anchor="ctr"/>
+          <a:lstStyle/>
+          <a:p>
+            <a:pPr algn="ctr"/>
+            <a:endParaRPr lang="en-IN">
+              <a:solidFill>
+                <a:schemeClr val="tx1"/>
+              </a:solidFill>
+            </a:endParaRPr>
+          </a:p>
+        </p:txBody>
+      </p:sp>
+      <p:sp>
+        <p:nvSpPr>
+          <p:cNvPr id="65" name="Circle: Hollow 64">
+            <a:extLst>
+              <a:ext uri="{FF2B5EF4-FFF2-40B4-BE49-F238E27FC236}">
+                <a16:creationId xmlns:a16="http://schemas.microsoft.com/office/drawing/2014/main" id="{E966B24A-D8F9-40F1-9109-233BC1D61B54}"/>
+              </a:ext>
+            </a:extLst>
+          </p:cNvPr>
+          <p:cNvSpPr/>
+          <p:nvPr/>
+        </p:nvSpPr>
+        <p:spPr>
+          <a:xfrm>
+            <a:off x="3845857" y="4383742"/>
+            <a:ext cx="555812" cy="600635"/>
+          </a:xfrm>
+          <a:prstGeom prst="donut">
+            <a:avLst>
+              <a:gd name="adj" fmla="val 8903"/>
+            </a:avLst>
+          </a:prstGeom>
+        </p:spPr>
+        <p:style>
+          <a:lnRef idx="2">
+            <a:schemeClr val="dk1">
+              <a:shade val="50000"/>
+            </a:schemeClr>
+          </a:lnRef>
+          <a:fillRef idx="1">
+            <a:schemeClr val="dk1"/>
+          </a:fillRef>
+          <a:effectRef idx="0">
+            <a:schemeClr val="dk1"/>
+          </a:effectRef>
+          <a:fontRef idx="minor">
+            <a:schemeClr val="lt1"/>
+          </a:fontRef>
+        </p:style>
+        <p:txBody>
+          <a:bodyPr rtlCol="0" anchor="ctr"/>
+          <a:lstStyle/>
+          <a:p>
+            <a:pPr algn="ctr"/>
+            <a:endParaRPr lang="en-IN">
+              <a:solidFill>
+                <a:schemeClr val="tx1"/>
+              </a:solidFill>
+            </a:endParaRPr>
+          </a:p>
+        </p:txBody>
+      </p:sp>
+      <p:sp>
+        <p:nvSpPr>
+          <p:cNvPr id="66" name="Circle: Hollow 65">
+            <a:extLst>
+              <a:ext uri="{FF2B5EF4-FFF2-40B4-BE49-F238E27FC236}">
+                <a16:creationId xmlns:a16="http://schemas.microsoft.com/office/drawing/2014/main" id="{FECEFC38-B894-4419-8D78-A689987D2632}"/>
+              </a:ext>
+            </a:extLst>
+          </p:cNvPr>
+          <p:cNvSpPr/>
+          <p:nvPr/>
+        </p:nvSpPr>
+        <p:spPr>
+          <a:xfrm>
+            <a:off x="4401669" y="4397188"/>
+            <a:ext cx="555812" cy="600635"/>
+          </a:xfrm>
+          <a:prstGeom prst="donut">
+            <a:avLst>
+              <a:gd name="adj" fmla="val 8903"/>
+            </a:avLst>
+          </a:prstGeom>
+        </p:spPr>
+        <p:style>
+          <a:lnRef idx="2">
+            <a:schemeClr val="dk1">
+              <a:shade val="50000"/>
+            </a:schemeClr>
+          </a:lnRef>
+          <a:fillRef idx="1">
+            <a:schemeClr val="dk1"/>
+          </a:fillRef>
+          <a:effectRef idx="0">
+            <a:schemeClr val="dk1"/>
+          </a:effectRef>
+          <a:fontRef idx="minor">
+            <a:schemeClr val="lt1"/>
+          </a:fontRef>
+        </p:style>
+        <p:txBody>
+          <a:bodyPr rtlCol="0" anchor="ctr"/>
+          <a:lstStyle/>
+          <a:p>
+            <a:pPr algn="ctr"/>
+            <a:endParaRPr lang="en-IN">
+              <a:solidFill>
+                <a:schemeClr val="tx1"/>
+              </a:solidFill>
+            </a:endParaRPr>
+          </a:p>
+        </p:txBody>
+      </p:sp>
+      <p:sp>
+        <p:nvSpPr>
+          <p:cNvPr id="67" name="Circle: Hollow 66">
+            <a:extLst>
+              <a:ext uri="{FF2B5EF4-FFF2-40B4-BE49-F238E27FC236}">
+                <a16:creationId xmlns:a16="http://schemas.microsoft.com/office/drawing/2014/main" id="{02E3D4FF-22FB-43E3-A179-7727EA838D57}"/>
+              </a:ext>
+            </a:extLst>
+          </p:cNvPr>
+          <p:cNvSpPr/>
+          <p:nvPr/>
+        </p:nvSpPr>
+        <p:spPr>
+          <a:xfrm>
+            <a:off x="4948515" y="4383741"/>
+            <a:ext cx="555812" cy="600635"/>
+          </a:xfrm>
+          <a:prstGeom prst="donut">
+            <a:avLst>
+              <a:gd name="adj" fmla="val 8903"/>
+            </a:avLst>
+          </a:prstGeom>
+        </p:spPr>
+        <p:style>
+          <a:lnRef idx="2">
+            <a:schemeClr val="dk1">
+              <a:shade val="50000"/>
+            </a:schemeClr>
+          </a:lnRef>
+          <a:fillRef idx="1">
+            <a:schemeClr val="dk1"/>
+          </a:fillRef>
+          <a:effectRef idx="0">
+            <a:schemeClr val="dk1"/>
+          </a:effectRef>
+          <a:fontRef idx="minor">
+            <a:schemeClr val="lt1"/>
+          </a:fontRef>
+        </p:style>
+        <p:txBody>
+          <a:bodyPr rtlCol="0" anchor="ctr"/>
+          <a:lstStyle/>
+          <a:p>
+            <a:pPr algn="ctr"/>
+            <a:endParaRPr lang="en-IN">
+              <a:solidFill>
+                <a:schemeClr val="tx1"/>
+              </a:solidFill>
+            </a:endParaRPr>
+          </a:p>
+        </p:txBody>
+      </p:sp>
+      <p:sp>
+        <p:nvSpPr>
+          <p:cNvPr id="68" name="Circle: Hollow 67">
+            <a:extLst>
+              <a:ext uri="{FF2B5EF4-FFF2-40B4-BE49-F238E27FC236}">
+                <a16:creationId xmlns:a16="http://schemas.microsoft.com/office/drawing/2014/main" id="{622AF539-5BB4-405B-9A58-87371ED800D5}"/>
+              </a:ext>
+            </a:extLst>
+          </p:cNvPr>
+          <p:cNvSpPr/>
+          <p:nvPr/>
+        </p:nvSpPr>
+        <p:spPr>
+          <a:xfrm>
+            <a:off x="5504326" y="4370294"/>
+            <a:ext cx="555812" cy="600635"/>
+          </a:xfrm>
+          <a:prstGeom prst="donut">
+            <a:avLst>
+              <a:gd name="adj" fmla="val 8903"/>
+            </a:avLst>
+          </a:prstGeom>
+        </p:spPr>
+        <p:style>
+          <a:lnRef idx="2">
+            <a:schemeClr val="dk1">
+              <a:shade val="50000"/>
+            </a:schemeClr>
+          </a:lnRef>
+          <a:fillRef idx="1">
+            <a:schemeClr val="dk1"/>
+          </a:fillRef>
+          <a:effectRef idx="0">
+            <a:schemeClr val="dk1"/>
+          </a:effectRef>
+          <a:fontRef idx="minor">
+            <a:schemeClr val="lt1"/>
+          </a:fontRef>
+        </p:style>
+        <p:txBody>
+          <a:bodyPr rtlCol="0" anchor="ctr"/>
+          <a:lstStyle/>
+          <a:p>
+            <a:pPr algn="ctr"/>
+            <a:endParaRPr lang="en-IN">
+              <a:solidFill>
+                <a:schemeClr val="tx1"/>
+              </a:solidFill>
+            </a:endParaRPr>
+          </a:p>
+        </p:txBody>
+      </p:sp>
+      <p:sp>
+        <p:nvSpPr>
+          <p:cNvPr id="69" name="Circle: Hollow 68">
+            <a:extLst>
+              <a:ext uri="{FF2B5EF4-FFF2-40B4-BE49-F238E27FC236}">
+                <a16:creationId xmlns:a16="http://schemas.microsoft.com/office/drawing/2014/main" id="{E668B679-0774-43BF-AA66-8889757D7289}"/>
+              </a:ext>
+            </a:extLst>
+          </p:cNvPr>
+          <p:cNvSpPr/>
+          <p:nvPr/>
+        </p:nvSpPr>
+        <p:spPr>
+          <a:xfrm>
+            <a:off x="6001868" y="4379257"/>
+            <a:ext cx="555812" cy="600635"/>
+          </a:xfrm>
+          <a:prstGeom prst="donut">
+            <a:avLst>
+              <a:gd name="adj" fmla="val 8903"/>
+            </a:avLst>
+          </a:prstGeom>
+        </p:spPr>
+        <p:style>
+          <a:lnRef idx="2">
+            <a:schemeClr val="dk1">
+              <a:shade val="50000"/>
+            </a:schemeClr>
+          </a:lnRef>
+          <a:fillRef idx="1">
+            <a:schemeClr val="dk1"/>
+          </a:fillRef>
+          <a:effectRef idx="0">
+            <a:schemeClr val="dk1"/>
+          </a:effectRef>
+          <a:fontRef idx="minor">
+            <a:schemeClr val="lt1"/>
+          </a:fontRef>
+        </p:style>
+        <p:txBody>
+          <a:bodyPr rtlCol="0" anchor="ctr"/>
+          <a:lstStyle/>
+          <a:p>
+            <a:pPr algn="ctr"/>
+            <a:endParaRPr lang="en-IN">
+              <a:solidFill>
+                <a:schemeClr val="tx1"/>
+              </a:solidFill>
+            </a:endParaRPr>
+          </a:p>
+        </p:txBody>
+      </p:sp>
+      <p:sp>
+        <p:nvSpPr>
+          <p:cNvPr id="70" name="Rectangle 69">
+            <a:extLst>
+              <a:ext uri="{FF2B5EF4-FFF2-40B4-BE49-F238E27FC236}">
+                <a16:creationId xmlns:a16="http://schemas.microsoft.com/office/drawing/2014/main" id="{55695EB8-3043-411D-99F0-20C36D476F7D}"/>
+              </a:ext>
+            </a:extLst>
+          </p:cNvPr>
+          <p:cNvSpPr/>
+          <p:nvPr/>
+        </p:nvSpPr>
+        <p:spPr>
+          <a:xfrm>
+            <a:off x="2743200" y="4634754"/>
+            <a:ext cx="3810000" cy="905435"/>
+          </a:xfrm>
+          <a:prstGeom prst="rect">
+            <a:avLst/>
+          </a:prstGeom>
+        </p:spPr>
+        <p:style>
+          <a:lnRef idx="2">
+            <a:schemeClr val="accent1">
+              <a:shade val="50000"/>
+            </a:schemeClr>
+          </a:lnRef>
+          <a:fillRef idx="1">
+            <a:schemeClr val="accent1"/>
+          </a:fillRef>
+          <a:effectRef idx="0">
+            <a:schemeClr val="accent1"/>
+          </a:effectRef>
+          <a:fontRef idx="minor">
+            <a:schemeClr val="lt1"/>
+          </a:fontRef>
+        </p:style>
+        <p:txBody>
+          <a:bodyPr rtlCol="0" anchor="ctr"/>
+          <a:lstStyle/>
+          <a:p>
+            <a:pPr algn="ctr"/>
+            <a:endParaRPr lang="en-IN"/>
+          </a:p>
+        </p:txBody>
+      </p:sp>
+      <p:sp>
+        <p:nvSpPr>
+          <p:cNvPr id="71" name="Rectangle 70">
+            <a:extLst>
+              <a:ext uri="{FF2B5EF4-FFF2-40B4-BE49-F238E27FC236}">
+                <a16:creationId xmlns:a16="http://schemas.microsoft.com/office/drawing/2014/main" id="{9DE4616C-14B7-40B4-8749-5188C6A710D2}"/>
+              </a:ext>
+            </a:extLst>
+          </p:cNvPr>
+          <p:cNvSpPr/>
+          <p:nvPr/>
+        </p:nvSpPr>
+        <p:spPr>
+          <a:xfrm>
+            <a:off x="7012638" y="4634753"/>
+            <a:ext cx="972673" cy="905435"/>
+          </a:xfrm>
+          <a:prstGeom prst="rect">
+            <a:avLst/>
+          </a:prstGeom>
+        </p:spPr>
+        <p:style>
+          <a:lnRef idx="2">
+            <a:schemeClr val="accent1">
+              <a:shade val="50000"/>
+            </a:schemeClr>
+          </a:lnRef>
+          <a:fillRef idx="1">
+            <a:schemeClr val="accent1"/>
+          </a:fillRef>
+          <a:effectRef idx="0">
+            <a:schemeClr val="accent1"/>
+          </a:effectRef>
+          <a:fontRef idx="minor">
+            <a:schemeClr val="lt1"/>
+          </a:fontRef>
+        </p:style>
+        <p:txBody>
+          <a:bodyPr rtlCol="0" anchor="ctr"/>
+          <a:lstStyle/>
+          <a:p>
+            <a:pPr algn="ctr"/>
+            <a:endParaRPr lang="en-IN"/>
+          </a:p>
+        </p:txBody>
+      </p:sp>
+      <p:cxnSp>
+        <p:nvCxnSpPr>
+          <p:cNvPr id="72" name="Straight Connector 71">
+            <a:extLst>
+              <a:ext uri="{FF2B5EF4-FFF2-40B4-BE49-F238E27FC236}">
+                <a16:creationId xmlns:a16="http://schemas.microsoft.com/office/drawing/2014/main" id="{BCF200CD-1AD3-4B61-8778-E53E47826512}"/>
+              </a:ext>
+            </a:extLst>
+          </p:cNvPr>
+          <p:cNvCxnSpPr>
+            <a:cxnSpLocks/>
+          </p:cNvCxnSpPr>
+          <p:nvPr/>
+        </p:nvCxnSpPr>
+        <p:spPr>
+          <a:xfrm flipV="1">
+            <a:off x="8875056" y="4634755"/>
+            <a:ext cx="0" cy="905433"/>
+          </a:xfrm>
+          <a:prstGeom prst="line">
+            <a:avLst/>
+          </a:prstGeom>
+          <a:ln w="28575"/>
+        </p:spPr>
+        <p:style>
+          <a:lnRef idx="1">
+            <a:schemeClr val="accent1"/>
+          </a:lnRef>
+          <a:fillRef idx="0">
+            <a:schemeClr val="accent1"/>
+          </a:fillRef>
+          <a:effectRef idx="0">
+            <a:schemeClr val="accent1"/>
+          </a:effectRef>
+          <a:fontRef idx="minor">
+            <a:schemeClr val="tx1"/>
+          </a:fontRef>
+        </p:style>
+      </p:cxnSp>
+      <p:cxnSp>
+        <p:nvCxnSpPr>
+          <p:cNvPr id="73" name="Straight Connector 72">
+            <a:extLst>
+              <a:ext uri="{FF2B5EF4-FFF2-40B4-BE49-F238E27FC236}">
+                <a16:creationId xmlns:a16="http://schemas.microsoft.com/office/drawing/2014/main" id="{A315E0F6-7AC8-4AC2-8816-9428313B7C81}"/>
+              </a:ext>
+            </a:extLst>
+          </p:cNvPr>
+          <p:cNvCxnSpPr>
+            <a:cxnSpLocks/>
+          </p:cNvCxnSpPr>
+          <p:nvPr/>
+        </p:nvCxnSpPr>
+        <p:spPr>
+          <a:xfrm flipH="1" flipV="1">
+            <a:off x="8229596" y="4634753"/>
+            <a:ext cx="1308849" cy="905435"/>
+          </a:xfrm>
+          <a:prstGeom prst="line">
+            <a:avLst/>
+          </a:prstGeom>
+          <a:ln w="28575"/>
+        </p:spPr>
+        <p:style>
+          <a:lnRef idx="1">
+            <a:schemeClr val="accent1"/>
+          </a:lnRef>
+          <a:fillRef idx="0">
+            <a:schemeClr val="accent1"/>
+          </a:fillRef>
+          <a:effectRef idx="0">
+            <a:schemeClr val="accent1"/>
+          </a:effectRef>
+          <a:fontRef idx="minor">
+            <a:schemeClr val="tx1"/>
+          </a:fontRef>
+        </p:style>
+      </p:cxnSp>
+      <p:cxnSp>
+        <p:nvCxnSpPr>
+          <p:cNvPr id="74" name="Straight Connector 73">
+            <a:extLst>
+              <a:ext uri="{FF2B5EF4-FFF2-40B4-BE49-F238E27FC236}">
+                <a16:creationId xmlns:a16="http://schemas.microsoft.com/office/drawing/2014/main" id="{F46BA46C-C543-47EC-BE16-8CD32715BB2E}"/>
+              </a:ext>
+            </a:extLst>
+          </p:cNvPr>
+          <p:cNvCxnSpPr>
+            <a:cxnSpLocks/>
+          </p:cNvCxnSpPr>
+          <p:nvPr/>
+        </p:nvCxnSpPr>
+        <p:spPr>
+          <a:xfrm>
+            <a:off x="8229597" y="4639235"/>
+            <a:ext cx="645459" cy="0"/>
+          </a:xfrm>
+          <a:prstGeom prst="line">
+            <a:avLst/>
+          </a:prstGeom>
+          <a:ln w="28575"/>
+        </p:spPr>
+        <p:style>
+          <a:lnRef idx="1">
+            <a:schemeClr val="accent1"/>
+          </a:lnRef>
+          <a:fillRef idx="0">
+            <a:schemeClr val="accent1"/>
+          </a:fillRef>
+          <a:effectRef idx="0">
+            <a:schemeClr val="accent1"/>
+          </a:effectRef>
+          <a:fontRef idx="minor">
+            <a:schemeClr val="tx1"/>
+          </a:fontRef>
+        </p:style>
+      </p:cxnSp>
+      <p:cxnSp>
+        <p:nvCxnSpPr>
+          <p:cNvPr id="75" name="Straight Connector 74">
+            <a:extLst>
+              <a:ext uri="{FF2B5EF4-FFF2-40B4-BE49-F238E27FC236}">
+                <a16:creationId xmlns:a16="http://schemas.microsoft.com/office/drawing/2014/main" id="{B0D34672-C211-4A87-9614-D1B98FB3C6B4}"/>
+              </a:ext>
+            </a:extLst>
+          </p:cNvPr>
+          <p:cNvCxnSpPr/>
+          <p:nvPr/>
+        </p:nvCxnSpPr>
+        <p:spPr>
+          <a:xfrm>
+            <a:off x="8875056" y="5540188"/>
+            <a:ext cx="663388" cy="0"/>
+          </a:xfrm>
+          <a:prstGeom prst="line">
+            <a:avLst/>
+          </a:prstGeom>
+          <a:ln w="28575"/>
+        </p:spPr>
+        <p:style>
+          <a:lnRef idx="1">
+            <a:schemeClr val="accent1"/>
+          </a:lnRef>
+          <a:fillRef idx="0">
+            <a:schemeClr val="accent1"/>
+          </a:fillRef>
+          <a:effectRef idx="0">
+            <a:schemeClr val="accent1"/>
+          </a:effectRef>
+          <a:fontRef idx="minor">
+            <a:schemeClr val="tx1"/>
+          </a:fontRef>
+        </p:style>
+      </p:cxnSp>
+      <p:cxnSp>
+        <p:nvCxnSpPr>
+          <p:cNvPr id="76" name="Straight Connector 75">
+            <a:extLst>
+              <a:ext uri="{FF2B5EF4-FFF2-40B4-BE49-F238E27FC236}">
+                <a16:creationId xmlns:a16="http://schemas.microsoft.com/office/drawing/2014/main" id="{8951F917-3E4D-4ECF-ADF1-5B10B8D2554F}"/>
+              </a:ext>
+            </a:extLst>
+          </p:cNvPr>
+          <p:cNvCxnSpPr/>
+          <p:nvPr/>
+        </p:nvCxnSpPr>
+        <p:spPr>
+          <a:xfrm>
+            <a:off x="2510117" y="5082989"/>
+            <a:ext cx="6795248" cy="0"/>
+          </a:xfrm>
+          <a:prstGeom prst="line">
+            <a:avLst/>
+          </a:prstGeom>
+          <a:ln w="28575">
+            <a:prstDash val="sysDash"/>
+          </a:ln>
+        </p:spPr>
+        <p:style>
+          <a:lnRef idx="1">
+            <a:schemeClr val="accent6"/>
+          </a:lnRef>
+          <a:fillRef idx="0">
+            <a:schemeClr val="accent6"/>
+          </a:fillRef>
+          <a:effectRef idx="0">
+            <a:schemeClr val="accent6"/>
+          </a:effectRef>
+          <a:fontRef idx="minor">
+            <a:schemeClr val="tx1"/>
+          </a:fontRef>
+        </p:style>
+      </p:cxnSp>
+      <p:sp>
+        <p:nvSpPr>
+          <p:cNvPr id="30" name="Rectangle 29">
+            <a:extLst>
+              <a:ext uri="{FF2B5EF4-FFF2-40B4-BE49-F238E27FC236}">
+                <a16:creationId xmlns:a16="http://schemas.microsoft.com/office/drawing/2014/main" id="{E54B7AE9-AB51-48CD-B930-E0405A329D93}"/>
+              </a:ext>
+            </a:extLst>
+          </p:cNvPr>
+          <p:cNvSpPr/>
+          <p:nvPr/>
+        </p:nvSpPr>
+        <p:spPr>
+          <a:xfrm>
+            <a:off x="2626659" y="4177553"/>
+            <a:ext cx="116539" cy="1855683"/>
+          </a:xfrm>
+          <a:prstGeom prst="rect">
+            <a:avLst/>
+          </a:prstGeom>
+        </p:spPr>
+        <p:style>
+          <a:lnRef idx="2">
+            <a:schemeClr val="dk1">
+              <a:shade val="50000"/>
+            </a:schemeClr>
+          </a:lnRef>
+          <a:fillRef idx="1">
+            <a:schemeClr val="dk1"/>
+          </a:fillRef>
+          <a:effectRef idx="0">
+            <a:schemeClr val="dk1"/>
+          </a:effectRef>
+          <a:fontRef idx="minor">
+            <a:schemeClr val="lt1"/>
+          </a:fontRef>
+        </p:style>
+        <p:txBody>
+          <a:bodyPr rtlCol="0" anchor="ctr"/>
+          <a:lstStyle/>
+          <a:p>
+            <a:pPr algn="ctr"/>
+            <a:endParaRPr lang="en-IN"/>
+          </a:p>
+        </p:txBody>
+      </p:sp>
+      <p:sp>
+        <p:nvSpPr>
+          <p:cNvPr id="77" name="TextBox 76">
+            <a:extLst>
+              <a:ext uri="{FF2B5EF4-FFF2-40B4-BE49-F238E27FC236}">
+                <a16:creationId xmlns:a16="http://schemas.microsoft.com/office/drawing/2014/main" id="{904B37A0-49C1-4D1B-9157-F009535FEB4D}"/>
+              </a:ext>
+            </a:extLst>
+          </p:cNvPr>
+          <p:cNvSpPr txBox="1"/>
+          <p:nvPr/>
+        </p:nvSpPr>
+        <p:spPr>
+          <a:xfrm>
+            <a:off x="837080" y="2486816"/>
+            <a:ext cx="1864659" cy="369332"/>
+          </a:xfrm>
+          <a:prstGeom prst="rect">
+            <a:avLst/>
+          </a:prstGeom>
+          <a:noFill/>
+        </p:spPr>
+        <p:txBody>
+          <a:bodyPr wrap="square" rtlCol="0">
+            <a:spAutoFit/>
+          </a:bodyPr>
+          <a:lstStyle/>
+          <a:p>
+            <a:pPr algn="ctr"/>
+            <a:r>
+              <a:rPr lang="en-IN"/>
+              <a:t>Neutral Axis</a:t>
+            </a:r>
+          </a:p>
+        </p:txBody>
+      </p:sp>
+      <p:sp>
+        <p:nvSpPr>
+          <p:cNvPr id="78" name="TextBox 77">
+            <a:extLst>
+              <a:ext uri="{FF2B5EF4-FFF2-40B4-BE49-F238E27FC236}">
+                <a16:creationId xmlns:a16="http://schemas.microsoft.com/office/drawing/2014/main" id="{3AEF964C-55DB-4E60-83D9-AC1908F0D05E}"/>
+              </a:ext>
+            </a:extLst>
+          </p:cNvPr>
+          <p:cNvSpPr txBox="1"/>
+          <p:nvPr/>
+        </p:nvSpPr>
+        <p:spPr>
+          <a:xfrm>
+            <a:off x="837080" y="4898323"/>
+            <a:ext cx="1864659" cy="369332"/>
+          </a:xfrm>
+          <a:prstGeom prst="rect">
+            <a:avLst/>
+          </a:prstGeom>
+          <a:noFill/>
+        </p:spPr>
+        <p:txBody>
+          <a:bodyPr wrap="square" rtlCol="0">
+            <a:spAutoFit/>
+          </a:bodyPr>
+          <a:lstStyle/>
+          <a:p>
+            <a:pPr algn="ctr"/>
+            <a:r>
+              <a:rPr lang="en-IN"/>
+              <a:t>Neutral Axis</a:t>
+            </a:r>
+          </a:p>
+        </p:txBody>
+      </p:sp>
+      <p:sp>
+        <p:nvSpPr>
+          <p:cNvPr id="79" name="TextBox 78">
+            <a:extLst>
+              <a:ext uri="{FF2B5EF4-FFF2-40B4-BE49-F238E27FC236}">
+                <a16:creationId xmlns:a16="http://schemas.microsoft.com/office/drawing/2014/main" id="{692D7BC9-9172-486E-9721-3E742E21D0A5}"/>
+              </a:ext>
+            </a:extLst>
+          </p:cNvPr>
+          <p:cNvSpPr txBox="1"/>
+          <p:nvPr/>
+        </p:nvSpPr>
+        <p:spPr>
+          <a:xfrm>
+            <a:off x="6544230" y="5515996"/>
+            <a:ext cx="1864659" cy="369332"/>
+          </a:xfrm>
+          <a:prstGeom prst="rect">
+            <a:avLst/>
+          </a:prstGeom>
+          <a:noFill/>
+        </p:spPr>
+        <p:txBody>
+          <a:bodyPr wrap="square" rtlCol="0">
+            <a:spAutoFit/>
+          </a:bodyPr>
+          <a:lstStyle/>
+          <a:p>
+            <a:pPr algn="ctr"/>
+            <a:r>
+              <a:rPr lang="en-IN"/>
+              <a:t>Compression</a:t>
+            </a:r>
+          </a:p>
+        </p:txBody>
+      </p:sp>
+      <p:sp>
+        <p:nvSpPr>
+          <p:cNvPr id="80" name="TextBox 79">
+            <a:extLst>
+              <a:ext uri="{FF2B5EF4-FFF2-40B4-BE49-F238E27FC236}">
+                <a16:creationId xmlns:a16="http://schemas.microsoft.com/office/drawing/2014/main" id="{B6C311B0-2680-4447-86D3-7FC63B26E916}"/>
+              </a:ext>
+            </a:extLst>
+          </p:cNvPr>
+          <p:cNvSpPr txBox="1"/>
+          <p:nvPr/>
+        </p:nvSpPr>
+        <p:spPr>
+          <a:xfrm>
+            <a:off x="6559917" y="1444461"/>
+            <a:ext cx="1864659" cy="369332"/>
+          </a:xfrm>
+          <a:prstGeom prst="rect">
+            <a:avLst/>
+          </a:prstGeom>
+          <a:noFill/>
+        </p:spPr>
+        <p:txBody>
+          <a:bodyPr wrap="square" rtlCol="0">
+            <a:spAutoFit/>
+          </a:bodyPr>
+          <a:lstStyle/>
+          <a:p>
+            <a:pPr algn="ctr"/>
+            <a:r>
+              <a:rPr lang="en-IN" b="1"/>
+              <a:t>Cross Section</a:t>
+            </a:r>
+          </a:p>
+        </p:txBody>
+      </p:sp>
+      <p:sp>
+        <p:nvSpPr>
+          <p:cNvPr id="81" name="TextBox 80">
+            <a:extLst>
+              <a:ext uri="{FF2B5EF4-FFF2-40B4-BE49-F238E27FC236}">
+                <a16:creationId xmlns:a16="http://schemas.microsoft.com/office/drawing/2014/main" id="{18E25BE8-4559-4F81-ACAC-00BF45BBE0BC}"/>
+              </a:ext>
+            </a:extLst>
+          </p:cNvPr>
+          <p:cNvSpPr txBox="1"/>
+          <p:nvPr/>
+        </p:nvSpPr>
+        <p:spPr>
+          <a:xfrm>
+            <a:off x="6571129" y="3094637"/>
+            <a:ext cx="1864659" cy="369332"/>
+          </a:xfrm>
+          <a:prstGeom prst="rect">
+            <a:avLst/>
+          </a:prstGeom>
+          <a:noFill/>
+        </p:spPr>
+        <p:txBody>
+          <a:bodyPr wrap="square" rtlCol="0">
+            <a:spAutoFit/>
+          </a:bodyPr>
+          <a:lstStyle/>
+          <a:p>
+            <a:pPr algn="ctr"/>
+            <a:r>
+              <a:rPr lang="en-IN"/>
+              <a:t>Tension</a:t>
+            </a:r>
+          </a:p>
+        </p:txBody>
+      </p:sp>
+      <p:sp>
+        <p:nvSpPr>
+          <p:cNvPr id="82" name="TextBox 81">
+            <a:extLst>
+              <a:ext uri="{FF2B5EF4-FFF2-40B4-BE49-F238E27FC236}">
+                <a16:creationId xmlns:a16="http://schemas.microsoft.com/office/drawing/2014/main" id="{A87623A2-70A2-4D52-AEB6-64D98C57A818}"/>
+              </a:ext>
+            </a:extLst>
+          </p:cNvPr>
+          <p:cNvSpPr txBox="1"/>
+          <p:nvPr/>
+        </p:nvSpPr>
+        <p:spPr>
+          <a:xfrm>
+            <a:off x="6606984" y="4315616"/>
+            <a:ext cx="1864659" cy="369332"/>
+          </a:xfrm>
+          <a:prstGeom prst="rect">
+            <a:avLst/>
+          </a:prstGeom>
+          <a:noFill/>
+        </p:spPr>
+        <p:txBody>
+          <a:bodyPr wrap="square" rtlCol="0">
+            <a:spAutoFit/>
+          </a:bodyPr>
+          <a:lstStyle/>
+          <a:p>
+            <a:pPr algn="ctr"/>
+            <a:r>
+              <a:rPr lang="en-IN"/>
+              <a:t>Tension</a:t>
+            </a:r>
+          </a:p>
+        </p:txBody>
+      </p:sp>
+      <p:sp>
+        <p:nvSpPr>
+          <p:cNvPr id="83" name="TextBox 82">
+            <a:extLst>
+              <a:ext uri="{FF2B5EF4-FFF2-40B4-BE49-F238E27FC236}">
+                <a16:creationId xmlns:a16="http://schemas.microsoft.com/office/drawing/2014/main" id="{0F873DA8-3087-4385-9208-6E54E5120299}"/>
+              </a:ext>
+            </a:extLst>
+          </p:cNvPr>
+          <p:cNvSpPr txBox="1"/>
+          <p:nvPr/>
+        </p:nvSpPr>
+        <p:spPr>
+          <a:xfrm>
+            <a:off x="8576982" y="2676599"/>
+            <a:ext cx="248772" cy="584775"/>
+          </a:xfrm>
+          <a:prstGeom prst="rect">
+            <a:avLst/>
+          </a:prstGeom>
+          <a:noFill/>
+        </p:spPr>
+        <p:txBody>
+          <a:bodyPr wrap="square" rtlCol="0">
+            <a:spAutoFit/>
+          </a:bodyPr>
+          <a:lstStyle/>
+          <a:p>
+            <a:pPr algn="ctr"/>
+            <a:r>
+              <a:rPr lang="en-IN" sz="3200"/>
+              <a:t>+</a:t>
+            </a:r>
+          </a:p>
+        </p:txBody>
+      </p:sp>
+      <p:sp>
+        <p:nvSpPr>
+          <p:cNvPr id="84" name="TextBox 83">
+            <a:extLst>
+              <a:ext uri="{FF2B5EF4-FFF2-40B4-BE49-F238E27FC236}">
+                <a16:creationId xmlns:a16="http://schemas.microsoft.com/office/drawing/2014/main" id="{EFCD12A9-0DFF-4D6E-8A00-A524E79AD002}"/>
+              </a:ext>
+            </a:extLst>
+          </p:cNvPr>
+          <p:cNvSpPr txBox="1"/>
+          <p:nvPr/>
+        </p:nvSpPr>
+        <p:spPr>
+          <a:xfrm>
+            <a:off x="8928847" y="5082989"/>
+            <a:ext cx="387721" cy="584775"/>
+          </a:xfrm>
+          <a:prstGeom prst="rect">
+            <a:avLst/>
+          </a:prstGeom>
+          <a:noFill/>
+        </p:spPr>
+        <p:txBody>
+          <a:bodyPr wrap="square" rtlCol="0">
+            <a:spAutoFit/>
+          </a:bodyPr>
+          <a:lstStyle/>
+          <a:p>
+            <a:pPr algn="ctr"/>
+            <a:r>
+              <a:rPr lang="en-IN" sz="3200"/>
+              <a:t>-</a:t>
+            </a:r>
+          </a:p>
+        </p:txBody>
+      </p:sp>
+      <p:sp>
+        <p:nvSpPr>
+          <p:cNvPr id="85" name="TextBox 84">
+            <a:extLst>
+              <a:ext uri="{FF2B5EF4-FFF2-40B4-BE49-F238E27FC236}">
+                <a16:creationId xmlns:a16="http://schemas.microsoft.com/office/drawing/2014/main" id="{3C8428B9-BE1A-4A5C-A908-871E59C57A4E}"/>
+              </a:ext>
+            </a:extLst>
+          </p:cNvPr>
+          <p:cNvSpPr txBox="1"/>
+          <p:nvPr/>
+        </p:nvSpPr>
+        <p:spPr>
+          <a:xfrm>
+            <a:off x="8572494" y="4475057"/>
+            <a:ext cx="248772" cy="584775"/>
+          </a:xfrm>
+          <a:prstGeom prst="rect">
+            <a:avLst/>
+          </a:prstGeom>
+          <a:noFill/>
+        </p:spPr>
+        <p:txBody>
+          <a:bodyPr wrap="square" rtlCol="0">
+            <a:spAutoFit/>
+          </a:bodyPr>
+          <a:lstStyle/>
+          <a:p>
+            <a:pPr algn="ctr"/>
+            <a:r>
+              <a:rPr lang="en-IN" sz="3200"/>
+              <a:t>+</a:t>
+            </a:r>
+          </a:p>
+        </p:txBody>
+      </p:sp>
+      <p:sp>
+        <p:nvSpPr>
+          <p:cNvPr id="86" name="TextBox 85">
+            <a:extLst>
+              <a:ext uri="{FF2B5EF4-FFF2-40B4-BE49-F238E27FC236}">
+                <a16:creationId xmlns:a16="http://schemas.microsoft.com/office/drawing/2014/main" id="{EE228101-4158-4850-B415-659ECAB130D4}"/>
+              </a:ext>
+            </a:extLst>
+          </p:cNvPr>
+          <p:cNvSpPr txBox="1"/>
+          <p:nvPr/>
+        </p:nvSpPr>
+        <p:spPr>
+          <a:xfrm>
+            <a:off x="8892985" y="2063262"/>
+            <a:ext cx="387721" cy="584775"/>
+          </a:xfrm>
+          <a:prstGeom prst="rect">
+            <a:avLst/>
+          </a:prstGeom>
+          <a:noFill/>
+        </p:spPr>
+        <p:txBody>
+          <a:bodyPr wrap="square" rtlCol="0">
+            <a:spAutoFit/>
+          </a:bodyPr>
+          <a:lstStyle/>
+          <a:p>
+            <a:pPr algn="ctr"/>
+            <a:r>
+              <a:rPr lang="en-IN" sz="3200"/>
+              <a:t>-</a:t>
+            </a:r>
+          </a:p>
+        </p:txBody>
+      </p:sp>
+      <p:sp>
+        <p:nvSpPr>
+          <p:cNvPr id="87" name="TextBox 86">
+            <a:extLst>
+              <a:ext uri="{FF2B5EF4-FFF2-40B4-BE49-F238E27FC236}">
+                <a16:creationId xmlns:a16="http://schemas.microsoft.com/office/drawing/2014/main" id="{A1EF2205-1224-4C87-98E4-E68F674B1F9F}"/>
+              </a:ext>
+            </a:extLst>
+          </p:cNvPr>
+          <p:cNvSpPr txBox="1"/>
+          <p:nvPr/>
+        </p:nvSpPr>
+        <p:spPr>
+          <a:xfrm>
+            <a:off x="6606983" y="1857726"/>
+            <a:ext cx="1864659" cy="369332"/>
+          </a:xfrm>
+          <a:prstGeom prst="rect">
+            <a:avLst/>
+          </a:prstGeom>
+          <a:noFill/>
+        </p:spPr>
+        <p:txBody>
+          <a:bodyPr wrap="square" rtlCol="0">
+            <a:spAutoFit/>
+          </a:bodyPr>
+          <a:lstStyle/>
+          <a:p>
+            <a:pPr algn="ctr"/>
+            <a:r>
+              <a:rPr lang="en-IN"/>
+              <a:t>Compression</a:t>
+            </a:r>
+          </a:p>
+        </p:txBody>
+      </p:sp>
+      <p:sp>
+        <p:nvSpPr>
+          <p:cNvPr id="88" name="TextBox 87">
+            <a:extLst>
+              <a:ext uri="{FF2B5EF4-FFF2-40B4-BE49-F238E27FC236}">
+                <a16:creationId xmlns:a16="http://schemas.microsoft.com/office/drawing/2014/main" id="{08254F3A-4AB2-41A2-98B4-698089C76007}"/>
+              </a:ext>
+            </a:extLst>
+          </p:cNvPr>
+          <p:cNvSpPr txBox="1"/>
+          <p:nvPr/>
+        </p:nvSpPr>
+        <p:spPr>
+          <a:xfrm>
+            <a:off x="8082798" y="3272134"/>
+            <a:ext cx="1864659" cy="369332"/>
+          </a:xfrm>
+          <a:prstGeom prst="rect">
+            <a:avLst/>
+          </a:prstGeom>
+          <a:noFill/>
+        </p:spPr>
+        <p:txBody>
+          <a:bodyPr wrap="square" rtlCol="0">
+            <a:spAutoFit/>
+          </a:bodyPr>
+          <a:lstStyle/>
+          <a:p>
+            <a:pPr algn="ctr"/>
+            <a:r>
+              <a:rPr lang="en-IN" b="1"/>
+              <a:t>Bending Stress</a:t>
+            </a:r>
+          </a:p>
+        </p:txBody>
+      </p:sp>
+      <p:sp>
+        <p:nvSpPr>
+          <p:cNvPr id="89" name="TextBox 88">
+            <a:extLst>
+              <a:ext uri="{FF2B5EF4-FFF2-40B4-BE49-F238E27FC236}">
+                <a16:creationId xmlns:a16="http://schemas.microsoft.com/office/drawing/2014/main" id="{971D1570-867A-4CA6-BB30-158D079036D9}"/>
+              </a:ext>
+            </a:extLst>
+          </p:cNvPr>
+          <p:cNvSpPr txBox="1"/>
+          <p:nvPr/>
+        </p:nvSpPr>
+        <p:spPr>
+          <a:xfrm>
+            <a:off x="8154515" y="5652248"/>
+            <a:ext cx="1864659" cy="369332"/>
+          </a:xfrm>
+          <a:prstGeom prst="rect">
+            <a:avLst/>
+          </a:prstGeom>
+          <a:noFill/>
+        </p:spPr>
+        <p:txBody>
+          <a:bodyPr wrap="square" rtlCol="0">
+            <a:spAutoFit/>
+          </a:bodyPr>
+          <a:lstStyle/>
+          <a:p>
+            <a:pPr algn="ctr"/>
+            <a:r>
+              <a:rPr lang="en-IN" b="1"/>
+              <a:t>Bending Stress</a:t>
+            </a:r>
+          </a:p>
+        </p:txBody>
+      </p:sp>
+      <p:sp>
+        <p:nvSpPr>
+          <p:cNvPr id="90" name="TextBox 89">
+            <a:extLst>
+              <a:ext uri="{FF2B5EF4-FFF2-40B4-BE49-F238E27FC236}">
+                <a16:creationId xmlns:a16="http://schemas.microsoft.com/office/drawing/2014/main" id="{AC1D3DE9-79DF-4213-BF46-7FD580363015}"/>
+              </a:ext>
+            </a:extLst>
+          </p:cNvPr>
+          <p:cNvSpPr txBox="1"/>
+          <p:nvPr/>
+        </p:nvSpPr>
+        <p:spPr>
+          <a:xfrm>
+            <a:off x="6584574" y="4000073"/>
+            <a:ext cx="1864659" cy="369332"/>
+          </a:xfrm>
+          <a:prstGeom prst="rect">
+            <a:avLst/>
+          </a:prstGeom>
+          <a:noFill/>
+        </p:spPr>
+        <p:txBody>
+          <a:bodyPr wrap="square" rtlCol="0">
+            <a:spAutoFit/>
+          </a:bodyPr>
+          <a:lstStyle/>
+          <a:p>
+            <a:pPr algn="ctr"/>
+            <a:r>
+              <a:rPr lang="en-IN" b="1"/>
+              <a:t>Cross Section</a:t>
+            </a:r>
+          </a:p>
+        </p:txBody>
+      </p:sp>
+      <p:sp>
+        <p:nvSpPr>
+          <p:cNvPr id="91" name="TextBox 90">
+            <a:extLst>
+              <a:ext uri="{FF2B5EF4-FFF2-40B4-BE49-F238E27FC236}">
+                <a16:creationId xmlns:a16="http://schemas.microsoft.com/office/drawing/2014/main" id="{32124224-6C74-45DA-9D74-58E32508D251}"/>
+              </a:ext>
+            </a:extLst>
+          </p:cNvPr>
+          <p:cNvSpPr txBox="1"/>
+          <p:nvPr/>
+        </p:nvSpPr>
+        <p:spPr>
+          <a:xfrm>
+            <a:off x="3733795" y="3202213"/>
+            <a:ext cx="1864659" cy="369332"/>
+          </a:xfrm>
+          <a:prstGeom prst="rect">
+            <a:avLst/>
+          </a:prstGeom>
+          <a:noFill/>
+        </p:spPr>
+        <p:txBody>
+          <a:bodyPr wrap="square" rtlCol="0">
+            <a:spAutoFit/>
+          </a:bodyPr>
+          <a:lstStyle/>
+          <a:p>
+            <a:pPr algn="ctr"/>
+            <a:r>
+              <a:rPr lang="en-IN" b="1"/>
+              <a:t>Simply supported</a:t>
+            </a:r>
+          </a:p>
+        </p:txBody>
+      </p:sp>
+      <p:sp>
+        <p:nvSpPr>
+          <p:cNvPr id="92" name="TextBox 91">
+            <a:extLst>
+              <a:ext uri="{FF2B5EF4-FFF2-40B4-BE49-F238E27FC236}">
+                <a16:creationId xmlns:a16="http://schemas.microsoft.com/office/drawing/2014/main" id="{B0C0F8FA-4AD2-4D7A-B0DE-6910A1A80597}"/>
+              </a:ext>
+            </a:extLst>
+          </p:cNvPr>
+          <p:cNvSpPr txBox="1"/>
+          <p:nvPr/>
+        </p:nvSpPr>
+        <p:spPr>
+          <a:xfrm>
+            <a:off x="3783112" y="5638802"/>
+            <a:ext cx="1864659" cy="369332"/>
+          </a:xfrm>
+          <a:prstGeom prst="rect">
+            <a:avLst/>
+          </a:prstGeom>
+          <a:noFill/>
+        </p:spPr>
+        <p:txBody>
+          <a:bodyPr wrap="square" rtlCol="0">
+            <a:spAutoFit/>
+          </a:bodyPr>
+          <a:lstStyle/>
+          <a:p>
+            <a:pPr algn="ctr"/>
+            <a:r>
+              <a:rPr lang="en-IN" b="1"/>
+              <a:t>Cantilever</a:t>
+            </a:r>
+          </a:p>
+        </p:txBody>
+      </p:sp>
+    </p:spTree>
+    <p:extLst>
+      <p:ext uri="{BB962C8B-B14F-4D97-AF65-F5344CB8AC3E}">
+        <p14:creationId xmlns:p14="http://schemas.microsoft.com/office/powerpoint/2010/main" val="235272759"/>
+      </p:ext>
+    </p:extLst>
+  </p:cSld>
+  <p:clrMapOvr>
+    <a:masterClrMapping/>
+  </p:clrMapOvr>
+</p:sld>
+</file>
+
+<file path=ppt/slides/slide25.xml><?xml version="1.0" encoding="utf-8"?>
+<p:sld xmlns:a="http://schemas.openxmlformats.org/drawingml/2006/main" xmlns:r="http://schemas.openxmlformats.org/officeDocument/2006/relationships" xmlns:p="http://schemas.openxmlformats.org/presentationml/2006/main">
+  <p:cSld>
+    <p:spTree>
+      <p:nvGrpSpPr>
+        <p:cNvPr id="1" name=""/>
+        <p:cNvGrpSpPr/>
+        <p:nvPr/>
+      </p:nvGrpSpPr>
+      <p:grpSpPr>
+        <a:xfrm>
+          <a:off x="0" y="0"/>
+          <a:ext cx="0" cy="0"/>
+          <a:chOff x="0" y="0"/>
+          <a:chExt cx="0" cy="0"/>
+        </a:xfrm>
+      </p:grpSpPr>
+      <p:sp>
+        <p:nvSpPr>
+          <p:cNvPr id="77" name="TextBox 76">
+            <a:extLst>
+              <a:ext uri="{FF2B5EF4-FFF2-40B4-BE49-F238E27FC236}">
+                <a16:creationId xmlns:a16="http://schemas.microsoft.com/office/drawing/2014/main" id="{904B37A0-49C1-4D1B-9157-F009535FEB4D}"/>
+              </a:ext>
+            </a:extLst>
+          </p:cNvPr>
+          <p:cNvSpPr txBox="1"/>
+          <p:nvPr/>
+        </p:nvSpPr>
+        <p:spPr>
+          <a:xfrm>
+            <a:off x="1488590" y="3007667"/>
+            <a:ext cx="1864659" cy="369332"/>
+          </a:xfrm>
+          <a:prstGeom prst="rect">
+            <a:avLst/>
+          </a:prstGeom>
+          <a:noFill/>
+        </p:spPr>
+        <p:txBody>
+          <a:bodyPr wrap="square" rtlCol="0">
+            <a:spAutoFit/>
+          </a:bodyPr>
+          <a:lstStyle/>
+          <a:p>
+            <a:pPr algn="ctr"/>
+            <a:r>
+              <a:rPr lang="en-IN"/>
+              <a:t>Neutral Axis</a:t>
+            </a:r>
+          </a:p>
+        </p:txBody>
+      </p:sp>
+      <p:sp>
+        <p:nvSpPr>
+          <p:cNvPr id="51" name="Trapezoid 50">
+            <a:extLst>
+              <a:ext uri="{FF2B5EF4-FFF2-40B4-BE49-F238E27FC236}">
+                <a16:creationId xmlns:a16="http://schemas.microsoft.com/office/drawing/2014/main" id="{B56F1824-FFBF-4A39-A0FA-1809A04A3434}"/>
+              </a:ext>
+            </a:extLst>
+          </p:cNvPr>
+          <p:cNvSpPr/>
+          <p:nvPr/>
+        </p:nvSpPr>
+        <p:spPr>
+          <a:xfrm>
+            <a:off x="3088344" y="1974031"/>
+            <a:ext cx="3079374" cy="2436604"/>
+          </a:xfrm>
+          <a:prstGeom prst="trapezoid">
+            <a:avLst/>
+          </a:prstGeom>
+        </p:spPr>
+        <p:style>
+          <a:lnRef idx="1">
+            <a:schemeClr val="accent5"/>
+          </a:lnRef>
+          <a:fillRef idx="2">
+            <a:schemeClr val="accent5"/>
+          </a:fillRef>
+          <a:effectRef idx="1">
+            <a:schemeClr val="accent5"/>
+          </a:effectRef>
+          <a:fontRef idx="minor">
+            <a:schemeClr val="dk1"/>
+          </a:fontRef>
+        </p:style>
+        <p:txBody>
+          <a:bodyPr rtlCol="0" anchor="ctr"/>
+          <a:lstStyle/>
+          <a:p>
+            <a:pPr algn="ctr"/>
+            <a:endParaRPr lang="en-IN"/>
+          </a:p>
+        </p:txBody>
+      </p:sp>
+      <p:cxnSp>
+        <p:nvCxnSpPr>
+          <p:cNvPr id="53" name="Straight Connector 52">
+            <a:extLst>
+              <a:ext uri="{FF2B5EF4-FFF2-40B4-BE49-F238E27FC236}">
+                <a16:creationId xmlns:a16="http://schemas.microsoft.com/office/drawing/2014/main" id="{0CA191DB-4536-4462-8AB0-5FD338D24DE6}"/>
+              </a:ext>
+            </a:extLst>
+          </p:cNvPr>
+          <p:cNvCxnSpPr>
+            <a:cxnSpLocks/>
+          </p:cNvCxnSpPr>
+          <p:nvPr/>
+        </p:nvCxnSpPr>
+        <p:spPr>
+          <a:xfrm>
+            <a:off x="3195920" y="3182472"/>
+            <a:ext cx="6199540" cy="0"/>
+          </a:xfrm>
+          <a:prstGeom prst="line">
+            <a:avLst/>
+          </a:prstGeom>
+          <a:ln w="28575">
+            <a:prstDash val="sysDash"/>
+          </a:ln>
+        </p:spPr>
+        <p:style>
+          <a:lnRef idx="1">
+            <a:schemeClr val="accent6"/>
+          </a:lnRef>
+          <a:fillRef idx="0">
+            <a:schemeClr val="accent6"/>
+          </a:fillRef>
+          <a:effectRef idx="0">
+            <a:schemeClr val="accent6"/>
+          </a:effectRef>
+          <a:fontRef idx="minor">
+            <a:schemeClr val="tx1"/>
+          </a:fontRef>
+        </p:style>
+      </p:cxnSp>
+      <p:sp>
+        <p:nvSpPr>
+          <p:cNvPr id="54" name="Trapezoid 53">
+            <a:extLst>
+              <a:ext uri="{FF2B5EF4-FFF2-40B4-BE49-F238E27FC236}">
+                <a16:creationId xmlns:a16="http://schemas.microsoft.com/office/drawing/2014/main" id="{42389834-026C-4F77-AC18-347990581232}"/>
+              </a:ext>
+            </a:extLst>
+          </p:cNvPr>
+          <p:cNvSpPr/>
+          <p:nvPr/>
+        </p:nvSpPr>
+        <p:spPr>
+          <a:xfrm>
+            <a:off x="3554506" y="2288713"/>
+            <a:ext cx="2156011" cy="284158"/>
+          </a:xfrm>
+          <a:prstGeom prst="trapezoid">
+            <a:avLst/>
+          </a:prstGeom>
+          <a:pattFill prst="wdUpDiag">
+            <a:fgClr>
+              <a:schemeClr val="accent1"/>
+            </a:fgClr>
+            <a:bgClr>
+              <a:schemeClr val="bg1"/>
+            </a:bgClr>
+          </a:pattFill>
+          <a:ln>
+            <a:noFill/>
+          </a:ln>
+        </p:spPr>
+        <p:style>
+          <a:lnRef idx="3">
+            <a:schemeClr val="lt1"/>
+          </a:lnRef>
+          <a:fillRef idx="1">
+            <a:schemeClr val="accent1"/>
+          </a:fillRef>
+          <a:effectRef idx="1">
+            <a:schemeClr val="accent1"/>
+          </a:effectRef>
+          <a:fontRef idx="minor">
+            <a:schemeClr val="lt1"/>
+          </a:fontRef>
+        </p:style>
+        <p:txBody>
+          <a:bodyPr rtlCol="0" anchor="ctr"/>
+          <a:lstStyle/>
+          <a:p>
+            <a:pPr algn="ctr"/>
+            <a:endParaRPr lang="en-IN"/>
+          </a:p>
+        </p:txBody>
+      </p:sp>
+      <p:sp>
+        <p:nvSpPr>
+          <p:cNvPr id="3" name="Rectangle 2">
+            <a:extLst>
+              <a:ext uri="{FF2B5EF4-FFF2-40B4-BE49-F238E27FC236}">
+                <a16:creationId xmlns:a16="http://schemas.microsoft.com/office/drawing/2014/main" id="{FB802FAC-B799-4518-BFBE-791688E2BDED}"/>
+              </a:ext>
+            </a:extLst>
+          </p:cNvPr>
+          <p:cNvSpPr/>
+          <p:nvPr/>
+        </p:nvSpPr>
+        <p:spPr>
+          <a:xfrm>
+            <a:off x="4421843" y="2288713"/>
+            <a:ext cx="412376" cy="284157"/>
+          </a:xfrm>
+          <a:prstGeom prst="rect">
+            <a:avLst/>
+          </a:prstGeom>
+          <a:pattFill prst="narVert">
+            <a:fgClr>
+              <a:schemeClr val="dk1"/>
+            </a:fgClr>
+            <a:bgClr>
+              <a:schemeClr val="bg1"/>
+            </a:bgClr>
+          </a:pattFill>
+        </p:spPr>
+        <p:style>
+          <a:lnRef idx="2">
+            <a:schemeClr val="dk1">
+              <a:shade val="50000"/>
+            </a:schemeClr>
+          </a:lnRef>
+          <a:fillRef idx="1">
+            <a:schemeClr val="dk1"/>
+          </a:fillRef>
+          <a:effectRef idx="0">
+            <a:schemeClr val="dk1"/>
+          </a:effectRef>
+          <a:fontRef idx="minor">
+            <a:schemeClr val="lt1"/>
+          </a:fontRef>
+        </p:style>
+        <p:txBody>
+          <a:bodyPr rtlCol="0" anchor="ctr"/>
+          <a:lstStyle/>
+          <a:p>
+            <a:pPr algn="ctr"/>
+            <a:endParaRPr lang="en-IN"/>
+          </a:p>
+        </p:txBody>
+      </p:sp>
+      <p:sp>
+        <p:nvSpPr>
+          <p:cNvPr id="57" name="TextBox 56">
+            <a:extLst>
+              <a:ext uri="{FF2B5EF4-FFF2-40B4-BE49-F238E27FC236}">
+                <a16:creationId xmlns:a16="http://schemas.microsoft.com/office/drawing/2014/main" id="{3E287F33-B21E-4529-B8BF-672D80576BDB}"/>
+              </a:ext>
+            </a:extLst>
+          </p:cNvPr>
+          <p:cNvSpPr txBox="1"/>
+          <p:nvPr/>
+        </p:nvSpPr>
+        <p:spPr>
+          <a:xfrm>
+            <a:off x="3695701" y="1946706"/>
+            <a:ext cx="1864659" cy="369332"/>
+          </a:xfrm>
+          <a:prstGeom prst="rect">
+            <a:avLst/>
+          </a:prstGeom>
+          <a:noFill/>
+        </p:spPr>
+        <p:txBody>
+          <a:bodyPr wrap="square" rtlCol="0">
+            <a:spAutoFit/>
+          </a:bodyPr>
+          <a:lstStyle/>
+          <a:p>
+            <a:pPr algn="ctr"/>
+            <a:r>
+              <a:rPr lang="en-IN"/>
+              <a:t>dA</a:t>
+            </a:r>
+          </a:p>
+        </p:txBody>
+      </p:sp>
+      <p:cxnSp>
+        <p:nvCxnSpPr>
+          <p:cNvPr id="7" name="Straight Arrow Connector 6">
+            <a:extLst>
+              <a:ext uri="{FF2B5EF4-FFF2-40B4-BE49-F238E27FC236}">
+                <a16:creationId xmlns:a16="http://schemas.microsoft.com/office/drawing/2014/main" id="{60BA1087-67CB-4DCD-92FD-6D864AED5F30}"/>
+              </a:ext>
+            </a:extLst>
+          </p:cNvPr>
+          <p:cNvCxnSpPr/>
+          <p:nvPr/>
+        </p:nvCxnSpPr>
+        <p:spPr>
+          <a:xfrm flipV="1">
+            <a:off x="5151120" y="2572870"/>
+            <a:ext cx="0" cy="609602"/>
+          </a:xfrm>
+          <a:prstGeom prst="straightConnector1">
+            <a:avLst/>
+          </a:prstGeom>
+          <a:ln w="38100">
+            <a:headEnd type="triangle"/>
+            <a:tailEnd type="triangle"/>
+          </a:ln>
+        </p:spPr>
+        <p:style>
+          <a:lnRef idx="1">
+            <a:schemeClr val="dk1"/>
+          </a:lnRef>
+          <a:fillRef idx="0">
+            <a:schemeClr val="dk1"/>
+          </a:fillRef>
+          <a:effectRef idx="0">
+            <a:schemeClr val="dk1"/>
+          </a:effectRef>
+          <a:fontRef idx="minor">
+            <a:schemeClr val="tx1"/>
+          </a:fontRef>
+        </p:style>
+      </p:cxnSp>
+      <p:cxnSp>
+        <p:nvCxnSpPr>
+          <p:cNvPr id="61" name="Straight Arrow Connector 60">
+            <a:extLst>
+              <a:ext uri="{FF2B5EF4-FFF2-40B4-BE49-F238E27FC236}">
+                <a16:creationId xmlns:a16="http://schemas.microsoft.com/office/drawing/2014/main" id="{60D8C991-8D30-4CDB-B17C-4C5495CA81FC}"/>
+              </a:ext>
+            </a:extLst>
+          </p:cNvPr>
+          <p:cNvCxnSpPr>
+            <a:cxnSpLocks/>
+          </p:cNvCxnSpPr>
+          <p:nvPr/>
+        </p:nvCxnSpPr>
+        <p:spPr>
+          <a:xfrm flipV="1">
+            <a:off x="6035040" y="1946706"/>
+            <a:ext cx="0" cy="1235766"/>
+          </a:xfrm>
+          <a:prstGeom prst="straightConnector1">
+            <a:avLst/>
+          </a:prstGeom>
+          <a:ln w="38100">
+            <a:headEnd type="triangle"/>
+            <a:tailEnd type="triangle"/>
+          </a:ln>
+        </p:spPr>
+        <p:style>
+          <a:lnRef idx="1">
+            <a:schemeClr val="dk1"/>
+          </a:lnRef>
+          <a:fillRef idx="0">
+            <a:schemeClr val="dk1"/>
+          </a:fillRef>
+          <a:effectRef idx="0">
+            <a:schemeClr val="dk1"/>
+          </a:effectRef>
+          <a:fontRef idx="minor">
+            <a:schemeClr val="tx1"/>
+          </a:fontRef>
+        </p:style>
+      </p:cxnSp>
+      <p:sp>
+        <p:nvSpPr>
+          <p:cNvPr id="62" name="TextBox 61">
+            <a:extLst>
+              <a:ext uri="{FF2B5EF4-FFF2-40B4-BE49-F238E27FC236}">
+                <a16:creationId xmlns:a16="http://schemas.microsoft.com/office/drawing/2014/main" id="{FAF505A7-251F-49C3-A12C-EF7B50CCF661}"/>
+              </a:ext>
+            </a:extLst>
+          </p:cNvPr>
+          <p:cNvSpPr txBox="1"/>
+          <p:nvPr/>
+        </p:nvSpPr>
+        <p:spPr>
+          <a:xfrm>
+            <a:off x="5031892" y="2664345"/>
+            <a:ext cx="510539" cy="369332"/>
+          </a:xfrm>
+          <a:prstGeom prst="rect">
+            <a:avLst/>
+          </a:prstGeom>
+          <a:noFill/>
+        </p:spPr>
+        <p:txBody>
+          <a:bodyPr wrap="square" rtlCol="0">
+            <a:spAutoFit/>
+          </a:bodyPr>
+          <a:lstStyle/>
+          <a:p>
+            <a:pPr algn="ctr"/>
+            <a:r>
+              <a:rPr lang="en-IN"/>
+              <a:t>y</a:t>
+            </a:r>
+          </a:p>
+        </p:txBody>
+      </p:sp>
+      <p:sp>
+        <p:nvSpPr>
+          <p:cNvPr id="93" name="TextBox 92">
+            <a:extLst>
+              <a:ext uri="{FF2B5EF4-FFF2-40B4-BE49-F238E27FC236}">
+                <a16:creationId xmlns:a16="http://schemas.microsoft.com/office/drawing/2014/main" id="{9E92203D-786A-441D-AD58-F854C98EE84A}"/>
+              </a:ext>
+            </a:extLst>
+          </p:cNvPr>
+          <p:cNvSpPr txBox="1"/>
+          <p:nvPr/>
+        </p:nvSpPr>
+        <p:spPr>
+          <a:xfrm>
+            <a:off x="6013527" y="2379923"/>
+            <a:ext cx="756173" cy="369332"/>
+          </a:xfrm>
+          <a:prstGeom prst="rect">
+            <a:avLst/>
+          </a:prstGeom>
+          <a:noFill/>
+        </p:spPr>
+        <p:txBody>
+          <a:bodyPr wrap="square" rtlCol="0">
+            <a:spAutoFit/>
+          </a:bodyPr>
+          <a:lstStyle/>
+          <a:p>
+            <a:pPr algn="ctr"/>
+            <a:r>
+              <a:rPr lang="en-IN"/>
+              <a:t>Ymax</a:t>
+            </a:r>
+          </a:p>
+        </p:txBody>
+      </p:sp>
+      <p:cxnSp>
+        <p:nvCxnSpPr>
+          <p:cNvPr id="12" name="Straight Connector 11">
+            <a:extLst>
+              <a:ext uri="{FF2B5EF4-FFF2-40B4-BE49-F238E27FC236}">
+                <a16:creationId xmlns:a16="http://schemas.microsoft.com/office/drawing/2014/main" id="{EF410134-BC37-4EB7-8009-A1CA3B8FE379}"/>
+              </a:ext>
+            </a:extLst>
+          </p:cNvPr>
+          <p:cNvCxnSpPr/>
+          <p:nvPr/>
+        </p:nvCxnSpPr>
+        <p:spPr>
+          <a:xfrm flipV="1">
+            <a:off x="8321040" y="1974031"/>
+            <a:ext cx="0" cy="2436604"/>
+          </a:xfrm>
+          <a:prstGeom prst="line">
+            <a:avLst/>
+          </a:prstGeom>
+          <a:ln w="28575"/>
+        </p:spPr>
+        <p:style>
+          <a:lnRef idx="1">
+            <a:schemeClr val="dk1"/>
+          </a:lnRef>
+          <a:fillRef idx="0">
+            <a:schemeClr val="dk1"/>
+          </a:fillRef>
+          <a:effectRef idx="0">
+            <a:schemeClr val="dk1"/>
+          </a:effectRef>
+          <a:fontRef idx="minor">
+            <a:schemeClr val="tx1"/>
+          </a:fontRef>
+        </p:style>
+      </p:cxnSp>
+      <p:cxnSp>
+        <p:nvCxnSpPr>
+          <p:cNvPr id="15" name="Straight Connector 14">
+            <a:extLst>
+              <a:ext uri="{FF2B5EF4-FFF2-40B4-BE49-F238E27FC236}">
+                <a16:creationId xmlns:a16="http://schemas.microsoft.com/office/drawing/2014/main" id="{C0D48611-7C48-4CC8-9F21-64D68CE43FF5}"/>
+              </a:ext>
+            </a:extLst>
+          </p:cNvPr>
+          <p:cNvCxnSpPr>
+            <a:cxnSpLocks/>
+          </p:cNvCxnSpPr>
+          <p:nvPr/>
+        </p:nvCxnSpPr>
+        <p:spPr>
+          <a:xfrm flipH="1">
+            <a:off x="7340302" y="1974031"/>
+            <a:ext cx="1948478" cy="2436604"/>
+          </a:xfrm>
+          <a:prstGeom prst="line">
+            <a:avLst/>
+          </a:prstGeom>
+          <a:ln w="28575"/>
+        </p:spPr>
+        <p:style>
+          <a:lnRef idx="1">
+            <a:schemeClr val="dk1"/>
+          </a:lnRef>
+          <a:fillRef idx="0">
+            <a:schemeClr val="dk1"/>
+          </a:fillRef>
+          <a:effectRef idx="0">
+            <a:schemeClr val="dk1"/>
+          </a:effectRef>
+          <a:fontRef idx="minor">
+            <a:schemeClr val="tx1"/>
+          </a:fontRef>
+        </p:style>
+      </p:cxnSp>
+      <p:cxnSp>
+        <p:nvCxnSpPr>
+          <p:cNvPr id="20" name="Straight Connector 19">
+            <a:extLst>
+              <a:ext uri="{FF2B5EF4-FFF2-40B4-BE49-F238E27FC236}">
+                <a16:creationId xmlns:a16="http://schemas.microsoft.com/office/drawing/2014/main" id="{FDE2D948-19BD-4F3F-BCB2-2A84A9A1A3B8}"/>
+              </a:ext>
+            </a:extLst>
+          </p:cNvPr>
+          <p:cNvCxnSpPr/>
+          <p:nvPr/>
+        </p:nvCxnSpPr>
+        <p:spPr>
+          <a:xfrm>
+            <a:off x="8314541" y="1974031"/>
+            <a:ext cx="974239" cy="0"/>
+          </a:xfrm>
+          <a:prstGeom prst="line">
+            <a:avLst/>
+          </a:prstGeom>
+          <a:ln w="28575"/>
+        </p:spPr>
+        <p:style>
+          <a:lnRef idx="1">
+            <a:schemeClr val="dk1"/>
+          </a:lnRef>
+          <a:fillRef idx="0">
+            <a:schemeClr val="dk1"/>
+          </a:fillRef>
+          <a:effectRef idx="0">
+            <a:schemeClr val="dk1"/>
+          </a:effectRef>
+          <a:fontRef idx="minor">
+            <a:schemeClr val="tx1"/>
+          </a:fontRef>
+        </p:style>
+      </p:cxnSp>
+      <p:cxnSp>
+        <p:nvCxnSpPr>
+          <p:cNvPr id="94" name="Straight Connector 93">
+            <a:extLst>
+              <a:ext uri="{FF2B5EF4-FFF2-40B4-BE49-F238E27FC236}">
+                <a16:creationId xmlns:a16="http://schemas.microsoft.com/office/drawing/2014/main" id="{2CF06303-62B2-480D-B7EB-C60C4E6D754D}"/>
+              </a:ext>
+            </a:extLst>
+          </p:cNvPr>
+          <p:cNvCxnSpPr/>
+          <p:nvPr/>
+        </p:nvCxnSpPr>
+        <p:spPr>
+          <a:xfrm>
+            <a:off x="7346801" y="4410635"/>
+            <a:ext cx="974239" cy="0"/>
+          </a:xfrm>
+          <a:prstGeom prst="line">
+            <a:avLst/>
+          </a:prstGeom>
+          <a:ln w="28575"/>
+        </p:spPr>
+        <p:style>
+          <a:lnRef idx="1">
+            <a:schemeClr val="dk1"/>
+          </a:lnRef>
+          <a:fillRef idx="0">
+            <a:schemeClr val="dk1"/>
+          </a:fillRef>
+          <a:effectRef idx="0">
+            <a:schemeClr val="dk1"/>
+          </a:effectRef>
+          <a:fontRef idx="minor">
+            <a:schemeClr val="tx1"/>
+          </a:fontRef>
+        </p:style>
+      </p:cxnSp>
+      <p:cxnSp>
+        <p:nvCxnSpPr>
+          <p:cNvPr id="95" name="Straight Connector 94">
+            <a:extLst>
+              <a:ext uri="{FF2B5EF4-FFF2-40B4-BE49-F238E27FC236}">
+                <a16:creationId xmlns:a16="http://schemas.microsoft.com/office/drawing/2014/main" id="{7ED4CF1A-7A4F-433F-B7FC-BB5A847DE849}"/>
+              </a:ext>
+            </a:extLst>
+          </p:cNvPr>
+          <p:cNvCxnSpPr>
+            <a:cxnSpLocks/>
+          </p:cNvCxnSpPr>
+          <p:nvPr/>
+        </p:nvCxnSpPr>
+        <p:spPr>
+          <a:xfrm>
+            <a:off x="3167010" y="2430791"/>
+            <a:ext cx="6199540" cy="0"/>
+          </a:xfrm>
+          <a:prstGeom prst="line">
+            <a:avLst/>
+          </a:prstGeom>
+          <a:ln w="38100">
+            <a:prstDash val="sysDash"/>
+          </a:ln>
+        </p:spPr>
+        <p:style>
+          <a:lnRef idx="1">
+            <a:schemeClr val="accent4"/>
+          </a:lnRef>
+          <a:fillRef idx="0">
+            <a:schemeClr val="accent4"/>
+          </a:fillRef>
+          <a:effectRef idx="0">
+            <a:schemeClr val="accent4"/>
+          </a:effectRef>
+          <a:fontRef idx="minor">
+            <a:schemeClr val="tx1"/>
+          </a:fontRef>
+        </p:style>
+      </p:cxnSp>
+      <p:cxnSp>
+        <p:nvCxnSpPr>
+          <p:cNvPr id="22" name="Straight Arrow Connector 21">
+            <a:extLst>
+              <a:ext uri="{FF2B5EF4-FFF2-40B4-BE49-F238E27FC236}">
+                <a16:creationId xmlns:a16="http://schemas.microsoft.com/office/drawing/2014/main" id="{C838CFEC-8ABE-4A9C-A233-BD0201E65AD2}"/>
+              </a:ext>
+            </a:extLst>
+          </p:cNvPr>
+          <p:cNvCxnSpPr/>
+          <p:nvPr/>
+        </p:nvCxnSpPr>
+        <p:spPr>
+          <a:xfrm>
+            <a:off x="8314541" y="2419809"/>
+            <a:ext cx="600859" cy="10981"/>
+          </a:xfrm>
+          <a:prstGeom prst="straightConnector1">
+            <a:avLst/>
+          </a:prstGeom>
+          <a:ln w="38100">
+            <a:headEnd type="triangle"/>
+            <a:tailEnd type="triangle"/>
+          </a:ln>
+        </p:spPr>
+        <p:style>
+          <a:lnRef idx="1">
+            <a:schemeClr val="dk1"/>
+          </a:lnRef>
+          <a:fillRef idx="0">
+            <a:schemeClr val="dk1"/>
+          </a:fillRef>
+          <a:effectRef idx="0">
+            <a:schemeClr val="dk1"/>
+          </a:effectRef>
+          <a:fontRef idx="minor">
+            <a:schemeClr val="tx1"/>
+          </a:fontRef>
+        </p:style>
+      </p:cxnSp>
+      <p:sp>
+        <p:nvSpPr>
+          <p:cNvPr id="96" name="TextBox 95">
+            <a:extLst>
+              <a:ext uri="{FF2B5EF4-FFF2-40B4-BE49-F238E27FC236}">
+                <a16:creationId xmlns:a16="http://schemas.microsoft.com/office/drawing/2014/main" id="{4596A4BC-A549-4E7A-A609-8AC241D7A3AD}"/>
+              </a:ext>
+            </a:extLst>
+          </p:cNvPr>
+          <p:cNvSpPr txBox="1"/>
+          <p:nvPr/>
+        </p:nvSpPr>
+        <p:spPr>
+          <a:xfrm>
+            <a:off x="8291627" y="1468428"/>
+            <a:ext cx="1031723" cy="461665"/>
+          </a:xfrm>
+          <a:prstGeom prst="rect">
+            <a:avLst/>
+          </a:prstGeom>
+          <a:noFill/>
+        </p:spPr>
+        <p:txBody>
+          <a:bodyPr wrap="square" rtlCol="0">
+            <a:spAutoFit/>
+          </a:bodyPr>
+          <a:lstStyle/>
+          <a:p>
+            <a:pPr algn="ctr"/>
+            <a:r>
+              <a:rPr lang="en-IN" sz="2400" b="1"/>
+              <a:t>σmax</a:t>
+            </a:r>
+          </a:p>
+        </p:txBody>
+      </p:sp>
+      <p:sp>
+        <p:nvSpPr>
+          <p:cNvPr id="97" name="TextBox 96">
+            <a:extLst>
+              <a:ext uri="{FF2B5EF4-FFF2-40B4-BE49-F238E27FC236}">
+                <a16:creationId xmlns:a16="http://schemas.microsoft.com/office/drawing/2014/main" id="{8C44CB72-161B-4CA8-8A10-19659A679650}"/>
+              </a:ext>
+            </a:extLst>
+          </p:cNvPr>
+          <p:cNvSpPr txBox="1"/>
+          <p:nvPr/>
+        </p:nvSpPr>
+        <p:spPr>
+          <a:xfrm>
+            <a:off x="8479636" y="1981939"/>
+            <a:ext cx="337744" cy="523220"/>
+          </a:xfrm>
+          <a:prstGeom prst="rect">
+            <a:avLst/>
+          </a:prstGeom>
+          <a:noFill/>
+        </p:spPr>
+        <p:txBody>
+          <a:bodyPr wrap="square" rtlCol="0">
+            <a:spAutoFit/>
+          </a:bodyPr>
+          <a:lstStyle/>
+          <a:p>
+            <a:pPr algn="ctr"/>
+            <a:r>
+              <a:rPr lang="en-IN" sz="2800" b="1"/>
+              <a:t>σ</a:t>
+            </a:r>
+          </a:p>
+        </p:txBody>
+      </p:sp>
+      <p:cxnSp>
+        <p:nvCxnSpPr>
+          <p:cNvPr id="98" name="Straight Arrow Connector 97">
+            <a:extLst>
+              <a:ext uri="{FF2B5EF4-FFF2-40B4-BE49-F238E27FC236}">
+                <a16:creationId xmlns:a16="http://schemas.microsoft.com/office/drawing/2014/main" id="{6B6AEDB4-0205-4C38-AF63-A2432DA66EF8}"/>
+              </a:ext>
+            </a:extLst>
+          </p:cNvPr>
+          <p:cNvCxnSpPr>
+            <a:cxnSpLocks/>
+          </p:cNvCxnSpPr>
+          <p:nvPr/>
+        </p:nvCxnSpPr>
+        <p:spPr>
+          <a:xfrm flipV="1">
+            <a:off x="8057703" y="2469778"/>
+            <a:ext cx="0" cy="712692"/>
+          </a:xfrm>
+          <a:prstGeom prst="straightConnector1">
+            <a:avLst/>
+          </a:prstGeom>
+          <a:ln w="38100">
+            <a:headEnd type="triangle"/>
+            <a:tailEnd type="triangle"/>
+          </a:ln>
+        </p:spPr>
+        <p:style>
+          <a:lnRef idx="1">
+            <a:schemeClr val="dk1"/>
+          </a:lnRef>
+          <a:fillRef idx="0">
+            <a:schemeClr val="dk1"/>
+          </a:fillRef>
+          <a:effectRef idx="0">
+            <a:schemeClr val="dk1"/>
+          </a:effectRef>
+          <a:fontRef idx="minor">
+            <a:schemeClr val="tx1"/>
+          </a:fontRef>
+        </p:style>
+      </p:cxnSp>
+      <p:sp>
+        <p:nvSpPr>
+          <p:cNvPr id="99" name="TextBox 98">
+            <a:extLst>
+              <a:ext uri="{FF2B5EF4-FFF2-40B4-BE49-F238E27FC236}">
+                <a16:creationId xmlns:a16="http://schemas.microsoft.com/office/drawing/2014/main" id="{2E5A1681-2137-49F1-B7C8-326AEB3F99ED}"/>
+              </a:ext>
+            </a:extLst>
+          </p:cNvPr>
+          <p:cNvSpPr txBox="1"/>
+          <p:nvPr/>
+        </p:nvSpPr>
+        <p:spPr>
+          <a:xfrm>
+            <a:off x="7938475" y="2561253"/>
+            <a:ext cx="510539" cy="369332"/>
+          </a:xfrm>
+          <a:prstGeom prst="rect">
+            <a:avLst/>
+          </a:prstGeom>
+          <a:noFill/>
+        </p:spPr>
+        <p:txBody>
+          <a:bodyPr wrap="square" rtlCol="0">
+            <a:spAutoFit/>
+          </a:bodyPr>
+          <a:lstStyle/>
+          <a:p>
+            <a:pPr algn="ctr"/>
+            <a:r>
+              <a:rPr lang="en-IN"/>
+              <a:t>y</a:t>
+            </a:r>
+          </a:p>
+        </p:txBody>
+      </p:sp>
+      <p:cxnSp>
+        <p:nvCxnSpPr>
+          <p:cNvPr id="100" name="Straight Arrow Connector 99">
+            <a:extLst>
+              <a:ext uri="{FF2B5EF4-FFF2-40B4-BE49-F238E27FC236}">
+                <a16:creationId xmlns:a16="http://schemas.microsoft.com/office/drawing/2014/main" id="{1E451311-9E6D-4573-B585-269829BC8E6C}"/>
+              </a:ext>
+            </a:extLst>
+          </p:cNvPr>
+          <p:cNvCxnSpPr>
+            <a:cxnSpLocks/>
+          </p:cNvCxnSpPr>
+          <p:nvPr/>
+        </p:nvCxnSpPr>
+        <p:spPr>
+          <a:xfrm flipV="1">
+            <a:off x="7653619" y="1940608"/>
+            <a:ext cx="0" cy="1235766"/>
+          </a:xfrm>
+          <a:prstGeom prst="straightConnector1">
+            <a:avLst/>
+          </a:prstGeom>
+          <a:ln w="38100">
+            <a:headEnd type="triangle"/>
+            <a:tailEnd type="triangle"/>
+          </a:ln>
+        </p:spPr>
+        <p:style>
+          <a:lnRef idx="1">
+            <a:schemeClr val="dk1"/>
+          </a:lnRef>
+          <a:fillRef idx="0">
+            <a:schemeClr val="dk1"/>
+          </a:fillRef>
+          <a:effectRef idx="0">
+            <a:schemeClr val="dk1"/>
+          </a:effectRef>
+          <a:fontRef idx="minor">
+            <a:schemeClr val="tx1"/>
+          </a:fontRef>
+        </p:style>
+      </p:cxnSp>
+      <p:sp>
+        <p:nvSpPr>
+          <p:cNvPr id="101" name="TextBox 100">
+            <a:extLst>
+              <a:ext uri="{FF2B5EF4-FFF2-40B4-BE49-F238E27FC236}">
+                <a16:creationId xmlns:a16="http://schemas.microsoft.com/office/drawing/2014/main" id="{EF8A4992-AFA7-47A0-83E8-3CF7431F9E8C}"/>
+              </a:ext>
+            </a:extLst>
+          </p:cNvPr>
+          <p:cNvSpPr txBox="1"/>
+          <p:nvPr/>
+        </p:nvSpPr>
+        <p:spPr>
+          <a:xfrm>
+            <a:off x="7577869" y="2037917"/>
+            <a:ext cx="756173" cy="369332"/>
+          </a:xfrm>
+          <a:prstGeom prst="rect">
+            <a:avLst/>
+          </a:prstGeom>
+          <a:noFill/>
+        </p:spPr>
+        <p:txBody>
+          <a:bodyPr wrap="square" rtlCol="0">
+            <a:spAutoFit/>
+          </a:bodyPr>
+          <a:lstStyle/>
+          <a:p>
+            <a:pPr algn="ctr"/>
+            <a:r>
+              <a:rPr lang="en-IN"/>
+              <a:t>Ymax</a:t>
+            </a:r>
+          </a:p>
+        </p:txBody>
+      </p:sp>
+    </p:spTree>
+    <p:extLst>
+      <p:ext uri="{BB962C8B-B14F-4D97-AF65-F5344CB8AC3E}">
+        <p14:creationId xmlns:p14="http://schemas.microsoft.com/office/powerpoint/2010/main" val="4224354917"/>
+      </p:ext>
+    </p:extLst>
+  </p:cSld>
+  <p:clrMapOvr>
+    <a:masterClrMapping/>
+  </p:clrMapOvr>
+</p:sld>
+</file>
+
 <file path=ppt/slides/slide3.xml><?xml version="1.0" encoding="utf-8"?>
 <p:sld xmlns:a="http://schemas.openxmlformats.org/drawingml/2006/main" xmlns:r="http://schemas.openxmlformats.org/officeDocument/2006/relationships" xmlns:p="http://schemas.openxmlformats.org/presentationml/2006/main">
   <p:cSld>

</xml_diff>

<commit_message>
rem 2 cases added
</commit_message>
<xml_diff>
--- a/STRENGTH OF MATERIALS SHORTNOTES/SOM Revision.pptx
+++ b/STRENGTH OF MATERIALS SHORTNOTES/SOM Revision.pptx
@@ -292,7 +292,7 @@
           <a:p>
             <a:fld id="{EA402788-B3D0-4CAD-96CC-4B452FA47DBC}" type="datetimeFigureOut">
               <a:rPr lang="en-IN" smtClean="0"/>
-              <a:t>01-02-2023</a:t>
+              <a:t>02-02-2023</a:t>
             </a:fld>
             <a:endParaRPr lang="en-IN"/>
           </a:p>
@@ -492,7 +492,7 @@
           <a:p>
             <a:fld id="{EA402788-B3D0-4CAD-96CC-4B452FA47DBC}" type="datetimeFigureOut">
               <a:rPr lang="en-IN" smtClean="0"/>
-              <a:t>01-02-2023</a:t>
+              <a:t>02-02-2023</a:t>
             </a:fld>
             <a:endParaRPr lang="en-IN"/>
           </a:p>
@@ -702,7 +702,7 @@
           <a:p>
             <a:fld id="{EA402788-B3D0-4CAD-96CC-4B452FA47DBC}" type="datetimeFigureOut">
               <a:rPr lang="en-IN" smtClean="0"/>
-              <a:t>01-02-2023</a:t>
+              <a:t>02-02-2023</a:t>
             </a:fld>
             <a:endParaRPr lang="en-IN"/>
           </a:p>
@@ -902,7 +902,7 @@
           <a:p>
             <a:fld id="{EA402788-B3D0-4CAD-96CC-4B452FA47DBC}" type="datetimeFigureOut">
               <a:rPr lang="en-IN" smtClean="0"/>
-              <a:t>01-02-2023</a:t>
+              <a:t>02-02-2023</a:t>
             </a:fld>
             <a:endParaRPr lang="en-IN"/>
           </a:p>
@@ -1178,7 +1178,7 @@
           <a:p>
             <a:fld id="{EA402788-B3D0-4CAD-96CC-4B452FA47DBC}" type="datetimeFigureOut">
               <a:rPr lang="en-IN" smtClean="0"/>
-              <a:t>01-02-2023</a:t>
+              <a:t>02-02-2023</a:t>
             </a:fld>
             <a:endParaRPr lang="en-IN"/>
           </a:p>
@@ -1446,7 +1446,7 @@
           <a:p>
             <a:fld id="{EA402788-B3D0-4CAD-96CC-4B452FA47DBC}" type="datetimeFigureOut">
               <a:rPr lang="en-IN" smtClean="0"/>
-              <a:t>01-02-2023</a:t>
+              <a:t>02-02-2023</a:t>
             </a:fld>
             <a:endParaRPr lang="en-IN"/>
           </a:p>
@@ -1861,7 +1861,7 @@
           <a:p>
             <a:fld id="{EA402788-B3D0-4CAD-96CC-4B452FA47DBC}" type="datetimeFigureOut">
               <a:rPr lang="en-IN" smtClean="0"/>
-              <a:t>01-02-2023</a:t>
+              <a:t>02-02-2023</a:t>
             </a:fld>
             <a:endParaRPr lang="en-IN"/>
           </a:p>
@@ -2003,7 +2003,7 @@
           <a:p>
             <a:fld id="{EA402788-B3D0-4CAD-96CC-4B452FA47DBC}" type="datetimeFigureOut">
               <a:rPr lang="en-IN" smtClean="0"/>
-              <a:t>01-02-2023</a:t>
+              <a:t>02-02-2023</a:t>
             </a:fld>
             <a:endParaRPr lang="en-IN"/>
           </a:p>
@@ -2116,7 +2116,7 @@
           <a:p>
             <a:fld id="{EA402788-B3D0-4CAD-96CC-4B452FA47DBC}" type="datetimeFigureOut">
               <a:rPr lang="en-IN" smtClean="0"/>
-              <a:t>01-02-2023</a:t>
+              <a:t>02-02-2023</a:t>
             </a:fld>
             <a:endParaRPr lang="en-IN"/>
           </a:p>
@@ -2429,7 +2429,7 @@
           <a:p>
             <a:fld id="{EA402788-B3D0-4CAD-96CC-4B452FA47DBC}" type="datetimeFigureOut">
               <a:rPr lang="en-IN" smtClean="0"/>
-              <a:t>01-02-2023</a:t>
+              <a:t>02-02-2023</a:t>
             </a:fld>
             <a:endParaRPr lang="en-IN"/>
           </a:p>
@@ -2718,7 +2718,7 @@
           <a:p>
             <a:fld id="{EA402788-B3D0-4CAD-96CC-4B452FA47DBC}" type="datetimeFigureOut">
               <a:rPr lang="en-IN" smtClean="0"/>
-              <a:t>01-02-2023</a:t>
+              <a:t>02-02-2023</a:t>
             </a:fld>
             <a:endParaRPr lang="en-IN"/>
           </a:p>
@@ -2961,7 +2961,7 @@
           <a:p>
             <a:fld id="{EA402788-B3D0-4CAD-96CC-4B452FA47DBC}" type="datetimeFigureOut">
               <a:rPr lang="en-IN" smtClean="0"/>
-              <a:t>01-02-2023</a:t>
+              <a:t>02-02-2023</a:t>
             </a:fld>
             <a:endParaRPr lang="en-IN"/>
           </a:p>
@@ -33415,8 +33415,8 @@
           </a:fontRef>
         </p:style>
       </p:cxnSp>
-      <mc:AlternateContent xmlns:mc="http://schemas.openxmlformats.org/markup-compatibility/2006">
-        <mc:Choice xmlns:a14="http://schemas.microsoft.com/office/drawing/2010/main" Requires="a14">
+      <mc:AlternateContent xmlns:mc="http://schemas.openxmlformats.org/markup-compatibility/2006" xmlns:a14="http://schemas.microsoft.com/office/drawing/2010/main">
+        <mc:Choice Requires="a14">
           <p:sp>
             <p:nvSpPr>
               <p:cNvPr id="12" name="TextBox 11">
@@ -33445,6 +33445,7 @@
               </a:bodyPr>
               <a:lstStyle/>
               <a:p>
+                <a:pPr/>
                 <a14:m>
                   <m:oMathPara xmlns:m="http://schemas.openxmlformats.org/officeDocument/2006/math">
                     <m:oMathParaPr>
@@ -33465,7 +33466,7 @@
             </p:txBody>
           </p:sp>
         </mc:Choice>
-        <mc:Fallback>
+        <mc:Fallback xmlns="">
           <p:sp>
             <p:nvSpPr>
               <p:cNvPr id="12" name="TextBox 11">
@@ -34421,8 +34422,8 @@
           </a:p>
         </p:txBody>
       </p:sp>
-      <mc:AlternateContent xmlns:mc="http://schemas.openxmlformats.org/markup-compatibility/2006">
-        <mc:Choice xmlns:a14="http://schemas.microsoft.com/office/drawing/2010/main" Requires="a14">
+      <mc:AlternateContent xmlns:mc="http://schemas.openxmlformats.org/markup-compatibility/2006" xmlns:a14="http://schemas.microsoft.com/office/drawing/2010/main">
+        <mc:Choice Requires="a14">
           <p:sp>
             <p:nvSpPr>
               <p:cNvPr id="119" name="TextBox 118">
@@ -34451,6 +34452,7 @@
               </a:bodyPr>
               <a:lstStyle/>
               <a:p>
+                <a:pPr/>
                 <a14:m>
                   <m:oMathPara xmlns:m="http://schemas.openxmlformats.org/officeDocument/2006/math">
                     <m:oMathParaPr>
@@ -34471,7 +34473,7 @@
             </p:txBody>
           </p:sp>
         </mc:Choice>
-        <mc:Fallback>
+        <mc:Fallback xmlns="">
           <p:sp>
             <p:nvSpPr>
               <p:cNvPr id="119" name="TextBox 118">
@@ -34516,8 +34518,8 @@
           </p:sp>
         </mc:Fallback>
       </mc:AlternateContent>
-      <mc:AlternateContent xmlns:mc="http://schemas.openxmlformats.org/markup-compatibility/2006">
-        <mc:Choice xmlns:a14="http://schemas.microsoft.com/office/drawing/2010/main" Requires="a14">
+      <mc:AlternateContent xmlns:mc="http://schemas.openxmlformats.org/markup-compatibility/2006" xmlns:a14="http://schemas.microsoft.com/office/drawing/2010/main">
+        <mc:Choice Requires="a14">
           <p:sp>
             <p:nvSpPr>
               <p:cNvPr id="121" name="TextBox 120">
@@ -34546,6 +34548,7 @@
               </a:bodyPr>
               <a:lstStyle/>
               <a:p>
+                <a:pPr/>
                 <a14:m>
                   <m:oMathPara xmlns:m="http://schemas.openxmlformats.org/officeDocument/2006/math">
                     <m:oMathParaPr>
@@ -34566,7 +34569,7 @@
             </p:txBody>
           </p:sp>
         </mc:Choice>
-        <mc:Fallback>
+        <mc:Fallback xmlns="">
           <p:sp>
             <p:nvSpPr>
               <p:cNvPr id="121" name="TextBox 120">
@@ -34659,8 +34662,8 @@
           </a:p>
         </p:txBody>
       </p:sp>
-      <mc:AlternateContent xmlns:mc="http://schemas.openxmlformats.org/markup-compatibility/2006">
-        <mc:Choice xmlns:a14="http://schemas.microsoft.com/office/drawing/2010/main" Requires="a14">
+      <mc:AlternateContent xmlns:mc="http://schemas.openxmlformats.org/markup-compatibility/2006" xmlns:a14="http://schemas.microsoft.com/office/drawing/2010/main">
+        <mc:Choice Requires="a14">
           <p:sp>
             <p:nvSpPr>
               <p:cNvPr id="123" name="TextBox 122">
@@ -34689,6 +34692,7 @@
               </a:bodyPr>
               <a:lstStyle/>
               <a:p>
+                <a:pPr/>
                 <a14:m>
                   <m:oMathPara xmlns:m="http://schemas.openxmlformats.org/officeDocument/2006/math">
                     <m:oMathParaPr>
@@ -34721,7 +34725,7 @@
             </p:txBody>
           </p:sp>
         </mc:Choice>
-        <mc:Fallback>
+        <mc:Fallback xmlns="">
           <p:sp>
             <p:nvSpPr>
               <p:cNvPr id="123" name="TextBox 122">
@@ -38592,8 +38596,8 @@
           </a:fontRef>
         </p:style>
       </p:cxnSp>
-      <mc:AlternateContent xmlns:mc="http://schemas.openxmlformats.org/markup-compatibility/2006">
-        <mc:Choice xmlns:a14="http://schemas.microsoft.com/office/drawing/2010/main" Requires="a14">
+      <mc:AlternateContent xmlns:mc="http://schemas.openxmlformats.org/markup-compatibility/2006" xmlns:a14="http://schemas.microsoft.com/office/drawing/2010/main">
+        <mc:Choice Requires="a14">
           <p:sp>
             <p:nvSpPr>
               <p:cNvPr id="12" name="TextBox 11">
@@ -38622,6 +38626,7 @@
               </a:bodyPr>
               <a:lstStyle/>
               <a:p>
+                <a:pPr/>
                 <a14:m>
                   <m:oMathPara xmlns:m="http://schemas.openxmlformats.org/officeDocument/2006/math">
                     <m:oMathParaPr>
@@ -38642,7 +38647,7 @@
             </p:txBody>
           </p:sp>
         </mc:Choice>
-        <mc:Fallback>
+        <mc:Fallback xmlns="">
           <p:sp>
             <p:nvSpPr>
               <p:cNvPr id="12" name="TextBox 11">
@@ -39599,8 +39604,8 @@
           </a:p>
         </p:txBody>
       </p:sp>
-      <mc:AlternateContent xmlns:mc="http://schemas.openxmlformats.org/markup-compatibility/2006">
-        <mc:Choice xmlns:a14="http://schemas.microsoft.com/office/drawing/2010/main" Requires="a14">
+      <mc:AlternateContent xmlns:mc="http://schemas.openxmlformats.org/markup-compatibility/2006" xmlns:a14="http://schemas.microsoft.com/office/drawing/2010/main">
+        <mc:Choice Requires="a14">
           <p:sp>
             <p:nvSpPr>
               <p:cNvPr id="119" name="TextBox 118">
@@ -39629,6 +39634,7 @@
               </a:bodyPr>
               <a:lstStyle/>
               <a:p>
+                <a:pPr/>
                 <a14:m>
                   <m:oMathPara xmlns:m="http://schemas.openxmlformats.org/officeDocument/2006/math">
                     <m:oMathParaPr>
@@ -39649,7 +39655,7 @@
             </p:txBody>
           </p:sp>
         </mc:Choice>
-        <mc:Fallback>
+        <mc:Fallback xmlns="">
           <p:sp>
             <p:nvSpPr>
               <p:cNvPr id="119" name="TextBox 118">
@@ -39694,8 +39700,8 @@
           </p:sp>
         </mc:Fallback>
       </mc:AlternateContent>
-      <mc:AlternateContent xmlns:mc="http://schemas.openxmlformats.org/markup-compatibility/2006">
-        <mc:Choice xmlns:a14="http://schemas.microsoft.com/office/drawing/2010/main" Requires="a14">
+      <mc:AlternateContent xmlns:mc="http://schemas.openxmlformats.org/markup-compatibility/2006" xmlns:a14="http://schemas.microsoft.com/office/drawing/2010/main">
+        <mc:Choice Requires="a14">
           <p:sp>
             <p:nvSpPr>
               <p:cNvPr id="121" name="TextBox 120">
@@ -39724,6 +39730,7 @@
               </a:bodyPr>
               <a:lstStyle/>
               <a:p>
+                <a:pPr/>
                 <a14:m>
                   <m:oMathPara xmlns:m="http://schemas.openxmlformats.org/officeDocument/2006/math">
                     <m:oMathParaPr>
@@ -39744,7 +39751,7 @@
             </p:txBody>
           </p:sp>
         </mc:Choice>
-        <mc:Fallback>
+        <mc:Fallback xmlns="">
           <p:sp>
             <p:nvSpPr>
               <p:cNvPr id="121" name="TextBox 120">
@@ -39837,8 +39844,8 @@
           </a:p>
         </p:txBody>
       </p:sp>
-      <mc:AlternateContent xmlns:mc="http://schemas.openxmlformats.org/markup-compatibility/2006">
-        <mc:Choice xmlns:a14="http://schemas.microsoft.com/office/drawing/2010/main" Requires="a14">
+      <mc:AlternateContent xmlns:mc="http://schemas.openxmlformats.org/markup-compatibility/2006" xmlns:a14="http://schemas.microsoft.com/office/drawing/2010/main">
+        <mc:Choice Requires="a14">
           <p:sp>
             <p:nvSpPr>
               <p:cNvPr id="123" name="TextBox 122">
@@ -39867,6 +39874,7 @@
               </a:bodyPr>
               <a:lstStyle/>
               <a:p>
+                <a:pPr/>
                 <a14:m>
                   <m:oMathPara xmlns:m="http://schemas.openxmlformats.org/officeDocument/2006/math">
                     <m:oMathParaPr>
@@ -39899,7 +39907,7 @@
             </p:txBody>
           </p:sp>
         </mc:Choice>
-        <mc:Fallback>
+        <mc:Fallback xmlns="">
           <p:sp>
             <p:nvSpPr>
               <p:cNvPr id="123" name="TextBox 122">
@@ -43444,8 +43452,8 @@
           </a:p>
         </p:txBody>
       </p:sp>
-      <mc:AlternateContent xmlns:mc="http://schemas.openxmlformats.org/markup-compatibility/2006">
-        <mc:Choice xmlns:a14="http://schemas.microsoft.com/office/drawing/2010/main" Requires="a14">
+      <mc:AlternateContent xmlns:mc="http://schemas.openxmlformats.org/markup-compatibility/2006" xmlns:a14="http://schemas.microsoft.com/office/drawing/2010/main">
+        <mc:Choice Requires="a14">
           <p:sp>
             <p:nvSpPr>
               <p:cNvPr id="7" name="TextBox 6">
@@ -43479,7 +43487,7 @@
                     <m:sSub>
                       <m:sSubPr>
                         <m:ctrlPr>
-                          <a:rPr lang="en-IN" sz="2400" b="1" smtClean="0">
+                          <a:rPr lang="en-IN" sz="2400" b="1" i="1" smtClean="0">
                             <a:latin typeface="Cambria Math" panose="02040503050406030204" pitchFamily="18" charset="0"/>
                           </a:rPr>
                         </m:ctrlPr>
@@ -43548,7 +43556,7 @@
             </p:txBody>
           </p:sp>
         </mc:Choice>
-        <mc:Fallback>
+        <mc:Fallback xmlns="">
           <p:sp>
             <p:nvSpPr>
               <p:cNvPr id="7" name="TextBox 6">
@@ -43719,8 +43727,8 @@
           </a:p>
         </p:txBody>
       </p:sp>
-      <mc:AlternateContent xmlns:mc="http://schemas.openxmlformats.org/markup-compatibility/2006">
-        <mc:Choice xmlns:a14="http://schemas.microsoft.com/office/drawing/2010/main" Requires="a14">
+      <mc:AlternateContent xmlns:mc="http://schemas.openxmlformats.org/markup-compatibility/2006" xmlns:a14="http://schemas.microsoft.com/office/drawing/2010/main">
+        <mc:Choice Requires="a14">
           <p:sp>
             <p:nvSpPr>
               <p:cNvPr id="178" name="TextBox 177">
@@ -43752,6 +43760,7 @@
               </a:bodyPr>
               <a:lstStyle/>
               <a:p>
+                <a:pPr/>
                 <a14:m>
                   <m:oMathPara xmlns:m="http://schemas.openxmlformats.org/officeDocument/2006/math">
                     <m:oMathParaPr>
@@ -43784,7 +43793,7 @@
             </p:txBody>
           </p:sp>
         </mc:Choice>
-        <mc:Fallback>
+        <mc:Fallback xmlns="">
           <p:sp>
             <p:nvSpPr>
               <p:cNvPr id="178" name="TextBox 177">
@@ -43880,8 +43889,8 @@
           </a:p>
         </p:txBody>
       </p:sp>
-      <mc:AlternateContent xmlns:mc="http://schemas.openxmlformats.org/markup-compatibility/2006">
-        <mc:Choice xmlns:a14="http://schemas.microsoft.com/office/drawing/2010/main" Requires="a14">
+      <mc:AlternateContent xmlns:mc="http://schemas.openxmlformats.org/markup-compatibility/2006" xmlns:a14="http://schemas.microsoft.com/office/drawing/2010/main">
+        <mc:Choice Requires="a14">
           <p:sp>
             <p:nvSpPr>
               <p:cNvPr id="180" name="TextBox 179">
@@ -43910,6 +43919,7 @@
               </a:bodyPr>
               <a:lstStyle/>
               <a:p>
+                <a:pPr/>
                 <a14:m>
                   <m:oMathPara xmlns:m="http://schemas.openxmlformats.org/officeDocument/2006/math">
                     <m:oMathParaPr>
@@ -43930,7 +43940,7 @@
             </p:txBody>
           </p:sp>
         </mc:Choice>
-        <mc:Fallback>
+        <mc:Fallback xmlns="">
           <p:sp>
             <p:nvSpPr>
               <p:cNvPr id="180" name="TextBox 179">
@@ -43977,85 +43987,6 @@
       </mc:AlternateContent>
       <p:cxnSp>
         <p:nvCxnSpPr>
-          <p:cNvPr id="181" name="Straight Connector 180">
-            <a:extLst>
-              <a:ext uri="{FF2B5EF4-FFF2-40B4-BE49-F238E27FC236}">
-                <a16:creationId xmlns:a16="http://schemas.microsoft.com/office/drawing/2014/main" id="{FBC2E771-10A3-4477-8EC2-B9AACA450FE7}"/>
-              </a:ext>
-            </a:extLst>
-          </p:cNvPr>
-          <p:cNvCxnSpPr>
-            <a:cxnSpLocks/>
-            <a:stCxn id="264" idx="5"/>
-          </p:cNvCxnSpPr>
-          <p:nvPr/>
-        </p:nvCxnSpPr>
-        <p:spPr>
-          <a:xfrm>
-            <a:off x="3030047" y="4326887"/>
-            <a:ext cx="592425" cy="419173"/>
-          </a:xfrm>
-          <a:prstGeom prst="line">
-            <a:avLst/>
-          </a:prstGeom>
-          <a:ln w="38100"/>
-        </p:spPr>
-        <p:style>
-          <a:lnRef idx="1">
-            <a:schemeClr val="dk1"/>
-          </a:lnRef>
-          <a:fillRef idx="0">
-            <a:schemeClr val="dk1"/>
-          </a:fillRef>
-          <a:effectRef idx="0">
-            <a:schemeClr val="dk1"/>
-          </a:effectRef>
-          <a:fontRef idx="minor">
-            <a:schemeClr val="tx1"/>
-          </a:fontRef>
-        </p:style>
-      </p:cxnSp>
-      <p:cxnSp>
-        <p:nvCxnSpPr>
-          <p:cNvPr id="184" name="Straight Connector 183">
-            <a:extLst>
-              <a:ext uri="{FF2B5EF4-FFF2-40B4-BE49-F238E27FC236}">
-                <a16:creationId xmlns:a16="http://schemas.microsoft.com/office/drawing/2014/main" id="{16ED8E57-2537-4E84-8178-540E50455041}"/>
-              </a:ext>
-            </a:extLst>
-          </p:cNvPr>
-          <p:cNvCxnSpPr>
-            <a:cxnSpLocks/>
-          </p:cNvCxnSpPr>
-          <p:nvPr/>
-        </p:nvCxnSpPr>
-        <p:spPr>
-          <a:xfrm flipV="1">
-            <a:off x="3622471" y="4746061"/>
-            <a:ext cx="0" cy="1587198"/>
-          </a:xfrm>
-          <a:prstGeom prst="line">
-            <a:avLst/>
-          </a:prstGeom>
-          <a:ln w="38100"/>
-        </p:spPr>
-        <p:style>
-          <a:lnRef idx="1">
-            <a:schemeClr val="dk1"/>
-          </a:lnRef>
-          <a:fillRef idx="0">
-            <a:schemeClr val="dk1"/>
-          </a:fillRef>
-          <a:effectRef idx="0">
-            <a:schemeClr val="dk1"/>
-          </a:effectRef>
-          <a:fontRef idx="minor">
-            <a:schemeClr val="tx1"/>
-          </a:fontRef>
-        </p:style>
-      </p:cxnSp>
-      <p:cxnSp>
-        <p:nvCxnSpPr>
           <p:cNvPr id="185" name="Straight Connector 184">
             <a:extLst>
               <a:ext uri="{FF2B5EF4-FFF2-40B4-BE49-F238E27FC236}">
@@ -44113,45 +44044,6 @@
           <a:xfrm flipH="1" flipV="1">
             <a:off x="5447023" y="4746062"/>
             <a:ext cx="49182" cy="1534082"/>
-          </a:xfrm>
-          <a:prstGeom prst="line">
-            <a:avLst/>
-          </a:prstGeom>
-          <a:ln w="38100"/>
-        </p:spPr>
-        <p:style>
-          <a:lnRef idx="1">
-            <a:schemeClr val="dk1"/>
-          </a:lnRef>
-          <a:fillRef idx="0">
-            <a:schemeClr val="dk1"/>
-          </a:fillRef>
-          <a:effectRef idx="0">
-            <a:schemeClr val="dk1"/>
-          </a:effectRef>
-          <a:fontRef idx="minor">
-            <a:schemeClr val="tx1"/>
-          </a:fontRef>
-        </p:style>
-      </p:cxnSp>
-      <p:cxnSp>
-        <p:nvCxnSpPr>
-          <p:cNvPr id="194" name="Straight Connector 193">
-            <a:extLst>
-              <a:ext uri="{FF2B5EF4-FFF2-40B4-BE49-F238E27FC236}">
-                <a16:creationId xmlns:a16="http://schemas.microsoft.com/office/drawing/2014/main" id="{FDA7ED23-0E0C-4A7B-A5D5-EEE2CE1079DB}"/>
-              </a:ext>
-            </a:extLst>
-          </p:cNvPr>
-          <p:cNvCxnSpPr>
-            <a:cxnSpLocks/>
-          </p:cNvCxnSpPr>
-          <p:nvPr/>
-        </p:nvCxnSpPr>
-        <p:spPr>
-          <a:xfrm flipH="1">
-            <a:off x="3622471" y="4746060"/>
-            <a:ext cx="1864767" cy="0"/>
           </a:xfrm>
           <a:prstGeom prst="line">
             <a:avLst/>
@@ -44947,52 +44839,6 @@
       </p:sp>
       <p:sp>
         <p:nvSpPr>
-          <p:cNvPr id="254" name="Oval 253">
-            <a:extLst>
-              <a:ext uri="{FF2B5EF4-FFF2-40B4-BE49-F238E27FC236}">
-                <a16:creationId xmlns:a16="http://schemas.microsoft.com/office/drawing/2014/main" id="{881A14EF-8BF4-45F1-9049-394A9DE0528C}"/>
-              </a:ext>
-            </a:extLst>
-          </p:cNvPr>
-          <p:cNvSpPr/>
-          <p:nvPr/>
-        </p:nvSpPr>
-        <p:spPr>
-          <a:xfrm>
-            <a:off x="5391866" y="4675448"/>
-            <a:ext cx="103932" cy="98166"/>
-          </a:xfrm>
-          <a:prstGeom prst="ellipse">
-            <a:avLst/>
-          </a:prstGeom>
-        </p:spPr>
-        <p:style>
-          <a:lnRef idx="2">
-            <a:schemeClr val="accent2">
-              <a:shade val="50000"/>
-            </a:schemeClr>
-          </a:lnRef>
-          <a:fillRef idx="1">
-            <a:schemeClr val="accent2"/>
-          </a:fillRef>
-          <a:effectRef idx="0">
-            <a:schemeClr val="accent2"/>
-          </a:effectRef>
-          <a:fontRef idx="minor">
-            <a:schemeClr val="lt1"/>
-          </a:fontRef>
-        </p:style>
-        <p:txBody>
-          <a:bodyPr rtlCol="0" anchor="ctr"/>
-          <a:lstStyle/>
-          <a:p>
-            <a:pPr algn="ctr"/>
-            <a:endParaRPr lang="en-IN"/>
-          </a:p>
-        </p:txBody>
-      </p:sp>
-      <p:sp>
-        <p:nvSpPr>
           <p:cNvPr id="255" name="TextBox 254">
             <a:extLst>
               <a:ext uri="{FF2B5EF4-FFF2-40B4-BE49-F238E27FC236}">
@@ -45029,52 +44875,6 @@
       </p:sp>
       <p:sp>
         <p:nvSpPr>
-          <p:cNvPr id="256" name="Oval 255">
-            <a:extLst>
-              <a:ext uri="{FF2B5EF4-FFF2-40B4-BE49-F238E27FC236}">
-                <a16:creationId xmlns:a16="http://schemas.microsoft.com/office/drawing/2014/main" id="{D939DD5B-918B-48E6-9A60-B03FA1C73E02}"/>
-              </a:ext>
-            </a:extLst>
-          </p:cNvPr>
-          <p:cNvSpPr/>
-          <p:nvPr/>
-        </p:nvSpPr>
-        <p:spPr>
-          <a:xfrm>
-            <a:off x="3543310" y="4675267"/>
-            <a:ext cx="103932" cy="98166"/>
-          </a:xfrm>
-          <a:prstGeom prst="ellipse">
-            <a:avLst/>
-          </a:prstGeom>
-        </p:spPr>
-        <p:style>
-          <a:lnRef idx="2">
-            <a:schemeClr val="accent2">
-              <a:shade val="50000"/>
-            </a:schemeClr>
-          </a:lnRef>
-          <a:fillRef idx="1">
-            <a:schemeClr val="accent2"/>
-          </a:fillRef>
-          <a:effectRef idx="0">
-            <a:schemeClr val="accent2"/>
-          </a:effectRef>
-          <a:fontRef idx="minor">
-            <a:schemeClr val="lt1"/>
-          </a:fontRef>
-        </p:style>
-        <p:txBody>
-          <a:bodyPr rtlCol="0" anchor="ctr"/>
-          <a:lstStyle/>
-          <a:p>
-            <a:pPr algn="ctr"/>
-            <a:endParaRPr lang="en-IN"/>
-          </a:p>
-        </p:txBody>
-      </p:sp>
-      <p:sp>
-        <p:nvSpPr>
           <p:cNvPr id="263" name="TextBox 262">
             <a:extLst>
               <a:ext uri="{FF2B5EF4-FFF2-40B4-BE49-F238E27FC236}">
@@ -45111,52 +44911,6 @@
       </p:sp>
       <p:sp>
         <p:nvSpPr>
-          <p:cNvPr id="264" name="Oval 263">
-            <a:extLst>
-              <a:ext uri="{FF2B5EF4-FFF2-40B4-BE49-F238E27FC236}">
-                <a16:creationId xmlns:a16="http://schemas.microsoft.com/office/drawing/2014/main" id="{8F1045ED-37DC-43E9-9074-5C621151EC8A}"/>
-              </a:ext>
-            </a:extLst>
-          </p:cNvPr>
-          <p:cNvSpPr/>
-          <p:nvPr/>
-        </p:nvSpPr>
-        <p:spPr>
-          <a:xfrm>
-            <a:off x="2941335" y="4243097"/>
-            <a:ext cx="103932" cy="98166"/>
-          </a:xfrm>
-          <a:prstGeom prst="ellipse">
-            <a:avLst/>
-          </a:prstGeom>
-        </p:spPr>
-        <p:style>
-          <a:lnRef idx="2">
-            <a:schemeClr val="accent2">
-              <a:shade val="50000"/>
-            </a:schemeClr>
-          </a:lnRef>
-          <a:fillRef idx="1">
-            <a:schemeClr val="accent2"/>
-          </a:fillRef>
-          <a:effectRef idx="0">
-            <a:schemeClr val="accent2"/>
-          </a:effectRef>
-          <a:fontRef idx="minor">
-            <a:schemeClr val="lt1"/>
-          </a:fontRef>
-        </p:style>
-        <p:txBody>
-          <a:bodyPr rtlCol="0" anchor="ctr"/>
-          <a:lstStyle/>
-          <a:p>
-            <a:pPr algn="ctr"/>
-            <a:endParaRPr lang="en-IN"/>
-          </a:p>
-        </p:txBody>
-      </p:sp>
-      <p:sp>
-        <p:nvSpPr>
           <p:cNvPr id="266" name="Oval 265">
             <a:extLst>
               <a:ext uri="{FF2B5EF4-FFF2-40B4-BE49-F238E27FC236}">
@@ -45237,8 +44991,8 @@
           </a:p>
         </p:txBody>
       </p:sp>
-      <mc:AlternateContent xmlns:mc="http://schemas.openxmlformats.org/markup-compatibility/2006">
-        <mc:Choice xmlns:a14="http://schemas.microsoft.com/office/drawing/2010/main" Requires="a14">
+      <mc:AlternateContent xmlns:mc="http://schemas.openxmlformats.org/markup-compatibility/2006" xmlns:a14="http://schemas.microsoft.com/office/drawing/2010/main">
+        <mc:Choice Requires="a14">
           <p:sp>
             <p:nvSpPr>
               <p:cNvPr id="273" name="TextBox 272">
@@ -45267,6 +45021,7 @@
               </a:bodyPr>
               <a:lstStyle/>
               <a:p>
+                <a:pPr/>
                 <a14:m>
                   <m:oMathPara xmlns:m="http://schemas.openxmlformats.org/officeDocument/2006/math">
                     <m:oMathParaPr>
@@ -45287,7 +45042,7 @@
             </p:txBody>
           </p:sp>
         </mc:Choice>
-        <mc:Fallback>
+        <mc:Fallback xmlns="">
           <p:sp>
             <p:nvSpPr>
               <p:cNvPr id="273" name="TextBox 272">
@@ -45769,6 +45524,262 @@
               <a:t>5</a:t>
             </a:r>
             <a:endParaRPr lang="en-IN" sz="2800" b="1"/>
+          </a:p>
+        </p:txBody>
+      </p:sp>
+      <p:cxnSp>
+        <p:nvCxnSpPr>
+          <p:cNvPr id="184" name="Straight Connector 183">
+            <a:extLst>
+              <a:ext uri="{FF2B5EF4-FFF2-40B4-BE49-F238E27FC236}">
+                <a16:creationId xmlns:a16="http://schemas.microsoft.com/office/drawing/2014/main" id="{16ED8E57-2537-4E84-8178-540E50455041}"/>
+              </a:ext>
+            </a:extLst>
+          </p:cNvPr>
+          <p:cNvCxnSpPr>
+            <a:cxnSpLocks/>
+          </p:cNvCxnSpPr>
+          <p:nvPr/>
+        </p:nvCxnSpPr>
+        <p:spPr>
+          <a:xfrm flipV="1">
+            <a:off x="3622471" y="4746061"/>
+            <a:ext cx="0" cy="1587198"/>
+          </a:xfrm>
+          <a:prstGeom prst="line">
+            <a:avLst/>
+          </a:prstGeom>
+          <a:ln w="38100"/>
+        </p:spPr>
+        <p:style>
+          <a:lnRef idx="1">
+            <a:schemeClr val="dk1"/>
+          </a:lnRef>
+          <a:fillRef idx="0">
+            <a:schemeClr val="dk1"/>
+          </a:fillRef>
+          <a:effectRef idx="0">
+            <a:schemeClr val="dk1"/>
+          </a:effectRef>
+          <a:fontRef idx="minor">
+            <a:schemeClr val="tx1"/>
+          </a:fontRef>
+        </p:style>
+      </p:cxnSp>
+      <p:cxnSp>
+        <p:nvCxnSpPr>
+          <p:cNvPr id="181" name="Straight Connector 180">
+            <a:extLst>
+              <a:ext uri="{FF2B5EF4-FFF2-40B4-BE49-F238E27FC236}">
+                <a16:creationId xmlns:a16="http://schemas.microsoft.com/office/drawing/2014/main" id="{FBC2E771-10A3-4477-8EC2-B9AACA450FE7}"/>
+              </a:ext>
+            </a:extLst>
+          </p:cNvPr>
+          <p:cNvCxnSpPr>
+            <a:cxnSpLocks/>
+            <a:stCxn id="264" idx="5"/>
+          </p:cNvCxnSpPr>
+          <p:nvPr/>
+        </p:nvCxnSpPr>
+        <p:spPr>
+          <a:xfrm>
+            <a:off x="3030047" y="4326887"/>
+            <a:ext cx="573395" cy="414533"/>
+          </a:xfrm>
+          <a:prstGeom prst="line">
+            <a:avLst/>
+          </a:prstGeom>
+          <a:ln w="38100"/>
+        </p:spPr>
+        <p:style>
+          <a:lnRef idx="1">
+            <a:schemeClr val="dk1"/>
+          </a:lnRef>
+          <a:fillRef idx="0">
+            <a:schemeClr val="dk1"/>
+          </a:fillRef>
+          <a:effectRef idx="0">
+            <a:schemeClr val="dk1"/>
+          </a:effectRef>
+          <a:fontRef idx="minor">
+            <a:schemeClr val="tx1"/>
+          </a:fontRef>
+        </p:style>
+      </p:cxnSp>
+      <p:sp>
+        <p:nvSpPr>
+          <p:cNvPr id="256" name="Oval 255">
+            <a:extLst>
+              <a:ext uri="{FF2B5EF4-FFF2-40B4-BE49-F238E27FC236}">
+                <a16:creationId xmlns:a16="http://schemas.microsoft.com/office/drawing/2014/main" id="{D939DD5B-918B-48E6-9A60-B03FA1C73E02}"/>
+              </a:ext>
+            </a:extLst>
+          </p:cNvPr>
+          <p:cNvSpPr/>
+          <p:nvPr/>
+        </p:nvSpPr>
+        <p:spPr>
+          <a:xfrm>
+            <a:off x="3573025" y="4692469"/>
+            <a:ext cx="103932" cy="98166"/>
+          </a:xfrm>
+          <a:prstGeom prst="ellipse">
+            <a:avLst/>
+          </a:prstGeom>
+        </p:spPr>
+        <p:style>
+          <a:lnRef idx="2">
+            <a:schemeClr val="accent2">
+              <a:shade val="50000"/>
+            </a:schemeClr>
+          </a:lnRef>
+          <a:fillRef idx="1">
+            <a:schemeClr val="accent2"/>
+          </a:fillRef>
+          <a:effectRef idx="0">
+            <a:schemeClr val="accent2"/>
+          </a:effectRef>
+          <a:fontRef idx="minor">
+            <a:schemeClr val="lt1"/>
+          </a:fontRef>
+        </p:style>
+        <p:txBody>
+          <a:bodyPr rtlCol="0" anchor="ctr"/>
+          <a:lstStyle/>
+          <a:p>
+            <a:pPr algn="ctr"/>
+            <a:endParaRPr lang="en-IN"/>
+          </a:p>
+        </p:txBody>
+      </p:sp>
+      <p:sp>
+        <p:nvSpPr>
+          <p:cNvPr id="264" name="Oval 263">
+            <a:extLst>
+              <a:ext uri="{FF2B5EF4-FFF2-40B4-BE49-F238E27FC236}">
+                <a16:creationId xmlns:a16="http://schemas.microsoft.com/office/drawing/2014/main" id="{8F1045ED-37DC-43E9-9074-5C621151EC8A}"/>
+              </a:ext>
+            </a:extLst>
+          </p:cNvPr>
+          <p:cNvSpPr/>
+          <p:nvPr/>
+        </p:nvSpPr>
+        <p:spPr>
+          <a:xfrm>
+            <a:off x="2941335" y="4243097"/>
+            <a:ext cx="103932" cy="98166"/>
+          </a:xfrm>
+          <a:prstGeom prst="ellipse">
+            <a:avLst/>
+          </a:prstGeom>
+        </p:spPr>
+        <p:style>
+          <a:lnRef idx="2">
+            <a:schemeClr val="accent2">
+              <a:shade val="50000"/>
+            </a:schemeClr>
+          </a:lnRef>
+          <a:fillRef idx="1">
+            <a:schemeClr val="accent2"/>
+          </a:fillRef>
+          <a:effectRef idx="0">
+            <a:schemeClr val="accent2"/>
+          </a:effectRef>
+          <a:fontRef idx="minor">
+            <a:schemeClr val="lt1"/>
+          </a:fontRef>
+        </p:style>
+        <p:txBody>
+          <a:bodyPr rtlCol="0" anchor="ctr"/>
+          <a:lstStyle/>
+          <a:p>
+            <a:pPr algn="ctr"/>
+            <a:endParaRPr lang="en-IN"/>
+          </a:p>
+        </p:txBody>
+      </p:sp>
+      <p:cxnSp>
+        <p:nvCxnSpPr>
+          <p:cNvPr id="194" name="Straight Connector 193">
+            <a:extLst>
+              <a:ext uri="{FF2B5EF4-FFF2-40B4-BE49-F238E27FC236}">
+                <a16:creationId xmlns:a16="http://schemas.microsoft.com/office/drawing/2014/main" id="{FDA7ED23-0E0C-4A7B-A5D5-EEE2CE1079DB}"/>
+              </a:ext>
+            </a:extLst>
+          </p:cNvPr>
+          <p:cNvCxnSpPr>
+            <a:cxnSpLocks/>
+          </p:cNvCxnSpPr>
+          <p:nvPr/>
+        </p:nvCxnSpPr>
+        <p:spPr>
+          <a:xfrm flipH="1">
+            <a:off x="3622471" y="4746060"/>
+            <a:ext cx="1864767" cy="0"/>
+          </a:xfrm>
+          <a:prstGeom prst="line">
+            <a:avLst/>
+          </a:prstGeom>
+          <a:ln w="38100"/>
+        </p:spPr>
+        <p:style>
+          <a:lnRef idx="1">
+            <a:schemeClr val="dk1"/>
+          </a:lnRef>
+          <a:fillRef idx="0">
+            <a:schemeClr val="dk1"/>
+          </a:fillRef>
+          <a:effectRef idx="0">
+            <a:schemeClr val="dk1"/>
+          </a:effectRef>
+          <a:fontRef idx="minor">
+            <a:schemeClr val="tx1"/>
+          </a:fontRef>
+        </p:style>
+      </p:cxnSp>
+      <p:sp>
+        <p:nvSpPr>
+          <p:cNvPr id="254" name="Oval 253">
+            <a:extLst>
+              <a:ext uri="{FF2B5EF4-FFF2-40B4-BE49-F238E27FC236}">
+                <a16:creationId xmlns:a16="http://schemas.microsoft.com/office/drawing/2014/main" id="{881A14EF-8BF4-45F1-9049-394A9DE0528C}"/>
+              </a:ext>
+            </a:extLst>
+          </p:cNvPr>
+          <p:cNvSpPr/>
+          <p:nvPr/>
+        </p:nvSpPr>
+        <p:spPr>
+          <a:xfrm>
+            <a:off x="5391866" y="4675448"/>
+            <a:ext cx="103932" cy="98166"/>
+          </a:xfrm>
+          <a:prstGeom prst="ellipse">
+            <a:avLst/>
+          </a:prstGeom>
+        </p:spPr>
+        <p:style>
+          <a:lnRef idx="2">
+            <a:schemeClr val="accent2">
+              <a:shade val="50000"/>
+            </a:schemeClr>
+          </a:lnRef>
+          <a:fillRef idx="1">
+            <a:schemeClr val="accent2"/>
+          </a:fillRef>
+          <a:effectRef idx="0">
+            <a:schemeClr val="accent2"/>
+          </a:effectRef>
+          <a:fontRef idx="minor">
+            <a:schemeClr val="lt1"/>
+          </a:fontRef>
+        </p:style>
+        <p:txBody>
+          <a:bodyPr rtlCol="0" anchor="ctr"/>
+          <a:lstStyle/>
+          <a:p>
+            <a:pPr algn="ctr"/>
+            <a:endParaRPr lang="en-IN"/>
           </a:p>
         </p:txBody>
       </p:sp>

</xml_diff>

<commit_message>
changes to stress-strain analysis
</commit_message>
<xml_diff>
--- a/STRENGTH OF MATERIALS SHORTNOTES/SOM Revision.pptx
+++ b/STRENGTH OF MATERIALS SHORTNOTES/SOM Revision.pptx
@@ -37,6 +37,8 @@
     <p:sldId id="285" r:id="rId31"/>
     <p:sldId id="286" r:id="rId32"/>
     <p:sldId id="287" r:id="rId33"/>
+    <p:sldId id="289" r:id="rId34"/>
+    <p:sldId id="288" r:id="rId35"/>
   </p:sldIdLst>
   <p:sldSz cx="12192000" cy="6858000"/>
   <p:notesSz cx="6858000" cy="9144000"/>
@@ -292,7 +294,7 @@
           <a:p>
             <a:fld id="{EA402788-B3D0-4CAD-96CC-4B452FA47DBC}" type="datetimeFigureOut">
               <a:rPr lang="en-IN" smtClean="0"/>
-              <a:t>02-02-2023</a:t>
+              <a:t>05-02-2023</a:t>
             </a:fld>
             <a:endParaRPr lang="en-IN"/>
           </a:p>
@@ -492,7 +494,7 @@
           <a:p>
             <a:fld id="{EA402788-B3D0-4CAD-96CC-4B452FA47DBC}" type="datetimeFigureOut">
               <a:rPr lang="en-IN" smtClean="0"/>
-              <a:t>02-02-2023</a:t>
+              <a:t>05-02-2023</a:t>
             </a:fld>
             <a:endParaRPr lang="en-IN"/>
           </a:p>
@@ -702,7 +704,7 @@
           <a:p>
             <a:fld id="{EA402788-B3D0-4CAD-96CC-4B452FA47DBC}" type="datetimeFigureOut">
               <a:rPr lang="en-IN" smtClean="0"/>
-              <a:t>02-02-2023</a:t>
+              <a:t>05-02-2023</a:t>
             </a:fld>
             <a:endParaRPr lang="en-IN"/>
           </a:p>
@@ -902,7 +904,7 @@
           <a:p>
             <a:fld id="{EA402788-B3D0-4CAD-96CC-4B452FA47DBC}" type="datetimeFigureOut">
               <a:rPr lang="en-IN" smtClean="0"/>
-              <a:t>02-02-2023</a:t>
+              <a:t>05-02-2023</a:t>
             </a:fld>
             <a:endParaRPr lang="en-IN"/>
           </a:p>
@@ -1178,7 +1180,7 @@
           <a:p>
             <a:fld id="{EA402788-B3D0-4CAD-96CC-4B452FA47DBC}" type="datetimeFigureOut">
               <a:rPr lang="en-IN" smtClean="0"/>
-              <a:t>02-02-2023</a:t>
+              <a:t>05-02-2023</a:t>
             </a:fld>
             <a:endParaRPr lang="en-IN"/>
           </a:p>
@@ -1446,7 +1448,7 @@
           <a:p>
             <a:fld id="{EA402788-B3D0-4CAD-96CC-4B452FA47DBC}" type="datetimeFigureOut">
               <a:rPr lang="en-IN" smtClean="0"/>
-              <a:t>02-02-2023</a:t>
+              <a:t>05-02-2023</a:t>
             </a:fld>
             <a:endParaRPr lang="en-IN"/>
           </a:p>
@@ -1861,7 +1863,7 @@
           <a:p>
             <a:fld id="{EA402788-B3D0-4CAD-96CC-4B452FA47DBC}" type="datetimeFigureOut">
               <a:rPr lang="en-IN" smtClean="0"/>
-              <a:t>02-02-2023</a:t>
+              <a:t>05-02-2023</a:t>
             </a:fld>
             <a:endParaRPr lang="en-IN"/>
           </a:p>
@@ -2003,7 +2005,7 @@
           <a:p>
             <a:fld id="{EA402788-B3D0-4CAD-96CC-4B452FA47DBC}" type="datetimeFigureOut">
               <a:rPr lang="en-IN" smtClean="0"/>
-              <a:t>02-02-2023</a:t>
+              <a:t>05-02-2023</a:t>
             </a:fld>
             <a:endParaRPr lang="en-IN"/>
           </a:p>
@@ -2116,7 +2118,7 @@
           <a:p>
             <a:fld id="{EA402788-B3D0-4CAD-96CC-4B452FA47DBC}" type="datetimeFigureOut">
               <a:rPr lang="en-IN" smtClean="0"/>
-              <a:t>02-02-2023</a:t>
+              <a:t>05-02-2023</a:t>
             </a:fld>
             <a:endParaRPr lang="en-IN"/>
           </a:p>
@@ -2429,7 +2431,7 @@
           <a:p>
             <a:fld id="{EA402788-B3D0-4CAD-96CC-4B452FA47DBC}" type="datetimeFigureOut">
               <a:rPr lang="en-IN" smtClean="0"/>
-              <a:t>02-02-2023</a:t>
+              <a:t>05-02-2023</a:t>
             </a:fld>
             <a:endParaRPr lang="en-IN"/>
           </a:p>
@@ -2718,7 +2720,7 @@
           <a:p>
             <a:fld id="{EA402788-B3D0-4CAD-96CC-4B452FA47DBC}" type="datetimeFigureOut">
               <a:rPr lang="en-IN" smtClean="0"/>
-              <a:t>02-02-2023</a:t>
+              <a:t>05-02-2023</a:t>
             </a:fld>
             <a:endParaRPr lang="en-IN"/>
           </a:p>
@@ -2961,7 +2963,7 @@
           <a:p>
             <a:fld id="{EA402788-B3D0-4CAD-96CC-4B452FA47DBC}" type="datetimeFigureOut">
               <a:rPr lang="en-IN" smtClean="0"/>
-              <a:t>02-02-2023</a:t>
+              <a:t>05-02-2023</a:t>
             </a:fld>
             <a:endParaRPr lang="en-IN"/>
           </a:p>
@@ -45783,10 +45785,4583 @@
           </a:p>
         </p:txBody>
       </p:sp>
+      <p:cxnSp>
+        <p:nvCxnSpPr>
+          <p:cNvPr id="182" name="Straight Arrow Connector 181">
+            <a:extLst>
+              <a:ext uri="{FF2B5EF4-FFF2-40B4-BE49-F238E27FC236}">
+                <a16:creationId xmlns:a16="http://schemas.microsoft.com/office/drawing/2014/main" id="{70387391-016F-4925-AB54-AA71EA25E2C9}"/>
+              </a:ext>
+            </a:extLst>
+          </p:cNvPr>
+          <p:cNvCxnSpPr>
+            <a:cxnSpLocks/>
+          </p:cNvCxnSpPr>
+          <p:nvPr/>
+        </p:nvCxnSpPr>
+        <p:spPr>
+          <a:xfrm flipV="1">
+            <a:off x="10099991" y="405810"/>
+            <a:ext cx="0" cy="892904"/>
+          </a:xfrm>
+          <a:prstGeom prst="straightConnector1">
+            <a:avLst/>
+          </a:prstGeom>
+          <a:ln w="57150">
+            <a:tailEnd type="triangle"/>
+          </a:ln>
+        </p:spPr>
+        <p:style>
+          <a:lnRef idx="1">
+            <a:schemeClr val="accent2"/>
+          </a:lnRef>
+          <a:fillRef idx="0">
+            <a:schemeClr val="accent2"/>
+          </a:fillRef>
+          <a:effectRef idx="0">
+            <a:schemeClr val="accent2"/>
+          </a:effectRef>
+          <a:fontRef idx="minor">
+            <a:schemeClr val="tx1"/>
+          </a:fontRef>
+        </p:style>
+      </p:cxnSp>
+      <p:cxnSp>
+        <p:nvCxnSpPr>
+          <p:cNvPr id="183" name="Straight Arrow Connector 182">
+            <a:extLst>
+              <a:ext uri="{FF2B5EF4-FFF2-40B4-BE49-F238E27FC236}">
+                <a16:creationId xmlns:a16="http://schemas.microsoft.com/office/drawing/2014/main" id="{3BE25D23-9A17-44A3-A9F4-7D5669D34BA1}"/>
+              </a:ext>
+            </a:extLst>
+          </p:cNvPr>
+          <p:cNvCxnSpPr>
+            <a:cxnSpLocks/>
+          </p:cNvCxnSpPr>
+          <p:nvPr/>
+        </p:nvCxnSpPr>
+        <p:spPr>
+          <a:xfrm flipH="1">
+            <a:off x="10151000" y="3327508"/>
+            <a:ext cx="7602" cy="714714"/>
+          </a:xfrm>
+          <a:prstGeom prst="straightConnector1">
+            <a:avLst/>
+          </a:prstGeom>
+          <a:ln w="57150">
+            <a:tailEnd type="triangle"/>
+          </a:ln>
+        </p:spPr>
+        <p:style>
+          <a:lnRef idx="1">
+            <a:schemeClr val="accent2"/>
+          </a:lnRef>
+          <a:fillRef idx="0">
+            <a:schemeClr val="accent2"/>
+          </a:fillRef>
+          <a:effectRef idx="0">
+            <a:schemeClr val="accent2"/>
+          </a:effectRef>
+          <a:fontRef idx="minor">
+            <a:schemeClr val="tx1"/>
+          </a:fontRef>
+        </p:style>
+      </p:cxnSp>
     </p:spTree>
     <p:extLst>
       <p:ext uri="{BB962C8B-B14F-4D97-AF65-F5344CB8AC3E}">
         <p14:creationId xmlns:p14="http://schemas.microsoft.com/office/powerpoint/2010/main" val="1913753874"/>
+      </p:ext>
+    </p:extLst>
+  </p:cSld>
+  <p:clrMapOvr>
+    <a:masterClrMapping/>
+  </p:clrMapOvr>
+</p:sld>
+</file>
+
+<file path=ppt/slides/slide33.xml><?xml version="1.0" encoding="utf-8"?>
+<p:sld xmlns:a="http://schemas.openxmlformats.org/drawingml/2006/main" xmlns:r="http://schemas.openxmlformats.org/officeDocument/2006/relationships" xmlns:p="http://schemas.openxmlformats.org/presentationml/2006/main">
+  <p:cSld>
+    <p:spTree>
+      <p:nvGrpSpPr>
+        <p:cNvPr id="1" name=""/>
+        <p:cNvGrpSpPr/>
+        <p:nvPr/>
+      </p:nvGrpSpPr>
+      <p:grpSpPr>
+        <a:xfrm>
+          <a:off x="0" y="0"/>
+          <a:ext cx="0" cy="0"/>
+          <a:chOff x="0" y="0"/>
+          <a:chExt cx="0" cy="0"/>
+        </a:xfrm>
+      </p:grpSpPr>
+      <p:cxnSp>
+        <p:nvCxnSpPr>
+          <p:cNvPr id="386" name="Straight Connector 385">
+            <a:extLst>
+              <a:ext uri="{FF2B5EF4-FFF2-40B4-BE49-F238E27FC236}">
+                <a16:creationId xmlns:a16="http://schemas.microsoft.com/office/drawing/2014/main" id="{49692702-BAFC-4FC5-B9B0-C4D9EDB0F50A}"/>
+              </a:ext>
+            </a:extLst>
+          </p:cNvPr>
+          <p:cNvCxnSpPr>
+            <a:cxnSpLocks/>
+          </p:cNvCxnSpPr>
+          <p:nvPr/>
+        </p:nvCxnSpPr>
+        <p:spPr>
+          <a:xfrm>
+            <a:off x="5342957" y="1511160"/>
+            <a:ext cx="490877" cy="1742569"/>
+          </a:xfrm>
+          <a:prstGeom prst="line">
+            <a:avLst/>
+          </a:prstGeom>
+          <a:ln w="57150">
+            <a:prstDash val="sysDot"/>
+          </a:ln>
+        </p:spPr>
+        <p:style>
+          <a:lnRef idx="1">
+            <a:schemeClr val="accent3"/>
+          </a:lnRef>
+          <a:fillRef idx="0">
+            <a:schemeClr val="accent3"/>
+          </a:fillRef>
+          <a:effectRef idx="0">
+            <a:schemeClr val="accent3"/>
+          </a:effectRef>
+          <a:fontRef idx="minor">
+            <a:schemeClr val="tx1"/>
+          </a:fontRef>
+        </p:style>
+      </p:cxnSp>
+      <p:sp>
+        <p:nvSpPr>
+          <p:cNvPr id="182" name="Arc 181">
+            <a:extLst>
+              <a:ext uri="{FF2B5EF4-FFF2-40B4-BE49-F238E27FC236}">
+                <a16:creationId xmlns:a16="http://schemas.microsoft.com/office/drawing/2014/main" id="{EB1A9182-8200-42E7-8A0E-13244A0BDB71}"/>
+              </a:ext>
+            </a:extLst>
+          </p:cNvPr>
+          <p:cNvSpPr/>
+          <p:nvPr/>
+        </p:nvSpPr>
+        <p:spPr>
+          <a:xfrm rot="18168457">
+            <a:off x="2392700" y="2411971"/>
+            <a:ext cx="789732" cy="725862"/>
+          </a:xfrm>
+          <a:prstGeom prst="arc">
+            <a:avLst>
+              <a:gd name="adj1" fmla="val 17346437"/>
+              <a:gd name="adj2" fmla="val 21110409"/>
+            </a:avLst>
+          </a:prstGeom>
+          <a:ln w="57150"/>
+        </p:spPr>
+        <p:style>
+          <a:lnRef idx="1">
+            <a:schemeClr val="accent1"/>
+          </a:lnRef>
+          <a:fillRef idx="0">
+            <a:schemeClr val="accent1"/>
+          </a:fillRef>
+          <a:effectRef idx="0">
+            <a:schemeClr val="accent1"/>
+          </a:effectRef>
+          <a:fontRef idx="minor">
+            <a:schemeClr val="tx1"/>
+          </a:fontRef>
+        </p:style>
+        <p:txBody>
+          <a:bodyPr rtlCol="0" anchor="ctr"/>
+          <a:lstStyle/>
+          <a:p>
+            <a:pPr algn="ctr"/>
+            <a:endParaRPr lang="en-IN"/>
+          </a:p>
+        </p:txBody>
+      </p:sp>
+      <p:cxnSp>
+        <p:nvCxnSpPr>
+          <p:cNvPr id="183" name="Straight Connector 182">
+            <a:extLst>
+              <a:ext uri="{FF2B5EF4-FFF2-40B4-BE49-F238E27FC236}">
+                <a16:creationId xmlns:a16="http://schemas.microsoft.com/office/drawing/2014/main" id="{164BA979-2F86-4E03-9D42-8ADB361F2FE6}"/>
+              </a:ext>
+            </a:extLst>
+          </p:cNvPr>
+          <p:cNvCxnSpPr/>
+          <p:nvPr/>
+        </p:nvCxnSpPr>
+        <p:spPr>
+          <a:xfrm>
+            <a:off x="1372107" y="1532506"/>
+            <a:ext cx="0" cy="1721223"/>
+          </a:xfrm>
+          <a:prstGeom prst="line">
+            <a:avLst/>
+          </a:prstGeom>
+          <a:ln w="57150"/>
+        </p:spPr>
+        <p:style>
+          <a:lnRef idx="1">
+            <a:schemeClr val="dk1"/>
+          </a:lnRef>
+          <a:fillRef idx="0">
+            <a:schemeClr val="dk1"/>
+          </a:fillRef>
+          <a:effectRef idx="0">
+            <a:schemeClr val="dk1"/>
+          </a:effectRef>
+          <a:fontRef idx="minor">
+            <a:schemeClr val="tx1"/>
+          </a:fontRef>
+        </p:style>
+      </p:cxnSp>
+      <p:cxnSp>
+        <p:nvCxnSpPr>
+          <p:cNvPr id="186" name="Straight Connector 185">
+            <a:extLst>
+              <a:ext uri="{FF2B5EF4-FFF2-40B4-BE49-F238E27FC236}">
+                <a16:creationId xmlns:a16="http://schemas.microsoft.com/office/drawing/2014/main" id="{4481783E-ECEB-4093-B4AC-772EF162947E}"/>
+              </a:ext>
+            </a:extLst>
+          </p:cNvPr>
+          <p:cNvCxnSpPr>
+            <a:cxnSpLocks/>
+          </p:cNvCxnSpPr>
+          <p:nvPr/>
+        </p:nvCxnSpPr>
+        <p:spPr>
+          <a:xfrm>
+            <a:off x="1354177" y="1550436"/>
+            <a:ext cx="1595718" cy="0"/>
+          </a:xfrm>
+          <a:prstGeom prst="line">
+            <a:avLst/>
+          </a:prstGeom>
+          <a:ln w="57150"/>
+        </p:spPr>
+        <p:style>
+          <a:lnRef idx="1">
+            <a:schemeClr val="dk1"/>
+          </a:lnRef>
+          <a:fillRef idx="0">
+            <a:schemeClr val="dk1"/>
+          </a:fillRef>
+          <a:effectRef idx="0">
+            <a:schemeClr val="dk1"/>
+          </a:effectRef>
+          <a:fontRef idx="minor">
+            <a:schemeClr val="tx1"/>
+          </a:fontRef>
+        </p:style>
+      </p:cxnSp>
+      <p:cxnSp>
+        <p:nvCxnSpPr>
+          <p:cNvPr id="187" name="Straight Connector 186">
+            <a:extLst>
+              <a:ext uri="{FF2B5EF4-FFF2-40B4-BE49-F238E27FC236}">
+                <a16:creationId xmlns:a16="http://schemas.microsoft.com/office/drawing/2014/main" id="{DD700A20-B789-412E-9F28-66D8826B8FAF}"/>
+              </a:ext>
+            </a:extLst>
+          </p:cNvPr>
+          <p:cNvCxnSpPr/>
+          <p:nvPr/>
+        </p:nvCxnSpPr>
+        <p:spPr>
+          <a:xfrm>
+            <a:off x="2931966" y="1532506"/>
+            <a:ext cx="0" cy="1721223"/>
+          </a:xfrm>
+          <a:prstGeom prst="line">
+            <a:avLst/>
+          </a:prstGeom>
+          <a:ln w="57150"/>
+        </p:spPr>
+        <p:style>
+          <a:lnRef idx="1">
+            <a:schemeClr val="dk1"/>
+          </a:lnRef>
+          <a:fillRef idx="0">
+            <a:schemeClr val="dk1"/>
+          </a:fillRef>
+          <a:effectRef idx="0">
+            <a:schemeClr val="dk1"/>
+          </a:effectRef>
+          <a:fontRef idx="minor">
+            <a:schemeClr val="tx1"/>
+          </a:fontRef>
+        </p:style>
+      </p:cxnSp>
+      <p:cxnSp>
+        <p:nvCxnSpPr>
+          <p:cNvPr id="191" name="Straight Connector 190">
+            <a:extLst>
+              <a:ext uri="{FF2B5EF4-FFF2-40B4-BE49-F238E27FC236}">
+                <a16:creationId xmlns:a16="http://schemas.microsoft.com/office/drawing/2014/main" id="{F7347990-22FA-4CC3-8E25-2B6016AECAEC}"/>
+              </a:ext>
+            </a:extLst>
+          </p:cNvPr>
+          <p:cNvCxnSpPr>
+            <a:cxnSpLocks/>
+          </p:cNvCxnSpPr>
+          <p:nvPr/>
+        </p:nvCxnSpPr>
+        <p:spPr>
+          <a:xfrm>
+            <a:off x="1363142" y="3235800"/>
+            <a:ext cx="1595718" cy="0"/>
+          </a:xfrm>
+          <a:prstGeom prst="line">
+            <a:avLst/>
+          </a:prstGeom>
+          <a:ln w="57150"/>
+        </p:spPr>
+        <p:style>
+          <a:lnRef idx="1">
+            <a:schemeClr val="dk1"/>
+          </a:lnRef>
+          <a:fillRef idx="0">
+            <a:schemeClr val="dk1"/>
+          </a:fillRef>
+          <a:effectRef idx="0">
+            <a:schemeClr val="dk1"/>
+          </a:effectRef>
+          <a:fontRef idx="minor">
+            <a:schemeClr val="tx1"/>
+          </a:fontRef>
+        </p:style>
+      </p:cxnSp>
+      <p:cxnSp>
+        <p:nvCxnSpPr>
+          <p:cNvPr id="195" name="Straight Connector 194">
+            <a:extLst>
+              <a:ext uri="{FF2B5EF4-FFF2-40B4-BE49-F238E27FC236}">
+                <a16:creationId xmlns:a16="http://schemas.microsoft.com/office/drawing/2014/main" id="{EF9F1345-97FF-44BB-A3BA-C1E4F7BC2127}"/>
+              </a:ext>
+            </a:extLst>
+          </p:cNvPr>
+          <p:cNvCxnSpPr/>
+          <p:nvPr/>
+        </p:nvCxnSpPr>
+        <p:spPr>
+          <a:xfrm>
+            <a:off x="1784484" y="913941"/>
+            <a:ext cx="1344705" cy="2725271"/>
+          </a:xfrm>
+          <a:prstGeom prst="line">
+            <a:avLst/>
+          </a:prstGeom>
+          <a:ln w="57150">
+            <a:prstDash val="sysDash"/>
+          </a:ln>
+        </p:spPr>
+        <p:style>
+          <a:lnRef idx="1">
+            <a:schemeClr val="accent1"/>
+          </a:lnRef>
+          <a:fillRef idx="0">
+            <a:schemeClr val="accent1"/>
+          </a:fillRef>
+          <a:effectRef idx="0">
+            <a:schemeClr val="accent1"/>
+          </a:effectRef>
+          <a:fontRef idx="minor">
+            <a:schemeClr val="tx1"/>
+          </a:fontRef>
+        </p:style>
+      </p:cxnSp>
+      <mc:AlternateContent xmlns:mc="http://schemas.openxmlformats.org/markup-compatibility/2006">
+        <mc:Choice xmlns:a14="http://schemas.microsoft.com/office/drawing/2010/main" Requires="a14">
+          <p:sp>
+            <p:nvSpPr>
+              <p:cNvPr id="198" name="TextBox 197">
+                <a:extLst>
+                  <a:ext uri="{FF2B5EF4-FFF2-40B4-BE49-F238E27FC236}">
+                    <a16:creationId xmlns:a16="http://schemas.microsoft.com/office/drawing/2014/main" id="{6D2852A0-0CD3-4493-BA3E-C7F710832CAC}"/>
+                  </a:ext>
+                </a:extLst>
+              </p:cNvPr>
+              <p:cNvSpPr txBox="1"/>
+              <p:nvPr/>
+            </p:nvSpPr>
+            <p:spPr>
+              <a:xfrm>
+                <a:off x="2582425" y="2075777"/>
+                <a:ext cx="197170" cy="276999"/>
+              </a:xfrm>
+              <a:prstGeom prst="rect">
+                <a:avLst/>
+              </a:prstGeom>
+              <a:noFill/>
+            </p:spPr>
+            <p:txBody>
+              <a:bodyPr wrap="none" lIns="0" tIns="0" rIns="0" bIns="0" rtlCol="0">
+                <a:spAutoFit/>
+              </a:bodyPr>
+              <a:lstStyle/>
+              <a:p>
+                <a:pPr/>
+                <a14:m>
+                  <m:oMathPara xmlns:m="http://schemas.openxmlformats.org/officeDocument/2006/math">
+                    <m:oMathParaPr>
+                      <m:jc m:val="centerGroup"/>
+                    </m:oMathParaPr>
+                    <m:oMath xmlns:m="http://schemas.openxmlformats.org/officeDocument/2006/math">
+                      <m:r>
+                        <a:rPr lang="en-IN" b="1" i="1" smtClean="0">
+                          <a:latin typeface="Cambria Math" panose="02040503050406030204" pitchFamily="18" charset="0"/>
+                        </a:rPr>
+                        <m:t>𝜽</m:t>
+                      </m:r>
+                    </m:oMath>
+                  </m:oMathPara>
+                </a14:m>
+                <a:endParaRPr lang="en-IN" b="1"/>
+              </a:p>
+            </p:txBody>
+          </p:sp>
+        </mc:Choice>
+        <mc:Fallback>
+          <p:sp>
+            <p:nvSpPr>
+              <p:cNvPr id="198" name="TextBox 197">
+                <a:extLst>
+                  <a:ext uri="{FF2B5EF4-FFF2-40B4-BE49-F238E27FC236}">
+                    <a16:creationId xmlns:a16="http://schemas.microsoft.com/office/drawing/2014/main" id="{6D2852A0-0CD3-4493-BA3E-C7F710832CAC}"/>
+                  </a:ext>
+                </a:extLst>
+              </p:cNvPr>
+              <p:cNvSpPr txBox="1">
+                <a:spLocks noRot="1" noChangeAspect="1" noMove="1" noResize="1" noEditPoints="1" noAdjustHandles="1" noChangeArrowheads="1" noChangeShapeType="1" noTextEdit="1"/>
+              </p:cNvSpPr>
+              <p:nvPr/>
+            </p:nvSpPr>
+            <p:spPr>
+              <a:xfrm>
+                <a:off x="2582425" y="2075777"/>
+                <a:ext cx="197170" cy="276999"/>
+              </a:xfrm>
+              <a:prstGeom prst="rect">
+                <a:avLst/>
+              </a:prstGeom>
+              <a:blipFill>
+                <a:blip r:embed="rId2"/>
+                <a:stretch>
+                  <a:fillRect l="-31250" r="-28125" b="-6667"/>
+                </a:stretch>
+              </a:blipFill>
+            </p:spPr>
+            <p:txBody>
+              <a:bodyPr/>
+              <a:lstStyle/>
+              <a:p>
+                <a:r>
+                  <a:rPr lang="en-IN">
+                    <a:noFill/>
+                  </a:rPr>
+                  <a:t> </a:t>
+                </a:r>
+              </a:p>
+            </p:txBody>
+          </p:sp>
+        </mc:Fallback>
+      </mc:AlternateContent>
+      <p:sp>
+        <p:nvSpPr>
+          <p:cNvPr id="258" name="TextBox 257">
+            <a:extLst>
+              <a:ext uri="{FF2B5EF4-FFF2-40B4-BE49-F238E27FC236}">
+                <a16:creationId xmlns:a16="http://schemas.microsoft.com/office/drawing/2014/main" id="{03CD0382-B73F-4D66-B47A-F2D4FBA739D6}"/>
+              </a:ext>
+            </a:extLst>
+          </p:cNvPr>
+          <p:cNvSpPr txBox="1"/>
+          <p:nvPr/>
+        </p:nvSpPr>
+        <p:spPr>
+          <a:xfrm>
+            <a:off x="1497614" y="447359"/>
+            <a:ext cx="358587" cy="523220"/>
+          </a:xfrm>
+          <a:prstGeom prst="rect">
+            <a:avLst/>
+          </a:prstGeom>
+          <a:noFill/>
+        </p:spPr>
+        <p:txBody>
+          <a:bodyPr wrap="square" rtlCol="0">
+            <a:spAutoFit/>
+          </a:bodyPr>
+          <a:lstStyle/>
+          <a:p>
+            <a:r>
+              <a:rPr lang="en-US" sz="2800" b="1"/>
+              <a:t>A</a:t>
+            </a:r>
+            <a:endParaRPr lang="en-IN" sz="2800" b="1"/>
+          </a:p>
+        </p:txBody>
+      </p:sp>
+      <p:sp>
+        <p:nvSpPr>
+          <p:cNvPr id="259" name="TextBox 258">
+            <a:extLst>
+              <a:ext uri="{FF2B5EF4-FFF2-40B4-BE49-F238E27FC236}">
+                <a16:creationId xmlns:a16="http://schemas.microsoft.com/office/drawing/2014/main" id="{063D0EA9-BC2A-4FF7-A7CD-631EB51F2DA0}"/>
+              </a:ext>
+            </a:extLst>
+          </p:cNvPr>
+          <p:cNvSpPr txBox="1"/>
+          <p:nvPr/>
+        </p:nvSpPr>
+        <p:spPr>
+          <a:xfrm>
+            <a:off x="3057472" y="3509968"/>
+            <a:ext cx="358587" cy="523220"/>
+          </a:xfrm>
+          <a:prstGeom prst="rect">
+            <a:avLst/>
+          </a:prstGeom>
+          <a:noFill/>
+        </p:spPr>
+        <p:txBody>
+          <a:bodyPr wrap="square" rtlCol="0">
+            <a:spAutoFit/>
+          </a:bodyPr>
+          <a:lstStyle/>
+          <a:p>
+            <a:r>
+              <a:rPr lang="en-US" sz="2800" b="1"/>
+              <a:t>A</a:t>
+            </a:r>
+            <a:endParaRPr lang="en-IN" sz="2800" b="1"/>
+          </a:p>
+        </p:txBody>
+      </p:sp>
+      <p:sp>
+        <p:nvSpPr>
+          <p:cNvPr id="260" name="TextBox 259">
+            <a:extLst>
+              <a:ext uri="{FF2B5EF4-FFF2-40B4-BE49-F238E27FC236}">
+                <a16:creationId xmlns:a16="http://schemas.microsoft.com/office/drawing/2014/main" id="{47DAAD1A-0E4A-4903-9165-E9CCD8BC181D}"/>
+              </a:ext>
+            </a:extLst>
+          </p:cNvPr>
+          <p:cNvSpPr txBox="1"/>
+          <p:nvPr/>
+        </p:nvSpPr>
+        <p:spPr>
+          <a:xfrm>
+            <a:off x="2832295" y="1077519"/>
+            <a:ext cx="358587" cy="523220"/>
+          </a:xfrm>
+          <a:prstGeom prst="rect">
+            <a:avLst/>
+          </a:prstGeom>
+          <a:noFill/>
+        </p:spPr>
+        <p:txBody>
+          <a:bodyPr wrap="square" rtlCol="0">
+            <a:spAutoFit/>
+          </a:bodyPr>
+          <a:lstStyle/>
+          <a:p>
+            <a:r>
+              <a:rPr lang="en-US" sz="2800" b="1"/>
+              <a:t>d</a:t>
+            </a:r>
+            <a:endParaRPr lang="en-IN" sz="2800" b="1"/>
+          </a:p>
+        </p:txBody>
+      </p:sp>
+      <p:sp>
+        <p:nvSpPr>
+          <p:cNvPr id="261" name="TextBox 260">
+            <a:extLst>
+              <a:ext uri="{FF2B5EF4-FFF2-40B4-BE49-F238E27FC236}">
+                <a16:creationId xmlns:a16="http://schemas.microsoft.com/office/drawing/2014/main" id="{8C74451B-9A78-4A1A-ADA9-230F09B9227E}"/>
+              </a:ext>
+            </a:extLst>
+          </p:cNvPr>
+          <p:cNvSpPr txBox="1"/>
+          <p:nvPr/>
+        </p:nvSpPr>
+        <p:spPr>
+          <a:xfrm>
+            <a:off x="1058344" y="1083854"/>
+            <a:ext cx="358587" cy="523220"/>
+          </a:xfrm>
+          <a:prstGeom prst="rect">
+            <a:avLst/>
+          </a:prstGeom>
+          <a:noFill/>
+        </p:spPr>
+        <p:txBody>
+          <a:bodyPr wrap="square" rtlCol="0">
+            <a:spAutoFit/>
+          </a:bodyPr>
+          <a:lstStyle/>
+          <a:p>
+            <a:r>
+              <a:rPr lang="en-US" sz="2800" b="1"/>
+              <a:t>g</a:t>
+            </a:r>
+            <a:endParaRPr lang="en-IN" sz="2800" b="1"/>
+          </a:p>
+        </p:txBody>
+      </p:sp>
+      <p:sp>
+        <p:nvSpPr>
+          <p:cNvPr id="262" name="TextBox 261">
+            <a:extLst>
+              <a:ext uri="{FF2B5EF4-FFF2-40B4-BE49-F238E27FC236}">
+                <a16:creationId xmlns:a16="http://schemas.microsoft.com/office/drawing/2014/main" id="{714FB9C1-C500-4988-994C-F898A2E30B51}"/>
+              </a:ext>
+            </a:extLst>
+          </p:cNvPr>
+          <p:cNvSpPr txBox="1"/>
+          <p:nvPr/>
+        </p:nvSpPr>
+        <p:spPr>
+          <a:xfrm>
+            <a:off x="1058345" y="3183645"/>
+            <a:ext cx="358587" cy="523220"/>
+          </a:xfrm>
+          <a:prstGeom prst="rect">
+            <a:avLst/>
+          </a:prstGeom>
+          <a:noFill/>
+        </p:spPr>
+        <p:txBody>
+          <a:bodyPr wrap="square" rtlCol="0">
+            <a:spAutoFit/>
+          </a:bodyPr>
+          <a:lstStyle/>
+          <a:p>
+            <a:r>
+              <a:rPr lang="en-US" sz="2800" b="1"/>
+              <a:t>h</a:t>
+            </a:r>
+            <a:endParaRPr lang="en-IN" sz="2800" b="1"/>
+          </a:p>
+        </p:txBody>
+      </p:sp>
+      <p:sp>
+        <p:nvSpPr>
+          <p:cNvPr id="265" name="TextBox 264">
+            <a:extLst>
+              <a:ext uri="{FF2B5EF4-FFF2-40B4-BE49-F238E27FC236}">
+                <a16:creationId xmlns:a16="http://schemas.microsoft.com/office/drawing/2014/main" id="{9FF6C3CB-F9A2-4FEA-BA3E-2C5F6F0BC06A}"/>
+              </a:ext>
+            </a:extLst>
+          </p:cNvPr>
+          <p:cNvSpPr txBox="1"/>
+          <p:nvPr/>
+        </p:nvSpPr>
+        <p:spPr>
+          <a:xfrm>
+            <a:off x="2992696" y="3022274"/>
+            <a:ext cx="396371" cy="523220"/>
+          </a:xfrm>
+          <a:prstGeom prst="rect">
+            <a:avLst/>
+          </a:prstGeom>
+          <a:noFill/>
+        </p:spPr>
+        <p:txBody>
+          <a:bodyPr wrap="square" rtlCol="0">
+            <a:spAutoFit/>
+          </a:bodyPr>
+          <a:lstStyle/>
+          <a:p>
+            <a:r>
+              <a:rPr lang="en-US" sz="2800" b="1"/>
+              <a:t>a</a:t>
+            </a:r>
+            <a:endParaRPr lang="en-IN" sz="2800" b="1"/>
+          </a:p>
+        </p:txBody>
+      </p:sp>
+      <p:sp>
+        <p:nvSpPr>
+          <p:cNvPr id="267" name="Oval 266">
+            <a:extLst>
+              <a:ext uri="{FF2B5EF4-FFF2-40B4-BE49-F238E27FC236}">
+                <a16:creationId xmlns:a16="http://schemas.microsoft.com/office/drawing/2014/main" id="{2B3F2903-3400-45ED-B9A6-502F46515018}"/>
+              </a:ext>
+            </a:extLst>
+          </p:cNvPr>
+          <p:cNvSpPr/>
+          <p:nvPr/>
+        </p:nvSpPr>
+        <p:spPr>
+          <a:xfrm>
+            <a:off x="1311176" y="1468789"/>
+            <a:ext cx="103932" cy="98166"/>
+          </a:xfrm>
+          <a:prstGeom prst="ellipse">
+            <a:avLst/>
+          </a:prstGeom>
+        </p:spPr>
+        <p:style>
+          <a:lnRef idx="2">
+            <a:schemeClr val="accent2">
+              <a:shade val="50000"/>
+            </a:schemeClr>
+          </a:lnRef>
+          <a:fillRef idx="1">
+            <a:schemeClr val="accent2"/>
+          </a:fillRef>
+          <a:effectRef idx="0">
+            <a:schemeClr val="accent2"/>
+          </a:effectRef>
+          <a:fontRef idx="minor">
+            <a:schemeClr val="lt1"/>
+          </a:fontRef>
+        </p:style>
+        <p:txBody>
+          <a:bodyPr rtlCol="0" anchor="ctr"/>
+          <a:lstStyle/>
+          <a:p>
+            <a:pPr algn="ctr"/>
+            <a:endParaRPr lang="en-IN"/>
+          </a:p>
+        </p:txBody>
+      </p:sp>
+      <p:sp>
+        <p:nvSpPr>
+          <p:cNvPr id="268" name="Oval 267">
+            <a:extLst>
+              <a:ext uri="{FF2B5EF4-FFF2-40B4-BE49-F238E27FC236}">
+                <a16:creationId xmlns:a16="http://schemas.microsoft.com/office/drawing/2014/main" id="{A09A8DF2-0063-4D38-B8A1-721A18B50E55}"/>
+              </a:ext>
+            </a:extLst>
+          </p:cNvPr>
+          <p:cNvSpPr/>
+          <p:nvPr/>
+        </p:nvSpPr>
+        <p:spPr>
+          <a:xfrm>
+            <a:off x="1296942" y="3179151"/>
+            <a:ext cx="103932" cy="98166"/>
+          </a:xfrm>
+          <a:prstGeom prst="ellipse">
+            <a:avLst/>
+          </a:prstGeom>
+        </p:spPr>
+        <p:style>
+          <a:lnRef idx="2">
+            <a:schemeClr val="accent2">
+              <a:shade val="50000"/>
+            </a:schemeClr>
+          </a:lnRef>
+          <a:fillRef idx="1">
+            <a:schemeClr val="accent2"/>
+          </a:fillRef>
+          <a:effectRef idx="0">
+            <a:schemeClr val="accent2"/>
+          </a:effectRef>
+          <a:fontRef idx="minor">
+            <a:schemeClr val="lt1"/>
+          </a:fontRef>
+        </p:style>
+        <p:txBody>
+          <a:bodyPr rtlCol="0" anchor="ctr"/>
+          <a:lstStyle/>
+          <a:p>
+            <a:pPr algn="ctr"/>
+            <a:endParaRPr lang="en-IN"/>
+          </a:p>
+        </p:txBody>
+      </p:sp>
+      <p:sp>
+        <p:nvSpPr>
+          <p:cNvPr id="283" name="Oval 282">
+            <a:extLst>
+              <a:ext uri="{FF2B5EF4-FFF2-40B4-BE49-F238E27FC236}">
+                <a16:creationId xmlns:a16="http://schemas.microsoft.com/office/drawing/2014/main" id="{55EB0BE6-E60F-43BF-9666-8FB89DAD59A7}"/>
+              </a:ext>
+            </a:extLst>
+          </p:cNvPr>
+          <p:cNvSpPr/>
+          <p:nvPr/>
+        </p:nvSpPr>
+        <p:spPr>
+          <a:xfrm>
+            <a:off x="2876428" y="3179151"/>
+            <a:ext cx="103932" cy="98166"/>
+          </a:xfrm>
+          <a:prstGeom prst="ellipse">
+            <a:avLst/>
+          </a:prstGeom>
+        </p:spPr>
+        <p:style>
+          <a:lnRef idx="2">
+            <a:schemeClr val="accent2">
+              <a:shade val="50000"/>
+            </a:schemeClr>
+          </a:lnRef>
+          <a:fillRef idx="1">
+            <a:schemeClr val="accent2"/>
+          </a:fillRef>
+          <a:effectRef idx="0">
+            <a:schemeClr val="accent2"/>
+          </a:effectRef>
+          <a:fontRef idx="minor">
+            <a:schemeClr val="lt1"/>
+          </a:fontRef>
+        </p:style>
+        <p:txBody>
+          <a:bodyPr rtlCol="0" anchor="ctr"/>
+          <a:lstStyle/>
+          <a:p>
+            <a:pPr algn="ctr"/>
+            <a:endParaRPr lang="en-IN"/>
+          </a:p>
+        </p:txBody>
+      </p:sp>
+      <p:sp>
+        <p:nvSpPr>
+          <p:cNvPr id="284" name="Oval 283">
+            <a:extLst>
+              <a:ext uri="{FF2B5EF4-FFF2-40B4-BE49-F238E27FC236}">
+                <a16:creationId xmlns:a16="http://schemas.microsoft.com/office/drawing/2014/main" id="{623F8380-15FA-4F92-B2DC-B6A55AF33B99}"/>
+              </a:ext>
+            </a:extLst>
+          </p:cNvPr>
+          <p:cNvSpPr/>
+          <p:nvPr/>
+        </p:nvSpPr>
+        <p:spPr>
+          <a:xfrm>
+            <a:off x="2876428" y="1473266"/>
+            <a:ext cx="103932" cy="98166"/>
+          </a:xfrm>
+          <a:prstGeom prst="ellipse">
+            <a:avLst/>
+          </a:prstGeom>
+        </p:spPr>
+        <p:style>
+          <a:lnRef idx="2">
+            <a:schemeClr val="accent2">
+              <a:shade val="50000"/>
+            </a:schemeClr>
+          </a:lnRef>
+          <a:fillRef idx="1">
+            <a:schemeClr val="accent2"/>
+          </a:fillRef>
+          <a:effectRef idx="0">
+            <a:schemeClr val="accent2"/>
+          </a:effectRef>
+          <a:fontRef idx="minor">
+            <a:schemeClr val="lt1"/>
+          </a:fontRef>
+        </p:style>
+        <p:txBody>
+          <a:bodyPr rtlCol="0" anchor="ctr"/>
+          <a:lstStyle/>
+          <a:p>
+            <a:pPr algn="ctr"/>
+            <a:endParaRPr lang="en-IN"/>
+          </a:p>
+        </p:txBody>
+      </p:sp>
+      <p:cxnSp>
+        <p:nvCxnSpPr>
+          <p:cNvPr id="4" name="Straight Connector 3">
+            <a:extLst>
+              <a:ext uri="{FF2B5EF4-FFF2-40B4-BE49-F238E27FC236}">
+                <a16:creationId xmlns:a16="http://schemas.microsoft.com/office/drawing/2014/main" id="{8A13E851-F285-4C0E-BF00-3DE007AA70CC}"/>
+              </a:ext>
+            </a:extLst>
+          </p:cNvPr>
+          <p:cNvCxnSpPr>
+            <a:stCxn id="261" idx="3"/>
+            <a:endCxn id="260" idx="1"/>
+          </p:cNvCxnSpPr>
+          <p:nvPr/>
+        </p:nvCxnSpPr>
+        <p:spPr>
+          <a:xfrm flipV="1">
+            <a:off x="1416931" y="1339129"/>
+            <a:ext cx="1415364" cy="6335"/>
+          </a:xfrm>
+          <a:prstGeom prst="line">
+            <a:avLst/>
+          </a:prstGeom>
+          <a:ln w="57150"/>
+        </p:spPr>
+        <p:style>
+          <a:lnRef idx="1">
+            <a:schemeClr val="accent2"/>
+          </a:lnRef>
+          <a:fillRef idx="0">
+            <a:schemeClr val="accent2"/>
+          </a:fillRef>
+          <a:effectRef idx="0">
+            <a:schemeClr val="accent2"/>
+          </a:effectRef>
+          <a:fontRef idx="minor">
+            <a:schemeClr val="tx1"/>
+          </a:fontRef>
+        </p:style>
+      </p:cxnSp>
+      <p:cxnSp>
+        <p:nvCxnSpPr>
+          <p:cNvPr id="297" name="Straight Connector 296">
+            <a:extLst>
+              <a:ext uri="{FF2B5EF4-FFF2-40B4-BE49-F238E27FC236}">
+                <a16:creationId xmlns:a16="http://schemas.microsoft.com/office/drawing/2014/main" id="{64949982-25D7-427B-AE63-7814B6FEEF0F}"/>
+              </a:ext>
+            </a:extLst>
+          </p:cNvPr>
+          <p:cNvCxnSpPr>
+            <a:cxnSpLocks/>
+          </p:cNvCxnSpPr>
+          <p:nvPr/>
+        </p:nvCxnSpPr>
+        <p:spPr>
+          <a:xfrm>
+            <a:off x="3155531" y="1621653"/>
+            <a:ext cx="0" cy="1462245"/>
+          </a:xfrm>
+          <a:prstGeom prst="line">
+            <a:avLst/>
+          </a:prstGeom>
+          <a:ln w="57150"/>
+        </p:spPr>
+        <p:style>
+          <a:lnRef idx="1">
+            <a:schemeClr val="accent2"/>
+          </a:lnRef>
+          <a:fillRef idx="0">
+            <a:schemeClr val="accent2"/>
+          </a:fillRef>
+          <a:effectRef idx="0">
+            <a:schemeClr val="accent2"/>
+          </a:effectRef>
+          <a:fontRef idx="minor">
+            <a:schemeClr val="tx1"/>
+          </a:fontRef>
+        </p:style>
+      </p:cxnSp>
+      <p:cxnSp>
+        <p:nvCxnSpPr>
+          <p:cNvPr id="10" name="Straight Connector 9">
+            <a:extLst>
+              <a:ext uri="{FF2B5EF4-FFF2-40B4-BE49-F238E27FC236}">
+                <a16:creationId xmlns:a16="http://schemas.microsoft.com/office/drawing/2014/main" id="{B90E43CA-30F5-4AEE-ABE1-0C63827F7C8C}"/>
+              </a:ext>
+            </a:extLst>
+          </p:cNvPr>
+          <p:cNvCxnSpPr>
+            <a:cxnSpLocks/>
+          </p:cNvCxnSpPr>
+          <p:nvPr/>
+        </p:nvCxnSpPr>
+        <p:spPr>
+          <a:xfrm flipH="1" flipV="1">
+            <a:off x="2573460" y="1156447"/>
+            <a:ext cx="249870" cy="191647"/>
+          </a:xfrm>
+          <a:prstGeom prst="line">
+            <a:avLst/>
+          </a:prstGeom>
+          <a:ln w="57150"/>
+        </p:spPr>
+        <p:style>
+          <a:lnRef idx="1">
+            <a:schemeClr val="accent2"/>
+          </a:lnRef>
+          <a:fillRef idx="0">
+            <a:schemeClr val="accent2"/>
+          </a:fillRef>
+          <a:effectRef idx="0">
+            <a:schemeClr val="accent2"/>
+          </a:effectRef>
+          <a:fontRef idx="minor">
+            <a:schemeClr val="tx1"/>
+          </a:fontRef>
+        </p:style>
+      </p:cxnSp>
+      <p:cxnSp>
+        <p:nvCxnSpPr>
+          <p:cNvPr id="299" name="Straight Connector 298">
+            <a:extLst>
+              <a:ext uri="{FF2B5EF4-FFF2-40B4-BE49-F238E27FC236}">
+                <a16:creationId xmlns:a16="http://schemas.microsoft.com/office/drawing/2014/main" id="{EDC14444-347B-4500-AF3C-17FABEE0E72D}"/>
+              </a:ext>
+            </a:extLst>
+          </p:cNvPr>
+          <p:cNvCxnSpPr>
+            <a:cxnSpLocks/>
+          </p:cNvCxnSpPr>
+          <p:nvPr/>
+        </p:nvCxnSpPr>
+        <p:spPr>
+          <a:xfrm flipH="1" flipV="1">
+            <a:off x="3147689" y="1621654"/>
+            <a:ext cx="158865" cy="216537"/>
+          </a:xfrm>
+          <a:prstGeom prst="line">
+            <a:avLst/>
+          </a:prstGeom>
+          <a:ln w="57150"/>
+        </p:spPr>
+        <p:style>
+          <a:lnRef idx="1">
+            <a:schemeClr val="accent2"/>
+          </a:lnRef>
+          <a:fillRef idx="0">
+            <a:schemeClr val="accent2"/>
+          </a:fillRef>
+          <a:effectRef idx="0">
+            <a:schemeClr val="accent2"/>
+          </a:effectRef>
+          <a:fontRef idx="minor">
+            <a:schemeClr val="tx1"/>
+          </a:fontRef>
+        </p:style>
+      </p:cxnSp>
+      <p:sp>
+        <p:nvSpPr>
+          <p:cNvPr id="338" name="TextBox 337">
+            <a:extLst>
+              <a:ext uri="{FF2B5EF4-FFF2-40B4-BE49-F238E27FC236}">
+                <a16:creationId xmlns:a16="http://schemas.microsoft.com/office/drawing/2014/main" id="{B86CC2D1-BE70-495F-B9D0-4BC1247DE0E5}"/>
+              </a:ext>
+            </a:extLst>
+          </p:cNvPr>
+          <p:cNvSpPr txBox="1"/>
+          <p:nvPr/>
+        </p:nvSpPr>
+        <p:spPr>
+          <a:xfrm>
+            <a:off x="2052367" y="788837"/>
+            <a:ext cx="573740" cy="523220"/>
+          </a:xfrm>
+          <a:prstGeom prst="rect">
+            <a:avLst/>
+          </a:prstGeom>
+          <a:noFill/>
+        </p:spPr>
+        <p:txBody>
+          <a:bodyPr wrap="square" rtlCol="0">
+            <a:spAutoFit/>
+          </a:bodyPr>
+          <a:lstStyle/>
+          <a:p>
+            <a:r>
+              <a:rPr lang="en-US" sz="2800" b="1"/>
+              <a:t>Px</a:t>
+            </a:r>
+            <a:endParaRPr lang="en-IN" sz="2800" b="1"/>
+          </a:p>
+        </p:txBody>
+      </p:sp>
+      <p:sp>
+        <p:nvSpPr>
+          <p:cNvPr id="339" name="TextBox 338">
+            <a:extLst>
+              <a:ext uri="{FF2B5EF4-FFF2-40B4-BE49-F238E27FC236}">
+                <a16:creationId xmlns:a16="http://schemas.microsoft.com/office/drawing/2014/main" id="{10176B86-BECB-4E84-8812-C350F989C54D}"/>
+              </a:ext>
+            </a:extLst>
+          </p:cNvPr>
+          <p:cNvSpPr txBox="1"/>
+          <p:nvPr/>
+        </p:nvSpPr>
+        <p:spPr>
+          <a:xfrm>
+            <a:off x="3147689" y="1753356"/>
+            <a:ext cx="573740" cy="523220"/>
+          </a:xfrm>
+          <a:prstGeom prst="rect">
+            <a:avLst/>
+          </a:prstGeom>
+          <a:noFill/>
+        </p:spPr>
+        <p:txBody>
+          <a:bodyPr wrap="square" rtlCol="0">
+            <a:spAutoFit/>
+          </a:bodyPr>
+          <a:lstStyle/>
+          <a:p>
+            <a:r>
+              <a:rPr lang="en-US" sz="2800" b="1"/>
+              <a:t>Py</a:t>
+            </a:r>
+            <a:endParaRPr lang="en-IN" sz="2800" b="1"/>
+          </a:p>
+        </p:txBody>
+      </p:sp>
+      <p:cxnSp>
+        <p:nvCxnSpPr>
+          <p:cNvPr id="48" name="Straight Connector 47">
+            <a:extLst>
+              <a:ext uri="{FF2B5EF4-FFF2-40B4-BE49-F238E27FC236}">
+                <a16:creationId xmlns:a16="http://schemas.microsoft.com/office/drawing/2014/main" id="{56241977-6B52-4DF6-B146-4A8BB0F810AA}"/>
+              </a:ext>
+            </a:extLst>
+          </p:cNvPr>
+          <p:cNvCxnSpPr>
+            <a:cxnSpLocks/>
+          </p:cNvCxnSpPr>
+          <p:nvPr/>
+        </p:nvCxnSpPr>
+        <p:spPr>
+          <a:xfrm>
+            <a:off x="3802887" y="1523154"/>
+            <a:ext cx="1556287" cy="0"/>
+          </a:xfrm>
+          <a:prstGeom prst="line">
+            <a:avLst/>
+          </a:prstGeom>
+          <a:ln w="57150"/>
+        </p:spPr>
+        <p:style>
+          <a:lnRef idx="1">
+            <a:schemeClr val="dk1"/>
+          </a:lnRef>
+          <a:fillRef idx="0">
+            <a:schemeClr val="dk1"/>
+          </a:fillRef>
+          <a:effectRef idx="0">
+            <a:schemeClr val="dk1"/>
+          </a:effectRef>
+          <a:fontRef idx="minor">
+            <a:schemeClr val="tx1"/>
+          </a:fontRef>
+        </p:style>
+      </p:cxnSp>
+      <p:cxnSp>
+        <p:nvCxnSpPr>
+          <p:cNvPr id="378" name="Straight Connector 377">
+            <a:extLst>
+              <a:ext uri="{FF2B5EF4-FFF2-40B4-BE49-F238E27FC236}">
+                <a16:creationId xmlns:a16="http://schemas.microsoft.com/office/drawing/2014/main" id="{9EDC5997-4B9E-4AFD-A072-25308D3BDD7D}"/>
+              </a:ext>
+            </a:extLst>
+          </p:cNvPr>
+          <p:cNvCxnSpPr>
+            <a:cxnSpLocks/>
+          </p:cNvCxnSpPr>
+          <p:nvPr/>
+        </p:nvCxnSpPr>
+        <p:spPr>
+          <a:xfrm>
+            <a:off x="4321047" y="1873674"/>
+            <a:ext cx="1556287" cy="0"/>
+          </a:xfrm>
+          <a:prstGeom prst="line">
+            <a:avLst/>
+          </a:prstGeom>
+          <a:ln w="57150"/>
+        </p:spPr>
+        <p:style>
+          <a:lnRef idx="1">
+            <a:schemeClr val="dk1"/>
+          </a:lnRef>
+          <a:fillRef idx="0">
+            <a:schemeClr val="dk1"/>
+          </a:fillRef>
+          <a:effectRef idx="0">
+            <a:schemeClr val="dk1"/>
+          </a:effectRef>
+          <a:fontRef idx="minor">
+            <a:schemeClr val="tx1"/>
+          </a:fontRef>
+        </p:style>
+      </p:cxnSp>
+      <p:cxnSp>
+        <p:nvCxnSpPr>
+          <p:cNvPr id="379" name="Straight Connector 378">
+            <a:extLst>
+              <a:ext uri="{FF2B5EF4-FFF2-40B4-BE49-F238E27FC236}">
+                <a16:creationId xmlns:a16="http://schemas.microsoft.com/office/drawing/2014/main" id="{6407CB46-9CDD-4B34-8371-BE79851D4019}"/>
+              </a:ext>
+            </a:extLst>
+          </p:cNvPr>
+          <p:cNvCxnSpPr>
+            <a:cxnSpLocks/>
+          </p:cNvCxnSpPr>
+          <p:nvPr/>
+        </p:nvCxnSpPr>
+        <p:spPr>
+          <a:xfrm>
+            <a:off x="3817977" y="1524020"/>
+            <a:ext cx="515457" cy="349654"/>
+          </a:xfrm>
+          <a:prstGeom prst="line">
+            <a:avLst/>
+          </a:prstGeom>
+          <a:ln w="57150"/>
+        </p:spPr>
+        <p:style>
+          <a:lnRef idx="1">
+            <a:schemeClr val="dk1"/>
+          </a:lnRef>
+          <a:fillRef idx="0">
+            <a:schemeClr val="dk1"/>
+          </a:fillRef>
+          <a:effectRef idx="0">
+            <a:schemeClr val="dk1"/>
+          </a:effectRef>
+          <a:fontRef idx="minor">
+            <a:schemeClr val="tx1"/>
+          </a:fontRef>
+        </p:style>
+      </p:cxnSp>
+      <p:cxnSp>
+        <p:nvCxnSpPr>
+          <p:cNvPr id="381" name="Straight Connector 380">
+            <a:extLst>
+              <a:ext uri="{FF2B5EF4-FFF2-40B4-BE49-F238E27FC236}">
+                <a16:creationId xmlns:a16="http://schemas.microsoft.com/office/drawing/2014/main" id="{D7CB234E-B5A3-44B0-A3B4-A98DCE9520E8}"/>
+              </a:ext>
+            </a:extLst>
+          </p:cNvPr>
+          <p:cNvCxnSpPr>
+            <a:cxnSpLocks/>
+          </p:cNvCxnSpPr>
+          <p:nvPr/>
+        </p:nvCxnSpPr>
+        <p:spPr>
+          <a:xfrm>
+            <a:off x="5335557" y="1518519"/>
+            <a:ext cx="515457" cy="349654"/>
+          </a:xfrm>
+          <a:prstGeom prst="line">
+            <a:avLst/>
+          </a:prstGeom>
+          <a:ln w="57150"/>
+        </p:spPr>
+        <p:style>
+          <a:lnRef idx="1">
+            <a:schemeClr val="dk1"/>
+          </a:lnRef>
+          <a:fillRef idx="0">
+            <a:schemeClr val="dk1"/>
+          </a:fillRef>
+          <a:effectRef idx="0">
+            <a:schemeClr val="dk1"/>
+          </a:effectRef>
+          <a:fontRef idx="minor">
+            <a:schemeClr val="tx1"/>
+          </a:fontRef>
+        </p:style>
+      </p:cxnSp>
+      <p:cxnSp>
+        <p:nvCxnSpPr>
+          <p:cNvPr id="382" name="Straight Connector 381">
+            <a:extLst>
+              <a:ext uri="{FF2B5EF4-FFF2-40B4-BE49-F238E27FC236}">
+                <a16:creationId xmlns:a16="http://schemas.microsoft.com/office/drawing/2014/main" id="{F019F915-9E4F-4AD1-A6D1-AB8B4237B9D4}"/>
+              </a:ext>
+            </a:extLst>
+          </p:cNvPr>
+          <p:cNvCxnSpPr>
+            <a:cxnSpLocks/>
+          </p:cNvCxnSpPr>
+          <p:nvPr/>
+        </p:nvCxnSpPr>
+        <p:spPr>
+          <a:xfrm flipH="1">
+            <a:off x="4321047" y="1877714"/>
+            <a:ext cx="1" cy="1389138"/>
+          </a:xfrm>
+          <a:prstGeom prst="line">
+            <a:avLst/>
+          </a:prstGeom>
+          <a:ln w="57150"/>
+        </p:spPr>
+        <p:style>
+          <a:lnRef idx="1">
+            <a:schemeClr val="dk1"/>
+          </a:lnRef>
+          <a:fillRef idx="0">
+            <a:schemeClr val="dk1"/>
+          </a:fillRef>
+          <a:effectRef idx="0">
+            <a:schemeClr val="dk1"/>
+          </a:effectRef>
+          <a:fontRef idx="minor">
+            <a:schemeClr val="tx1"/>
+          </a:fontRef>
+        </p:style>
+      </p:cxnSp>
+      <p:cxnSp>
+        <p:nvCxnSpPr>
+          <p:cNvPr id="383" name="Straight Connector 382">
+            <a:extLst>
+              <a:ext uri="{FF2B5EF4-FFF2-40B4-BE49-F238E27FC236}">
+                <a16:creationId xmlns:a16="http://schemas.microsoft.com/office/drawing/2014/main" id="{8B9E905A-D462-4DC9-B90C-1667F0A2362C}"/>
+              </a:ext>
+            </a:extLst>
+          </p:cNvPr>
+          <p:cNvCxnSpPr>
+            <a:cxnSpLocks/>
+          </p:cNvCxnSpPr>
+          <p:nvPr/>
+        </p:nvCxnSpPr>
+        <p:spPr>
+          <a:xfrm flipH="1">
+            <a:off x="5848643" y="1883581"/>
+            <a:ext cx="1" cy="1389138"/>
+          </a:xfrm>
+          <a:prstGeom prst="line">
+            <a:avLst/>
+          </a:prstGeom>
+          <a:ln w="57150"/>
+        </p:spPr>
+        <p:style>
+          <a:lnRef idx="1">
+            <a:schemeClr val="dk1"/>
+          </a:lnRef>
+          <a:fillRef idx="0">
+            <a:schemeClr val="dk1"/>
+          </a:fillRef>
+          <a:effectRef idx="0">
+            <a:schemeClr val="dk1"/>
+          </a:effectRef>
+          <a:fontRef idx="minor">
+            <a:schemeClr val="tx1"/>
+          </a:fontRef>
+        </p:style>
+      </p:cxnSp>
+      <p:cxnSp>
+        <p:nvCxnSpPr>
+          <p:cNvPr id="384" name="Straight Connector 383">
+            <a:extLst>
+              <a:ext uri="{FF2B5EF4-FFF2-40B4-BE49-F238E27FC236}">
+                <a16:creationId xmlns:a16="http://schemas.microsoft.com/office/drawing/2014/main" id="{5B60EFA1-CFEB-437A-9A08-9F9B674CAF86}"/>
+              </a:ext>
+            </a:extLst>
+          </p:cNvPr>
+          <p:cNvCxnSpPr>
+            <a:cxnSpLocks/>
+          </p:cNvCxnSpPr>
+          <p:nvPr/>
+        </p:nvCxnSpPr>
+        <p:spPr>
+          <a:xfrm>
+            <a:off x="4333434" y="3240741"/>
+            <a:ext cx="1515209" cy="0"/>
+          </a:xfrm>
+          <a:prstGeom prst="line">
+            <a:avLst/>
+          </a:prstGeom>
+          <a:ln w="57150"/>
+        </p:spPr>
+        <p:style>
+          <a:lnRef idx="1">
+            <a:schemeClr val="dk1"/>
+          </a:lnRef>
+          <a:fillRef idx="0">
+            <a:schemeClr val="dk1"/>
+          </a:fillRef>
+          <a:effectRef idx="0">
+            <a:schemeClr val="dk1"/>
+          </a:effectRef>
+          <a:fontRef idx="minor">
+            <a:schemeClr val="tx1"/>
+          </a:fontRef>
+        </p:style>
+      </p:cxnSp>
+      <p:cxnSp>
+        <p:nvCxnSpPr>
+          <p:cNvPr id="385" name="Straight Connector 384">
+            <a:extLst>
+              <a:ext uri="{FF2B5EF4-FFF2-40B4-BE49-F238E27FC236}">
+                <a16:creationId xmlns:a16="http://schemas.microsoft.com/office/drawing/2014/main" id="{84F630AD-04CE-421D-8E17-08CC20373BEE}"/>
+              </a:ext>
+            </a:extLst>
+          </p:cNvPr>
+          <p:cNvCxnSpPr>
+            <a:cxnSpLocks/>
+          </p:cNvCxnSpPr>
+          <p:nvPr/>
+        </p:nvCxnSpPr>
+        <p:spPr>
+          <a:xfrm>
+            <a:off x="3830169" y="1524283"/>
+            <a:ext cx="490877" cy="1742569"/>
+          </a:xfrm>
+          <a:prstGeom prst="line">
+            <a:avLst/>
+          </a:prstGeom>
+          <a:ln w="57150"/>
+        </p:spPr>
+        <p:style>
+          <a:lnRef idx="1">
+            <a:schemeClr val="dk1"/>
+          </a:lnRef>
+          <a:fillRef idx="0">
+            <a:schemeClr val="dk1"/>
+          </a:fillRef>
+          <a:effectRef idx="0">
+            <a:schemeClr val="dk1"/>
+          </a:effectRef>
+          <a:fontRef idx="minor">
+            <a:schemeClr val="tx1"/>
+          </a:fontRef>
+        </p:style>
+      </p:cxnSp>
+      <p:cxnSp>
+        <p:nvCxnSpPr>
+          <p:cNvPr id="65" name="Straight Arrow Connector 64">
+            <a:extLst>
+              <a:ext uri="{FF2B5EF4-FFF2-40B4-BE49-F238E27FC236}">
+                <a16:creationId xmlns:a16="http://schemas.microsoft.com/office/drawing/2014/main" id="{A4237851-B726-48BA-9F7B-1891647FA97A}"/>
+              </a:ext>
+            </a:extLst>
+          </p:cNvPr>
+          <p:cNvCxnSpPr/>
+          <p:nvPr/>
+        </p:nvCxnSpPr>
+        <p:spPr>
+          <a:xfrm flipV="1">
+            <a:off x="5041392" y="2075777"/>
+            <a:ext cx="0" cy="946497"/>
+          </a:xfrm>
+          <a:prstGeom prst="straightConnector1">
+            <a:avLst/>
+          </a:prstGeom>
+          <a:ln w="57150">
+            <a:tailEnd type="triangle"/>
+          </a:ln>
+        </p:spPr>
+        <p:style>
+          <a:lnRef idx="1">
+            <a:schemeClr val="accent2"/>
+          </a:lnRef>
+          <a:fillRef idx="0">
+            <a:schemeClr val="accent2"/>
+          </a:fillRef>
+          <a:effectRef idx="0">
+            <a:schemeClr val="accent2"/>
+          </a:effectRef>
+          <a:fontRef idx="minor">
+            <a:schemeClr val="tx1"/>
+          </a:fontRef>
+        </p:style>
+      </p:cxnSp>
+      <p:cxnSp>
+        <p:nvCxnSpPr>
+          <p:cNvPr id="72" name="Straight Arrow Connector 71">
+            <a:extLst>
+              <a:ext uri="{FF2B5EF4-FFF2-40B4-BE49-F238E27FC236}">
+                <a16:creationId xmlns:a16="http://schemas.microsoft.com/office/drawing/2014/main" id="{A9B2AE0B-C66D-42D7-BF2B-CB949B6C0CB3}"/>
+              </a:ext>
+            </a:extLst>
+          </p:cNvPr>
+          <p:cNvCxnSpPr/>
+          <p:nvPr/>
+        </p:nvCxnSpPr>
+        <p:spPr>
+          <a:xfrm>
+            <a:off x="4681728" y="1600739"/>
+            <a:ext cx="268224" cy="152617"/>
+          </a:xfrm>
+          <a:prstGeom prst="straightConnector1">
+            <a:avLst/>
+          </a:prstGeom>
+          <a:ln w="57150">
+            <a:tailEnd type="triangle"/>
+          </a:ln>
+        </p:spPr>
+        <p:style>
+          <a:lnRef idx="1">
+            <a:schemeClr val="accent2"/>
+          </a:lnRef>
+          <a:fillRef idx="0">
+            <a:schemeClr val="accent2"/>
+          </a:fillRef>
+          <a:effectRef idx="0">
+            <a:schemeClr val="accent2"/>
+          </a:effectRef>
+          <a:fontRef idx="minor">
+            <a:schemeClr val="tx1"/>
+          </a:fontRef>
+        </p:style>
+      </p:cxnSp>
+      <p:sp>
+        <p:nvSpPr>
+          <p:cNvPr id="387" name="TextBox 386">
+            <a:extLst>
+              <a:ext uri="{FF2B5EF4-FFF2-40B4-BE49-F238E27FC236}">
+                <a16:creationId xmlns:a16="http://schemas.microsoft.com/office/drawing/2014/main" id="{6CE90723-53C3-4ADF-9488-055860D611D7}"/>
+              </a:ext>
+            </a:extLst>
+          </p:cNvPr>
+          <p:cNvSpPr txBox="1"/>
+          <p:nvPr/>
+        </p:nvSpPr>
+        <p:spPr>
+          <a:xfrm>
+            <a:off x="4880142" y="1415437"/>
+            <a:ext cx="573740" cy="523220"/>
+          </a:xfrm>
+          <a:prstGeom prst="rect">
+            <a:avLst/>
+          </a:prstGeom>
+          <a:noFill/>
+        </p:spPr>
+        <p:txBody>
+          <a:bodyPr wrap="square" rtlCol="0">
+            <a:spAutoFit/>
+          </a:bodyPr>
+          <a:lstStyle/>
+          <a:p>
+            <a:r>
+              <a:rPr lang="en-US" sz="2800" b="1"/>
+              <a:t>Px</a:t>
+            </a:r>
+            <a:endParaRPr lang="en-IN" sz="2800" b="1"/>
+          </a:p>
+        </p:txBody>
+      </p:sp>
+      <p:sp>
+        <p:nvSpPr>
+          <p:cNvPr id="388" name="TextBox 387">
+            <a:extLst>
+              <a:ext uri="{FF2B5EF4-FFF2-40B4-BE49-F238E27FC236}">
+                <a16:creationId xmlns:a16="http://schemas.microsoft.com/office/drawing/2014/main" id="{EC887491-4B71-4873-AE13-1B06E952E9EC}"/>
+              </a:ext>
+            </a:extLst>
+          </p:cNvPr>
+          <p:cNvSpPr txBox="1"/>
+          <p:nvPr/>
+        </p:nvSpPr>
+        <p:spPr>
+          <a:xfrm>
+            <a:off x="5014655" y="2482574"/>
+            <a:ext cx="573740" cy="523220"/>
+          </a:xfrm>
+          <a:prstGeom prst="rect">
+            <a:avLst/>
+          </a:prstGeom>
+          <a:noFill/>
+        </p:spPr>
+        <p:txBody>
+          <a:bodyPr wrap="square" rtlCol="0">
+            <a:spAutoFit/>
+          </a:bodyPr>
+          <a:lstStyle/>
+          <a:p>
+            <a:r>
+              <a:rPr lang="en-US" sz="2800" b="1"/>
+              <a:t>Py</a:t>
+            </a:r>
+            <a:endParaRPr lang="en-IN" sz="2800" b="1"/>
+          </a:p>
+        </p:txBody>
+      </p:sp>
+      <p:sp>
+        <p:nvSpPr>
+          <p:cNvPr id="389" name="TextBox 388">
+            <a:extLst>
+              <a:ext uri="{FF2B5EF4-FFF2-40B4-BE49-F238E27FC236}">
+                <a16:creationId xmlns:a16="http://schemas.microsoft.com/office/drawing/2014/main" id="{DF9E3CC0-7E2E-42BB-AB68-284CECD8D532}"/>
+              </a:ext>
+            </a:extLst>
+          </p:cNvPr>
+          <p:cNvSpPr txBox="1"/>
+          <p:nvPr/>
+        </p:nvSpPr>
+        <p:spPr>
+          <a:xfrm>
+            <a:off x="4102613" y="3137399"/>
+            <a:ext cx="396371" cy="523220"/>
+          </a:xfrm>
+          <a:prstGeom prst="rect">
+            <a:avLst/>
+          </a:prstGeom>
+          <a:noFill/>
+        </p:spPr>
+        <p:txBody>
+          <a:bodyPr wrap="square" rtlCol="0">
+            <a:spAutoFit/>
+          </a:bodyPr>
+          <a:lstStyle/>
+          <a:p>
+            <a:r>
+              <a:rPr lang="en-US" sz="2800" b="1"/>
+              <a:t>a</a:t>
+            </a:r>
+            <a:endParaRPr lang="en-IN" sz="2800" b="1"/>
+          </a:p>
+        </p:txBody>
+      </p:sp>
+      <p:sp>
+        <p:nvSpPr>
+          <p:cNvPr id="390" name="TextBox 389">
+            <a:extLst>
+              <a:ext uri="{FF2B5EF4-FFF2-40B4-BE49-F238E27FC236}">
+                <a16:creationId xmlns:a16="http://schemas.microsoft.com/office/drawing/2014/main" id="{4D250110-EBAD-44D3-9AAA-B779E9074273}"/>
+              </a:ext>
+            </a:extLst>
+          </p:cNvPr>
+          <p:cNvSpPr txBox="1"/>
+          <p:nvPr/>
+        </p:nvSpPr>
+        <p:spPr>
+          <a:xfrm>
+            <a:off x="5699629" y="3199374"/>
+            <a:ext cx="396371" cy="523220"/>
+          </a:xfrm>
+          <a:prstGeom prst="rect">
+            <a:avLst/>
+          </a:prstGeom>
+          <a:noFill/>
+        </p:spPr>
+        <p:txBody>
+          <a:bodyPr wrap="square" rtlCol="0">
+            <a:spAutoFit/>
+          </a:bodyPr>
+          <a:lstStyle/>
+          <a:p>
+            <a:r>
+              <a:rPr lang="en-US" sz="2800" b="1"/>
+              <a:t>b</a:t>
+            </a:r>
+            <a:endParaRPr lang="en-IN" sz="2800" b="1"/>
+          </a:p>
+        </p:txBody>
+      </p:sp>
+      <p:sp>
+        <p:nvSpPr>
+          <p:cNvPr id="391" name="TextBox 390">
+            <a:extLst>
+              <a:ext uri="{FF2B5EF4-FFF2-40B4-BE49-F238E27FC236}">
+                <a16:creationId xmlns:a16="http://schemas.microsoft.com/office/drawing/2014/main" id="{A5E345AC-9F6B-4DEA-84A2-5E8DC3D3F07F}"/>
+              </a:ext>
+            </a:extLst>
+          </p:cNvPr>
+          <p:cNvSpPr txBox="1"/>
+          <p:nvPr/>
+        </p:nvSpPr>
+        <p:spPr>
+          <a:xfrm>
+            <a:off x="5800276" y="1511160"/>
+            <a:ext cx="396371" cy="523220"/>
+          </a:xfrm>
+          <a:prstGeom prst="rect">
+            <a:avLst/>
+          </a:prstGeom>
+          <a:noFill/>
+        </p:spPr>
+        <p:txBody>
+          <a:bodyPr wrap="square" rtlCol="0">
+            <a:spAutoFit/>
+          </a:bodyPr>
+          <a:lstStyle/>
+          <a:p>
+            <a:r>
+              <a:rPr lang="en-US" sz="2800" b="1"/>
+              <a:t>c</a:t>
+            </a:r>
+            <a:endParaRPr lang="en-IN" sz="2800" b="1"/>
+          </a:p>
+        </p:txBody>
+      </p:sp>
+      <p:sp>
+        <p:nvSpPr>
+          <p:cNvPr id="392" name="TextBox 391">
+            <a:extLst>
+              <a:ext uri="{FF2B5EF4-FFF2-40B4-BE49-F238E27FC236}">
+                <a16:creationId xmlns:a16="http://schemas.microsoft.com/office/drawing/2014/main" id="{217FE5A3-047C-48CF-972F-C651DAA21AEF}"/>
+              </a:ext>
+            </a:extLst>
+          </p:cNvPr>
+          <p:cNvSpPr txBox="1"/>
+          <p:nvPr/>
+        </p:nvSpPr>
+        <p:spPr>
+          <a:xfrm>
+            <a:off x="4294905" y="1804114"/>
+            <a:ext cx="396371" cy="523220"/>
+          </a:xfrm>
+          <a:prstGeom prst="rect">
+            <a:avLst/>
+          </a:prstGeom>
+          <a:noFill/>
+        </p:spPr>
+        <p:txBody>
+          <a:bodyPr wrap="square" rtlCol="0">
+            <a:spAutoFit/>
+          </a:bodyPr>
+          <a:lstStyle/>
+          <a:p>
+            <a:r>
+              <a:rPr lang="en-US" sz="2800" b="1"/>
+              <a:t>d</a:t>
+            </a:r>
+            <a:endParaRPr lang="en-IN" sz="2800" b="1"/>
+          </a:p>
+        </p:txBody>
+      </p:sp>
+      <p:sp>
+        <p:nvSpPr>
+          <p:cNvPr id="393" name="TextBox 392">
+            <a:extLst>
+              <a:ext uri="{FF2B5EF4-FFF2-40B4-BE49-F238E27FC236}">
+                <a16:creationId xmlns:a16="http://schemas.microsoft.com/office/drawing/2014/main" id="{A085DA69-3057-4B41-88E5-C2E2A336F8BD}"/>
+              </a:ext>
+            </a:extLst>
+          </p:cNvPr>
+          <p:cNvSpPr txBox="1"/>
+          <p:nvPr/>
+        </p:nvSpPr>
+        <p:spPr>
+          <a:xfrm>
+            <a:off x="3638484" y="1050447"/>
+            <a:ext cx="396371" cy="523220"/>
+          </a:xfrm>
+          <a:prstGeom prst="rect">
+            <a:avLst/>
+          </a:prstGeom>
+          <a:noFill/>
+        </p:spPr>
+        <p:txBody>
+          <a:bodyPr wrap="square" rtlCol="0">
+            <a:spAutoFit/>
+          </a:bodyPr>
+          <a:lstStyle/>
+          <a:p>
+            <a:r>
+              <a:rPr lang="en-US" sz="2800" b="1"/>
+              <a:t>x</a:t>
+            </a:r>
+            <a:endParaRPr lang="en-IN" sz="2800" b="1"/>
+          </a:p>
+        </p:txBody>
+      </p:sp>
+      <p:sp>
+        <p:nvSpPr>
+          <p:cNvPr id="394" name="TextBox 393">
+            <a:extLst>
+              <a:ext uri="{FF2B5EF4-FFF2-40B4-BE49-F238E27FC236}">
+                <a16:creationId xmlns:a16="http://schemas.microsoft.com/office/drawing/2014/main" id="{641615AE-1588-45AD-9C73-C4ED27ED67F4}"/>
+              </a:ext>
+            </a:extLst>
+          </p:cNvPr>
+          <p:cNvSpPr txBox="1"/>
+          <p:nvPr/>
+        </p:nvSpPr>
+        <p:spPr>
+          <a:xfrm>
+            <a:off x="5152779" y="1027216"/>
+            <a:ext cx="396371" cy="523220"/>
+          </a:xfrm>
+          <a:prstGeom prst="rect">
+            <a:avLst/>
+          </a:prstGeom>
+          <a:noFill/>
+        </p:spPr>
+        <p:txBody>
+          <a:bodyPr wrap="square" rtlCol="0">
+            <a:spAutoFit/>
+          </a:bodyPr>
+          <a:lstStyle/>
+          <a:p>
+            <a:r>
+              <a:rPr lang="en-US" sz="2800" b="1"/>
+              <a:t>w</a:t>
+            </a:r>
+            <a:endParaRPr lang="en-IN" sz="2800" b="1"/>
+          </a:p>
+        </p:txBody>
+      </p:sp>
+      <p:sp>
+        <p:nvSpPr>
+          <p:cNvPr id="395" name="TextBox 394">
+            <a:extLst>
+              <a:ext uri="{FF2B5EF4-FFF2-40B4-BE49-F238E27FC236}">
+                <a16:creationId xmlns:a16="http://schemas.microsoft.com/office/drawing/2014/main" id="{AF51AFAA-37F2-4522-AD34-FFDF6E30979E}"/>
+              </a:ext>
+            </a:extLst>
+          </p:cNvPr>
+          <p:cNvSpPr txBox="1"/>
+          <p:nvPr/>
+        </p:nvSpPr>
+        <p:spPr>
+          <a:xfrm>
+            <a:off x="1801017" y="1431736"/>
+            <a:ext cx="396371" cy="523220"/>
+          </a:xfrm>
+          <a:prstGeom prst="rect">
+            <a:avLst/>
+          </a:prstGeom>
+          <a:noFill/>
+        </p:spPr>
+        <p:txBody>
+          <a:bodyPr wrap="square" rtlCol="0">
+            <a:spAutoFit/>
+          </a:bodyPr>
+          <a:lstStyle/>
+          <a:p>
+            <a:r>
+              <a:rPr lang="en-US" sz="2800" b="1"/>
+              <a:t>x</a:t>
+            </a:r>
+            <a:endParaRPr lang="en-IN" sz="2800" b="1"/>
+          </a:p>
+        </p:txBody>
+      </p:sp>
+      <p:sp>
+        <p:nvSpPr>
+          <p:cNvPr id="396" name="Arc 395">
+            <a:extLst>
+              <a:ext uri="{FF2B5EF4-FFF2-40B4-BE49-F238E27FC236}">
+                <a16:creationId xmlns:a16="http://schemas.microsoft.com/office/drawing/2014/main" id="{76C611ED-BFA9-4534-A7A1-C56C531DF547}"/>
+              </a:ext>
+            </a:extLst>
+          </p:cNvPr>
+          <p:cNvSpPr/>
+          <p:nvPr/>
+        </p:nvSpPr>
+        <p:spPr>
+          <a:xfrm rot="6841741">
+            <a:off x="7386806" y="2132685"/>
+            <a:ext cx="789732" cy="725862"/>
+          </a:xfrm>
+          <a:prstGeom prst="arc">
+            <a:avLst>
+              <a:gd name="adj1" fmla="val 18231721"/>
+              <a:gd name="adj2" fmla="val 21110409"/>
+            </a:avLst>
+          </a:prstGeom>
+          <a:ln w="57150"/>
+        </p:spPr>
+        <p:style>
+          <a:lnRef idx="1">
+            <a:schemeClr val="accent1"/>
+          </a:lnRef>
+          <a:fillRef idx="0">
+            <a:schemeClr val="accent1"/>
+          </a:fillRef>
+          <a:effectRef idx="0">
+            <a:schemeClr val="accent1"/>
+          </a:effectRef>
+          <a:fontRef idx="minor">
+            <a:schemeClr val="tx1"/>
+          </a:fontRef>
+        </p:style>
+        <p:txBody>
+          <a:bodyPr rtlCol="0" anchor="ctr"/>
+          <a:lstStyle/>
+          <a:p>
+            <a:pPr algn="ctr"/>
+            <a:endParaRPr lang="en-IN"/>
+          </a:p>
+        </p:txBody>
+      </p:sp>
+      <p:cxnSp>
+        <p:nvCxnSpPr>
+          <p:cNvPr id="397" name="Straight Connector 396">
+            <a:extLst>
+              <a:ext uri="{FF2B5EF4-FFF2-40B4-BE49-F238E27FC236}">
+                <a16:creationId xmlns:a16="http://schemas.microsoft.com/office/drawing/2014/main" id="{9F6E6D15-827A-4AA1-A21F-CBB105E6CE1C}"/>
+              </a:ext>
+            </a:extLst>
+          </p:cNvPr>
+          <p:cNvCxnSpPr>
+            <a:cxnSpLocks/>
+          </p:cNvCxnSpPr>
+          <p:nvPr/>
+        </p:nvCxnSpPr>
+        <p:spPr>
+          <a:xfrm>
+            <a:off x="7072669" y="1016271"/>
+            <a:ext cx="1272988" cy="2636902"/>
+          </a:xfrm>
+          <a:prstGeom prst="line">
+            <a:avLst/>
+          </a:prstGeom>
+          <a:ln w="57150">
+            <a:prstDash val="sysDash"/>
+          </a:ln>
+        </p:spPr>
+        <p:style>
+          <a:lnRef idx="1">
+            <a:schemeClr val="accent1"/>
+          </a:lnRef>
+          <a:fillRef idx="0">
+            <a:schemeClr val="accent1"/>
+          </a:fillRef>
+          <a:effectRef idx="0">
+            <a:schemeClr val="accent1"/>
+          </a:effectRef>
+          <a:fontRef idx="minor">
+            <a:schemeClr val="tx1"/>
+          </a:fontRef>
+        </p:style>
+      </p:cxnSp>
+      <p:cxnSp>
+        <p:nvCxnSpPr>
+          <p:cNvPr id="398" name="Straight Connector 397">
+            <a:extLst>
+              <a:ext uri="{FF2B5EF4-FFF2-40B4-BE49-F238E27FC236}">
+                <a16:creationId xmlns:a16="http://schemas.microsoft.com/office/drawing/2014/main" id="{19C8B8BB-26F2-44E4-B069-FE382B50C1F0}"/>
+              </a:ext>
+            </a:extLst>
+          </p:cNvPr>
+          <p:cNvCxnSpPr/>
+          <p:nvPr/>
+        </p:nvCxnSpPr>
+        <p:spPr>
+          <a:xfrm>
+            <a:off x="6588575" y="1511544"/>
+            <a:ext cx="0" cy="1721223"/>
+          </a:xfrm>
+          <a:prstGeom prst="line">
+            <a:avLst/>
+          </a:prstGeom>
+          <a:ln w="57150"/>
+        </p:spPr>
+        <p:style>
+          <a:lnRef idx="1">
+            <a:schemeClr val="dk1"/>
+          </a:lnRef>
+          <a:fillRef idx="0">
+            <a:schemeClr val="dk1"/>
+          </a:fillRef>
+          <a:effectRef idx="0">
+            <a:schemeClr val="dk1"/>
+          </a:effectRef>
+          <a:fontRef idx="minor">
+            <a:schemeClr val="tx1"/>
+          </a:fontRef>
+        </p:style>
+      </p:cxnSp>
+      <p:cxnSp>
+        <p:nvCxnSpPr>
+          <p:cNvPr id="399" name="Straight Connector 398">
+            <a:extLst>
+              <a:ext uri="{FF2B5EF4-FFF2-40B4-BE49-F238E27FC236}">
+                <a16:creationId xmlns:a16="http://schemas.microsoft.com/office/drawing/2014/main" id="{25D14561-D75A-4181-91B5-BC92DAEE9261}"/>
+              </a:ext>
+            </a:extLst>
+          </p:cNvPr>
+          <p:cNvCxnSpPr>
+            <a:cxnSpLocks/>
+          </p:cNvCxnSpPr>
+          <p:nvPr/>
+        </p:nvCxnSpPr>
+        <p:spPr>
+          <a:xfrm>
+            <a:off x="6579610" y="3214838"/>
+            <a:ext cx="1595718" cy="0"/>
+          </a:xfrm>
+          <a:prstGeom prst="line">
+            <a:avLst/>
+          </a:prstGeom>
+          <a:ln w="57150"/>
+        </p:spPr>
+        <p:style>
+          <a:lnRef idx="1">
+            <a:schemeClr val="dk1"/>
+          </a:lnRef>
+          <a:fillRef idx="0">
+            <a:schemeClr val="dk1"/>
+          </a:fillRef>
+          <a:effectRef idx="0">
+            <a:schemeClr val="dk1"/>
+          </a:effectRef>
+          <a:fontRef idx="minor">
+            <a:schemeClr val="tx1"/>
+          </a:fontRef>
+        </p:style>
+      </p:cxnSp>
+      <p:cxnSp>
+        <p:nvCxnSpPr>
+          <p:cNvPr id="400" name="Straight Connector 399">
+            <a:extLst>
+              <a:ext uri="{FF2B5EF4-FFF2-40B4-BE49-F238E27FC236}">
+                <a16:creationId xmlns:a16="http://schemas.microsoft.com/office/drawing/2014/main" id="{EE041308-4E14-401E-AF05-F60150922294}"/>
+              </a:ext>
+            </a:extLst>
+          </p:cNvPr>
+          <p:cNvCxnSpPr>
+            <a:cxnSpLocks/>
+          </p:cNvCxnSpPr>
+          <p:nvPr/>
+        </p:nvCxnSpPr>
+        <p:spPr>
+          <a:xfrm>
+            <a:off x="6561681" y="1511544"/>
+            <a:ext cx="767976" cy="0"/>
+          </a:xfrm>
+          <a:prstGeom prst="line">
+            <a:avLst/>
+          </a:prstGeom>
+          <a:ln w="57150"/>
+        </p:spPr>
+        <p:style>
+          <a:lnRef idx="1">
+            <a:schemeClr val="dk1"/>
+          </a:lnRef>
+          <a:fillRef idx="0">
+            <a:schemeClr val="dk1"/>
+          </a:fillRef>
+          <a:effectRef idx="0">
+            <a:schemeClr val="dk1"/>
+          </a:effectRef>
+          <a:fontRef idx="minor">
+            <a:schemeClr val="tx1"/>
+          </a:fontRef>
+        </p:style>
+      </p:cxnSp>
+      <p:cxnSp>
+        <p:nvCxnSpPr>
+          <p:cNvPr id="401" name="Straight Connector 400">
+            <a:extLst>
+              <a:ext uri="{FF2B5EF4-FFF2-40B4-BE49-F238E27FC236}">
+                <a16:creationId xmlns:a16="http://schemas.microsoft.com/office/drawing/2014/main" id="{A9F913C0-8621-4144-BC02-17C296D5216D}"/>
+              </a:ext>
+            </a:extLst>
+          </p:cNvPr>
+          <p:cNvCxnSpPr>
+            <a:cxnSpLocks/>
+          </p:cNvCxnSpPr>
+          <p:nvPr/>
+        </p:nvCxnSpPr>
+        <p:spPr>
+          <a:xfrm>
+            <a:off x="7306797" y="1491911"/>
+            <a:ext cx="838065" cy="1722927"/>
+          </a:xfrm>
+          <a:prstGeom prst="line">
+            <a:avLst/>
+          </a:prstGeom>
+          <a:ln w="57150"/>
+        </p:spPr>
+        <p:style>
+          <a:lnRef idx="1">
+            <a:schemeClr val="dk1"/>
+          </a:lnRef>
+          <a:fillRef idx="0">
+            <a:schemeClr val="dk1"/>
+          </a:fillRef>
+          <a:effectRef idx="0">
+            <a:schemeClr val="dk1"/>
+          </a:effectRef>
+          <a:fontRef idx="minor">
+            <a:schemeClr val="tx1"/>
+          </a:fontRef>
+        </p:style>
+      </p:cxnSp>
+      <p:cxnSp>
+        <p:nvCxnSpPr>
+          <p:cNvPr id="402" name="Straight Arrow Connector 401">
+            <a:extLst>
+              <a:ext uri="{FF2B5EF4-FFF2-40B4-BE49-F238E27FC236}">
+                <a16:creationId xmlns:a16="http://schemas.microsoft.com/office/drawing/2014/main" id="{EBA453CC-A5CD-417E-B187-7C6DFCFC6A26}"/>
+              </a:ext>
+            </a:extLst>
+          </p:cNvPr>
+          <p:cNvCxnSpPr>
+            <a:cxnSpLocks/>
+          </p:cNvCxnSpPr>
+          <p:nvPr/>
+        </p:nvCxnSpPr>
+        <p:spPr>
+          <a:xfrm flipV="1">
+            <a:off x="7668035" y="2234784"/>
+            <a:ext cx="1169352" cy="20830"/>
+          </a:xfrm>
+          <a:prstGeom prst="straightConnector1">
+            <a:avLst/>
+          </a:prstGeom>
+          <a:ln w="57150">
+            <a:tailEnd type="triangle"/>
+          </a:ln>
+        </p:spPr>
+        <p:style>
+          <a:lnRef idx="1">
+            <a:schemeClr val="accent2"/>
+          </a:lnRef>
+          <a:fillRef idx="0">
+            <a:schemeClr val="accent2"/>
+          </a:fillRef>
+          <a:effectRef idx="0">
+            <a:schemeClr val="accent2"/>
+          </a:effectRef>
+          <a:fontRef idx="minor">
+            <a:schemeClr val="tx1"/>
+          </a:fontRef>
+        </p:style>
+      </p:cxnSp>
+      <p:cxnSp>
+        <p:nvCxnSpPr>
+          <p:cNvPr id="405" name="Straight Connector 404">
+            <a:extLst>
+              <a:ext uri="{FF2B5EF4-FFF2-40B4-BE49-F238E27FC236}">
+                <a16:creationId xmlns:a16="http://schemas.microsoft.com/office/drawing/2014/main" id="{2E197F8C-8947-4AB3-8670-FFC8C5C6937A}"/>
+              </a:ext>
+            </a:extLst>
+          </p:cNvPr>
+          <p:cNvCxnSpPr>
+            <a:cxnSpLocks/>
+          </p:cNvCxnSpPr>
+          <p:nvPr/>
+        </p:nvCxnSpPr>
+        <p:spPr>
+          <a:xfrm>
+            <a:off x="7668035" y="1016271"/>
+            <a:ext cx="0" cy="2614184"/>
+          </a:xfrm>
+          <a:prstGeom prst="line">
+            <a:avLst/>
+          </a:prstGeom>
+          <a:ln w="38100">
+            <a:prstDash val="dashDot"/>
+          </a:ln>
+        </p:spPr>
+        <p:style>
+          <a:lnRef idx="1">
+            <a:schemeClr val="accent3"/>
+          </a:lnRef>
+          <a:fillRef idx="0">
+            <a:schemeClr val="accent3"/>
+          </a:fillRef>
+          <a:effectRef idx="0">
+            <a:schemeClr val="accent3"/>
+          </a:effectRef>
+          <a:fontRef idx="minor">
+            <a:schemeClr val="tx1"/>
+          </a:fontRef>
+        </p:style>
+      </p:cxnSp>
+      <p:sp>
+        <p:nvSpPr>
+          <p:cNvPr id="406" name="Arc 405">
+            <a:extLst>
+              <a:ext uri="{FF2B5EF4-FFF2-40B4-BE49-F238E27FC236}">
+                <a16:creationId xmlns:a16="http://schemas.microsoft.com/office/drawing/2014/main" id="{73BD6181-8E54-4470-BCB9-B9C7403FADE0}"/>
+              </a:ext>
+            </a:extLst>
+          </p:cNvPr>
+          <p:cNvSpPr/>
+          <p:nvPr/>
+        </p:nvSpPr>
+        <p:spPr>
+          <a:xfrm rot="18168457">
+            <a:off x="7117072" y="1343327"/>
+            <a:ext cx="789732" cy="725862"/>
+          </a:xfrm>
+          <a:prstGeom prst="arc">
+            <a:avLst>
+              <a:gd name="adj1" fmla="val 17346437"/>
+              <a:gd name="adj2" fmla="val 21110409"/>
+            </a:avLst>
+          </a:prstGeom>
+          <a:ln w="57150"/>
+        </p:spPr>
+        <p:style>
+          <a:lnRef idx="1">
+            <a:schemeClr val="accent1"/>
+          </a:lnRef>
+          <a:fillRef idx="0">
+            <a:schemeClr val="accent1"/>
+          </a:fillRef>
+          <a:effectRef idx="0">
+            <a:schemeClr val="accent1"/>
+          </a:effectRef>
+          <a:fontRef idx="minor">
+            <a:schemeClr val="tx1"/>
+          </a:fontRef>
+        </p:style>
+        <p:txBody>
+          <a:bodyPr rtlCol="0" anchor="ctr"/>
+          <a:lstStyle/>
+          <a:p>
+            <a:pPr algn="ctr"/>
+            <a:endParaRPr lang="en-IN"/>
+          </a:p>
+        </p:txBody>
+      </p:sp>
+      <mc:AlternateContent xmlns:mc="http://schemas.openxmlformats.org/markup-compatibility/2006">
+        <mc:Choice xmlns:a14="http://schemas.microsoft.com/office/drawing/2010/main" Requires="a14">
+          <p:sp>
+            <p:nvSpPr>
+              <p:cNvPr id="407" name="TextBox 406">
+                <a:extLst>
+                  <a:ext uri="{FF2B5EF4-FFF2-40B4-BE49-F238E27FC236}">
+                    <a16:creationId xmlns:a16="http://schemas.microsoft.com/office/drawing/2014/main" id="{2CE47B05-344E-4CA4-8F94-DCA0BC635A91}"/>
+                  </a:ext>
+                </a:extLst>
+              </p:cNvPr>
+              <p:cNvSpPr txBox="1"/>
+              <p:nvPr/>
+            </p:nvSpPr>
+            <p:spPr>
+              <a:xfrm>
+                <a:off x="7306797" y="1007133"/>
+                <a:ext cx="197170" cy="276999"/>
+              </a:xfrm>
+              <a:prstGeom prst="rect">
+                <a:avLst/>
+              </a:prstGeom>
+              <a:noFill/>
+            </p:spPr>
+            <p:txBody>
+              <a:bodyPr wrap="none" lIns="0" tIns="0" rIns="0" bIns="0" rtlCol="0">
+                <a:spAutoFit/>
+              </a:bodyPr>
+              <a:lstStyle/>
+              <a:p>
+                <a:pPr/>
+                <a14:m>
+                  <m:oMathPara xmlns:m="http://schemas.openxmlformats.org/officeDocument/2006/math">
+                    <m:oMathParaPr>
+                      <m:jc m:val="centerGroup"/>
+                    </m:oMathParaPr>
+                    <m:oMath xmlns:m="http://schemas.openxmlformats.org/officeDocument/2006/math">
+                      <m:r>
+                        <a:rPr lang="en-IN" b="1" i="1" smtClean="0">
+                          <a:latin typeface="Cambria Math" panose="02040503050406030204" pitchFamily="18" charset="0"/>
+                        </a:rPr>
+                        <m:t>𝜽</m:t>
+                      </m:r>
+                    </m:oMath>
+                  </m:oMathPara>
+                </a14:m>
+                <a:endParaRPr lang="en-IN" b="1"/>
+              </a:p>
+            </p:txBody>
+          </p:sp>
+        </mc:Choice>
+        <mc:Fallback>
+          <p:sp>
+            <p:nvSpPr>
+              <p:cNvPr id="407" name="TextBox 406">
+                <a:extLst>
+                  <a:ext uri="{FF2B5EF4-FFF2-40B4-BE49-F238E27FC236}">
+                    <a16:creationId xmlns:a16="http://schemas.microsoft.com/office/drawing/2014/main" id="{2CE47B05-344E-4CA4-8F94-DCA0BC635A91}"/>
+                  </a:ext>
+                </a:extLst>
+              </p:cNvPr>
+              <p:cNvSpPr txBox="1">
+                <a:spLocks noRot="1" noChangeAspect="1" noMove="1" noResize="1" noEditPoints="1" noAdjustHandles="1" noChangeArrowheads="1" noChangeShapeType="1" noTextEdit="1"/>
+              </p:cNvSpPr>
+              <p:nvPr/>
+            </p:nvSpPr>
+            <p:spPr>
+              <a:xfrm>
+                <a:off x="7306797" y="1007133"/>
+                <a:ext cx="197170" cy="276999"/>
+              </a:xfrm>
+              <a:prstGeom prst="rect">
+                <a:avLst/>
+              </a:prstGeom>
+              <a:blipFill>
+                <a:blip r:embed="rId3"/>
+                <a:stretch>
+                  <a:fillRect l="-31250" r="-28125" b="-6522"/>
+                </a:stretch>
+              </a:blipFill>
+            </p:spPr>
+            <p:txBody>
+              <a:bodyPr/>
+              <a:lstStyle/>
+              <a:p>
+                <a:r>
+                  <a:rPr lang="en-IN">
+                    <a:noFill/>
+                  </a:rPr>
+                  <a:t> </a:t>
+                </a:r>
+              </a:p>
+            </p:txBody>
+          </p:sp>
+        </mc:Fallback>
+      </mc:AlternateContent>
+      <mc:AlternateContent xmlns:mc="http://schemas.openxmlformats.org/markup-compatibility/2006">
+        <mc:Choice xmlns:a14="http://schemas.microsoft.com/office/drawing/2010/main" Requires="a14">
+          <p:sp>
+            <p:nvSpPr>
+              <p:cNvPr id="408" name="TextBox 407">
+                <a:extLst>
+                  <a:ext uri="{FF2B5EF4-FFF2-40B4-BE49-F238E27FC236}">
+                    <a16:creationId xmlns:a16="http://schemas.microsoft.com/office/drawing/2014/main" id="{ED7E3219-C467-43BA-9ABD-4C5FA7A70FB1}"/>
+                  </a:ext>
+                </a:extLst>
+              </p:cNvPr>
+              <p:cNvSpPr txBox="1"/>
+              <p:nvPr/>
+            </p:nvSpPr>
+            <p:spPr>
+              <a:xfrm>
+                <a:off x="7744530" y="2908629"/>
+                <a:ext cx="197170" cy="276999"/>
+              </a:xfrm>
+              <a:prstGeom prst="rect">
+                <a:avLst/>
+              </a:prstGeom>
+              <a:noFill/>
+            </p:spPr>
+            <p:txBody>
+              <a:bodyPr wrap="none" lIns="0" tIns="0" rIns="0" bIns="0" rtlCol="0">
+                <a:spAutoFit/>
+              </a:bodyPr>
+              <a:lstStyle/>
+              <a:p>
+                <a:pPr/>
+                <a14:m>
+                  <m:oMathPara xmlns:m="http://schemas.openxmlformats.org/officeDocument/2006/math">
+                    <m:oMathParaPr>
+                      <m:jc m:val="centerGroup"/>
+                    </m:oMathParaPr>
+                    <m:oMath xmlns:m="http://schemas.openxmlformats.org/officeDocument/2006/math">
+                      <m:r>
+                        <a:rPr lang="en-IN" b="1" i="1" smtClean="0">
+                          <a:latin typeface="Cambria Math" panose="02040503050406030204" pitchFamily="18" charset="0"/>
+                        </a:rPr>
+                        <m:t>𝜽</m:t>
+                      </m:r>
+                    </m:oMath>
+                  </m:oMathPara>
+                </a14:m>
+                <a:endParaRPr lang="en-IN" b="1"/>
+              </a:p>
+            </p:txBody>
+          </p:sp>
+        </mc:Choice>
+        <mc:Fallback>
+          <p:sp>
+            <p:nvSpPr>
+              <p:cNvPr id="408" name="TextBox 407">
+                <a:extLst>
+                  <a:ext uri="{FF2B5EF4-FFF2-40B4-BE49-F238E27FC236}">
+                    <a16:creationId xmlns:a16="http://schemas.microsoft.com/office/drawing/2014/main" id="{ED7E3219-C467-43BA-9ABD-4C5FA7A70FB1}"/>
+                  </a:ext>
+                </a:extLst>
+              </p:cNvPr>
+              <p:cNvSpPr txBox="1">
+                <a:spLocks noRot="1" noChangeAspect="1" noMove="1" noResize="1" noEditPoints="1" noAdjustHandles="1" noChangeArrowheads="1" noChangeShapeType="1" noTextEdit="1"/>
+              </p:cNvSpPr>
+              <p:nvPr/>
+            </p:nvSpPr>
+            <p:spPr>
+              <a:xfrm>
+                <a:off x="7744530" y="2908629"/>
+                <a:ext cx="197170" cy="276999"/>
+              </a:xfrm>
+              <a:prstGeom prst="rect">
+                <a:avLst/>
+              </a:prstGeom>
+              <a:blipFill>
+                <a:blip r:embed="rId4"/>
+                <a:stretch>
+                  <a:fillRect l="-27273" r="-27273" b="-6522"/>
+                </a:stretch>
+              </a:blipFill>
+            </p:spPr>
+            <p:txBody>
+              <a:bodyPr/>
+              <a:lstStyle/>
+              <a:p>
+                <a:r>
+                  <a:rPr lang="en-IN">
+                    <a:noFill/>
+                  </a:rPr>
+                  <a:t> </a:t>
+                </a:r>
+              </a:p>
+            </p:txBody>
+          </p:sp>
+        </mc:Fallback>
+      </mc:AlternateContent>
+      <p:sp>
+        <p:nvSpPr>
+          <p:cNvPr id="409" name="Arc 408">
+            <a:extLst>
+              <a:ext uri="{FF2B5EF4-FFF2-40B4-BE49-F238E27FC236}">
+                <a16:creationId xmlns:a16="http://schemas.microsoft.com/office/drawing/2014/main" id="{C553182D-A78B-4EBD-922A-A1C8E4268BCA}"/>
+              </a:ext>
+            </a:extLst>
+          </p:cNvPr>
+          <p:cNvSpPr/>
+          <p:nvPr/>
+        </p:nvSpPr>
+        <p:spPr>
+          <a:xfrm rot="4472994">
+            <a:off x="7301559" y="1897346"/>
+            <a:ext cx="789732" cy="725862"/>
+          </a:xfrm>
+          <a:prstGeom prst="arc">
+            <a:avLst>
+              <a:gd name="adj1" fmla="val 17346437"/>
+              <a:gd name="adj2" fmla="val 21110409"/>
+            </a:avLst>
+          </a:prstGeom>
+          <a:ln w="57150"/>
+        </p:spPr>
+        <p:style>
+          <a:lnRef idx="1">
+            <a:schemeClr val="accent1"/>
+          </a:lnRef>
+          <a:fillRef idx="0">
+            <a:schemeClr val="accent1"/>
+          </a:fillRef>
+          <a:effectRef idx="0">
+            <a:schemeClr val="accent1"/>
+          </a:effectRef>
+          <a:fontRef idx="minor">
+            <a:schemeClr val="tx1"/>
+          </a:fontRef>
+        </p:style>
+        <p:txBody>
+          <a:bodyPr rtlCol="0" anchor="ctr"/>
+          <a:lstStyle/>
+          <a:p>
+            <a:pPr algn="ctr"/>
+            <a:endParaRPr lang="en-IN"/>
+          </a:p>
+        </p:txBody>
+      </p:sp>
+      <mc:AlternateContent xmlns:mc="http://schemas.openxmlformats.org/markup-compatibility/2006">
+        <mc:Choice xmlns:a14="http://schemas.microsoft.com/office/drawing/2010/main" Requires="a14">
+          <p:sp>
+            <p:nvSpPr>
+              <p:cNvPr id="410" name="TextBox 409">
+                <a:extLst>
+                  <a:ext uri="{FF2B5EF4-FFF2-40B4-BE49-F238E27FC236}">
+                    <a16:creationId xmlns:a16="http://schemas.microsoft.com/office/drawing/2014/main" id="{D154B9F7-069A-4A50-833B-F7A90A879B53}"/>
+                  </a:ext>
+                </a:extLst>
+              </p:cNvPr>
+              <p:cNvSpPr txBox="1"/>
+              <p:nvPr/>
+            </p:nvSpPr>
+            <p:spPr>
+              <a:xfrm rot="1751227">
+                <a:off x="7987305" y="2569326"/>
+                <a:ext cx="748603" cy="276999"/>
+              </a:xfrm>
+              <a:prstGeom prst="rect">
+                <a:avLst/>
+              </a:prstGeom>
+              <a:noFill/>
+            </p:spPr>
+            <p:txBody>
+              <a:bodyPr wrap="none" lIns="0" tIns="0" rIns="0" bIns="0" rtlCol="0">
+                <a:spAutoFit/>
+              </a:bodyPr>
+              <a:lstStyle/>
+              <a:p>
+                <a:pPr/>
+                <a14:m>
+                  <m:oMathPara xmlns:m="http://schemas.openxmlformats.org/officeDocument/2006/math">
+                    <m:oMathParaPr>
+                      <m:jc m:val="centerGroup"/>
+                    </m:oMathParaPr>
+                    <m:oMath xmlns:m="http://schemas.openxmlformats.org/officeDocument/2006/math">
+                      <m:r>
+                        <a:rPr lang="en-US" b="1" i="1" smtClean="0">
+                          <a:latin typeface="Cambria Math" panose="02040503050406030204" pitchFamily="18" charset="0"/>
+                        </a:rPr>
+                        <m:t>𝟗𝟎</m:t>
+                      </m:r>
+                      <m:r>
+                        <a:rPr lang="en-US" b="1" i="1" smtClean="0">
+                          <a:latin typeface="Cambria Math" panose="02040503050406030204" pitchFamily="18" charset="0"/>
+                        </a:rPr>
+                        <m:t>−</m:t>
+                      </m:r>
+                      <m:r>
+                        <a:rPr lang="en-IN" b="1" i="1">
+                          <a:latin typeface="Cambria Math" panose="02040503050406030204" pitchFamily="18" charset="0"/>
+                        </a:rPr>
+                        <m:t>𝜽</m:t>
+                      </m:r>
+                    </m:oMath>
+                  </m:oMathPara>
+                </a14:m>
+                <a:endParaRPr lang="en-IN" b="1"/>
+              </a:p>
+            </p:txBody>
+          </p:sp>
+        </mc:Choice>
+        <mc:Fallback>
+          <p:sp>
+            <p:nvSpPr>
+              <p:cNvPr id="410" name="TextBox 409">
+                <a:extLst>
+                  <a:ext uri="{FF2B5EF4-FFF2-40B4-BE49-F238E27FC236}">
+                    <a16:creationId xmlns:a16="http://schemas.microsoft.com/office/drawing/2014/main" id="{D154B9F7-069A-4A50-833B-F7A90A879B53}"/>
+                  </a:ext>
+                </a:extLst>
+              </p:cNvPr>
+              <p:cNvSpPr txBox="1">
+                <a:spLocks noRot="1" noChangeAspect="1" noMove="1" noResize="1" noEditPoints="1" noAdjustHandles="1" noChangeArrowheads="1" noChangeShapeType="1" noTextEdit="1"/>
+              </p:cNvSpPr>
+              <p:nvPr/>
+            </p:nvSpPr>
+            <p:spPr>
+              <a:xfrm rot="1751227">
+                <a:off x="7987305" y="2569326"/>
+                <a:ext cx="748603" cy="276999"/>
+              </a:xfrm>
+              <a:prstGeom prst="rect">
+                <a:avLst/>
+              </a:prstGeom>
+              <a:blipFill>
+                <a:blip r:embed="rId5"/>
+                <a:stretch>
+                  <a:fillRect l="-6107" t="-2000" r="-4580" b="-7000"/>
+                </a:stretch>
+              </a:blipFill>
+            </p:spPr>
+            <p:txBody>
+              <a:bodyPr/>
+              <a:lstStyle/>
+              <a:p>
+                <a:r>
+                  <a:rPr lang="en-IN">
+                    <a:noFill/>
+                  </a:rPr>
+                  <a:t> </a:t>
+                </a:r>
+              </a:p>
+            </p:txBody>
+          </p:sp>
+        </mc:Fallback>
+      </mc:AlternateContent>
+      <p:sp>
+        <p:nvSpPr>
+          <p:cNvPr id="411" name="TextBox 410">
+            <a:extLst>
+              <a:ext uri="{FF2B5EF4-FFF2-40B4-BE49-F238E27FC236}">
+                <a16:creationId xmlns:a16="http://schemas.microsoft.com/office/drawing/2014/main" id="{FB0D0DEF-2AFD-4309-9712-1415F988C233}"/>
+              </a:ext>
+            </a:extLst>
+          </p:cNvPr>
+          <p:cNvSpPr txBox="1"/>
+          <p:nvPr/>
+        </p:nvSpPr>
+        <p:spPr>
+          <a:xfrm>
+            <a:off x="7832580" y="3129953"/>
+            <a:ext cx="396371" cy="523220"/>
+          </a:xfrm>
+          <a:prstGeom prst="rect">
+            <a:avLst/>
+          </a:prstGeom>
+          <a:noFill/>
+        </p:spPr>
+        <p:txBody>
+          <a:bodyPr wrap="square" rtlCol="0">
+            <a:spAutoFit/>
+          </a:bodyPr>
+          <a:lstStyle/>
+          <a:p>
+            <a:r>
+              <a:rPr lang="en-US" sz="2800" b="1"/>
+              <a:t>a</a:t>
+            </a:r>
+            <a:endParaRPr lang="en-IN" sz="2800" b="1"/>
+          </a:p>
+        </p:txBody>
+      </p:sp>
+      <p:sp>
+        <p:nvSpPr>
+          <p:cNvPr id="412" name="Oval 411">
+            <a:extLst>
+              <a:ext uri="{FF2B5EF4-FFF2-40B4-BE49-F238E27FC236}">
+                <a16:creationId xmlns:a16="http://schemas.microsoft.com/office/drawing/2014/main" id="{0E424CB2-BF0A-494B-B826-5CA204507A4C}"/>
+              </a:ext>
+            </a:extLst>
+          </p:cNvPr>
+          <p:cNvSpPr/>
+          <p:nvPr/>
+        </p:nvSpPr>
+        <p:spPr>
+          <a:xfrm>
+            <a:off x="8074803" y="3150031"/>
+            <a:ext cx="103932" cy="98166"/>
+          </a:xfrm>
+          <a:prstGeom prst="ellipse">
+            <a:avLst/>
+          </a:prstGeom>
+        </p:spPr>
+        <p:style>
+          <a:lnRef idx="2">
+            <a:schemeClr val="accent2">
+              <a:shade val="50000"/>
+            </a:schemeClr>
+          </a:lnRef>
+          <a:fillRef idx="1">
+            <a:schemeClr val="accent2"/>
+          </a:fillRef>
+          <a:effectRef idx="0">
+            <a:schemeClr val="accent2"/>
+          </a:effectRef>
+          <a:fontRef idx="minor">
+            <a:schemeClr val="lt1"/>
+          </a:fontRef>
+        </p:style>
+        <p:txBody>
+          <a:bodyPr rtlCol="0" anchor="ctr"/>
+          <a:lstStyle/>
+          <a:p>
+            <a:pPr algn="ctr"/>
+            <a:endParaRPr lang="en-IN"/>
+          </a:p>
+        </p:txBody>
+      </p:sp>
+      <p:sp>
+        <p:nvSpPr>
+          <p:cNvPr id="413" name="TextBox 412">
+            <a:extLst>
+              <a:ext uri="{FF2B5EF4-FFF2-40B4-BE49-F238E27FC236}">
+                <a16:creationId xmlns:a16="http://schemas.microsoft.com/office/drawing/2014/main" id="{EDB011EC-1487-4A73-A05E-8037C6C58630}"/>
+              </a:ext>
+            </a:extLst>
+          </p:cNvPr>
+          <p:cNvSpPr txBox="1"/>
+          <p:nvPr/>
+        </p:nvSpPr>
+        <p:spPr>
+          <a:xfrm>
+            <a:off x="6247401" y="1054547"/>
+            <a:ext cx="358587" cy="523220"/>
+          </a:xfrm>
+          <a:prstGeom prst="rect">
+            <a:avLst/>
+          </a:prstGeom>
+          <a:noFill/>
+        </p:spPr>
+        <p:txBody>
+          <a:bodyPr wrap="square" rtlCol="0">
+            <a:spAutoFit/>
+          </a:bodyPr>
+          <a:lstStyle/>
+          <a:p>
+            <a:r>
+              <a:rPr lang="en-US" sz="2800" b="1"/>
+              <a:t>g</a:t>
+            </a:r>
+            <a:endParaRPr lang="en-IN" sz="2800" b="1"/>
+          </a:p>
+        </p:txBody>
+      </p:sp>
+      <p:sp>
+        <p:nvSpPr>
+          <p:cNvPr id="414" name="TextBox 413">
+            <a:extLst>
+              <a:ext uri="{FF2B5EF4-FFF2-40B4-BE49-F238E27FC236}">
+                <a16:creationId xmlns:a16="http://schemas.microsoft.com/office/drawing/2014/main" id="{0BD6EE27-9DF2-4329-BB2E-65DB17F6234E}"/>
+              </a:ext>
+            </a:extLst>
+          </p:cNvPr>
+          <p:cNvSpPr txBox="1"/>
+          <p:nvPr/>
+        </p:nvSpPr>
+        <p:spPr>
+          <a:xfrm>
+            <a:off x="6283262" y="3163303"/>
+            <a:ext cx="358587" cy="523220"/>
+          </a:xfrm>
+          <a:prstGeom prst="rect">
+            <a:avLst/>
+          </a:prstGeom>
+          <a:noFill/>
+        </p:spPr>
+        <p:txBody>
+          <a:bodyPr wrap="square" rtlCol="0">
+            <a:spAutoFit/>
+          </a:bodyPr>
+          <a:lstStyle/>
+          <a:p>
+            <a:r>
+              <a:rPr lang="en-US" sz="2800" b="1"/>
+              <a:t>h</a:t>
+            </a:r>
+            <a:endParaRPr lang="en-IN" sz="2800" b="1"/>
+          </a:p>
+        </p:txBody>
+      </p:sp>
+      <p:sp>
+        <p:nvSpPr>
+          <p:cNvPr id="415" name="Oval 414">
+            <a:extLst>
+              <a:ext uri="{FF2B5EF4-FFF2-40B4-BE49-F238E27FC236}">
+                <a16:creationId xmlns:a16="http://schemas.microsoft.com/office/drawing/2014/main" id="{8EC994EC-9B58-47B4-9D46-224D69D8D915}"/>
+              </a:ext>
+            </a:extLst>
+          </p:cNvPr>
+          <p:cNvSpPr/>
+          <p:nvPr/>
+        </p:nvSpPr>
+        <p:spPr>
+          <a:xfrm>
+            <a:off x="6536093" y="1448447"/>
+            <a:ext cx="103932" cy="98166"/>
+          </a:xfrm>
+          <a:prstGeom prst="ellipse">
+            <a:avLst/>
+          </a:prstGeom>
+        </p:spPr>
+        <p:style>
+          <a:lnRef idx="2">
+            <a:schemeClr val="accent2">
+              <a:shade val="50000"/>
+            </a:schemeClr>
+          </a:lnRef>
+          <a:fillRef idx="1">
+            <a:schemeClr val="accent2"/>
+          </a:fillRef>
+          <a:effectRef idx="0">
+            <a:schemeClr val="accent2"/>
+          </a:effectRef>
+          <a:fontRef idx="minor">
+            <a:schemeClr val="lt1"/>
+          </a:fontRef>
+        </p:style>
+        <p:txBody>
+          <a:bodyPr rtlCol="0" anchor="ctr"/>
+          <a:lstStyle/>
+          <a:p>
+            <a:pPr algn="ctr"/>
+            <a:endParaRPr lang="en-IN"/>
+          </a:p>
+        </p:txBody>
+      </p:sp>
+      <p:sp>
+        <p:nvSpPr>
+          <p:cNvPr id="416" name="Oval 415">
+            <a:extLst>
+              <a:ext uri="{FF2B5EF4-FFF2-40B4-BE49-F238E27FC236}">
+                <a16:creationId xmlns:a16="http://schemas.microsoft.com/office/drawing/2014/main" id="{B01AC2E5-C18B-4875-A8F7-E2A86FF3695E}"/>
+              </a:ext>
+            </a:extLst>
+          </p:cNvPr>
+          <p:cNvSpPr/>
+          <p:nvPr/>
+        </p:nvSpPr>
+        <p:spPr>
+          <a:xfrm>
+            <a:off x="6521859" y="3158809"/>
+            <a:ext cx="103932" cy="98166"/>
+          </a:xfrm>
+          <a:prstGeom prst="ellipse">
+            <a:avLst/>
+          </a:prstGeom>
+        </p:spPr>
+        <p:style>
+          <a:lnRef idx="2">
+            <a:schemeClr val="accent2">
+              <a:shade val="50000"/>
+            </a:schemeClr>
+          </a:lnRef>
+          <a:fillRef idx="1">
+            <a:schemeClr val="accent2"/>
+          </a:fillRef>
+          <a:effectRef idx="0">
+            <a:schemeClr val="accent2"/>
+          </a:effectRef>
+          <a:fontRef idx="minor">
+            <a:schemeClr val="lt1"/>
+          </a:fontRef>
+        </p:style>
+        <p:txBody>
+          <a:bodyPr rtlCol="0" anchor="ctr"/>
+          <a:lstStyle/>
+          <a:p>
+            <a:pPr algn="ctr"/>
+            <a:endParaRPr lang="en-IN"/>
+          </a:p>
+        </p:txBody>
+      </p:sp>
+      <p:cxnSp>
+        <p:nvCxnSpPr>
+          <p:cNvPr id="418" name="Straight Arrow Connector 417">
+            <a:extLst>
+              <a:ext uri="{FF2B5EF4-FFF2-40B4-BE49-F238E27FC236}">
+                <a16:creationId xmlns:a16="http://schemas.microsoft.com/office/drawing/2014/main" id="{80076B1B-1DDD-4E06-BF4A-1A1152DDB917}"/>
+              </a:ext>
+            </a:extLst>
+          </p:cNvPr>
+          <p:cNvCxnSpPr>
+            <a:cxnSpLocks/>
+          </p:cNvCxnSpPr>
+          <p:nvPr/>
+        </p:nvCxnSpPr>
+        <p:spPr>
+          <a:xfrm flipV="1">
+            <a:off x="7704700" y="1571568"/>
+            <a:ext cx="1279201" cy="682879"/>
+          </a:xfrm>
+          <a:prstGeom prst="straightConnector1">
+            <a:avLst/>
+          </a:prstGeom>
+          <a:ln w="57150">
+            <a:prstDash val="sysDot"/>
+            <a:tailEnd type="triangle"/>
+          </a:ln>
+        </p:spPr>
+        <p:style>
+          <a:lnRef idx="1">
+            <a:schemeClr val="accent6"/>
+          </a:lnRef>
+          <a:fillRef idx="0">
+            <a:schemeClr val="accent6"/>
+          </a:fillRef>
+          <a:effectRef idx="0">
+            <a:schemeClr val="accent6"/>
+          </a:effectRef>
+          <a:fontRef idx="minor">
+            <a:schemeClr val="tx1"/>
+          </a:fontRef>
+        </p:style>
+      </p:cxnSp>
+      <p:sp>
+        <p:nvSpPr>
+          <p:cNvPr id="424" name="TextBox 423">
+            <a:extLst>
+              <a:ext uri="{FF2B5EF4-FFF2-40B4-BE49-F238E27FC236}">
+                <a16:creationId xmlns:a16="http://schemas.microsoft.com/office/drawing/2014/main" id="{04292374-FEB9-4085-99FF-080D36737D70}"/>
+              </a:ext>
+            </a:extLst>
+          </p:cNvPr>
+          <p:cNvSpPr txBox="1"/>
+          <p:nvPr/>
+        </p:nvSpPr>
+        <p:spPr>
+          <a:xfrm>
+            <a:off x="7035454" y="1449955"/>
+            <a:ext cx="358587" cy="523220"/>
+          </a:xfrm>
+          <a:prstGeom prst="rect">
+            <a:avLst/>
+          </a:prstGeom>
+          <a:noFill/>
+        </p:spPr>
+        <p:txBody>
+          <a:bodyPr wrap="square" rtlCol="0">
+            <a:spAutoFit/>
+          </a:bodyPr>
+          <a:lstStyle/>
+          <a:p>
+            <a:r>
+              <a:rPr lang="en-US" sz="2800" b="1"/>
+              <a:t>x</a:t>
+            </a:r>
+            <a:endParaRPr lang="en-IN" sz="2800" b="1"/>
+          </a:p>
+        </p:txBody>
+      </p:sp>
+      <p:sp>
+        <p:nvSpPr>
+          <p:cNvPr id="425" name="Oval 424">
+            <a:extLst>
+              <a:ext uri="{FF2B5EF4-FFF2-40B4-BE49-F238E27FC236}">
+                <a16:creationId xmlns:a16="http://schemas.microsoft.com/office/drawing/2014/main" id="{BF005B4C-BBE9-4DD8-86CD-988B95A988C3}"/>
+              </a:ext>
+            </a:extLst>
+          </p:cNvPr>
+          <p:cNvSpPr/>
+          <p:nvPr/>
+        </p:nvSpPr>
+        <p:spPr>
+          <a:xfrm>
+            <a:off x="7244057" y="1437934"/>
+            <a:ext cx="103932" cy="98166"/>
+          </a:xfrm>
+          <a:prstGeom prst="ellipse">
+            <a:avLst/>
+          </a:prstGeom>
+        </p:spPr>
+        <p:style>
+          <a:lnRef idx="2">
+            <a:schemeClr val="accent2">
+              <a:shade val="50000"/>
+            </a:schemeClr>
+          </a:lnRef>
+          <a:fillRef idx="1">
+            <a:schemeClr val="accent2"/>
+          </a:fillRef>
+          <a:effectRef idx="0">
+            <a:schemeClr val="accent2"/>
+          </a:effectRef>
+          <a:fontRef idx="minor">
+            <a:schemeClr val="lt1"/>
+          </a:fontRef>
+        </p:style>
+        <p:txBody>
+          <a:bodyPr rtlCol="0" anchor="ctr"/>
+          <a:lstStyle/>
+          <a:p>
+            <a:pPr algn="ctr"/>
+            <a:endParaRPr lang="en-IN"/>
+          </a:p>
+        </p:txBody>
+      </p:sp>
+      <p:cxnSp>
+        <p:nvCxnSpPr>
+          <p:cNvPr id="426" name="Straight Arrow Connector 425">
+            <a:extLst>
+              <a:ext uri="{FF2B5EF4-FFF2-40B4-BE49-F238E27FC236}">
+                <a16:creationId xmlns:a16="http://schemas.microsoft.com/office/drawing/2014/main" id="{AD18A603-FE03-45EA-8DF9-F63728EF10F6}"/>
+              </a:ext>
+            </a:extLst>
+          </p:cNvPr>
+          <p:cNvCxnSpPr>
+            <a:cxnSpLocks/>
+          </p:cNvCxnSpPr>
+          <p:nvPr/>
+        </p:nvCxnSpPr>
+        <p:spPr>
+          <a:xfrm flipH="1" flipV="1">
+            <a:off x="7677340" y="1472269"/>
+            <a:ext cx="12335" cy="783346"/>
+          </a:xfrm>
+          <a:prstGeom prst="straightConnector1">
+            <a:avLst/>
+          </a:prstGeom>
+          <a:ln w="57150">
+            <a:tailEnd type="triangle"/>
+          </a:ln>
+        </p:spPr>
+        <p:style>
+          <a:lnRef idx="1">
+            <a:schemeClr val="accent2"/>
+          </a:lnRef>
+          <a:fillRef idx="0">
+            <a:schemeClr val="accent2"/>
+          </a:fillRef>
+          <a:effectRef idx="0">
+            <a:schemeClr val="accent2"/>
+          </a:effectRef>
+          <a:fontRef idx="minor">
+            <a:schemeClr val="tx1"/>
+          </a:fontRef>
+        </p:style>
+      </p:cxnSp>
+      <p:sp>
+        <p:nvSpPr>
+          <p:cNvPr id="427" name="Arc 426">
+            <a:extLst>
+              <a:ext uri="{FF2B5EF4-FFF2-40B4-BE49-F238E27FC236}">
+                <a16:creationId xmlns:a16="http://schemas.microsoft.com/office/drawing/2014/main" id="{05E5F860-75E3-4173-94DC-48FC159A709A}"/>
+              </a:ext>
+            </a:extLst>
+          </p:cNvPr>
+          <p:cNvSpPr/>
+          <p:nvPr/>
+        </p:nvSpPr>
+        <p:spPr>
+          <a:xfrm rot="1584642">
+            <a:off x="7587656" y="1759955"/>
+            <a:ext cx="789732" cy="725862"/>
+          </a:xfrm>
+          <a:prstGeom prst="arc">
+            <a:avLst>
+              <a:gd name="adj1" fmla="val 18231721"/>
+              <a:gd name="adj2" fmla="val 21110409"/>
+            </a:avLst>
+          </a:prstGeom>
+          <a:ln w="57150"/>
+        </p:spPr>
+        <p:style>
+          <a:lnRef idx="1">
+            <a:schemeClr val="accent1"/>
+          </a:lnRef>
+          <a:fillRef idx="0">
+            <a:schemeClr val="accent1"/>
+          </a:fillRef>
+          <a:effectRef idx="0">
+            <a:schemeClr val="accent1"/>
+          </a:effectRef>
+          <a:fontRef idx="minor">
+            <a:schemeClr val="tx1"/>
+          </a:fontRef>
+        </p:style>
+        <p:txBody>
+          <a:bodyPr rtlCol="0" anchor="ctr"/>
+          <a:lstStyle/>
+          <a:p>
+            <a:pPr algn="ctr"/>
+            <a:endParaRPr lang="en-IN"/>
+          </a:p>
+        </p:txBody>
+      </p:sp>
+      <mc:AlternateContent xmlns:mc="http://schemas.openxmlformats.org/markup-compatibility/2006">
+        <mc:Choice xmlns:a14="http://schemas.microsoft.com/office/drawing/2010/main" Requires="a14">
+          <p:sp>
+            <p:nvSpPr>
+              <p:cNvPr id="428" name="TextBox 427">
+                <a:extLst>
+                  <a:ext uri="{FF2B5EF4-FFF2-40B4-BE49-F238E27FC236}">
+                    <a16:creationId xmlns:a16="http://schemas.microsoft.com/office/drawing/2014/main" id="{84634016-4788-4ACA-A7D8-38A1F8E86519}"/>
+                  </a:ext>
+                </a:extLst>
+              </p:cNvPr>
+              <p:cNvSpPr txBox="1"/>
+              <p:nvPr/>
+            </p:nvSpPr>
+            <p:spPr>
+              <a:xfrm>
+                <a:off x="8414524" y="1887612"/>
+                <a:ext cx="197170" cy="276999"/>
+              </a:xfrm>
+              <a:prstGeom prst="rect">
+                <a:avLst/>
+              </a:prstGeom>
+              <a:noFill/>
+            </p:spPr>
+            <p:txBody>
+              <a:bodyPr wrap="none" lIns="0" tIns="0" rIns="0" bIns="0" rtlCol="0">
+                <a:spAutoFit/>
+              </a:bodyPr>
+              <a:lstStyle/>
+              <a:p>
+                <a:pPr/>
+                <a14:m>
+                  <m:oMathPara xmlns:m="http://schemas.openxmlformats.org/officeDocument/2006/math">
+                    <m:oMathParaPr>
+                      <m:jc m:val="centerGroup"/>
+                    </m:oMathParaPr>
+                    <m:oMath xmlns:m="http://schemas.openxmlformats.org/officeDocument/2006/math">
+                      <m:r>
+                        <a:rPr lang="en-IN" b="1" i="1">
+                          <a:latin typeface="Cambria Math" panose="02040503050406030204" pitchFamily="18" charset="0"/>
+                        </a:rPr>
+                        <m:t>𝜽</m:t>
+                      </m:r>
+                    </m:oMath>
+                  </m:oMathPara>
+                </a14:m>
+                <a:endParaRPr lang="en-IN" b="1"/>
+              </a:p>
+            </p:txBody>
+          </p:sp>
+        </mc:Choice>
+        <mc:Fallback>
+          <p:sp>
+            <p:nvSpPr>
+              <p:cNvPr id="428" name="TextBox 427">
+                <a:extLst>
+                  <a:ext uri="{FF2B5EF4-FFF2-40B4-BE49-F238E27FC236}">
+                    <a16:creationId xmlns:a16="http://schemas.microsoft.com/office/drawing/2014/main" id="{84634016-4788-4ACA-A7D8-38A1F8E86519}"/>
+                  </a:ext>
+                </a:extLst>
+              </p:cNvPr>
+              <p:cNvSpPr txBox="1">
+                <a:spLocks noRot="1" noChangeAspect="1" noMove="1" noResize="1" noEditPoints="1" noAdjustHandles="1" noChangeArrowheads="1" noChangeShapeType="1" noTextEdit="1"/>
+              </p:cNvSpPr>
+              <p:nvPr/>
+            </p:nvSpPr>
+            <p:spPr>
+              <a:xfrm>
+                <a:off x="8414524" y="1887612"/>
+                <a:ext cx="197170" cy="276999"/>
+              </a:xfrm>
+              <a:prstGeom prst="rect">
+                <a:avLst/>
+              </a:prstGeom>
+              <a:blipFill>
+                <a:blip r:embed="rId6"/>
+                <a:stretch>
+                  <a:fillRect l="-27273" r="-27273" b="-6667"/>
+                </a:stretch>
+              </a:blipFill>
+            </p:spPr>
+            <p:txBody>
+              <a:bodyPr/>
+              <a:lstStyle/>
+              <a:p>
+                <a:r>
+                  <a:rPr lang="en-IN">
+                    <a:noFill/>
+                  </a:rPr>
+                  <a:t> </a:t>
+                </a:r>
+              </a:p>
+            </p:txBody>
+          </p:sp>
+        </mc:Fallback>
+      </mc:AlternateContent>
+      <p:sp>
+        <p:nvSpPr>
+          <p:cNvPr id="429" name="Arc 428">
+            <a:extLst>
+              <a:ext uri="{FF2B5EF4-FFF2-40B4-BE49-F238E27FC236}">
+                <a16:creationId xmlns:a16="http://schemas.microsoft.com/office/drawing/2014/main" id="{C7740B72-D8CE-46F6-8603-0AB0C92B1644}"/>
+              </a:ext>
+            </a:extLst>
+          </p:cNvPr>
+          <p:cNvSpPr/>
+          <p:nvPr/>
+        </p:nvSpPr>
+        <p:spPr>
+          <a:xfrm rot="20702616">
+            <a:off x="7289408" y="1829531"/>
+            <a:ext cx="789732" cy="725862"/>
+          </a:xfrm>
+          <a:prstGeom prst="arc">
+            <a:avLst>
+              <a:gd name="adj1" fmla="val 17346437"/>
+              <a:gd name="adj2" fmla="val 21110409"/>
+            </a:avLst>
+          </a:prstGeom>
+          <a:ln w="57150"/>
+        </p:spPr>
+        <p:style>
+          <a:lnRef idx="1">
+            <a:schemeClr val="accent1"/>
+          </a:lnRef>
+          <a:fillRef idx="0">
+            <a:schemeClr val="accent1"/>
+          </a:fillRef>
+          <a:effectRef idx="0">
+            <a:schemeClr val="accent1"/>
+          </a:effectRef>
+          <a:fontRef idx="minor">
+            <a:schemeClr val="tx1"/>
+          </a:fontRef>
+        </p:style>
+        <p:txBody>
+          <a:bodyPr rtlCol="0" anchor="ctr"/>
+          <a:lstStyle/>
+          <a:p>
+            <a:pPr algn="ctr"/>
+            <a:endParaRPr lang="en-IN"/>
+          </a:p>
+        </p:txBody>
+      </p:sp>
+      <mc:AlternateContent xmlns:mc="http://schemas.openxmlformats.org/markup-compatibility/2006">
+        <mc:Choice xmlns:a14="http://schemas.microsoft.com/office/drawing/2010/main" Requires="a14">
+          <p:sp>
+            <p:nvSpPr>
+              <p:cNvPr id="430" name="TextBox 429">
+                <a:extLst>
+                  <a:ext uri="{FF2B5EF4-FFF2-40B4-BE49-F238E27FC236}">
+                    <a16:creationId xmlns:a16="http://schemas.microsoft.com/office/drawing/2014/main" id="{41DD5A5D-A709-492B-8ED8-D5572469F005}"/>
+                  </a:ext>
+                </a:extLst>
+              </p:cNvPr>
+              <p:cNvSpPr txBox="1"/>
+              <p:nvPr/>
+            </p:nvSpPr>
+            <p:spPr>
+              <a:xfrm rot="19546790">
+                <a:off x="7857958" y="1456076"/>
+                <a:ext cx="748603" cy="276999"/>
+              </a:xfrm>
+              <a:prstGeom prst="rect">
+                <a:avLst/>
+              </a:prstGeom>
+              <a:noFill/>
+            </p:spPr>
+            <p:txBody>
+              <a:bodyPr wrap="none" lIns="0" tIns="0" rIns="0" bIns="0" rtlCol="0">
+                <a:spAutoFit/>
+              </a:bodyPr>
+              <a:lstStyle/>
+              <a:p>
+                <a:pPr/>
+                <a14:m>
+                  <m:oMathPara xmlns:m="http://schemas.openxmlformats.org/officeDocument/2006/math">
+                    <m:oMathParaPr>
+                      <m:jc m:val="centerGroup"/>
+                    </m:oMathParaPr>
+                    <m:oMath xmlns:m="http://schemas.openxmlformats.org/officeDocument/2006/math">
+                      <m:r>
+                        <a:rPr lang="en-US" b="1" i="1" smtClean="0">
+                          <a:latin typeface="Cambria Math" panose="02040503050406030204" pitchFamily="18" charset="0"/>
+                        </a:rPr>
+                        <m:t>𝟗𝟎</m:t>
+                      </m:r>
+                      <m:r>
+                        <a:rPr lang="en-US" b="1" i="1" smtClean="0">
+                          <a:latin typeface="Cambria Math" panose="02040503050406030204" pitchFamily="18" charset="0"/>
+                        </a:rPr>
+                        <m:t>−</m:t>
+                      </m:r>
+                      <m:r>
+                        <a:rPr lang="en-IN" b="1" i="1">
+                          <a:latin typeface="Cambria Math" panose="02040503050406030204" pitchFamily="18" charset="0"/>
+                        </a:rPr>
+                        <m:t>𝜽</m:t>
+                      </m:r>
+                    </m:oMath>
+                  </m:oMathPara>
+                </a14:m>
+                <a:endParaRPr lang="en-IN" b="1"/>
+              </a:p>
+            </p:txBody>
+          </p:sp>
+        </mc:Choice>
+        <mc:Fallback>
+          <p:sp>
+            <p:nvSpPr>
+              <p:cNvPr id="430" name="TextBox 429">
+                <a:extLst>
+                  <a:ext uri="{FF2B5EF4-FFF2-40B4-BE49-F238E27FC236}">
+                    <a16:creationId xmlns:a16="http://schemas.microsoft.com/office/drawing/2014/main" id="{41DD5A5D-A709-492B-8ED8-D5572469F005}"/>
+                  </a:ext>
+                </a:extLst>
+              </p:cNvPr>
+              <p:cNvSpPr txBox="1">
+                <a:spLocks noRot="1" noChangeAspect="1" noMove="1" noResize="1" noEditPoints="1" noAdjustHandles="1" noChangeArrowheads="1" noChangeShapeType="1" noTextEdit="1"/>
+              </p:cNvSpPr>
+              <p:nvPr/>
+            </p:nvSpPr>
+            <p:spPr>
+              <a:xfrm rot="19546790">
+                <a:off x="7857958" y="1456076"/>
+                <a:ext cx="748603" cy="276999"/>
+              </a:xfrm>
+              <a:prstGeom prst="rect">
+                <a:avLst/>
+              </a:prstGeom>
+              <a:blipFill>
+                <a:blip r:embed="rId7"/>
+                <a:stretch>
+                  <a:fillRect l="-3906" t="-2804" r="-7031" b="-6542"/>
+                </a:stretch>
+              </a:blipFill>
+            </p:spPr>
+            <p:txBody>
+              <a:bodyPr/>
+              <a:lstStyle/>
+              <a:p>
+                <a:r>
+                  <a:rPr lang="en-IN">
+                    <a:noFill/>
+                  </a:rPr>
+                  <a:t> </a:t>
+                </a:r>
+              </a:p>
+            </p:txBody>
+          </p:sp>
+        </mc:Fallback>
+      </mc:AlternateContent>
+    </p:spTree>
+    <p:extLst>
+      <p:ext uri="{BB962C8B-B14F-4D97-AF65-F5344CB8AC3E}">
+        <p14:creationId xmlns:p14="http://schemas.microsoft.com/office/powerpoint/2010/main" val="1469098282"/>
+      </p:ext>
+    </p:extLst>
+  </p:cSld>
+  <p:clrMapOvr>
+    <a:masterClrMapping/>
+  </p:clrMapOvr>
+</p:sld>
+</file>
+
+<file path=ppt/slides/slide34.xml><?xml version="1.0" encoding="utf-8"?>
+<p:sld xmlns:a="http://schemas.openxmlformats.org/drawingml/2006/main" xmlns:r="http://schemas.openxmlformats.org/officeDocument/2006/relationships" xmlns:p="http://schemas.openxmlformats.org/presentationml/2006/main">
+  <p:cSld>
+    <p:spTree>
+      <p:nvGrpSpPr>
+        <p:cNvPr id="1" name=""/>
+        <p:cNvGrpSpPr/>
+        <p:nvPr/>
+      </p:nvGrpSpPr>
+      <p:grpSpPr>
+        <a:xfrm>
+          <a:off x="0" y="0"/>
+          <a:ext cx="0" cy="0"/>
+          <a:chOff x="0" y="0"/>
+          <a:chExt cx="0" cy="0"/>
+        </a:xfrm>
+      </p:grpSpPr>
+      <p:sp>
+        <p:nvSpPr>
+          <p:cNvPr id="22" name="Rectangle 21">
+            <a:extLst>
+              <a:ext uri="{FF2B5EF4-FFF2-40B4-BE49-F238E27FC236}">
+                <a16:creationId xmlns:a16="http://schemas.microsoft.com/office/drawing/2014/main" id="{522337E6-3C17-497D-9797-1762846016A2}"/>
+              </a:ext>
+            </a:extLst>
+          </p:cNvPr>
+          <p:cNvSpPr/>
+          <p:nvPr/>
+        </p:nvSpPr>
+        <p:spPr>
+          <a:xfrm>
+            <a:off x="4165031" y="2523482"/>
+            <a:ext cx="2347826" cy="2231447"/>
+          </a:xfrm>
+          <a:prstGeom prst="rect">
+            <a:avLst/>
+          </a:prstGeom>
+        </p:spPr>
+        <p:style>
+          <a:lnRef idx="2">
+            <a:schemeClr val="accent3">
+              <a:shade val="50000"/>
+            </a:schemeClr>
+          </a:lnRef>
+          <a:fillRef idx="1">
+            <a:schemeClr val="accent3"/>
+          </a:fillRef>
+          <a:effectRef idx="0">
+            <a:schemeClr val="accent3"/>
+          </a:effectRef>
+          <a:fontRef idx="minor">
+            <a:schemeClr val="lt1"/>
+          </a:fontRef>
+        </p:style>
+        <p:txBody>
+          <a:bodyPr rtlCol="0" anchor="ctr"/>
+          <a:lstStyle/>
+          <a:p>
+            <a:pPr algn="ctr"/>
+            <a:endParaRPr lang="en-IN"/>
+          </a:p>
+        </p:txBody>
+      </p:sp>
+      <p:cxnSp>
+        <p:nvCxnSpPr>
+          <p:cNvPr id="4" name="Straight Arrow Connector 3">
+            <a:extLst>
+              <a:ext uri="{FF2B5EF4-FFF2-40B4-BE49-F238E27FC236}">
+                <a16:creationId xmlns:a16="http://schemas.microsoft.com/office/drawing/2014/main" id="{2CB34E74-1D72-443E-8220-E07FA1F2F98E}"/>
+              </a:ext>
+            </a:extLst>
+          </p:cNvPr>
+          <p:cNvCxnSpPr/>
+          <p:nvPr/>
+        </p:nvCxnSpPr>
+        <p:spPr>
+          <a:xfrm flipV="1">
+            <a:off x="5774345" y="454690"/>
+            <a:ext cx="0" cy="3164541"/>
+          </a:xfrm>
+          <a:prstGeom prst="straightConnector1">
+            <a:avLst/>
+          </a:prstGeom>
+          <a:ln w="57150">
+            <a:tailEnd type="triangle"/>
+          </a:ln>
+        </p:spPr>
+        <p:style>
+          <a:lnRef idx="1">
+            <a:schemeClr val="dk1"/>
+          </a:lnRef>
+          <a:fillRef idx="0">
+            <a:schemeClr val="dk1"/>
+          </a:fillRef>
+          <a:effectRef idx="0">
+            <a:schemeClr val="dk1"/>
+          </a:effectRef>
+          <a:fontRef idx="minor">
+            <a:schemeClr val="tx1"/>
+          </a:fontRef>
+        </p:style>
+      </p:cxnSp>
+      <p:cxnSp>
+        <p:nvCxnSpPr>
+          <p:cNvPr id="182" name="Straight Arrow Connector 181">
+            <a:extLst>
+              <a:ext uri="{FF2B5EF4-FFF2-40B4-BE49-F238E27FC236}">
+                <a16:creationId xmlns:a16="http://schemas.microsoft.com/office/drawing/2014/main" id="{A58A7DB9-AD36-402D-8E49-E97B410E2416}"/>
+              </a:ext>
+            </a:extLst>
+          </p:cNvPr>
+          <p:cNvCxnSpPr>
+            <a:cxnSpLocks/>
+          </p:cNvCxnSpPr>
+          <p:nvPr/>
+        </p:nvCxnSpPr>
+        <p:spPr>
+          <a:xfrm flipV="1">
+            <a:off x="5747450" y="3619231"/>
+            <a:ext cx="3334870" cy="1"/>
+          </a:xfrm>
+          <a:prstGeom prst="straightConnector1">
+            <a:avLst/>
+          </a:prstGeom>
+          <a:ln w="57150">
+            <a:tailEnd type="triangle"/>
+          </a:ln>
+        </p:spPr>
+        <p:style>
+          <a:lnRef idx="1">
+            <a:schemeClr val="dk1"/>
+          </a:lnRef>
+          <a:fillRef idx="0">
+            <a:schemeClr val="dk1"/>
+          </a:fillRef>
+          <a:effectRef idx="0">
+            <a:schemeClr val="dk1"/>
+          </a:effectRef>
+          <a:fontRef idx="minor">
+            <a:schemeClr val="tx1"/>
+          </a:fontRef>
+        </p:style>
+      </p:cxnSp>
+      <p:cxnSp>
+        <p:nvCxnSpPr>
+          <p:cNvPr id="183" name="Straight Arrow Connector 182">
+            <a:extLst>
+              <a:ext uri="{FF2B5EF4-FFF2-40B4-BE49-F238E27FC236}">
+                <a16:creationId xmlns:a16="http://schemas.microsoft.com/office/drawing/2014/main" id="{FC0CE86E-48EA-421C-B9DC-32D16F7E7A79}"/>
+              </a:ext>
+            </a:extLst>
+          </p:cNvPr>
+          <p:cNvCxnSpPr>
+            <a:cxnSpLocks/>
+          </p:cNvCxnSpPr>
+          <p:nvPr/>
+        </p:nvCxnSpPr>
+        <p:spPr>
+          <a:xfrm flipV="1">
+            <a:off x="5774344" y="1915938"/>
+            <a:ext cx="2849703" cy="1703295"/>
+          </a:xfrm>
+          <a:prstGeom prst="straightConnector1">
+            <a:avLst/>
+          </a:prstGeom>
+          <a:ln w="57150">
+            <a:tailEnd type="triangle"/>
+          </a:ln>
+        </p:spPr>
+        <p:style>
+          <a:lnRef idx="1">
+            <a:schemeClr val="dk1"/>
+          </a:lnRef>
+          <a:fillRef idx="0">
+            <a:schemeClr val="dk1"/>
+          </a:fillRef>
+          <a:effectRef idx="0">
+            <a:schemeClr val="dk1"/>
+          </a:effectRef>
+          <a:fontRef idx="minor">
+            <a:schemeClr val="tx1"/>
+          </a:fontRef>
+        </p:style>
+      </p:cxnSp>
+      <p:sp>
+        <p:nvSpPr>
+          <p:cNvPr id="10" name="Rectangle 9">
+            <a:extLst>
+              <a:ext uri="{FF2B5EF4-FFF2-40B4-BE49-F238E27FC236}">
+                <a16:creationId xmlns:a16="http://schemas.microsoft.com/office/drawing/2014/main" id="{9B10B450-9EB2-4D35-BE9B-0122A7667308}"/>
+              </a:ext>
+            </a:extLst>
+          </p:cNvPr>
+          <p:cNvSpPr/>
+          <p:nvPr/>
+        </p:nvSpPr>
+        <p:spPr>
+          <a:xfrm>
+            <a:off x="5635405" y="1140498"/>
+            <a:ext cx="277878" cy="896462"/>
+          </a:xfrm>
+          <a:prstGeom prst="rect">
+            <a:avLst/>
+          </a:prstGeom>
+        </p:spPr>
+        <p:style>
+          <a:lnRef idx="2">
+            <a:schemeClr val="accent1">
+              <a:shade val="50000"/>
+            </a:schemeClr>
+          </a:lnRef>
+          <a:fillRef idx="1">
+            <a:schemeClr val="accent1"/>
+          </a:fillRef>
+          <a:effectRef idx="0">
+            <a:schemeClr val="accent1"/>
+          </a:effectRef>
+          <a:fontRef idx="minor">
+            <a:schemeClr val="lt1"/>
+          </a:fontRef>
+        </p:style>
+        <p:txBody>
+          <a:bodyPr rtlCol="0" anchor="ctr"/>
+          <a:lstStyle/>
+          <a:p>
+            <a:pPr algn="ctr"/>
+            <a:endParaRPr lang="en-IN"/>
+          </a:p>
+        </p:txBody>
+      </p:sp>
+      <p:sp>
+        <p:nvSpPr>
+          <p:cNvPr id="186" name="Rectangle 185">
+            <a:extLst>
+              <a:ext uri="{FF2B5EF4-FFF2-40B4-BE49-F238E27FC236}">
+                <a16:creationId xmlns:a16="http://schemas.microsoft.com/office/drawing/2014/main" id="{AC52465A-EB41-4CCB-98E6-88BE0EAE0A34}"/>
+              </a:ext>
+            </a:extLst>
+          </p:cNvPr>
+          <p:cNvSpPr/>
+          <p:nvPr/>
+        </p:nvSpPr>
+        <p:spPr>
+          <a:xfrm>
+            <a:off x="7432824" y="3487004"/>
+            <a:ext cx="950248" cy="264454"/>
+          </a:xfrm>
+          <a:prstGeom prst="rect">
+            <a:avLst/>
+          </a:prstGeom>
+        </p:spPr>
+        <p:style>
+          <a:lnRef idx="2">
+            <a:schemeClr val="accent1">
+              <a:shade val="50000"/>
+            </a:schemeClr>
+          </a:lnRef>
+          <a:fillRef idx="1">
+            <a:schemeClr val="accent1"/>
+          </a:fillRef>
+          <a:effectRef idx="0">
+            <a:schemeClr val="accent1"/>
+          </a:effectRef>
+          <a:fontRef idx="minor">
+            <a:schemeClr val="lt1"/>
+          </a:fontRef>
+        </p:style>
+        <p:txBody>
+          <a:bodyPr rtlCol="0" anchor="ctr"/>
+          <a:lstStyle/>
+          <a:p>
+            <a:pPr algn="ctr"/>
+            <a:endParaRPr lang="en-IN"/>
+          </a:p>
+        </p:txBody>
+      </p:sp>
+      <p:sp>
+        <p:nvSpPr>
+          <p:cNvPr id="198" name="Rectangle 197">
+            <a:extLst>
+              <a:ext uri="{FF2B5EF4-FFF2-40B4-BE49-F238E27FC236}">
+                <a16:creationId xmlns:a16="http://schemas.microsoft.com/office/drawing/2014/main" id="{D4BEE4BB-DE7D-4D39-A3C8-6925E613E4D0}"/>
+              </a:ext>
+            </a:extLst>
+          </p:cNvPr>
+          <p:cNvSpPr/>
+          <p:nvPr/>
+        </p:nvSpPr>
+        <p:spPr>
+          <a:xfrm rot="3461444">
+            <a:off x="7513351" y="2028405"/>
+            <a:ext cx="277878" cy="896462"/>
+          </a:xfrm>
+          <a:prstGeom prst="rect">
+            <a:avLst/>
+          </a:prstGeom>
+        </p:spPr>
+        <p:style>
+          <a:lnRef idx="2">
+            <a:schemeClr val="accent1">
+              <a:shade val="50000"/>
+            </a:schemeClr>
+          </a:lnRef>
+          <a:fillRef idx="1">
+            <a:schemeClr val="accent1"/>
+          </a:fillRef>
+          <a:effectRef idx="0">
+            <a:schemeClr val="accent1"/>
+          </a:effectRef>
+          <a:fontRef idx="minor">
+            <a:schemeClr val="lt1"/>
+          </a:fontRef>
+        </p:style>
+        <p:txBody>
+          <a:bodyPr rtlCol="0" anchor="ctr"/>
+          <a:lstStyle/>
+          <a:p>
+            <a:pPr algn="ctr"/>
+            <a:endParaRPr lang="en-IN"/>
+          </a:p>
+        </p:txBody>
+      </p:sp>
+      <mc:AlternateContent xmlns:mc="http://schemas.openxmlformats.org/markup-compatibility/2006">
+        <mc:Choice xmlns:a14="http://schemas.microsoft.com/office/drawing/2010/main" Requires="a14">
+          <p:sp>
+            <p:nvSpPr>
+              <p:cNvPr id="219" name="TextBox 218">
+                <a:extLst>
+                  <a:ext uri="{FF2B5EF4-FFF2-40B4-BE49-F238E27FC236}">
+                    <a16:creationId xmlns:a16="http://schemas.microsoft.com/office/drawing/2014/main" id="{0A70472B-180C-4453-8852-6D88D0CA1DE7}"/>
+                  </a:ext>
+                </a:extLst>
+              </p:cNvPr>
+              <p:cNvSpPr txBox="1"/>
+              <p:nvPr/>
+            </p:nvSpPr>
+            <p:spPr>
+              <a:xfrm>
+                <a:off x="7308692" y="1919898"/>
+                <a:ext cx="389961" cy="465897"/>
+              </a:xfrm>
+              <a:prstGeom prst="rect">
+                <a:avLst/>
+              </a:prstGeom>
+              <a:noFill/>
+            </p:spPr>
+            <p:txBody>
+              <a:bodyPr wrap="square" rtlCol="0">
+                <a:spAutoFit/>
+              </a:bodyPr>
+              <a:lstStyle/>
+              <a:p>
+                <a:pPr algn="ctr"/>
+                <a14:m>
+                  <m:oMathPara xmlns:m="http://schemas.openxmlformats.org/officeDocument/2006/math">
+                    <m:oMathParaPr>
+                      <m:jc m:val="centerGroup"/>
+                    </m:oMathParaPr>
+                    <m:oMath xmlns:m="http://schemas.openxmlformats.org/officeDocument/2006/math">
+                      <m:sSub>
+                        <m:sSubPr>
+                          <m:ctrlPr>
+                            <a:rPr lang="en-US" sz="2400" b="1" smtClean="0">
+                              <a:latin typeface="Cambria Math" panose="02040503050406030204" pitchFamily="18" charset="0"/>
+                            </a:rPr>
+                          </m:ctrlPr>
+                        </m:sSubPr>
+                        <m:e>
+                          <m:r>
+                            <a:rPr lang="en-US" sz="2400" b="1" i="1">
+                              <a:latin typeface="Cambria Math" panose="02040503050406030204" pitchFamily="18" charset="0"/>
+                            </a:rPr>
+                            <m:t>𝝐</m:t>
+                          </m:r>
+                        </m:e>
+                        <m:sub>
+                          <m:sSup>
+                            <m:sSupPr>
+                              <m:ctrlPr>
+                                <a:rPr lang="en-US" sz="2400" b="1" i="1">
+                                  <a:latin typeface="Cambria Math" panose="02040503050406030204" pitchFamily="18" charset="0"/>
+                                </a:rPr>
+                              </m:ctrlPr>
+                            </m:sSupPr>
+                            <m:e>
+                              <m:r>
+                                <a:rPr lang="en-US" sz="2400" b="1" i="1">
+                                  <a:latin typeface="Cambria Math" panose="02040503050406030204" pitchFamily="18" charset="0"/>
+                                </a:rPr>
+                                <m:t>𝒙</m:t>
+                              </m:r>
+                            </m:e>
+                            <m:sup>
+                              <m:r>
+                                <a:rPr lang="en-US" sz="2400" b="1" i="0">
+                                  <a:latin typeface="Cambria Math" panose="02040503050406030204" pitchFamily="18" charset="0"/>
+                                </a:rPr>
+                                <m:t>′</m:t>
+                              </m:r>
+                            </m:sup>
+                          </m:sSup>
+                        </m:sub>
+                      </m:sSub>
+                    </m:oMath>
+                  </m:oMathPara>
+                </a14:m>
+                <a:endParaRPr lang="en-US" sz="2400" b="1"/>
+              </a:p>
+            </p:txBody>
+          </p:sp>
+        </mc:Choice>
+        <mc:Fallback>
+          <p:sp>
+            <p:nvSpPr>
+              <p:cNvPr id="219" name="TextBox 218">
+                <a:extLst>
+                  <a:ext uri="{FF2B5EF4-FFF2-40B4-BE49-F238E27FC236}">
+                    <a16:creationId xmlns:a16="http://schemas.microsoft.com/office/drawing/2014/main" id="{0A70472B-180C-4453-8852-6D88D0CA1DE7}"/>
+                  </a:ext>
+                </a:extLst>
+              </p:cNvPr>
+              <p:cNvSpPr txBox="1">
+                <a:spLocks noRot="1" noChangeAspect="1" noMove="1" noResize="1" noEditPoints="1" noAdjustHandles="1" noChangeArrowheads="1" noChangeShapeType="1" noTextEdit="1"/>
+              </p:cNvSpPr>
+              <p:nvPr/>
+            </p:nvSpPr>
+            <p:spPr>
+              <a:xfrm>
+                <a:off x="7308692" y="1919898"/>
+                <a:ext cx="389961" cy="465897"/>
+              </a:xfrm>
+              <a:prstGeom prst="rect">
+                <a:avLst/>
+              </a:prstGeom>
+              <a:blipFill>
+                <a:blip r:embed="rId2"/>
+                <a:stretch>
+                  <a:fillRect l="-28125"/>
+                </a:stretch>
+              </a:blipFill>
+            </p:spPr>
+            <p:txBody>
+              <a:bodyPr/>
+              <a:lstStyle/>
+              <a:p>
+                <a:r>
+                  <a:rPr lang="en-IN">
+                    <a:noFill/>
+                  </a:rPr>
+                  <a:t> </a:t>
+                </a:r>
+              </a:p>
+            </p:txBody>
+          </p:sp>
+        </mc:Fallback>
+      </mc:AlternateContent>
+      <mc:AlternateContent xmlns:mc="http://schemas.openxmlformats.org/markup-compatibility/2006">
+        <mc:Choice xmlns:a14="http://schemas.microsoft.com/office/drawing/2010/main" Requires="a14">
+          <p:sp>
+            <p:nvSpPr>
+              <p:cNvPr id="220" name="TextBox 219">
+                <a:extLst>
+                  <a:ext uri="{FF2B5EF4-FFF2-40B4-BE49-F238E27FC236}">
+                    <a16:creationId xmlns:a16="http://schemas.microsoft.com/office/drawing/2014/main" id="{55BFB9C5-D110-4996-BD6B-49D3B991007A}"/>
+                  </a:ext>
+                </a:extLst>
+              </p:cNvPr>
+              <p:cNvSpPr txBox="1"/>
+              <p:nvPr/>
+            </p:nvSpPr>
+            <p:spPr>
+              <a:xfrm>
+                <a:off x="5325353" y="1393098"/>
+                <a:ext cx="253015" cy="495520"/>
+              </a:xfrm>
+              <a:prstGeom prst="rect">
+                <a:avLst/>
+              </a:prstGeom>
+              <a:noFill/>
+            </p:spPr>
+            <p:txBody>
+              <a:bodyPr wrap="square" rtlCol="0">
+                <a:spAutoFit/>
+              </a:bodyPr>
+              <a:lstStyle/>
+              <a:p>
+                <a:pPr algn="ctr"/>
+                <a14:m>
+                  <m:oMathPara xmlns:m="http://schemas.openxmlformats.org/officeDocument/2006/math">
+                    <m:oMathParaPr>
+                      <m:jc m:val="centerGroup"/>
+                    </m:oMathParaPr>
+                    <m:oMath xmlns:m="http://schemas.openxmlformats.org/officeDocument/2006/math">
+                      <m:sSub>
+                        <m:sSubPr>
+                          <m:ctrlPr>
+                            <a:rPr lang="en-US" sz="2400" b="1" smtClean="0">
+                              <a:latin typeface="Cambria Math" panose="02040503050406030204" pitchFamily="18" charset="0"/>
+                            </a:rPr>
+                          </m:ctrlPr>
+                        </m:sSubPr>
+                        <m:e>
+                          <m:r>
+                            <a:rPr lang="en-US" sz="2400" b="1" i="1">
+                              <a:latin typeface="Cambria Math" panose="02040503050406030204" pitchFamily="18" charset="0"/>
+                            </a:rPr>
+                            <m:t>𝝐</m:t>
+                          </m:r>
+                        </m:e>
+                        <m:sub>
+                          <m:r>
+                            <a:rPr lang="en-US" sz="2400" b="1" i="1">
+                              <a:latin typeface="Cambria Math" panose="02040503050406030204" pitchFamily="18" charset="0"/>
+                            </a:rPr>
+                            <m:t>𝒚</m:t>
+                          </m:r>
+                        </m:sub>
+                      </m:sSub>
+                    </m:oMath>
+                  </m:oMathPara>
+                </a14:m>
+                <a:endParaRPr lang="en-US" sz="2400" b="1"/>
+              </a:p>
+            </p:txBody>
+          </p:sp>
+        </mc:Choice>
+        <mc:Fallback>
+          <p:sp>
+            <p:nvSpPr>
+              <p:cNvPr id="220" name="TextBox 219">
+                <a:extLst>
+                  <a:ext uri="{FF2B5EF4-FFF2-40B4-BE49-F238E27FC236}">
+                    <a16:creationId xmlns:a16="http://schemas.microsoft.com/office/drawing/2014/main" id="{55BFB9C5-D110-4996-BD6B-49D3B991007A}"/>
+                  </a:ext>
+                </a:extLst>
+              </p:cNvPr>
+              <p:cNvSpPr txBox="1">
+                <a:spLocks noRot="1" noChangeAspect="1" noMove="1" noResize="1" noEditPoints="1" noAdjustHandles="1" noChangeArrowheads="1" noChangeShapeType="1" noTextEdit="1"/>
+              </p:cNvSpPr>
+              <p:nvPr/>
+            </p:nvSpPr>
+            <p:spPr>
+              <a:xfrm>
+                <a:off x="5325353" y="1393098"/>
+                <a:ext cx="253015" cy="495520"/>
+              </a:xfrm>
+              <a:prstGeom prst="rect">
+                <a:avLst/>
+              </a:prstGeom>
+              <a:blipFill>
+                <a:blip r:embed="rId3"/>
+                <a:stretch>
+                  <a:fillRect l="-56098" r="-24390" b="-7407"/>
+                </a:stretch>
+              </a:blipFill>
+            </p:spPr>
+            <p:txBody>
+              <a:bodyPr/>
+              <a:lstStyle/>
+              <a:p>
+                <a:r>
+                  <a:rPr lang="en-IN">
+                    <a:noFill/>
+                  </a:rPr>
+                  <a:t> </a:t>
+                </a:r>
+              </a:p>
+            </p:txBody>
+          </p:sp>
+        </mc:Fallback>
+      </mc:AlternateContent>
+      <mc:AlternateContent xmlns:mc="http://schemas.openxmlformats.org/markup-compatibility/2006">
+        <mc:Choice xmlns:a14="http://schemas.microsoft.com/office/drawing/2010/main" Requires="a14">
+          <p:sp>
+            <p:nvSpPr>
+              <p:cNvPr id="257" name="TextBox 256">
+                <a:extLst>
+                  <a:ext uri="{FF2B5EF4-FFF2-40B4-BE49-F238E27FC236}">
+                    <a16:creationId xmlns:a16="http://schemas.microsoft.com/office/drawing/2014/main" id="{B48FBBBD-718C-4B4D-AE06-46A1392B7681}"/>
+                  </a:ext>
+                </a:extLst>
+              </p:cNvPr>
+              <p:cNvSpPr txBox="1"/>
+              <p:nvPr/>
+            </p:nvSpPr>
+            <p:spPr>
+              <a:xfrm>
+                <a:off x="7830203" y="3663703"/>
+                <a:ext cx="253015" cy="461665"/>
+              </a:xfrm>
+              <a:prstGeom prst="rect">
+                <a:avLst/>
+              </a:prstGeom>
+              <a:noFill/>
+            </p:spPr>
+            <p:txBody>
+              <a:bodyPr wrap="square" rtlCol="0">
+                <a:spAutoFit/>
+              </a:bodyPr>
+              <a:lstStyle/>
+              <a:p>
+                <a:pPr algn="ctr"/>
+                <a14:m>
+                  <m:oMathPara xmlns:m="http://schemas.openxmlformats.org/officeDocument/2006/math">
+                    <m:oMathParaPr>
+                      <m:jc m:val="centerGroup"/>
+                    </m:oMathParaPr>
+                    <m:oMath xmlns:m="http://schemas.openxmlformats.org/officeDocument/2006/math">
+                      <m:sSub>
+                        <m:sSubPr>
+                          <m:ctrlPr>
+                            <a:rPr lang="en-US" sz="2400" b="1" smtClean="0">
+                              <a:latin typeface="Cambria Math" panose="02040503050406030204" pitchFamily="18" charset="0"/>
+                            </a:rPr>
+                          </m:ctrlPr>
+                        </m:sSubPr>
+                        <m:e>
+                          <m:r>
+                            <a:rPr lang="en-US" sz="2400" b="1" i="1">
+                              <a:latin typeface="Cambria Math" panose="02040503050406030204" pitchFamily="18" charset="0"/>
+                            </a:rPr>
+                            <m:t>𝝐</m:t>
+                          </m:r>
+                        </m:e>
+                        <m:sub>
+                          <m:r>
+                            <a:rPr lang="en-US" sz="2400" b="1" i="1" smtClean="0">
+                              <a:latin typeface="Cambria Math" panose="02040503050406030204" pitchFamily="18" charset="0"/>
+                            </a:rPr>
+                            <m:t>𝒙</m:t>
+                          </m:r>
+                        </m:sub>
+                      </m:sSub>
+                    </m:oMath>
+                  </m:oMathPara>
+                </a14:m>
+                <a:endParaRPr lang="en-US" sz="2400" b="1"/>
+              </a:p>
+            </p:txBody>
+          </p:sp>
+        </mc:Choice>
+        <mc:Fallback>
+          <p:sp>
+            <p:nvSpPr>
+              <p:cNvPr id="257" name="TextBox 256">
+                <a:extLst>
+                  <a:ext uri="{FF2B5EF4-FFF2-40B4-BE49-F238E27FC236}">
+                    <a16:creationId xmlns:a16="http://schemas.microsoft.com/office/drawing/2014/main" id="{B48FBBBD-718C-4B4D-AE06-46A1392B7681}"/>
+                  </a:ext>
+                </a:extLst>
+              </p:cNvPr>
+              <p:cNvSpPr txBox="1">
+                <a:spLocks noRot="1" noChangeAspect="1" noMove="1" noResize="1" noEditPoints="1" noAdjustHandles="1" noChangeArrowheads="1" noChangeShapeType="1" noTextEdit="1"/>
+              </p:cNvSpPr>
+              <p:nvPr/>
+            </p:nvSpPr>
+            <p:spPr>
+              <a:xfrm>
+                <a:off x="7830203" y="3663703"/>
+                <a:ext cx="253015" cy="461665"/>
+              </a:xfrm>
+              <a:prstGeom prst="rect">
+                <a:avLst/>
+              </a:prstGeom>
+              <a:blipFill>
+                <a:blip r:embed="rId4"/>
+                <a:stretch>
+                  <a:fillRect l="-50000" r="-11905"/>
+                </a:stretch>
+              </a:blipFill>
+            </p:spPr>
+            <p:txBody>
+              <a:bodyPr/>
+              <a:lstStyle/>
+              <a:p>
+                <a:r>
+                  <a:rPr lang="en-IN">
+                    <a:noFill/>
+                  </a:rPr>
+                  <a:t> </a:t>
+                </a:r>
+              </a:p>
+            </p:txBody>
+          </p:sp>
+        </mc:Fallback>
+      </mc:AlternateContent>
+      <p:sp>
+        <p:nvSpPr>
+          <p:cNvPr id="21" name="Arc 20">
+            <a:extLst>
+              <a:ext uri="{FF2B5EF4-FFF2-40B4-BE49-F238E27FC236}">
+                <a16:creationId xmlns:a16="http://schemas.microsoft.com/office/drawing/2014/main" id="{3FADCFED-5D37-41DD-8758-AA7035AA40AD}"/>
+              </a:ext>
+            </a:extLst>
+          </p:cNvPr>
+          <p:cNvSpPr/>
+          <p:nvPr/>
+        </p:nvSpPr>
+        <p:spPr>
+          <a:xfrm rot="3248404">
+            <a:off x="6085946" y="2934790"/>
+            <a:ext cx="914400" cy="914400"/>
+          </a:xfrm>
+          <a:prstGeom prst="arc">
+            <a:avLst>
+              <a:gd name="adj1" fmla="val 15150010"/>
+              <a:gd name="adj2" fmla="val 20231058"/>
+            </a:avLst>
+          </a:prstGeom>
+          <a:ln w="57150"/>
+        </p:spPr>
+        <p:style>
+          <a:lnRef idx="1">
+            <a:schemeClr val="dk1"/>
+          </a:lnRef>
+          <a:fillRef idx="0">
+            <a:schemeClr val="dk1"/>
+          </a:fillRef>
+          <a:effectRef idx="0">
+            <a:schemeClr val="dk1"/>
+          </a:effectRef>
+          <a:fontRef idx="minor">
+            <a:schemeClr val="tx1"/>
+          </a:fontRef>
+        </p:style>
+        <p:txBody>
+          <a:bodyPr rtlCol="0" anchor="ctr"/>
+          <a:lstStyle/>
+          <a:p>
+            <a:pPr algn="ctr"/>
+            <a:endParaRPr lang="en-IN"/>
+          </a:p>
+        </p:txBody>
+      </p:sp>
+      <mc:AlternateContent xmlns:mc="http://schemas.openxmlformats.org/markup-compatibility/2006">
+        <mc:Choice xmlns:a14="http://schemas.microsoft.com/office/drawing/2010/main" Requires="a14">
+          <p:sp>
+            <p:nvSpPr>
+              <p:cNvPr id="258" name="TextBox 257">
+                <a:extLst>
+                  <a:ext uri="{FF2B5EF4-FFF2-40B4-BE49-F238E27FC236}">
+                    <a16:creationId xmlns:a16="http://schemas.microsoft.com/office/drawing/2014/main" id="{4F71A075-C545-4319-928B-4D5500187E24}"/>
+                  </a:ext>
+                </a:extLst>
+              </p:cNvPr>
+              <p:cNvSpPr txBox="1"/>
+              <p:nvPr/>
+            </p:nvSpPr>
+            <p:spPr>
+              <a:xfrm>
+                <a:off x="6969434" y="3059668"/>
+                <a:ext cx="389961" cy="369332"/>
+              </a:xfrm>
+              <a:prstGeom prst="rect">
+                <a:avLst/>
+              </a:prstGeom>
+              <a:noFill/>
+            </p:spPr>
+            <p:txBody>
+              <a:bodyPr wrap="square" rtlCol="0">
+                <a:spAutoFit/>
+              </a:bodyPr>
+              <a:lstStyle/>
+              <a:p>
+                <a:pPr algn="ctr"/>
+                <a14:m>
+                  <m:oMathPara xmlns:m="http://schemas.openxmlformats.org/officeDocument/2006/math">
+                    <m:oMathParaPr>
+                      <m:jc m:val="centerGroup"/>
+                    </m:oMathParaPr>
+                    <m:oMath xmlns:m="http://schemas.openxmlformats.org/officeDocument/2006/math">
+                      <m:r>
+                        <a:rPr lang="en-US" b="1" i="1" smtClean="0">
+                          <a:latin typeface="Cambria Math" panose="02040503050406030204" pitchFamily="18" charset="0"/>
+                          <a:ea typeface="Cambria Math" panose="02040503050406030204" pitchFamily="18" charset="0"/>
+                        </a:rPr>
+                        <m:t>𝜽</m:t>
+                      </m:r>
+                    </m:oMath>
+                  </m:oMathPara>
+                </a14:m>
+                <a:endParaRPr lang="en-US" b="1"/>
+              </a:p>
+            </p:txBody>
+          </p:sp>
+        </mc:Choice>
+        <mc:Fallback>
+          <p:sp>
+            <p:nvSpPr>
+              <p:cNvPr id="258" name="TextBox 257">
+                <a:extLst>
+                  <a:ext uri="{FF2B5EF4-FFF2-40B4-BE49-F238E27FC236}">
+                    <a16:creationId xmlns:a16="http://schemas.microsoft.com/office/drawing/2014/main" id="{4F71A075-C545-4319-928B-4D5500187E24}"/>
+                  </a:ext>
+                </a:extLst>
+              </p:cNvPr>
+              <p:cNvSpPr txBox="1">
+                <a:spLocks noRot="1" noChangeAspect="1" noMove="1" noResize="1" noEditPoints="1" noAdjustHandles="1" noChangeArrowheads="1" noChangeShapeType="1" noTextEdit="1"/>
+              </p:cNvSpPr>
+              <p:nvPr/>
+            </p:nvSpPr>
+            <p:spPr>
+              <a:xfrm>
+                <a:off x="6969434" y="3059668"/>
+                <a:ext cx="389961" cy="369332"/>
+              </a:xfrm>
+              <a:prstGeom prst="rect">
+                <a:avLst/>
+              </a:prstGeom>
+              <a:blipFill>
+                <a:blip r:embed="rId5"/>
+                <a:stretch>
+                  <a:fillRect/>
+                </a:stretch>
+              </a:blipFill>
+            </p:spPr>
+            <p:txBody>
+              <a:bodyPr/>
+              <a:lstStyle/>
+              <a:p>
+                <a:r>
+                  <a:rPr lang="en-IN">
+                    <a:noFill/>
+                  </a:rPr>
+                  <a:t> </a:t>
+                </a:r>
+              </a:p>
+            </p:txBody>
+          </p:sp>
+        </mc:Fallback>
+      </mc:AlternateContent>
+      <p:cxnSp>
+        <p:nvCxnSpPr>
+          <p:cNvPr id="24" name="Straight Connector 23">
+            <a:extLst>
+              <a:ext uri="{FF2B5EF4-FFF2-40B4-BE49-F238E27FC236}">
+                <a16:creationId xmlns:a16="http://schemas.microsoft.com/office/drawing/2014/main" id="{66A4CFA1-A928-49DF-9CB1-17E03C241552}"/>
+              </a:ext>
+            </a:extLst>
+          </p:cNvPr>
+          <p:cNvCxnSpPr>
+            <a:cxnSpLocks/>
+          </p:cNvCxnSpPr>
+          <p:nvPr/>
+        </p:nvCxnSpPr>
+        <p:spPr>
+          <a:xfrm>
+            <a:off x="4625251" y="1915938"/>
+            <a:ext cx="2214820" cy="3435991"/>
+          </a:xfrm>
+          <a:prstGeom prst="line">
+            <a:avLst/>
+          </a:prstGeom>
+          <a:ln w="38100">
+            <a:prstDash val="sysDash"/>
+          </a:ln>
+        </p:spPr>
+        <p:style>
+          <a:lnRef idx="1">
+            <a:schemeClr val="accent1"/>
+          </a:lnRef>
+          <a:fillRef idx="0">
+            <a:schemeClr val="accent1"/>
+          </a:fillRef>
+          <a:effectRef idx="0">
+            <a:schemeClr val="accent1"/>
+          </a:effectRef>
+          <a:fontRef idx="minor">
+            <a:schemeClr val="tx1"/>
+          </a:fontRef>
+        </p:style>
+      </p:cxnSp>
+      <p:sp>
+        <p:nvSpPr>
+          <p:cNvPr id="259" name="TextBox 258">
+            <a:extLst>
+              <a:ext uri="{FF2B5EF4-FFF2-40B4-BE49-F238E27FC236}">
+                <a16:creationId xmlns:a16="http://schemas.microsoft.com/office/drawing/2014/main" id="{88DAF485-7AF2-4915-B4AB-6782FA1B2945}"/>
+              </a:ext>
+            </a:extLst>
+          </p:cNvPr>
+          <p:cNvSpPr txBox="1"/>
+          <p:nvPr/>
+        </p:nvSpPr>
+        <p:spPr>
+          <a:xfrm>
+            <a:off x="4341429" y="1487813"/>
+            <a:ext cx="358587" cy="523220"/>
+          </a:xfrm>
+          <a:prstGeom prst="rect">
+            <a:avLst/>
+          </a:prstGeom>
+          <a:noFill/>
+        </p:spPr>
+        <p:txBody>
+          <a:bodyPr wrap="square" rtlCol="0">
+            <a:spAutoFit/>
+          </a:bodyPr>
+          <a:lstStyle/>
+          <a:p>
+            <a:r>
+              <a:rPr lang="en-US" sz="2800" b="1"/>
+              <a:t>A</a:t>
+            </a:r>
+            <a:endParaRPr lang="en-IN" sz="2800" b="1"/>
+          </a:p>
+        </p:txBody>
+      </p:sp>
+      <p:sp>
+        <p:nvSpPr>
+          <p:cNvPr id="260" name="TextBox 259">
+            <a:extLst>
+              <a:ext uri="{FF2B5EF4-FFF2-40B4-BE49-F238E27FC236}">
+                <a16:creationId xmlns:a16="http://schemas.microsoft.com/office/drawing/2014/main" id="{B3F7216E-5A23-45C5-BF88-C276CBAA6556}"/>
+              </a:ext>
+            </a:extLst>
+          </p:cNvPr>
+          <p:cNvSpPr txBox="1"/>
+          <p:nvPr/>
+        </p:nvSpPr>
+        <p:spPr>
+          <a:xfrm>
+            <a:off x="6765306" y="5221898"/>
+            <a:ext cx="358587" cy="523220"/>
+          </a:xfrm>
+          <a:prstGeom prst="rect">
+            <a:avLst/>
+          </a:prstGeom>
+          <a:noFill/>
+        </p:spPr>
+        <p:txBody>
+          <a:bodyPr wrap="square" rtlCol="0">
+            <a:spAutoFit/>
+          </a:bodyPr>
+          <a:lstStyle/>
+          <a:p>
+            <a:r>
+              <a:rPr lang="en-US" sz="2800" b="1"/>
+              <a:t>A</a:t>
+            </a:r>
+            <a:endParaRPr lang="en-IN" sz="2800" b="1"/>
+          </a:p>
+        </p:txBody>
+      </p:sp>
+      <p:sp>
+        <p:nvSpPr>
+          <p:cNvPr id="261" name="Arc 260">
+            <a:extLst>
+              <a:ext uri="{FF2B5EF4-FFF2-40B4-BE49-F238E27FC236}">
+                <a16:creationId xmlns:a16="http://schemas.microsoft.com/office/drawing/2014/main" id="{F6F5A375-D82B-45B3-9582-A5C5DB30F48D}"/>
+              </a:ext>
+            </a:extLst>
+          </p:cNvPr>
+          <p:cNvSpPr/>
+          <p:nvPr/>
+        </p:nvSpPr>
+        <p:spPr>
+          <a:xfrm rot="17795845">
+            <a:off x="6099838" y="4196341"/>
+            <a:ext cx="914400" cy="914400"/>
+          </a:xfrm>
+          <a:prstGeom prst="arc">
+            <a:avLst>
+              <a:gd name="adj1" fmla="val 17123329"/>
+              <a:gd name="adj2" fmla="val 19685584"/>
+            </a:avLst>
+          </a:prstGeom>
+          <a:ln w="57150"/>
+        </p:spPr>
+        <p:style>
+          <a:lnRef idx="1">
+            <a:schemeClr val="dk1"/>
+          </a:lnRef>
+          <a:fillRef idx="0">
+            <a:schemeClr val="dk1"/>
+          </a:fillRef>
+          <a:effectRef idx="0">
+            <a:schemeClr val="dk1"/>
+          </a:effectRef>
+          <a:fontRef idx="minor">
+            <a:schemeClr val="tx1"/>
+          </a:fontRef>
+        </p:style>
+        <p:txBody>
+          <a:bodyPr rtlCol="0" anchor="ctr"/>
+          <a:lstStyle/>
+          <a:p>
+            <a:pPr algn="ctr"/>
+            <a:endParaRPr lang="en-IN"/>
+          </a:p>
+        </p:txBody>
+      </p:sp>
+      <mc:AlternateContent xmlns:mc="http://schemas.openxmlformats.org/markup-compatibility/2006">
+        <mc:Choice xmlns:a14="http://schemas.microsoft.com/office/drawing/2010/main" Requires="a14">
+          <p:sp>
+            <p:nvSpPr>
+              <p:cNvPr id="262" name="TextBox 261">
+                <a:extLst>
+                  <a:ext uri="{FF2B5EF4-FFF2-40B4-BE49-F238E27FC236}">
+                    <a16:creationId xmlns:a16="http://schemas.microsoft.com/office/drawing/2014/main" id="{4220635E-F63D-4BCC-98BA-6885C98CAF68}"/>
+                  </a:ext>
+                </a:extLst>
+              </p:cNvPr>
+              <p:cNvSpPr txBox="1"/>
+              <p:nvPr/>
+            </p:nvSpPr>
+            <p:spPr>
+              <a:xfrm>
+                <a:off x="6118168" y="3886777"/>
+                <a:ext cx="389961" cy="369332"/>
+              </a:xfrm>
+              <a:prstGeom prst="rect">
+                <a:avLst/>
+              </a:prstGeom>
+              <a:noFill/>
+            </p:spPr>
+            <p:txBody>
+              <a:bodyPr wrap="square" rtlCol="0">
+                <a:spAutoFit/>
+              </a:bodyPr>
+              <a:lstStyle/>
+              <a:p>
+                <a:pPr algn="ctr"/>
+                <a14:m>
+                  <m:oMathPara xmlns:m="http://schemas.openxmlformats.org/officeDocument/2006/math">
+                    <m:oMathParaPr>
+                      <m:jc m:val="centerGroup"/>
+                    </m:oMathParaPr>
+                    <m:oMath xmlns:m="http://schemas.openxmlformats.org/officeDocument/2006/math">
+                      <m:r>
+                        <a:rPr lang="en-US" b="1" i="1" smtClean="0">
+                          <a:latin typeface="Cambria Math" panose="02040503050406030204" pitchFamily="18" charset="0"/>
+                          <a:ea typeface="Cambria Math" panose="02040503050406030204" pitchFamily="18" charset="0"/>
+                        </a:rPr>
+                        <m:t>𝜽</m:t>
+                      </m:r>
+                    </m:oMath>
+                  </m:oMathPara>
+                </a14:m>
+                <a:endParaRPr lang="en-US" b="1"/>
+              </a:p>
+            </p:txBody>
+          </p:sp>
+        </mc:Choice>
+        <mc:Fallback>
+          <p:sp>
+            <p:nvSpPr>
+              <p:cNvPr id="262" name="TextBox 261">
+                <a:extLst>
+                  <a:ext uri="{FF2B5EF4-FFF2-40B4-BE49-F238E27FC236}">
+                    <a16:creationId xmlns:a16="http://schemas.microsoft.com/office/drawing/2014/main" id="{4220635E-F63D-4BCC-98BA-6885C98CAF68}"/>
+                  </a:ext>
+                </a:extLst>
+              </p:cNvPr>
+              <p:cNvSpPr txBox="1">
+                <a:spLocks noRot="1" noChangeAspect="1" noMove="1" noResize="1" noEditPoints="1" noAdjustHandles="1" noChangeArrowheads="1" noChangeShapeType="1" noTextEdit="1"/>
+              </p:cNvSpPr>
+              <p:nvPr/>
+            </p:nvSpPr>
+            <p:spPr>
+              <a:xfrm>
+                <a:off x="6118168" y="3886777"/>
+                <a:ext cx="389961" cy="369332"/>
+              </a:xfrm>
+              <a:prstGeom prst="rect">
+                <a:avLst/>
+              </a:prstGeom>
+              <a:blipFill>
+                <a:blip r:embed="rId6"/>
+                <a:stretch>
+                  <a:fillRect/>
+                </a:stretch>
+              </a:blipFill>
+            </p:spPr>
+            <p:txBody>
+              <a:bodyPr/>
+              <a:lstStyle/>
+              <a:p>
+                <a:r>
+                  <a:rPr lang="en-IN">
+                    <a:noFill/>
+                  </a:rPr>
+                  <a:t> </a:t>
+                </a:r>
+              </a:p>
+            </p:txBody>
+          </p:sp>
+        </mc:Fallback>
+      </mc:AlternateContent>
+      <p:cxnSp>
+        <p:nvCxnSpPr>
+          <p:cNvPr id="265" name="Straight Arrow Connector 264">
+            <a:extLst>
+              <a:ext uri="{FF2B5EF4-FFF2-40B4-BE49-F238E27FC236}">
+                <a16:creationId xmlns:a16="http://schemas.microsoft.com/office/drawing/2014/main" id="{9692387B-6F17-4D4A-880B-3E944E255B68}"/>
+              </a:ext>
+            </a:extLst>
+          </p:cNvPr>
+          <p:cNvCxnSpPr>
+            <a:cxnSpLocks/>
+          </p:cNvCxnSpPr>
+          <p:nvPr/>
+        </p:nvCxnSpPr>
+        <p:spPr>
+          <a:xfrm flipH="1" flipV="1">
+            <a:off x="3990368" y="875127"/>
+            <a:ext cx="1766046" cy="2755501"/>
+          </a:xfrm>
+          <a:prstGeom prst="straightConnector1">
+            <a:avLst/>
+          </a:prstGeom>
+          <a:ln w="57150">
+            <a:tailEnd type="triangle"/>
+          </a:ln>
+        </p:spPr>
+        <p:style>
+          <a:lnRef idx="1">
+            <a:schemeClr val="dk1"/>
+          </a:lnRef>
+          <a:fillRef idx="0">
+            <a:schemeClr val="dk1"/>
+          </a:fillRef>
+          <a:effectRef idx="0">
+            <a:schemeClr val="dk1"/>
+          </a:effectRef>
+          <a:fontRef idx="minor">
+            <a:schemeClr val="tx1"/>
+          </a:fontRef>
+        </p:style>
+      </p:cxnSp>
+      <mc:AlternateContent xmlns:mc="http://schemas.openxmlformats.org/markup-compatibility/2006">
+        <mc:Choice xmlns:a14="http://schemas.microsoft.com/office/drawing/2010/main" Requires="a14">
+          <p:sp>
+            <p:nvSpPr>
+              <p:cNvPr id="267" name="TextBox 266">
+                <a:extLst>
+                  <a:ext uri="{FF2B5EF4-FFF2-40B4-BE49-F238E27FC236}">
+                    <a16:creationId xmlns:a16="http://schemas.microsoft.com/office/drawing/2014/main" id="{751BC175-8BBE-4383-8884-272EB4784F57}"/>
+                  </a:ext>
+                </a:extLst>
+              </p:cNvPr>
+              <p:cNvSpPr txBox="1"/>
+              <p:nvPr/>
+            </p:nvSpPr>
+            <p:spPr>
+              <a:xfrm>
+                <a:off x="4193087" y="1729574"/>
+                <a:ext cx="253015" cy="495520"/>
+              </a:xfrm>
+              <a:prstGeom prst="rect">
+                <a:avLst/>
+              </a:prstGeom>
+              <a:noFill/>
+            </p:spPr>
+            <p:txBody>
+              <a:bodyPr wrap="square" rtlCol="0">
+                <a:spAutoFit/>
+              </a:bodyPr>
+              <a:lstStyle/>
+              <a:p>
+                <a:pPr algn="ctr"/>
+                <a14:m>
+                  <m:oMathPara xmlns:m="http://schemas.openxmlformats.org/officeDocument/2006/math">
+                    <m:oMathParaPr>
+                      <m:jc m:val="centerGroup"/>
+                    </m:oMathParaPr>
+                    <m:oMath xmlns:m="http://schemas.openxmlformats.org/officeDocument/2006/math">
+                      <m:sSub>
+                        <m:sSubPr>
+                          <m:ctrlPr>
+                            <a:rPr lang="en-US" sz="2400" b="1" smtClean="0">
+                              <a:latin typeface="Cambria Math" panose="02040503050406030204" pitchFamily="18" charset="0"/>
+                            </a:rPr>
+                          </m:ctrlPr>
+                        </m:sSubPr>
+                        <m:e>
+                          <m:r>
+                            <a:rPr lang="en-US" sz="2400" b="1" i="1">
+                              <a:latin typeface="Cambria Math" panose="02040503050406030204" pitchFamily="18" charset="0"/>
+                            </a:rPr>
+                            <m:t>𝝐</m:t>
+                          </m:r>
+                        </m:e>
+                        <m:sub>
+                          <m:r>
+                            <a:rPr lang="en-US" sz="2400" b="1" i="1">
+                              <a:latin typeface="Cambria Math" panose="02040503050406030204" pitchFamily="18" charset="0"/>
+                            </a:rPr>
+                            <m:t>𝒚</m:t>
+                          </m:r>
+                          <m:r>
+                            <a:rPr lang="en-US" sz="2400" b="1" i="1" smtClean="0">
+                              <a:latin typeface="Cambria Math" panose="02040503050406030204" pitchFamily="18" charset="0"/>
+                            </a:rPr>
+                            <m:t>′</m:t>
+                          </m:r>
+                        </m:sub>
+                      </m:sSub>
+                    </m:oMath>
+                  </m:oMathPara>
+                </a14:m>
+                <a:endParaRPr lang="en-US" sz="2400" b="1"/>
+              </a:p>
+            </p:txBody>
+          </p:sp>
+        </mc:Choice>
+        <mc:Fallback>
+          <p:sp>
+            <p:nvSpPr>
+              <p:cNvPr id="267" name="TextBox 266">
+                <a:extLst>
+                  <a:ext uri="{FF2B5EF4-FFF2-40B4-BE49-F238E27FC236}">
+                    <a16:creationId xmlns:a16="http://schemas.microsoft.com/office/drawing/2014/main" id="{751BC175-8BBE-4383-8884-272EB4784F57}"/>
+                  </a:ext>
+                </a:extLst>
+              </p:cNvPr>
+              <p:cNvSpPr txBox="1">
+                <a:spLocks noRot="1" noChangeAspect="1" noMove="1" noResize="1" noEditPoints="1" noAdjustHandles="1" noChangeArrowheads="1" noChangeShapeType="1" noTextEdit="1"/>
+              </p:cNvSpPr>
+              <p:nvPr/>
+            </p:nvSpPr>
+            <p:spPr>
+              <a:xfrm>
+                <a:off x="4193087" y="1729574"/>
+                <a:ext cx="253015" cy="495520"/>
+              </a:xfrm>
+              <a:prstGeom prst="rect">
+                <a:avLst/>
+              </a:prstGeom>
+              <a:blipFill>
+                <a:blip r:embed="rId7"/>
+                <a:stretch>
+                  <a:fillRect l="-70732" r="-31707" b="-7407"/>
+                </a:stretch>
+              </a:blipFill>
+            </p:spPr>
+            <p:txBody>
+              <a:bodyPr/>
+              <a:lstStyle/>
+              <a:p>
+                <a:r>
+                  <a:rPr lang="en-IN">
+                    <a:noFill/>
+                  </a:rPr>
+                  <a:t> </a:t>
+                </a:r>
+              </a:p>
+            </p:txBody>
+          </p:sp>
+        </mc:Fallback>
+      </mc:AlternateContent>
+      <p:sp>
+        <p:nvSpPr>
+          <p:cNvPr id="268" name="Rectangle 267">
+            <a:extLst>
+              <a:ext uri="{FF2B5EF4-FFF2-40B4-BE49-F238E27FC236}">
+                <a16:creationId xmlns:a16="http://schemas.microsoft.com/office/drawing/2014/main" id="{DE8FB70B-C767-4EB4-A858-82E38D62BB85}"/>
+              </a:ext>
+            </a:extLst>
+          </p:cNvPr>
+          <p:cNvSpPr/>
+          <p:nvPr/>
+        </p:nvSpPr>
+        <p:spPr>
+          <a:xfrm rot="19536563">
+            <a:off x="4465035" y="1412829"/>
+            <a:ext cx="277878" cy="896462"/>
+          </a:xfrm>
+          <a:prstGeom prst="rect">
+            <a:avLst/>
+          </a:prstGeom>
+        </p:spPr>
+        <p:style>
+          <a:lnRef idx="2">
+            <a:schemeClr val="accent1">
+              <a:shade val="50000"/>
+            </a:schemeClr>
+          </a:lnRef>
+          <a:fillRef idx="1">
+            <a:schemeClr val="accent1"/>
+          </a:fillRef>
+          <a:effectRef idx="0">
+            <a:schemeClr val="accent1"/>
+          </a:effectRef>
+          <a:fontRef idx="minor">
+            <a:schemeClr val="lt1"/>
+          </a:fontRef>
+        </p:style>
+        <p:txBody>
+          <a:bodyPr rtlCol="0" anchor="ctr"/>
+          <a:lstStyle/>
+          <a:p>
+            <a:pPr algn="ctr"/>
+            <a:endParaRPr lang="en-IN"/>
+          </a:p>
+        </p:txBody>
+      </p:sp>
+    </p:spTree>
+    <p:extLst>
+      <p:ext uri="{BB962C8B-B14F-4D97-AF65-F5344CB8AC3E}">
+        <p14:creationId xmlns:p14="http://schemas.microsoft.com/office/powerpoint/2010/main" val="3892318033"/>
       </p:ext>
     </p:extLst>
   </p:cSld>

</xml_diff>